<commit_message>
Increased size of notification text fields in MainActivity, changed API levels in manifest to 17 and 19, updated presentation for Columbus Code Camp.
</commit_message>
<xml_diff>
--- a/Implementing Push Notification in Android.pptx
+++ b/Implementing Push Notification in Android.pptx
@@ -213,7 +213,7 @@
           <a:p>
             <a:fld id="{AB6131E3-072D-1447-B771-F05C9D397949}" type="datetimeFigureOut">
               <a:rPr lang="en-US" smtClean="0"/>
-              <a:t>7/16/14</a:t>
+              <a:t>10/8/14</a:t>
             </a:fld>
             <a:endParaRPr lang="en-US" dirty="0"/>
           </a:p>
@@ -378,7 +378,7 @@
           <a:p>
             <a:fld id="{DE4C9721-1813-4A55-A5DA-76417DB5EE62}" type="datetimeFigureOut">
               <a:rPr lang="en-US" smtClean="0"/>
-              <a:t>7/16/14</a:t>
+              <a:t>10/8/14</a:t>
             </a:fld>
             <a:endParaRPr lang="en-US" dirty="0"/>
           </a:p>
@@ -1019,7 +1019,7 @@
           <a:p>
             <a:fld id="{1A6A9824-C09F-4166-9A2C-6C9FA577887A}" type="datetimeFigureOut">
               <a:rPr lang="en-US" smtClean="0"/>
-              <a:t>7/16/14</a:t>
+              <a:t>10/8/14</a:t>
             </a:fld>
             <a:endParaRPr lang="en-US" dirty="0"/>
           </a:p>
@@ -1189,7 +1189,7 @@
           <a:p>
             <a:fld id="{1A6A9824-C09F-4166-9A2C-6C9FA577887A}" type="datetimeFigureOut">
               <a:rPr lang="en-US" smtClean="0"/>
-              <a:t>7/16/14</a:t>
+              <a:t>10/8/14</a:t>
             </a:fld>
             <a:endParaRPr lang="en-US" dirty="0"/>
           </a:p>
@@ -1369,7 +1369,7 @@
           <a:p>
             <a:fld id="{1A6A9824-C09F-4166-9A2C-6C9FA577887A}" type="datetimeFigureOut">
               <a:rPr lang="en-US" smtClean="0"/>
-              <a:t>7/16/14</a:t>
+              <a:t>10/8/14</a:t>
             </a:fld>
             <a:endParaRPr lang="en-US" dirty="0"/>
           </a:p>
@@ -1539,7 +1539,7 @@
           <a:p>
             <a:fld id="{1A6A9824-C09F-4166-9A2C-6C9FA577887A}" type="datetimeFigureOut">
               <a:rPr lang="en-US" smtClean="0"/>
-              <a:t>7/16/14</a:t>
+              <a:t>10/8/14</a:t>
             </a:fld>
             <a:endParaRPr lang="en-US" dirty="0"/>
           </a:p>
@@ -1785,7 +1785,7 @@
           <a:p>
             <a:fld id="{1A6A9824-C09F-4166-9A2C-6C9FA577887A}" type="datetimeFigureOut">
               <a:rPr lang="en-US" smtClean="0"/>
-              <a:t>7/16/14</a:t>
+              <a:t>10/8/14</a:t>
             </a:fld>
             <a:endParaRPr lang="en-US" dirty="0"/>
           </a:p>
@@ -2073,7 +2073,7 @@
           <a:p>
             <a:fld id="{1A6A9824-C09F-4166-9A2C-6C9FA577887A}" type="datetimeFigureOut">
               <a:rPr lang="en-US" smtClean="0"/>
-              <a:t>7/16/14</a:t>
+              <a:t>10/8/14</a:t>
             </a:fld>
             <a:endParaRPr lang="en-US" dirty="0"/>
           </a:p>
@@ -2495,7 +2495,7 @@
           <a:p>
             <a:fld id="{1A6A9824-C09F-4166-9A2C-6C9FA577887A}" type="datetimeFigureOut">
               <a:rPr lang="en-US" smtClean="0"/>
-              <a:t>7/16/14</a:t>
+              <a:t>10/8/14</a:t>
             </a:fld>
             <a:endParaRPr lang="en-US" dirty="0"/>
           </a:p>
@@ -2613,7 +2613,7 @@
           <a:p>
             <a:fld id="{1A6A9824-C09F-4166-9A2C-6C9FA577887A}" type="datetimeFigureOut">
               <a:rPr lang="en-US" smtClean="0"/>
-              <a:t>7/16/14</a:t>
+              <a:t>10/8/14</a:t>
             </a:fld>
             <a:endParaRPr lang="en-US" dirty="0"/>
           </a:p>
@@ -2708,7 +2708,7 @@
           <a:p>
             <a:fld id="{1A6A9824-C09F-4166-9A2C-6C9FA577887A}" type="datetimeFigureOut">
               <a:rPr lang="en-US" smtClean="0"/>
-              <a:t>7/16/14</a:t>
+              <a:t>10/8/14</a:t>
             </a:fld>
             <a:endParaRPr lang="en-US" dirty="0"/>
           </a:p>
@@ -2985,7 +2985,7 @@
           <a:p>
             <a:fld id="{1A6A9824-C09F-4166-9A2C-6C9FA577887A}" type="datetimeFigureOut">
               <a:rPr lang="en-US" smtClean="0"/>
-              <a:t>7/16/14</a:t>
+              <a:t>10/8/14</a:t>
             </a:fld>
             <a:endParaRPr lang="en-US" dirty="0"/>
           </a:p>
@@ -3242,7 +3242,7 @@
           <a:p>
             <a:fld id="{1A6A9824-C09F-4166-9A2C-6C9FA577887A}" type="datetimeFigureOut">
               <a:rPr lang="en-US" smtClean="0"/>
-              <a:t>7/16/14</a:t>
+              <a:t>10/8/14</a:t>
             </a:fld>
             <a:endParaRPr lang="en-US" dirty="0"/>
           </a:p>
@@ -3526,7 +3526,7 @@
           <a:p>
             <a:fld id="{1A6A9824-C09F-4166-9A2C-6C9FA577887A}" type="datetimeFigureOut">
               <a:rPr lang="en-US" smtClean="0"/>
-              <a:t>7/16/14</a:t>
+              <a:t>10/8/14</a:t>
             </a:fld>
             <a:endParaRPr lang="en-US" dirty="0"/>
           </a:p>
@@ -4519,11 +4519,11 @@
           <a:p>
             <a:r>
               <a:rPr lang="en-US" dirty="0"/>
-              <a:t>Check for Google Play Services </a:t>
+              <a:t>Check for Google Play </a:t>
             </a:r>
             <a:r>
               <a:rPr lang="en-US" dirty="0" smtClean="0"/>
-              <a:t>APK</a:t>
+              <a:t>Services</a:t>
             </a:r>
             <a:endParaRPr lang="en-US" dirty="0"/>
           </a:p>
@@ -4548,7 +4548,7 @@
           <a:p>
             <a:r>
               <a:rPr lang="en-US" sz="2400" dirty="0" smtClean="0"/>
-              <a:t>Apps relying on Google Play Services SDK should check for compatible version</a:t>
+              <a:t>Apps relying on Google Play Services should check for compatible version</a:t>
             </a:r>
           </a:p>
           <a:p>
@@ -4883,7 +4883,15 @@
           <a:p>
             <a:r>
               <a:rPr lang="en-US" sz="2400" dirty="0" smtClean="0"/>
-              <a:t>HTTP status code 401 indicates invalid API key</a:t>
+              <a:t>HTTP status code 401 indicates invalid </a:t>
+            </a:r>
+            <a:r>
+              <a:rPr lang="en-US" sz="2400" dirty="0" smtClean="0"/>
+              <a:t>server API </a:t>
+            </a:r>
+            <a:r>
+              <a:rPr lang="en-US" sz="2400" dirty="0" smtClean="0"/>
+              <a:t>key</a:t>
             </a:r>
           </a:p>
           <a:p>
@@ -4928,7 +4936,11 @@
             </a:r>
             <a:r>
               <a:rPr lang="en-US" sz="2400" dirty="0"/>
-              <a:t>invalid registration </a:t>
+              <a:t>invalid </a:t>
+            </a:r>
+            <a:r>
+              <a:rPr lang="en-US" sz="2400" dirty="0" smtClean="0"/>
+              <a:t>device registration </a:t>
             </a:r>
             <a:r>
               <a:rPr lang="en-US" sz="2400" dirty="0" smtClean="0"/>
@@ -5247,12 +5259,8 @@
           <a:lstStyle/>
           <a:p>
             <a:r>
-              <a:rPr lang="en-US" dirty="0"/>
-              <a:t>Edit </a:t>
-            </a:r>
-            <a:r>
               <a:rPr lang="en-US" dirty="0" smtClean="0"/>
-              <a:t>the Application's </a:t>
+              <a:t>Update the App's </a:t>
             </a:r>
             <a:r>
               <a:rPr lang="en-US" dirty="0"/>
@@ -5354,7 +5362,7 @@
           <a:p>
             <a:r>
               <a:rPr lang="en-US" dirty="0" smtClean="0"/>
-              <a:t>Testing Without Server</a:t>
+              <a:t>Testing Without a Server</a:t>
             </a:r>
             <a:endParaRPr lang="en-US" dirty="0"/>
           </a:p>
@@ -5790,27 +5798,35 @@
           <a:p>
             <a:r>
               <a:rPr lang="en-US" sz="2000" dirty="0"/>
-              <a:t>Check for Google Play Services </a:t>
+              <a:t>Check for Google Play </a:t>
             </a:r>
             <a:r>
               <a:rPr lang="en-US" sz="2000" dirty="0" smtClean="0"/>
-              <a:t>APK</a:t>
+              <a:t>Services Availability</a:t>
             </a:r>
           </a:p>
           <a:p>
             <a:r>
               <a:rPr lang="en-US" sz="2000" dirty="0" smtClean="0"/>
-              <a:t>Register with GCM</a:t>
+              <a:t>Register Your App with GCM</a:t>
             </a:r>
           </a:p>
           <a:p>
             <a:r>
               <a:rPr lang="en-US" sz="2000" dirty="0"/>
-              <a:t>Test API Key and Registration </a:t>
+              <a:t>Test </a:t>
             </a:r>
             <a:r>
               <a:rPr lang="en-US" sz="2000" dirty="0" smtClean="0"/>
-              <a:t>ID</a:t>
+              <a:t>API </a:t>
+            </a:r>
+            <a:r>
+              <a:rPr lang="en-US" sz="2000" dirty="0"/>
+              <a:t>Key and </a:t>
+            </a:r>
+            <a:r>
+              <a:rPr lang="en-US" sz="2000" dirty="0" smtClean="0"/>
+              <a:t>Registration ID</a:t>
             </a:r>
           </a:p>
           <a:p>
@@ -5840,13 +5856,13 @@
           <a:p>
             <a:r>
               <a:rPr lang="en-US" sz="2000" dirty="0" smtClean="0"/>
-              <a:t>Edit the Application's Manifest</a:t>
+              <a:t>Update the App's Manifest</a:t>
             </a:r>
           </a:p>
           <a:p>
             <a:r>
               <a:rPr lang="en-US" sz="2000" dirty="0" smtClean="0"/>
-              <a:t>Testing Without Server</a:t>
+              <a:t>Testing Without a Server</a:t>
             </a:r>
           </a:p>
           <a:p>
@@ -5939,7 +5955,7 @@
         <p:spPr/>
         <p:txBody>
           <a:bodyPr>
-            <a:normAutofit/>
+            <a:normAutofit fontScale="92500" lnSpcReduction="10000"/>
           </a:bodyPr>
           <a:lstStyle/>
           <a:p>
@@ -5956,7 +5972,15 @@
             </a:r>
             <a:r>
               <a:rPr lang="en-US" sz="2000" dirty="0"/>
-              <a:t>24 years experience designing, developing and delivering high quality software solutions for several companies including Lexmark, Diebold, Limited Brands, Sterling Commerce and IBM. He recently completed a PhoneGap / web technology based Android mobile app solution to help automate the workflow for his client's 1,200 service technicians.  He also recently completed push notification support for a client’s native Android app that allows the client’s employees to be notified of new equipment alarms</a:t>
+              <a:t>25 years experience designing, developing and delivering high quality software solutions for several companies including Lexmark, Diebold, Limited Brands, Sterling Commerce and IBM. He completed a PhoneGap / web technology based Android mobile app solution to help automate the workflow for his client's 1,200 service technicians. He also completed push notification support for a client’s native Android app that allows the client’s employees to be notified of new equipment alarms. He has presented "Real World Mobile App Development with Phonegap" at Columbus Code Camp, </a:t>
+            </a:r>
+            <a:r>
+              <a:rPr lang="en-US" sz="2000" dirty="0" err="1"/>
+              <a:t>StirTrek</a:t>
+            </a:r>
+            <a:r>
+              <a:rPr lang="en-US" sz="2000" dirty="0"/>
+              <a:t> and M3. He is currently working on the design and architecture of a mobile and server vehicle health management solution for a large trucking company</a:t>
             </a:r>
             <a:r>
               <a:rPr lang="en-US" sz="2000" dirty="0" smtClean="0"/>
@@ -5965,8 +5989,12 @@
           </a:p>
           <a:p>
             <a:r>
+              <a:rPr lang="en-US" sz="2400" dirty="0" smtClean="0"/>
+              <a:t>About </a:t>
+            </a:r>
+            <a:r>
               <a:rPr lang="en-US" sz="2400" dirty="0"/>
-              <a:t>About Leading EDJE</a:t>
+              <a:t>Leading EDJE</a:t>
             </a:r>
           </a:p>
           <a:p>

</xml_diff>

<commit_message>
Updates for Columbus Code Camp 2014
</commit_message>
<xml_diff>
--- a/Implementing Push Notification in Android.pptx
+++ b/Implementing Push Notification in Android.pptx
@@ -21,7 +21,7 @@
     <p:sldId id="265" r:id="rId9"/>
     <p:sldId id="266" r:id="rId10"/>
     <p:sldId id="267" r:id="rId11"/>
-    <p:sldId id="268" r:id="rId12"/>
+    <p:sldId id="276" r:id="rId12"/>
     <p:sldId id="270" r:id="rId13"/>
     <p:sldId id="271" r:id="rId14"/>
     <p:sldId id="272" r:id="rId15"/>
@@ -128,6 +128,36 @@
       </a:defRPr>
     </a:lvl9pPr>
   </p:defaultTextStyle>
+  <p:extLst>
+    <p:ext uri="{EFAFB233-063F-42B5-8137-9DF3F51BA10A}">
+      <p15:sldGuideLst xmlns:p15="http://schemas.microsoft.com/office/powerpoint/2012/main">
+        <p15:guide id="1" orient="horz" pos="2160">
+          <p15:clr>
+            <a:srgbClr val="A4A3A4"/>
+          </p15:clr>
+        </p15:guide>
+        <p15:guide id="2" pos="2880">
+          <p15:clr>
+            <a:srgbClr val="A4A3A4"/>
+          </p15:clr>
+        </p15:guide>
+      </p15:sldGuideLst>
+    </p:ext>
+    <p:ext uri="{2D200454-40CA-4A62-9FC3-DE9A4176ACB9}">
+      <p15:notesGuideLst xmlns:p15="http://schemas.microsoft.com/office/powerpoint/2012/main">
+        <p15:guide id="1" orient="horz" pos="2880">
+          <p15:clr>
+            <a:srgbClr val="A4A3A4"/>
+          </p15:clr>
+        </p15:guide>
+        <p15:guide id="2" pos="2160">
+          <p15:clr>
+            <a:srgbClr val="A4A3A4"/>
+          </p15:clr>
+        </p15:guide>
+      </p15:notesGuideLst>
+    </p:ext>
+  </p:extLst>
 </p:presentation>
 </file>
 
@@ -213,7 +243,7 @@
           <a:p>
             <a:fld id="{AB6131E3-072D-1447-B771-F05C9D397949}" type="datetimeFigureOut">
               <a:rPr lang="en-US" smtClean="0"/>
-              <a:t>10/8/14</a:t>
+              <a:t>10/9/2014</a:t>
             </a:fld>
             <a:endParaRPr lang="en-US" dirty="0"/>
           </a:p>
@@ -378,7 +408,7 @@
           <a:p>
             <a:fld id="{DE4C9721-1813-4A55-A5DA-76417DB5EE62}" type="datetimeFigureOut">
               <a:rPr lang="en-US" smtClean="0"/>
-              <a:t>10/8/14</a:t>
+              <a:t>10/9/2014</a:t>
             </a:fld>
             <a:endParaRPr lang="en-US" dirty="0"/>
           </a:p>
@@ -1019,7 +1049,7 @@
           <a:p>
             <a:fld id="{1A6A9824-C09F-4166-9A2C-6C9FA577887A}" type="datetimeFigureOut">
               <a:rPr lang="en-US" smtClean="0"/>
-              <a:t>10/8/14</a:t>
+              <a:t>10/9/2014</a:t>
             </a:fld>
             <a:endParaRPr lang="en-US" dirty="0"/>
           </a:p>
@@ -1189,7 +1219,7 @@
           <a:p>
             <a:fld id="{1A6A9824-C09F-4166-9A2C-6C9FA577887A}" type="datetimeFigureOut">
               <a:rPr lang="en-US" smtClean="0"/>
-              <a:t>10/8/14</a:t>
+              <a:t>10/9/2014</a:t>
             </a:fld>
             <a:endParaRPr lang="en-US" dirty="0"/>
           </a:p>
@@ -1369,7 +1399,7 @@
           <a:p>
             <a:fld id="{1A6A9824-C09F-4166-9A2C-6C9FA577887A}" type="datetimeFigureOut">
               <a:rPr lang="en-US" smtClean="0"/>
-              <a:t>10/8/14</a:t>
+              <a:t>10/9/2014</a:t>
             </a:fld>
             <a:endParaRPr lang="en-US" dirty="0"/>
           </a:p>
@@ -1539,7 +1569,7 @@
           <a:p>
             <a:fld id="{1A6A9824-C09F-4166-9A2C-6C9FA577887A}" type="datetimeFigureOut">
               <a:rPr lang="en-US" smtClean="0"/>
-              <a:t>10/8/14</a:t>
+              <a:t>10/9/2014</a:t>
             </a:fld>
             <a:endParaRPr lang="en-US" dirty="0"/>
           </a:p>
@@ -1785,7 +1815,7 @@
           <a:p>
             <a:fld id="{1A6A9824-C09F-4166-9A2C-6C9FA577887A}" type="datetimeFigureOut">
               <a:rPr lang="en-US" smtClean="0"/>
-              <a:t>10/8/14</a:t>
+              <a:t>10/9/2014</a:t>
             </a:fld>
             <a:endParaRPr lang="en-US" dirty="0"/>
           </a:p>
@@ -2073,7 +2103,7 @@
           <a:p>
             <a:fld id="{1A6A9824-C09F-4166-9A2C-6C9FA577887A}" type="datetimeFigureOut">
               <a:rPr lang="en-US" smtClean="0"/>
-              <a:t>10/8/14</a:t>
+              <a:t>10/9/2014</a:t>
             </a:fld>
             <a:endParaRPr lang="en-US" dirty="0"/>
           </a:p>
@@ -2495,7 +2525,7 @@
           <a:p>
             <a:fld id="{1A6A9824-C09F-4166-9A2C-6C9FA577887A}" type="datetimeFigureOut">
               <a:rPr lang="en-US" smtClean="0"/>
-              <a:t>10/8/14</a:t>
+              <a:t>10/9/2014</a:t>
             </a:fld>
             <a:endParaRPr lang="en-US" dirty="0"/>
           </a:p>
@@ -2613,7 +2643,7 @@
           <a:p>
             <a:fld id="{1A6A9824-C09F-4166-9A2C-6C9FA577887A}" type="datetimeFigureOut">
               <a:rPr lang="en-US" smtClean="0"/>
-              <a:t>10/8/14</a:t>
+              <a:t>10/9/2014</a:t>
             </a:fld>
             <a:endParaRPr lang="en-US" dirty="0"/>
           </a:p>
@@ -2708,7 +2738,7 @@
           <a:p>
             <a:fld id="{1A6A9824-C09F-4166-9A2C-6C9FA577887A}" type="datetimeFigureOut">
               <a:rPr lang="en-US" smtClean="0"/>
-              <a:t>10/8/14</a:t>
+              <a:t>10/9/2014</a:t>
             </a:fld>
             <a:endParaRPr lang="en-US" dirty="0"/>
           </a:p>
@@ -2985,7 +3015,7 @@
           <a:p>
             <a:fld id="{1A6A9824-C09F-4166-9A2C-6C9FA577887A}" type="datetimeFigureOut">
               <a:rPr lang="en-US" smtClean="0"/>
-              <a:t>10/8/14</a:t>
+              <a:t>10/9/2014</a:t>
             </a:fld>
             <a:endParaRPr lang="en-US" dirty="0"/>
           </a:p>
@@ -3242,7 +3272,7 @@
           <a:p>
             <a:fld id="{1A6A9824-C09F-4166-9A2C-6C9FA577887A}" type="datetimeFigureOut">
               <a:rPr lang="en-US" smtClean="0"/>
-              <a:t>10/8/14</a:t>
+              <a:t>10/9/2014</a:t>
             </a:fld>
             <a:endParaRPr lang="en-US" dirty="0"/>
           </a:p>
@@ -3387,7 +3417,7 @@
           <a:noFill/>
           <a:extLst>
             <a:ext uri="{909E8E84-426E-40dd-AFC4-6F175D3DCCD1}">
-              <a14:hiddenFill xmlns:a14="http://schemas.microsoft.com/office/drawing/2010/main">
+              <a14:hiddenFill xmlns:a14="http://schemas.microsoft.com/office/drawing/2010/main" xmlns="">
                 <a:solidFill>
                   <a:srgbClr val="FFFFFF"/>
                 </a:solidFill>
@@ -3526,7 +3556,7 @@
           <a:p>
             <a:fld id="{1A6A9824-C09F-4166-9A2C-6C9FA577887A}" type="datetimeFigureOut">
               <a:rPr lang="en-US" smtClean="0"/>
-              <a:t>10/8/14</a:t>
+              <a:t>10/9/2014</a:t>
             </a:fld>
             <a:endParaRPr lang="en-US" dirty="0"/>
           </a:p>
@@ -3963,7 +3993,7 @@
           <a:noFill/>
           <a:extLst>
             <a:ext uri="{909E8E84-426E-40dd-AFC4-6F175D3DCCD1}">
-              <a14:hiddenFill xmlns:a14="http://schemas.microsoft.com/office/drawing/2010/main">
+              <a14:hiddenFill xmlns:a14="http://schemas.microsoft.com/office/drawing/2010/main" xmlns="">
                 <a:solidFill>
                   <a:srgbClr val="FFFFFF"/>
                 </a:solidFill>
@@ -4059,7 +4089,7 @@
   <p:timing>
     <p:tnLst>
       <p:par>
-        <p:cTn xmlns:p14="http://schemas.microsoft.com/office/powerpoint/2010/main" id="1" dur="indefinite" restart="never" nodeType="tmRoot"/>
+        <p:cTn id="1" dur="indefinite" restart="never" nodeType="tmRoot"/>
       </p:par>
     </p:tnLst>
   </p:timing>
@@ -4095,13 +4125,16 @@
         </p:nvSpPr>
         <p:spPr/>
         <p:txBody>
-          <a:bodyPr/>
-          <a:lstStyle/>
-          <a:p>
-            <a:r>
-              <a:rPr lang="en-US" dirty="0"/>
-              <a:t>Add Google Play Services Library</a:t>
-            </a:r>
+          <a:bodyPr>
+            <a:normAutofit/>
+          </a:bodyPr>
+          <a:lstStyle/>
+          <a:p>
+            <a:r>
+              <a:rPr lang="en-US" sz="3600" dirty="0"/>
+              <a:t>Add Google Play Services Library - Eclipse</a:t>
+            </a:r>
+            <a:endParaRPr lang="en-US" sz="3600" dirty="0"/>
           </a:p>
         </p:txBody>
       </p:sp>
@@ -4166,67 +4199,17 @@
             <a:pPr lvl="1"/>
             <a:r>
               <a:rPr lang="en-US" sz="2000" dirty="0" smtClean="0"/>
-              <a:t>Click Add… under Library and select google-play-services_lib</a:t>
-            </a:r>
-          </a:p>
-          <a:p>
-            <a:r>
-              <a:rPr lang="en-US" sz="2400" dirty="0" smtClean="0"/>
-              <a:t>Add the following as a child of </a:t>
-            </a:r>
-            <a:r>
-              <a:rPr lang="en-US" sz="2400" dirty="0" smtClean="0">
-                <a:latin typeface="Courier"/>
-                <a:cs typeface="Courier"/>
-              </a:rPr>
-              <a:t>&lt;application&gt;</a:t>
-            </a:r>
-            <a:r>
-              <a:rPr lang="en-US" sz="2400" dirty="0" smtClean="0"/>
-              <a:t> inside AndroidManifest.xml</a:t>
-            </a:r>
-          </a:p>
-        </p:txBody>
-      </p:sp>
-      <p:sp>
-        <p:nvSpPr>
-          <p:cNvPr id="4" name="TextBox 3"/>
-          <p:cNvSpPr txBox="1"/>
-          <p:nvPr/>
-        </p:nvSpPr>
-        <p:spPr>
-          <a:xfrm>
-            <a:off x="533400" y="4495800"/>
-            <a:ext cx="8153400" cy="685800"/>
-          </a:xfrm>
-          <a:prstGeom prst="rect">
-            <a:avLst/>
-          </a:prstGeom>
-          <a:solidFill>
-            <a:schemeClr val="bg1">
-              <a:lumMod val="85000"/>
-            </a:schemeClr>
-          </a:solidFill>
-          <a:ln>
-            <a:solidFill>
-              <a:schemeClr val="tx1"/>
-            </a:solidFill>
-          </a:ln>
-        </p:spPr>
-        <p:txBody>
-          <a:bodyPr wrap="square" rtlCol="0">
-            <a:noAutofit/>
-          </a:bodyPr>
-          <a:lstStyle/>
-          <a:p>
-            <a:pPr lvl="1"/>
-            <a:r>
-              <a:rPr lang="en-US" sz="1600" dirty="0">
-                <a:latin typeface="Courier"/>
-                <a:cs typeface="Courier"/>
-              </a:rPr>
-              <a:t>&lt;meta-data android:name="com.google.android.gms.version" android:value="@integer/google_play_services_version" /&gt;</a:t>
-            </a:r>
+              <a:t>Click Add… under Library and select </a:t>
+            </a:r>
+            <a:r>
+              <a:rPr lang="en-US" sz="2000" dirty="0" smtClean="0"/>
+              <a:t>google-play-</a:t>
+            </a:r>
+            <a:r>
+              <a:rPr lang="en-US" sz="2000" dirty="0" err="1" smtClean="0"/>
+              <a:t>services_lib</a:t>
+            </a:r>
+            <a:endParaRPr lang="en-US" sz="2000" dirty="0" smtClean="0"/>
           </a:p>
         </p:txBody>
       </p:sp>
@@ -4284,52 +4267,239 @@
       </p:sp>
       <p:sp>
         <p:nvSpPr>
-          <p:cNvPr id="3" name="Content Placeholder 2"/>
-          <p:cNvSpPr>
+          <p:cNvPr id="4" name="Content Placeholder 3"/>
+          <p:cNvSpPr txBox="1">
             <a:spLocks noGrp="1"/>
           </p:cNvSpPr>
           <p:nvPr>
             <p:ph idx="1"/>
           </p:nvPr>
+        </p:nvSpPr>
+        <p:spPr>
+          <a:xfrm>
+            <a:off x="457200" y="2286000"/>
+            <a:ext cx="8229600" cy="457200"/>
+          </a:xfrm>
+          <a:prstGeom prst="rect">
+            <a:avLst/>
+          </a:prstGeom>
+          <a:solidFill>
+            <a:schemeClr val="bg1">
+              <a:lumMod val="85000"/>
+            </a:schemeClr>
+          </a:solidFill>
+          <a:ln>
+            <a:solidFill>
+              <a:schemeClr val="tx1"/>
+            </a:solidFill>
+          </a:ln>
+        </p:spPr>
+        <p:txBody>
+          <a:bodyPr wrap="square" rtlCol="0">
+            <a:noAutofit/>
+          </a:bodyPr>
+          <a:lstStyle/>
+          <a:p>
+            <a:pPr marL="457200" lvl="1" indent="0">
+              <a:buNone/>
+            </a:pPr>
+            <a:r>
+              <a:rPr lang="en-US" sz="1200" dirty="0">
+                <a:latin typeface="Courier"/>
+                <a:cs typeface="Courier"/>
+              </a:rPr>
+              <a:t>&lt;meta-data android:name="com.google.android.gms.version" android:value="@integer/google_play_services_version" /&gt;</a:t>
+            </a:r>
+          </a:p>
+        </p:txBody>
+      </p:sp>
+      <p:sp>
+        <p:nvSpPr>
+          <p:cNvPr id="5" name="Content Placeholder 2"/>
+          <p:cNvSpPr txBox="1">
+            <a:spLocks/>
+          </p:cNvSpPr>
+          <p:nvPr/>
         </p:nvSpPr>
         <p:spPr>
           <a:xfrm>
             <a:off x="457200" y="1600201"/>
-            <a:ext cx="8229600" cy="1219199"/>
+            <a:ext cx="8229600" cy="685799"/>
           </a:xfrm>
+          <a:prstGeom prst="rect">
+            <a:avLst/>
+          </a:prstGeom>
         </p:spPr>
         <p:txBody>
-          <a:bodyPr>
-            <a:normAutofit/>
+          <a:bodyPr vert="horz" lIns="91440" tIns="45720" rIns="91440" bIns="45720" rtlCol="0">
+            <a:noAutofit/>
           </a:bodyPr>
-          <a:lstStyle/>
-          <a:p>
-            <a:r>
-              <a:rPr lang="en-US" sz="2400" dirty="0" smtClean="0"/>
-              <a:t>To prevent ProGuard from stripping away required classes, add the following lines in the file</a:t>
-            </a:r>
-            <a:br>
-              <a:rPr lang="en-US" sz="2400" dirty="0" smtClean="0"/>
-            </a:br>
-            <a:r>
-              <a:rPr lang="en-US" sz="2400" dirty="0" smtClean="0"/>
-              <a:t>&lt;project_directory&gt;/proguard-project.txt:</a:t>
-            </a:r>
-          </a:p>
-          <a:p>
+          <a:lstStyle>
+            <a:lvl1pPr marL="342900" indent="-342900" algn="l" defTabSz="914400" rtl="0" eaLnBrk="1" latinLnBrk="0" hangingPunct="1">
+              <a:spcBef>
+                <a:spcPct val="20000"/>
+              </a:spcBef>
+              <a:buFont typeface="Arial" panose="020B0604020202020204" pitchFamily="34" charset="0"/>
+              <a:buChar char="•"/>
+              <a:defRPr sz="3200" kern="1200">
+                <a:solidFill>
+                  <a:schemeClr val="tx1"/>
+                </a:solidFill>
+                <a:latin typeface="+mn-lt"/>
+                <a:ea typeface="+mn-ea"/>
+                <a:cs typeface="+mn-cs"/>
+              </a:defRPr>
+            </a:lvl1pPr>
+            <a:lvl2pPr marL="742950" indent="-285750" algn="l" defTabSz="914400" rtl="0" eaLnBrk="1" latinLnBrk="0" hangingPunct="1">
+              <a:spcBef>
+                <a:spcPct val="20000"/>
+              </a:spcBef>
+              <a:buFont typeface="Arial" panose="020B0604020202020204" pitchFamily="34" charset="0"/>
+              <a:buChar char="–"/>
+              <a:defRPr sz="2800" kern="1200">
+                <a:solidFill>
+                  <a:schemeClr val="tx1"/>
+                </a:solidFill>
+                <a:latin typeface="+mn-lt"/>
+                <a:ea typeface="+mn-ea"/>
+                <a:cs typeface="+mn-cs"/>
+              </a:defRPr>
+            </a:lvl2pPr>
+            <a:lvl3pPr marL="1143000" indent="-228600" algn="l" defTabSz="914400" rtl="0" eaLnBrk="1" latinLnBrk="0" hangingPunct="1">
+              <a:spcBef>
+                <a:spcPct val="20000"/>
+              </a:spcBef>
+              <a:buFont typeface="Arial" panose="020B0604020202020204" pitchFamily="34" charset="0"/>
+              <a:buChar char="•"/>
+              <a:defRPr sz="2400" kern="1200">
+                <a:solidFill>
+                  <a:schemeClr val="tx1"/>
+                </a:solidFill>
+                <a:latin typeface="+mn-lt"/>
+                <a:ea typeface="+mn-ea"/>
+                <a:cs typeface="+mn-cs"/>
+              </a:defRPr>
+            </a:lvl3pPr>
+            <a:lvl4pPr marL="1600200" indent="-228600" algn="l" defTabSz="914400" rtl="0" eaLnBrk="1" latinLnBrk="0" hangingPunct="1">
+              <a:spcBef>
+                <a:spcPct val="20000"/>
+              </a:spcBef>
+              <a:buFont typeface="Arial" panose="020B0604020202020204" pitchFamily="34" charset="0"/>
+              <a:buChar char="–"/>
+              <a:defRPr sz="2000" kern="1200">
+                <a:solidFill>
+                  <a:schemeClr val="tx1"/>
+                </a:solidFill>
+                <a:latin typeface="+mn-lt"/>
+                <a:ea typeface="+mn-ea"/>
+                <a:cs typeface="+mn-cs"/>
+              </a:defRPr>
+            </a:lvl4pPr>
+            <a:lvl5pPr marL="2057400" indent="-228600" algn="l" defTabSz="914400" rtl="0" eaLnBrk="1" latinLnBrk="0" hangingPunct="1">
+              <a:spcBef>
+                <a:spcPct val="20000"/>
+              </a:spcBef>
+              <a:buFont typeface="Arial" panose="020B0604020202020204" pitchFamily="34" charset="0"/>
+              <a:buChar char="»"/>
+              <a:defRPr sz="2000" kern="1200">
+                <a:solidFill>
+                  <a:schemeClr val="tx1"/>
+                </a:solidFill>
+                <a:latin typeface="+mn-lt"/>
+                <a:ea typeface="+mn-ea"/>
+                <a:cs typeface="+mn-cs"/>
+              </a:defRPr>
+            </a:lvl5pPr>
+            <a:lvl6pPr marL="2514600" indent="-228600" algn="l" defTabSz="914400" rtl="0" eaLnBrk="1" latinLnBrk="0" hangingPunct="1">
+              <a:spcBef>
+                <a:spcPct val="20000"/>
+              </a:spcBef>
+              <a:buFont typeface="Arial" panose="020B0604020202020204" pitchFamily="34" charset="0"/>
+              <a:buChar char="•"/>
+              <a:defRPr sz="2000" kern="1200">
+                <a:solidFill>
+                  <a:schemeClr val="tx1"/>
+                </a:solidFill>
+                <a:latin typeface="+mn-lt"/>
+                <a:ea typeface="+mn-ea"/>
+                <a:cs typeface="+mn-cs"/>
+              </a:defRPr>
+            </a:lvl6pPr>
+            <a:lvl7pPr marL="2971800" indent="-228600" algn="l" defTabSz="914400" rtl="0" eaLnBrk="1" latinLnBrk="0" hangingPunct="1">
+              <a:spcBef>
+                <a:spcPct val="20000"/>
+              </a:spcBef>
+              <a:buFont typeface="Arial" panose="020B0604020202020204" pitchFamily="34" charset="0"/>
+              <a:buChar char="•"/>
+              <a:defRPr sz="2000" kern="1200">
+                <a:solidFill>
+                  <a:schemeClr val="tx1"/>
+                </a:solidFill>
+                <a:latin typeface="+mn-lt"/>
+                <a:ea typeface="+mn-ea"/>
+                <a:cs typeface="+mn-cs"/>
+              </a:defRPr>
+            </a:lvl7pPr>
+            <a:lvl8pPr marL="3429000" indent="-228600" algn="l" defTabSz="914400" rtl="0" eaLnBrk="1" latinLnBrk="0" hangingPunct="1">
+              <a:spcBef>
+                <a:spcPct val="20000"/>
+              </a:spcBef>
+              <a:buFont typeface="Arial" panose="020B0604020202020204" pitchFamily="34" charset="0"/>
+              <a:buChar char="•"/>
+              <a:defRPr sz="2000" kern="1200">
+                <a:solidFill>
+                  <a:schemeClr val="tx1"/>
+                </a:solidFill>
+                <a:latin typeface="+mn-lt"/>
+                <a:ea typeface="+mn-ea"/>
+                <a:cs typeface="+mn-cs"/>
+              </a:defRPr>
+            </a:lvl8pPr>
+            <a:lvl9pPr marL="3886200" indent="-228600" algn="l" defTabSz="914400" rtl="0" eaLnBrk="1" latinLnBrk="0" hangingPunct="1">
+              <a:spcBef>
+                <a:spcPct val="20000"/>
+              </a:spcBef>
+              <a:buFont typeface="Arial" panose="020B0604020202020204" pitchFamily="34" charset="0"/>
+              <a:buChar char="•"/>
+              <a:defRPr sz="2000" kern="1200">
+                <a:solidFill>
+                  <a:schemeClr val="tx1"/>
+                </a:solidFill>
+                <a:latin typeface="+mn-lt"/>
+                <a:ea typeface="+mn-ea"/>
+                <a:cs typeface="+mn-cs"/>
+              </a:defRPr>
+            </a:lvl9pPr>
+          </a:lstStyle>
+          <a:p>
+            <a:r>
+              <a:rPr lang="en-US" sz="2000" dirty="0" smtClean="0"/>
+              <a:t>Add the following as a child of </a:t>
+            </a:r>
+            <a:r>
+              <a:rPr lang="en-US" sz="2000" dirty="0" smtClean="0">
+                <a:latin typeface="Courier"/>
+                <a:cs typeface="Courier"/>
+              </a:rPr>
+              <a:t>&lt;application&gt;</a:t>
+            </a:r>
+            <a:r>
+              <a:rPr lang="en-US" sz="2000" dirty="0" smtClean="0"/>
+              <a:t> inside AndroidManifest.xml</a:t>
+            </a:r>
             <a:endParaRPr lang="en-US" sz="2000" dirty="0" smtClean="0"/>
           </a:p>
         </p:txBody>
       </p:sp>
       <p:sp>
         <p:nvSpPr>
-          <p:cNvPr id="4" name="TextBox 3"/>
+          <p:cNvPr id="6" name="TextBox 5"/>
           <p:cNvSpPr txBox="1"/>
           <p:nvPr/>
         </p:nvSpPr>
         <p:spPr>
           <a:xfrm>
-            <a:off x="457200" y="2971800"/>
+            <a:off x="457200" y="3657600"/>
             <a:ext cx="8229600" cy="2492990"/>
           </a:xfrm>
           <a:prstGeom prst="rect">
@@ -4470,10 +4640,195 @@
           </a:p>
         </p:txBody>
       </p:sp>
+      <p:sp>
+        <p:nvSpPr>
+          <p:cNvPr id="7" name="Content Placeholder 2"/>
+          <p:cNvSpPr txBox="1">
+            <a:spLocks/>
+          </p:cNvSpPr>
+          <p:nvPr/>
+        </p:nvSpPr>
+        <p:spPr>
+          <a:xfrm>
+            <a:off x="460075" y="2891289"/>
+            <a:ext cx="8229600" cy="766311"/>
+          </a:xfrm>
+          <a:prstGeom prst="rect">
+            <a:avLst/>
+          </a:prstGeom>
+        </p:spPr>
+        <p:txBody>
+          <a:bodyPr vert="horz" lIns="91440" tIns="45720" rIns="91440" bIns="45720" rtlCol="0">
+            <a:normAutofit/>
+          </a:bodyPr>
+          <a:lstStyle>
+            <a:lvl1pPr marL="342900" indent="-342900" algn="l" defTabSz="914400" rtl="0" eaLnBrk="1" latinLnBrk="0" hangingPunct="1">
+              <a:spcBef>
+                <a:spcPct val="20000"/>
+              </a:spcBef>
+              <a:buFont typeface="Arial" panose="020B0604020202020204" pitchFamily="34" charset="0"/>
+              <a:buChar char="•"/>
+              <a:defRPr sz="3200" kern="1200">
+                <a:solidFill>
+                  <a:schemeClr val="tx1"/>
+                </a:solidFill>
+                <a:latin typeface="+mn-lt"/>
+                <a:ea typeface="+mn-ea"/>
+                <a:cs typeface="+mn-cs"/>
+              </a:defRPr>
+            </a:lvl1pPr>
+            <a:lvl2pPr marL="742950" indent="-285750" algn="l" defTabSz="914400" rtl="0" eaLnBrk="1" latinLnBrk="0" hangingPunct="1">
+              <a:spcBef>
+                <a:spcPct val="20000"/>
+              </a:spcBef>
+              <a:buFont typeface="Arial" panose="020B0604020202020204" pitchFamily="34" charset="0"/>
+              <a:buChar char="–"/>
+              <a:defRPr sz="2800" kern="1200">
+                <a:solidFill>
+                  <a:schemeClr val="tx1"/>
+                </a:solidFill>
+                <a:latin typeface="+mn-lt"/>
+                <a:ea typeface="+mn-ea"/>
+                <a:cs typeface="+mn-cs"/>
+              </a:defRPr>
+            </a:lvl2pPr>
+            <a:lvl3pPr marL="1143000" indent="-228600" algn="l" defTabSz="914400" rtl="0" eaLnBrk="1" latinLnBrk="0" hangingPunct="1">
+              <a:spcBef>
+                <a:spcPct val="20000"/>
+              </a:spcBef>
+              <a:buFont typeface="Arial" panose="020B0604020202020204" pitchFamily="34" charset="0"/>
+              <a:buChar char="•"/>
+              <a:defRPr sz="2400" kern="1200">
+                <a:solidFill>
+                  <a:schemeClr val="tx1"/>
+                </a:solidFill>
+                <a:latin typeface="+mn-lt"/>
+                <a:ea typeface="+mn-ea"/>
+                <a:cs typeface="+mn-cs"/>
+              </a:defRPr>
+            </a:lvl3pPr>
+            <a:lvl4pPr marL="1600200" indent="-228600" algn="l" defTabSz="914400" rtl="0" eaLnBrk="1" latinLnBrk="0" hangingPunct="1">
+              <a:spcBef>
+                <a:spcPct val="20000"/>
+              </a:spcBef>
+              <a:buFont typeface="Arial" panose="020B0604020202020204" pitchFamily="34" charset="0"/>
+              <a:buChar char="–"/>
+              <a:defRPr sz="2000" kern="1200">
+                <a:solidFill>
+                  <a:schemeClr val="tx1"/>
+                </a:solidFill>
+                <a:latin typeface="+mn-lt"/>
+                <a:ea typeface="+mn-ea"/>
+                <a:cs typeface="+mn-cs"/>
+              </a:defRPr>
+            </a:lvl4pPr>
+            <a:lvl5pPr marL="2057400" indent="-228600" algn="l" defTabSz="914400" rtl="0" eaLnBrk="1" latinLnBrk="0" hangingPunct="1">
+              <a:spcBef>
+                <a:spcPct val="20000"/>
+              </a:spcBef>
+              <a:buFont typeface="Arial" panose="020B0604020202020204" pitchFamily="34" charset="0"/>
+              <a:buChar char="»"/>
+              <a:defRPr sz="2000" kern="1200">
+                <a:solidFill>
+                  <a:schemeClr val="tx1"/>
+                </a:solidFill>
+                <a:latin typeface="+mn-lt"/>
+                <a:ea typeface="+mn-ea"/>
+                <a:cs typeface="+mn-cs"/>
+              </a:defRPr>
+            </a:lvl5pPr>
+            <a:lvl6pPr marL="2514600" indent="-228600" algn="l" defTabSz="914400" rtl="0" eaLnBrk="1" latinLnBrk="0" hangingPunct="1">
+              <a:spcBef>
+                <a:spcPct val="20000"/>
+              </a:spcBef>
+              <a:buFont typeface="Arial" panose="020B0604020202020204" pitchFamily="34" charset="0"/>
+              <a:buChar char="•"/>
+              <a:defRPr sz="2000" kern="1200">
+                <a:solidFill>
+                  <a:schemeClr val="tx1"/>
+                </a:solidFill>
+                <a:latin typeface="+mn-lt"/>
+                <a:ea typeface="+mn-ea"/>
+                <a:cs typeface="+mn-cs"/>
+              </a:defRPr>
+            </a:lvl6pPr>
+            <a:lvl7pPr marL="2971800" indent="-228600" algn="l" defTabSz="914400" rtl="0" eaLnBrk="1" latinLnBrk="0" hangingPunct="1">
+              <a:spcBef>
+                <a:spcPct val="20000"/>
+              </a:spcBef>
+              <a:buFont typeface="Arial" panose="020B0604020202020204" pitchFamily="34" charset="0"/>
+              <a:buChar char="•"/>
+              <a:defRPr sz="2000" kern="1200">
+                <a:solidFill>
+                  <a:schemeClr val="tx1"/>
+                </a:solidFill>
+                <a:latin typeface="+mn-lt"/>
+                <a:ea typeface="+mn-ea"/>
+                <a:cs typeface="+mn-cs"/>
+              </a:defRPr>
+            </a:lvl7pPr>
+            <a:lvl8pPr marL="3429000" indent="-228600" algn="l" defTabSz="914400" rtl="0" eaLnBrk="1" latinLnBrk="0" hangingPunct="1">
+              <a:spcBef>
+                <a:spcPct val="20000"/>
+              </a:spcBef>
+              <a:buFont typeface="Arial" panose="020B0604020202020204" pitchFamily="34" charset="0"/>
+              <a:buChar char="•"/>
+              <a:defRPr sz="2000" kern="1200">
+                <a:solidFill>
+                  <a:schemeClr val="tx1"/>
+                </a:solidFill>
+                <a:latin typeface="+mn-lt"/>
+                <a:ea typeface="+mn-ea"/>
+                <a:cs typeface="+mn-cs"/>
+              </a:defRPr>
+            </a:lvl8pPr>
+            <a:lvl9pPr marL="3886200" indent="-228600" algn="l" defTabSz="914400" rtl="0" eaLnBrk="1" latinLnBrk="0" hangingPunct="1">
+              <a:spcBef>
+                <a:spcPct val="20000"/>
+              </a:spcBef>
+              <a:buFont typeface="Arial" panose="020B0604020202020204" pitchFamily="34" charset="0"/>
+              <a:buChar char="•"/>
+              <a:defRPr sz="2000" kern="1200">
+                <a:solidFill>
+                  <a:schemeClr val="tx1"/>
+                </a:solidFill>
+                <a:latin typeface="+mn-lt"/>
+                <a:ea typeface="+mn-ea"/>
+                <a:cs typeface="+mn-cs"/>
+              </a:defRPr>
+            </a:lvl9pPr>
+          </a:lstStyle>
+          <a:p>
+            <a:r>
+              <a:rPr lang="en-US" sz="2000" dirty="0" smtClean="0"/>
+              <a:t>To prevent </a:t>
+            </a:r>
+            <a:r>
+              <a:rPr lang="en-US" sz="2000" dirty="0" err="1" smtClean="0"/>
+              <a:t>ProGuard</a:t>
+            </a:r>
+            <a:r>
+              <a:rPr lang="en-US" sz="2000" dirty="0" smtClean="0"/>
+              <a:t> from stripping away required classes, add the following lines in the file &lt;</a:t>
+            </a:r>
+            <a:r>
+              <a:rPr lang="en-US" sz="2000" dirty="0" err="1" smtClean="0"/>
+              <a:t>project_directory</a:t>
+            </a:r>
+            <a:r>
+              <a:rPr lang="en-US" sz="2000" dirty="0" smtClean="0"/>
+              <a:t>&gt;/proguard-project.txt:</a:t>
+            </a:r>
+          </a:p>
+          <a:p>
+            <a:endParaRPr lang="en-US" sz="1800" dirty="0" smtClean="0"/>
+          </a:p>
+        </p:txBody>
+      </p:sp>
     </p:spTree>
     <p:extLst>
       <p:ext uri="{BB962C8B-B14F-4D97-AF65-F5344CB8AC3E}">
-        <p14:creationId xmlns:p14="http://schemas.microsoft.com/office/powerpoint/2010/main" val="3578448808"/>
+        <p14:creationId xmlns:p14="http://schemas.microsoft.com/office/powerpoint/2010/main" val="1180308513"/>
       </p:ext>
     </p:extLst>
   </p:cSld>
@@ -4813,7 +5168,7 @@
         <p:spPr/>
         <p:txBody>
           <a:bodyPr>
-            <a:normAutofit/>
+            <a:normAutofit lnSpcReduction="10000"/>
           </a:bodyPr>
           <a:lstStyle/>
           <a:p>
@@ -4883,15 +5238,7 @@
           <a:p>
             <a:r>
               <a:rPr lang="en-US" sz="2400" dirty="0" smtClean="0"/>
-              <a:t>HTTP status code 401 indicates invalid </a:t>
-            </a:r>
-            <a:r>
-              <a:rPr lang="en-US" sz="2400" dirty="0" smtClean="0"/>
-              <a:t>server API </a:t>
-            </a:r>
-            <a:r>
-              <a:rPr lang="en-US" sz="2400" dirty="0" smtClean="0"/>
-              <a:t>key</a:t>
+              <a:t>HTTP status code 401 indicates invalid server API key</a:t>
             </a:r>
           </a:p>
           <a:p>
@@ -4940,11 +5287,7 @@
             </a:r>
             <a:r>
               <a:rPr lang="en-US" sz="2400" dirty="0" smtClean="0"/>
-              <a:t>device registration </a:t>
-            </a:r>
-            <a:r>
-              <a:rPr lang="en-US" sz="2400" dirty="0" smtClean="0"/>
-              <a:t>ID</a:t>
+              <a:t>device registration ID</a:t>
             </a:r>
           </a:p>
           <a:p>
@@ -5514,7 +5857,9 @@
         </p:nvSpPr>
         <p:spPr/>
         <p:txBody>
-          <a:bodyPr/>
+          <a:bodyPr>
+            <a:normAutofit lnSpcReduction="10000"/>
+          </a:bodyPr>
           <a:lstStyle/>
           <a:p>
             <a:r>
@@ -5553,6 +5898,33 @@
               <a:t>MobilePushNotification</a:t>
             </a:r>
             <a:endParaRPr lang="en-US" sz="2400" dirty="0" smtClean="0"/>
+          </a:p>
+          <a:p>
+            <a:pPr lvl="2"/>
+            <a:r>
+              <a:rPr lang="en-US" sz="2000" dirty="0" smtClean="0"/>
+              <a:t>Use </a:t>
+            </a:r>
+            <a:r>
+              <a:rPr lang="en-US" sz="2000" dirty="0" smtClean="0"/>
+              <a:t>gradle_migration_2014-10-08 branch for Android Studio / </a:t>
+            </a:r>
+            <a:r>
+              <a:rPr lang="en-US" sz="2000" dirty="0" err="1" smtClean="0"/>
+              <a:t>Gradle</a:t>
+            </a:r>
+            <a:r>
+              <a:rPr lang="en-US" sz="2000" dirty="0" smtClean="0"/>
+              <a:t> based project</a:t>
+            </a:r>
+          </a:p>
+          <a:p>
+            <a:pPr lvl="2"/>
+            <a:r>
+              <a:rPr lang="en-US" sz="2000" dirty="0" smtClean="0"/>
+              <a:t>Use master for Eclipse based project</a:t>
+            </a:r>
+            <a:endParaRPr lang="en-US" sz="2000" dirty="0" smtClean="0"/>
           </a:p>
           <a:p>
             <a:r>
@@ -5717,7 +6089,7 @@
           <a:noFill/>
           <a:extLst>
             <a:ext uri="{909E8E84-426E-40dd-AFC4-6F175D3DCCD1}">
-              <a14:hiddenFill xmlns:a14="http://schemas.microsoft.com/office/drawing/2010/main">
+              <a14:hiddenFill xmlns:a14="http://schemas.microsoft.com/office/drawing/2010/main" xmlns="">
                 <a:solidFill>
                   <a:srgbClr val="FFFFFF"/>
                 </a:solidFill>
@@ -5895,7 +6267,7 @@
   <p:timing>
     <p:tnLst>
       <p:par>
-        <p:cTn xmlns:p14="http://schemas.microsoft.com/office/powerpoint/2010/main" id="1" dur="indefinite" restart="never" nodeType="tmRoot"/>
+        <p:cTn id="1" dur="indefinite" restart="never" nodeType="tmRoot"/>
       </p:par>
     </p:tnLst>
   </p:timing>
@@ -6168,7 +6540,7 @@
         <p:spPr/>
         <p:txBody>
           <a:bodyPr>
-            <a:normAutofit lnSpcReduction="10000"/>
+            <a:normAutofit fontScale="92500" lnSpcReduction="20000"/>
           </a:bodyPr>
           <a:lstStyle/>
           <a:p>
@@ -6188,15 +6560,51 @@
             <a:pPr lvl="2"/>
             <a:r>
               <a:rPr lang="en-US" sz="2000" dirty="0" smtClean="0"/>
-              <a:t>Android SDK</a:t>
+              <a:t>Android </a:t>
+            </a:r>
+            <a:r>
+              <a:rPr lang="en-US" sz="2000" dirty="0" smtClean="0"/>
+              <a:t>SDK: </a:t>
+            </a:r>
+            <a:r>
+              <a:rPr lang="en-US" sz="2000" dirty="0"/>
+              <a:t>http://developer.android.com/sdk/index.html</a:t>
             </a:r>
           </a:p>
           <a:p>
             <a:pPr lvl="2"/>
             <a:r>
               <a:rPr lang="en-US" sz="2000" dirty="0" smtClean="0"/>
-              <a:t>IDE – Eclipse, IntelliJ IDEA, Android Studio</a:t>
-            </a:r>
+              <a:t>IDE</a:t>
+            </a:r>
+          </a:p>
+          <a:p>
+            <a:pPr lvl="3"/>
+            <a:r>
+              <a:rPr lang="en-US" sz="1600" dirty="0"/>
+              <a:t>Eclipse: http://eclipse.org/downloads/</a:t>
+            </a:r>
+            <a:endParaRPr lang="en-US" sz="1600" dirty="0" smtClean="0"/>
+          </a:p>
+          <a:p>
+            <a:pPr lvl="3"/>
+            <a:r>
+              <a:rPr lang="en-US" sz="1600" dirty="0" err="1" smtClean="0"/>
+              <a:t>IntelliJ</a:t>
+            </a:r>
+            <a:r>
+              <a:rPr lang="en-US" sz="1600" dirty="0"/>
+              <a:t> IDEA: http://www.jetbrains.com/idea/</a:t>
+            </a:r>
+            <a:endParaRPr lang="en-US" sz="1600" dirty="0" smtClean="0"/>
+          </a:p>
+          <a:p>
+            <a:pPr lvl="3"/>
+            <a:r>
+              <a:rPr lang="en-US" sz="1600" dirty="0"/>
+              <a:t>Android Studio: https://developer.android.com/sdk/installing/studio.html</a:t>
+            </a:r>
+            <a:endParaRPr lang="en-US" sz="1600" dirty="0" smtClean="0"/>
           </a:p>
           <a:p>
             <a:pPr lvl="1"/>
@@ -6349,15 +6757,28 @@
             <a:pPr lvl="1"/>
             <a:r>
               <a:rPr lang="en-US" dirty="0" smtClean="0"/>
-              <a:t>Expand platform for API 17 or higher</a:t>
+              <a:t>Expand platform for API </a:t>
+            </a:r>
+            <a:r>
+              <a:rPr lang="en-US" dirty="0" smtClean="0"/>
+              <a:t>19 </a:t>
+            </a:r>
+            <a:r>
+              <a:rPr lang="en-US" dirty="0" smtClean="0"/>
+              <a:t>or higher</a:t>
             </a:r>
           </a:p>
           <a:p>
             <a:pPr lvl="1"/>
             <a:r>
               <a:rPr lang="en-US" dirty="0" smtClean="0"/>
-              <a:t>Install Google APIs</a:t>
-            </a:r>
+              <a:t>Install Google </a:t>
+            </a:r>
+            <a:r>
+              <a:rPr lang="en-US" dirty="0" smtClean="0"/>
+              <a:t>APIs (x86 System Image)</a:t>
+            </a:r>
+            <a:endParaRPr lang="en-US" dirty="0" smtClean="0"/>
           </a:p>
           <a:p>
             <a:pPr lvl="1"/>
@@ -6495,7 +6916,15 @@
             </a:r>
             <a:r>
               <a:rPr lang="en-US" sz="2400" dirty="0" smtClean="0"/>
-              <a:t> Note the project number, used later as GCM sender ID inside app when registering with GCM</a:t>
+              <a:t> Note the project number, used later as GCM sender ID </a:t>
+            </a:r>
+            <a:r>
+              <a:rPr lang="en-US" sz="2400" dirty="0" smtClean="0"/>
+              <a:t>inside </a:t>
+            </a:r>
+            <a:r>
+              <a:rPr lang="en-US" sz="2400" dirty="0" smtClean="0"/>
+              <a:t>app when registering with GCM</a:t>
             </a:r>
           </a:p>
           <a:p>
@@ -6508,8 +6937,17 @@
             <a:pPr lvl="1"/>
             <a:r>
               <a:rPr lang="en-US" sz="2400" dirty="0" smtClean="0"/>
-              <a:t>Click APIs &amp; auth in left sidebar</a:t>
-            </a:r>
+              <a:t>Expand APIs </a:t>
+            </a:r>
+            <a:r>
+              <a:rPr lang="en-US" sz="2400" dirty="0" smtClean="0"/>
+              <a:t>&amp; auth in left </a:t>
+            </a:r>
+            <a:r>
+              <a:rPr lang="en-US" sz="2400" dirty="0" smtClean="0"/>
+              <a:t>sidebar and click on APIs</a:t>
+            </a:r>
+            <a:endParaRPr lang="en-US" sz="2400" dirty="0" smtClean="0"/>
           </a:p>
           <a:p>
             <a:pPr lvl="1"/>
@@ -6603,7 +7041,15 @@
           <a:p>
             <a:r>
               <a:rPr lang="en-US" dirty="0"/>
-              <a:t>Obtain the API key</a:t>
+              <a:t>Obtain the </a:t>
+            </a:r>
+            <a:r>
+              <a:rPr lang="en-US" dirty="0" smtClean="0"/>
+              <a:t>Server API </a:t>
+            </a:r>
+            <a:r>
+              <a:rPr lang="en-US" dirty="0"/>
+              <a:t>key</a:t>
             </a:r>
           </a:p>
           <a:p>
@@ -6617,7 +7063,15 @@
             <a:pPr lvl="1"/>
             <a:r>
               <a:rPr lang="en-US" dirty="0"/>
-              <a:t>Under Public API access, click Create New Key</a:t>
+              <a:t>Under Public API access, click Create </a:t>
+            </a:r>
+            <a:r>
+              <a:rPr lang="en-US" dirty="0" smtClean="0"/>
+              <a:t>new </a:t>
+            </a:r>
+            <a:r>
+              <a:rPr lang="en-US" dirty="0"/>
+              <a:t>Key</a:t>
             </a:r>
           </a:p>
           <a:p>
@@ -6650,7 +7104,23 @@
             </a:r>
             <a:r>
               <a:rPr lang="en-US" dirty="0" smtClean="0"/>
-              <a:t>Note the API key, used by server as authorization key in HTTP headers when posting notification messages</a:t>
+              <a:t>Note the API </a:t>
+            </a:r>
+            <a:r>
+              <a:rPr lang="en-US" dirty="0" smtClean="0"/>
+              <a:t>KEY, </a:t>
+            </a:r>
+            <a:r>
+              <a:rPr lang="en-US" dirty="0" smtClean="0"/>
+              <a:t>used by server as authorization key in HTTP </a:t>
+            </a:r>
+            <a:r>
+              <a:rPr lang="en-US" dirty="0" smtClean="0"/>
+              <a:t>Authorization header </a:t>
+            </a:r>
+            <a:r>
+              <a:rPr lang="en-US" dirty="0" smtClean="0"/>
+              <a:t>when posting notification messages</a:t>
             </a:r>
           </a:p>
           <a:p>
@@ -6707,14 +7177,20 @@
         </p:nvSpPr>
         <p:spPr/>
         <p:txBody>
-          <a:bodyPr/>
-          <a:lstStyle/>
-          <a:p>
-            <a:r>
-              <a:rPr lang="en-US" dirty="0" smtClean="0"/>
-              <a:t>Add Google Play Services Library</a:t>
-            </a:r>
-            <a:endParaRPr lang="en-US" dirty="0"/>
+          <a:bodyPr>
+            <a:normAutofit/>
+          </a:bodyPr>
+          <a:lstStyle/>
+          <a:p>
+            <a:r>
+              <a:rPr lang="en-US" sz="3600" dirty="0" smtClean="0"/>
+              <a:t>Add Google Play Services </a:t>
+            </a:r>
+            <a:r>
+              <a:rPr lang="en-US" sz="3600" dirty="0" smtClean="0"/>
+              <a:t>Library - Eclipse</a:t>
+            </a:r>
+            <a:endParaRPr lang="en-US" sz="3600" dirty="0"/>
           </a:p>
         </p:txBody>
       </p:sp>

</xml_diff>

<commit_message>
More updates for Columbus Code Camp 2014
</commit_message>
<xml_diff>
--- a/Implementing Push Notification in Android.pptx
+++ b/Implementing Push Notification in Android.pptx
@@ -5,10 +5,10 @@
     <p:sldMasterId id="2147483648" r:id="rId1"/>
   </p:sldMasterIdLst>
   <p:notesMasterIdLst>
-    <p:notesMasterId r:id="rId21"/>
+    <p:notesMasterId r:id="rId23"/>
   </p:notesMasterIdLst>
   <p:handoutMasterIdLst>
-    <p:handoutMasterId r:id="rId22"/>
+    <p:handoutMasterId r:id="rId24"/>
   </p:handoutMasterIdLst>
   <p:sldIdLst>
     <p:sldId id="257" r:id="rId2"/>
@@ -21,15 +21,17 @@
     <p:sldId id="265" r:id="rId9"/>
     <p:sldId id="266" r:id="rId10"/>
     <p:sldId id="267" r:id="rId11"/>
-    <p:sldId id="276" r:id="rId12"/>
-    <p:sldId id="270" r:id="rId13"/>
-    <p:sldId id="271" r:id="rId14"/>
-    <p:sldId id="272" r:id="rId15"/>
-    <p:sldId id="273" r:id="rId16"/>
-    <p:sldId id="275" r:id="rId17"/>
-    <p:sldId id="269" r:id="rId18"/>
-    <p:sldId id="274" r:id="rId19"/>
-    <p:sldId id="259" r:id="rId20"/>
+    <p:sldId id="277" r:id="rId12"/>
+    <p:sldId id="276" r:id="rId13"/>
+    <p:sldId id="270" r:id="rId14"/>
+    <p:sldId id="271" r:id="rId15"/>
+    <p:sldId id="272" r:id="rId16"/>
+    <p:sldId id="273" r:id="rId17"/>
+    <p:sldId id="275" r:id="rId18"/>
+    <p:sldId id="269" r:id="rId19"/>
+    <p:sldId id="274" r:id="rId20"/>
+    <p:sldId id="259" r:id="rId21"/>
+    <p:sldId id="278" r:id="rId22"/>
   </p:sldIdLst>
   <p:sldSz cx="9144000" cy="6858000" type="screen4x3"/>
   <p:notesSz cx="6858000" cy="9144000"/>
@@ -3417,7 +3419,7 @@
           <a:noFill/>
           <a:extLst>
             <a:ext uri="{909E8E84-426E-40dd-AFC4-6F175D3DCCD1}">
-              <a14:hiddenFill xmlns:a14="http://schemas.microsoft.com/office/drawing/2010/main" xmlns="">
+              <a14:hiddenFill xmlns="" xmlns:a14="http://schemas.microsoft.com/office/drawing/2010/main">
                 <a:solidFill>
                   <a:srgbClr val="FFFFFF"/>
                 </a:solidFill>
@@ -3993,7 +3995,7 @@
           <a:noFill/>
           <a:extLst>
             <a:ext uri="{909E8E84-426E-40dd-AFC4-6F175D3DCCD1}">
-              <a14:hiddenFill xmlns:a14="http://schemas.microsoft.com/office/drawing/2010/main" xmlns="">
+              <a14:hiddenFill xmlns="" xmlns:a14="http://schemas.microsoft.com/office/drawing/2010/main">
                 <a:solidFill>
                   <a:srgbClr val="FFFFFF"/>
                 </a:solidFill>
@@ -4134,7 +4136,6 @@
               <a:rPr lang="en-US" sz="3600" dirty="0"/>
               <a:t>Add Google Play Services Library - Eclipse</a:t>
             </a:r>
-            <a:endParaRPr lang="en-US" sz="3600" dirty="0"/>
           </a:p>
         </p:txBody>
       </p:sp>
@@ -4203,11 +4204,15 @@
             </a:r>
             <a:r>
               <a:rPr lang="en-US" sz="2000" dirty="0" smtClean="0"/>
-              <a:t>google-play-</a:t>
+              <a:t>the imported google-play-</a:t>
             </a:r>
             <a:r>
               <a:rPr lang="en-US" sz="2000" dirty="0" err="1" smtClean="0"/>
               <a:t>services_lib</a:t>
+            </a:r>
+            <a:r>
+              <a:rPr lang="en-US" sz="2000" dirty="0" smtClean="0"/>
+              <a:t> project</a:t>
             </a:r>
             <a:endParaRPr lang="en-US" sz="2000" dirty="0" smtClean="0"/>
           </a:p>
@@ -4255,6 +4260,271 @@
         </p:nvSpPr>
         <p:spPr/>
         <p:txBody>
+          <a:bodyPr>
+            <a:noAutofit/>
+          </a:bodyPr>
+          <a:lstStyle/>
+          <a:p>
+            <a:r>
+              <a:rPr lang="en-US" sz="3600" dirty="0" smtClean="0"/>
+              <a:t>Add Google Play Services Library –</a:t>
+            </a:r>
+            <a:br>
+              <a:rPr lang="en-US" sz="3600" dirty="0" smtClean="0"/>
+            </a:br>
+            <a:r>
+              <a:rPr lang="en-US" sz="3600" dirty="0" smtClean="0"/>
+              <a:t>Android Studio</a:t>
+            </a:r>
+            <a:endParaRPr lang="en-US" sz="3600" dirty="0"/>
+          </a:p>
+        </p:txBody>
+      </p:sp>
+      <p:sp>
+        <p:nvSpPr>
+          <p:cNvPr id="3" name="Content Placeholder 2"/>
+          <p:cNvSpPr>
+            <a:spLocks noGrp="1"/>
+          </p:cNvSpPr>
+          <p:nvPr>
+            <p:ph idx="1"/>
+          </p:nvPr>
+        </p:nvSpPr>
+        <p:spPr>
+          <a:xfrm>
+            <a:off x="457200" y="1608827"/>
+            <a:ext cx="8229600" cy="981973"/>
+          </a:xfrm>
+        </p:spPr>
+        <p:txBody>
+          <a:bodyPr>
+            <a:normAutofit/>
+          </a:bodyPr>
+          <a:lstStyle/>
+          <a:p>
+            <a:r>
+              <a:rPr lang="en-US" sz="2400" dirty="0" smtClean="0"/>
+              <a:t>Much simpler...</a:t>
+            </a:r>
+          </a:p>
+          <a:p>
+            <a:r>
+              <a:rPr lang="en-US" sz="2400" dirty="0" smtClean="0"/>
+              <a:t>Inside </a:t>
+            </a:r>
+            <a:r>
+              <a:rPr lang="en-US" sz="2400" dirty="0" err="1" smtClean="0"/>
+              <a:t>build.gradle</a:t>
+            </a:r>
+            <a:r>
+              <a:rPr lang="en-US" sz="2400" dirty="0" smtClean="0"/>
+              <a:t>, add the following dependencies</a:t>
+            </a:r>
+            <a:endParaRPr lang="en-US" sz="2400" dirty="0"/>
+          </a:p>
+        </p:txBody>
+      </p:sp>
+      <p:sp>
+        <p:nvSpPr>
+          <p:cNvPr id="4" name="TextBox 3"/>
+          <p:cNvSpPr txBox="1"/>
+          <p:nvPr/>
+        </p:nvSpPr>
+        <p:spPr>
+          <a:xfrm>
+            <a:off x="461513" y="2590800"/>
+            <a:ext cx="8229600" cy="830997"/>
+          </a:xfrm>
+          <a:prstGeom prst="rect">
+            <a:avLst/>
+          </a:prstGeom>
+          <a:solidFill>
+            <a:schemeClr val="bg1">
+              <a:lumMod val="85000"/>
+            </a:schemeClr>
+          </a:solidFill>
+          <a:ln>
+            <a:solidFill>
+              <a:schemeClr val="tx1"/>
+            </a:solidFill>
+          </a:ln>
+        </p:spPr>
+        <p:txBody>
+          <a:bodyPr wrap="square" rtlCol="0">
+            <a:spAutoFit/>
+          </a:bodyPr>
+          <a:lstStyle/>
+          <a:p>
+            <a:r>
+              <a:rPr lang="en-US" sz="1200" dirty="0" smtClean="0">
+                <a:latin typeface="Courier"/>
+              </a:rPr>
+              <a:t>dependencies </a:t>
+            </a:r>
+            <a:r>
+              <a:rPr lang="en-US" sz="1200" dirty="0">
+                <a:latin typeface="Courier"/>
+              </a:rPr>
+              <a:t>{</a:t>
+            </a:r>
+            <a:br>
+              <a:rPr lang="en-US" sz="1200" dirty="0">
+                <a:latin typeface="Courier"/>
+              </a:rPr>
+            </a:br>
+            <a:r>
+              <a:rPr lang="en-US" sz="1200" dirty="0">
+                <a:latin typeface="Courier"/>
+              </a:rPr>
+              <a:t>    compile </a:t>
+            </a:r>
+            <a:r>
+              <a:rPr lang="en-US" sz="1200" b="1" dirty="0">
+                <a:latin typeface="Courier"/>
+              </a:rPr>
+              <a:t>'com.android.support:appcompat-v7:20.+'</a:t>
+            </a:r>
+            <a:br>
+              <a:rPr lang="en-US" sz="1200" b="1" dirty="0">
+                <a:latin typeface="Courier"/>
+              </a:rPr>
+            </a:br>
+            <a:r>
+              <a:rPr lang="en-US" sz="1200" b="1" dirty="0">
+                <a:latin typeface="Courier"/>
+              </a:rPr>
+              <a:t>    </a:t>
+            </a:r>
+            <a:r>
+              <a:rPr lang="en-US" sz="1200" dirty="0">
+                <a:latin typeface="Courier"/>
+              </a:rPr>
+              <a:t>compile </a:t>
+            </a:r>
+            <a:r>
+              <a:rPr lang="en-US" sz="1200" b="1" dirty="0">
+                <a:latin typeface="Courier"/>
+              </a:rPr>
+              <a:t>'com.google.android.gms:play-services:5.+'</a:t>
+            </a:r>
+            <a:br>
+              <a:rPr lang="en-US" sz="1200" b="1" dirty="0">
+                <a:latin typeface="Courier"/>
+              </a:rPr>
+            </a:br>
+            <a:r>
+              <a:rPr lang="en-US" sz="1200" dirty="0" smtClean="0">
+                <a:latin typeface="Courier"/>
+              </a:rPr>
+              <a:t>}</a:t>
+            </a:r>
+            <a:endParaRPr lang="en-US" sz="1200" dirty="0">
+              <a:latin typeface="Courier"/>
+              <a:cs typeface="Courier"/>
+            </a:endParaRPr>
+          </a:p>
+        </p:txBody>
+      </p:sp>
+      <p:sp>
+        <p:nvSpPr>
+          <p:cNvPr id="5" name="Rectangle 4"/>
+          <p:cNvSpPr/>
+          <p:nvPr/>
+        </p:nvSpPr>
+        <p:spPr>
+          <a:xfrm>
+            <a:off x="457200" y="3434274"/>
+            <a:ext cx="8229600" cy="1938992"/>
+          </a:xfrm>
+          <a:prstGeom prst="rect">
+            <a:avLst/>
+          </a:prstGeom>
+        </p:spPr>
+        <p:txBody>
+          <a:bodyPr wrap="square">
+            <a:spAutoFit/>
+          </a:bodyPr>
+          <a:lstStyle/>
+          <a:p>
+            <a:pPr marL="342900" indent="-342900">
+              <a:buFont typeface="Arial" panose="020B0604020202020204" pitchFamily="34" charset="0"/>
+              <a:buChar char="•"/>
+            </a:pPr>
+            <a:r>
+              <a:rPr lang="en-US" sz="2400" dirty="0" err="1" smtClean="0"/>
+              <a:t>Gradle</a:t>
+            </a:r>
+            <a:r>
+              <a:rPr lang="en-US" sz="2400" dirty="0" smtClean="0"/>
+              <a:t> build will run these tasks to get dependencies from Android SDK</a:t>
+            </a:r>
+            <a:br>
+              <a:rPr lang="en-US" sz="2400" dirty="0" smtClean="0"/>
+            </a:br>
+            <a:r>
+              <a:rPr lang="en-US" sz="2400" dirty="0" smtClean="0"/>
+              <a:t>:prepareComAndroidSupportAppcompatV72000Library</a:t>
+            </a:r>
+            <a:br>
+              <a:rPr lang="en-US" sz="2400" dirty="0" smtClean="0"/>
+            </a:br>
+            <a:r>
+              <a:rPr lang="en-US" sz="2400" dirty="0" smtClean="0"/>
+              <a:t>:prepareComAndroidSupportSupportV42000Library</a:t>
+            </a:r>
+            <a:br>
+              <a:rPr lang="en-US" sz="2400" dirty="0" smtClean="0"/>
+            </a:br>
+            <a:r>
+              <a:rPr lang="en-US" sz="2400" dirty="0" smtClean="0"/>
+              <a:t>:prepareComGoogleAndroidGmsPlayServices5089Library</a:t>
+            </a:r>
+            <a:endParaRPr lang="en-US" sz="2400" dirty="0"/>
+          </a:p>
+        </p:txBody>
+      </p:sp>
+    </p:spTree>
+    <p:extLst>
+      <p:ext uri="{BB962C8B-B14F-4D97-AF65-F5344CB8AC3E}">
+        <p14:creationId xmlns:p14="http://schemas.microsoft.com/office/powerpoint/2010/main" val="3695063026"/>
+      </p:ext>
+    </p:extLst>
+  </p:cSld>
+  <p:clrMapOvr>
+    <a:masterClrMapping/>
+  </p:clrMapOvr>
+</p:sld>
+</file>
+
+<file path=ppt/slides/slide12.xml><?xml version="1.0" encoding="utf-8"?>
+<p:sld xmlns:a="http://schemas.openxmlformats.org/drawingml/2006/main" xmlns:r="http://schemas.openxmlformats.org/officeDocument/2006/relationships" xmlns:p="http://schemas.openxmlformats.org/presentationml/2006/main">
+  <p:cSld>
+    <p:spTree>
+      <p:nvGrpSpPr>
+        <p:cNvPr id="1" name=""/>
+        <p:cNvGrpSpPr/>
+        <p:nvPr/>
+      </p:nvGrpSpPr>
+      <p:grpSpPr>
+        <a:xfrm>
+          <a:off x="0" y="0"/>
+          <a:ext cx="0" cy="0"/>
+          <a:chOff x="0" y="0"/>
+          <a:chExt cx="0" cy="0"/>
+        </a:xfrm>
+      </p:grpSpPr>
+      <p:sp>
+        <p:nvSpPr>
+          <p:cNvPr id="2" name="Title 1"/>
+          <p:cNvSpPr>
+            <a:spLocks noGrp="1"/>
+          </p:cNvSpPr>
+          <p:nvPr>
+            <p:ph type="title"/>
+          </p:nvPr>
+        </p:nvSpPr>
+        <p:spPr/>
+        <p:txBody>
           <a:bodyPr/>
           <a:lstStyle/>
           <a:p>
@@ -4304,11 +4574,18 @@
               <a:buNone/>
             </a:pPr>
             <a:r>
+              <a:rPr lang="en-US" sz="1200" dirty="0" smtClean="0">
+                <a:latin typeface="Courier"/>
+                <a:cs typeface="Courier"/>
+              </a:rPr>
+              <a:t>&lt;</a:t>
+            </a:r>
+            <a:r>
               <a:rPr lang="en-US" sz="1200" dirty="0">
                 <a:latin typeface="Courier"/>
                 <a:cs typeface="Courier"/>
               </a:rPr>
-              <a:t>&lt;meta-data android:name="com.google.android.gms.version" android:value="@integer/google_play_services_version" /&gt;</a:t>
+              <a:t>meta-data android:name="com.google.android.gms.version" android:value="@integer/google_play_services_version" /&gt;</a:t>
             </a:r>
           </a:p>
         </p:txBody>
@@ -4487,7 +4764,6 @@
               <a:rPr lang="en-US" sz="2000" dirty="0" smtClean="0"/>
               <a:t> inside AndroidManifest.xml</a:t>
             </a:r>
-            <a:endParaRPr lang="en-US" sz="2000" dirty="0" smtClean="0"/>
           </a:p>
         </p:txBody>
       </p:sp>
@@ -4499,7 +4775,7 @@
         </p:nvSpPr>
         <p:spPr>
           <a:xfrm>
-            <a:off x="457200" y="3657600"/>
+            <a:off x="457200" y="3437625"/>
             <a:ext cx="8229600" cy="2492990"/>
           </a:xfrm>
           <a:prstGeom prst="rect">
@@ -4650,7 +4926,7 @@
         </p:nvSpPr>
         <p:spPr>
           <a:xfrm>
-            <a:off x="460075" y="2891289"/>
+            <a:off x="457200" y="2743200"/>
             <a:ext cx="8229600" cy="766311"/>
           </a:xfrm>
           <a:prstGeom prst="rect">
@@ -4838,143 +5114,6 @@
 </p:sld>
 </file>
 
-<file path=ppt/slides/slide12.xml><?xml version="1.0" encoding="utf-8"?>
-<p:sld xmlns:a="http://schemas.openxmlformats.org/drawingml/2006/main" xmlns:r="http://schemas.openxmlformats.org/officeDocument/2006/relationships" xmlns:p="http://schemas.openxmlformats.org/presentationml/2006/main">
-  <p:cSld>
-    <p:spTree>
-      <p:nvGrpSpPr>
-        <p:cNvPr id="1" name=""/>
-        <p:cNvGrpSpPr/>
-        <p:nvPr/>
-      </p:nvGrpSpPr>
-      <p:grpSpPr>
-        <a:xfrm>
-          <a:off x="0" y="0"/>
-          <a:ext cx="0" cy="0"/>
-          <a:chOff x="0" y="0"/>
-          <a:chExt cx="0" cy="0"/>
-        </a:xfrm>
-      </p:grpSpPr>
-      <p:sp>
-        <p:nvSpPr>
-          <p:cNvPr id="2" name="Title 1"/>
-          <p:cNvSpPr>
-            <a:spLocks noGrp="1"/>
-          </p:cNvSpPr>
-          <p:nvPr>
-            <p:ph type="title"/>
-          </p:nvPr>
-        </p:nvSpPr>
-        <p:spPr/>
-        <p:txBody>
-          <a:bodyPr>
-            <a:normAutofit/>
-          </a:bodyPr>
-          <a:lstStyle/>
-          <a:p>
-            <a:r>
-              <a:rPr lang="en-US" dirty="0"/>
-              <a:t>Check for Google Play </a:t>
-            </a:r>
-            <a:r>
-              <a:rPr lang="en-US" dirty="0" smtClean="0"/>
-              <a:t>Services</a:t>
-            </a:r>
-            <a:endParaRPr lang="en-US" dirty="0"/>
-          </a:p>
-        </p:txBody>
-      </p:sp>
-      <p:sp>
-        <p:nvSpPr>
-          <p:cNvPr id="3" name="Content Placeholder 2"/>
-          <p:cNvSpPr>
-            <a:spLocks noGrp="1"/>
-          </p:cNvSpPr>
-          <p:nvPr>
-            <p:ph idx="1"/>
-          </p:nvPr>
-        </p:nvSpPr>
-        <p:spPr/>
-        <p:txBody>
-          <a:bodyPr>
-            <a:normAutofit/>
-          </a:bodyPr>
-          <a:lstStyle/>
-          <a:p>
-            <a:r>
-              <a:rPr lang="en-US" sz="2400" dirty="0" smtClean="0"/>
-              <a:t>Apps relying on Google Play Services should check for compatible version</a:t>
-            </a:r>
-          </a:p>
-          <a:p>
-            <a:r>
-              <a:rPr lang="en-US" sz="2400" dirty="0" smtClean="0"/>
-              <a:t>Typically done in following main activity methods</a:t>
-            </a:r>
-          </a:p>
-          <a:p>
-            <a:pPr lvl="1"/>
-            <a:r>
-              <a:rPr lang="en-US" sz="2000" dirty="0" smtClean="0"/>
-              <a:t>onCreate() – ensures app cannot be used without successful check</a:t>
-            </a:r>
-          </a:p>
-          <a:p>
-            <a:pPr lvl="1"/>
-            <a:r>
-              <a:rPr lang="en-US" sz="2000" dirty="0" smtClean="0"/>
-              <a:t>onResume() – ensures check is done when user returns to the app</a:t>
-            </a:r>
-          </a:p>
-          <a:p>
-            <a:r>
-              <a:rPr lang="en-US" sz="2400" dirty="0" smtClean="0"/>
-              <a:t>App can </a:t>
-            </a:r>
-            <a:r>
-              <a:rPr lang="en-US" sz="2400" dirty="0"/>
-              <a:t>call GooglePlayServicesUtil.getErrorDialog(</a:t>
-            </a:r>
-            <a:r>
-              <a:rPr lang="en-US" sz="2400" dirty="0" smtClean="0"/>
-              <a:t>) to:</a:t>
-            </a:r>
-          </a:p>
-          <a:p>
-            <a:pPr lvl="1"/>
-            <a:r>
-              <a:rPr lang="en-US" sz="2000" dirty="0" smtClean="0"/>
-              <a:t>Download APK from Google Play Store or</a:t>
-            </a:r>
-          </a:p>
-          <a:p>
-            <a:pPr lvl="1"/>
-            <a:r>
-              <a:rPr lang="en-US" sz="2000" dirty="0" smtClean="0"/>
-              <a:t>Enable it in device settings</a:t>
-            </a:r>
-          </a:p>
-          <a:p>
-            <a:r>
-              <a:rPr lang="en-US" sz="2400" dirty="0" smtClean="0"/>
-              <a:t>Code walkthrough</a:t>
-            </a:r>
-          </a:p>
-        </p:txBody>
-      </p:sp>
-    </p:spTree>
-    <p:extLst>
-      <p:ext uri="{BB962C8B-B14F-4D97-AF65-F5344CB8AC3E}">
-        <p14:creationId xmlns:p14="http://schemas.microsoft.com/office/powerpoint/2010/main" val="606154861"/>
-      </p:ext>
-    </p:extLst>
-  </p:cSld>
-  <p:clrMapOvr>
-    <a:masterClrMapping/>
-  </p:clrMapOvr>
-</p:sld>
-</file>
-
 <file path=ppt/slides/slide13.xml><?xml version="1.0" encoding="utf-8"?>
 <p:sld xmlns:a="http://schemas.openxmlformats.org/drawingml/2006/main" xmlns:r="http://schemas.openxmlformats.org/officeDocument/2006/relationships" xmlns:p="http://schemas.openxmlformats.org/presentationml/2006/main">
   <p:cSld>
@@ -5004,12 +5143,18 @@
         </p:nvSpPr>
         <p:spPr/>
         <p:txBody>
-          <a:bodyPr/>
-          <a:lstStyle/>
-          <a:p>
+          <a:bodyPr>
+            <a:normAutofit/>
+          </a:bodyPr>
+          <a:lstStyle/>
+          <a:p>
+            <a:r>
+              <a:rPr lang="en-US" dirty="0"/>
+              <a:t>Check for Google Play </a:t>
+            </a:r>
             <a:r>
               <a:rPr lang="en-US" dirty="0" smtClean="0"/>
-              <a:t>Register with GCM</a:t>
+              <a:t>Services</a:t>
             </a:r>
             <a:endParaRPr lang="en-US" dirty="0"/>
           </a:p>
@@ -5028,84 +5173,75 @@
         <p:spPr/>
         <p:txBody>
           <a:bodyPr>
-            <a:normAutofit lnSpcReduction="10000"/>
+            <a:normAutofit/>
           </a:bodyPr>
           <a:lstStyle/>
           <a:p>
             <a:r>
-              <a:rPr lang="en-US" sz="2800" dirty="0" smtClean="0"/>
-              <a:t>App must </a:t>
-            </a:r>
-            <a:r>
-              <a:rPr lang="en-US" sz="2800" dirty="0"/>
-              <a:t>register </a:t>
-            </a:r>
-            <a:r>
-              <a:rPr lang="en-US" sz="2800" dirty="0" smtClean="0"/>
-              <a:t>with GCM before </a:t>
-            </a:r>
-            <a:r>
-              <a:rPr lang="en-US" sz="2800" dirty="0"/>
-              <a:t>it can receive </a:t>
-            </a:r>
-            <a:r>
-              <a:rPr lang="en-US" sz="2800" dirty="0" smtClean="0"/>
-              <a:t>messages</a:t>
+              <a:rPr lang="en-US" sz="2400" dirty="0" smtClean="0"/>
+              <a:t>Apps relying on Google Play Services should check for compatible version</a:t>
+            </a:r>
+          </a:p>
+          <a:p>
+            <a:r>
+              <a:rPr lang="en-US" sz="2400" dirty="0" smtClean="0"/>
+              <a:t>Typically done in following main activity methods</a:t>
             </a:r>
           </a:p>
           <a:p>
             <a:pPr lvl="1"/>
             <a:r>
+              <a:rPr lang="en-US" sz="2000" dirty="0" smtClean="0"/>
+              <a:t>onCreate() – ensures app cannot be used without successful check</a:t>
+            </a:r>
+          </a:p>
+          <a:p>
+            <a:pPr lvl="1"/>
+            <a:r>
+              <a:rPr lang="en-US" sz="2000" dirty="0" smtClean="0"/>
+              <a:t>onResume() – ensures check is done when user returns to the app</a:t>
+            </a:r>
+          </a:p>
+          <a:p>
+            <a:r>
               <a:rPr lang="en-US" sz="2400" dirty="0" smtClean="0"/>
-              <a:t>Must be done on background thread because GCM register() method blocks</a:t>
-            </a:r>
-          </a:p>
-          <a:p>
-            <a:r>
-              <a:rPr lang="en-US" sz="2800" dirty="0" smtClean="0"/>
-              <a:t>Receives registration ID from GCM</a:t>
+              <a:t>App can </a:t>
+            </a:r>
+            <a:r>
+              <a:rPr lang="en-US" sz="2400" dirty="0"/>
+              <a:t>call GooglePlayServicesUtil.getErrorDialog(</a:t>
+            </a:r>
+            <a:r>
+              <a:rPr lang="en-US" sz="2400" dirty="0" smtClean="0"/>
+              <a:t>) to:</a:t>
             </a:r>
           </a:p>
           <a:p>
             <a:pPr lvl="1"/>
             <a:r>
+              <a:rPr lang="en-US" sz="2000" dirty="0" smtClean="0"/>
+              <a:t>Download APK from Google Play Store or</a:t>
+            </a:r>
+          </a:p>
+          <a:p>
+            <a:pPr lvl="1"/>
+            <a:r>
+              <a:rPr lang="en-US" sz="2000" dirty="0" smtClean="0"/>
+              <a:t>Enable it in device settings</a:t>
+            </a:r>
+          </a:p>
+          <a:p>
+            <a:r>
               <a:rPr lang="en-US" sz="2400" dirty="0" smtClean="0"/>
-              <a:t>Used by server to send notifications to that device</a:t>
-            </a:r>
-          </a:p>
-          <a:p>
-            <a:r>
-              <a:rPr lang="en-US" sz="2800" dirty="0" smtClean="0"/>
-              <a:t>Registration ID stored by app</a:t>
-            </a:r>
-          </a:p>
-          <a:p>
-            <a:pPr lvl="1"/>
-            <a:r>
-              <a:rPr lang="en-US" sz="2400" dirty="0" smtClean="0"/>
-              <a:t>Allows registration to be skipped if ID is still valid</a:t>
-            </a:r>
-          </a:p>
-          <a:p>
-            <a:pPr lvl="1"/>
-            <a:r>
-              <a:rPr lang="en-US" sz="2400" dirty="0" smtClean="0"/>
-              <a:t>Typically inside shared preferences</a:t>
-            </a:r>
-          </a:p>
-          <a:p>
-            <a:r>
-              <a:rPr lang="en-US" sz="2800" dirty="0" smtClean="0"/>
               <a:t>Code walkthrough</a:t>
             </a:r>
-            <a:endParaRPr lang="en-US" sz="2800" dirty="0"/>
           </a:p>
         </p:txBody>
       </p:sp>
     </p:spTree>
     <p:extLst>
       <p:ext uri="{BB962C8B-B14F-4D97-AF65-F5344CB8AC3E}">
-        <p14:creationId xmlns:p14="http://schemas.microsoft.com/office/powerpoint/2010/main" val="361619516"/>
+        <p14:creationId xmlns:p14="http://schemas.microsoft.com/office/powerpoint/2010/main" val="606154861"/>
       </p:ext>
     </p:extLst>
   </p:cSld>
@@ -5149,7 +5285,7 @@
           <a:p>
             <a:r>
               <a:rPr lang="en-US" dirty="0" smtClean="0"/>
-              <a:t>Test API Key and Registration ID</a:t>
+              <a:t>Register with GCM</a:t>
             </a:r>
             <a:endParaRPr lang="en-US" dirty="0"/>
           </a:p>
@@ -5173,139 +5309,79 @@
           <a:lstStyle/>
           <a:p>
             <a:r>
+              <a:rPr lang="en-US" sz="2800" dirty="0" smtClean="0"/>
+              <a:t>App must </a:t>
+            </a:r>
+            <a:r>
+              <a:rPr lang="en-US" sz="2800" dirty="0"/>
+              <a:t>register </a:t>
+            </a:r>
+            <a:r>
+              <a:rPr lang="en-US" sz="2800" dirty="0" smtClean="0"/>
+              <a:t>with GCM before </a:t>
+            </a:r>
+            <a:r>
+              <a:rPr lang="en-US" sz="2800" dirty="0"/>
+              <a:t>it can receive </a:t>
+            </a:r>
+            <a:r>
+              <a:rPr lang="en-US" sz="2800" dirty="0" smtClean="0"/>
+              <a:t>messages</a:t>
+            </a:r>
+          </a:p>
+          <a:p>
+            <a:pPr lvl="1"/>
+            <a:r>
               <a:rPr lang="en-US" sz="2400" dirty="0" smtClean="0"/>
-              <a:t>Run this command, all on one line</a:t>
-            </a:r>
-          </a:p>
-          <a:p>
-            <a:pPr marL="457200" lvl="1" indent="0">
-              <a:buNone/>
-            </a:pPr>
-            <a:r>
-              <a:rPr lang="en-US" sz="1600" dirty="0">
-                <a:latin typeface="Courier"/>
-                <a:cs typeface="Courier"/>
-              </a:rPr>
-              <a:t>curl --header "Authorization: key=&lt;API Key&gt;" --header Content-Type:"application/json" https://android.googleapis.com/gcm/send  -d "{\"registration_ids\":[\"&lt;Registration </a:t>
-            </a:r>
-            <a:r>
-              <a:rPr lang="en-US" sz="1600" dirty="0" smtClean="0">
-                <a:latin typeface="Courier"/>
-                <a:cs typeface="Courier"/>
-              </a:rPr>
-              <a:t>ID&gt;</a:t>
-            </a:r>
-            <a:r>
-              <a:rPr lang="en-US" sz="1600" dirty="0">
-                <a:latin typeface="Courier"/>
-                <a:cs typeface="Courier"/>
-              </a:rPr>
-              <a:t>\"]}</a:t>
-            </a:r>
-            <a:r>
-              <a:rPr lang="en-US" sz="1600" dirty="0" smtClean="0">
-                <a:latin typeface="Courier"/>
-                <a:cs typeface="Courier"/>
-              </a:rPr>
-              <a:t>"</a:t>
-            </a:r>
-          </a:p>
-          <a:p>
+              <a:t>Must be done on background thread because GCM register() method blocks</a:t>
+            </a:r>
+          </a:p>
+          <a:p>
+            <a:r>
+              <a:rPr lang="en-US" sz="2800" dirty="0" smtClean="0"/>
+              <a:t>Receives registration ID from GCM</a:t>
+            </a:r>
+          </a:p>
+          <a:p>
+            <a:pPr lvl="1"/>
             <a:r>
               <a:rPr lang="en-US" sz="2400" dirty="0" smtClean="0"/>
-              <a:t>Valid API key and registration ID returns response similar to:</a:t>
-            </a:r>
-          </a:p>
-          <a:p>
-            <a:pPr marL="457200" lvl="1" indent="0">
-              <a:buNone/>
-            </a:pPr>
-            <a:r>
-              <a:rPr lang="pt-BR" sz="1600" dirty="0">
-                <a:latin typeface="Courier"/>
-                <a:cs typeface="Courier"/>
-              </a:rPr>
-              <a:t>{"multicast_id":7234249251933638557,"success":1,"failure":0,"canonical_ids":0,"results":[{"message_id":"0:1397573613153828%b1013b1cf9fd7ecd"}]</a:t>
-            </a:r>
-            <a:r>
-              <a:rPr lang="pt-BR" sz="1600" dirty="0" smtClean="0">
-                <a:latin typeface="Courier"/>
-                <a:cs typeface="Courier"/>
-              </a:rPr>
-              <a:t>}</a:t>
-            </a:r>
-          </a:p>
-          <a:p>
+              <a:t>Used by server to send notifications to that device</a:t>
+            </a:r>
+          </a:p>
+          <a:p>
+            <a:r>
+              <a:rPr lang="en-US" sz="2800" dirty="0" smtClean="0"/>
+              <a:t>Registration ID stored by app</a:t>
+            </a:r>
+          </a:p>
+          <a:p>
+            <a:pPr lvl="1"/>
             <a:r>
               <a:rPr lang="en-US" sz="2400" dirty="0" smtClean="0"/>
-              <a:t>HTTP status code 401 indicates invalid server API key</a:t>
-            </a:r>
-          </a:p>
-          <a:p>
+              <a:t>Allows registration to be skipped if ID is still valid</a:t>
+            </a:r>
+          </a:p>
+          <a:p>
+            <a:pPr lvl="1"/>
             <a:r>
               <a:rPr lang="en-US" sz="2400" dirty="0" smtClean="0"/>
-              <a:t>Response containing</a:t>
-            </a:r>
-            <a:br>
-              <a:rPr lang="en-US" sz="2400" dirty="0" smtClean="0"/>
-            </a:br>
-            <a:r>
-              <a:rPr lang="en-US" sz="1600" dirty="0" smtClean="0">
-                <a:latin typeface="Courier"/>
-                <a:cs typeface="Courier"/>
-              </a:rPr>
-              <a:t>"failure":1, results</a:t>
-            </a:r>
-            <a:r>
-              <a:rPr lang="en-US" sz="1600" dirty="0">
-                <a:latin typeface="Courier"/>
-                <a:cs typeface="Courier"/>
-              </a:rPr>
-              <a:t>":[{"error":"InvalidRegistration"}</a:t>
-            </a:r>
-            <a:r>
-              <a:rPr lang="en-US" sz="1600" dirty="0" smtClean="0">
-                <a:latin typeface="Courier"/>
-                <a:cs typeface="Courier"/>
-              </a:rPr>
-              <a:t>]</a:t>
-            </a:r>
-            <a:r>
-              <a:rPr lang="en-US" sz="2400" dirty="0" smtClean="0"/>
-              <a:t/>
-            </a:r>
-            <a:br>
-              <a:rPr lang="en-US" sz="2400" dirty="0" smtClean="0"/>
-            </a:br>
-            <a:r>
-              <a:rPr lang="en-US" sz="2400" dirty="0" smtClean="0"/>
-              <a:t>indicates </a:t>
-            </a:r>
-            <a:r>
-              <a:rPr lang="en-US" sz="2400" dirty="0"/>
-              <a:t>invalid </a:t>
-            </a:r>
-            <a:r>
-              <a:rPr lang="en-US" sz="2400" dirty="0" smtClean="0"/>
-              <a:t>device registration ID</a:t>
-            </a:r>
-          </a:p>
-          <a:p>
-            <a:r>
-              <a:rPr lang="en-US" sz="2400" dirty="0" smtClean="0"/>
-              <a:t>DEMO</a:t>
-            </a:r>
-            <a:endParaRPr lang="en-US" sz="2400" dirty="0"/>
-          </a:p>
-          <a:p>
-            <a:endParaRPr lang="en-US" sz="2400" dirty="0"/>
+              <a:t>Typically inside shared preferences</a:t>
+            </a:r>
+          </a:p>
+          <a:p>
+            <a:r>
+              <a:rPr lang="en-US" sz="2800" dirty="0" smtClean="0"/>
+              <a:t>Code walkthrough</a:t>
+            </a:r>
+            <a:endParaRPr lang="en-US" sz="2800" dirty="0"/>
           </a:p>
         </p:txBody>
       </p:sp>
     </p:spTree>
     <p:extLst>
       <p:ext uri="{BB962C8B-B14F-4D97-AF65-F5344CB8AC3E}">
-        <p14:creationId xmlns:p14="http://schemas.microsoft.com/office/powerpoint/2010/main" val="2683352921"/>
+        <p14:creationId xmlns:p14="http://schemas.microsoft.com/office/powerpoint/2010/main" val="361619516"/>
       </p:ext>
     </p:extLst>
   </p:cSld>
@@ -5344,14 +5420,12 @@
         </p:nvSpPr>
         <p:spPr/>
         <p:txBody>
-          <a:bodyPr>
-            <a:normAutofit fontScale="90000"/>
-          </a:bodyPr>
+          <a:bodyPr/>
           <a:lstStyle/>
           <a:p>
             <a:r>
               <a:rPr lang="en-US" dirty="0" smtClean="0"/>
-              <a:t>Implement Broadcast Receiver and Intent Service</a:t>
+              <a:t>Test API Key and Registration ID</a:t>
             </a:r>
             <a:endParaRPr lang="en-US" dirty="0"/>
           </a:p>
@@ -5375,72 +5449,139 @@
           <a:lstStyle/>
           <a:p>
             <a:r>
-              <a:rPr lang="en-US" dirty="0" smtClean="0"/>
-              <a:t>Broadcast Receiver</a:t>
-            </a:r>
-          </a:p>
-          <a:p>
-            <a:pPr lvl="1"/>
-            <a:r>
-              <a:rPr lang="en-US" dirty="0" smtClean="0"/>
-              <a:t>Extends WakefulBroadcastReceiver</a:t>
-            </a:r>
-          </a:p>
-          <a:p>
-            <a:pPr lvl="1"/>
-            <a:r>
-              <a:rPr lang="en-US" dirty="0" smtClean="0"/>
-              <a:t>Override onReceive() to receive notification and start intent service to handle notification</a:t>
-            </a:r>
-          </a:p>
-          <a:p>
-            <a:r>
-              <a:rPr lang="en-US" dirty="0" smtClean="0"/>
-              <a:t>Intent Service</a:t>
-            </a:r>
-          </a:p>
-          <a:p>
-            <a:pPr lvl="1"/>
-            <a:r>
-              <a:rPr lang="en-US" dirty="0" smtClean="0"/>
-              <a:t>Extends IntentService</a:t>
-            </a:r>
-          </a:p>
-          <a:p>
-            <a:pPr lvl="1"/>
-            <a:r>
-              <a:rPr lang="en-US" dirty="0" smtClean="0"/>
-              <a:t>Override onHandleIntent() to process notification</a:t>
-            </a:r>
-          </a:p>
-          <a:p>
-            <a:pPr lvl="1"/>
-            <a:r>
-              <a:rPr lang="en-US" b="1" dirty="0" smtClean="0">
-                <a:solidFill>
-                  <a:srgbClr val="800000"/>
-                </a:solidFill>
+              <a:rPr lang="en-US" sz="2400" dirty="0" smtClean="0"/>
+              <a:t>Run this command, all on one line</a:t>
+            </a:r>
+          </a:p>
+          <a:p>
+            <a:pPr marL="457200" lvl="1" indent="0">
+              <a:buNone/>
+            </a:pPr>
+            <a:r>
+              <a:rPr lang="en-US" sz="1600" dirty="0">
+                <a:latin typeface="Courier"/>
+                <a:cs typeface="Courier"/>
               </a:rPr>
-              <a:t>IMPORTANT: </a:t>
-            </a:r>
-            <a:r>
-              <a:rPr lang="en-US" dirty="0" smtClean="0"/>
-              <a:t>Release wake lock when done</a:t>
-            </a:r>
-          </a:p>
-          <a:p>
-            <a:r>
-              <a:rPr lang="en-US" dirty="0" smtClean="0"/>
-              <a:t>Code walkthrough</a:t>
-            </a:r>
-            <a:endParaRPr lang="en-US" dirty="0"/>
+              <a:t>curl --header "Authorization: key=&lt;API Key&gt;" --header Content-Type:"application/json" https://android.googleapis.com/gcm/send  -d "{\"registration_ids\":[\"&lt;Registration </a:t>
+            </a:r>
+            <a:r>
+              <a:rPr lang="en-US" sz="1600" dirty="0" smtClean="0">
+                <a:latin typeface="Courier"/>
+                <a:cs typeface="Courier"/>
+              </a:rPr>
+              <a:t>ID&gt;</a:t>
+            </a:r>
+            <a:r>
+              <a:rPr lang="en-US" sz="1600" dirty="0">
+                <a:latin typeface="Courier"/>
+                <a:cs typeface="Courier"/>
+              </a:rPr>
+              <a:t>\"]}</a:t>
+            </a:r>
+            <a:r>
+              <a:rPr lang="en-US" sz="1600" dirty="0" smtClean="0">
+                <a:latin typeface="Courier"/>
+                <a:cs typeface="Courier"/>
+              </a:rPr>
+              <a:t>"</a:t>
+            </a:r>
+          </a:p>
+          <a:p>
+            <a:r>
+              <a:rPr lang="en-US" sz="2400" dirty="0" smtClean="0"/>
+              <a:t>Valid API key and registration ID returns response similar to:</a:t>
+            </a:r>
+          </a:p>
+          <a:p>
+            <a:pPr marL="457200" lvl="1" indent="0">
+              <a:buNone/>
+            </a:pPr>
+            <a:r>
+              <a:rPr lang="pt-BR" sz="1600" dirty="0">
+                <a:latin typeface="Courier"/>
+                <a:cs typeface="Courier"/>
+              </a:rPr>
+              <a:t>{"multicast_id":7234249251933638557,"success":1,"failure":0,"canonical_ids":0,"results":[{"message_id":"0:1397573613153828%b1013b1cf9fd7ecd"}]</a:t>
+            </a:r>
+            <a:r>
+              <a:rPr lang="pt-BR" sz="1600" dirty="0" smtClean="0">
+                <a:latin typeface="Courier"/>
+                <a:cs typeface="Courier"/>
+              </a:rPr>
+              <a:t>}</a:t>
+            </a:r>
+          </a:p>
+          <a:p>
+            <a:r>
+              <a:rPr lang="en-US" sz="2400" dirty="0" smtClean="0"/>
+              <a:t>HTTP status code 401 indicates invalid server API key</a:t>
+            </a:r>
+          </a:p>
+          <a:p>
+            <a:r>
+              <a:rPr lang="en-US" sz="2400" dirty="0" smtClean="0"/>
+              <a:t>Response containing</a:t>
+            </a:r>
+            <a:br>
+              <a:rPr lang="en-US" sz="2400" dirty="0" smtClean="0"/>
+            </a:br>
+            <a:r>
+              <a:rPr lang="en-US" sz="1600" dirty="0" smtClean="0">
+                <a:latin typeface="Courier"/>
+                <a:cs typeface="Courier"/>
+              </a:rPr>
+              <a:t>"failure":1, results</a:t>
+            </a:r>
+            <a:r>
+              <a:rPr lang="en-US" sz="1600" dirty="0">
+                <a:latin typeface="Courier"/>
+                <a:cs typeface="Courier"/>
+              </a:rPr>
+              <a:t>":[{"error":"InvalidRegistration"}</a:t>
+            </a:r>
+            <a:r>
+              <a:rPr lang="en-US" sz="1600" dirty="0" smtClean="0">
+                <a:latin typeface="Courier"/>
+                <a:cs typeface="Courier"/>
+              </a:rPr>
+              <a:t>]</a:t>
+            </a:r>
+            <a:r>
+              <a:rPr lang="en-US" sz="2400" dirty="0" smtClean="0"/>
+              <a:t/>
+            </a:r>
+            <a:br>
+              <a:rPr lang="en-US" sz="2400" dirty="0" smtClean="0"/>
+            </a:br>
+            <a:r>
+              <a:rPr lang="en-US" sz="2400" dirty="0" smtClean="0"/>
+              <a:t>indicates </a:t>
+            </a:r>
+            <a:r>
+              <a:rPr lang="en-US" sz="2400" dirty="0"/>
+              <a:t>invalid </a:t>
+            </a:r>
+            <a:r>
+              <a:rPr lang="en-US" sz="2400" dirty="0" smtClean="0"/>
+              <a:t>device registration ID</a:t>
+            </a:r>
+          </a:p>
+          <a:p>
+            <a:r>
+              <a:rPr lang="en-US" sz="2400" dirty="0" smtClean="0"/>
+              <a:t>DEMO</a:t>
+            </a:r>
+            <a:endParaRPr lang="en-US" sz="2400" dirty="0"/>
+          </a:p>
+          <a:p>
+            <a:endParaRPr lang="en-US" sz="2400" dirty="0"/>
           </a:p>
         </p:txBody>
       </p:sp>
     </p:spTree>
     <p:extLst>
       <p:ext uri="{BB962C8B-B14F-4D97-AF65-F5344CB8AC3E}">
-        <p14:creationId xmlns:p14="http://schemas.microsoft.com/office/powerpoint/2010/main" val="2368302692"/>
+        <p14:creationId xmlns:p14="http://schemas.microsoft.com/office/powerpoint/2010/main" val="2683352921"/>
       </p:ext>
     </p:extLst>
   </p:cSld>
@@ -5486,7 +5627,7 @@
           <a:p>
             <a:r>
               <a:rPr lang="en-US" dirty="0" smtClean="0"/>
-              <a:t>Process Notification Data in Activity</a:t>
+              <a:t>Implement Broadcast Receiver and Intent Service</a:t>
             </a:r>
             <a:endParaRPr lang="en-US" dirty="0"/>
           </a:p>
@@ -5504,53 +5645,69 @@
         </p:nvSpPr>
         <p:spPr/>
         <p:txBody>
-          <a:bodyPr/>
+          <a:bodyPr>
+            <a:normAutofit lnSpcReduction="10000"/>
+          </a:bodyPr>
           <a:lstStyle/>
           <a:p>
             <a:r>
               <a:rPr lang="en-US" dirty="0" smtClean="0"/>
-              <a:t>Store data inside Intent extras</a:t>
-            </a:r>
-          </a:p>
-          <a:p>
+              <a:t>Broadcast Receiver</a:t>
+            </a:r>
+          </a:p>
+          <a:p>
+            <a:pPr lvl="1"/>
             <a:r>
               <a:rPr lang="en-US" dirty="0" smtClean="0"/>
-              <a:t>Process data in two places</a:t>
+              <a:t>Extends WakefulBroadcastReceiver</a:t>
             </a:r>
           </a:p>
           <a:p>
             <a:pPr lvl="1"/>
             <a:r>
               <a:rPr lang="en-US" dirty="0" smtClean="0"/>
-              <a:t>onCreate() if activity was destroyed / recreated</a:t>
+              <a:t>Override onReceive() to receive notification and start intent service to handle notification</a:t>
+            </a:r>
+          </a:p>
+          <a:p>
+            <a:r>
+              <a:rPr lang="en-US" dirty="0" smtClean="0"/>
+              <a:t>Intent Service</a:t>
             </a:r>
           </a:p>
           <a:p>
             <a:pPr lvl="1"/>
             <a:r>
               <a:rPr lang="en-US" dirty="0" smtClean="0"/>
-              <a:t>onNewIntent() if activity still exists</a:t>
-            </a:r>
-          </a:p>
-          <a:p>
-            <a:pPr lvl="2"/>
+              <a:t>Extends IntentService</a:t>
+            </a:r>
+          </a:p>
+          <a:p>
+            <a:pPr lvl="1"/>
             <a:r>
               <a:rPr lang="en-US" dirty="0" smtClean="0"/>
-              <a:t>Requires Intent to </a:t>
-            </a:r>
-            <a:r>
-              <a:rPr lang="en-US" dirty="0"/>
-              <a:t>have </a:t>
+              <a:t>Override onHandleIntent() to process notification</a:t>
+            </a:r>
+          </a:p>
+          <a:p>
+            <a:pPr lvl="1"/>
+            <a:r>
+              <a:rPr lang="en-US" b="1" dirty="0" smtClean="0">
+                <a:solidFill>
+                  <a:srgbClr val="800000"/>
+                </a:solidFill>
+              </a:rPr>
+              <a:t>IMPORTANT: </a:t>
             </a:r>
             <a:r>
               <a:rPr lang="en-US" dirty="0" smtClean="0"/>
-              <a:t>FLAG_ACTIVITY_SINGLE_TOP flag to be set</a:t>
+              <a:t>Release wake lock when done</a:t>
             </a:r>
           </a:p>
           <a:p>
             <a:r>
               <a:rPr lang="en-US" dirty="0" smtClean="0"/>
-              <a:t> Code walkthrough</a:t>
+              <a:t>Code walkthrough</a:t>
             </a:r>
             <a:endParaRPr lang="en-US" dirty="0"/>
           </a:p>
@@ -5559,7 +5716,7 @@
     </p:spTree>
     <p:extLst>
       <p:ext uri="{BB962C8B-B14F-4D97-AF65-F5344CB8AC3E}">
-        <p14:creationId xmlns:p14="http://schemas.microsoft.com/office/powerpoint/2010/main" val="504142742"/>
+        <p14:creationId xmlns:p14="http://schemas.microsoft.com/office/powerpoint/2010/main" val="2368302692"/>
       </p:ext>
     </p:extLst>
   </p:cSld>
@@ -5598,70 +5755,87 @@
         </p:nvSpPr>
         <p:spPr/>
         <p:txBody>
+          <a:bodyPr>
+            <a:normAutofit fontScale="90000"/>
+          </a:bodyPr>
+          <a:lstStyle/>
+          <a:p>
+            <a:r>
+              <a:rPr lang="en-US" dirty="0" smtClean="0"/>
+              <a:t>Process Notification Data in Activity</a:t>
+            </a:r>
+            <a:endParaRPr lang="en-US" dirty="0"/>
+          </a:p>
+        </p:txBody>
+      </p:sp>
+      <p:sp>
+        <p:nvSpPr>
+          <p:cNvPr id="3" name="Content Placeholder 2"/>
+          <p:cNvSpPr>
+            <a:spLocks noGrp="1"/>
+          </p:cNvSpPr>
+          <p:nvPr>
+            <p:ph idx="1"/>
+          </p:nvPr>
+        </p:nvSpPr>
+        <p:spPr/>
+        <p:txBody>
           <a:bodyPr/>
           <a:lstStyle/>
           <a:p>
             <a:r>
               <a:rPr lang="en-US" dirty="0" smtClean="0"/>
-              <a:t>Update the App's </a:t>
+              <a:t>Store data inside Intent extras</a:t>
+            </a:r>
+          </a:p>
+          <a:p>
+            <a:r>
+              <a:rPr lang="en-US" dirty="0" smtClean="0"/>
+              <a:t>Process data in two places</a:t>
+            </a:r>
+          </a:p>
+          <a:p>
+            <a:pPr lvl="1"/>
+            <a:r>
+              <a:rPr lang="en-US" dirty="0" smtClean="0"/>
+              <a:t>onCreate() if activity was destroyed / recreated</a:t>
+            </a:r>
+          </a:p>
+          <a:p>
+            <a:pPr lvl="1"/>
+            <a:r>
+              <a:rPr lang="en-US" dirty="0" smtClean="0"/>
+              <a:t>onNewIntent() if activity still exists</a:t>
+            </a:r>
+          </a:p>
+          <a:p>
+            <a:pPr lvl="2"/>
+            <a:r>
+              <a:rPr lang="en-US" dirty="0" smtClean="0"/>
+              <a:t>Requires Intent to </a:t>
             </a:r>
             <a:r>
               <a:rPr lang="en-US" dirty="0"/>
-              <a:t>Manifest</a:t>
-            </a:r>
-          </a:p>
-        </p:txBody>
-      </p:sp>
-      <p:sp>
-        <p:nvSpPr>
-          <p:cNvPr id="3" name="Content Placeholder 2"/>
-          <p:cNvSpPr>
-            <a:spLocks noGrp="1"/>
-          </p:cNvSpPr>
-          <p:nvPr>
-            <p:ph idx="1"/>
-          </p:nvPr>
-        </p:nvSpPr>
-        <p:spPr/>
-        <p:txBody>
-          <a:bodyPr>
-            <a:normAutofit/>
-          </a:bodyPr>
-          <a:lstStyle/>
-          <a:p>
-            <a:r>
-              <a:rPr lang="en-US" sz="2800" dirty="0" smtClean="0"/>
-              <a:t>Define Receiver for messages and registration ID</a:t>
-            </a:r>
-          </a:p>
-          <a:p>
-            <a:r>
-              <a:rPr lang="en-US" sz="2800" dirty="0" smtClean="0"/>
-              <a:t>Define IntentService for processing notifications</a:t>
-            </a:r>
-          </a:p>
-          <a:p>
-            <a:r>
-              <a:rPr lang="en-US" sz="2800" dirty="0" smtClean="0"/>
-              <a:t>See </a:t>
-            </a:r>
-            <a:r>
-              <a:rPr lang="en-US" sz="2800" dirty="0"/>
-              <a:t>http://developer.android.com/google/gcm/client.html#manifest for additional details</a:t>
-            </a:r>
-          </a:p>
-          <a:p>
-            <a:r>
-              <a:rPr lang="en-US" sz="2800" dirty="0" smtClean="0"/>
-              <a:t>Code walkthrough</a:t>
-            </a:r>
+              <a:t>have </a:t>
+            </a:r>
+            <a:r>
+              <a:rPr lang="en-US" dirty="0" smtClean="0"/>
+              <a:t>FLAG_ACTIVITY_SINGLE_TOP flag to be set</a:t>
+            </a:r>
+          </a:p>
+          <a:p>
+            <a:r>
+              <a:rPr lang="en-US" dirty="0" smtClean="0"/>
+              <a:t> Code walkthrough</a:t>
+            </a:r>
+            <a:endParaRPr lang="en-US" dirty="0"/>
           </a:p>
         </p:txBody>
       </p:sp>
     </p:spTree>
     <p:extLst>
       <p:ext uri="{BB962C8B-B14F-4D97-AF65-F5344CB8AC3E}">
-        <p14:creationId xmlns:p14="http://schemas.microsoft.com/office/powerpoint/2010/main" val="1627020553"/>
+        <p14:creationId xmlns:p14="http://schemas.microsoft.com/office/powerpoint/2010/main" val="504142742"/>
       </p:ext>
     </p:extLst>
   </p:cSld>
@@ -5705,9 +5879,12 @@
           <a:p>
             <a:r>
               <a:rPr lang="en-US" dirty="0" smtClean="0"/>
-              <a:t>Testing Without a Server</a:t>
-            </a:r>
-            <a:endParaRPr lang="en-US" dirty="0"/>
+              <a:t>Update the App's </a:t>
+            </a:r>
+            <a:r>
+              <a:rPr lang="en-US" dirty="0"/>
+              <a:t>Manifest</a:t>
+            </a:r>
           </a:p>
         </p:txBody>
       </p:sp>
@@ -5723,79 +5900,44 @@
         </p:nvSpPr>
         <p:spPr/>
         <p:txBody>
-          <a:bodyPr/>
-          <a:lstStyle/>
-          <a:p>
-            <a:r>
-              <a:rPr lang="en-US" dirty="0" smtClean="0"/>
-              <a:t>Server implementation not required</a:t>
-            </a:r>
-          </a:p>
-          <a:p>
-            <a:r>
-              <a:rPr lang="en-US" dirty="0" smtClean="0"/>
-              <a:t>Any tool capable of sending HTTPS POST requests will work</a:t>
-            </a:r>
-          </a:p>
-          <a:p>
-            <a:pPr lvl="1"/>
-            <a:r>
-              <a:rPr lang="en-US" dirty="0" smtClean="0"/>
-              <a:t>Examples:</a:t>
-            </a:r>
-          </a:p>
-          <a:p>
-            <a:pPr lvl="2"/>
-            <a:r>
-              <a:rPr lang="en-US" dirty="0" smtClean="0"/>
-              <a:t>curl</a:t>
-            </a:r>
-          </a:p>
-          <a:p>
-            <a:pPr lvl="2"/>
-            <a:r>
-              <a:rPr lang="en-US" dirty="0"/>
-              <a:t>Hurl.it -</a:t>
-            </a:r>
-            <a:r>
-              <a:rPr lang="en-US" dirty="0" smtClean="0"/>
-              <a:t> http</a:t>
-            </a:r>
-            <a:r>
-              <a:rPr lang="en-US" dirty="0"/>
-              <a:t>://www.hurl.it</a:t>
-            </a:r>
-            <a:r>
-              <a:rPr lang="en-US" dirty="0" smtClean="0"/>
-              <a:t>/</a:t>
-            </a:r>
-          </a:p>
-          <a:p>
-            <a:pPr lvl="2"/>
-            <a:r>
-              <a:rPr lang="en-US" dirty="0" smtClean="0"/>
-              <a:t>Dev HTTP Client  - Google Chrome App</a:t>
-            </a:r>
-          </a:p>
-          <a:p>
-            <a:r>
-              <a:rPr lang="en-US" dirty="0" smtClean="0"/>
-              <a:t>DEMO</a:t>
-            </a:r>
-          </a:p>
-          <a:p>
-            <a:pPr lvl="2"/>
-            <a:endParaRPr lang="en-US" dirty="0" smtClean="0"/>
-          </a:p>
-          <a:p>
-            <a:endParaRPr lang="en-US" dirty="0"/>
+          <a:bodyPr>
+            <a:normAutofit/>
+          </a:bodyPr>
+          <a:lstStyle/>
+          <a:p>
+            <a:r>
+              <a:rPr lang="en-US" sz="2800" dirty="0" smtClean="0"/>
+              <a:t>Define Receiver for messages and registration ID</a:t>
+            </a:r>
+          </a:p>
+          <a:p>
+            <a:r>
+              <a:rPr lang="en-US" sz="2800" dirty="0" smtClean="0"/>
+              <a:t>Define IntentService for processing notifications</a:t>
+            </a:r>
+          </a:p>
+          <a:p>
+            <a:r>
+              <a:rPr lang="en-US" sz="2800" dirty="0" smtClean="0"/>
+              <a:t>See </a:t>
+            </a:r>
+            <a:r>
+              <a:rPr lang="en-US" sz="2800" dirty="0"/>
+              <a:t>http://developer.android.com/google/gcm/client.html#manifest for additional details</a:t>
+            </a:r>
+          </a:p>
+          <a:p>
+            <a:r>
+              <a:rPr lang="en-US" sz="2800" dirty="0" smtClean="0"/>
+              <a:t>Code walkthrough</a:t>
+            </a:r>
           </a:p>
         </p:txBody>
       </p:sp>
     </p:spTree>
     <p:extLst>
       <p:ext uri="{BB962C8B-B14F-4D97-AF65-F5344CB8AC3E}">
-        <p14:creationId xmlns:p14="http://schemas.microsoft.com/office/powerpoint/2010/main" val="327509647"/>
+        <p14:creationId xmlns:p14="http://schemas.microsoft.com/office/powerpoint/2010/main" val="1627020553"/>
       </p:ext>
     </p:extLst>
   </p:cSld>
@@ -5839,7 +5981,7 @@
           <a:p>
             <a:r>
               <a:rPr lang="en-US" dirty="0" smtClean="0"/>
-              <a:t>Additional Info and Questions</a:t>
+              <a:t>Testing Without a Server</a:t>
             </a:r>
             <a:endParaRPr lang="en-US" dirty="0"/>
           </a:p>
@@ -5857,140 +5999,69 @@
         </p:nvSpPr>
         <p:spPr/>
         <p:txBody>
-          <a:bodyPr>
-            <a:normAutofit lnSpcReduction="10000"/>
-          </a:bodyPr>
-          <a:lstStyle/>
-          <a:p>
-            <a:r>
-              <a:rPr lang="en-US" dirty="0" err="1" smtClean="0"/>
-              <a:t>GitHub</a:t>
-            </a:r>
+          <a:bodyPr/>
+          <a:lstStyle/>
+          <a:p>
             <a:r>
               <a:rPr lang="en-US" dirty="0" smtClean="0"/>
-              <a:t> repo:</a:t>
+              <a:t>Server implementation not required</a:t>
+            </a:r>
+          </a:p>
+          <a:p>
+            <a:r>
+              <a:rPr lang="en-US" dirty="0" smtClean="0"/>
+              <a:t>Any tool capable of sending HTTPS POST requests will work</a:t>
             </a:r>
           </a:p>
           <a:p>
             <a:pPr lvl="1"/>
             <a:r>
-              <a:rPr lang="en-US" sz="2400" dirty="0"/>
-              <a:t>https://</a:t>
-            </a:r>
-            <a:r>
-              <a:rPr lang="en-US" sz="2400" dirty="0" err="1"/>
-              <a:t>github.com</a:t>
-            </a:r>
-            <a:r>
-              <a:rPr lang="en-US" sz="2400" dirty="0"/>
+              <a:rPr lang="en-US" dirty="0" smtClean="0"/>
+              <a:t>Examples:</a:t>
+            </a:r>
+          </a:p>
+          <a:p>
+            <a:pPr lvl="2"/>
+            <a:r>
+              <a:rPr lang="en-US" dirty="0" smtClean="0"/>
+              <a:t>curl</a:t>
+            </a:r>
+          </a:p>
+          <a:p>
+            <a:pPr lvl="2"/>
+            <a:r>
+              <a:rPr lang="en-US" dirty="0"/>
+              <a:t>Hurl.it -</a:t>
+            </a:r>
+            <a:r>
+              <a:rPr lang="en-US" dirty="0" smtClean="0"/>
+              <a:t> http</a:t>
+            </a:r>
+            <a:r>
+              <a:rPr lang="en-US" dirty="0"/>
+              <a:t>://www.hurl.it</a:t>
+            </a:r>
+            <a:r>
+              <a:rPr lang="en-US" dirty="0" smtClean="0"/>
               <a:t>/</a:t>
             </a:r>
-            <a:r>
-              <a:rPr lang="en-US" sz="2400" dirty="0" err="1"/>
-              <a:t>LeadingEDJE</a:t>
-            </a:r>
-            <a:r>
-              <a:rPr lang="en-US" sz="2400" dirty="0"/>
-              <a:t>/</a:t>
-            </a:r>
-            <a:r>
-              <a:rPr lang="en-US" sz="2400" dirty="0" err="1" smtClean="0"/>
-              <a:t>MobilePushNotification</a:t>
-            </a:r>
-            <a:endParaRPr lang="en-US" sz="2400" dirty="0" smtClean="0"/>
           </a:p>
           <a:p>
             <a:pPr lvl="2"/>
             <a:r>
-              <a:rPr lang="en-US" sz="2000" dirty="0" smtClean="0"/>
-              <a:t>Use </a:t>
-            </a:r>
-            <a:r>
-              <a:rPr lang="en-US" sz="2000" dirty="0" smtClean="0"/>
-              <a:t>gradle_migration_2014-10-08 branch for Android Studio / </a:t>
-            </a:r>
-            <a:r>
-              <a:rPr lang="en-US" sz="2000" dirty="0" err="1" smtClean="0"/>
-              <a:t>Gradle</a:t>
-            </a:r>
-            <a:r>
-              <a:rPr lang="en-US" sz="2000" dirty="0" smtClean="0"/>
-              <a:t> based project</a:t>
+              <a:rPr lang="en-US" dirty="0" smtClean="0"/>
+              <a:t>Dev HTTP Client  - Google Chrome App</a:t>
+            </a:r>
+          </a:p>
+          <a:p>
+            <a:r>
+              <a:rPr lang="en-US" dirty="0" smtClean="0"/>
+              <a:t>DEMO</a:t>
             </a:r>
           </a:p>
           <a:p>
             <a:pPr lvl="2"/>
-            <a:r>
-              <a:rPr lang="en-US" sz="2000" dirty="0" smtClean="0"/>
-              <a:t>Use master for Eclipse based project</a:t>
-            </a:r>
-            <a:endParaRPr lang="en-US" sz="2000" dirty="0" smtClean="0"/>
-          </a:p>
-          <a:p>
-            <a:r>
-              <a:rPr lang="en-US" dirty="0" smtClean="0"/>
-              <a:t>Google Cloud Messaging for Android</a:t>
-            </a:r>
-          </a:p>
-          <a:p>
-            <a:pPr lvl="1"/>
-            <a:r>
-              <a:rPr lang="en-US" sz="2400" dirty="0"/>
-              <a:t>http://</a:t>
-            </a:r>
-            <a:r>
-              <a:rPr lang="en-US" sz="2400" dirty="0" err="1"/>
-              <a:t>developer.android.com</a:t>
-            </a:r>
-            <a:r>
-              <a:rPr lang="en-US" sz="2400" dirty="0"/>
-              <a:t>/</a:t>
-            </a:r>
-            <a:r>
-              <a:rPr lang="en-US" sz="2400" dirty="0" err="1"/>
-              <a:t>google</a:t>
-            </a:r>
-            <a:r>
-              <a:rPr lang="en-US" sz="2400" dirty="0"/>
-              <a:t>/</a:t>
-            </a:r>
-            <a:r>
-              <a:rPr lang="en-US" sz="2400" dirty="0" err="1"/>
-              <a:t>gcm</a:t>
-            </a:r>
-            <a:r>
-              <a:rPr lang="en-US" sz="2400" dirty="0"/>
-              <a:t>/</a:t>
-            </a:r>
-            <a:r>
-              <a:rPr lang="en-US" sz="2400" dirty="0" err="1"/>
-              <a:t>index.html</a:t>
-            </a:r>
-            <a:endParaRPr lang="en-US" sz="2400" dirty="0"/>
-          </a:p>
-          <a:p>
-            <a:r>
-              <a:rPr lang="en-US" dirty="0" smtClean="0"/>
-              <a:t>My </a:t>
-            </a:r>
-            <a:r>
-              <a:rPr lang="en-US" dirty="0"/>
-              <a:t>contact info:</a:t>
-            </a:r>
-          </a:p>
-          <a:p>
-            <a:pPr lvl="1"/>
-            <a:r>
-              <a:rPr lang="en-US" sz="2400" dirty="0"/>
-              <a:t>keith.wedinger@leadingedje.com</a:t>
-            </a:r>
-          </a:p>
-          <a:p>
-            <a:pPr lvl="1"/>
-            <a:r>
-              <a:rPr lang="en-US" sz="2400" dirty="0"/>
-              <a:t>Twitter: @jkwuc89</a:t>
-            </a:r>
+            <a:endParaRPr lang="en-US" dirty="0" smtClean="0"/>
           </a:p>
           <a:p>
             <a:endParaRPr lang="en-US" dirty="0"/>
@@ -6000,7 +6071,7 @@
     </p:spTree>
     <p:extLst>
       <p:ext uri="{BB962C8B-B14F-4D97-AF65-F5344CB8AC3E}">
-        <p14:creationId xmlns:p14="http://schemas.microsoft.com/office/powerpoint/2010/main" val="442285733"/>
+        <p14:creationId xmlns:p14="http://schemas.microsoft.com/office/powerpoint/2010/main" val="327509647"/>
       </p:ext>
     </p:extLst>
   </p:cSld>
@@ -6089,7 +6160,7 @@
           <a:noFill/>
           <a:extLst>
             <a:ext uri="{909E8E84-426E-40dd-AFC4-6F175D3DCCD1}">
-              <a14:hiddenFill xmlns:a14="http://schemas.microsoft.com/office/drawing/2010/main" xmlns="">
+              <a14:hiddenFill xmlns="" xmlns:a14="http://schemas.microsoft.com/office/drawing/2010/main">
                 <a:solidFill>
                   <a:srgbClr val="FFFFFF"/>
                 </a:solidFill>
@@ -6271,6 +6342,317 @@
       </p:par>
     </p:tnLst>
   </p:timing>
+</p:sld>
+</file>
+
+<file path=ppt/slides/slide20.xml><?xml version="1.0" encoding="utf-8"?>
+<p:sld xmlns:a="http://schemas.openxmlformats.org/drawingml/2006/main" xmlns:r="http://schemas.openxmlformats.org/officeDocument/2006/relationships" xmlns:p="http://schemas.openxmlformats.org/presentationml/2006/main">
+  <p:cSld>
+    <p:spTree>
+      <p:nvGrpSpPr>
+        <p:cNvPr id="1" name=""/>
+        <p:cNvGrpSpPr/>
+        <p:nvPr/>
+      </p:nvGrpSpPr>
+      <p:grpSpPr>
+        <a:xfrm>
+          <a:off x="0" y="0"/>
+          <a:ext cx="0" cy="0"/>
+          <a:chOff x="0" y="0"/>
+          <a:chExt cx="0" cy="0"/>
+        </a:xfrm>
+      </p:grpSpPr>
+      <p:sp>
+        <p:nvSpPr>
+          <p:cNvPr id="2" name="Title 1"/>
+          <p:cNvSpPr>
+            <a:spLocks noGrp="1"/>
+          </p:cNvSpPr>
+          <p:nvPr>
+            <p:ph type="title"/>
+          </p:nvPr>
+        </p:nvSpPr>
+        <p:spPr/>
+        <p:txBody>
+          <a:bodyPr/>
+          <a:lstStyle/>
+          <a:p>
+            <a:r>
+              <a:rPr lang="en-US" dirty="0" smtClean="0"/>
+              <a:t>Additional </a:t>
+            </a:r>
+            <a:r>
+              <a:rPr lang="en-US" dirty="0" smtClean="0"/>
+              <a:t>Info</a:t>
+            </a:r>
+            <a:endParaRPr lang="en-US" dirty="0"/>
+          </a:p>
+        </p:txBody>
+      </p:sp>
+      <p:sp>
+        <p:nvSpPr>
+          <p:cNvPr id="3" name="Content Placeholder 2"/>
+          <p:cNvSpPr>
+            <a:spLocks noGrp="1"/>
+          </p:cNvSpPr>
+          <p:nvPr>
+            <p:ph idx="1"/>
+          </p:nvPr>
+        </p:nvSpPr>
+        <p:spPr/>
+        <p:txBody>
+          <a:bodyPr>
+            <a:normAutofit/>
+          </a:bodyPr>
+          <a:lstStyle/>
+          <a:p>
+            <a:r>
+              <a:rPr lang="en-US" sz="2000" dirty="0" smtClean="0"/>
+              <a:t>GitHub </a:t>
+            </a:r>
+            <a:r>
+              <a:rPr lang="en-US" sz="2000" dirty="0" smtClean="0"/>
+              <a:t>repo:</a:t>
+            </a:r>
+          </a:p>
+          <a:p>
+            <a:pPr lvl="1"/>
+            <a:r>
+              <a:rPr lang="en-US" sz="1600" dirty="0">
+                <a:hlinkClick r:id="rId2"/>
+              </a:rPr>
+              <a:t>https://</a:t>
+            </a:r>
+            <a:r>
+              <a:rPr lang="en-US" sz="1600" dirty="0" smtClean="0">
+                <a:hlinkClick r:id="rId2"/>
+              </a:rPr>
+              <a:t>github.com/LeadingEDJE/MobilePushNotification</a:t>
+            </a:r>
+            <a:endParaRPr lang="en-US" sz="1600" dirty="0" smtClean="0"/>
+          </a:p>
+          <a:p>
+            <a:pPr lvl="2"/>
+            <a:r>
+              <a:rPr lang="en-US" sz="1400" dirty="0" smtClean="0"/>
+              <a:t>Use gradle_migration_2014-10-08 branch for Android Studio / </a:t>
+            </a:r>
+            <a:r>
+              <a:rPr lang="en-US" sz="1400" dirty="0" err="1" smtClean="0"/>
+              <a:t>Gradle</a:t>
+            </a:r>
+            <a:r>
+              <a:rPr lang="en-US" sz="1400" dirty="0" smtClean="0"/>
+              <a:t> based project</a:t>
+            </a:r>
+          </a:p>
+          <a:p>
+            <a:pPr lvl="2"/>
+            <a:r>
+              <a:rPr lang="en-US" sz="1400" dirty="0" smtClean="0"/>
+              <a:t>Use master for Eclipse based project</a:t>
+            </a:r>
+          </a:p>
+          <a:p>
+            <a:r>
+              <a:rPr lang="en-US" sz="2000" dirty="0" smtClean="0"/>
+              <a:t>Google </a:t>
+            </a:r>
+            <a:r>
+              <a:rPr lang="en-US" sz="2000" dirty="0" smtClean="0"/>
+              <a:t>Cloud Messaging for Android</a:t>
+            </a:r>
+          </a:p>
+          <a:p>
+            <a:pPr lvl="1"/>
+            <a:r>
+              <a:rPr lang="en-US" sz="1600" dirty="0">
+                <a:hlinkClick r:id="rId3"/>
+              </a:rPr>
+              <a:t>http://</a:t>
+            </a:r>
+            <a:r>
+              <a:rPr lang="en-US" sz="1600" dirty="0" smtClean="0">
+                <a:hlinkClick r:id="rId3"/>
+              </a:rPr>
+              <a:t>developer.android.com/google/gcm/index.html</a:t>
+            </a:r>
+            <a:endParaRPr lang="en-US" sz="1600" dirty="0"/>
+          </a:p>
+          <a:p>
+            <a:r>
+              <a:rPr lang="en-US" sz="2000" dirty="0" smtClean="0"/>
+              <a:t>Setting up Google Play Services</a:t>
+            </a:r>
+          </a:p>
+          <a:p>
+            <a:pPr lvl="1"/>
+            <a:r>
+              <a:rPr lang="en-US" sz="1800" dirty="0">
+                <a:hlinkClick r:id="rId4"/>
+              </a:rPr>
+              <a:t>http://</a:t>
+            </a:r>
+            <a:r>
+              <a:rPr lang="en-US" sz="1800" dirty="0" smtClean="0">
+                <a:hlinkClick r:id="rId4"/>
+              </a:rPr>
+              <a:t>developer.android.com/google/play-services/setup.html</a:t>
+            </a:r>
+            <a:endParaRPr lang="en-US" sz="1800" dirty="0" smtClean="0"/>
+          </a:p>
+          <a:p>
+            <a:r>
+              <a:rPr lang="en-US" sz="2200" dirty="0" smtClean="0"/>
+              <a:t>DHC REST HTTP API Client</a:t>
+            </a:r>
+          </a:p>
+          <a:p>
+            <a:pPr lvl="1"/>
+            <a:r>
+              <a:rPr lang="en-US" sz="1800" dirty="0">
+                <a:hlinkClick r:id="rId5"/>
+              </a:rPr>
+              <a:t>https://</a:t>
+            </a:r>
+            <a:r>
+              <a:rPr lang="en-US" sz="1800" dirty="0" smtClean="0">
+                <a:hlinkClick r:id="rId5"/>
+              </a:rPr>
+              <a:t>chrome.google.com/webstore/detail/dhc-rest-http-api-client/aejoelaoggembcahagimdiliamlcdmfm?hl=en</a:t>
+            </a:r>
+            <a:endParaRPr lang="en-US" sz="1800" dirty="0" smtClean="0"/>
+          </a:p>
+          <a:p>
+            <a:r>
+              <a:rPr lang="en-US" sz="2200" dirty="0" err="1" smtClean="0"/>
+              <a:t>Droid@Screen</a:t>
+            </a:r>
+            <a:endParaRPr lang="en-US" sz="2200" dirty="0"/>
+          </a:p>
+          <a:p>
+            <a:pPr lvl="1"/>
+            <a:r>
+              <a:rPr lang="en-US" sz="1800" dirty="0">
+                <a:hlinkClick r:id="rId6"/>
+              </a:rPr>
+              <a:t>http://droid-at-screen.ribomation.com</a:t>
+            </a:r>
+            <a:r>
+              <a:rPr lang="en-US" sz="1800" dirty="0" smtClean="0">
+                <a:hlinkClick r:id="rId6"/>
+              </a:rPr>
+              <a:t>/</a:t>
+            </a:r>
+            <a:endParaRPr lang="en-US" sz="1800" dirty="0"/>
+          </a:p>
+          <a:p>
+            <a:endParaRPr lang="en-US" sz="2000" dirty="0"/>
+          </a:p>
+        </p:txBody>
+      </p:sp>
+    </p:spTree>
+    <p:extLst>
+      <p:ext uri="{BB962C8B-B14F-4D97-AF65-F5344CB8AC3E}">
+        <p14:creationId xmlns:p14="http://schemas.microsoft.com/office/powerpoint/2010/main" val="442285733"/>
+      </p:ext>
+    </p:extLst>
+  </p:cSld>
+  <p:clrMapOvr>
+    <a:masterClrMapping/>
+  </p:clrMapOvr>
+</p:sld>
+</file>
+
+<file path=ppt/slides/slide21.xml><?xml version="1.0" encoding="utf-8"?>
+<p:sld xmlns:a="http://schemas.openxmlformats.org/drawingml/2006/main" xmlns:r="http://schemas.openxmlformats.org/officeDocument/2006/relationships" xmlns:p="http://schemas.openxmlformats.org/presentationml/2006/main">
+  <p:cSld>
+    <p:spTree>
+      <p:nvGrpSpPr>
+        <p:cNvPr id="1" name=""/>
+        <p:cNvGrpSpPr/>
+        <p:nvPr/>
+      </p:nvGrpSpPr>
+      <p:grpSpPr>
+        <a:xfrm>
+          <a:off x="0" y="0"/>
+          <a:ext cx="0" cy="0"/>
+          <a:chOff x="0" y="0"/>
+          <a:chExt cx="0" cy="0"/>
+        </a:xfrm>
+      </p:grpSpPr>
+      <p:sp>
+        <p:nvSpPr>
+          <p:cNvPr id="2" name="Title 1"/>
+          <p:cNvSpPr>
+            <a:spLocks noGrp="1"/>
+          </p:cNvSpPr>
+          <p:nvPr>
+            <p:ph type="title"/>
+          </p:nvPr>
+        </p:nvSpPr>
+        <p:spPr/>
+        <p:txBody>
+          <a:bodyPr/>
+          <a:lstStyle/>
+          <a:p>
+            <a:r>
+              <a:rPr lang="en-US" dirty="0" smtClean="0"/>
+              <a:t>Questions</a:t>
+            </a:r>
+            <a:endParaRPr lang="en-US" dirty="0"/>
+          </a:p>
+        </p:txBody>
+      </p:sp>
+      <p:sp>
+        <p:nvSpPr>
+          <p:cNvPr id="3" name="Content Placeholder 2"/>
+          <p:cNvSpPr>
+            <a:spLocks noGrp="1"/>
+          </p:cNvSpPr>
+          <p:nvPr>
+            <p:ph idx="1"/>
+          </p:nvPr>
+        </p:nvSpPr>
+        <p:spPr/>
+        <p:txBody>
+          <a:bodyPr/>
+          <a:lstStyle/>
+          <a:p>
+            <a:r>
+              <a:rPr lang="en-US" dirty="0"/>
+              <a:t>My contact info:</a:t>
+            </a:r>
+          </a:p>
+          <a:p>
+            <a:pPr lvl="1"/>
+            <a:r>
+              <a:rPr lang="en-US" dirty="0"/>
+              <a:t>keith.wedinger@leadingedje.com</a:t>
+            </a:r>
+          </a:p>
+          <a:p>
+            <a:pPr lvl="1"/>
+            <a:r>
+              <a:rPr lang="en-US" dirty="0"/>
+              <a:t>Twitter: @jkwuc89</a:t>
+            </a:r>
+          </a:p>
+          <a:p>
+            <a:endParaRPr lang="en-US" dirty="0"/>
+          </a:p>
+        </p:txBody>
+      </p:sp>
+    </p:spTree>
+    <p:extLst>
+      <p:ext uri="{BB962C8B-B14F-4D97-AF65-F5344CB8AC3E}">
+        <p14:creationId xmlns:p14="http://schemas.microsoft.com/office/powerpoint/2010/main" val="1023252770"/>
+      </p:ext>
+    </p:extLst>
+  </p:cSld>
+  <p:clrMapOvr>
+    <a:masterClrMapping/>
+  </p:clrMapOvr>
 </p:sld>
 </file>
 
@@ -6560,11 +6942,7 @@
             <a:pPr lvl="2"/>
             <a:r>
               <a:rPr lang="en-US" sz="2000" dirty="0" smtClean="0"/>
-              <a:t>Android </a:t>
-            </a:r>
-            <a:r>
-              <a:rPr lang="en-US" sz="2000" dirty="0" smtClean="0"/>
-              <a:t>SDK: </a:t>
+              <a:t>Android SDK: </a:t>
             </a:r>
             <a:r>
               <a:rPr lang="en-US" sz="2000" dirty="0"/>
@@ -6757,28 +7135,15 @@
             <a:pPr lvl="1"/>
             <a:r>
               <a:rPr lang="en-US" dirty="0" smtClean="0"/>
-              <a:t>Expand platform for API </a:t>
-            </a:r>
+              <a:t>Expand platform for API 19 or higher</a:t>
+            </a:r>
+          </a:p>
+          <a:p>
+            <a:pPr lvl="1"/>
             <a:r>
               <a:rPr lang="en-US" dirty="0" smtClean="0"/>
-              <a:t>19 </a:t>
-            </a:r>
-            <a:r>
-              <a:rPr lang="en-US" dirty="0" smtClean="0"/>
-              <a:t>or higher</a:t>
-            </a:r>
-          </a:p>
-          <a:p>
-            <a:pPr lvl="1"/>
-            <a:r>
-              <a:rPr lang="en-US" dirty="0" smtClean="0"/>
-              <a:t>Install Google </a:t>
-            </a:r>
-            <a:r>
-              <a:rPr lang="en-US" dirty="0" smtClean="0"/>
-              <a:t>APIs (x86 System Image)</a:t>
-            </a:r>
-            <a:endParaRPr lang="en-US" dirty="0" smtClean="0"/>
+              <a:t>Install Google APIs (x86 System Image)</a:t>
+            </a:r>
           </a:p>
           <a:p>
             <a:pPr lvl="1"/>
@@ -6916,15 +7281,7 @@
             </a:r>
             <a:r>
               <a:rPr lang="en-US" sz="2400" dirty="0" smtClean="0"/>
-              <a:t> Note the project number, used later as GCM sender ID </a:t>
-            </a:r>
-            <a:r>
-              <a:rPr lang="en-US" sz="2400" dirty="0" smtClean="0"/>
-              <a:t>inside </a:t>
-            </a:r>
-            <a:r>
-              <a:rPr lang="en-US" sz="2400" dirty="0" smtClean="0"/>
-              <a:t>app when registering with GCM</a:t>
+              <a:t> Note the project number, used later as GCM sender ID inside app when registering with GCM</a:t>
             </a:r>
           </a:p>
           <a:p>
@@ -6937,17 +7294,8 @@
             <a:pPr lvl="1"/>
             <a:r>
               <a:rPr lang="en-US" sz="2400" dirty="0" smtClean="0"/>
-              <a:t>Expand APIs </a:t>
-            </a:r>
-            <a:r>
-              <a:rPr lang="en-US" sz="2400" dirty="0" smtClean="0"/>
-              <a:t>&amp; auth in left </a:t>
-            </a:r>
-            <a:r>
-              <a:rPr lang="en-US" sz="2400" dirty="0" smtClean="0"/>
-              <a:t>sidebar and click on APIs</a:t>
-            </a:r>
-            <a:endParaRPr lang="en-US" sz="2400" dirty="0" smtClean="0"/>
+              <a:t>Expand APIs &amp; auth in left sidebar and click on APIs</a:t>
+            </a:r>
           </a:p>
           <a:p>
             <a:pPr lvl="1"/>
@@ -7104,23 +7452,7 @@
             </a:r>
             <a:r>
               <a:rPr lang="en-US" dirty="0" smtClean="0"/>
-              <a:t>Note the API </a:t>
-            </a:r>
-            <a:r>
-              <a:rPr lang="en-US" dirty="0" smtClean="0"/>
-              <a:t>KEY, </a:t>
-            </a:r>
-            <a:r>
-              <a:rPr lang="en-US" dirty="0" smtClean="0"/>
-              <a:t>used by server as authorization key in HTTP </a:t>
-            </a:r>
-            <a:r>
-              <a:rPr lang="en-US" dirty="0" smtClean="0"/>
-              <a:t>Authorization header </a:t>
-            </a:r>
-            <a:r>
-              <a:rPr lang="en-US" dirty="0" smtClean="0"/>
-              <a:t>when posting notification messages</a:t>
+              <a:t>Note the API KEY, used by server as authorization key in HTTP Authorization header when posting notification messages</a:t>
             </a:r>
           </a:p>
           <a:p>
@@ -7184,11 +7516,7 @@
           <a:p>
             <a:r>
               <a:rPr lang="en-US" sz="3600" dirty="0" smtClean="0"/>
-              <a:t>Add Google Play Services </a:t>
-            </a:r>
-            <a:r>
-              <a:rPr lang="en-US" sz="3600" dirty="0" smtClean="0"/>
-              <a:t>Library - Eclipse</a:t>
+              <a:t>Add Google Play Services Library - Eclipse</a:t>
             </a:r>
             <a:endParaRPr lang="en-US" sz="3600" dirty="0"/>
           </a:p>

</xml_diff>

<commit_message>
Additional changes for Columbus Code Camp 2014
</commit_message>
<xml_diff>
--- a/Implementing Push Notification in Android.pptx
+++ b/Implementing Push Notification in Android.pptx
@@ -25,11 +25,11 @@
     <p:sldId id="276" r:id="rId13"/>
     <p:sldId id="270" r:id="rId14"/>
     <p:sldId id="271" r:id="rId15"/>
-    <p:sldId id="272" r:id="rId16"/>
-    <p:sldId id="273" r:id="rId17"/>
-    <p:sldId id="275" r:id="rId18"/>
-    <p:sldId id="269" r:id="rId19"/>
-    <p:sldId id="274" r:id="rId20"/>
+    <p:sldId id="273" r:id="rId16"/>
+    <p:sldId id="275" r:id="rId17"/>
+    <p:sldId id="269" r:id="rId18"/>
+    <p:sldId id="274" r:id="rId19"/>
+    <p:sldId id="272" r:id="rId20"/>
     <p:sldId id="259" r:id="rId21"/>
     <p:sldId id="278" r:id="rId22"/>
   </p:sldIdLst>
@@ -245,7 +245,7 @@
           <a:p>
             <a:fld id="{AB6131E3-072D-1447-B771-F05C9D397949}" type="datetimeFigureOut">
               <a:rPr lang="en-US" smtClean="0"/>
-              <a:t>10/9/2014</a:t>
+              <a:t>10/10/2014</a:t>
             </a:fld>
             <a:endParaRPr lang="en-US" dirty="0"/>
           </a:p>
@@ -410,7 +410,7 @@
           <a:p>
             <a:fld id="{DE4C9721-1813-4A55-A5DA-76417DB5EE62}" type="datetimeFigureOut">
               <a:rPr lang="en-US" smtClean="0"/>
-              <a:t>10/9/2014</a:t>
+              <a:t>10/10/2014</a:t>
             </a:fld>
             <a:endParaRPr lang="en-US" dirty="0"/>
           </a:p>
@@ -1051,7 +1051,7 @@
           <a:p>
             <a:fld id="{1A6A9824-C09F-4166-9A2C-6C9FA577887A}" type="datetimeFigureOut">
               <a:rPr lang="en-US" smtClean="0"/>
-              <a:t>10/9/2014</a:t>
+              <a:t>10/10/2014</a:t>
             </a:fld>
             <a:endParaRPr lang="en-US" dirty="0"/>
           </a:p>
@@ -1221,7 +1221,7 @@
           <a:p>
             <a:fld id="{1A6A9824-C09F-4166-9A2C-6C9FA577887A}" type="datetimeFigureOut">
               <a:rPr lang="en-US" smtClean="0"/>
-              <a:t>10/9/2014</a:t>
+              <a:t>10/10/2014</a:t>
             </a:fld>
             <a:endParaRPr lang="en-US" dirty="0"/>
           </a:p>
@@ -1401,7 +1401,7 @@
           <a:p>
             <a:fld id="{1A6A9824-C09F-4166-9A2C-6C9FA577887A}" type="datetimeFigureOut">
               <a:rPr lang="en-US" smtClean="0"/>
-              <a:t>10/9/2014</a:t>
+              <a:t>10/10/2014</a:t>
             </a:fld>
             <a:endParaRPr lang="en-US" dirty="0"/>
           </a:p>
@@ -1571,7 +1571,7 @@
           <a:p>
             <a:fld id="{1A6A9824-C09F-4166-9A2C-6C9FA577887A}" type="datetimeFigureOut">
               <a:rPr lang="en-US" smtClean="0"/>
-              <a:t>10/9/2014</a:t>
+              <a:t>10/10/2014</a:t>
             </a:fld>
             <a:endParaRPr lang="en-US" dirty="0"/>
           </a:p>
@@ -1817,7 +1817,7 @@
           <a:p>
             <a:fld id="{1A6A9824-C09F-4166-9A2C-6C9FA577887A}" type="datetimeFigureOut">
               <a:rPr lang="en-US" smtClean="0"/>
-              <a:t>10/9/2014</a:t>
+              <a:t>10/10/2014</a:t>
             </a:fld>
             <a:endParaRPr lang="en-US" dirty="0"/>
           </a:p>
@@ -2105,7 +2105,7 @@
           <a:p>
             <a:fld id="{1A6A9824-C09F-4166-9A2C-6C9FA577887A}" type="datetimeFigureOut">
               <a:rPr lang="en-US" smtClean="0"/>
-              <a:t>10/9/2014</a:t>
+              <a:t>10/10/2014</a:t>
             </a:fld>
             <a:endParaRPr lang="en-US" dirty="0"/>
           </a:p>
@@ -2527,7 +2527,7 @@
           <a:p>
             <a:fld id="{1A6A9824-C09F-4166-9A2C-6C9FA577887A}" type="datetimeFigureOut">
               <a:rPr lang="en-US" smtClean="0"/>
-              <a:t>10/9/2014</a:t>
+              <a:t>10/10/2014</a:t>
             </a:fld>
             <a:endParaRPr lang="en-US" dirty="0"/>
           </a:p>
@@ -2645,7 +2645,7 @@
           <a:p>
             <a:fld id="{1A6A9824-C09F-4166-9A2C-6C9FA577887A}" type="datetimeFigureOut">
               <a:rPr lang="en-US" smtClean="0"/>
-              <a:t>10/9/2014</a:t>
+              <a:t>10/10/2014</a:t>
             </a:fld>
             <a:endParaRPr lang="en-US" dirty="0"/>
           </a:p>
@@ -2740,7 +2740,7 @@
           <a:p>
             <a:fld id="{1A6A9824-C09F-4166-9A2C-6C9FA577887A}" type="datetimeFigureOut">
               <a:rPr lang="en-US" smtClean="0"/>
-              <a:t>10/9/2014</a:t>
+              <a:t>10/10/2014</a:t>
             </a:fld>
             <a:endParaRPr lang="en-US" dirty="0"/>
           </a:p>
@@ -3017,7 +3017,7 @@
           <a:p>
             <a:fld id="{1A6A9824-C09F-4166-9A2C-6C9FA577887A}" type="datetimeFigureOut">
               <a:rPr lang="en-US" smtClean="0"/>
-              <a:t>10/9/2014</a:t>
+              <a:t>10/10/2014</a:t>
             </a:fld>
             <a:endParaRPr lang="en-US" dirty="0"/>
           </a:p>
@@ -3274,7 +3274,7 @@
           <a:p>
             <a:fld id="{1A6A9824-C09F-4166-9A2C-6C9FA577887A}" type="datetimeFigureOut">
               <a:rPr lang="en-US" smtClean="0"/>
-              <a:t>10/9/2014</a:t>
+              <a:t>10/10/2014</a:t>
             </a:fld>
             <a:endParaRPr lang="en-US" dirty="0"/>
           </a:p>
@@ -3419,7 +3419,7 @@
           <a:noFill/>
           <a:extLst>
             <a:ext uri="{909E8E84-426E-40dd-AFC4-6F175D3DCCD1}">
-              <a14:hiddenFill xmlns="" xmlns:a14="http://schemas.microsoft.com/office/drawing/2010/main">
+              <a14:hiddenFill xmlns:a14="http://schemas.microsoft.com/office/drawing/2010/main" xmlns="">
                 <a:solidFill>
                   <a:srgbClr val="FFFFFF"/>
                 </a:solidFill>
@@ -3558,7 +3558,7 @@
           <a:p>
             <a:fld id="{1A6A9824-C09F-4166-9A2C-6C9FA577887A}" type="datetimeFigureOut">
               <a:rPr lang="en-US" smtClean="0"/>
-              <a:t>10/9/2014</a:t>
+              <a:t>10/10/2014</a:t>
             </a:fld>
             <a:endParaRPr lang="en-US" dirty="0"/>
           </a:p>
@@ -3995,7 +3995,7 @@
           <a:noFill/>
           <a:extLst>
             <a:ext uri="{909E8E84-426E-40dd-AFC4-6F175D3DCCD1}">
-              <a14:hiddenFill xmlns="" xmlns:a14="http://schemas.microsoft.com/office/drawing/2010/main">
+              <a14:hiddenFill xmlns:a14="http://schemas.microsoft.com/office/drawing/2010/main" xmlns="">
                 <a:solidFill>
                   <a:srgbClr val="FFFFFF"/>
                 </a:solidFill>
@@ -4151,8 +4151,8 @@
         </p:nvSpPr>
         <p:spPr>
           <a:xfrm>
-            <a:off x="457200" y="1600201"/>
-            <a:ext cx="8229600" cy="2819400"/>
+            <a:off x="457200" y="1600200"/>
+            <a:ext cx="8229600" cy="4267199"/>
           </a:xfrm>
         </p:spPr>
         <p:txBody>
@@ -4162,59 +4162,65 @@
           <a:lstStyle/>
           <a:p>
             <a:r>
+              <a:rPr lang="en-US" sz="2800" dirty="0"/>
+              <a:t>Add Project Reference </a:t>
+            </a:r>
+            <a:r>
+              <a:rPr lang="en-US" sz="2800" dirty="0" smtClean="0"/>
+              <a:t>for library project to </a:t>
+            </a:r>
+            <a:r>
+              <a:rPr lang="en-US" sz="2800" dirty="0"/>
+              <a:t>your Android app project</a:t>
+            </a:r>
+          </a:p>
+          <a:p>
+            <a:pPr lvl="1"/>
+            <a:r>
+              <a:rPr lang="en-US" sz="2400" dirty="0" smtClean="0"/>
+              <a:t>Right-click on Android app project and select Properties</a:t>
+            </a:r>
+          </a:p>
+          <a:p>
+            <a:pPr lvl="1"/>
+            <a:r>
+              <a:rPr lang="en-US" sz="2400" dirty="0" smtClean="0"/>
+              <a:t>Select </a:t>
+            </a:r>
+            <a:r>
               <a:rPr lang="en-US" sz="2400" dirty="0"/>
-              <a:t>Add Project Reference </a:t>
+              <a:t>the "Android" properties </a:t>
             </a:r>
             <a:r>
               <a:rPr lang="en-US" sz="2400" dirty="0" smtClean="0"/>
-              <a:t>for library project to </a:t>
-            </a:r>
-            <a:r>
-              <a:rPr lang="en-US" sz="2400" dirty="0"/>
-              <a:t>your Android app project</a:t>
+              <a:t>group</a:t>
             </a:r>
           </a:p>
           <a:p>
             <a:pPr lvl="1"/>
             <a:r>
-              <a:rPr lang="en-US" sz="2000" dirty="0" smtClean="0"/>
-              <a:t>Right-click on Android app project and select Properties</a:t>
-            </a:r>
-          </a:p>
-          <a:p>
-            <a:pPr lvl="1"/>
-            <a:r>
-              <a:rPr lang="en-US" sz="2000" dirty="0" smtClean="0"/>
-              <a:t>Select </a:t>
-            </a:r>
-            <a:r>
-              <a:rPr lang="en-US" sz="2000" dirty="0"/>
-              <a:t>the "Android" properties </a:t>
-            </a:r>
-            <a:r>
-              <a:rPr lang="en-US" sz="2000" dirty="0" smtClean="0"/>
-              <a:t>group</a:t>
-            </a:r>
-          </a:p>
-          <a:p>
-            <a:pPr lvl="1"/>
-            <a:r>
-              <a:rPr lang="en-US" sz="2000" dirty="0" smtClean="0"/>
-              <a:t>Click Add… under Library and select </a:t>
-            </a:r>
-            <a:r>
-              <a:rPr lang="en-US" sz="2000" dirty="0" smtClean="0"/>
-              <a:t>the imported google-play-</a:t>
-            </a:r>
-            <a:r>
-              <a:rPr lang="en-US" sz="2000" dirty="0" err="1" smtClean="0"/>
+              <a:rPr lang="en-US" sz="2400" dirty="0" smtClean="0"/>
+              <a:t>Click Add… under Library and select the imported google-play-</a:t>
+            </a:r>
+            <a:r>
+              <a:rPr lang="en-US" sz="2400" dirty="0" err="1" smtClean="0"/>
               <a:t>services_lib</a:t>
             </a:r>
             <a:r>
-              <a:rPr lang="en-US" sz="2000" dirty="0" smtClean="0"/>
-              <a:t> project</a:t>
-            </a:r>
-            <a:endParaRPr lang="en-US" sz="2000" dirty="0" smtClean="0"/>
+              <a:rPr lang="en-US" sz="2400" dirty="0" smtClean="0"/>
+              <a:t> </a:t>
+            </a:r>
+            <a:r>
+              <a:rPr lang="en-US" sz="2400" dirty="0" smtClean="0"/>
+              <a:t>project</a:t>
+            </a:r>
+          </a:p>
+          <a:p>
+            <a:r>
+              <a:rPr lang="en-US" dirty="0" smtClean="0"/>
+              <a:t>DEMO</a:t>
+            </a:r>
+            <a:endParaRPr lang="en-US" dirty="0" smtClean="0"/>
           </a:p>
         </p:txBody>
       </p:sp>
@@ -4293,7 +4299,7 @@
         <p:spPr>
           <a:xfrm>
             <a:off x="457200" y="1608827"/>
-            <a:ext cx="8229600" cy="981973"/>
+            <a:ext cx="8229600" cy="1362973"/>
           </a:xfrm>
         </p:spPr>
         <p:txBody>
@@ -4304,7 +4310,22 @@
           <a:p>
             <a:r>
               <a:rPr lang="en-US" sz="2400" dirty="0" smtClean="0"/>
-              <a:t>Much simpler...</a:t>
+              <a:t>New Android build system based on </a:t>
+            </a:r>
+            <a:r>
+              <a:rPr lang="en-US" sz="2400" dirty="0" err="1" smtClean="0"/>
+              <a:t>Gradle</a:t>
+            </a:r>
+            <a:endParaRPr lang="en-US" sz="2400" dirty="0" smtClean="0"/>
+          </a:p>
+          <a:p>
+            <a:r>
+              <a:rPr lang="en-US" sz="2400" dirty="0" smtClean="0"/>
+              <a:t>Much </a:t>
+            </a:r>
+            <a:r>
+              <a:rPr lang="en-US" sz="2400" dirty="0" smtClean="0"/>
+              <a:t>simpler...</a:t>
             </a:r>
           </a:p>
           <a:p>
@@ -4332,7 +4353,7 @@
         </p:nvSpPr>
         <p:spPr>
           <a:xfrm>
-            <a:off x="461513" y="2590800"/>
+            <a:off x="457200" y="2971800"/>
             <a:ext cx="8229600" cy="830997"/>
           </a:xfrm>
           <a:prstGeom prst="rect">
@@ -4433,7 +4454,7 @@
         </p:nvSpPr>
         <p:spPr>
           <a:xfrm>
-            <a:off x="457200" y="3434274"/>
+            <a:off x="457200" y="3886200"/>
             <a:ext cx="8229600" cy="1938992"/>
           </a:xfrm>
           <a:prstGeom prst="rect">
@@ -5420,12 +5441,14 @@
         </p:nvSpPr>
         <p:spPr/>
         <p:txBody>
-          <a:bodyPr/>
+          <a:bodyPr>
+            <a:normAutofit fontScale="90000"/>
+          </a:bodyPr>
           <a:lstStyle/>
           <a:p>
             <a:r>
               <a:rPr lang="en-US" dirty="0" smtClean="0"/>
-              <a:t>Test API Key and Registration ID</a:t>
+              <a:t>Implement Broadcast Receiver and Intent Service</a:t>
             </a:r>
             <a:endParaRPr lang="en-US" dirty="0"/>
           </a:p>
@@ -5449,139 +5472,72 @@
           <a:lstStyle/>
           <a:p>
             <a:r>
-              <a:rPr lang="en-US" sz="2400" dirty="0" smtClean="0"/>
-              <a:t>Run this command, all on one line</a:t>
-            </a:r>
-          </a:p>
-          <a:p>
-            <a:pPr marL="457200" lvl="1" indent="0">
-              <a:buNone/>
-            </a:pPr>
-            <a:r>
-              <a:rPr lang="en-US" sz="1600" dirty="0">
-                <a:latin typeface="Courier"/>
-                <a:cs typeface="Courier"/>
+              <a:rPr lang="en-US" dirty="0" smtClean="0"/>
+              <a:t>Broadcast Receiver</a:t>
+            </a:r>
+          </a:p>
+          <a:p>
+            <a:pPr lvl="1"/>
+            <a:r>
+              <a:rPr lang="en-US" dirty="0" smtClean="0"/>
+              <a:t>Extends WakefulBroadcastReceiver</a:t>
+            </a:r>
+          </a:p>
+          <a:p>
+            <a:pPr lvl="1"/>
+            <a:r>
+              <a:rPr lang="en-US" dirty="0" smtClean="0"/>
+              <a:t>Override onReceive() to receive notification and start intent service to handle notification</a:t>
+            </a:r>
+          </a:p>
+          <a:p>
+            <a:r>
+              <a:rPr lang="en-US" dirty="0" smtClean="0"/>
+              <a:t>Intent Service</a:t>
+            </a:r>
+          </a:p>
+          <a:p>
+            <a:pPr lvl="1"/>
+            <a:r>
+              <a:rPr lang="en-US" dirty="0" smtClean="0"/>
+              <a:t>Extends IntentService</a:t>
+            </a:r>
+          </a:p>
+          <a:p>
+            <a:pPr lvl="1"/>
+            <a:r>
+              <a:rPr lang="en-US" dirty="0" smtClean="0"/>
+              <a:t>Override onHandleIntent() to process notification</a:t>
+            </a:r>
+          </a:p>
+          <a:p>
+            <a:pPr lvl="1"/>
+            <a:r>
+              <a:rPr lang="en-US" b="1" dirty="0" smtClean="0">
+                <a:solidFill>
+                  <a:srgbClr val="800000"/>
+                </a:solidFill>
               </a:rPr>
-              <a:t>curl --header "Authorization: key=&lt;API Key&gt;" --header Content-Type:"application/json" https://android.googleapis.com/gcm/send  -d "{\"registration_ids\":[\"&lt;Registration </a:t>
-            </a:r>
-            <a:r>
-              <a:rPr lang="en-US" sz="1600" dirty="0" smtClean="0">
-                <a:latin typeface="Courier"/>
-                <a:cs typeface="Courier"/>
-              </a:rPr>
-              <a:t>ID&gt;</a:t>
-            </a:r>
-            <a:r>
-              <a:rPr lang="en-US" sz="1600" dirty="0">
-                <a:latin typeface="Courier"/>
-                <a:cs typeface="Courier"/>
-              </a:rPr>
-              <a:t>\"]}</a:t>
-            </a:r>
-            <a:r>
-              <a:rPr lang="en-US" sz="1600" dirty="0" smtClean="0">
-                <a:latin typeface="Courier"/>
-                <a:cs typeface="Courier"/>
-              </a:rPr>
-              <a:t>"</a:t>
-            </a:r>
-          </a:p>
-          <a:p>
-            <a:r>
-              <a:rPr lang="en-US" sz="2400" dirty="0" smtClean="0"/>
-              <a:t>Valid API key and registration ID returns response similar to:</a:t>
-            </a:r>
-          </a:p>
-          <a:p>
-            <a:pPr marL="457200" lvl="1" indent="0">
-              <a:buNone/>
-            </a:pPr>
-            <a:r>
-              <a:rPr lang="pt-BR" sz="1600" dirty="0">
-                <a:latin typeface="Courier"/>
-                <a:cs typeface="Courier"/>
-              </a:rPr>
-              <a:t>{"multicast_id":7234249251933638557,"success":1,"failure":0,"canonical_ids":0,"results":[{"message_id":"0:1397573613153828%b1013b1cf9fd7ecd"}]</a:t>
-            </a:r>
-            <a:r>
-              <a:rPr lang="pt-BR" sz="1600" dirty="0" smtClean="0">
-                <a:latin typeface="Courier"/>
-                <a:cs typeface="Courier"/>
-              </a:rPr>
-              <a:t>}</a:t>
-            </a:r>
-          </a:p>
-          <a:p>
-            <a:r>
-              <a:rPr lang="en-US" sz="2400" dirty="0" smtClean="0"/>
-              <a:t>HTTP status code 401 indicates invalid server API key</a:t>
-            </a:r>
-          </a:p>
-          <a:p>
-            <a:r>
-              <a:rPr lang="en-US" sz="2400" dirty="0" smtClean="0"/>
-              <a:t>Response containing</a:t>
-            </a:r>
-            <a:br>
-              <a:rPr lang="en-US" sz="2400" dirty="0" smtClean="0"/>
-            </a:br>
-            <a:r>
-              <a:rPr lang="en-US" sz="1600" dirty="0" smtClean="0">
-                <a:latin typeface="Courier"/>
-                <a:cs typeface="Courier"/>
-              </a:rPr>
-              <a:t>"failure":1, results</a:t>
-            </a:r>
-            <a:r>
-              <a:rPr lang="en-US" sz="1600" dirty="0">
-                <a:latin typeface="Courier"/>
-                <a:cs typeface="Courier"/>
-              </a:rPr>
-              <a:t>":[{"error":"InvalidRegistration"}</a:t>
-            </a:r>
-            <a:r>
-              <a:rPr lang="en-US" sz="1600" dirty="0" smtClean="0">
-                <a:latin typeface="Courier"/>
-                <a:cs typeface="Courier"/>
-              </a:rPr>
-              <a:t>]</a:t>
-            </a:r>
-            <a:r>
-              <a:rPr lang="en-US" sz="2400" dirty="0" smtClean="0"/>
-              <a:t/>
-            </a:r>
-            <a:br>
-              <a:rPr lang="en-US" sz="2400" dirty="0" smtClean="0"/>
-            </a:br>
-            <a:r>
-              <a:rPr lang="en-US" sz="2400" dirty="0" smtClean="0"/>
-              <a:t>indicates </a:t>
-            </a:r>
-            <a:r>
-              <a:rPr lang="en-US" sz="2400" dirty="0"/>
-              <a:t>invalid </a:t>
-            </a:r>
-            <a:r>
-              <a:rPr lang="en-US" sz="2400" dirty="0" smtClean="0"/>
-              <a:t>device registration ID</a:t>
-            </a:r>
-          </a:p>
-          <a:p>
-            <a:r>
-              <a:rPr lang="en-US" sz="2400" dirty="0" smtClean="0"/>
-              <a:t>DEMO</a:t>
-            </a:r>
-            <a:endParaRPr lang="en-US" sz="2400" dirty="0"/>
-          </a:p>
-          <a:p>
-            <a:endParaRPr lang="en-US" sz="2400" dirty="0"/>
+              <a:t>IMPORTANT: </a:t>
+            </a:r>
+            <a:r>
+              <a:rPr lang="en-US" dirty="0" smtClean="0"/>
+              <a:t>Release wake lock when done</a:t>
+            </a:r>
+          </a:p>
+          <a:p>
+            <a:r>
+              <a:rPr lang="en-US" dirty="0" smtClean="0"/>
+              <a:t>Code walkthrough</a:t>
+            </a:r>
+            <a:endParaRPr lang="en-US" dirty="0"/>
           </a:p>
         </p:txBody>
       </p:sp>
     </p:spTree>
     <p:extLst>
       <p:ext uri="{BB962C8B-B14F-4D97-AF65-F5344CB8AC3E}">
-        <p14:creationId xmlns:p14="http://schemas.microsoft.com/office/powerpoint/2010/main" val="2683352921"/>
+        <p14:creationId xmlns:p14="http://schemas.microsoft.com/office/powerpoint/2010/main" val="2368302692"/>
       </p:ext>
     </p:extLst>
   </p:cSld>
@@ -5627,7 +5583,7 @@
           <a:p>
             <a:r>
               <a:rPr lang="en-US" dirty="0" smtClean="0"/>
-              <a:t>Implement Broadcast Receiver and Intent Service</a:t>
+              <a:t>Process Notification Data in Activity</a:t>
             </a:r>
             <a:endParaRPr lang="en-US" dirty="0"/>
           </a:p>
@@ -5645,69 +5601,53 @@
         </p:nvSpPr>
         <p:spPr/>
         <p:txBody>
-          <a:bodyPr>
-            <a:normAutofit lnSpcReduction="10000"/>
-          </a:bodyPr>
+          <a:bodyPr/>
           <a:lstStyle/>
           <a:p>
             <a:r>
               <a:rPr lang="en-US" dirty="0" smtClean="0"/>
-              <a:t>Broadcast Receiver</a:t>
+              <a:t>Store data inside Intent extras</a:t>
+            </a:r>
+          </a:p>
+          <a:p>
+            <a:r>
+              <a:rPr lang="en-US" dirty="0" smtClean="0"/>
+              <a:t>Process data in two places</a:t>
             </a:r>
           </a:p>
           <a:p>
             <a:pPr lvl="1"/>
             <a:r>
               <a:rPr lang="en-US" dirty="0" smtClean="0"/>
-              <a:t>Extends WakefulBroadcastReceiver</a:t>
+              <a:t>onCreate() if activity was destroyed / recreated</a:t>
             </a:r>
           </a:p>
           <a:p>
             <a:pPr lvl="1"/>
             <a:r>
               <a:rPr lang="en-US" dirty="0" smtClean="0"/>
-              <a:t>Override onReceive() to receive notification and start intent service to handle notification</a:t>
-            </a:r>
-          </a:p>
-          <a:p>
+              <a:t>onNewIntent() if activity still exists</a:t>
+            </a:r>
+          </a:p>
+          <a:p>
+            <a:pPr lvl="2"/>
             <a:r>
               <a:rPr lang="en-US" dirty="0" smtClean="0"/>
-              <a:t>Intent Service</a:t>
-            </a:r>
-          </a:p>
-          <a:p>
-            <a:pPr lvl="1"/>
+              <a:t>Requires Intent to </a:t>
+            </a:r>
+            <a:r>
+              <a:rPr lang="en-US" dirty="0"/>
+              <a:t>have </a:t>
+            </a:r>
             <a:r>
               <a:rPr lang="en-US" dirty="0" smtClean="0"/>
-              <a:t>Extends IntentService</a:t>
-            </a:r>
-          </a:p>
-          <a:p>
-            <a:pPr lvl="1"/>
+              <a:t>FLAG_ACTIVITY_SINGLE_TOP flag to be set</a:t>
+            </a:r>
+          </a:p>
+          <a:p>
             <a:r>
               <a:rPr lang="en-US" dirty="0" smtClean="0"/>
-              <a:t>Override onHandleIntent() to process notification</a:t>
-            </a:r>
-          </a:p>
-          <a:p>
-            <a:pPr lvl="1"/>
-            <a:r>
-              <a:rPr lang="en-US" b="1" dirty="0" smtClean="0">
-                <a:solidFill>
-                  <a:srgbClr val="800000"/>
-                </a:solidFill>
-              </a:rPr>
-              <a:t>IMPORTANT: </a:t>
-            </a:r>
-            <a:r>
-              <a:rPr lang="en-US" dirty="0" smtClean="0"/>
-              <a:t>Release wake lock when done</a:t>
-            </a:r>
-          </a:p>
-          <a:p>
-            <a:r>
-              <a:rPr lang="en-US" dirty="0" smtClean="0"/>
-              <a:t>Code walkthrough</a:t>
+              <a:t> Code walkthrough</a:t>
             </a:r>
             <a:endParaRPr lang="en-US" dirty="0"/>
           </a:p>
@@ -5716,7 +5656,7 @@
     </p:spTree>
     <p:extLst>
       <p:ext uri="{BB962C8B-B14F-4D97-AF65-F5344CB8AC3E}">
-        <p14:creationId xmlns:p14="http://schemas.microsoft.com/office/powerpoint/2010/main" val="2368302692"/>
+        <p14:creationId xmlns:p14="http://schemas.microsoft.com/office/powerpoint/2010/main" val="504142742"/>
       </p:ext>
     </p:extLst>
   </p:cSld>
@@ -5755,87 +5695,1072 @@
         </p:nvSpPr>
         <p:spPr/>
         <p:txBody>
+          <a:bodyPr/>
+          <a:lstStyle/>
+          <a:p>
+            <a:r>
+              <a:rPr lang="en-US" dirty="0" smtClean="0"/>
+              <a:t>Update the App's </a:t>
+            </a:r>
+            <a:r>
+              <a:rPr lang="en-US" dirty="0"/>
+              <a:t>Manifest</a:t>
+            </a:r>
+          </a:p>
+        </p:txBody>
+      </p:sp>
+      <p:sp>
+        <p:nvSpPr>
+          <p:cNvPr id="3" name="Content Placeholder 2"/>
+          <p:cNvSpPr>
+            <a:spLocks noGrp="1"/>
+          </p:cNvSpPr>
+          <p:nvPr>
+            <p:ph idx="1"/>
+          </p:nvPr>
+        </p:nvSpPr>
+        <p:spPr>
+          <a:xfrm>
+            <a:off x="457200" y="1600201"/>
+            <a:ext cx="8229600" cy="380999"/>
+          </a:xfrm>
+        </p:spPr>
+        <p:txBody>
           <a:bodyPr>
-            <a:normAutofit fontScale="90000"/>
+            <a:noAutofit/>
           </a:bodyPr>
           <a:lstStyle/>
           <a:p>
             <a:r>
-              <a:rPr lang="en-US" dirty="0" smtClean="0"/>
-              <a:t>Process Notification Data in Activity</a:t>
-            </a:r>
-            <a:endParaRPr lang="en-US" dirty="0"/>
-          </a:p>
-        </p:txBody>
-      </p:sp>
-      <p:sp>
-        <p:nvSpPr>
-          <p:cNvPr id="3" name="Content Placeholder 2"/>
-          <p:cNvSpPr>
-            <a:spLocks noGrp="1"/>
-          </p:cNvSpPr>
-          <p:nvPr>
-            <p:ph idx="1"/>
-          </p:nvPr>
-        </p:nvSpPr>
-        <p:spPr/>
-        <p:txBody>
-          <a:bodyPr/>
+              <a:rPr lang="en-US" sz="2000" dirty="0" smtClean="0"/>
+              <a:t>Permissions</a:t>
+            </a:r>
+            <a:endParaRPr lang="en-US" sz="2000" dirty="0" smtClean="0"/>
+          </a:p>
+          <a:p>
+            <a:endParaRPr lang="en-US" sz="2000" dirty="0"/>
+          </a:p>
+          <a:p>
+            <a:endParaRPr lang="en-US" sz="2000" dirty="0"/>
+          </a:p>
+          <a:p>
+            <a:endParaRPr lang="en-US" sz="2000" dirty="0" smtClean="0"/>
+          </a:p>
+          <a:p>
+            <a:endParaRPr lang="en-US" sz="2000" dirty="0" smtClean="0"/>
+          </a:p>
+        </p:txBody>
+      </p:sp>
+      <p:graphicFrame>
+        <p:nvGraphicFramePr>
+          <p:cNvPr id="5" name="Table 4"/>
+          <p:cNvGraphicFramePr>
+            <a:graphicFrameLocks noGrp="1"/>
+          </p:cNvGraphicFramePr>
+          <p:nvPr>
+            <p:extLst>
+              <p:ext uri="{D42A27DB-BD31-4B8C-83A1-F6EECF244321}">
+                <p14:modId xmlns:p14="http://schemas.microsoft.com/office/powerpoint/2010/main" val="1304497272"/>
+              </p:ext>
+            </p:extLst>
+          </p:nvPr>
+        </p:nvGraphicFramePr>
+        <p:xfrm>
+          <a:off x="304800" y="1981200"/>
+          <a:ext cx="8610600" cy="1877262"/>
+        </p:xfrm>
+        <a:graphic>
+          <a:graphicData uri="http://schemas.openxmlformats.org/drawingml/2006/table">
+            <a:tbl>
+              <a:tblPr>
+                <a:tableStyleId>{F5AB1C69-6EDB-4FF4-983F-18BD219EF322}</a:tableStyleId>
+              </a:tblPr>
+              <a:tblGrid>
+                <a:gridCol w="3613377"/>
+                <a:gridCol w="4997223"/>
+              </a:tblGrid>
+              <a:tr h="312877">
+                <a:tc>
+                  <a:txBody>
+                    <a:bodyPr/>
+                    <a:lstStyle/>
+                    <a:p>
+                      <a:r>
+                        <a:rPr lang="en-US" sz="1400" dirty="0" smtClean="0"/>
+                        <a:t>com.google.android.c2dm.permission.RECEIVE</a:t>
+                      </a:r>
+                    </a:p>
+                  </a:txBody>
+                  <a:tcPr>
+                    <a:lnL w="12700" cap="flat" cmpd="sng" algn="ctr">
+                      <a:solidFill>
+                        <a:schemeClr val="tx1"/>
+                      </a:solidFill>
+                      <a:prstDash val="solid"/>
+                      <a:round/>
+                      <a:headEnd type="none" w="med" len="med"/>
+                      <a:tailEnd type="none" w="med" len="med"/>
+                    </a:lnL>
+                    <a:lnR w="12700" cap="flat" cmpd="sng" algn="ctr">
+                      <a:solidFill>
+                        <a:schemeClr val="tx1"/>
+                      </a:solidFill>
+                      <a:prstDash val="solid"/>
+                      <a:round/>
+                      <a:headEnd type="none" w="med" len="med"/>
+                      <a:tailEnd type="none" w="med" len="med"/>
+                    </a:lnR>
+                    <a:lnT w="12700" cap="flat" cmpd="sng" algn="ctr">
+                      <a:solidFill>
+                        <a:schemeClr val="tx1"/>
+                      </a:solidFill>
+                      <a:prstDash val="solid"/>
+                      <a:round/>
+                      <a:headEnd type="none" w="med" len="med"/>
+                      <a:tailEnd type="none" w="med" len="med"/>
+                    </a:lnT>
+                    <a:lnB w="12700" cap="flat" cmpd="sng" algn="ctr">
+                      <a:solidFill>
+                        <a:schemeClr val="tx1"/>
+                      </a:solidFill>
+                      <a:prstDash val="solid"/>
+                      <a:round/>
+                      <a:headEnd type="none" w="med" len="med"/>
+                      <a:tailEnd type="none" w="med" len="med"/>
+                    </a:lnB>
+                    <a:solidFill>
+                      <a:schemeClr val="accent3">
+                        <a:lumMod val="60000"/>
+                        <a:lumOff val="40000"/>
+                      </a:schemeClr>
+                    </a:solidFill>
+                  </a:tcPr>
+                </a:tc>
+                <a:tc>
+                  <a:txBody>
+                    <a:bodyPr/>
+                    <a:lstStyle/>
+                    <a:p>
+                      <a:r>
+                        <a:rPr lang="en-US" sz="1400" dirty="0" smtClean="0"/>
+                        <a:t>App can register and receive messages</a:t>
+                      </a:r>
+                      <a:endParaRPr lang="en-US" sz="1400" dirty="0"/>
+                    </a:p>
+                  </a:txBody>
+                  <a:tcPr>
+                    <a:lnL w="12700" cap="flat" cmpd="sng" algn="ctr">
+                      <a:solidFill>
+                        <a:schemeClr val="tx1"/>
+                      </a:solidFill>
+                      <a:prstDash val="solid"/>
+                      <a:round/>
+                      <a:headEnd type="none" w="med" len="med"/>
+                      <a:tailEnd type="none" w="med" len="med"/>
+                    </a:lnL>
+                    <a:lnR w="12700" cap="flat" cmpd="sng" algn="ctr">
+                      <a:solidFill>
+                        <a:schemeClr val="tx1"/>
+                      </a:solidFill>
+                      <a:prstDash val="solid"/>
+                      <a:round/>
+                      <a:headEnd type="none" w="med" len="med"/>
+                      <a:tailEnd type="none" w="med" len="med"/>
+                    </a:lnR>
+                    <a:lnT w="12700" cap="flat" cmpd="sng" algn="ctr">
+                      <a:solidFill>
+                        <a:schemeClr val="tx1"/>
+                      </a:solidFill>
+                      <a:prstDash val="solid"/>
+                      <a:round/>
+                      <a:headEnd type="none" w="med" len="med"/>
+                      <a:tailEnd type="none" w="med" len="med"/>
+                    </a:lnT>
+                    <a:lnB w="12700" cap="flat" cmpd="sng" algn="ctr">
+                      <a:solidFill>
+                        <a:schemeClr val="tx1"/>
+                      </a:solidFill>
+                      <a:prstDash val="solid"/>
+                      <a:round/>
+                      <a:headEnd type="none" w="med" len="med"/>
+                      <a:tailEnd type="none" w="med" len="med"/>
+                    </a:lnB>
+                    <a:solidFill>
+                      <a:schemeClr val="accent3">
+                        <a:lumMod val="60000"/>
+                        <a:lumOff val="40000"/>
+                      </a:schemeClr>
+                    </a:solidFill>
+                  </a:tcPr>
+                </a:tc>
+              </a:tr>
+              <a:tr h="312877">
+                <a:tc>
+                  <a:txBody>
+                    <a:bodyPr/>
+                    <a:lstStyle/>
+                    <a:p>
+                      <a:r>
+                        <a:rPr lang="en-US" sz="1400" dirty="0" err="1" smtClean="0"/>
+                        <a:t>android.permission.INTERNET</a:t>
+                      </a:r>
+                      <a:endParaRPr lang="en-US" sz="1400" dirty="0" smtClean="0"/>
+                    </a:p>
+                  </a:txBody>
+                  <a:tcPr>
+                    <a:lnL w="12700" cap="flat" cmpd="sng" algn="ctr">
+                      <a:solidFill>
+                        <a:schemeClr val="tx1"/>
+                      </a:solidFill>
+                      <a:prstDash val="solid"/>
+                      <a:round/>
+                      <a:headEnd type="none" w="med" len="med"/>
+                      <a:tailEnd type="none" w="med" len="med"/>
+                    </a:lnL>
+                    <a:lnR w="12700" cap="flat" cmpd="sng" algn="ctr">
+                      <a:solidFill>
+                        <a:schemeClr val="tx1"/>
+                      </a:solidFill>
+                      <a:prstDash val="solid"/>
+                      <a:round/>
+                      <a:headEnd type="none" w="med" len="med"/>
+                      <a:tailEnd type="none" w="med" len="med"/>
+                    </a:lnR>
+                    <a:lnT w="12700" cap="flat" cmpd="sng" algn="ctr">
+                      <a:solidFill>
+                        <a:schemeClr val="tx1"/>
+                      </a:solidFill>
+                      <a:prstDash val="solid"/>
+                      <a:round/>
+                      <a:headEnd type="none" w="med" len="med"/>
+                      <a:tailEnd type="none" w="med" len="med"/>
+                    </a:lnT>
+                    <a:lnB w="12700" cap="flat" cmpd="sng" algn="ctr">
+                      <a:solidFill>
+                        <a:schemeClr val="tx1"/>
+                      </a:solidFill>
+                      <a:prstDash val="solid"/>
+                      <a:round/>
+                      <a:headEnd type="none" w="med" len="med"/>
+                      <a:tailEnd type="none" w="med" len="med"/>
+                    </a:lnB>
+                    <a:solidFill>
+                      <a:schemeClr val="accent3">
+                        <a:lumMod val="60000"/>
+                        <a:lumOff val="40000"/>
+                      </a:schemeClr>
+                    </a:solidFill>
+                  </a:tcPr>
+                </a:tc>
+                <a:tc>
+                  <a:txBody>
+                    <a:bodyPr/>
+                    <a:lstStyle/>
+                    <a:p>
+                      <a:r>
+                        <a:rPr lang="en-US" sz="1400" dirty="0" smtClean="0"/>
+                        <a:t>App can send registration ID to the 3</a:t>
+                      </a:r>
+                      <a:r>
+                        <a:rPr lang="en-US" sz="1400" baseline="30000" dirty="0" smtClean="0"/>
+                        <a:t>rd</a:t>
+                      </a:r>
+                      <a:r>
+                        <a:rPr lang="en-US" sz="1400" dirty="0" smtClean="0"/>
+                        <a:t> party server</a:t>
+                      </a:r>
+                      <a:endParaRPr lang="en-US" sz="1400" dirty="0"/>
+                    </a:p>
+                  </a:txBody>
+                  <a:tcPr>
+                    <a:lnL w="12700" cap="flat" cmpd="sng" algn="ctr">
+                      <a:solidFill>
+                        <a:schemeClr val="tx1"/>
+                      </a:solidFill>
+                      <a:prstDash val="solid"/>
+                      <a:round/>
+                      <a:headEnd type="none" w="med" len="med"/>
+                      <a:tailEnd type="none" w="med" len="med"/>
+                    </a:lnL>
+                    <a:lnR w="12700" cap="flat" cmpd="sng" algn="ctr">
+                      <a:solidFill>
+                        <a:schemeClr val="tx1"/>
+                      </a:solidFill>
+                      <a:prstDash val="solid"/>
+                      <a:round/>
+                      <a:headEnd type="none" w="med" len="med"/>
+                      <a:tailEnd type="none" w="med" len="med"/>
+                    </a:lnR>
+                    <a:lnT w="12700" cap="flat" cmpd="sng" algn="ctr">
+                      <a:solidFill>
+                        <a:schemeClr val="tx1"/>
+                      </a:solidFill>
+                      <a:prstDash val="solid"/>
+                      <a:round/>
+                      <a:headEnd type="none" w="med" len="med"/>
+                      <a:tailEnd type="none" w="med" len="med"/>
+                    </a:lnT>
+                    <a:lnB w="12700" cap="flat" cmpd="sng" algn="ctr">
+                      <a:solidFill>
+                        <a:schemeClr val="tx1"/>
+                      </a:solidFill>
+                      <a:prstDash val="solid"/>
+                      <a:round/>
+                      <a:headEnd type="none" w="med" len="med"/>
+                      <a:tailEnd type="none" w="med" len="med"/>
+                    </a:lnB>
+                    <a:solidFill>
+                      <a:schemeClr val="accent3">
+                        <a:lumMod val="60000"/>
+                        <a:lumOff val="40000"/>
+                      </a:schemeClr>
+                    </a:solidFill>
+                  </a:tcPr>
+                </a:tc>
+              </a:tr>
+              <a:tr h="312877">
+                <a:tc>
+                  <a:txBody>
+                    <a:bodyPr/>
+                    <a:lstStyle/>
+                    <a:p>
+                      <a:r>
+                        <a:rPr lang="en-US" sz="1400" dirty="0" err="1" smtClean="0"/>
+                        <a:t>android.permission.GET_ACCOUNTS</a:t>
+                      </a:r>
+                      <a:endParaRPr lang="en-US" sz="1400" dirty="0" smtClean="0"/>
+                    </a:p>
+                  </a:txBody>
+                  <a:tcPr>
+                    <a:lnL w="12700" cap="flat" cmpd="sng" algn="ctr">
+                      <a:solidFill>
+                        <a:schemeClr val="tx1"/>
+                      </a:solidFill>
+                      <a:prstDash val="solid"/>
+                      <a:round/>
+                      <a:headEnd type="none" w="med" len="med"/>
+                      <a:tailEnd type="none" w="med" len="med"/>
+                    </a:lnL>
+                    <a:lnR w="12700" cap="flat" cmpd="sng" algn="ctr">
+                      <a:solidFill>
+                        <a:schemeClr val="tx1"/>
+                      </a:solidFill>
+                      <a:prstDash val="solid"/>
+                      <a:round/>
+                      <a:headEnd type="none" w="med" len="med"/>
+                      <a:tailEnd type="none" w="med" len="med"/>
+                    </a:lnR>
+                    <a:lnT w="12700" cap="flat" cmpd="sng" algn="ctr">
+                      <a:solidFill>
+                        <a:schemeClr val="tx1"/>
+                      </a:solidFill>
+                      <a:prstDash val="solid"/>
+                      <a:round/>
+                      <a:headEnd type="none" w="med" len="med"/>
+                      <a:tailEnd type="none" w="med" len="med"/>
+                    </a:lnT>
+                    <a:lnB w="12700" cap="flat" cmpd="sng" algn="ctr">
+                      <a:solidFill>
+                        <a:schemeClr val="tx1"/>
+                      </a:solidFill>
+                      <a:prstDash val="solid"/>
+                      <a:round/>
+                      <a:headEnd type="none" w="med" len="med"/>
+                      <a:tailEnd type="none" w="med" len="med"/>
+                    </a:lnB>
+                    <a:solidFill>
+                      <a:schemeClr val="accent3">
+                        <a:lumMod val="60000"/>
+                        <a:lumOff val="40000"/>
+                      </a:schemeClr>
+                    </a:solidFill>
+                  </a:tcPr>
+                </a:tc>
+                <a:tc>
+                  <a:txBody>
+                    <a:bodyPr/>
+                    <a:lstStyle/>
+                    <a:p>
+                      <a:r>
+                        <a:rPr lang="en-US" sz="1400" dirty="0" smtClean="0"/>
+                        <a:t>Access</a:t>
+                      </a:r>
+                      <a:r>
+                        <a:rPr lang="en-US" sz="1400" baseline="0" dirty="0" smtClean="0"/>
+                        <a:t> to Google account, only if Android version &lt; 4.0.4</a:t>
+                      </a:r>
+                      <a:endParaRPr lang="en-US" sz="1400" dirty="0"/>
+                    </a:p>
+                  </a:txBody>
+                  <a:tcPr>
+                    <a:lnL w="12700" cap="flat" cmpd="sng" algn="ctr">
+                      <a:solidFill>
+                        <a:schemeClr val="tx1"/>
+                      </a:solidFill>
+                      <a:prstDash val="solid"/>
+                      <a:round/>
+                      <a:headEnd type="none" w="med" len="med"/>
+                      <a:tailEnd type="none" w="med" len="med"/>
+                    </a:lnL>
+                    <a:lnR w="12700" cap="flat" cmpd="sng" algn="ctr">
+                      <a:solidFill>
+                        <a:schemeClr val="tx1"/>
+                      </a:solidFill>
+                      <a:prstDash val="solid"/>
+                      <a:round/>
+                      <a:headEnd type="none" w="med" len="med"/>
+                      <a:tailEnd type="none" w="med" len="med"/>
+                    </a:lnR>
+                    <a:lnT w="12700" cap="flat" cmpd="sng" algn="ctr">
+                      <a:solidFill>
+                        <a:schemeClr val="tx1"/>
+                      </a:solidFill>
+                      <a:prstDash val="solid"/>
+                      <a:round/>
+                      <a:headEnd type="none" w="med" len="med"/>
+                      <a:tailEnd type="none" w="med" len="med"/>
+                    </a:lnT>
+                    <a:lnB w="12700" cap="flat" cmpd="sng" algn="ctr">
+                      <a:solidFill>
+                        <a:schemeClr val="tx1"/>
+                      </a:solidFill>
+                      <a:prstDash val="solid"/>
+                      <a:round/>
+                      <a:headEnd type="none" w="med" len="med"/>
+                      <a:tailEnd type="none" w="med" len="med"/>
+                    </a:lnB>
+                    <a:solidFill>
+                      <a:schemeClr val="accent3">
+                        <a:lumMod val="60000"/>
+                        <a:lumOff val="40000"/>
+                      </a:schemeClr>
+                    </a:solidFill>
+                  </a:tcPr>
+                </a:tc>
+              </a:tr>
+              <a:tr h="312877">
+                <a:tc>
+                  <a:txBody>
+                    <a:bodyPr/>
+                    <a:lstStyle/>
+                    <a:p>
+                      <a:r>
+                        <a:rPr lang="en-US" sz="1400" dirty="0" err="1" smtClean="0"/>
+                        <a:t>android.permission.WAKE_LOCK</a:t>
+                      </a:r>
+                      <a:endParaRPr lang="en-US" sz="1400" dirty="0" smtClean="0"/>
+                    </a:p>
+                  </a:txBody>
+                  <a:tcPr>
+                    <a:lnL w="12700" cap="flat" cmpd="sng" algn="ctr">
+                      <a:solidFill>
+                        <a:schemeClr val="tx1"/>
+                      </a:solidFill>
+                      <a:prstDash val="solid"/>
+                      <a:round/>
+                      <a:headEnd type="none" w="med" len="med"/>
+                      <a:tailEnd type="none" w="med" len="med"/>
+                    </a:lnL>
+                    <a:lnR w="12700" cap="flat" cmpd="sng" algn="ctr">
+                      <a:solidFill>
+                        <a:schemeClr val="tx1"/>
+                      </a:solidFill>
+                      <a:prstDash val="solid"/>
+                      <a:round/>
+                      <a:headEnd type="none" w="med" len="med"/>
+                      <a:tailEnd type="none" w="med" len="med"/>
+                    </a:lnR>
+                    <a:lnT w="12700" cap="flat" cmpd="sng" algn="ctr">
+                      <a:solidFill>
+                        <a:schemeClr val="tx1"/>
+                      </a:solidFill>
+                      <a:prstDash val="solid"/>
+                      <a:round/>
+                      <a:headEnd type="none" w="med" len="med"/>
+                      <a:tailEnd type="none" w="med" len="med"/>
+                    </a:lnT>
+                    <a:lnB w="12700" cap="flat" cmpd="sng" algn="ctr">
+                      <a:solidFill>
+                        <a:schemeClr val="tx1"/>
+                      </a:solidFill>
+                      <a:prstDash val="solid"/>
+                      <a:round/>
+                      <a:headEnd type="none" w="med" len="med"/>
+                      <a:tailEnd type="none" w="med" len="med"/>
+                    </a:lnB>
+                    <a:solidFill>
+                      <a:schemeClr val="accent3">
+                        <a:lumMod val="60000"/>
+                        <a:lumOff val="40000"/>
+                      </a:schemeClr>
+                    </a:solidFill>
+                  </a:tcPr>
+                </a:tc>
+                <a:tc>
+                  <a:txBody>
+                    <a:bodyPr/>
+                    <a:lstStyle/>
+                    <a:p>
+                      <a:r>
+                        <a:rPr lang="en-US" sz="1400" dirty="0" smtClean="0"/>
+                        <a:t>App can keep process from sleeping when message is received</a:t>
+                      </a:r>
+                      <a:endParaRPr lang="en-US" sz="1400" dirty="0"/>
+                    </a:p>
+                  </a:txBody>
+                  <a:tcPr>
+                    <a:lnL w="12700" cap="flat" cmpd="sng" algn="ctr">
+                      <a:solidFill>
+                        <a:schemeClr val="tx1"/>
+                      </a:solidFill>
+                      <a:prstDash val="solid"/>
+                      <a:round/>
+                      <a:headEnd type="none" w="med" len="med"/>
+                      <a:tailEnd type="none" w="med" len="med"/>
+                    </a:lnL>
+                    <a:lnR w="12700" cap="flat" cmpd="sng" algn="ctr">
+                      <a:solidFill>
+                        <a:schemeClr val="tx1"/>
+                      </a:solidFill>
+                      <a:prstDash val="solid"/>
+                      <a:round/>
+                      <a:headEnd type="none" w="med" len="med"/>
+                      <a:tailEnd type="none" w="med" len="med"/>
+                    </a:lnR>
+                    <a:lnT w="12700" cap="flat" cmpd="sng" algn="ctr">
+                      <a:solidFill>
+                        <a:schemeClr val="tx1"/>
+                      </a:solidFill>
+                      <a:prstDash val="solid"/>
+                      <a:round/>
+                      <a:headEnd type="none" w="med" len="med"/>
+                      <a:tailEnd type="none" w="med" len="med"/>
+                    </a:lnT>
+                    <a:lnB w="12700" cap="flat" cmpd="sng" algn="ctr">
+                      <a:solidFill>
+                        <a:schemeClr val="tx1"/>
+                      </a:solidFill>
+                      <a:prstDash val="solid"/>
+                      <a:round/>
+                      <a:headEnd type="none" w="med" len="med"/>
+                      <a:tailEnd type="none" w="med" len="med"/>
+                    </a:lnB>
+                    <a:solidFill>
+                      <a:schemeClr val="accent3">
+                        <a:lumMod val="60000"/>
+                        <a:lumOff val="40000"/>
+                      </a:schemeClr>
+                    </a:solidFill>
+                  </a:tcPr>
+                </a:tc>
+              </a:tr>
+              <a:tr h="312877">
+                <a:tc>
+                  <a:txBody>
+                    <a:bodyPr/>
+                    <a:lstStyle/>
+                    <a:p>
+                      <a:r>
+                        <a:rPr lang="en-US" sz="1400" dirty="0" err="1" smtClean="0"/>
+                        <a:t>android.permission.VIBRATE</a:t>
+                      </a:r>
+                      <a:endParaRPr lang="en-US" sz="1400" dirty="0" smtClean="0"/>
+                    </a:p>
+                  </a:txBody>
+                  <a:tcPr>
+                    <a:lnL w="12700" cap="flat" cmpd="sng" algn="ctr">
+                      <a:solidFill>
+                        <a:schemeClr val="tx1"/>
+                      </a:solidFill>
+                      <a:prstDash val="solid"/>
+                      <a:round/>
+                      <a:headEnd type="none" w="med" len="med"/>
+                      <a:tailEnd type="none" w="med" len="med"/>
+                    </a:lnL>
+                    <a:lnR w="12700" cap="flat" cmpd="sng" algn="ctr">
+                      <a:solidFill>
+                        <a:schemeClr val="tx1"/>
+                      </a:solidFill>
+                      <a:prstDash val="solid"/>
+                      <a:round/>
+                      <a:headEnd type="none" w="med" len="med"/>
+                      <a:tailEnd type="none" w="med" len="med"/>
+                    </a:lnR>
+                    <a:lnT w="12700" cap="flat" cmpd="sng" algn="ctr">
+                      <a:solidFill>
+                        <a:schemeClr val="tx1"/>
+                      </a:solidFill>
+                      <a:prstDash val="solid"/>
+                      <a:round/>
+                      <a:headEnd type="none" w="med" len="med"/>
+                      <a:tailEnd type="none" w="med" len="med"/>
+                    </a:lnT>
+                    <a:lnB w="12700" cap="flat" cmpd="sng" algn="ctr">
+                      <a:solidFill>
+                        <a:schemeClr val="tx1"/>
+                      </a:solidFill>
+                      <a:prstDash val="solid"/>
+                      <a:round/>
+                      <a:headEnd type="none" w="med" len="med"/>
+                      <a:tailEnd type="none" w="med" len="med"/>
+                    </a:lnB>
+                    <a:solidFill>
+                      <a:schemeClr val="accent3">
+                        <a:lumMod val="60000"/>
+                        <a:lumOff val="40000"/>
+                      </a:schemeClr>
+                    </a:solidFill>
+                  </a:tcPr>
+                </a:tc>
+                <a:tc>
+                  <a:txBody>
+                    <a:bodyPr/>
+                    <a:lstStyle/>
+                    <a:p>
+                      <a:r>
+                        <a:rPr lang="en-US" sz="1400" dirty="0" smtClean="0"/>
+                        <a:t>Notifications cause</a:t>
+                      </a:r>
+                      <a:r>
+                        <a:rPr lang="en-US" sz="1400" baseline="0" dirty="0" smtClean="0"/>
+                        <a:t> device to vibrate</a:t>
+                      </a:r>
+                      <a:endParaRPr lang="en-US" sz="1400" dirty="0"/>
+                    </a:p>
+                  </a:txBody>
+                  <a:tcPr>
+                    <a:lnL w="12700" cap="flat" cmpd="sng" algn="ctr">
+                      <a:solidFill>
+                        <a:schemeClr val="tx1"/>
+                      </a:solidFill>
+                      <a:prstDash val="solid"/>
+                      <a:round/>
+                      <a:headEnd type="none" w="med" len="med"/>
+                      <a:tailEnd type="none" w="med" len="med"/>
+                    </a:lnL>
+                    <a:lnR w="12700" cap="flat" cmpd="sng" algn="ctr">
+                      <a:solidFill>
+                        <a:schemeClr val="tx1"/>
+                      </a:solidFill>
+                      <a:prstDash val="solid"/>
+                      <a:round/>
+                      <a:headEnd type="none" w="med" len="med"/>
+                      <a:tailEnd type="none" w="med" len="med"/>
+                    </a:lnR>
+                    <a:lnT w="12700" cap="flat" cmpd="sng" algn="ctr">
+                      <a:solidFill>
+                        <a:schemeClr val="tx1"/>
+                      </a:solidFill>
+                      <a:prstDash val="solid"/>
+                      <a:round/>
+                      <a:headEnd type="none" w="med" len="med"/>
+                      <a:tailEnd type="none" w="med" len="med"/>
+                    </a:lnT>
+                    <a:lnB w="12700" cap="flat" cmpd="sng" algn="ctr">
+                      <a:solidFill>
+                        <a:schemeClr val="tx1"/>
+                      </a:solidFill>
+                      <a:prstDash val="solid"/>
+                      <a:round/>
+                      <a:headEnd type="none" w="med" len="med"/>
+                      <a:tailEnd type="none" w="med" len="med"/>
+                    </a:lnB>
+                    <a:solidFill>
+                      <a:schemeClr val="accent3">
+                        <a:lumMod val="60000"/>
+                        <a:lumOff val="40000"/>
+                      </a:schemeClr>
+                    </a:solidFill>
+                  </a:tcPr>
+                </a:tc>
+              </a:tr>
+              <a:tr h="312877">
+                <a:tc>
+                  <a:txBody>
+                    <a:bodyPr/>
+                    <a:lstStyle/>
+                    <a:p>
+                      <a:r>
+                        <a:rPr lang="en-US" sz="1400" dirty="0" smtClean="0"/>
+                        <a:t>applicationPackage.permission.C2D_MESSAGE</a:t>
+                      </a:r>
+                    </a:p>
+                  </a:txBody>
+                  <a:tcPr>
+                    <a:lnL w="12700" cap="flat" cmpd="sng" algn="ctr">
+                      <a:solidFill>
+                        <a:schemeClr val="tx1"/>
+                      </a:solidFill>
+                      <a:prstDash val="solid"/>
+                      <a:round/>
+                      <a:headEnd type="none" w="med" len="med"/>
+                      <a:tailEnd type="none" w="med" len="med"/>
+                    </a:lnL>
+                    <a:lnR w="12700" cap="flat" cmpd="sng" algn="ctr">
+                      <a:solidFill>
+                        <a:schemeClr val="tx1"/>
+                      </a:solidFill>
+                      <a:prstDash val="solid"/>
+                      <a:round/>
+                      <a:headEnd type="none" w="med" len="med"/>
+                      <a:tailEnd type="none" w="med" len="med"/>
+                    </a:lnR>
+                    <a:lnT w="12700" cap="flat" cmpd="sng" algn="ctr">
+                      <a:solidFill>
+                        <a:schemeClr val="tx1"/>
+                      </a:solidFill>
+                      <a:prstDash val="solid"/>
+                      <a:round/>
+                      <a:headEnd type="none" w="med" len="med"/>
+                      <a:tailEnd type="none" w="med" len="med"/>
+                    </a:lnT>
+                    <a:lnB w="12700" cap="flat" cmpd="sng" algn="ctr">
+                      <a:solidFill>
+                        <a:schemeClr val="tx1"/>
+                      </a:solidFill>
+                      <a:prstDash val="solid"/>
+                      <a:round/>
+                      <a:headEnd type="none" w="med" len="med"/>
+                      <a:tailEnd type="none" w="med" len="med"/>
+                    </a:lnB>
+                    <a:solidFill>
+                      <a:schemeClr val="accent3">
+                        <a:lumMod val="60000"/>
+                        <a:lumOff val="40000"/>
+                      </a:schemeClr>
+                    </a:solidFill>
+                  </a:tcPr>
+                </a:tc>
+                <a:tc>
+                  <a:txBody>
+                    <a:bodyPr/>
+                    <a:lstStyle/>
+                    <a:p>
+                      <a:r>
+                        <a:rPr lang="en-US" sz="1400" dirty="0" smtClean="0"/>
+                        <a:t>Prevent other apps from registering/receiving</a:t>
+                      </a:r>
+                      <a:r>
+                        <a:rPr lang="en-US" sz="1400" baseline="0" dirty="0" smtClean="0"/>
+                        <a:t> this app’s messages.</a:t>
+                      </a:r>
+                      <a:endParaRPr lang="en-US" sz="1400" dirty="0"/>
+                    </a:p>
+                  </a:txBody>
+                  <a:tcPr>
+                    <a:lnL w="12700" cap="flat" cmpd="sng" algn="ctr">
+                      <a:solidFill>
+                        <a:schemeClr val="tx1"/>
+                      </a:solidFill>
+                      <a:prstDash val="solid"/>
+                      <a:round/>
+                      <a:headEnd type="none" w="med" len="med"/>
+                      <a:tailEnd type="none" w="med" len="med"/>
+                    </a:lnL>
+                    <a:lnR w="12700" cap="flat" cmpd="sng" algn="ctr">
+                      <a:solidFill>
+                        <a:schemeClr val="tx1"/>
+                      </a:solidFill>
+                      <a:prstDash val="solid"/>
+                      <a:round/>
+                      <a:headEnd type="none" w="med" len="med"/>
+                      <a:tailEnd type="none" w="med" len="med"/>
+                    </a:lnR>
+                    <a:lnT w="12700" cap="flat" cmpd="sng" algn="ctr">
+                      <a:solidFill>
+                        <a:schemeClr val="tx1"/>
+                      </a:solidFill>
+                      <a:prstDash val="solid"/>
+                      <a:round/>
+                      <a:headEnd type="none" w="med" len="med"/>
+                      <a:tailEnd type="none" w="med" len="med"/>
+                    </a:lnT>
+                    <a:lnB w="12700" cap="flat" cmpd="sng" algn="ctr">
+                      <a:solidFill>
+                        <a:schemeClr val="tx1"/>
+                      </a:solidFill>
+                      <a:prstDash val="solid"/>
+                      <a:round/>
+                      <a:headEnd type="none" w="med" len="med"/>
+                      <a:tailEnd type="none" w="med" len="med"/>
+                    </a:lnB>
+                    <a:solidFill>
+                      <a:schemeClr val="accent3">
+                        <a:lumMod val="60000"/>
+                        <a:lumOff val="40000"/>
+                      </a:schemeClr>
+                    </a:solidFill>
+                  </a:tcPr>
+                </a:tc>
+              </a:tr>
+            </a:tbl>
+          </a:graphicData>
+        </a:graphic>
+      </p:graphicFrame>
+      <p:sp>
+        <p:nvSpPr>
+          <p:cNvPr id="6" name="Content Placeholder 2"/>
+          <p:cNvSpPr txBox="1">
+            <a:spLocks/>
+          </p:cNvSpPr>
+          <p:nvPr/>
+        </p:nvSpPr>
+        <p:spPr>
+          <a:xfrm>
+            <a:off x="457200" y="3657600"/>
+            <a:ext cx="8229600" cy="2286000"/>
+          </a:xfrm>
+          <a:prstGeom prst="rect">
+            <a:avLst/>
+          </a:prstGeom>
+        </p:spPr>
+        <p:txBody>
+          <a:bodyPr vert="horz" lIns="91440" tIns="45720" rIns="91440" bIns="45720" rtlCol="0">
+            <a:noAutofit/>
+          </a:bodyPr>
+          <a:lstStyle>
+            <a:lvl1pPr marL="342900" indent="-342900" algn="l" defTabSz="914400" rtl="0" eaLnBrk="1" latinLnBrk="0" hangingPunct="1">
+              <a:spcBef>
+                <a:spcPct val="20000"/>
+              </a:spcBef>
+              <a:buFont typeface="Arial" panose="020B0604020202020204" pitchFamily="34" charset="0"/>
+              <a:buChar char="•"/>
+              <a:defRPr sz="3200" kern="1200">
+                <a:solidFill>
+                  <a:schemeClr val="tx1"/>
+                </a:solidFill>
+                <a:latin typeface="+mn-lt"/>
+                <a:ea typeface="+mn-ea"/>
+                <a:cs typeface="+mn-cs"/>
+              </a:defRPr>
+            </a:lvl1pPr>
+            <a:lvl2pPr marL="742950" indent="-285750" algn="l" defTabSz="914400" rtl="0" eaLnBrk="1" latinLnBrk="0" hangingPunct="1">
+              <a:spcBef>
+                <a:spcPct val="20000"/>
+              </a:spcBef>
+              <a:buFont typeface="Arial" panose="020B0604020202020204" pitchFamily="34" charset="0"/>
+              <a:buChar char="–"/>
+              <a:defRPr sz="2800" kern="1200">
+                <a:solidFill>
+                  <a:schemeClr val="tx1"/>
+                </a:solidFill>
+                <a:latin typeface="+mn-lt"/>
+                <a:ea typeface="+mn-ea"/>
+                <a:cs typeface="+mn-cs"/>
+              </a:defRPr>
+            </a:lvl2pPr>
+            <a:lvl3pPr marL="1143000" indent="-228600" algn="l" defTabSz="914400" rtl="0" eaLnBrk="1" latinLnBrk="0" hangingPunct="1">
+              <a:spcBef>
+                <a:spcPct val="20000"/>
+              </a:spcBef>
+              <a:buFont typeface="Arial" panose="020B0604020202020204" pitchFamily="34" charset="0"/>
+              <a:buChar char="•"/>
+              <a:defRPr sz="2400" kern="1200">
+                <a:solidFill>
+                  <a:schemeClr val="tx1"/>
+                </a:solidFill>
+                <a:latin typeface="+mn-lt"/>
+                <a:ea typeface="+mn-ea"/>
+                <a:cs typeface="+mn-cs"/>
+              </a:defRPr>
+            </a:lvl3pPr>
+            <a:lvl4pPr marL="1600200" indent="-228600" algn="l" defTabSz="914400" rtl="0" eaLnBrk="1" latinLnBrk="0" hangingPunct="1">
+              <a:spcBef>
+                <a:spcPct val="20000"/>
+              </a:spcBef>
+              <a:buFont typeface="Arial" panose="020B0604020202020204" pitchFamily="34" charset="0"/>
+              <a:buChar char="–"/>
+              <a:defRPr sz="2000" kern="1200">
+                <a:solidFill>
+                  <a:schemeClr val="tx1"/>
+                </a:solidFill>
+                <a:latin typeface="+mn-lt"/>
+                <a:ea typeface="+mn-ea"/>
+                <a:cs typeface="+mn-cs"/>
+              </a:defRPr>
+            </a:lvl4pPr>
+            <a:lvl5pPr marL="2057400" indent="-228600" algn="l" defTabSz="914400" rtl="0" eaLnBrk="1" latinLnBrk="0" hangingPunct="1">
+              <a:spcBef>
+                <a:spcPct val="20000"/>
+              </a:spcBef>
+              <a:buFont typeface="Arial" panose="020B0604020202020204" pitchFamily="34" charset="0"/>
+              <a:buChar char="»"/>
+              <a:defRPr sz="2000" kern="1200">
+                <a:solidFill>
+                  <a:schemeClr val="tx1"/>
+                </a:solidFill>
+                <a:latin typeface="+mn-lt"/>
+                <a:ea typeface="+mn-ea"/>
+                <a:cs typeface="+mn-cs"/>
+              </a:defRPr>
+            </a:lvl5pPr>
+            <a:lvl6pPr marL="2514600" indent="-228600" algn="l" defTabSz="914400" rtl="0" eaLnBrk="1" latinLnBrk="0" hangingPunct="1">
+              <a:spcBef>
+                <a:spcPct val="20000"/>
+              </a:spcBef>
+              <a:buFont typeface="Arial" panose="020B0604020202020204" pitchFamily="34" charset="0"/>
+              <a:buChar char="•"/>
+              <a:defRPr sz="2000" kern="1200">
+                <a:solidFill>
+                  <a:schemeClr val="tx1"/>
+                </a:solidFill>
+                <a:latin typeface="+mn-lt"/>
+                <a:ea typeface="+mn-ea"/>
+                <a:cs typeface="+mn-cs"/>
+              </a:defRPr>
+            </a:lvl6pPr>
+            <a:lvl7pPr marL="2971800" indent="-228600" algn="l" defTabSz="914400" rtl="0" eaLnBrk="1" latinLnBrk="0" hangingPunct="1">
+              <a:spcBef>
+                <a:spcPct val="20000"/>
+              </a:spcBef>
+              <a:buFont typeface="Arial" panose="020B0604020202020204" pitchFamily="34" charset="0"/>
+              <a:buChar char="•"/>
+              <a:defRPr sz="2000" kern="1200">
+                <a:solidFill>
+                  <a:schemeClr val="tx1"/>
+                </a:solidFill>
+                <a:latin typeface="+mn-lt"/>
+                <a:ea typeface="+mn-ea"/>
+                <a:cs typeface="+mn-cs"/>
+              </a:defRPr>
+            </a:lvl7pPr>
+            <a:lvl8pPr marL="3429000" indent="-228600" algn="l" defTabSz="914400" rtl="0" eaLnBrk="1" latinLnBrk="0" hangingPunct="1">
+              <a:spcBef>
+                <a:spcPct val="20000"/>
+              </a:spcBef>
+              <a:buFont typeface="Arial" panose="020B0604020202020204" pitchFamily="34" charset="0"/>
+              <a:buChar char="•"/>
+              <a:defRPr sz="2000" kern="1200">
+                <a:solidFill>
+                  <a:schemeClr val="tx1"/>
+                </a:solidFill>
+                <a:latin typeface="+mn-lt"/>
+                <a:ea typeface="+mn-ea"/>
+                <a:cs typeface="+mn-cs"/>
+              </a:defRPr>
+            </a:lvl8pPr>
+            <a:lvl9pPr marL="3886200" indent="-228600" algn="l" defTabSz="914400" rtl="0" eaLnBrk="1" latinLnBrk="0" hangingPunct="1">
+              <a:spcBef>
+                <a:spcPct val="20000"/>
+              </a:spcBef>
+              <a:buFont typeface="Arial" panose="020B0604020202020204" pitchFamily="34" charset="0"/>
+              <a:buChar char="•"/>
+              <a:defRPr sz="2000" kern="1200">
+                <a:solidFill>
+                  <a:schemeClr val="tx1"/>
+                </a:solidFill>
+                <a:latin typeface="+mn-lt"/>
+                <a:ea typeface="+mn-ea"/>
+                <a:cs typeface="+mn-cs"/>
+              </a:defRPr>
+            </a:lvl9pPr>
+          </a:lstStyle>
+          <a:p>
+            <a:endParaRPr lang="en-US" sz="2400" dirty="0" smtClean="0"/>
+          </a:p>
+        </p:txBody>
+      </p:sp>
+      <p:sp>
+        <p:nvSpPr>
+          <p:cNvPr id="7" name="Rectangle 6"/>
+          <p:cNvSpPr/>
+          <p:nvPr/>
+        </p:nvSpPr>
+        <p:spPr>
+          <a:xfrm>
+            <a:off x="457200" y="3886200"/>
+            <a:ext cx="8144774" cy="1631216"/>
+          </a:xfrm>
+          <a:prstGeom prst="rect">
+            <a:avLst/>
+          </a:prstGeom>
+        </p:spPr>
+        <p:txBody>
+          <a:bodyPr wrap="square">
+            <a:spAutoFit/>
+          </a:bodyPr>
           <a:lstStyle/>
           <a:p>
-            <a:r>
-              <a:rPr lang="en-US" dirty="0" smtClean="0"/>
-              <a:t>Store data inside Intent extras</a:t>
-            </a:r>
-          </a:p>
-          <a:p>
-            <a:r>
-              <a:rPr lang="en-US" dirty="0" smtClean="0"/>
-              <a:t>Process data in two places</a:t>
-            </a:r>
-          </a:p>
-          <a:p>
-            <a:pPr lvl="1"/>
-            <a:r>
-              <a:rPr lang="en-US" dirty="0" smtClean="0"/>
-              <a:t>onCreate() if activity was destroyed / recreated</a:t>
-            </a:r>
-          </a:p>
-          <a:p>
-            <a:pPr lvl="1"/>
-            <a:r>
-              <a:rPr lang="en-US" dirty="0" smtClean="0"/>
-              <a:t>onNewIntent() if activity still exists</a:t>
-            </a:r>
-          </a:p>
-          <a:p>
-            <a:pPr lvl="2"/>
-            <a:r>
-              <a:rPr lang="en-US" dirty="0" smtClean="0"/>
-              <a:t>Requires Intent to </a:t>
-            </a:r>
-            <a:r>
-              <a:rPr lang="en-US" dirty="0"/>
-              <a:t>have </a:t>
-            </a:r>
-            <a:r>
-              <a:rPr lang="en-US" dirty="0" smtClean="0"/>
-              <a:t>FLAG_ACTIVITY_SINGLE_TOP flag to be set</a:t>
-            </a:r>
-          </a:p>
-          <a:p>
-            <a:r>
-              <a:rPr lang="en-US" dirty="0" smtClean="0"/>
-              <a:t> Code walkthrough</a:t>
-            </a:r>
-            <a:endParaRPr lang="en-US" dirty="0"/>
+            <a:pPr marL="342900" indent="-342900">
+              <a:buFont typeface="Arial" panose="020B0604020202020204" pitchFamily="34" charset="0"/>
+              <a:buChar char="•"/>
+            </a:pPr>
+            <a:r>
+              <a:rPr lang="en-US" sz="2000" dirty="0"/>
+              <a:t>Define Receiver for messages and registration ID</a:t>
+            </a:r>
+          </a:p>
+          <a:p>
+            <a:pPr marL="342900" indent="-342900">
+              <a:buFont typeface="Arial" panose="020B0604020202020204" pitchFamily="34" charset="0"/>
+              <a:buChar char="•"/>
+            </a:pPr>
+            <a:r>
+              <a:rPr lang="en-US" sz="2000" dirty="0"/>
+              <a:t>Define </a:t>
+            </a:r>
+            <a:r>
+              <a:rPr lang="en-US" sz="2000" dirty="0" err="1"/>
+              <a:t>IntentService</a:t>
+            </a:r>
+            <a:r>
+              <a:rPr lang="en-US" sz="2000" dirty="0"/>
+              <a:t> for processing notifications</a:t>
+            </a:r>
+          </a:p>
+          <a:p>
+            <a:pPr marL="342900" indent="-342900">
+              <a:buFont typeface="Arial" panose="020B0604020202020204" pitchFamily="34" charset="0"/>
+              <a:buChar char="•"/>
+            </a:pPr>
+            <a:r>
+              <a:rPr lang="en-US" sz="2000" dirty="0"/>
+              <a:t>See </a:t>
+            </a:r>
+            <a:r>
+              <a:rPr lang="en-US" sz="2000" dirty="0">
+                <a:hlinkClick r:id="rId2"/>
+              </a:rPr>
+              <a:t>http://</a:t>
+            </a:r>
+            <a:r>
+              <a:rPr lang="en-US" sz="2000" dirty="0" smtClean="0">
+                <a:hlinkClick r:id="rId2"/>
+              </a:rPr>
+              <a:t>developer.android.com/google/gcm/client.html#manifest</a:t>
+            </a:r>
+            <a:r>
+              <a:rPr lang="en-US" sz="2000" dirty="0" smtClean="0"/>
+              <a:t/>
+            </a:r>
+            <a:br>
+              <a:rPr lang="en-US" sz="2000" dirty="0" smtClean="0"/>
+            </a:br>
+            <a:r>
+              <a:rPr lang="en-US" sz="2000" dirty="0" smtClean="0"/>
+              <a:t>for </a:t>
+            </a:r>
+            <a:r>
+              <a:rPr lang="en-US" sz="2000" dirty="0"/>
+              <a:t>additional details</a:t>
+            </a:r>
+          </a:p>
+          <a:p>
+            <a:pPr marL="342900" indent="-342900">
+              <a:buFont typeface="Arial" panose="020B0604020202020204" pitchFamily="34" charset="0"/>
+              <a:buChar char="•"/>
+            </a:pPr>
+            <a:r>
+              <a:rPr lang="en-US" sz="2000" dirty="0"/>
+              <a:t>Code walkthrough</a:t>
+            </a:r>
           </a:p>
         </p:txBody>
       </p:sp>
     </p:spTree>
     <p:extLst>
       <p:ext uri="{BB962C8B-B14F-4D97-AF65-F5344CB8AC3E}">
-        <p14:creationId xmlns:p14="http://schemas.microsoft.com/office/powerpoint/2010/main" val="504142742"/>
+        <p14:creationId xmlns:p14="http://schemas.microsoft.com/office/powerpoint/2010/main" val="1627020553"/>
       </p:ext>
     </p:extLst>
   </p:cSld>
@@ -5879,65 +6804,96 @@
           <a:p>
             <a:r>
               <a:rPr lang="en-US" dirty="0" smtClean="0"/>
-              <a:t>Update the App's </a:t>
-            </a:r>
+              <a:t>Testing Without a Server</a:t>
+            </a:r>
+            <a:endParaRPr lang="en-US" dirty="0"/>
+          </a:p>
+        </p:txBody>
+      </p:sp>
+      <p:sp>
+        <p:nvSpPr>
+          <p:cNvPr id="3" name="Content Placeholder 2"/>
+          <p:cNvSpPr>
+            <a:spLocks noGrp="1"/>
+          </p:cNvSpPr>
+          <p:nvPr>
+            <p:ph idx="1"/>
+          </p:nvPr>
+        </p:nvSpPr>
+        <p:spPr/>
+        <p:txBody>
+          <a:bodyPr/>
+          <a:lstStyle/>
+          <a:p>
+            <a:r>
+              <a:rPr lang="en-US" dirty="0" smtClean="0"/>
+              <a:t>Server implementation not required</a:t>
+            </a:r>
+          </a:p>
+          <a:p>
+            <a:r>
+              <a:rPr lang="en-US" dirty="0" smtClean="0"/>
+              <a:t>Any tool capable of sending HTTPS POST requests will work</a:t>
+            </a:r>
+          </a:p>
+          <a:p>
+            <a:pPr lvl="1"/>
+            <a:r>
+              <a:rPr lang="en-US" dirty="0" smtClean="0"/>
+              <a:t>Examples:</a:t>
+            </a:r>
+          </a:p>
+          <a:p>
+            <a:pPr lvl="2"/>
+            <a:r>
+              <a:rPr lang="en-US" dirty="0" smtClean="0"/>
+              <a:t>curl</a:t>
+            </a:r>
+          </a:p>
+          <a:p>
+            <a:pPr lvl="2"/>
             <a:r>
               <a:rPr lang="en-US" dirty="0"/>
-              <a:t>Manifest</a:t>
-            </a:r>
-          </a:p>
-        </p:txBody>
-      </p:sp>
-      <p:sp>
-        <p:nvSpPr>
-          <p:cNvPr id="3" name="Content Placeholder 2"/>
-          <p:cNvSpPr>
-            <a:spLocks noGrp="1"/>
-          </p:cNvSpPr>
-          <p:nvPr>
-            <p:ph idx="1"/>
-          </p:nvPr>
-        </p:nvSpPr>
-        <p:spPr/>
-        <p:txBody>
-          <a:bodyPr>
-            <a:normAutofit/>
-          </a:bodyPr>
-          <a:lstStyle/>
-          <a:p>
-            <a:r>
-              <a:rPr lang="en-US" sz="2800" dirty="0" smtClean="0"/>
-              <a:t>Define Receiver for messages and registration ID</a:t>
-            </a:r>
-          </a:p>
-          <a:p>
-            <a:r>
-              <a:rPr lang="en-US" sz="2800" dirty="0" smtClean="0"/>
-              <a:t>Define IntentService for processing notifications</a:t>
-            </a:r>
-          </a:p>
-          <a:p>
-            <a:r>
-              <a:rPr lang="en-US" sz="2800" dirty="0" smtClean="0"/>
-              <a:t>See </a:t>
-            </a:r>
-            <a:r>
-              <a:rPr lang="en-US" sz="2800" dirty="0"/>
-              <a:t>http://developer.android.com/google/gcm/client.html#manifest for additional details</a:t>
-            </a:r>
-          </a:p>
-          <a:p>
-            <a:r>
-              <a:rPr lang="en-US" sz="2800" dirty="0" smtClean="0"/>
-              <a:t>Code walkthrough</a:t>
-            </a:r>
+              <a:t>Hurl.it -</a:t>
+            </a:r>
+            <a:r>
+              <a:rPr lang="en-US" dirty="0" smtClean="0"/>
+              <a:t> http</a:t>
+            </a:r>
+            <a:r>
+              <a:rPr lang="en-US" dirty="0"/>
+              <a:t>://www.hurl.it</a:t>
+            </a:r>
+            <a:r>
+              <a:rPr lang="en-US" dirty="0" smtClean="0"/>
+              <a:t>/</a:t>
+            </a:r>
+          </a:p>
+          <a:p>
+            <a:pPr lvl="2"/>
+            <a:r>
+              <a:rPr lang="en-US" dirty="0" smtClean="0"/>
+              <a:t>Dev HTTP Client  - Google Chrome </a:t>
+            </a:r>
+            <a:r>
+              <a:rPr lang="en-US" dirty="0" smtClean="0"/>
+              <a:t>App</a:t>
+            </a:r>
+            <a:endParaRPr lang="en-US" dirty="0" smtClean="0"/>
+          </a:p>
+          <a:p>
+            <a:pPr lvl="2"/>
+            <a:endParaRPr lang="en-US" dirty="0" smtClean="0"/>
+          </a:p>
+          <a:p>
+            <a:endParaRPr lang="en-US" dirty="0"/>
           </a:p>
         </p:txBody>
       </p:sp>
     </p:spTree>
     <p:extLst>
       <p:ext uri="{BB962C8B-B14F-4D97-AF65-F5344CB8AC3E}">
-        <p14:creationId xmlns:p14="http://schemas.microsoft.com/office/powerpoint/2010/main" val="1627020553"/>
+        <p14:creationId xmlns:p14="http://schemas.microsoft.com/office/powerpoint/2010/main" val="327509647"/>
       </p:ext>
     </p:extLst>
   </p:cSld>
@@ -5981,7 +6937,7 @@
           <a:p>
             <a:r>
               <a:rPr lang="en-US" dirty="0" smtClean="0"/>
-              <a:t>Testing Without a Server</a:t>
+              <a:t>Test API Key and Registration ID</a:t>
             </a:r>
             <a:endParaRPr lang="en-US" dirty="0"/>
           </a:p>
@@ -5997,81 +6953,922 @@
             <p:ph idx="1"/>
           </p:nvPr>
         </p:nvSpPr>
-        <p:spPr/>
-        <p:txBody>
-          <a:bodyPr/>
+        <p:spPr>
+          <a:xfrm>
+            <a:off x="457200" y="1600200"/>
+            <a:ext cx="8229600" cy="496669"/>
+          </a:xfrm>
+        </p:spPr>
+        <p:txBody>
+          <a:bodyPr>
+            <a:normAutofit/>
+          </a:bodyPr>
           <a:lstStyle/>
           <a:p>
-            <a:r>
-              <a:rPr lang="en-US" dirty="0" smtClean="0"/>
-              <a:t>Server implementation not required</a:t>
-            </a:r>
-          </a:p>
-          <a:p>
-            <a:r>
-              <a:rPr lang="en-US" dirty="0" smtClean="0"/>
-              <a:t>Any tool capable of sending HTTPS POST requests will work</a:t>
-            </a:r>
-          </a:p>
-          <a:p>
-            <a:pPr lvl="1"/>
-            <a:r>
-              <a:rPr lang="en-US" dirty="0" smtClean="0"/>
-              <a:t>Examples:</a:t>
-            </a:r>
-          </a:p>
-          <a:p>
-            <a:pPr lvl="2"/>
-            <a:r>
-              <a:rPr lang="en-US" dirty="0" smtClean="0"/>
-              <a:t>curl</a:t>
-            </a:r>
-          </a:p>
-          <a:p>
-            <a:pPr lvl="2"/>
-            <a:r>
-              <a:rPr lang="en-US" dirty="0"/>
-              <a:t>Hurl.it -</a:t>
-            </a:r>
-            <a:r>
-              <a:rPr lang="en-US" dirty="0" smtClean="0"/>
-              <a:t> http</a:t>
-            </a:r>
-            <a:r>
-              <a:rPr lang="en-US" dirty="0"/>
-              <a:t>://www.hurl.it</a:t>
-            </a:r>
-            <a:r>
-              <a:rPr lang="en-US" dirty="0" smtClean="0"/>
+            <a:pPr marL="0" indent="0">
+              <a:buNone/>
+            </a:pPr>
+            <a:r>
+              <a:rPr lang="en-US" sz="2400" dirty="0"/>
+              <a:t>Run this command, all on one line</a:t>
+            </a:r>
+            <a:endParaRPr lang="en-US" sz="2400" dirty="0"/>
+          </a:p>
+        </p:txBody>
+      </p:sp>
+      <p:sp>
+        <p:nvSpPr>
+          <p:cNvPr id="5" name="TextBox 4"/>
+          <p:cNvSpPr txBox="1"/>
+          <p:nvPr/>
+        </p:nvSpPr>
+        <p:spPr>
+          <a:xfrm>
+            <a:off x="451449" y="2068658"/>
+            <a:ext cx="8229600" cy="646331"/>
+          </a:xfrm>
+          <a:prstGeom prst="rect">
+            <a:avLst/>
+          </a:prstGeom>
+          <a:solidFill>
+            <a:schemeClr val="bg1">
+              <a:lumMod val="85000"/>
+            </a:schemeClr>
+          </a:solidFill>
+          <a:ln>
+            <a:solidFill>
+              <a:schemeClr val="tx1"/>
+            </a:solidFill>
+          </a:ln>
+        </p:spPr>
+        <p:txBody>
+          <a:bodyPr wrap="square" rtlCol="0">
+            <a:spAutoFit/>
+          </a:bodyPr>
+          <a:lstStyle/>
+          <a:p>
+            <a:r>
+              <a:rPr lang="en-US" sz="1200" dirty="0">
+                <a:latin typeface="Courier"/>
+                <a:cs typeface="Courier"/>
+              </a:rPr>
+              <a:t>curl --header "Authorization: key=&lt;API Key&gt;" --header </a:t>
+            </a:r>
+            <a:r>
+              <a:rPr lang="en-US" sz="1200" dirty="0" err="1">
+                <a:latin typeface="Courier"/>
+                <a:cs typeface="Courier"/>
+              </a:rPr>
+              <a:t>Content-Type:"application</a:t>
+            </a:r>
+            <a:r>
+              <a:rPr lang="en-US" sz="1200" dirty="0">
+                <a:latin typeface="Courier"/>
+                <a:cs typeface="Courier"/>
+              </a:rPr>
               <a:t>/</a:t>
             </a:r>
-          </a:p>
-          <a:p>
-            <a:pPr lvl="2"/>
-            <a:r>
-              <a:rPr lang="en-US" dirty="0" smtClean="0"/>
-              <a:t>Dev HTTP Client  - Google Chrome App</a:t>
-            </a:r>
-          </a:p>
-          <a:p>
-            <a:r>
-              <a:rPr lang="en-US" dirty="0" smtClean="0"/>
+            <a:r>
+              <a:rPr lang="en-US" sz="1200" dirty="0" err="1">
+                <a:latin typeface="Courier"/>
+                <a:cs typeface="Courier"/>
+              </a:rPr>
+              <a:t>json</a:t>
+            </a:r>
+            <a:r>
+              <a:rPr lang="en-US" sz="1200" dirty="0">
+                <a:latin typeface="Courier"/>
+                <a:cs typeface="Courier"/>
+              </a:rPr>
+              <a:t>" https://android.googleapis.com/gcm/send  -d "{\"</a:t>
+            </a:r>
+            <a:r>
+              <a:rPr lang="en-US" sz="1200" dirty="0" err="1">
+                <a:latin typeface="Courier"/>
+                <a:cs typeface="Courier"/>
+              </a:rPr>
+              <a:t>registration_ids</a:t>
+            </a:r>
+            <a:r>
+              <a:rPr lang="en-US" sz="1200" dirty="0">
+                <a:latin typeface="Courier"/>
+                <a:cs typeface="Courier"/>
+              </a:rPr>
+              <a:t>\":[\"&lt;Registration ID</a:t>
+            </a:r>
+            <a:r>
+              <a:rPr lang="en-US" sz="1200" dirty="0" smtClean="0">
+                <a:latin typeface="Courier"/>
+                <a:cs typeface="Courier"/>
+              </a:rPr>
+              <a:t>&gt;\"]}"</a:t>
+            </a:r>
+            <a:endParaRPr lang="en-US" sz="1200" dirty="0">
+              <a:latin typeface="Courier"/>
+              <a:cs typeface="Courier"/>
+            </a:endParaRPr>
+          </a:p>
+        </p:txBody>
+      </p:sp>
+      <p:sp>
+        <p:nvSpPr>
+          <p:cNvPr id="6" name="TextBox 5"/>
+          <p:cNvSpPr txBox="1"/>
+          <p:nvPr/>
+        </p:nvSpPr>
+        <p:spPr>
+          <a:xfrm>
+            <a:off x="451449" y="3326875"/>
+            <a:ext cx="8229600" cy="461665"/>
+          </a:xfrm>
+          <a:prstGeom prst="rect">
+            <a:avLst/>
+          </a:prstGeom>
+          <a:solidFill>
+            <a:schemeClr val="bg1">
+              <a:lumMod val="85000"/>
+            </a:schemeClr>
+          </a:solidFill>
+          <a:ln>
+            <a:solidFill>
+              <a:schemeClr val="tx1"/>
+            </a:solidFill>
+          </a:ln>
+        </p:spPr>
+        <p:txBody>
+          <a:bodyPr wrap="square" rtlCol="0">
+            <a:spAutoFit/>
+          </a:bodyPr>
+          <a:lstStyle/>
+          <a:p>
+            <a:r>
+              <a:rPr lang="en-US" sz="1200" dirty="0">
+                <a:latin typeface="Courier"/>
+                <a:cs typeface="Courier"/>
+              </a:rPr>
+              <a:t>{"multicast_id":7234249251933638557,"success":1,"failure":0,"canonical_ids":0,"results":[{"message_id":"0:1397573613153828%b1013b1cf9fd7ecd</a:t>
+            </a:r>
+            <a:r>
+              <a:rPr lang="en-US" sz="1200" dirty="0" smtClean="0">
+                <a:latin typeface="Courier"/>
+                <a:cs typeface="Courier"/>
+              </a:rPr>
+              <a:t>"}]}</a:t>
+            </a:r>
+            <a:endParaRPr lang="en-US" sz="1200" dirty="0">
+              <a:latin typeface="Courier"/>
+              <a:cs typeface="Courier"/>
+            </a:endParaRPr>
+          </a:p>
+        </p:txBody>
+      </p:sp>
+      <p:sp>
+        <p:nvSpPr>
+          <p:cNvPr id="7" name="TextBox 6"/>
+          <p:cNvSpPr txBox="1"/>
+          <p:nvPr/>
+        </p:nvSpPr>
+        <p:spPr>
+          <a:xfrm>
+            <a:off x="460075" y="4801409"/>
+            <a:ext cx="8229600" cy="276999"/>
+          </a:xfrm>
+          <a:prstGeom prst="rect">
+            <a:avLst/>
+          </a:prstGeom>
+          <a:solidFill>
+            <a:schemeClr val="bg1">
+              <a:lumMod val="85000"/>
+            </a:schemeClr>
+          </a:solidFill>
+          <a:ln>
+            <a:solidFill>
+              <a:schemeClr val="tx1"/>
+            </a:solidFill>
+          </a:ln>
+        </p:spPr>
+        <p:txBody>
+          <a:bodyPr wrap="square" rtlCol="0">
+            <a:spAutoFit/>
+          </a:bodyPr>
+          <a:lstStyle/>
+          <a:p>
+            <a:r>
+              <a:rPr lang="en-US" sz="1200" dirty="0">
+                <a:latin typeface="Courier"/>
+                <a:cs typeface="Courier"/>
+              </a:rPr>
+              <a:t>"failure":1, results":[{"error":"</a:t>
+            </a:r>
+            <a:r>
+              <a:rPr lang="en-US" sz="1200" dirty="0" err="1">
+                <a:latin typeface="Courier"/>
+                <a:cs typeface="Courier"/>
+              </a:rPr>
+              <a:t>InvalidRegistration</a:t>
+            </a:r>
+            <a:r>
+              <a:rPr lang="en-US" sz="1200" dirty="0" smtClean="0">
+                <a:latin typeface="Courier"/>
+                <a:cs typeface="Courier"/>
+              </a:rPr>
+              <a:t>"}]</a:t>
+            </a:r>
+            <a:endParaRPr lang="en-US" sz="1200" dirty="0">
+              <a:latin typeface="Courier"/>
+              <a:cs typeface="Courier"/>
+            </a:endParaRPr>
+          </a:p>
+        </p:txBody>
+      </p:sp>
+      <p:sp>
+        <p:nvSpPr>
+          <p:cNvPr id="8" name="Content Placeholder 2"/>
+          <p:cNvSpPr txBox="1">
+            <a:spLocks/>
+          </p:cNvSpPr>
+          <p:nvPr/>
+        </p:nvSpPr>
+        <p:spPr>
+          <a:xfrm>
+            <a:off x="451449" y="2817266"/>
+            <a:ext cx="8229600" cy="496669"/>
+          </a:xfrm>
+          <a:prstGeom prst="rect">
+            <a:avLst/>
+          </a:prstGeom>
+        </p:spPr>
+        <p:txBody>
+          <a:bodyPr vert="horz" lIns="91440" tIns="45720" rIns="91440" bIns="45720" rtlCol="0">
+            <a:normAutofit/>
+          </a:bodyPr>
+          <a:lstStyle>
+            <a:lvl1pPr marL="342900" indent="-342900" algn="l" defTabSz="914400" rtl="0" eaLnBrk="1" latinLnBrk="0" hangingPunct="1">
+              <a:spcBef>
+                <a:spcPct val="20000"/>
+              </a:spcBef>
+              <a:buFont typeface="Arial" panose="020B0604020202020204" pitchFamily="34" charset="0"/>
+              <a:buChar char="•"/>
+              <a:defRPr sz="3200" kern="1200">
+                <a:solidFill>
+                  <a:schemeClr val="tx1"/>
+                </a:solidFill>
+                <a:latin typeface="+mn-lt"/>
+                <a:ea typeface="+mn-ea"/>
+                <a:cs typeface="+mn-cs"/>
+              </a:defRPr>
+            </a:lvl1pPr>
+            <a:lvl2pPr marL="742950" indent="-285750" algn="l" defTabSz="914400" rtl="0" eaLnBrk="1" latinLnBrk="0" hangingPunct="1">
+              <a:spcBef>
+                <a:spcPct val="20000"/>
+              </a:spcBef>
+              <a:buFont typeface="Arial" panose="020B0604020202020204" pitchFamily="34" charset="0"/>
+              <a:buChar char="–"/>
+              <a:defRPr sz="2800" kern="1200">
+                <a:solidFill>
+                  <a:schemeClr val="tx1"/>
+                </a:solidFill>
+                <a:latin typeface="+mn-lt"/>
+                <a:ea typeface="+mn-ea"/>
+                <a:cs typeface="+mn-cs"/>
+              </a:defRPr>
+            </a:lvl2pPr>
+            <a:lvl3pPr marL="1143000" indent="-228600" algn="l" defTabSz="914400" rtl="0" eaLnBrk="1" latinLnBrk="0" hangingPunct="1">
+              <a:spcBef>
+                <a:spcPct val="20000"/>
+              </a:spcBef>
+              <a:buFont typeface="Arial" panose="020B0604020202020204" pitchFamily="34" charset="0"/>
+              <a:buChar char="•"/>
+              <a:defRPr sz="2400" kern="1200">
+                <a:solidFill>
+                  <a:schemeClr val="tx1"/>
+                </a:solidFill>
+                <a:latin typeface="+mn-lt"/>
+                <a:ea typeface="+mn-ea"/>
+                <a:cs typeface="+mn-cs"/>
+              </a:defRPr>
+            </a:lvl3pPr>
+            <a:lvl4pPr marL="1600200" indent="-228600" algn="l" defTabSz="914400" rtl="0" eaLnBrk="1" latinLnBrk="0" hangingPunct="1">
+              <a:spcBef>
+                <a:spcPct val="20000"/>
+              </a:spcBef>
+              <a:buFont typeface="Arial" panose="020B0604020202020204" pitchFamily="34" charset="0"/>
+              <a:buChar char="–"/>
+              <a:defRPr sz="2000" kern="1200">
+                <a:solidFill>
+                  <a:schemeClr val="tx1"/>
+                </a:solidFill>
+                <a:latin typeface="+mn-lt"/>
+                <a:ea typeface="+mn-ea"/>
+                <a:cs typeface="+mn-cs"/>
+              </a:defRPr>
+            </a:lvl4pPr>
+            <a:lvl5pPr marL="2057400" indent="-228600" algn="l" defTabSz="914400" rtl="0" eaLnBrk="1" latinLnBrk="0" hangingPunct="1">
+              <a:spcBef>
+                <a:spcPct val="20000"/>
+              </a:spcBef>
+              <a:buFont typeface="Arial" panose="020B0604020202020204" pitchFamily="34" charset="0"/>
+              <a:buChar char="»"/>
+              <a:defRPr sz="2000" kern="1200">
+                <a:solidFill>
+                  <a:schemeClr val="tx1"/>
+                </a:solidFill>
+                <a:latin typeface="+mn-lt"/>
+                <a:ea typeface="+mn-ea"/>
+                <a:cs typeface="+mn-cs"/>
+              </a:defRPr>
+            </a:lvl5pPr>
+            <a:lvl6pPr marL="2514600" indent="-228600" algn="l" defTabSz="914400" rtl="0" eaLnBrk="1" latinLnBrk="0" hangingPunct="1">
+              <a:spcBef>
+                <a:spcPct val="20000"/>
+              </a:spcBef>
+              <a:buFont typeface="Arial" panose="020B0604020202020204" pitchFamily="34" charset="0"/>
+              <a:buChar char="•"/>
+              <a:defRPr sz="2000" kern="1200">
+                <a:solidFill>
+                  <a:schemeClr val="tx1"/>
+                </a:solidFill>
+                <a:latin typeface="+mn-lt"/>
+                <a:ea typeface="+mn-ea"/>
+                <a:cs typeface="+mn-cs"/>
+              </a:defRPr>
+            </a:lvl6pPr>
+            <a:lvl7pPr marL="2971800" indent="-228600" algn="l" defTabSz="914400" rtl="0" eaLnBrk="1" latinLnBrk="0" hangingPunct="1">
+              <a:spcBef>
+                <a:spcPct val="20000"/>
+              </a:spcBef>
+              <a:buFont typeface="Arial" panose="020B0604020202020204" pitchFamily="34" charset="0"/>
+              <a:buChar char="•"/>
+              <a:defRPr sz="2000" kern="1200">
+                <a:solidFill>
+                  <a:schemeClr val="tx1"/>
+                </a:solidFill>
+                <a:latin typeface="+mn-lt"/>
+                <a:ea typeface="+mn-ea"/>
+                <a:cs typeface="+mn-cs"/>
+              </a:defRPr>
+            </a:lvl7pPr>
+            <a:lvl8pPr marL="3429000" indent="-228600" algn="l" defTabSz="914400" rtl="0" eaLnBrk="1" latinLnBrk="0" hangingPunct="1">
+              <a:spcBef>
+                <a:spcPct val="20000"/>
+              </a:spcBef>
+              <a:buFont typeface="Arial" panose="020B0604020202020204" pitchFamily="34" charset="0"/>
+              <a:buChar char="•"/>
+              <a:defRPr sz="2000" kern="1200">
+                <a:solidFill>
+                  <a:schemeClr val="tx1"/>
+                </a:solidFill>
+                <a:latin typeface="+mn-lt"/>
+                <a:ea typeface="+mn-ea"/>
+                <a:cs typeface="+mn-cs"/>
+              </a:defRPr>
+            </a:lvl8pPr>
+            <a:lvl9pPr marL="3886200" indent="-228600" algn="l" defTabSz="914400" rtl="0" eaLnBrk="1" latinLnBrk="0" hangingPunct="1">
+              <a:spcBef>
+                <a:spcPct val="20000"/>
+              </a:spcBef>
+              <a:buFont typeface="Arial" panose="020B0604020202020204" pitchFamily="34" charset="0"/>
+              <a:buChar char="•"/>
+              <a:defRPr sz="2000" kern="1200">
+                <a:solidFill>
+                  <a:schemeClr val="tx1"/>
+                </a:solidFill>
+                <a:latin typeface="+mn-lt"/>
+                <a:ea typeface="+mn-ea"/>
+                <a:cs typeface="+mn-cs"/>
+              </a:defRPr>
+            </a:lvl9pPr>
+          </a:lstStyle>
+          <a:p>
+            <a:pPr marL="0" indent="0">
+              <a:buFont typeface="Arial" panose="020B0604020202020204" pitchFamily="34" charset="0"/>
+              <a:buNone/>
+            </a:pPr>
+            <a:r>
+              <a:rPr lang="en-US" sz="2400" dirty="0" smtClean="0"/>
+              <a:t>Valid server API key and device registration ID returns:</a:t>
+            </a:r>
+            <a:endParaRPr lang="en-US" sz="2400" dirty="0"/>
+          </a:p>
+        </p:txBody>
+      </p:sp>
+      <p:sp>
+        <p:nvSpPr>
+          <p:cNvPr id="9" name="Content Placeholder 2"/>
+          <p:cNvSpPr txBox="1">
+            <a:spLocks/>
+          </p:cNvSpPr>
+          <p:nvPr/>
+        </p:nvSpPr>
+        <p:spPr>
+          <a:xfrm>
+            <a:off x="451449" y="3804726"/>
+            <a:ext cx="8229600" cy="496669"/>
+          </a:xfrm>
+          <a:prstGeom prst="rect">
+            <a:avLst/>
+          </a:prstGeom>
+        </p:spPr>
+        <p:txBody>
+          <a:bodyPr vert="horz" lIns="91440" tIns="45720" rIns="91440" bIns="45720" rtlCol="0">
+            <a:normAutofit/>
+          </a:bodyPr>
+          <a:lstStyle>
+            <a:lvl1pPr marL="342900" indent="-342900" algn="l" defTabSz="914400" rtl="0" eaLnBrk="1" latinLnBrk="0" hangingPunct="1">
+              <a:spcBef>
+                <a:spcPct val="20000"/>
+              </a:spcBef>
+              <a:buFont typeface="Arial" panose="020B0604020202020204" pitchFamily="34" charset="0"/>
+              <a:buChar char="•"/>
+              <a:defRPr sz="3200" kern="1200">
+                <a:solidFill>
+                  <a:schemeClr val="tx1"/>
+                </a:solidFill>
+                <a:latin typeface="+mn-lt"/>
+                <a:ea typeface="+mn-ea"/>
+                <a:cs typeface="+mn-cs"/>
+              </a:defRPr>
+            </a:lvl1pPr>
+            <a:lvl2pPr marL="742950" indent="-285750" algn="l" defTabSz="914400" rtl="0" eaLnBrk="1" latinLnBrk="0" hangingPunct="1">
+              <a:spcBef>
+                <a:spcPct val="20000"/>
+              </a:spcBef>
+              <a:buFont typeface="Arial" panose="020B0604020202020204" pitchFamily="34" charset="0"/>
+              <a:buChar char="–"/>
+              <a:defRPr sz="2800" kern="1200">
+                <a:solidFill>
+                  <a:schemeClr val="tx1"/>
+                </a:solidFill>
+                <a:latin typeface="+mn-lt"/>
+                <a:ea typeface="+mn-ea"/>
+                <a:cs typeface="+mn-cs"/>
+              </a:defRPr>
+            </a:lvl2pPr>
+            <a:lvl3pPr marL="1143000" indent="-228600" algn="l" defTabSz="914400" rtl="0" eaLnBrk="1" latinLnBrk="0" hangingPunct="1">
+              <a:spcBef>
+                <a:spcPct val="20000"/>
+              </a:spcBef>
+              <a:buFont typeface="Arial" panose="020B0604020202020204" pitchFamily="34" charset="0"/>
+              <a:buChar char="•"/>
+              <a:defRPr sz="2400" kern="1200">
+                <a:solidFill>
+                  <a:schemeClr val="tx1"/>
+                </a:solidFill>
+                <a:latin typeface="+mn-lt"/>
+                <a:ea typeface="+mn-ea"/>
+                <a:cs typeface="+mn-cs"/>
+              </a:defRPr>
+            </a:lvl3pPr>
+            <a:lvl4pPr marL="1600200" indent="-228600" algn="l" defTabSz="914400" rtl="0" eaLnBrk="1" latinLnBrk="0" hangingPunct="1">
+              <a:spcBef>
+                <a:spcPct val="20000"/>
+              </a:spcBef>
+              <a:buFont typeface="Arial" panose="020B0604020202020204" pitchFamily="34" charset="0"/>
+              <a:buChar char="–"/>
+              <a:defRPr sz="2000" kern="1200">
+                <a:solidFill>
+                  <a:schemeClr val="tx1"/>
+                </a:solidFill>
+                <a:latin typeface="+mn-lt"/>
+                <a:ea typeface="+mn-ea"/>
+                <a:cs typeface="+mn-cs"/>
+              </a:defRPr>
+            </a:lvl4pPr>
+            <a:lvl5pPr marL="2057400" indent="-228600" algn="l" defTabSz="914400" rtl="0" eaLnBrk="1" latinLnBrk="0" hangingPunct="1">
+              <a:spcBef>
+                <a:spcPct val="20000"/>
+              </a:spcBef>
+              <a:buFont typeface="Arial" panose="020B0604020202020204" pitchFamily="34" charset="0"/>
+              <a:buChar char="»"/>
+              <a:defRPr sz="2000" kern="1200">
+                <a:solidFill>
+                  <a:schemeClr val="tx1"/>
+                </a:solidFill>
+                <a:latin typeface="+mn-lt"/>
+                <a:ea typeface="+mn-ea"/>
+                <a:cs typeface="+mn-cs"/>
+              </a:defRPr>
+            </a:lvl5pPr>
+            <a:lvl6pPr marL="2514600" indent="-228600" algn="l" defTabSz="914400" rtl="0" eaLnBrk="1" latinLnBrk="0" hangingPunct="1">
+              <a:spcBef>
+                <a:spcPct val="20000"/>
+              </a:spcBef>
+              <a:buFont typeface="Arial" panose="020B0604020202020204" pitchFamily="34" charset="0"/>
+              <a:buChar char="•"/>
+              <a:defRPr sz="2000" kern="1200">
+                <a:solidFill>
+                  <a:schemeClr val="tx1"/>
+                </a:solidFill>
+                <a:latin typeface="+mn-lt"/>
+                <a:ea typeface="+mn-ea"/>
+                <a:cs typeface="+mn-cs"/>
+              </a:defRPr>
+            </a:lvl6pPr>
+            <a:lvl7pPr marL="2971800" indent="-228600" algn="l" defTabSz="914400" rtl="0" eaLnBrk="1" latinLnBrk="0" hangingPunct="1">
+              <a:spcBef>
+                <a:spcPct val="20000"/>
+              </a:spcBef>
+              <a:buFont typeface="Arial" panose="020B0604020202020204" pitchFamily="34" charset="0"/>
+              <a:buChar char="•"/>
+              <a:defRPr sz="2000" kern="1200">
+                <a:solidFill>
+                  <a:schemeClr val="tx1"/>
+                </a:solidFill>
+                <a:latin typeface="+mn-lt"/>
+                <a:ea typeface="+mn-ea"/>
+                <a:cs typeface="+mn-cs"/>
+              </a:defRPr>
+            </a:lvl7pPr>
+            <a:lvl8pPr marL="3429000" indent="-228600" algn="l" defTabSz="914400" rtl="0" eaLnBrk="1" latinLnBrk="0" hangingPunct="1">
+              <a:spcBef>
+                <a:spcPct val="20000"/>
+              </a:spcBef>
+              <a:buFont typeface="Arial" panose="020B0604020202020204" pitchFamily="34" charset="0"/>
+              <a:buChar char="•"/>
+              <a:defRPr sz="2000" kern="1200">
+                <a:solidFill>
+                  <a:schemeClr val="tx1"/>
+                </a:solidFill>
+                <a:latin typeface="+mn-lt"/>
+                <a:ea typeface="+mn-ea"/>
+                <a:cs typeface="+mn-cs"/>
+              </a:defRPr>
+            </a:lvl8pPr>
+            <a:lvl9pPr marL="3886200" indent="-228600" algn="l" defTabSz="914400" rtl="0" eaLnBrk="1" latinLnBrk="0" hangingPunct="1">
+              <a:spcBef>
+                <a:spcPct val="20000"/>
+              </a:spcBef>
+              <a:buFont typeface="Arial" panose="020B0604020202020204" pitchFamily="34" charset="0"/>
+              <a:buChar char="•"/>
+              <a:defRPr sz="2000" kern="1200">
+                <a:solidFill>
+                  <a:schemeClr val="tx1"/>
+                </a:solidFill>
+                <a:latin typeface="+mn-lt"/>
+                <a:ea typeface="+mn-ea"/>
+                <a:cs typeface="+mn-cs"/>
+              </a:defRPr>
+            </a:lvl9pPr>
+          </a:lstStyle>
+          <a:p>
+            <a:pPr marL="0" indent="0">
+              <a:buFont typeface="Arial" panose="020B0604020202020204" pitchFamily="34" charset="0"/>
+              <a:buNone/>
+            </a:pPr>
+            <a:r>
+              <a:rPr lang="en-US" sz="2400" dirty="0" smtClean="0"/>
+              <a:t>Invalid server API key returns HTTP status code 401</a:t>
+            </a:r>
+            <a:endParaRPr lang="en-US" sz="2400" dirty="0"/>
+          </a:p>
+        </p:txBody>
+      </p:sp>
+      <p:sp>
+        <p:nvSpPr>
+          <p:cNvPr id="10" name="Content Placeholder 2"/>
+          <p:cNvSpPr txBox="1">
+            <a:spLocks/>
+          </p:cNvSpPr>
+          <p:nvPr/>
+        </p:nvSpPr>
+        <p:spPr>
+          <a:xfrm>
+            <a:off x="455762" y="4297180"/>
+            <a:ext cx="8229600" cy="496669"/>
+          </a:xfrm>
+          <a:prstGeom prst="rect">
+            <a:avLst/>
+          </a:prstGeom>
+        </p:spPr>
+        <p:txBody>
+          <a:bodyPr vert="horz" lIns="91440" tIns="45720" rIns="91440" bIns="45720" rtlCol="0">
+            <a:normAutofit/>
+          </a:bodyPr>
+          <a:lstStyle>
+            <a:lvl1pPr marL="342900" indent="-342900" algn="l" defTabSz="914400" rtl="0" eaLnBrk="1" latinLnBrk="0" hangingPunct="1">
+              <a:spcBef>
+                <a:spcPct val="20000"/>
+              </a:spcBef>
+              <a:buFont typeface="Arial" panose="020B0604020202020204" pitchFamily="34" charset="0"/>
+              <a:buChar char="•"/>
+              <a:defRPr sz="3200" kern="1200">
+                <a:solidFill>
+                  <a:schemeClr val="tx1"/>
+                </a:solidFill>
+                <a:latin typeface="+mn-lt"/>
+                <a:ea typeface="+mn-ea"/>
+                <a:cs typeface="+mn-cs"/>
+              </a:defRPr>
+            </a:lvl1pPr>
+            <a:lvl2pPr marL="742950" indent="-285750" algn="l" defTabSz="914400" rtl="0" eaLnBrk="1" latinLnBrk="0" hangingPunct="1">
+              <a:spcBef>
+                <a:spcPct val="20000"/>
+              </a:spcBef>
+              <a:buFont typeface="Arial" panose="020B0604020202020204" pitchFamily="34" charset="0"/>
+              <a:buChar char="–"/>
+              <a:defRPr sz="2800" kern="1200">
+                <a:solidFill>
+                  <a:schemeClr val="tx1"/>
+                </a:solidFill>
+                <a:latin typeface="+mn-lt"/>
+                <a:ea typeface="+mn-ea"/>
+                <a:cs typeface="+mn-cs"/>
+              </a:defRPr>
+            </a:lvl2pPr>
+            <a:lvl3pPr marL="1143000" indent="-228600" algn="l" defTabSz="914400" rtl="0" eaLnBrk="1" latinLnBrk="0" hangingPunct="1">
+              <a:spcBef>
+                <a:spcPct val="20000"/>
+              </a:spcBef>
+              <a:buFont typeface="Arial" panose="020B0604020202020204" pitchFamily="34" charset="0"/>
+              <a:buChar char="•"/>
+              <a:defRPr sz="2400" kern="1200">
+                <a:solidFill>
+                  <a:schemeClr val="tx1"/>
+                </a:solidFill>
+                <a:latin typeface="+mn-lt"/>
+                <a:ea typeface="+mn-ea"/>
+                <a:cs typeface="+mn-cs"/>
+              </a:defRPr>
+            </a:lvl3pPr>
+            <a:lvl4pPr marL="1600200" indent="-228600" algn="l" defTabSz="914400" rtl="0" eaLnBrk="1" latinLnBrk="0" hangingPunct="1">
+              <a:spcBef>
+                <a:spcPct val="20000"/>
+              </a:spcBef>
+              <a:buFont typeface="Arial" panose="020B0604020202020204" pitchFamily="34" charset="0"/>
+              <a:buChar char="–"/>
+              <a:defRPr sz="2000" kern="1200">
+                <a:solidFill>
+                  <a:schemeClr val="tx1"/>
+                </a:solidFill>
+                <a:latin typeface="+mn-lt"/>
+                <a:ea typeface="+mn-ea"/>
+                <a:cs typeface="+mn-cs"/>
+              </a:defRPr>
+            </a:lvl4pPr>
+            <a:lvl5pPr marL="2057400" indent="-228600" algn="l" defTabSz="914400" rtl="0" eaLnBrk="1" latinLnBrk="0" hangingPunct="1">
+              <a:spcBef>
+                <a:spcPct val="20000"/>
+              </a:spcBef>
+              <a:buFont typeface="Arial" panose="020B0604020202020204" pitchFamily="34" charset="0"/>
+              <a:buChar char="»"/>
+              <a:defRPr sz="2000" kern="1200">
+                <a:solidFill>
+                  <a:schemeClr val="tx1"/>
+                </a:solidFill>
+                <a:latin typeface="+mn-lt"/>
+                <a:ea typeface="+mn-ea"/>
+                <a:cs typeface="+mn-cs"/>
+              </a:defRPr>
+            </a:lvl5pPr>
+            <a:lvl6pPr marL="2514600" indent="-228600" algn="l" defTabSz="914400" rtl="0" eaLnBrk="1" latinLnBrk="0" hangingPunct="1">
+              <a:spcBef>
+                <a:spcPct val="20000"/>
+              </a:spcBef>
+              <a:buFont typeface="Arial" panose="020B0604020202020204" pitchFamily="34" charset="0"/>
+              <a:buChar char="•"/>
+              <a:defRPr sz="2000" kern="1200">
+                <a:solidFill>
+                  <a:schemeClr val="tx1"/>
+                </a:solidFill>
+                <a:latin typeface="+mn-lt"/>
+                <a:ea typeface="+mn-ea"/>
+                <a:cs typeface="+mn-cs"/>
+              </a:defRPr>
+            </a:lvl6pPr>
+            <a:lvl7pPr marL="2971800" indent="-228600" algn="l" defTabSz="914400" rtl="0" eaLnBrk="1" latinLnBrk="0" hangingPunct="1">
+              <a:spcBef>
+                <a:spcPct val="20000"/>
+              </a:spcBef>
+              <a:buFont typeface="Arial" panose="020B0604020202020204" pitchFamily="34" charset="0"/>
+              <a:buChar char="•"/>
+              <a:defRPr sz="2000" kern="1200">
+                <a:solidFill>
+                  <a:schemeClr val="tx1"/>
+                </a:solidFill>
+                <a:latin typeface="+mn-lt"/>
+                <a:ea typeface="+mn-ea"/>
+                <a:cs typeface="+mn-cs"/>
+              </a:defRPr>
+            </a:lvl7pPr>
+            <a:lvl8pPr marL="3429000" indent="-228600" algn="l" defTabSz="914400" rtl="0" eaLnBrk="1" latinLnBrk="0" hangingPunct="1">
+              <a:spcBef>
+                <a:spcPct val="20000"/>
+              </a:spcBef>
+              <a:buFont typeface="Arial" panose="020B0604020202020204" pitchFamily="34" charset="0"/>
+              <a:buChar char="•"/>
+              <a:defRPr sz="2000" kern="1200">
+                <a:solidFill>
+                  <a:schemeClr val="tx1"/>
+                </a:solidFill>
+                <a:latin typeface="+mn-lt"/>
+                <a:ea typeface="+mn-ea"/>
+                <a:cs typeface="+mn-cs"/>
+              </a:defRPr>
+            </a:lvl8pPr>
+            <a:lvl9pPr marL="3886200" indent="-228600" algn="l" defTabSz="914400" rtl="0" eaLnBrk="1" latinLnBrk="0" hangingPunct="1">
+              <a:spcBef>
+                <a:spcPct val="20000"/>
+              </a:spcBef>
+              <a:buFont typeface="Arial" panose="020B0604020202020204" pitchFamily="34" charset="0"/>
+              <a:buChar char="•"/>
+              <a:defRPr sz="2000" kern="1200">
+                <a:solidFill>
+                  <a:schemeClr val="tx1"/>
+                </a:solidFill>
+                <a:latin typeface="+mn-lt"/>
+                <a:ea typeface="+mn-ea"/>
+                <a:cs typeface="+mn-cs"/>
+              </a:defRPr>
+            </a:lvl9pPr>
+          </a:lstStyle>
+          <a:p>
+            <a:pPr marL="0" indent="0">
+              <a:buFont typeface="Arial" panose="020B0604020202020204" pitchFamily="34" charset="0"/>
+              <a:buNone/>
+            </a:pPr>
+            <a:r>
+              <a:rPr lang="en-US" sz="2400" dirty="0" smtClean="0"/>
+              <a:t>Invalid device registration ID returns:</a:t>
+            </a:r>
+            <a:endParaRPr lang="en-US" sz="2400" dirty="0"/>
+          </a:p>
+        </p:txBody>
+      </p:sp>
+      <p:sp>
+        <p:nvSpPr>
+          <p:cNvPr id="11" name="Content Placeholder 2"/>
+          <p:cNvSpPr txBox="1">
+            <a:spLocks/>
+          </p:cNvSpPr>
+          <p:nvPr/>
+        </p:nvSpPr>
+        <p:spPr>
+          <a:xfrm>
+            <a:off x="451449" y="5111945"/>
+            <a:ext cx="8229600" cy="496669"/>
+          </a:xfrm>
+          <a:prstGeom prst="rect">
+            <a:avLst/>
+          </a:prstGeom>
+        </p:spPr>
+        <p:txBody>
+          <a:bodyPr vert="horz" lIns="91440" tIns="45720" rIns="91440" bIns="45720" rtlCol="0">
+            <a:normAutofit/>
+          </a:bodyPr>
+          <a:lstStyle>
+            <a:lvl1pPr marL="342900" indent="-342900" algn="l" defTabSz="914400" rtl="0" eaLnBrk="1" latinLnBrk="0" hangingPunct="1">
+              <a:spcBef>
+                <a:spcPct val="20000"/>
+              </a:spcBef>
+              <a:buFont typeface="Arial" panose="020B0604020202020204" pitchFamily="34" charset="0"/>
+              <a:buChar char="•"/>
+              <a:defRPr sz="3200" kern="1200">
+                <a:solidFill>
+                  <a:schemeClr val="tx1"/>
+                </a:solidFill>
+                <a:latin typeface="+mn-lt"/>
+                <a:ea typeface="+mn-ea"/>
+                <a:cs typeface="+mn-cs"/>
+              </a:defRPr>
+            </a:lvl1pPr>
+            <a:lvl2pPr marL="742950" indent="-285750" algn="l" defTabSz="914400" rtl="0" eaLnBrk="1" latinLnBrk="0" hangingPunct="1">
+              <a:spcBef>
+                <a:spcPct val="20000"/>
+              </a:spcBef>
+              <a:buFont typeface="Arial" panose="020B0604020202020204" pitchFamily="34" charset="0"/>
+              <a:buChar char="–"/>
+              <a:defRPr sz="2800" kern="1200">
+                <a:solidFill>
+                  <a:schemeClr val="tx1"/>
+                </a:solidFill>
+                <a:latin typeface="+mn-lt"/>
+                <a:ea typeface="+mn-ea"/>
+                <a:cs typeface="+mn-cs"/>
+              </a:defRPr>
+            </a:lvl2pPr>
+            <a:lvl3pPr marL="1143000" indent="-228600" algn="l" defTabSz="914400" rtl="0" eaLnBrk="1" latinLnBrk="0" hangingPunct="1">
+              <a:spcBef>
+                <a:spcPct val="20000"/>
+              </a:spcBef>
+              <a:buFont typeface="Arial" panose="020B0604020202020204" pitchFamily="34" charset="0"/>
+              <a:buChar char="•"/>
+              <a:defRPr sz="2400" kern="1200">
+                <a:solidFill>
+                  <a:schemeClr val="tx1"/>
+                </a:solidFill>
+                <a:latin typeface="+mn-lt"/>
+                <a:ea typeface="+mn-ea"/>
+                <a:cs typeface="+mn-cs"/>
+              </a:defRPr>
+            </a:lvl3pPr>
+            <a:lvl4pPr marL="1600200" indent="-228600" algn="l" defTabSz="914400" rtl="0" eaLnBrk="1" latinLnBrk="0" hangingPunct="1">
+              <a:spcBef>
+                <a:spcPct val="20000"/>
+              </a:spcBef>
+              <a:buFont typeface="Arial" panose="020B0604020202020204" pitchFamily="34" charset="0"/>
+              <a:buChar char="–"/>
+              <a:defRPr sz="2000" kern="1200">
+                <a:solidFill>
+                  <a:schemeClr val="tx1"/>
+                </a:solidFill>
+                <a:latin typeface="+mn-lt"/>
+                <a:ea typeface="+mn-ea"/>
+                <a:cs typeface="+mn-cs"/>
+              </a:defRPr>
+            </a:lvl4pPr>
+            <a:lvl5pPr marL="2057400" indent="-228600" algn="l" defTabSz="914400" rtl="0" eaLnBrk="1" latinLnBrk="0" hangingPunct="1">
+              <a:spcBef>
+                <a:spcPct val="20000"/>
+              </a:spcBef>
+              <a:buFont typeface="Arial" panose="020B0604020202020204" pitchFamily="34" charset="0"/>
+              <a:buChar char="»"/>
+              <a:defRPr sz="2000" kern="1200">
+                <a:solidFill>
+                  <a:schemeClr val="tx1"/>
+                </a:solidFill>
+                <a:latin typeface="+mn-lt"/>
+                <a:ea typeface="+mn-ea"/>
+                <a:cs typeface="+mn-cs"/>
+              </a:defRPr>
+            </a:lvl5pPr>
+            <a:lvl6pPr marL="2514600" indent="-228600" algn="l" defTabSz="914400" rtl="0" eaLnBrk="1" latinLnBrk="0" hangingPunct="1">
+              <a:spcBef>
+                <a:spcPct val="20000"/>
+              </a:spcBef>
+              <a:buFont typeface="Arial" panose="020B0604020202020204" pitchFamily="34" charset="0"/>
+              <a:buChar char="•"/>
+              <a:defRPr sz="2000" kern="1200">
+                <a:solidFill>
+                  <a:schemeClr val="tx1"/>
+                </a:solidFill>
+                <a:latin typeface="+mn-lt"/>
+                <a:ea typeface="+mn-ea"/>
+                <a:cs typeface="+mn-cs"/>
+              </a:defRPr>
+            </a:lvl6pPr>
+            <a:lvl7pPr marL="2971800" indent="-228600" algn="l" defTabSz="914400" rtl="0" eaLnBrk="1" latinLnBrk="0" hangingPunct="1">
+              <a:spcBef>
+                <a:spcPct val="20000"/>
+              </a:spcBef>
+              <a:buFont typeface="Arial" panose="020B0604020202020204" pitchFamily="34" charset="0"/>
+              <a:buChar char="•"/>
+              <a:defRPr sz="2000" kern="1200">
+                <a:solidFill>
+                  <a:schemeClr val="tx1"/>
+                </a:solidFill>
+                <a:latin typeface="+mn-lt"/>
+                <a:ea typeface="+mn-ea"/>
+                <a:cs typeface="+mn-cs"/>
+              </a:defRPr>
+            </a:lvl7pPr>
+            <a:lvl8pPr marL="3429000" indent="-228600" algn="l" defTabSz="914400" rtl="0" eaLnBrk="1" latinLnBrk="0" hangingPunct="1">
+              <a:spcBef>
+                <a:spcPct val="20000"/>
+              </a:spcBef>
+              <a:buFont typeface="Arial" panose="020B0604020202020204" pitchFamily="34" charset="0"/>
+              <a:buChar char="•"/>
+              <a:defRPr sz="2000" kern="1200">
+                <a:solidFill>
+                  <a:schemeClr val="tx1"/>
+                </a:solidFill>
+                <a:latin typeface="+mn-lt"/>
+                <a:ea typeface="+mn-ea"/>
+                <a:cs typeface="+mn-cs"/>
+              </a:defRPr>
+            </a:lvl8pPr>
+            <a:lvl9pPr marL="3886200" indent="-228600" algn="l" defTabSz="914400" rtl="0" eaLnBrk="1" latinLnBrk="0" hangingPunct="1">
+              <a:spcBef>
+                <a:spcPct val="20000"/>
+              </a:spcBef>
+              <a:buFont typeface="Arial" panose="020B0604020202020204" pitchFamily="34" charset="0"/>
+              <a:buChar char="•"/>
+              <a:defRPr sz="2000" kern="1200">
+                <a:solidFill>
+                  <a:schemeClr val="tx1"/>
+                </a:solidFill>
+                <a:latin typeface="+mn-lt"/>
+                <a:ea typeface="+mn-ea"/>
+                <a:cs typeface="+mn-cs"/>
+              </a:defRPr>
+            </a:lvl9pPr>
+          </a:lstStyle>
+          <a:p>
+            <a:pPr marL="0" indent="0">
+              <a:buFont typeface="Arial" panose="020B0604020202020204" pitchFamily="34" charset="0"/>
+              <a:buNone/>
+            </a:pPr>
+            <a:r>
+              <a:rPr lang="en-US" sz="2400" dirty="0" smtClean="0"/>
               <a:t>DEMO</a:t>
             </a:r>
-          </a:p>
-          <a:p>
-            <a:pPr lvl="2"/>
-            <a:endParaRPr lang="en-US" dirty="0" smtClean="0"/>
-          </a:p>
-          <a:p>
-            <a:endParaRPr lang="en-US" dirty="0"/>
+            <a:endParaRPr lang="en-US" sz="2400" dirty="0"/>
           </a:p>
         </p:txBody>
       </p:sp>
     </p:spTree>
     <p:extLst>
       <p:ext uri="{BB962C8B-B14F-4D97-AF65-F5344CB8AC3E}">
-        <p14:creationId xmlns:p14="http://schemas.microsoft.com/office/powerpoint/2010/main" val="327509647"/>
+        <p14:creationId xmlns:p14="http://schemas.microsoft.com/office/powerpoint/2010/main" val="2683352921"/>
       </p:ext>
     </p:extLst>
   </p:cSld>
@@ -6160,7 +7957,7 @@
           <a:noFill/>
           <a:extLst>
             <a:ext uri="{909E8E84-426E-40dd-AFC4-6F175D3DCCD1}">
-              <a14:hiddenFill xmlns="" xmlns:a14="http://schemas.microsoft.com/office/drawing/2010/main">
+              <a14:hiddenFill xmlns:a14="http://schemas.microsoft.com/office/drawing/2010/main" xmlns="">
                 <a:solidFill>
                   <a:srgbClr val="FFFFFF"/>
                 </a:solidFill>
@@ -6205,7 +8002,7 @@
         <p:spPr/>
         <p:txBody>
           <a:bodyPr>
-            <a:normAutofit lnSpcReduction="10000"/>
+            <a:normAutofit fontScale="92500" lnSpcReduction="10000"/>
           </a:bodyPr>
           <a:lstStyle/>
           <a:p>
@@ -6256,25 +8053,7 @@
           </a:p>
           <a:p>
             <a:r>
-              <a:rPr lang="en-US" sz="2000" dirty="0"/>
-              <a:t>Test </a:t>
-            </a:r>
-            <a:r>
               <a:rPr lang="en-US" sz="2000" dirty="0" smtClean="0"/>
-              <a:t>API </a:t>
-            </a:r>
-            <a:r>
-              <a:rPr lang="en-US" sz="2000" dirty="0"/>
-              <a:t>Key and </a:t>
-            </a:r>
-            <a:r>
-              <a:rPr lang="en-US" sz="2000" dirty="0" smtClean="0"/>
-              <a:t>Registration ID</a:t>
-            </a:r>
-          </a:p>
-          <a:p>
-            <a:r>
-              <a:rPr lang="en-US" sz="2000" dirty="0"/>
               <a:t>Implement </a:t>
             </a:r>
             <a:r>
@@ -6305,13 +8084,27 @@
           <a:p>
             <a:r>
               <a:rPr lang="en-US" sz="2000" dirty="0" smtClean="0"/>
-              <a:t>Testing Without a Server</a:t>
-            </a:r>
-          </a:p>
-          <a:p>
+              <a:t>Testing Without a </a:t>
+            </a:r>
             <a:r>
               <a:rPr lang="en-US" sz="2000" dirty="0" smtClean="0"/>
-              <a:t>Additional Info and Questions</a:t>
+              <a:t>Server</a:t>
+            </a:r>
+          </a:p>
+          <a:p>
+            <a:r>
+              <a:rPr lang="en-US" sz="2000" dirty="0"/>
+              <a:t>Test API Key and Registration ID</a:t>
+            </a:r>
+          </a:p>
+          <a:p>
+            <a:r>
+              <a:rPr lang="en-US" sz="2000" dirty="0" smtClean="0"/>
+              <a:t>Additional </a:t>
+            </a:r>
+            <a:r>
+              <a:rPr lang="en-US" sz="2000" dirty="0" smtClean="0"/>
+              <a:t>Info and Questions</a:t>
             </a:r>
             <a:endParaRPr lang="en-US" sz="2000" dirty="0"/>
           </a:p>
@@ -6379,11 +8172,7 @@
           <a:p>
             <a:r>
               <a:rPr lang="en-US" dirty="0" smtClean="0"/>
-              <a:t>Additional </a:t>
-            </a:r>
-            <a:r>
-              <a:rPr lang="en-US" dirty="0" smtClean="0"/>
-              <a:t>Info</a:t>
+              <a:t>Additional Info</a:t>
             </a:r>
             <a:endParaRPr lang="en-US" dirty="0"/>
           </a:p>
@@ -6407,147 +8196,173 @@
           <a:lstStyle/>
           <a:p>
             <a:r>
-              <a:rPr lang="en-US" sz="2000" dirty="0" smtClean="0"/>
-              <a:t>GitHub </a:t>
-            </a:r>
-            <a:r>
-              <a:rPr lang="en-US" sz="2000" dirty="0" smtClean="0"/>
-              <a:t>repo:</a:t>
+              <a:rPr lang="en-US" sz="1800" dirty="0" smtClean="0"/>
+              <a:t>GitHub repo:</a:t>
             </a:r>
           </a:p>
           <a:p>
             <a:pPr lvl="1"/>
             <a:r>
-              <a:rPr lang="en-US" sz="1600" dirty="0">
+              <a:rPr lang="en-US" sz="1400" dirty="0">
                 <a:hlinkClick r:id="rId2"/>
               </a:rPr>
               <a:t>https://</a:t>
             </a:r>
             <a:r>
-              <a:rPr lang="en-US" sz="1600" dirty="0" smtClean="0">
+              <a:rPr lang="en-US" sz="1400" dirty="0" smtClean="0">
                 <a:hlinkClick r:id="rId2"/>
               </a:rPr>
               <a:t>github.com/LeadingEDJE/MobilePushNotification</a:t>
             </a:r>
-            <a:endParaRPr lang="en-US" sz="1600" dirty="0" smtClean="0"/>
+            <a:endParaRPr lang="en-US" sz="1400" dirty="0" smtClean="0"/>
           </a:p>
           <a:p>
             <a:pPr lvl="2"/>
             <a:r>
-              <a:rPr lang="en-US" sz="1400" dirty="0" smtClean="0"/>
+              <a:rPr lang="en-US" sz="1200" dirty="0" smtClean="0"/>
               <a:t>Use gradle_migration_2014-10-08 branch for Android Studio / </a:t>
             </a:r>
             <a:r>
-              <a:rPr lang="en-US" sz="1400" dirty="0" err="1" smtClean="0"/>
+              <a:rPr lang="en-US" sz="1200" dirty="0" err="1" smtClean="0"/>
               <a:t>Gradle</a:t>
             </a:r>
             <a:r>
-              <a:rPr lang="en-US" sz="1400" dirty="0" smtClean="0"/>
+              <a:rPr lang="en-US" sz="1200" dirty="0" smtClean="0"/>
               <a:t> based project</a:t>
             </a:r>
           </a:p>
           <a:p>
             <a:pPr lvl="2"/>
             <a:r>
-              <a:rPr lang="en-US" sz="1400" dirty="0" smtClean="0"/>
+              <a:rPr lang="en-US" sz="1200" dirty="0" smtClean="0"/>
               <a:t>Use master for Eclipse based project</a:t>
             </a:r>
           </a:p>
           <a:p>
             <a:r>
-              <a:rPr lang="en-US" sz="2000" dirty="0" smtClean="0"/>
-              <a:t>Google </a:t>
-            </a:r>
-            <a:r>
-              <a:rPr lang="en-US" sz="2000" dirty="0" smtClean="0"/>
-              <a:t>Cloud Messaging for Android</a:t>
+              <a:rPr lang="en-US" sz="1800" dirty="0" smtClean="0"/>
+              <a:t>Google Cloud Messaging for Android</a:t>
             </a:r>
           </a:p>
           <a:p>
             <a:pPr lvl="1"/>
             <a:r>
-              <a:rPr lang="en-US" sz="1600" dirty="0">
+              <a:rPr lang="en-US" sz="1400" dirty="0">
                 <a:hlinkClick r:id="rId3"/>
               </a:rPr>
               <a:t>http://</a:t>
             </a:r>
             <a:r>
-              <a:rPr lang="en-US" sz="1600" dirty="0" smtClean="0">
+              <a:rPr lang="en-US" sz="1400" dirty="0" smtClean="0">
                 <a:hlinkClick r:id="rId3"/>
               </a:rPr>
               <a:t>developer.android.com/google/gcm/index.html</a:t>
             </a:r>
-            <a:endParaRPr lang="en-US" sz="1600" dirty="0"/>
-          </a:p>
-          <a:p>
-            <a:r>
-              <a:rPr lang="en-US" sz="2000" dirty="0" smtClean="0"/>
+            <a:endParaRPr lang="en-US" sz="1400" dirty="0"/>
+          </a:p>
+          <a:p>
+            <a:r>
+              <a:rPr lang="en-US" sz="1800" dirty="0" smtClean="0"/>
               <a:t>Setting up Google Play Services</a:t>
             </a:r>
           </a:p>
           <a:p>
             <a:pPr lvl="1"/>
             <a:r>
-              <a:rPr lang="en-US" sz="1800" dirty="0">
+              <a:rPr lang="en-US" sz="1600" dirty="0">
                 <a:hlinkClick r:id="rId4"/>
               </a:rPr>
               <a:t>http://</a:t>
             </a:r>
             <a:r>
-              <a:rPr lang="en-US" sz="1800" dirty="0" smtClean="0">
+              <a:rPr lang="en-US" sz="1600" dirty="0" smtClean="0">
                 <a:hlinkClick r:id="rId4"/>
               </a:rPr>
               <a:t>developer.android.com/google/play-services/setup.html</a:t>
             </a:r>
-            <a:endParaRPr lang="en-US" sz="1800" dirty="0" smtClean="0"/>
-          </a:p>
-          <a:p>
-            <a:r>
-              <a:rPr lang="en-US" sz="2200" dirty="0" smtClean="0"/>
-              <a:t>DHC REST HTTP API Client</a:t>
+            <a:endParaRPr lang="en-US" sz="1600" dirty="0" smtClean="0"/>
+          </a:p>
+          <a:p>
+            <a:r>
+              <a:rPr lang="en-US" sz="2000" dirty="0" smtClean="0"/>
+              <a:t>Building your Project with </a:t>
+            </a:r>
+            <a:r>
+              <a:rPr lang="en-US" sz="2000" dirty="0" err="1" smtClean="0"/>
+              <a:t>Gradle</a:t>
+            </a:r>
+            <a:r>
+              <a:rPr lang="en-US" sz="2000" dirty="0" smtClean="0"/>
+              <a:t> and Android Studio</a:t>
             </a:r>
           </a:p>
           <a:p>
             <a:pPr lvl="1"/>
             <a:r>
-              <a:rPr lang="en-US" sz="1800" dirty="0">
+              <a:rPr lang="en-US" sz="1600" dirty="0">
                 <a:hlinkClick r:id="rId5"/>
               </a:rPr>
-              <a:t>https://</a:t>
-            </a:r>
-            <a:r>
-              <a:rPr lang="en-US" sz="1800" dirty="0" smtClean="0">
+              <a:t>http://</a:t>
+            </a:r>
+            <a:r>
+              <a:rPr lang="en-US" sz="1600" dirty="0" smtClean="0">
                 <a:hlinkClick r:id="rId5"/>
               </a:rPr>
-              <a:t>chrome.google.com/webstore/detail/dhc-rest-http-api-client/aejoelaoggembcahagimdiliamlcdmfm?hl=en</a:t>
-            </a:r>
-            <a:endParaRPr lang="en-US" sz="1800" dirty="0" smtClean="0"/>
-          </a:p>
-          <a:p>
-            <a:r>
-              <a:rPr lang="en-US" sz="2200" dirty="0" err="1" smtClean="0"/>
-              <a:t>Droid@Screen</a:t>
-            </a:r>
-            <a:endParaRPr lang="en-US" sz="2200" dirty="0"/>
+              <a:t>developer.android.com/sdk/installing/studio-build.html</a:t>
+            </a:r>
+            <a:endParaRPr lang="en-US" sz="1600" dirty="0"/>
+          </a:p>
+          <a:p>
+            <a:r>
+              <a:rPr lang="en-US" sz="2000" dirty="0" smtClean="0"/>
+              <a:t>DHC </a:t>
+            </a:r>
+            <a:r>
+              <a:rPr lang="en-US" sz="2000" dirty="0" smtClean="0"/>
+              <a:t>REST HTTP API Client</a:t>
+            </a:r>
           </a:p>
           <a:p>
             <a:pPr lvl="1"/>
             <a:r>
-              <a:rPr lang="en-US" sz="1800" dirty="0">
+              <a:rPr lang="en-US" sz="1600" dirty="0">
                 <a:hlinkClick r:id="rId6"/>
               </a:rPr>
-              <a:t>http://droid-at-screen.ribomation.com</a:t>
-            </a:r>
-            <a:r>
-              <a:rPr lang="en-US" sz="1800" dirty="0" smtClean="0">
+              <a:t>https://</a:t>
+            </a:r>
+            <a:r>
+              <a:rPr lang="en-US" sz="1600" dirty="0" smtClean="0">
                 <a:hlinkClick r:id="rId6"/>
               </a:rPr>
+              <a:t>chrome.google.com/webstore/detail/dhc-rest-http-api-client/aejoelaoggembcahagimdiliamlcdmfm?hl=en</a:t>
+            </a:r>
+            <a:endParaRPr lang="en-US" sz="1600" dirty="0" smtClean="0"/>
+          </a:p>
+          <a:p>
+            <a:r>
+              <a:rPr lang="en-US" sz="2000" dirty="0" err="1" smtClean="0"/>
+              <a:t>Droid@Screen</a:t>
+            </a:r>
+            <a:endParaRPr lang="en-US" sz="2000" dirty="0"/>
+          </a:p>
+          <a:p>
+            <a:pPr lvl="1"/>
+            <a:r>
+              <a:rPr lang="en-US" sz="1600" dirty="0">
+                <a:hlinkClick r:id="rId7"/>
+              </a:rPr>
+              <a:t>http://droid-at-screen.ribomation.com</a:t>
+            </a:r>
+            <a:r>
+              <a:rPr lang="en-US" sz="1600" dirty="0" smtClean="0">
+                <a:hlinkClick r:id="rId7"/>
+              </a:rPr>
               <a:t>/</a:t>
             </a:r>
+            <a:endParaRPr lang="en-US" sz="1600" dirty="0"/>
+          </a:p>
+          <a:p>
             <a:endParaRPr lang="en-US" sz="1800" dirty="0"/>
-          </a:p>
-          <a:p>
-            <a:endParaRPr lang="en-US" sz="2000" dirty="0"/>
           </a:p>
         </p:txBody>
       </p:sp>
@@ -6726,7 +8541,51 @@
             </a:r>
             <a:r>
               <a:rPr lang="en-US" sz="2000" dirty="0"/>
-              <a:t>25 years experience designing, developing and delivering high quality software solutions for several companies including Lexmark, Diebold, Limited Brands, Sterling Commerce and IBM. He completed a PhoneGap / web technology based Android mobile app solution to help automate the workflow for his client's 1,200 service technicians. He also completed push notification support for a client’s native Android app that allows the client’s employees to be notified of new equipment alarms. He has presented "Real World Mobile App Development with Phonegap" at Columbus Code Camp, </a:t>
+              <a:t>25 years experience designing, developing and delivering high quality software solutions for several companies including Lexmark, Diebold, Limited Brands, Sterling Commerce and IBM. </a:t>
+            </a:r>
+            <a:r>
+              <a:rPr lang="en-US" sz="2000" dirty="0"/>
+              <a:t>C</a:t>
+            </a:r>
+            <a:r>
+              <a:rPr lang="en-US" sz="2000" dirty="0" smtClean="0"/>
+              <a:t>ompleted </a:t>
+            </a:r>
+            <a:r>
+              <a:rPr lang="en-US" sz="2000" dirty="0"/>
+              <a:t>a PhoneGap / web technology based Android mobile app solution to help automate the workflow for </a:t>
+            </a:r>
+            <a:r>
+              <a:rPr lang="en-US" sz="2000" dirty="0" smtClean="0"/>
+              <a:t>client's </a:t>
+            </a:r>
+            <a:r>
+              <a:rPr lang="en-US" sz="2000" dirty="0"/>
+              <a:t>1,200 service technicians. </a:t>
+            </a:r>
+            <a:r>
+              <a:rPr lang="en-US" sz="2000" dirty="0" smtClean="0"/>
+              <a:t>Also </a:t>
+            </a:r>
+            <a:r>
+              <a:rPr lang="en-US" sz="2000" dirty="0"/>
+              <a:t>completed push notification support for a client’s native Android app that allows the client’s employees to be notified of new equipment alarms. </a:t>
+            </a:r>
+            <a:r>
+              <a:rPr lang="en-US" sz="2000" dirty="0" smtClean="0"/>
+              <a:t>Presented </a:t>
+            </a:r>
+            <a:r>
+              <a:rPr lang="en-US" sz="2000" dirty="0"/>
+              <a:t>"Real World Mobile App Development with </a:t>
+            </a:r>
+            <a:r>
+              <a:rPr lang="en-US" sz="2000" dirty="0" smtClean="0"/>
+              <a:t>PhoneGap</a:t>
+            </a:r>
+            <a:r>
+              <a:rPr lang="en-US" sz="2000" dirty="0"/>
+              <a:t>" at Columbus Code Camp, </a:t>
             </a:r>
             <a:r>
               <a:rPr lang="en-US" sz="2000" dirty="0" err="1"/>
@@ -6734,7 +8593,15 @@
             </a:r>
             <a:r>
               <a:rPr lang="en-US" sz="2000" dirty="0"/>
-              <a:t> and M3. He is currently working on the design and architecture of a mobile and server vehicle health management solution for a large trucking company</a:t>
+              <a:t> and M3. </a:t>
+            </a:r>
+            <a:r>
+              <a:rPr lang="en-US" sz="2000" dirty="0" smtClean="0"/>
+              <a:t>Currently </a:t>
+            </a:r>
+            <a:r>
+              <a:rPr lang="en-US" sz="2000" dirty="0"/>
+              <a:t>working on the design and architecture of a mobile and server vehicle health management solution for a large trucking company</a:t>
             </a:r>
             <a:r>
               <a:rPr lang="en-US" sz="2000" dirty="0" smtClean="0"/>
@@ -6832,30 +8699,92 @@
         </p:nvSpPr>
         <p:spPr/>
         <p:txBody>
-          <a:bodyPr/>
+          <a:bodyPr>
+            <a:normAutofit/>
+          </a:bodyPr>
           <a:lstStyle/>
           <a:p>
             <a:r>
-              <a:rPr lang="en-US" dirty="0"/>
+              <a:rPr lang="en-US" sz="2000" dirty="0"/>
               <a:t>Google Cloud Messaging (GCM) is a free service that allows you to send data from your server to your Android </a:t>
             </a:r>
             <a:r>
-              <a:rPr lang="en-US" dirty="0" smtClean="0"/>
+              <a:rPr lang="en-US" sz="2000" dirty="0" smtClean="0"/>
               <a:t>application</a:t>
             </a:r>
           </a:p>
           <a:p>
-            <a:r>
-              <a:rPr lang="en-US" dirty="0" smtClean="0"/>
-              <a:t>Can </a:t>
-            </a:r>
-            <a:r>
-              <a:rPr lang="en-US" dirty="0"/>
-              <a:t>be lightweight messages telling your app there is new data to be fetched from your server or it could be a message containing up to 4kb of payload data</a:t>
-            </a:r>
-          </a:p>
-        </p:txBody>
-      </p:sp>
+            <a:pPr lvl="1"/>
+            <a:r>
+              <a:rPr lang="en-US" sz="1800" dirty="0" smtClean="0"/>
+              <a:t>GCM service handles all aspects of message queueing and delivery to target app running on the target device</a:t>
+            </a:r>
+            <a:endParaRPr lang="en-US" sz="1800" dirty="0" smtClean="0"/>
+          </a:p>
+          <a:p>
+            <a:r>
+              <a:rPr lang="en-US" sz="2000" dirty="0"/>
+              <a:t>L</a:t>
+            </a:r>
+            <a:r>
+              <a:rPr lang="en-US" sz="2000" dirty="0" smtClean="0"/>
+              <a:t>ightweight </a:t>
+            </a:r>
+            <a:r>
+              <a:rPr lang="en-US" sz="2000" dirty="0"/>
+              <a:t>messages telling your app there is new data to be fetched from your </a:t>
+            </a:r>
+            <a:r>
+              <a:rPr lang="en-US" sz="2000" dirty="0" smtClean="0"/>
+              <a:t>server</a:t>
+            </a:r>
+          </a:p>
+          <a:p>
+            <a:r>
+              <a:rPr lang="en-US" sz="2000" dirty="0" smtClean="0"/>
+              <a:t>M</a:t>
+            </a:r>
+            <a:r>
+              <a:rPr lang="en-US" sz="2000" dirty="0" smtClean="0"/>
+              <a:t>essages </a:t>
+            </a:r>
+            <a:r>
+              <a:rPr lang="en-US" sz="2000" dirty="0"/>
+              <a:t>containing up to 4kb of payload data</a:t>
+            </a:r>
+          </a:p>
+        </p:txBody>
+      </p:sp>
+      <p:pic>
+        <p:nvPicPr>
+          <p:cNvPr id="4" name="Picture 3"/>
+          <p:cNvPicPr>
+            <a:picLocks noChangeAspect="1"/>
+          </p:cNvPicPr>
+          <p:nvPr/>
+        </p:nvPicPr>
+        <p:blipFill>
+          <a:blip r:embed="rId2">
+            <a:extLst>
+              <a:ext uri="{28A0092B-C50C-407E-A947-70E740481C1C}">
+                <a14:useLocalDpi xmlns:a14="http://schemas.microsoft.com/office/drawing/2010/main" val="0"/>
+              </a:ext>
+            </a:extLst>
+          </a:blip>
+          <a:stretch>
+            <a:fillRect/>
+          </a:stretch>
+        </p:blipFill>
+        <p:spPr>
+          <a:xfrm>
+            <a:off x="1292458" y="3688485"/>
+            <a:ext cx="6559083" cy="2472184"/>
+          </a:xfrm>
+          <a:prstGeom prst="rect">
+            <a:avLst/>
+          </a:prstGeom>
+        </p:spPr>
+      </p:pic>
     </p:spTree>
     <p:extLst>
       <p:ext uri="{BB962C8B-B14F-4D97-AF65-F5344CB8AC3E}">
@@ -6922,7 +8851,7 @@
         <p:spPr/>
         <p:txBody>
           <a:bodyPr>
-            <a:normAutofit fontScale="92500" lnSpcReduction="20000"/>
+            <a:normAutofit fontScale="85000" lnSpcReduction="20000"/>
           </a:bodyPr>
           <a:lstStyle/>
           <a:p>
@@ -6935,7 +8864,18 @@
             <a:pPr lvl="1"/>
             <a:r>
               <a:rPr lang="en-US" sz="2400" dirty="0" smtClean="0"/>
-              <a:t>Android development environment</a:t>
+              <a:t>Google account to create Google API project</a:t>
+            </a:r>
+          </a:p>
+          <a:p>
+            <a:pPr lvl="1"/>
+            <a:r>
+              <a:rPr lang="en-US" sz="2400" dirty="0" smtClean="0"/>
+              <a:t>Android </a:t>
+            </a:r>
+            <a:r>
+              <a:rPr lang="en-US" sz="2400" dirty="0" smtClean="0"/>
+              <a:t>development environment</a:t>
             </a:r>
           </a:p>
           <a:p>
@@ -7568,12 +9508,7 @@
               <a:rPr lang="en-US" sz="2400" dirty="0" smtClean="0"/>
               <a:t>it</a:t>
             </a:r>
-          </a:p>
-          <a:p>
-            <a:r>
-              <a:rPr lang="en-US" dirty="0" smtClean="0"/>
-              <a:t>DEMO</a:t>
-            </a:r>
+            <a:endParaRPr lang="en-US" dirty="0" smtClean="0"/>
           </a:p>
           <a:p>
             <a:endParaRPr lang="en-US" sz="2800" dirty="0"/>

</xml_diff>

<commit_message>
Put latest version of presentation into master branch
</commit_message>
<xml_diff>
--- a/Implementing Push Notification in Android.pptx
+++ b/Implementing Push Notification in Android.pptx
@@ -5,10 +5,10 @@
     <p:sldMasterId id="2147483648" r:id="rId1"/>
   </p:sldMasterIdLst>
   <p:notesMasterIdLst>
-    <p:notesMasterId r:id="rId21"/>
+    <p:notesMasterId r:id="rId23"/>
   </p:notesMasterIdLst>
   <p:handoutMasterIdLst>
-    <p:handoutMasterId r:id="rId22"/>
+    <p:handoutMasterId r:id="rId24"/>
   </p:handoutMasterIdLst>
   <p:sldIdLst>
     <p:sldId id="257" r:id="rId2"/>
@@ -21,15 +21,17 @@
     <p:sldId id="265" r:id="rId9"/>
     <p:sldId id="266" r:id="rId10"/>
     <p:sldId id="267" r:id="rId11"/>
-    <p:sldId id="268" r:id="rId12"/>
-    <p:sldId id="270" r:id="rId13"/>
-    <p:sldId id="271" r:id="rId14"/>
-    <p:sldId id="272" r:id="rId15"/>
+    <p:sldId id="277" r:id="rId12"/>
+    <p:sldId id="276" r:id="rId13"/>
+    <p:sldId id="270" r:id="rId14"/>
+    <p:sldId id="271" r:id="rId15"/>
     <p:sldId id="273" r:id="rId16"/>
     <p:sldId id="275" r:id="rId17"/>
     <p:sldId id="269" r:id="rId18"/>
     <p:sldId id="274" r:id="rId19"/>
-    <p:sldId id="259" r:id="rId20"/>
+    <p:sldId id="272" r:id="rId20"/>
+    <p:sldId id="259" r:id="rId21"/>
+    <p:sldId id="278" r:id="rId22"/>
   </p:sldIdLst>
   <p:sldSz cx="9144000" cy="6858000" type="screen4x3"/>
   <p:notesSz cx="6858000" cy="9144000"/>
@@ -128,6 +130,36 @@
       </a:defRPr>
     </a:lvl9pPr>
   </p:defaultTextStyle>
+  <p:extLst>
+    <p:ext uri="{EFAFB233-063F-42B5-8137-9DF3F51BA10A}">
+      <p15:sldGuideLst xmlns:p15="http://schemas.microsoft.com/office/powerpoint/2012/main">
+        <p15:guide id="1" orient="horz" pos="2160">
+          <p15:clr>
+            <a:srgbClr val="A4A3A4"/>
+          </p15:clr>
+        </p15:guide>
+        <p15:guide id="2" pos="2880">
+          <p15:clr>
+            <a:srgbClr val="A4A3A4"/>
+          </p15:clr>
+        </p15:guide>
+      </p15:sldGuideLst>
+    </p:ext>
+    <p:ext uri="{2D200454-40CA-4A62-9FC3-DE9A4176ACB9}">
+      <p15:notesGuideLst xmlns:p15="http://schemas.microsoft.com/office/powerpoint/2012/main">
+        <p15:guide id="1" orient="horz" pos="2880">
+          <p15:clr>
+            <a:srgbClr val="A4A3A4"/>
+          </p15:clr>
+        </p15:guide>
+        <p15:guide id="2" pos="2160">
+          <p15:clr>
+            <a:srgbClr val="A4A3A4"/>
+          </p15:clr>
+        </p15:guide>
+      </p15:notesGuideLst>
+    </p:ext>
+  </p:extLst>
 </p:presentation>
 </file>
 
@@ -213,7 +245,7 @@
           <a:p>
             <a:fld id="{AB6131E3-072D-1447-B771-F05C9D397949}" type="datetimeFigureOut">
               <a:rPr lang="en-US" smtClean="0"/>
-              <a:t>10/8/14</a:t>
+              <a:t>10/10/2014</a:t>
             </a:fld>
             <a:endParaRPr lang="en-US" dirty="0"/>
           </a:p>
@@ -378,7 +410,7 @@
           <a:p>
             <a:fld id="{DE4C9721-1813-4A55-A5DA-76417DB5EE62}" type="datetimeFigureOut">
               <a:rPr lang="en-US" smtClean="0"/>
-              <a:t>10/8/14</a:t>
+              <a:t>10/10/2014</a:t>
             </a:fld>
             <a:endParaRPr lang="en-US" dirty="0"/>
           </a:p>
@@ -1019,7 +1051,7 @@
           <a:p>
             <a:fld id="{1A6A9824-C09F-4166-9A2C-6C9FA577887A}" type="datetimeFigureOut">
               <a:rPr lang="en-US" smtClean="0"/>
-              <a:t>10/8/14</a:t>
+              <a:t>10/10/2014</a:t>
             </a:fld>
             <a:endParaRPr lang="en-US" dirty="0"/>
           </a:p>
@@ -1189,7 +1221,7 @@
           <a:p>
             <a:fld id="{1A6A9824-C09F-4166-9A2C-6C9FA577887A}" type="datetimeFigureOut">
               <a:rPr lang="en-US" smtClean="0"/>
-              <a:t>10/8/14</a:t>
+              <a:t>10/10/2014</a:t>
             </a:fld>
             <a:endParaRPr lang="en-US" dirty="0"/>
           </a:p>
@@ -1369,7 +1401,7 @@
           <a:p>
             <a:fld id="{1A6A9824-C09F-4166-9A2C-6C9FA577887A}" type="datetimeFigureOut">
               <a:rPr lang="en-US" smtClean="0"/>
-              <a:t>10/8/14</a:t>
+              <a:t>10/10/2014</a:t>
             </a:fld>
             <a:endParaRPr lang="en-US" dirty="0"/>
           </a:p>
@@ -1539,7 +1571,7 @@
           <a:p>
             <a:fld id="{1A6A9824-C09F-4166-9A2C-6C9FA577887A}" type="datetimeFigureOut">
               <a:rPr lang="en-US" smtClean="0"/>
-              <a:t>10/8/14</a:t>
+              <a:t>10/10/2014</a:t>
             </a:fld>
             <a:endParaRPr lang="en-US" dirty="0"/>
           </a:p>
@@ -1785,7 +1817,7 @@
           <a:p>
             <a:fld id="{1A6A9824-C09F-4166-9A2C-6C9FA577887A}" type="datetimeFigureOut">
               <a:rPr lang="en-US" smtClean="0"/>
-              <a:t>10/8/14</a:t>
+              <a:t>10/10/2014</a:t>
             </a:fld>
             <a:endParaRPr lang="en-US" dirty="0"/>
           </a:p>
@@ -2073,7 +2105,7 @@
           <a:p>
             <a:fld id="{1A6A9824-C09F-4166-9A2C-6C9FA577887A}" type="datetimeFigureOut">
               <a:rPr lang="en-US" smtClean="0"/>
-              <a:t>10/8/14</a:t>
+              <a:t>10/10/2014</a:t>
             </a:fld>
             <a:endParaRPr lang="en-US" dirty="0"/>
           </a:p>
@@ -2495,7 +2527,7 @@
           <a:p>
             <a:fld id="{1A6A9824-C09F-4166-9A2C-6C9FA577887A}" type="datetimeFigureOut">
               <a:rPr lang="en-US" smtClean="0"/>
-              <a:t>10/8/14</a:t>
+              <a:t>10/10/2014</a:t>
             </a:fld>
             <a:endParaRPr lang="en-US" dirty="0"/>
           </a:p>
@@ -2613,7 +2645,7 @@
           <a:p>
             <a:fld id="{1A6A9824-C09F-4166-9A2C-6C9FA577887A}" type="datetimeFigureOut">
               <a:rPr lang="en-US" smtClean="0"/>
-              <a:t>10/8/14</a:t>
+              <a:t>10/10/2014</a:t>
             </a:fld>
             <a:endParaRPr lang="en-US" dirty="0"/>
           </a:p>
@@ -2708,7 +2740,7 @@
           <a:p>
             <a:fld id="{1A6A9824-C09F-4166-9A2C-6C9FA577887A}" type="datetimeFigureOut">
               <a:rPr lang="en-US" smtClean="0"/>
-              <a:t>10/8/14</a:t>
+              <a:t>10/10/2014</a:t>
             </a:fld>
             <a:endParaRPr lang="en-US" dirty="0"/>
           </a:p>
@@ -2985,7 +3017,7 @@
           <a:p>
             <a:fld id="{1A6A9824-C09F-4166-9A2C-6C9FA577887A}" type="datetimeFigureOut">
               <a:rPr lang="en-US" smtClean="0"/>
-              <a:t>10/8/14</a:t>
+              <a:t>10/10/2014</a:t>
             </a:fld>
             <a:endParaRPr lang="en-US" dirty="0"/>
           </a:p>
@@ -3242,7 +3274,7 @@
           <a:p>
             <a:fld id="{1A6A9824-C09F-4166-9A2C-6C9FA577887A}" type="datetimeFigureOut">
               <a:rPr lang="en-US" smtClean="0"/>
-              <a:t>10/8/14</a:t>
+              <a:t>10/10/2014</a:t>
             </a:fld>
             <a:endParaRPr lang="en-US" dirty="0"/>
           </a:p>
@@ -3387,7 +3419,7 @@
           <a:noFill/>
           <a:extLst>
             <a:ext uri="{909E8E84-426E-40dd-AFC4-6F175D3DCCD1}">
-              <a14:hiddenFill xmlns:a14="http://schemas.microsoft.com/office/drawing/2010/main">
+              <a14:hiddenFill xmlns:a14="http://schemas.microsoft.com/office/drawing/2010/main" xmlns="">
                 <a:solidFill>
                   <a:srgbClr val="FFFFFF"/>
                 </a:solidFill>
@@ -3526,7 +3558,7 @@
           <a:p>
             <a:fld id="{1A6A9824-C09F-4166-9A2C-6C9FA577887A}" type="datetimeFigureOut">
               <a:rPr lang="en-US" smtClean="0"/>
-              <a:t>10/8/14</a:t>
+              <a:t>10/10/2014</a:t>
             </a:fld>
             <a:endParaRPr lang="en-US" dirty="0"/>
           </a:p>
@@ -3963,7 +3995,7 @@
           <a:noFill/>
           <a:extLst>
             <a:ext uri="{909E8E84-426E-40dd-AFC4-6F175D3DCCD1}">
-              <a14:hiddenFill xmlns:a14="http://schemas.microsoft.com/office/drawing/2010/main">
+              <a14:hiddenFill xmlns:a14="http://schemas.microsoft.com/office/drawing/2010/main" xmlns="">
                 <a:solidFill>
                   <a:srgbClr val="FFFFFF"/>
                 </a:solidFill>
@@ -4059,7 +4091,7 @@
   <p:timing>
     <p:tnLst>
       <p:par>
-        <p:cTn xmlns:p14="http://schemas.microsoft.com/office/powerpoint/2010/main" id="1" dur="indefinite" restart="never" nodeType="tmRoot"/>
+        <p:cTn id="1" dur="indefinite" restart="never" nodeType="tmRoot"/>
       </p:par>
     </p:tnLst>
   </p:timing>
@@ -4095,12 +4127,14 @@
         </p:nvSpPr>
         <p:spPr/>
         <p:txBody>
-          <a:bodyPr/>
+          <a:bodyPr>
+            <a:normAutofit/>
+          </a:bodyPr>
           <a:lstStyle/>
           <a:p>
             <a:r>
-              <a:rPr lang="en-US" dirty="0"/>
-              <a:t>Add Google Play Services Library</a:t>
+              <a:rPr lang="en-US" sz="3600" dirty="0"/>
+              <a:t>Add Google Play Services Library - Eclipse</a:t>
             </a:r>
           </a:p>
         </p:txBody>
@@ -4117,8 +4151,8 @@
         </p:nvSpPr>
         <p:spPr>
           <a:xfrm>
-            <a:off x="457200" y="1600201"/>
-            <a:ext cx="8229600" cy="2819400"/>
+            <a:off x="457200" y="1600200"/>
+            <a:ext cx="8229600" cy="4267199"/>
           </a:xfrm>
         </p:spPr>
         <p:txBody>
@@ -4128,105 +4162,65 @@
           <a:lstStyle/>
           <a:p>
             <a:r>
+              <a:rPr lang="en-US" sz="2800" dirty="0"/>
+              <a:t>Add Project Reference </a:t>
+            </a:r>
+            <a:r>
+              <a:rPr lang="en-US" sz="2800" dirty="0" smtClean="0"/>
+              <a:t>for library project to </a:t>
+            </a:r>
+            <a:r>
+              <a:rPr lang="en-US" sz="2800" dirty="0"/>
+              <a:t>your Android app project</a:t>
+            </a:r>
+          </a:p>
+          <a:p>
+            <a:pPr lvl="1"/>
+            <a:r>
+              <a:rPr lang="en-US" sz="2400" dirty="0" smtClean="0"/>
+              <a:t>Right-click on Android app project and select Properties</a:t>
+            </a:r>
+          </a:p>
+          <a:p>
+            <a:pPr lvl="1"/>
+            <a:r>
+              <a:rPr lang="en-US" sz="2400" dirty="0" smtClean="0"/>
+              <a:t>Select </a:t>
+            </a:r>
+            <a:r>
               <a:rPr lang="en-US" sz="2400" dirty="0"/>
-              <a:t>Add Project Reference </a:t>
+              <a:t>the "Android" properties </a:t>
             </a:r>
             <a:r>
               <a:rPr lang="en-US" sz="2400" dirty="0" smtClean="0"/>
-              <a:t>for library project to </a:t>
-            </a:r>
-            <a:r>
-              <a:rPr lang="en-US" sz="2400" dirty="0"/>
-              <a:t>your Android app project</a:t>
+              <a:t>group</a:t>
             </a:r>
           </a:p>
           <a:p>
             <a:pPr lvl="1"/>
             <a:r>
-              <a:rPr lang="en-US" sz="2000" dirty="0" smtClean="0"/>
-              <a:t>Right-click on Android app project and select Properties</a:t>
-            </a:r>
-          </a:p>
-          <a:p>
-            <a:pPr lvl="1"/>
-            <a:r>
-              <a:rPr lang="en-US" sz="2000" dirty="0" smtClean="0"/>
-              <a:t>Select </a:t>
-            </a:r>
-            <a:r>
-              <a:rPr lang="en-US" sz="2000" dirty="0"/>
-              <a:t>the "Android" properties </a:t>
-            </a:r>
-            <a:r>
-              <a:rPr lang="en-US" sz="2000" dirty="0" smtClean="0"/>
-              <a:t>group</a:t>
-            </a:r>
-          </a:p>
-          <a:p>
-            <a:pPr lvl="1"/>
-            <a:r>
-              <a:rPr lang="en-US" sz="2000" dirty="0" smtClean="0"/>
-              <a:t>Click Add… under Library and select google-play-services_lib</a:t>
-            </a:r>
-          </a:p>
-          <a:p>
-            <a:r>
               <a:rPr lang="en-US" sz="2400" dirty="0" smtClean="0"/>
-              <a:t>Add the following as a child of </a:t>
-            </a:r>
-            <a:r>
-              <a:rPr lang="en-US" sz="2400" dirty="0" smtClean="0">
-                <a:latin typeface="Courier"/>
-                <a:cs typeface="Courier"/>
-              </a:rPr>
-              <a:t>&lt;application&gt;</a:t>
+              <a:t>Click Add… under Library and select the imported google-play-</a:t>
+            </a:r>
+            <a:r>
+              <a:rPr lang="en-US" sz="2400" dirty="0" err="1" smtClean="0"/>
+              <a:t>services_lib</a:t>
             </a:r>
             <a:r>
               <a:rPr lang="en-US" sz="2400" dirty="0" smtClean="0"/>
-              <a:t> inside AndroidManifest.xml</a:t>
-            </a:r>
-          </a:p>
-        </p:txBody>
-      </p:sp>
-      <p:sp>
-        <p:nvSpPr>
-          <p:cNvPr id="4" name="TextBox 3"/>
-          <p:cNvSpPr txBox="1"/>
-          <p:nvPr/>
-        </p:nvSpPr>
-        <p:spPr>
-          <a:xfrm>
-            <a:off x="533400" y="4495800"/>
-            <a:ext cx="8153400" cy="685800"/>
-          </a:xfrm>
-          <a:prstGeom prst="rect">
-            <a:avLst/>
-          </a:prstGeom>
-          <a:solidFill>
-            <a:schemeClr val="bg1">
-              <a:lumMod val="85000"/>
-            </a:schemeClr>
-          </a:solidFill>
-          <a:ln>
-            <a:solidFill>
-              <a:schemeClr val="tx1"/>
-            </a:solidFill>
-          </a:ln>
-        </p:spPr>
-        <p:txBody>
-          <a:bodyPr wrap="square" rtlCol="0">
-            <a:noAutofit/>
-          </a:bodyPr>
-          <a:lstStyle/>
-          <a:p>
-            <a:pPr lvl="1"/>
-            <a:r>
-              <a:rPr lang="en-US" sz="1600" dirty="0">
-                <a:latin typeface="Courier"/>
-                <a:cs typeface="Courier"/>
-              </a:rPr>
-              <a:t>&lt;meta-data android:name="com.google.android.gms.version" android:value="@integer/google_play_services_version" /&gt;</a:t>
-            </a:r>
+              <a:t> </a:t>
+            </a:r>
+            <a:r>
+              <a:rPr lang="en-US" sz="2400" dirty="0" smtClean="0"/>
+              <a:t>project</a:t>
+            </a:r>
+          </a:p>
+          <a:p>
+            <a:r>
+              <a:rPr lang="en-US" dirty="0" smtClean="0"/>
+              <a:t>DEMO</a:t>
+            </a:r>
+            <a:endParaRPr lang="en-US" dirty="0" smtClean="0"/>
           </a:p>
         </p:txBody>
       </p:sp>
@@ -4272,13 +4266,23 @@
         </p:nvSpPr>
         <p:spPr/>
         <p:txBody>
-          <a:bodyPr/>
+          <a:bodyPr>
+            <a:noAutofit/>
+          </a:bodyPr>
           <a:lstStyle/>
           <a:p>
             <a:r>
-              <a:rPr lang="en-US" dirty="0"/>
-              <a:t>Add Google Play Services Library</a:t>
-            </a:r>
+              <a:rPr lang="en-US" sz="3600" dirty="0" smtClean="0"/>
+              <a:t>Add Google Play Services Library –</a:t>
+            </a:r>
+            <a:br>
+              <a:rPr lang="en-US" sz="3600" dirty="0" smtClean="0"/>
+            </a:br>
+            <a:r>
+              <a:rPr lang="en-US" sz="3600" dirty="0" smtClean="0"/>
+              <a:t>Android Studio</a:t>
+            </a:r>
+            <a:endParaRPr lang="en-US" sz="3600" dirty="0"/>
           </a:p>
         </p:txBody>
       </p:sp>
@@ -4294,8 +4298,8 @@
         </p:nvSpPr>
         <p:spPr>
           <a:xfrm>
-            <a:off x="457200" y="1600201"/>
-            <a:ext cx="8229600" cy="1219199"/>
+            <a:off x="457200" y="1608827"/>
+            <a:ext cx="8229600" cy="1362973"/>
           </a:xfrm>
         </p:spPr>
         <p:txBody>
@@ -4306,18 +4310,38 @@
           <a:p>
             <a:r>
               <a:rPr lang="en-US" sz="2400" dirty="0" smtClean="0"/>
-              <a:t>To prevent ProGuard from stripping away required classes, add the following lines in the file</a:t>
-            </a:r>
-            <a:br>
+              <a:t>New Android build system based on </a:t>
+            </a:r>
+            <a:r>
+              <a:rPr lang="en-US" sz="2400" dirty="0" err="1" smtClean="0"/>
+              <a:t>Gradle</a:t>
+            </a:r>
+            <a:endParaRPr lang="en-US" sz="2400" dirty="0" smtClean="0"/>
+          </a:p>
+          <a:p>
+            <a:r>
               <a:rPr lang="en-US" sz="2400" dirty="0" smtClean="0"/>
-            </a:br>
+              <a:t>Much </a:t>
+            </a:r>
             <a:r>
               <a:rPr lang="en-US" sz="2400" dirty="0" smtClean="0"/>
-              <a:t>&lt;project_directory&gt;/proguard-project.txt:</a:t>
-            </a:r>
-          </a:p>
-          <a:p>
-            <a:endParaRPr lang="en-US" sz="2000" dirty="0" smtClean="0"/>
+              <a:t>simpler...</a:t>
+            </a:r>
+          </a:p>
+          <a:p>
+            <a:r>
+              <a:rPr lang="en-US" sz="2400" dirty="0" smtClean="0"/>
+              <a:t>Inside </a:t>
+            </a:r>
+            <a:r>
+              <a:rPr lang="en-US" sz="2400" dirty="0" err="1" smtClean="0"/>
+              <a:t>build.gradle</a:t>
+            </a:r>
+            <a:r>
+              <a:rPr lang="en-US" sz="2400" dirty="0" smtClean="0"/>
+              <a:t>, add the following dependencies</a:t>
+            </a:r>
+            <a:endParaRPr lang="en-US" sz="2400" dirty="0"/>
           </a:p>
         </p:txBody>
       </p:sp>
@@ -4330,7 +4354,7 @@
         <p:spPr>
           <a:xfrm>
             <a:off x="457200" y="2971800"/>
-            <a:ext cx="8229600" cy="2492990"/>
+            <a:ext cx="8229600" cy="830997"/>
           </a:xfrm>
           <a:prstGeom prst="rect">
             <a:avLst/>
@@ -4353,127 +4377,137 @@
           <a:lstStyle/>
           <a:p>
             <a:r>
+              <a:rPr lang="en-US" sz="1200" dirty="0" smtClean="0">
+                <a:latin typeface="Courier"/>
+              </a:rPr>
+              <a:t>dependencies </a:t>
+            </a:r>
+            <a:r>
               <a:rPr lang="en-US" sz="1200" dirty="0">
                 <a:latin typeface="Courier"/>
-                <a:cs typeface="Courier"/>
               </a:rPr>
-              <a:t>-keep class * extends java.util.ListResourceBundle {</a:t>
-            </a:r>
-          </a:p>
-          <a:p>
-            <a:r>
+              <a:t>{</a:t>
+            </a:r>
+            <a:br>
               <a:rPr lang="en-US" sz="1200" dirty="0">
                 <a:latin typeface="Courier"/>
-                <a:cs typeface="Courier"/>
               </a:rPr>
-              <a:t>    protected Object[][] getContents();</a:t>
-            </a:r>
-          </a:p>
-          <a:p>
+            </a:br>
             <a:r>
               <a:rPr lang="en-US" sz="1200" dirty="0">
                 <a:latin typeface="Courier"/>
-                <a:cs typeface="Courier"/>
+              </a:rPr>
+              <a:t>    compile </a:t>
+            </a:r>
+            <a:r>
+              <a:rPr lang="en-US" sz="1200" b="1" dirty="0">
+                <a:latin typeface="Courier"/>
+              </a:rPr>
+              <a:t>'com.android.support:appcompat-v7:20.+'</a:t>
+            </a:r>
+            <a:br>
+              <a:rPr lang="en-US" sz="1200" b="1" dirty="0">
+                <a:latin typeface="Courier"/>
+              </a:rPr>
+            </a:br>
+            <a:r>
+              <a:rPr lang="en-US" sz="1200" b="1" dirty="0">
+                <a:latin typeface="Courier"/>
+              </a:rPr>
+              <a:t>    </a:t>
+            </a:r>
+            <a:r>
+              <a:rPr lang="en-US" sz="1200" dirty="0">
+                <a:latin typeface="Courier"/>
+              </a:rPr>
+              <a:t>compile </a:t>
+            </a:r>
+            <a:r>
+              <a:rPr lang="en-US" sz="1200" b="1" dirty="0">
+                <a:latin typeface="Courier"/>
+              </a:rPr>
+              <a:t>'com.google.android.gms:play-services:5.+'</a:t>
+            </a:r>
+            <a:br>
+              <a:rPr lang="en-US" sz="1200" b="1" dirty="0">
+                <a:latin typeface="Courier"/>
+              </a:rPr>
+            </a:br>
+            <a:r>
+              <a:rPr lang="en-US" sz="1200" dirty="0" smtClean="0">
+                <a:latin typeface="Courier"/>
               </a:rPr>
               <a:t>}</a:t>
             </a:r>
-          </a:p>
-          <a:p>
-            <a:r>
-              <a:rPr lang="en-US" sz="1200" dirty="0">
-                <a:latin typeface="Courier"/>
-                <a:cs typeface="Courier"/>
-              </a:rPr>
-              <a:t>-keep public class com.google.android.gms.common.internal.safeparcel.SafeParcelable {</a:t>
-            </a:r>
-          </a:p>
-          <a:p>
-            <a:r>
-              <a:rPr lang="en-US" sz="1200" dirty="0">
-                <a:latin typeface="Courier"/>
-                <a:cs typeface="Courier"/>
-              </a:rPr>
-              <a:t>    public static final *** NULL;</a:t>
-            </a:r>
-          </a:p>
-          <a:p>
-            <a:r>
-              <a:rPr lang="en-US" sz="1200" dirty="0">
-                <a:latin typeface="Courier"/>
-                <a:cs typeface="Courier"/>
-              </a:rPr>
-              <a:t>}</a:t>
-            </a:r>
-          </a:p>
-          <a:p>
-            <a:r>
-              <a:rPr lang="en-US" sz="1200" dirty="0">
-                <a:latin typeface="Courier"/>
-                <a:cs typeface="Courier"/>
-              </a:rPr>
-              <a:t>-keepnames @com.google.android.gms.common.annotation.KeepName class *</a:t>
-            </a:r>
-          </a:p>
-          <a:p>
-            <a:r>
-              <a:rPr lang="en-US" sz="1200" dirty="0">
-                <a:latin typeface="Courier"/>
-                <a:cs typeface="Courier"/>
-              </a:rPr>
-              <a:t>-keepclassmembernames class * {</a:t>
-            </a:r>
-          </a:p>
-          <a:p>
-            <a:r>
-              <a:rPr lang="en-US" sz="1200" dirty="0">
-                <a:latin typeface="Courier"/>
-                <a:cs typeface="Courier"/>
-              </a:rPr>
-              <a:t>    @com.google.android.gms.common.annotation.KeepName *;</a:t>
-            </a:r>
-          </a:p>
-          <a:p>
-            <a:r>
-              <a:rPr lang="en-US" sz="1200" dirty="0">
-                <a:latin typeface="Courier"/>
-                <a:cs typeface="Courier"/>
-              </a:rPr>
-              <a:t>}</a:t>
-            </a:r>
-          </a:p>
-          <a:p>
-            <a:r>
-              <a:rPr lang="en-US" sz="1200" dirty="0">
-                <a:latin typeface="Courier"/>
-                <a:cs typeface="Courier"/>
-              </a:rPr>
-              <a:t>-keepnames class * implements android.os.Parcelable {</a:t>
-            </a:r>
-          </a:p>
-          <a:p>
-            <a:r>
-              <a:rPr lang="en-US" sz="1200" dirty="0">
-                <a:latin typeface="Courier"/>
-                <a:cs typeface="Courier"/>
-              </a:rPr>
-              <a:t>    public static final ** CREATOR;</a:t>
-            </a:r>
-          </a:p>
-          <a:p>
-            <a:r>
-              <a:rPr lang="en-US" sz="1200" dirty="0">
-                <a:latin typeface="Courier"/>
-                <a:cs typeface="Courier"/>
-              </a:rPr>
-              <a:t>}</a:t>
-            </a:r>
+            <a:endParaRPr lang="en-US" sz="1200" dirty="0">
+              <a:latin typeface="Courier"/>
+              <a:cs typeface="Courier"/>
+            </a:endParaRPr>
+          </a:p>
+        </p:txBody>
+      </p:sp>
+      <p:sp>
+        <p:nvSpPr>
+          <p:cNvPr id="5" name="Rectangle 4"/>
+          <p:cNvSpPr/>
+          <p:nvPr/>
+        </p:nvSpPr>
+        <p:spPr>
+          <a:xfrm>
+            <a:off x="457200" y="3886200"/>
+            <a:ext cx="8229600" cy="1938992"/>
+          </a:xfrm>
+          <a:prstGeom prst="rect">
+            <a:avLst/>
+          </a:prstGeom>
+        </p:spPr>
+        <p:txBody>
+          <a:bodyPr wrap="square">
+            <a:spAutoFit/>
+          </a:bodyPr>
+          <a:lstStyle/>
+          <a:p>
+            <a:pPr marL="342900" indent="-342900">
+              <a:buFont typeface="Arial" panose="020B0604020202020204" pitchFamily="34" charset="0"/>
+              <a:buChar char="•"/>
+            </a:pPr>
+            <a:r>
+              <a:rPr lang="en-US" sz="2400" dirty="0" err="1" smtClean="0"/>
+              <a:t>Gradle</a:t>
+            </a:r>
+            <a:r>
+              <a:rPr lang="en-US" sz="2400" dirty="0" smtClean="0"/>
+              <a:t> build will run these tasks to get dependencies from Android SDK</a:t>
+            </a:r>
+            <a:br>
+              <a:rPr lang="en-US" sz="2400" dirty="0" smtClean="0"/>
+            </a:br>
+            <a:r>
+              <a:rPr lang="en-US" sz="2400" dirty="0" smtClean="0"/>
+              <a:t>:prepareComAndroidSupportAppcompatV72000Library</a:t>
+            </a:r>
+            <a:br>
+              <a:rPr lang="en-US" sz="2400" dirty="0" smtClean="0"/>
+            </a:br>
+            <a:r>
+              <a:rPr lang="en-US" sz="2400" dirty="0" smtClean="0"/>
+              <a:t>:prepareComAndroidSupportSupportV42000Library</a:t>
+            </a:r>
+            <a:br>
+              <a:rPr lang="en-US" sz="2400" dirty="0" smtClean="0"/>
+            </a:br>
+            <a:r>
+              <a:rPr lang="en-US" sz="2400" dirty="0" smtClean="0"/>
+              <a:t>:prepareComGoogleAndroidGmsPlayServices5089Library</a:t>
+            </a:r>
+            <a:endParaRPr lang="en-US" sz="2400" dirty="0"/>
           </a:p>
         </p:txBody>
       </p:sp>
     </p:spTree>
     <p:extLst>
       <p:ext uri="{BB962C8B-B14F-4D97-AF65-F5344CB8AC3E}">
-        <p14:creationId xmlns:p14="http://schemas.microsoft.com/office/powerpoint/2010/main" val="3578448808"/>
+        <p14:creationId xmlns:p14="http://schemas.microsoft.com/office/powerpoint/2010/main" val="3695063026"/>
       </p:ext>
     </p:extLst>
   </p:cSld>
@@ -4512,105 +4546,586 @@
         </p:nvSpPr>
         <p:spPr/>
         <p:txBody>
-          <a:bodyPr>
+          <a:bodyPr/>
+          <a:lstStyle/>
+          <a:p>
+            <a:r>
+              <a:rPr lang="en-US" dirty="0"/>
+              <a:t>Add Google Play Services Library</a:t>
+            </a:r>
+          </a:p>
+        </p:txBody>
+      </p:sp>
+      <p:sp>
+        <p:nvSpPr>
+          <p:cNvPr id="4" name="Content Placeholder 3"/>
+          <p:cNvSpPr txBox="1">
+            <a:spLocks noGrp="1"/>
+          </p:cNvSpPr>
+          <p:nvPr>
+            <p:ph idx="1"/>
+          </p:nvPr>
+        </p:nvSpPr>
+        <p:spPr>
+          <a:xfrm>
+            <a:off x="457200" y="2286000"/>
+            <a:ext cx="8229600" cy="457200"/>
+          </a:xfrm>
+          <a:prstGeom prst="rect">
+            <a:avLst/>
+          </a:prstGeom>
+          <a:solidFill>
+            <a:schemeClr val="bg1">
+              <a:lumMod val="85000"/>
+            </a:schemeClr>
+          </a:solidFill>
+          <a:ln>
+            <a:solidFill>
+              <a:schemeClr val="tx1"/>
+            </a:solidFill>
+          </a:ln>
+        </p:spPr>
+        <p:txBody>
+          <a:bodyPr wrap="square" rtlCol="0">
+            <a:noAutofit/>
+          </a:bodyPr>
+          <a:lstStyle/>
+          <a:p>
+            <a:pPr marL="457200" lvl="1" indent="0">
+              <a:buNone/>
+            </a:pPr>
+            <a:r>
+              <a:rPr lang="en-US" sz="1200" dirty="0" smtClean="0">
+                <a:latin typeface="Courier"/>
+                <a:cs typeface="Courier"/>
+              </a:rPr>
+              <a:t>&lt;</a:t>
+            </a:r>
+            <a:r>
+              <a:rPr lang="en-US" sz="1200" dirty="0">
+                <a:latin typeface="Courier"/>
+                <a:cs typeface="Courier"/>
+              </a:rPr>
+              <a:t>meta-data android:name="com.google.android.gms.version" android:value="@integer/google_play_services_version" /&gt;</a:t>
+            </a:r>
+          </a:p>
+        </p:txBody>
+      </p:sp>
+      <p:sp>
+        <p:nvSpPr>
+          <p:cNvPr id="5" name="Content Placeholder 2"/>
+          <p:cNvSpPr txBox="1">
+            <a:spLocks/>
+          </p:cNvSpPr>
+          <p:nvPr/>
+        </p:nvSpPr>
+        <p:spPr>
+          <a:xfrm>
+            <a:off x="457200" y="1600201"/>
+            <a:ext cx="8229600" cy="685799"/>
+          </a:xfrm>
+          <a:prstGeom prst="rect">
+            <a:avLst/>
+          </a:prstGeom>
+        </p:spPr>
+        <p:txBody>
+          <a:bodyPr vert="horz" lIns="91440" tIns="45720" rIns="91440" bIns="45720" rtlCol="0">
+            <a:noAutofit/>
+          </a:bodyPr>
+          <a:lstStyle>
+            <a:lvl1pPr marL="342900" indent="-342900" algn="l" defTabSz="914400" rtl="0" eaLnBrk="1" latinLnBrk="0" hangingPunct="1">
+              <a:spcBef>
+                <a:spcPct val="20000"/>
+              </a:spcBef>
+              <a:buFont typeface="Arial" panose="020B0604020202020204" pitchFamily="34" charset="0"/>
+              <a:buChar char="•"/>
+              <a:defRPr sz="3200" kern="1200">
+                <a:solidFill>
+                  <a:schemeClr val="tx1"/>
+                </a:solidFill>
+                <a:latin typeface="+mn-lt"/>
+                <a:ea typeface="+mn-ea"/>
+                <a:cs typeface="+mn-cs"/>
+              </a:defRPr>
+            </a:lvl1pPr>
+            <a:lvl2pPr marL="742950" indent="-285750" algn="l" defTabSz="914400" rtl="0" eaLnBrk="1" latinLnBrk="0" hangingPunct="1">
+              <a:spcBef>
+                <a:spcPct val="20000"/>
+              </a:spcBef>
+              <a:buFont typeface="Arial" panose="020B0604020202020204" pitchFamily="34" charset="0"/>
+              <a:buChar char="–"/>
+              <a:defRPr sz="2800" kern="1200">
+                <a:solidFill>
+                  <a:schemeClr val="tx1"/>
+                </a:solidFill>
+                <a:latin typeface="+mn-lt"/>
+                <a:ea typeface="+mn-ea"/>
+                <a:cs typeface="+mn-cs"/>
+              </a:defRPr>
+            </a:lvl2pPr>
+            <a:lvl3pPr marL="1143000" indent="-228600" algn="l" defTabSz="914400" rtl="0" eaLnBrk="1" latinLnBrk="0" hangingPunct="1">
+              <a:spcBef>
+                <a:spcPct val="20000"/>
+              </a:spcBef>
+              <a:buFont typeface="Arial" panose="020B0604020202020204" pitchFamily="34" charset="0"/>
+              <a:buChar char="•"/>
+              <a:defRPr sz="2400" kern="1200">
+                <a:solidFill>
+                  <a:schemeClr val="tx1"/>
+                </a:solidFill>
+                <a:latin typeface="+mn-lt"/>
+                <a:ea typeface="+mn-ea"/>
+                <a:cs typeface="+mn-cs"/>
+              </a:defRPr>
+            </a:lvl3pPr>
+            <a:lvl4pPr marL="1600200" indent="-228600" algn="l" defTabSz="914400" rtl="0" eaLnBrk="1" latinLnBrk="0" hangingPunct="1">
+              <a:spcBef>
+                <a:spcPct val="20000"/>
+              </a:spcBef>
+              <a:buFont typeface="Arial" panose="020B0604020202020204" pitchFamily="34" charset="0"/>
+              <a:buChar char="–"/>
+              <a:defRPr sz="2000" kern="1200">
+                <a:solidFill>
+                  <a:schemeClr val="tx1"/>
+                </a:solidFill>
+                <a:latin typeface="+mn-lt"/>
+                <a:ea typeface="+mn-ea"/>
+                <a:cs typeface="+mn-cs"/>
+              </a:defRPr>
+            </a:lvl4pPr>
+            <a:lvl5pPr marL="2057400" indent="-228600" algn="l" defTabSz="914400" rtl="0" eaLnBrk="1" latinLnBrk="0" hangingPunct="1">
+              <a:spcBef>
+                <a:spcPct val="20000"/>
+              </a:spcBef>
+              <a:buFont typeface="Arial" panose="020B0604020202020204" pitchFamily="34" charset="0"/>
+              <a:buChar char="»"/>
+              <a:defRPr sz="2000" kern="1200">
+                <a:solidFill>
+                  <a:schemeClr val="tx1"/>
+                </a:solidFill>
+                <a:latin typeface="+mn-lt"/>
+                <a:ea typeface="+mn-ea"/>
+                <a:cs typeface="+mn-cs"/>
+              </a:defRPr>
+            </a:lvl5pPr>
+            <a:lvl6pPr marL="2514600" indent="-228600" algn="l" defTabSz="914400" rtl="0" eaLnBrk="1" latinLnBrk="0" hangingPunct="1">
+              <a:spcBef>
+                <a:spcPct val="20000"/>
+              </a:spcBef>
+              <a:buFont typeface="Arial" panose="020B0604020202020204" pitchFamily="34" charset="0"/>
+              <a:buChar char="•"/>
+              <a:defRPr sz="2000" kern="1200">
+                <a:solidFill>
+                  <a:schemeClr val="tx1"/>
+                </a:solidFill>
+                <a:latin typeface="+mn-lt"/>
+                <a:ea typeface="+mn-ea"/>
+                <a:cs typeface="+mn-cs"/>
+              </a:defRPr>
+            </a:lvl6pPr>
+            <a:lvl7pPr marL="2971800" indent="-228600" algn="l" defTabSz="914400" rtl="0" eaLnBrk="1" latinLnBrk="0" hangingPunct="1">
+              <a:spcBef>
+                <a:spcPct val="20000"/>
+              </a:spcBef>
+              <a:buFont typeface="Arial" panose="020B0604020202020204" pitchFamily="34" charset="0"/>
+              <a:buChar char="•"/>
+              <a:defRPr sz="2000" kern="1200">
+                <a:solidFill>
+                  <a:schemeClr val="tx1"/>
+                </a:solidFill>
+                <a:latin typeface="+mn-lt"/>
+                <a:ea typeface="+mn-ea"/>
+                <a:cs typeface="+mn-cs"/>
+              </a:defRPr>
+            </a:lvl7pPr>
+            <a:lvl8pPr marL="3429000" indent="-228600" algn="l" defTabSz="914400" rtl="0" eaLnBrk="1" latinLnBrk="0" hangingPunct="1">
+              <a:spcBef>
+                <a:spcPct val="20000"/>
+              </a:spcBef>
+              <a:buFont typeface="Arial" panose="020B0604020202020204" pitchFamily="34" charset="0"/>
+              <a:buChar char="•"/>
+              <a:defRPr sz="2000" kern="1200">
+                <a:solidFill>
+                  <a:schemeClr val="tx1"/>
+                </a:solidFill>
+                <a:latin typeface="+mn-lt"/>
+                <a:ea typeface="+mn-ea"/>
+                <a:cs typeface="+mn-cs"/>
+              </a:defRPr>
+            </a:lvl8pPr>
+            <a:lvl9pPr marL="3886200" indent="-228600" algn="l" defTabSz="914400" rtl="0" eaLnBrk="1" latinLnBrk="0" hangingPunct="1">
+              <a:spcBef>
+                <a:spcPct val="20000"/>
+              </a:spcBef>
+              <a:buFont typeface="Arial" panose="020B0604020202020204" pitchFamily="34" charset="0"/>
+              <a:buChar char="•"/>
+              <a:defRPr sz="2000" kern="1200">
+                <a:solidFill>
+                  <a:schemeClr val="tx1"/>
+                </a:solidFill>
+                <a:latin typeface="+mn-lt"/>
+                <a:ea typeface="+mn-ea"/>
+                <a:cs typeface="+mn-cs"/>
+              </a:defRPr>
+            </a:lvl9pPr>
+          </a:lstStyle>
+          <a:p>
+            <a:r>
+              <a:rPr lang="en-US" sz="2000" dirty="0" smtClean="0"/>
+              <a:t>Add the following as a child of </a:t>
+            </a:r>
+            <a:r>
+              <a:rPr lang="en-US" sz="2000" dirty="0" smtClean="0">
+                <a:latin typeface="Courier"/>
+                <a:cs typeface="Courier"/>
+              </a:rPr>
+              <a:t>&lt;application&gt;</a:t>
+            </a:r>
+            <a:r>
+              <a:rPr lang="en-US" sz="2000" dirty="0" smtClean="0"/>
+              <a:t> inside AndroidManifest.xml</a:t>
+            </a:r>
+          </a:p>
+        </p:txBody>
+      </p:sp>
+      <p:sp>
+        <p:nvSpPr>
+          <p:cNvPr id="6" name="TextBox 5"/>
+          <p:cNvSpPr txBox="1"/>
+          <p:nvPr/>
+        </p:nvSpPr>
+        <p:spPr>
+          <a:xfrm>
+            <a:off x="457200" y="3437625"/>
+            <a:ext cx="8229600" cy="2492990"/>
+          </a:xfrm>
+          <a:prstGeom prst="rect">
+            <a:avLst/>
+          </a:prstGeom>
+          <a:solidFill>
+            <a:schemeClr val="bg1">
+              <a:lumMod val="85000"/>
+            </a:schemeClr>
+          </a:solidFill>
+          <a:ln>
+            <a:solidFill>
+              <a:schemeClr val="tx1"/>
+            </a:solidFill>
+          </a:ln>
+        </p:spPr>
+        <p:txBody>
+          <a:bodyPr wrap="square" rtlCol="0">
+            <a:spAutoFit/>
+          </a:bodyPr>
+          <a:lstStyle/>
+          <a:p>
+            <a:r>
+              <a:rPr lang="en-US" sz="1200" dirty="0">
+                <a:latin typeface="Courier"/>
+                <a:cs typeface="Courier"/>
+              </a:rPr>
+              <a:t>-keep class * extends java.util.ListResourceBundle {</a:t>
+            </a:r>
+          </a:p>
+          <a:p>
+            <a:r>
+              <a:rPr lang="en-US" sz="1200" dirty="0">
+                <a:latin typeface="Courier"/>
+                <a:cs typeface="Courier"/>
+              </a:rPr>
+              <a:t>    protected Object[][] getContents();</a:t>
+            </a:r>
+          </a:p>
+          <a:p>
+            <a:r>
+              <a:rPr lang="en-US" sz="1200" dirty="0">
+                <a:latin typeface="Courier"/>
+                <a:cs typeface="Courier"/>
+              </a:rPr>
+              <a:t>}</a:t>
+            </a:r>
+          </a:p>
+          <a:p>
+            <a:r>
+              <a:rPr lang="en-US" sz="1200" dirty="0">
+                <a:latin typeface="Courier"/>
+                <a:cs typeface="Courier"/>
+              </a:rPr>
+              <a:t>-keep public class com.google.android.gms.common.internal.safeparcel.SafeParcelable {</a:t>
+            </a:r>
+          </a:p>
+          <a:p>
+            <a:r>
+              <a:rPr lang="en-US" sz="1200" dirty="0">
+                <a:latin typeface="Courier"/>
+                <a:cs typeface="Courier"/>
+              </a:rPr>
+              <a:t>    public static final *** NULL;</a:t>
+            </a:r>
+          </a:p>
+          <a:p>
+            <a:r>
+              <a:rPr lang="en-US" sz="1200" dirty="0">
+                <a:latin typeface="Courier"/>
+                <a:cs typeface="Courier"/>
+              </a:rPr>
+              <a:t>}</a:t>
+            </a:r>
+          </a:p>
+          <a:p>
+            <a:r>
+              <a:rPr lang="en-US" sz="1200" dirty="0">
+                <a:latin typeface="Courier"/>
+                <a:cs typeface="Courier"/>
+              </a:rPr>
+              <a:t>-keepnames @com.google.android.gms.common.annotation.KeepName class *</a:t>
+            </a:r>
+          </a:p>
+          <a:p>
+            <a:r>
+              <a:rPr lang="en-US" sz="1200" dirty="0">
+                <a:latin typeface="Courier"/>
+                <a:cs typeface="Courier"/>
+              </a:rPr>
+              <a:t>-keepclassmembernames class * {</a:t>
+            </a:r>
+          </a:p>
+          <a:p>
+            <a:r>
+              <a:rPr lang="en-US" sz="1200" dirty="0">
+                <a:latin typeface="Courier"/>
+                <a:cs typeface="Courier"/>
+              </a:rPr>
+              <a:t>    @com.google.android.gms.common.annotation.KeepName *;</a:t>
+            </a:r>
+          </a:p>
+          <a:p>
+            <a:r>
+              <a:rPr lang="en-US" sz="1200" dirty="0">
+                <a:latin typeface="Courier"/>
+                <a:cs typeface="Courier"/>
+              </a:rPr>
+              <a:t>}</a:t>
+            </a:r>
+          </a:p>
+          <a:p>
+            <a:r>
+              <a:rPr lang="en-US" sz="1200" dirty="0">
+                <a:latin typeface="Courier"/>
+                <a:cs typeface="Courier"/>
+              </a:rPr>
+              <a:t>-keepnames class * implements android.os.Parcelable {</a:t>
+            </a:r>
+          </a:p>
+          <a:p>
+            <a:r>
+              <a:rPr lang="en-US" sz="1200" dirty="0">
+                <a:latin typeface="Courier"/>
+                <a:cs typeface="Courier"/>
+              </a:rPr>
+              <a:t>    public static final ** CREATOR;</a:t>
+            </a:r>
+          </a:p>
+          <a:p>
+            <a:r>
+              <a:rPr lang="en-US" sz="1200" dirty="0">
+                <a:latin typeface="Courier"/>
+                <a:cs typeface="Courier"/>
+              </a:rPr>
+              <a:t>}</a:t>
+            </a:r>
+          </a:p>
+        </p:txBody>
+      </p:sp>
+      <p:sp>
+        <p:nvSpPr>
+          <p:cNvPr id="7" name="Content Placeholder 2"/>
+          <p:cNvSpPr txBox="1">
+            <a:spLocks/>
+          </p:cNvSpPr>
+          <p:nvPr/>
+        </p:nvSpPr>
+        <p:spPr>
+          <a:xfrm>
+            <a:off x="457200" y="2743200"/>
+            <a:ext cx="8229600" cy="766311"/>
+          </a:xfrm>
+          <a:prstGeom prst="rect">
+            <a:avLst/>
+          </a:prstGeom>
+        </p:spPr>
+        <p:txBody>
+          <a:bodyPr vert="horz" lIns="91440" tIns="45720" rIns="91440" bIns="45720" rtlCol="0">
             <a:normAutofit/>
           </a:bodyPr>
-          <a:lstStyle/>
-          <a:p>
-            <a:r>
-              <a:rPr lang="en-US" dirty="0"/>
-              <a:t>Check for Google Play </a:t>
-            </a:r>
-            <a:r>
-              <a:rPr lang="en-US" dirty="0" smtClean="0"/>
-              <a:t>Services</a:t>
-            </a:r>
-            <a:endParaRPr lang="en-US" dirty="0"/>
-          </a:p>
-        </p:txBody>
-      </p:sp>
-      <p:sp>
-        <p:nvSpPr>
-          <p:cNvPr id="3" name="Content Placeholder 2"/>
-          <p:cNvSpPr>
-            <a:spLocks noGrp="1"/>
-          </p:cNvSpPr>
-          <p:nvPr>
-            <p:ph idx="1"/>
-          </p:nvPr>
-        </p:nvSpPr>
-        <p:spPr/>
-        <p:txBody>
-          <a:bodyPr>
-            <a:normAutofit/>
-          </a:bodyPr>
-          <a:lstStyle/>
-          <a:p>
-            <a:r>
-              <a:rPr lang="en-US" sz="2400" dirty="0" smtClean="0"/>
-              <a:t>Apps relying on Google Play Services should check for compatible version</a:t>
-            </a:r>
-          </a:p>
-          <a:p>
-            <a:r>
-              <a:rPr lang="en-US" sz="2400" dirty="0" smtClean="0"/>
-              <a:t>Typically done in following main activity methods</a:t>
-            </a:r>
-          </a:p>
-          <a:p>
-            <a:pPr lvl="1"/>
+          <a:lstStyle>
+            <a:lvl1pPr marL="342900" indent="-342900" algn="l" defTabSz="914400" rtl="0" eaLnBrk="1" latinLnBrk="0" hangingPunct="1">
+              <a:spcBef>
+                <a:spcPct val="20000"/>
+              </a:spcBef>
+              <a:buFont typeface="Arial" panose="020B0604020202020204" pitchFamily="34" charset="0"/>
+              <a:buChar char="•"/>
+              <a:defRPr sz="3200" kern="1200">
+                <a:solidFill>
+                  <a:schemeClr val="tx1"/>
+                </a:solidFill>
+                <a:latin typeface="+mn-lt"/>
+                <a:ea typeface="+mn-ea"/>
+                <a:cs typeface="+mn-cs"/>
+              </a:defRPr>
+            </a:lvl1pPr>
+            <a:lvl2pPr marL="742950" indent="-285750" algn="l" defTabSz="914400" rtl="0" eaLnBrk="1" latinLnBrk="0" hangingPunct="1">
+              <a:spcBef>
+                <a:spcPct val="20000"/>
+              </a:spcBef>
+              <a:buFont typeface="Arial" panose="020B0604020202020204" pitchFamily="34" charset="0"/>
+              <a:buChar char="–"/>
+              <a:defRPr sz="2800" kern="1200">
+                <a:solidFill>
+                  <a:schemeClr val="tx1"/>
+                </a:solidFill>
+                <a:latin typeface="+mn-lt"/>
+                <a:ea typeface="+mn-ea"/>
+                <a:cs typeface="+mn-cs"/>
+              </a:defRPr>
+            </a:lvl2pPr>
+            <a:lvl3pPr marL="1143000" indent="-228600" algn="l" defTabSz="914400" rtl="0" eaLnBrk="1" latinLnBrk="0" hangingPunct="1">
+              <a:spcBef>
+                <a:spcPct val="20000"/>
+              </a:spcBef>
+              <a:buFont typeface="Arial" panose="020B0604020202020204" pitchFamily="34" charset="0"/>
+              <a:buChar char="•"/>
+              <a:defRPr sz="2400" kern="1200">
+                <a:solidFill>
+                  <a:schemeClr val="tx1"/>
+                </a:solidFill>
+                <a:latin typeface="+mn-lt"/>
+                <a:ea typeface="+mn-ea"/>
+                <a:cs typeface="+mn-cs"/>
+              </a:defRPr>
+            </a:lvl3pPr>
+            <a:lvl4pPr marL="1600200" indent="-228600" algn="l" defTabSz="914400" rtl="0" eaLnBrk="1" latinLnBrk="0" hangingPunct="1">
+              <a:spcBef>
+                <a:spcPct val="20000"/>
+              </a:spcBef>
+              <a:buFont typeface="Arial" panose="020B0604020202020204" pitchFamily="34" charset="0"/>
+              <a:buChar char="–"/>
+              <a:defRPr sz="2000" kern="1200">
+                <a:solidFill>
+                  <a:schemeClr val="tx1"/>
+                </a:solidFill>
+                <a:latin typeface="+mn-lt"/>
+                <a:ea typeface="+mn-ea"/>
+                <a:cs typeface="+mn-cs"/>
+              </a:defRPr>
+            </a:lvl4pPr>
+            <a:lvl5pPr marL="2057400" indent="-228600" algn="l" defTabSz="914400" rtl="0" eaLnBrk="1" latinLnBrk="0" hangingPunct="1">
+              <a:spcBef>
+                <a:spcPct val="20000"/>
+              </a:spcBef>
+              <a:buFont typeface="Arial" panose="020B0604020202020204" pitchFamily="34" charset="0"/>
+              <a:buChar char="»"/>
+              <a:defRPr sz="2000" kern="1200">
+                <a:solidFill>
+                  <a:schemeClr val="tx1"/>
+                </a:solidFill>
+                <a:latin typeface="+mn-lt"/>
+                <a:ea typeface="+mn-ea"/>
+                <a:cs typeface="+mn-cs"/>
+              </a:defRPr>
+            </a:lvl5pPr>
+            <a:lvl6pPr marL="2514600" indent="-228600" algn="l" defTabSz="914400" rtl="0" eaLnBrk="1" latinLnBrk="0" hangingPunct="1">
+              <a:spcBef>
+                <a:spcPct val="20000"/>
+              </a:spcBef>
+              <a:buFont typeface="Arial" panose="020B0604020202020204" pitchFamily="34" charset="0"/>
+              <a:buChar char="•"/>
+              <a:defRPr sz="2000" kern="1200">
+                <a:solidFill>
+                  <a:schemeClr val="tx1"/>
+                </a:solidFill>
+                <a:latin typeface="+mn-lt"/>
+                <a:ea typeface="+mn-ea"/>
+                <a:cs typeface="+mn-cs"/>
+              </a:defRPr>
+            </a:lvl6pPr>
+            <a:lvl7pPr marL="2971800" indent="-228600" algn="l" defTabSz="914400" rtl="0" eaLnBrk="1" latinLnBrk="0" hangingPunct="1">
+              <a:spcBef>
+                <a:spcPct val="20000"/>
+              </a:spcBef>
+              <a:buFont typeface="Arial" panose="020B0604020202020204" pitchFamily="34" charset="0"/>
+              <a:buChar char="•"/>
+              <a:defRPr sz="2000" kern="1200">
+                <a:solidFill>
+                  <a:schemeClr val="tx1"/>
+                </a:solidFill>
+                <a:latin typeface="+mn-lt"/>
+                <a:ea typeface="+mn-ea"/>
+                <a:cs typeface="+mn-cs"/>
+              </a:defRPr>
+            </a:lvl7pPr>
+            <a:lvl8pPr marL="3429000" indent="-228600" algn="l" defTabSz="914400" rtl="0" eaLnBrk="1" latinLnBrk="0" hangingPunct="1">
+              <a:spcBef>
+                <a:spcPct val="20000"/>
+              </a:spcBef>
+              <a:buFont typeface="Arial" panose="020B0604020202020204" pitchFamily="34" charset="0"/>
+              <a:buChar char="•"/>
+              <a:defRPr sz="2000" kern="1200">
+                <a:solidFill>
+                  <a:schemeClr val="tx1"/>
+                </a:solidFill>
+                <a:latin typeface="+mn-lt"/>
+                <a:ea typeface="+mn-ea"/>
+                <a:cs typeface="+mn-cs"/>
+              </a:defRPr>
+            </a:lvl8pPr>
+            <a:lvl9pPr marL="3886200" indent="-228600" algn="l" defTabSz="914400" rtl="0" eaLnBrk="1" latinLnBrk="0" hangingPunct="1">
+              <a:spcBef>
+                <a:spcPct val="20000"/>
+              </a:spcBef>
+              <a:buFont typeface="Arial" panose="020B0604020202020204" pitchFamily="34" charset="0"/>
+              <a:buChar char="•"/>
+              <a:defRPr sz="2000" kern="1200">
+                <a:solidFill>
+                  <a:schemeClr val="tx1"/>
+                </a:solidFill>
+                <a:latin typeface="+mn-lt"/>
+                <a:ea typeface="+mn-ea"/>
+                <a:cs typeface="+mn-cs"/>
+              </a:defRPr>
+            </a:lvl9pPr>
+          </a:lstStyle>
+          <a:p>
             <a:r>
               <a:rPr lang="en-US" sz="2000" dirty="0" smtClean="0"/>
-              <a:t>onCreate() – ensures app cannot be used without successful check</a:t>
-            </a:r>
-          </a:p>
-          <a:p>
-            <a:pPr lvl="1"/>
+              <a:t>To prevent </a:t>
+            </a:r>
+            <a:r>
+              <a:rPr lang="en-US" sz="2000" dirty="0" err="1" smtClean="0"/>
+              <a:t>ProGuard</a:t>
+            </a:r>
             <a:r>
               <a:rPr lang="en-US" sz="2000" dirty="0" smtClean="0"/>
-              <a:t>onResume() – ensures check is done when user returns to the app</a:t>
-            </a:r>
-          </a:p>
-          <a:p>
-            <a:r>
-              <a:rPr lang="en-US" sz="2400" dirty="0" smtClean="0"/>
-              <a:t>App can </a:t>
-            </a:r>
-            <a:r>
-              <a:rPr lang="en-US" sz="2400" dirty="0"/>
-              <a:t>call GooglePlayServicesUtil.getErrorDialog(</a:t>
-            </a:r>
-            <a:r>
-              <a:rPr lang="en-US" sz="2400" dirty="0" smtClean="0"/>
-              <a:t>) to:</a:t>
-            </a:r>
-          </a:p>
-          <a:p>
-            <a:pPr lvl="1"/>
+              <a:t> from stripping away required classes, add the following lines in the file &lt;</a:t>
+            </a:r>
+            <a:r>
+              <a:rPr lang="en-US" sz="2000" dirty="0" err="1" smtClean="0"/>
+              <a:t>project_directory</a:t>
+            </a:r>
             <a:r>
               <a:rPr lang="en-US" sz="2000" dirty="0" smtClean="0"/>
-              <a:t>Download APK from Google Play Store or</a:t>
-            </a:r>
-          </a:p>
-          <a:p>
-            <a:pPr lvl="1"/>
-            <a:r>
-              <a:rPr lang="en-US" sz="2000" dirty="0" smtClean="0"/>
-              <a:t>Enable it in device settings</a:t>
-            </a:r>
-          </a:p>
-          <a:p>
-            <a:r>
-              <a:rPr lang="en-US" sz="2400" dirty="0" smtClean="0"/>
-              <a:t>Code walkthrough</a:t>
-            </a:r>
+              <a:t>&gt;/proguard-project.txt:</a:t>
+            </a:r>
+          </a:p>
+          <a:p>
+            <a:endParaRPr lang="en-US" sz="1800" dirty="0" smtClean="0"/>
           </a:p>
         </p:txBody>
       </p:sp>
     </p:spTree>
     <p:extLst>
       <p:ext uri="{BB962C8B-B14F-4D97-AF65-F5344CB8AC3E}">
-        <p14:creationId xmlns:p14="http://schemas.microsoft.com/office/powerpoint/2010/main" val="606154861"/>
+        <p14:creationId xmlns:p14="http://schemas.microsoft.com/office/powerpoint/2010/main" val="1180308513"/>
       </p:ext>
     </p:extLst>
   </p:cSld>
@@ -4649,108 +5164,105 @@
         </p:nvSpPr>
         <p:spPr/>
         <p:txBody>
-          <a:bodyPr/>
-          <a:lstStyle/>
-          <a:p>
-            <a:r>
-              <a:rPr lang="en-US" dirty="0" smtClean="0"/>
-              <a:t>Register with GCM</a:t>
-            </a:r>
-            <a:endParaRPr lang="en-US" dirty="0"/>
-          </a:p>
-        </p:txBody>
-      </p:sp>
-      <p:sp>
-        <p:nvSpPr>
-          <p:cNvPr id="3" name="Content Placeholder 2"/>
-          <p:cNvSpPr>
-            <a:spLocks noGrp="1"/>
-          </p:cNvSpPr>
-          <p:nvPr>
-            <p:ph idx="1"/>
-          </p:nvPr>
-        </p:nvSpPr>
-        <p:spPr/>
-        <p:txBody>
           <a:bodyPr>
-            <a:normAutofit lnSpcReduction="10000"/>
+            <a:normAutofit/>
           </a:bodyPr>
           <a:lstStyle/>
           <a:p>
             <a:r>
-              <a:rPr lang="en-US" sz="2800" dirty="0" smtClean="0"/>
-              <a:t>App must </a:t>
-            </a:r>
-            <a:r>
-              <a:rPr lang="en-US" sz="2800" dirty="0"/>
-              <a:t>register </a:t>
-            </a:r>
-            <a:r>
-              <a:rPr lang="en-US" sz="2800" dirty="0" smtClean="0"/>
-              <a:t>with GCM before </a:t>
-            </a:r>
-            <a:r>
-              <a:rPr lang="en-US" sz="2800" dirty="0"/>
-              <a:t>it can receive </a:t>
-            </a:r>
-            <a:r>
-              <a:rPr lang="en-US" sz="2800" dirty="0" smtClean="0"/>
-              <a:t>messages</a:t>
+              <a:rPr lang="en-US" dirty="0"/>
+              <a:t>Check for Google Play </a:t>
+            </a:r>
+            <a:r>
+              <a:rPr lang="en-US" dirty="0" smtClean="0"/>
+              <a:t>Services</a:t>
+            </a:r>
+            <a:endParaRPr lang="en-US" dirty="0"/>
+          </a:p>
+        </p:txBody>
+      </p:sp>
+      <p:sp>
+        <p:nvSpPr>
+          <p:cNvPr id="3" name="Content Placeholder 2"/>
+          <p:cNvSpPr>
+            <a:spLocks noGrp="1"/>
+          </p:cNvSpPr>
+          <p:nvPr>
+            <p:ph idx="1"/>
+          </p:nvPr>
+        </p:nvSpPr>
+        <p:spPr/>
+        <p:txBody>
+          <a:bodyPr>
+            <a:normAutofit/>
+          </a:bodyPr>
+          <a:lstStyle/>
+          <a:p>
+            <a:r>
+              <a:rPr lang="en-US" sz="2400" dirty="0" smtClean="0"/>
+              <a:t>Apps relying on Google Play Services should check for compatible version</a:t>
+            </a:r>
+          </a:p>
+          <a:p>
+            <a:r>
+              <a:rPr lang="en-US" sz="2400" dirty="0" smtClean="0"/>
+              <a:t>Typically done in following main activity methods</a:t>
             </a:r>
           </a:p>
           <a:p>
             <a:pPr lvl="1"/>
             <a:r>
+              <a:rPr lang="en-US" sz="2000" dirty="0" smtClean="0"/>
+              <a:t>onCreate() – ensures app cannot be used without successful check</a:t>
+            </a:r>
+          </a:p>
+          <a:p>
+            <a:pPr lvl="1"/>
+            <a:r>
+              <a:rPr lang="en-US" sz="2000" dirty="0" smtClean="0"/>
+              <a:t>onResume() – ensures check is done when user returns to the app</a:t>
+            </a:r>
+          </a:p>
+          <a:p>
+            <a:r>
               <a:rPr lang="en-US" sz="2400" dirty="0" smtClean="0"/>
-              <a:t>Must be done on background thread because GCM register() method blocks</a:t>
-            </a:r>
-          </a:p>
-          <a:p>
-            <a:r>
-              <a:rPr lang="en-US" sz="2800" dirty="0" smtClean="0"/>
-              <a:t>Receives registration ID from GCM</a:t>
+              <a:t>App can </a:t>
+            </a:r>
+            <a:r>
+              <a:rPr lang="en-US" sz="2400" dirty="0"/>
+              <a:t>call GooglePlayServicesUtil.getErrorDialog(</a:t>
+            </a:r>
+            <a:r>
+              <a:rPr lang="en-US" sz="2400" dirty="0" smtClean="0"/>
+              <a:t>) to:</a:t>
             </a:r>
           </a:p>
           <a:p>
             <a:pPr lvl="1"/>
             <a:r>
+              <a:rPr lang="en-US" sz="2000" dirty="0" smtClean="0"/>
+              <a:t>Download APK from Google Play Store or</a:t>
+            </a:r>
+          </a:p>
+          <a:p>
+            <a:pPr lvl="1"/>
+            <a:r>
+              <a:rPr lang="en-US" sz="2000" dirty="0" smtClean="0"/>
+              <a:t>Enable it in device settings</a:t>
+            </a:r>
+          </a:p>
+          <a:p>
+            <a:r>
               <a:rPr lang="en-US" sz="2400" dirty="0" smtClean="0"/>
-              <a:t>Used by server to send notifications to that device</a:t>
-            </a:r>
-          </a:p>
-          <a:p>
-            <a:r>
-              <a:rPr lang="en-US" sz="2800" dirty="0" smtClean="0"/>
-              <a:t>Registration ID stored by app</a:t>
-            </a:r>
-          </a:p>
-          <a:p>
-            <a:pPr lvl="1"/>
-            <a:r>
-              <a:rPr lang="en-US" sz="2400" dirty="0" smtClean="0"/>
-              <a:t>Allows registration to be skipped if ID is still valid</a:t>
-            </a:r>
-          </a:p>
-          <a:p>
-            <a:pPr lvl="1"/>
-            <a:r>
-              <a:rPr lang="en-US" sz="2400" dirty="0" smtClean="0"/>
-              <a:t>Typically inside shared preferences</a:t>
-            </a:r>
-          </a:p>
-          <a:p>
-            <a:r>
-              <a:rPr lang="en-US" sz="2800" dirty="0" smtClean="0"/>
               <a:t>Code walkthrough</a:t>
             </a:r>
-            <a:endParaRPr lang="en-US" sz="2800" dirty="0"/>
           </a:p>
         </p:txBody>
       </p:sp>
     </p:spTree>
     <p:extLst>
       <p:ext uri="{BB962C8B-B14F-4D97-AF65-F5344CB8AC3E}">
-        <p14:creationId xmlns:p14="http://schemas.microsoft.com/office/powerpoint/2010/main" val="361619516"/>
+        <p14:creationId xmlns:p14="http://schemas.microsoft.com/office/powerpoint/2010/main" val="606154861"/>
       </p:ext>
     </p:extLst>
   </p:cSld>
@@ -4794,7 +5306,7 @@
           <a:p>
             <a:r>
               <a:rPr lang="en-US" dirty="0" smtClean="0"/>
-              <a:t>Test API Key and Registration ID</a:t>
+              <a:t>Register with GCM</a:t>
             </a:r>
             <a:endParaRPr lang="en-US" dirty="0"/>
           </a:p>
@@ -4813,156 +5325,84 @@
         <p:spPr/>
         <p:txBody>
           <a:bodyPr>
-            <a:normAutofit/>
+            <a:normAutofit lnSpcReduction="10000"/>
           </a:bodyPr>
           <a:lstStyle/>
           <a:p>
             <a:r>
+              <a:rPr lang="en-US" sz="2800" dirty="0" smtClean="0"/>
+              <a:t>App must </a:t>
+            </a:r>
+            <a:r>
+              <a:rPr lang="en-US" sz="2800" dirty="0"/>
+              <a:t>register </a:t>
+            </a:r>
+            <a:r>
+              <a:rPr lang="en-US" sz="2800" dirty="0" smtClean="0"/>
+              <a:t>with GCM before </a:t>
+            </a:r>
+            <a:r>
+              <a:rPr lang="en-US" sz="2800" dirty="0"/>
+              <a:t>it can receive </a:t>
+            </a:r>
+            <a:r>
+              <a:rPr lang="en-US" sz="2800" dirty="0" smtClean="0"/>
+              <a:t>messages</a:t>
+            </a:r>
+          </a:p>
+          <a:p>
+            <a:pPr lvl="1"/>
+            <a:r>
               <a:rPr lang="en-US" sz="2400" dirty="0" smtClean="0"/>
-              <a:t>Run this command, all on one line</a:t>
-            </a:r>
-          </a:p>
-          <a:p>
-            <a:pPr marL="457200" lvl="1" indent="0">
-              <a:buNone/>
-            </a:pPr>
-            <a:r>
-              <a:rPr lang="en-US" sz="1600" dirty="0">
-                <a:latin typeface="Courier"/>
-                <a:cs typeface="Courier"/>
-              </a:rPr>
-              <a:t>curl --header "Authorization: key=&lt;API Key&gt;" --header Content-Type:"application/json" https://android.googleapis.com/gcm/send  -d "{\"registration_ids\":[\"&lt;Registration </a:t>
-            </a:r>
-            <a:r>
-              <a:rPr lang="en-US" sz="1600" dirty="0" smtClean="0">
-                <a:latin typeface="Courier"/>
-                <a:cs typeface="Courier"/>
-              </a:rPr>
-              <a:t>ID&gt;</a:t>
-            </a:r>
-            <a:r>
-              <a:rPr lang="en-US" sz="1600" dirty="0">
-                <a:latin typeface="Courier"/>
-                <a:cs typeface="Courier"/>
-              </a:rPr>
-              <a:t>\"]}</a:t>
-            </a:r>
-            <a:r>
-              <a:rPr lang="en-US" sz="1600" dirty="0" smtClean="0">
-                <a:latin typeface="Courier"/>
-                <a:cs typeface="Courier"/>
-              </a:rPr>
-              <a:t>"</a:t>
-            </a:r>
-          </a:p>
-          <a:p>
+              <a:t>Must be done on background thread because GCM register() method blocks</a:t>
+            </a:r>
+          </a:p>
+          <a:p>
+            <a:r>
+              <a:rPr lang="en-US" sz="2800" dirty="0" smtClean="0"/>
+              <a:t>Receives registration ID from GCM</a:t>
+            </a:r>
+          </a:p>
+          <a:p>
+            <a:pPr lvl="1"/>
             <a:r>
               <a:rPr lang="en-US" sz="2400" dirty="0" smtClean="0"/>
-              <a:t>Valid API key and registration ID returns response similar to:</a:t>
-            </a:r>
-          </a:p>
-          <a:p>
-            <a:pPr marL="457200" lvl="1" indent="0">
-              <a:buNone/>
-            </a:pPr>
-            <a:r>
-              <a:rPr lang="pt-BR" sz="1600" dirty="0">
-                <a:latin typeface="Courier"/>
-                <a:cs typeface="Courier"/>
-              </a:rPr>
-              <a:t>{"multicast_id":7234249251933638557,"success":1,"failure":0,"canonical_ids":0,"results":[{"message_id":"0:1397573613153828%b1013b1cf9fd7ecd"}]</a:t>
-            </a:r>
-            <a:r>
-              <a:rPr lang="pt-BR" sz="1600" dirty="0" smtClean="0">
-                <a:latin typeface="Courier"/>
-                <a:cs typeface="Courier"/>
-              </a:rPr>
-              <a:t>}</a:t>
-            </a:r>
-          </a:p>
-          <a:p>
+              <a:t>Used by server to send notifications to that device</a:t>
+            </a:r>
+          </a:p>
+          <a:p>
+            <a:r>
+              <a:rPr lang="en-US" sz="2800" dirty="0" smtClean="0"/>
+              <a:t>Registration ID stored by app</a:t>
+            </a:r>
+          </a:p>
+          <a:p>
+            <a:pPr lvl="1"/>
             <a:r>
               <a:rPr lang="en-US" sz="2400" dirty="0" smtClean="0"/>
-              <a:t>HTTP status code 401 indicates invalid </a:t>
-            </a:r>
+              <a:t>Allows registration to be skipped if ID is still valid</a:t>
+            </a:r>
+          </a:p>
+          <a:p>
+            <a:pPr lvl="1"/>
             <a:r>
               <a:rPr lang="en-US" sz="2400" dirty="0" smtClean="0"/>
-              <a:t>server API </a:t>
-            </a:r>
-            <a:r>
-              <a:rPr lang="en-US" sz="2400" dirty="0" smtClean="0"/>
-              <a:t>key</a:t>
-            </a:r>
-          </a:p>
-          <a:p>
-            <a:r>
-              <a:rPr lang="en-US" sz="2400" dirty="0" smtClean="0"/>
-              <a:t>Response containing</a:t>
-            </a:r>
-            <a:br>
-              <a:rPr lang="en-US" sz="2400" dirty="0" smtClean="0"/>
-            </a:br>
-            <a:r>
-              <a:rPr lang="en-US" sz="1600" dirty="0" smtClean="0">
-                <a:latin typeface="Courier"/>
-                <a:cs typeface="Courier"/>
-              </a:rPr>
-              <a:t>"failure":1, results</a:t>
-            </a:r>
-            <a:r>
-              <a:rPr lang="en-US" sz="1600" dirty="0">
-                <a:latin typeface="Courier"/>
-                <a:cs typeface="Courier"/>
-              </a:rPr>
-              <a:t>":[{"error":"InvalidRegistration"}</a:t>
-            </a:r>
-            <a:r>
-              <a:rPr lang="en-US" sz="1600" dirty="0" smtClean="0">
-                <a:latin typeface="Courier"/>
-                <a:cs typeface="Courier"/>
-              </a:rPr>
-              <a:t>]</a:t>
-            </a:r>
-            <a:r>
-              <a:rPr lang="en-US" sz="2400" dirty="0" smtClean="0"/>
-              <a:t/>
-            </a:r>
-            <a:br>
-              <a:rPr lang="en-US" sz="2400" dirty="0" smtClean="0"/>
-            </a:br>
-            <a:r>
-              <a:rPr lang="en-US" sz="2400" dirty="0" smtClean="0"/>
-              <a:t>indicates </a:t>
-            </a:r>
-            <a:r>
-              <a:rPr lang="en-US" sz="2400" dirty="0"/>
-              <a:t>invalid </a:t>
-            </a:r>
-            <a:r>
-              <a:rPr lang="en-US" sz="2400" dirty="0" smtClean="0"/>
-              <a:t>device registration </a:t>
-            </a:r>
-            <a:r>
-              <a:rPr lang="en-US" sz="2400" dirty="0" smtClean="0"/>
-              <a:t>ID</a:t>
-            </a:r>
-          </a:p>
-          <a:p>
-            <a:r>
-              <a:rPr lang="en-US" sz="2400" dirty="0" smtClean="0"/>
-              <a:t>DEMO</a:t>
-            </a:r>
-            <a:endParaRPr lang="en-US" sz="2400" dirty="0"/>
-          </a:p>
-          <a:p>
-            <a:endParaRPr lang="en-US" sz="2400" dirty="0"/>
+              <a:t>Typically inside shared preferences</a:t>
+            </a:r>
+          </a:p>
+          <a:p>
+            <a:r>
+              <a:rPr lang="en-US" sz="2800" dirty="0" smtClean="0"/>
+              <a:t>Code walkthrough</a:t>
+            </a:r>
+            <a:endParaRPr lang="en-US" sz="2800" dirty="0"/>
           </a:p>
         </p:txBody>
       </p:sp>
     </p:spTree>
     <p:extLst>
       <p:ext uri="{BB962C8B-B14F-4D97-AF65-F5344CB8AC3E}">
-        <p14:creationId xmlns:p14="http://schemas.microsoft.com/office/powerpoint/2010/main" val="2683352921"/>
+        <p14:creationId xmlns:p14="http://schemas.microsoft.com/office/powerpoint/2010/main" val="361619516"/>
       </p:ext>
     </p:extLst>
   </p:cSld>
@@ -5279,37 +5719,1039 @@
             <p:ph idx="1"/>
           </p:nvPr>
         </p:nvSpPr>
-        <p:spPr/>
+        <p:spPr>
+          <a:xfrm>
+            <a:off x="457200" y="1600201"/>
+            <a:ext cx="8229600" cy="380999"/>
+          </a:xfrm>
+        </p:spPr>
         <p:txBody>
           <a:bodyPr>
-            <a:normAutofit/>
+            <a:noAutofit/>
           </a:bodyPr>
           <a:lstStyle/>
           <a:p>
             <a:r>
-              <a:rPr lang="en-US" sz="2800" dirty="0" smtClean="0"/>
+              <a:rPr lang="en-US" sz="2000" dirty="0" smtClean="0"/>
+              <a:t>Permissions</a:t>
+            </a:r>
+            <a:endParaRPr lang="en-US" sz="2000" dirty="0" smtClean="0"/>
+          </a:p>
+          <a:p>
+            <a:endParaRPr lang="en-US" sz="2000" dirty="0"/>
+          </a:p>
+          <a:p>
+            <a:endParaRPr lang="en-US" sz="2000" dirty="0"/>
+          </a:p>
+          <a:p>
+            <a:endParaRPr lang="en-US" sz="2000" dirty="0" smtClean="0"/>
+          </a:p>
+          <a:p>
+            <a:endParaRPr lang="en-US" sz="2000" dirty="0" smtClean="0"/>
+          </a:p>
+        </p:txBody>
+      </p:sp>
+      <p:graphicFrame>
+        <p:nvGraphicFramePr>
+          <p:cNvPr id="5" name="Table 4"/>
+          <p:cNvGraphicFramePr>
+            <a:graphicFrameLocks noGrp="1"/>
+          </p:cNvGraphicFramePr>
+          <p:nvPr>
+            <p:extLst>
+              <p:ext uri="{D42A27DB-BD31-4B8C-83A1-F6EECF244321}">
+                <p14:modId xmlns:p14="http://schemas.microsoft.com/office/powerpoint/2010/main" val="1304497272"/>
+              </p:ext>
+            </p:extLst>
+          </p:nvPr>
+        </p:nvGraphicFramePr>
+        <p:xfrm>
+          <a:off x="304800" y="1981200"/>
+          <a:ext cx="8610600" cy="1877262"/>
+        </p:xfrm>
+        <a:graphic>
+          <a:graphicData uri="http://schemas.openxmlformats.org/drawingml/2006/table">
+            <a:tbl>
+              <a:tblPr>
+                <a:tableStyleId>{F5AB1C69-6EDB-4FF4-983F-18BD219EF322}</a:tableStyleId>
+              </a:tblPr>
+              <a:tblGrid>
+                <a:gridCol w="3613377"/>
+                <a:gridCol w="4997223"/>
+              </a:tblGrid>
+              <a:tr h="312877">
+                <a:tc>
+                  <a:txBody>
+                    <a:bodyPr/>
+                    <a:lstStyle/>
+                    <a:p>
+                      <a:r>
+                        <a:rPr lang="en-US" sz="1400" dirty="0" smtClean="0"/>
+                        <a:t>com.google.android.c2dm.permission.RECEIVE</a:t>
+                      </a:r>
+                    </a:p>
+                  </a:txBody>
+                  <a:tcPr>
+                    <a:lnL w="12700" cap="flat" cmpd="sng" algn="ctr">
+                      <a:solidFill>
+                        <a:schemeClr val="tx1"/>
+                      </a:solidFill>
+                      <a:prstDash val="solid"/>
+                      <a:round/>
+                      <a:headEnd type="none" w="med" len="med"/>
+                      <a:tailEnd type="none" w="med" len="med"/>
+                    </a:lnL>
+                    <a:lnR w="12700" cap="flat" cmpd="sng" algn="ctr">
+                      <a:solidFill>
+                        <a:schemeClr val="tx1"/>
+                      </a:solidFill>
+                      <a:prstDash val="solid"/>
+                      <a:round/>
+                      <a:headEnd type="none" w="med" len="med"/>
+                      <a:tailEnd type="none" w="med" len="med"/>
+                    </a:lnR>
+                    <a:lnT w="12700" cap="flat" cmpd="sng" algn="ctr">
+                      <a:solidFill>
+                        <a:schemeClr val="tx1"/>
+                      </a:solidFill>
+                      <a:prstDash val="solid"/>
+                      <a:round/>
+                      <a:headEnd type="none" w="med" len="med"/>
+                      <a:tailEnd type="none" w="med" len="med"/>
+                    </a:lnT>
+                    <a:lnB w="12700" cap="flat" cmpd="sng" algn="ctr">
+                      <a:solidFill>
+                        <a:schemeClr val="tx1"/>
+                      </a:solidFill>
+                      <a:prstDash val="solid"/>
+                      <a:round/>
+                      <a:headEnd type="none" w="med" len="med"/>
+                      <a:tailEnd type="none" w="med" len="med"/>
+                    </a:lnB>
+                    <a:solidFill>
+                      <a:schemeClr val="accent3">
+                        <a:lumMod val="60000"/>
+                        <a:lumOff val="40000"/>
+                      </a:schemeClr>
+                    </a:solidFill>
+                  </a:tcPr>
+                </a:tc>
+                <a:tc>
+                  <a:txBody>
+                    <a:bodyPr/>
+                    <a:lstStyle/>
+                    <a:p>
+                      <a:r>
+                        <a:rPr lang="en-US" sz="1400" dirty="0" smtClean="0"/>
+                        <a:t>App can register and receive messages</a:t>
+                      </a:r>
+                      <a:endParaRPr lang="en-US" sz="1400" dirty="0"/>
+                    </a:p>
+                  </a:txBody>
+                  <a:tcPr>
+                    <a:lnL w="12700" cap="flat" cmpd="sng" algn="ctr">
+                      <a:solidFill>
+                        <a:schemeClr val="tx1"/>
+                      </a:solidFill>
+                      <a:prstDash val="solid"/>
+                      <a:round/>
+                      <a:headEnd type="none" w="med" len="med"/>
+                      <a:tailEnd type="none" w="med" len="med"/>
+                    </a:lnL>
+                    <a:lnR w="12700" cap="flat" cmpd="sng" algn="ctr">
+                      <a:solidFill>
+                        <a:schemeClr val="tx1"/>
+                      </a:solidFill>
+                      <a:prstDash val="solid"/>
+                      <a:round/>
+                      <a:headEnd type="none" w="med" len="med"/>
+                      <a:tailEnd type="none" w="med" len="med"/>
+                    </a:lnR>
+                    <a:lnT w="12700" cap="flat" cmpd="sng" algn="ctr">
+                      <a:solidFill>
+                        <a:schemeClr val="tx1"/>
+                      </a:solidFill>
+                      <a:prstDash val="solid"/>
+                      <a:round/>
+                      <a:headEnd type="none" w="med" len="med"/>
+                      <a:tailEnd type="none" w="med" len="med"/>
+                    </a:lnT>
+                    <a:lnB w="12700" cap="flat" cmpd="sng" algn="ctr">
+                      <a:solidFill>
+                        <a:schemeClr val="tx1"/>
+                      </a:solidFill>
+                      <a:prstDash val="solid"/>
+                      <a:round/>
+                      <a:headEnd type="none" w="med" len="med"/>
+                      <a:tailEnd type="none" w="med" len="med"/>
+                    </a:lnB>
+                    <a:solidFill>
+                      <a:schemeClr val="accent3">
+                        <a:lumMod val="60000"/>
+                        <a:lumOff val="40000"/>
+                      </a:schemeClr>
+                    </a:solidFill>
+                  </a:tcPr>
+                </a:tc>
+              </a:tr>
+              <a:tr h="312877">
+                <a:tc>
+                  <a:txBody>
+                    <a:bodyPr/>
+                    <a:lstStyle/>
+                    <a:p>
+                      <a:r>
+                        <a:rPr lang="en-US" sz="1400" dirty="0" err="1" smtClean="0"/>
+                        <a:t>android.permission.INTERNET</a:t>
+                      </a:r>
+                      <a:endParaRPr lang="en-US" sz="1400" dirty="0" smtClean="0"/>
+                    </a:p>
+                  </a:txBody>
+                  <a:tcPr>
+                    <a:lnL w="12700" cap="flat" cmpd="sng" algn="ctr">
+                      <a:solidFill>
+                        <a:schemeClr val="tx1"/>
+                      </a:solidFill>
+                      <a:prstDash val="solid"/>
+                      <a:round/>
+                      <a:headEnd type="none" w="med" len="med"/>
+                      <a:tailEnd type="none" w="med" len="med"/>
+                    </a:lnL>
+                    <a:lnR w="12700" cap="flat" cmpd="sng" algn="ctr">
+                      <a:solidFill>
+                        <a:schemeClr val="tx1"/>
+                      </a:solidFill>
+                      <a:prstDash val="solid"/>
+                      <a:round/>
+                      <a:headEnd type="none" w="med" len="med"/>
+                      <a:tailEnd type="none" w="med" len="med"/>
+                    </a:lnR>
+                    <a:lnT w="12700" cap="flat" cmpd="sng" algn="ctr">
+                      <a:solidFill>
+                        <a:schemeClr val="tx1"/>
+                      </a:solidFill>
+                      <a:prstDash val="solid"/>
+                      <a:round/>
+                      <a:headEnd type="none" w="med" len="med"/>
+                      <a:tailEnd type="none" w="med" len="med"/>
+                    </a:lnT>
+                    <a:lnB w="12700" cap="flat" cmpd="sng" algn="ctr">
+                      <a:solidFill>
+                        <a:schemeClr val="tx1"/>
+                      </a:solidFill>
+                      <a:prstDash val="solid"/>
+                      <a:round/>
+                      <a:headEnd type="none" w="med" len="med"/>
+                      <a:tailEnd type="none" w="med" len="med"/>
+                    </a:lnB>
+                    <a:solidFill>
+                      <a:schemeClr val="accent3">
+                        <a:lumMod val="60000"/>
+                        <a:lumOff val="40000"/>
+                      </a:schemeClr>
+                    </a:solidFill>
+                  </a:tcPr>
+                </a:tc>
+                <a:tc>
+                  <a:txBody>
+                    <a:bodyPr/>
+                    <a:lstStyle/>
+                    <a:p>
+                      <a:r>
+                        <a:rPr lang="en-US" sz="1400" dirty="0" smtClean="0"/>
+                        <a:t>App can send registration ID to the 3</a:t>
+                      </a:r>
+                      <a:r>
+                        <a:rPr lang="en-US" sz="1400" baseline="30000" dirty="0" smtClean="0"/>
+                        <a:t>rd</a:t>
+                      </a:r>
+                      <a:r>
+                        <a:rPr lang="en-US" sz="1400" dirty="0" smtClean="0"/>
+                        <a:t> party server</a:t>
+                      </a:r>
+                      <a:endParaRPr lang="en-US" sz="1400" dirty="0"/>
+                    </a:p>
+                  </a:txBody>
+                  <a:tcPr>
+                    <a:lnL w="12700" cap="flat" cmpd="sng" algn="ctr">
+                      <a:solidFill>
+                        <a:schemeClr val="tx1"/>
+                      </a:solidFill>
+                      <a:prstDash val="solid"/>
+                      <a:round/>
+                      <a:headEnd type="none" w="med" len="med"/>
+                      <a:tailEnd type="none" w="med" len="med"/>
+                    </a:lnL>
+                    <a:lnR w="12700" cap="flat" cmpd="sng" algn="ctr">
+                      <a:solidFill>
+                        <a:schemeClr val="tx1"/>
+                      </a:solidFill>
+                      <a:prstDash val="solid"/>
+                      <a:round/>
+                      <a:headEnd type="none" w="med" len="med"/>
+                      <a:tailEnd type="none" w="med" len="med"/>
+                    </a:lnR>
+                    <a:lnT w="12700" cap="flat" cmpd="sng" algn="ctr">
+                      <a:solidFill>
+                        <a:schemeClr val="tx1"/>
+                      </a:solidFill>
+                      <a:prstDash val="solid"/>
+                      <a:round/>
+                      <a:headEnd type="none" w="med" len="med"/>
+                      <a:tailEnd type="none" w="med" len="med"/>
+                    </a:lnT>
+                    <a:lnB w="12700" cap="flat" cmpd="sng" algn="ctr">
+                      <a:solidFill>
+                        <a:schemeClr val="tx1"/>
+                      </a:solidFill>
+                      <a:prstDash val="solid"/>
+                      <a:round/>
+                      <a:headEnd type="none" w="med" len="med"/>
+                      <a:tailEnd type="none" w="med" len="med"/>
+                    </a:lnB>
+                    <a:solidFill>
+                      <a:schemeClr val="accent3">
+                        <a:lumMod val="60000"/>
+                        <a:lumOff val="40000"/>
+                      </a:schemeClr>
+                    </a:solidFill>
+                  </a:tcPr>
+                </a:tc>
+              </a:tr>
+              <a:tr h="312877">
+                <a:tc>
+                  <a:txBody>
+                    <a:bodyPr/>
+                    <a:lstStyle/>
+                    <a:p>
+                      <a:r>
+                        <a:rPr lang="en-US" sz="1400" dirty="0" err="1" smtClean="0"/>
+                        <a:t>android.permission.GET_ACCOUNTS</a:t>
+                      </a:r>
+                      <a:endParaRPr lang="en-US" sz="1400" dirty="0" smtClean="0"/>
+                    </a:p>
+                  </a:txBody>
+                  <a:tcPr>
+                    <a:lnL w="12700" cap="flat" cmpd="sng" algn="ctr">
+                      <a:solidFill>
+                        <a:schemeClr val="tx1"/>
+                      </a:solidFill>
+                      <a:prstDash val="solid"/>
+                      <a:round/>
+                      <a:headEnd type="none" w="med" len="med"/>
+                      <a:tailEnd type="none" w="med" len="med"/>
+                    </a:lnL>
+                    <a:lnR w="12700" cap="flat" cmpd="sng" algn="ctr">
+                      <a:solidFill>
+                        <a:schemeClr val="tx1"/>
+                      </a:solidFill>
+                      <a:prstDash val="solid"/>
+                      <a:round/>
+                      <a:headEnd type="none" w="med" len="med"/>
+                      <a:tailEnd type="none" w="med" len="med"/>
+                    </a:lnR>
+                    <a:lnT w="12700" cap="flat" cmpd="sng" algn="ctr">
+                      <a:solidFill>
+                        <a:schemeClr val="tx1"/>
+                      </a:solidFill>
+                      <a:prstDash val="solid"/>
+                      <a:round/>
+                      <a:headEnd type="none" w="med" len="med"/>
+                      <a:tailEnd type="none" w="med" len="med"/>
+                    </a:lnT>
+                    <a:lnB w="12700" cap="flat" cmpd="sng" algn="ctr">
+                      <a:solidFill>
+                        <a:schemeClr val="tx1"/>
+                      </a:solidFill>
+                      <a:prstDash val="solid"/>
+                      <a:round/>
+                      <a:headEnd type="none" w="med" len="med"/>
+                      <a:tailEnd type="none" w="med" len="med"/>
+                    </a:lnB>
+                    <a:solidFill>
+                      <a:schemeClr val="accent3">
+                        <a:lumMod val="60000"/>
+                        <a:lumOff val="40000"/>
+                      </a:schemeClr>
+                    </a:solidFill>
+                  </a:tcPr>
+                </a:tc>
+                <a:tc>
+                  <a:txBody>
+                    <a:bodyPr/>
+                    <a:lstStyle/>
+                    <a:p>
+                      <a:r>
+                        <a:rPr lang="en-US" sz="1400" dirty="0" smtClean="0"/>
+                        <a:t>Access</a:t>
+                      </a:r>
+                      <a:r>
+                        <a:rPr lang="en-US" sz="1400" baseline="0" dirty="0" smtClean="0"/>
+                        <a:t> to Google account, only if Android version &lt; 4.0.4</a:t>
+                      </a:r>
+                      <a:endParaRPr lang="en-US" sz="1400" dirty="0"/>
+                    </a:p>
+                  </a:txBody>
+                  <a:tcPr>
+                    <a:lnL w="12700" cap="flat" cmpd="sng" algn="ctr">
+                      <a:solidFill>
+                        <a:schemeClr val="tx1"/>
+                      </a:solidFill>
+                      <a:prstDash val="solid"/>
+                      <a:round/>
+                      <a:headEnd type="none" w="med" len="med"/>
+                      <a:tailEnd type="none" w="med" len="med"/>
+                    </a:lnL>
+                    <a:lnR w="12700" cap="flat" cmpd="sng" algn="ctr">
+                      <a:solidFill>
+                        <a:schemeClr val="tx1"/>
+                      </a:solidFill>
+                      <a:prstDash val="solid"/>
+                      <a:round/>
+                      <a:headEnd type="none" w="med" len="med"/>
+                      <a:tailEnd type="none" w="med" len="med"/>
+                    </a:lnR>
+                    <a:lnT w="12700" cap="flat" cmpd="sng" algn="ctr">
+                      <a:solidFill>
+                        <a:schemeClr val="tx1"/>
+                      </a:solidFill>
+                      <a:prstDash val="solid"/>
+                      <a:round/>
+                      <a:headEnd type="none" w="med" len="med"/>
+                      <a:tailEnd type="none" w="med" len="med"/>
+                    </a:lnT>
+                    <a:lnB w="12700" cap="flat" cmpd="sng" algn="ctr">
+                      <a:solidFill>
+                        <a:schemeClr val="tx1"/>
+                      </a:solidFill>
+                      <a:prstDash val="solid"/>
+                      <a:round/>
+                      <a:headEnd type="none" w="med" len="med"/>
+                      <a:tailEnd type="none" w="med" len="med"/>
+                    </a:lnB>
+                    <a:solidFill>
+                      <a:schemeClr val="accent3">
+                        <a:lumMod val="60000"/>
+                        <a:lumOff val="40000"/>
+                      </a:schemeClr>
+                    </a:solidFill>
+                  </a:tcPr>
+                </a:tc>
+              </a:tr>
+              <a:tr h="312877">
+                <a:tc>
+                  <a:txBody>
+                    <a:bodyPr/>
+                    <a:lstStyle/>
+                    <a:p>
+                      <a:r>
+                        <a:rPr lang="en-US" sz="1400" dirty="0" err="1" smtClean="0"/>
+                        <a:t>android.permission.WAKE_LOCK</a:t>
+                      </a:r>
+                      <a:endParaRPr lang="en-US" sz="1400" dirty="0" smtClean="0"/>
+                    </a:p>
+                  </a:txBody>
+                  <a:tcPr>
+                    <a:lnL w="12700" cap="flat" cmpd="sng" algn="ctr">
+                      <a:solidFill>
+                        <a:schemeClr val="tx1"/>
+                      </a:solidFill>
+                      <a:prstDash val="solid"/>
+                      <a:round/>
+                      <a:headEnd type="none" w="med" len="med"/>
+                      <a:tailEnd type="none" w="med" len="med"/>
+                    </a:lnL>
+                    <a:lnR w="12700" cap="flat" cmpd="sng" algn="ctr">
+                      <a:solidFill>
+                        <a:schemeClr val="tx1"/>
+                      </a:solidFill>
+                      <a:prstDash val="solid"/>
+                      <a:round/>
+                      <a:headEnd type="none" w="med" len="med"/>
+                      <a:tailEnd type="none" w="med" len="med"/>
+                    </a:lnR>
+                    <a:lnT w="12700" cap="flat" cmpd="sng" algn="ctr">
+                      <a:solidFill>
+                        <a:schemeClr val="tx1"/>
+                      </a:solidFill>
+                      <a:prstDash val="solid"/>
+                      <a:round/>
+                      <a:headEnd type="none" w="med" len="med"/>
+                      <a:tailEnd type="none" w="med" len="med"/>
+                    </a:lnT>
+                    <a:lnB w="12700" cap="flat" cmpd="sng" algn="ctr">
+                      <a:solidFill>
+                        <a:schemeClr val="tx1"/>
+                      </a:solidFill>
+                      <a:prstDash val="solid"/>
+                      <a:round/>
+                      <a:headEnd type="none" w="med" len="med"/>
+                      <a:tailEnd type="none" w="med" len="med"/>
+                    </a:lnB>
+                    <a:solidFill>
+                      <a:schemeClr val="accent3">
+                        <a:lumMod val="60000"/>
+                        <a:lumOff val="40000"/>
+                      </a:schemeClr>
+                    </a:solidFill>
+                  </a:tcPr>
+                </a:tc>
+                <a:tc>
+                  <a:txBody>
+                    <a:bodyPr/>
+                    <a:lstStyle/>
+                    <a:p>
+                      <a:r>
+                        <a:rPr lang="en-US" sz="1400" dirty="0" smtClean="0"/>
+                        <a:t>App can keep process from sleeping when message is received</a:t>
+                      </a:r>
+                      <a:endParaRPr lang="en-US" sz="1400" dirty="0"/>
+                    </a:p>
+                  </a:txBody>
+                  <a:tcPr>
+                    <a:lnL w="12700" cap="flat" cmpd="sng" algn="ctr">
+                      <a:solidFill>
+                        <a:schemeClr val="tx1"/>
+                      </a:solidFill>
+                      <a:prstDash val="solid"/>
+                      <a:round/>
+                      <a:headEnd type="none" w="med" len="med"/>
+                      <a:tailEnd type="none" w="med" len="med"/>
+                    </a:lnL>
+                    <a:lnR w="12700" cap="flat" cmpd="sng" algn="ctr">
+                      <a:solidFill>
+                        <a:schemeClr val="tx1"/>
+                      </a:solidFill>
+                      <a:prstDash val="solid"/>
+                      <a:round/>
+                      <a:headEnd type="none" w="med" len="med"/>
+                      <a:tailEnd type="none" w="med" len="med"/>
+                    </a:lnR>
+                    <a:lnT w="12700" cap="flat" cmpd="sng" algn="ctr">
+                      <a:solidFill>
+                        <a:schemeClr val="tx1"/>
+                      </a:solidFill>
+                      <a:prstDash val="solid"/>
+                      <a:round/>
+                      <a:headEnd type="none" w="med" len="med"/>
+                      <a:tailEnd type="none" w="med" len="med"/>
+                    </a:lnT>
+                    <a:lnB w="12700" cap="flat" cmpd="sng" algn="ctr">
+                      <a:solidFill>
+                        <a:schemeClr val="tx1"/>
+                      </a:solidFill>
+                      <a:prstDash val="solid"/>
+                      <a:round/>
+                      <a:headEnd type="none" w="med" len="med"/>
+                      <a:tailEnd type="none" w="med" len="med"/>
+                    </a:lnB>
+                    <a:solidFill>
+                      <a:schemeClr val="accent3">
+                        <a:lumMod val="60000"/>
+                        <a:lumOff val="40000"/>
+                      </a:schemeClr>
+                    </a:solidFill>
+                  </a:tcPr>
+                </a:tc>
+              </a:tr>
+              <a:tr h="312877">
+                <a:tc>
+                  <a:txBody>
+                    <a:bodyPr/>
+                    <a:lstStyle/>
+                    <a:p>
+                      <a:r>
+                        <a:rPr lang="en-US" sz="1400" dirty="0" err="1" smtClean="0"/>
+                        <a:t>android.permission.VIBRATE</a:t>
+                      </a:r>
+                      <a:endParaRPr lang="en-US" sz="1400" dirty="0" smtClean="0"/>
+                    </a:p>
+                  </a:txBody>
+                  <a:tcPr>
+                    <a:lnL w="12700" cap="flat" cmpd="sng" algn="ctr">
+                      <a:solidFill>
+                        <a:schemeClr val="tx1"/>
+                      </a:solidFill>
+                      <a:prstDash val="solid"/>
+                      <a:round/>
+                      <a:headEnd type="none" w="med" len="med"/>
+                      <a:tailEnd type="none" w="med" len="med"/>
+                    </a:lnL>
+                    <a:lnR w="12700" cap="flat" cmpd="sng" algn="ctr">
+                      <a:solidFill>
+                        <a:schemeClr val="tx1"/>
+                      </a:solidFill>
+                      <a:prstDash val="solid"/>
+                      <a:round/>
+                      <a:headEnd type="none" w="med" len="med"/>
+                      <a:tailEnd type="none" w="med" len="med"/>
+                    </a:lnR>
+                    <a:lnT w="12700" cap="flat" cmpd="sng" algn="ctr">
+                      <a:solidFill>
+                        <a:schemeClr val="tx1"/>
+                      </a:solidFill>
+                      <a:prstDash val="solid"/>
+                      <a:round/>
+                      <a:headEnd type="none" w="med" len="med"/>
+                      <a:tailEnd type="none" w="med" len="med"/>
+                    </a:lnT>
+                    <a:lnB w="12700" cap="flat" cmpd="sng" algn="ctr">
+                      <a:solidFill>
+                        <a:schemeClr val="tx1"/>
+                      </a:solidFill>
+                      <a:prstDash val="solid"/>
+                      <a:round/>
+                      <a:headEnd type="none" w="med" len="med"/>
+                      <a:tailEnd type="none" w="med" len="med"/>
+                    </a:lnB>
+                    <a:solidFill>
+                      <a:schemeClr val="accent3">
+                        <a:lumMod val="60000"/>
+                        <a:lumOff val="40000"/>
+                      </a:schemeClr>
+                    </a:solidFill>
+                  </a:tcPr>
+                </a:tc>
+                <a:tc>
+                  <a:txBody>
+                    <a:bodyPr/>
+                    <a:lstStyle/>
+                    <a:p>
+                      <a:r>
+                        <a:rPr lang="en-US" sz="1400" dirty="0" smtClean="0"/>
+                        <a:t>Notifications cause</a:t>
+                      </a:r>
+                      <a:r>
+                        <a:rPr lang="en-US" sz="1400" baseline="0" dirty="0" smtClean="0"/>
+                        <a:t> device to vibrate</a:t>
+                      </a:r>
+                      <a:endParaRPr lang="en-US" sz="1400" dirty="0"/>
+                    </a:p>
+                  </a:txBody>
+                  <a:tcPr>
+                    <a:lnL w="12700" cap="flat" cmpd="sng" algn="ctr">
+                      <a:solidFill>
+                        <a:schemeClr val="tx1"/>
+                      </a:solidFill>
+                      <a:prstDash val="solid"/>
+                      <a:round/>
+                      <a:headEnd type="none" w="med" len="med"/>
+                      <a:tailEnd type="none" w="med" len="med"/>
+                    </a:lnL>
+                    <a:lnR w="12700" cap="flat" cmpd="sng" algn="ctr">
+                      <a:solidFill>
+                        <a:schemeClr val="tx1"/>
+                      </a:solidFill>
+                      <a:prstDash val="solid"/>
+                      <a:round/>
+                      <a:headEnd type="none" w="med" len="med"/>
+                      <a:tailEnd type="none" w="med" len="med"/>
+                    </a:lnR>
+                    <a:lnT w="12700" cap="flat" cmpd="sng" algn="ctr">
+                      <a:solidFill>
+                        <a:schemeClr val="tx1"/>
+                      </a:solidFill>
+                      <a:prstDash val="solid"/>
+                      <a:round/>
+                      <a:headEnd type="none" w="med" len="med"/>
+                      <a:tailEnd type="none" w="med" len="med"/>
+                    </a:lnT>
+                    <a:lnB w="12700" cap="flat" cmpd="sng" algn="ctr">
+                      <a:solidFill>
+                        <a:schemeClr val="tx1"/>
+                      </a:solidFill>
+                      <a:prstDash val="solid"/>
+                      <a:round/>
+                      <a:headEnd type="none" w="med" len="med"/>
+                      <a:tailEnd type="none" w="med" len="med"/>
+                    </a:lnB>
+                    <a:solidFill>
+                      <a:schemeClr val="accent3">
+                        <a:lumMod val="60000"/>
+                        <a:lumOff val="40000"/>
+                      </a:schemeClr>
+                    </a:solidFill>
+                  </a:tcPr>
+                </a:tc>
+              </a:tr>
+              <a:tr h="312877">
+                <a:tc>
+                  <a:txBody>
+                    <a:bodyPr/>
+                    <a:lstStyle/>
+                    <a:p>
+                      <a:r>
+                        <a:rPr lang="en-US" sz="1400" dirty="0" smtClean="0"/>
+                        <a:t>applicationPackage.permission.C2D_MESSAGE</a:t>
+                      </a:r>
+                    </a:p>
+                  </a:txBody>
+                  <a:tcPr>
+                    <a:lnL w="12700" cap="flat" cmpd="sng" algn="ctr">
+                      <a:solidFill>
+                        <a:schemeClr val="tx1"/>
+                      </a:solidFill>
+                      <a:prstDash val="solid"/>
+                      <a:round/>
+                      <a:headEnd type="none" w="med" len="med"/>
+                      <a:tailEnd type="none" w="med" len="med"/>
+                    </a:lnL>
+                    <a:lnR w="12700" cap="flat" cmpd="sng" algn="ctr">
+                      <a:solidFill>
+                        <a:schemeClr val="tx1"/>
+                      </a:solidFill>
+                      <a:prstDash val="solid"/>
+                      <a:round/>
+                      <a:headEnd type="none" w="med" len="med"/>
+                      <a:tailEnd type="none" w="med" len="med"/>
+                    </a:lnR>
+                    <a:lnT w="12700" cap="flat" cmpd="sng" algn="ctr">
+                      <a:solidFill>
+                        <a:schemeClr val="tx1"/>
+                      </a:solidFill>
+                      <a:prstDash val="solid"/>
+                      <a:round/>
+                      <a:headEnd type="none" w="med" len="med"/>
+                      <a:tailEnd type="none" w="med" len="med"/>
+                    </a:lnT>
+                    <a:lnB w="12700" cap="flat" cmpd="sng" algn="ctr">
+                      <a:solidFill>
+                        <a:schemeClr val="tx1"/>
+                      </a:solidFill>
+                      <a:prstDash val="solid"/>
+                      <a:round/>
+                      <a:headEnd type="none" w="med" len="med"/>
+                      <a:tailEnd type="none" w="med" len="med"/>
+                    </a:lnB>
+                    <a:solidFill>
+                      <a:schemeClr val="accent3">
+                        <a:lumMod val="60000"/>
+                        <a:lumOff val="40000"/>
+                      </a:schemeClr>
+                    </a:solidFill>
+                  </a:tcPr>
+                </a:tc>
+                <a:tc>
+                  <a:txBody>
+                    <a:bodyPr/>
+                    <a:lstStyle/>
+                    <a:p>
+                      <a:r>
+                        <a:rPr lang="en-US" sz="1400" dirty="0" smtClean="0"/>
+                        <a:t>Prevent other apps from registering/receiving</a:t>
+                      </a:r>
+                      <a:r>
+                        <a:rPr lang="en-US" sz="1400" baseline="0" dirty="0" smtClean="0"/>
+                        <a:t> this app’s messages.</a:t>
+                      </a:r>
+                      <a:endParaRPr lang="en-US" sz="1400" dirty="0"/>
+                    </a:p>
+                  </a:txBody>
+                  <a:tcPr>
+                    <a:lnL w="12700" cap="flat" cmpd="sng" algn="ctr">
+                      <a:solidFill>
+                        <a:schemeClr val="tx1"/>
+                      </a:solidFill>
+                      <a:prstDash val="solid"/>
+                      <a:round/>
+                      <a:headEnd type="none" w="med" len="med"/>
+                      <a:tailEnd type="none" w="med" len="med"/>
+                    </a:lnL>
+                    <a:lnR w="12700" cap="flat" cmpd="sng" algn="ctr">
+                      <a:solidFill>
+                        <a:schemeClr val="tx1"/>
+                      </a:solidFill>
+                      <a:prstDash val="solid"/>
+                      <a:round/>
+                      <a:headEnd type="none" w="med" len="med"/>
+                      <a:tailEnd type="none" w="med" len="med"/>
+                    </a:lnR>
+                    <a:lnT w="12700" cap="flat" cmpd="sng" algn="ctr">
+                      <a:solidFill>
+                        <a:schemeClr val="tx1"/>
+                      </a:solidFill>
+                      <a:prstDash val="solid"/>
+                      <a:round/>
+                      <a:headEnd type="none" w="med" len="med"/>
+                      <a:tailEnd type="none" w="med" len="med"/>
+                    </a:lnT>
+                    <a:lnB w="12700" cap="flat" cmpd="sng" algn="ctr">
+                      <a:solidFill>
+                        <a:schemeClr val="tx1"/>
+                      </a:solidFill>
+                      <a:prstDash val="solid"/>
+                      <a:round/>
+                      <a:headEnd type="none" w="med" len="med"/>
+                      <a:tailEnd type="none" w="med" len="med"/>
+                    </a:lnB>
+                    <a:solidFill>
+                      <a:schemeClr val="accent3">
+                        <a:lumMod val="60000"/>
+                        <a:lumOff val="40000"/>
+                      </a:schemeClr>
+                    </a:solidFill>
+                  </a:tcPr>
+                </a:tc>
+              </a:tr>
+            </a:tbl>
+          </a:graphicData>
+        </a:graphic>
+      </p:graphicFrame>
+      <p:sp>
+        <p:nvSpPr>
+          <p:cNvPr id="6" name="Content Placeholder 2"/>
+          <p:cNvSpPr txBox="1">
+            <a:spLocks/>
+          </p:cNvSpPr>
+          <p:nvPr/>
+        </p:nvSpPr>
+        <p:spPr>
+          <a:xfrm>
+            <a:off x="457200" y="3657600"/>
+            <a:ext cx="8229600" cy="2286000"/>
+          </a:xfrm>
+          <a:prstGeom prst="rect">
+            <a:avLst/>
+          </a:prstGeom>
+        </p:spPr>
+        <p:txBody>
+          <a:bodyPr vert="horz" lIns="91440" tIns="45720" rIns="91440" bIns="45720" rtlCol="0">
+            <a:noAutofit/>
+          </a:bodyPr>
+          <a:lstStyle>
+            <a:lvl1pPr marL="342900" indent="-342900" algn="l" defTabSz="914400" rtl="0" eaLnBrk="1" latinLnBrk="0" hangingPunct="1">
+              <a:spcBef>
+                <a:spcPct val="20000"/>
+              </a:spcBef>
+              <a:buFont typeface="Arial" panose="020B0604020202020204" pitchFamily="34" charset="0"/>
+              <a:buChar char="•"/>
+              <a:defRPr sz="3200" kern="1200">
+                <a:solidFill>
+                  <a:schemeClr val="tx1"/>
+                </a:solidFill>
+                <a:latin typeface="+mn-lt"/>
+                <a:ea typeface="+mn-ea"/>
+                <a:cs typeface="+mn-cs"/>
+              </a:defRPr>
+            </a:lvl1pPr>
+            <a:lvl2pPr marL="742950" indent="-285750" algn="l" defTabSz="914400" rtl="0" eaLnBrk="1" latinLnBrk="0" hangingPunct="1">
+              <a:spcBef>
+                <a:spcPct val="20000"/>
+              </a:spcBef>
+              <a:buFont typeface="Arial" panose="020B0604020202020204" pitchFamily="34" charset="0"/>
+              <a:buChar char="–"/>
+              <a:defRPr sz="2800" kern="1200">
+                <a:solidFill>
+                  <a:schemeClr val="tx1"/>
+                </a:solidFill>
+                <a:latin typeface="+mn-lt"/>
+                <a:ea typeface="+mn-ea"/>
+                <a:cs typeface="+mn-cs"/>
+              </a:defRPr>
+            </a:lvl2pPr>
+            <a:lvl3pPr marL="1143000" indent="-228600" algn="l" defTabSz="914400" rtl="0" eaLnBrk="1" latinLnBrk="0" hangingPunct="1">
+              <a:spcBef>
+                <a:spcPct val="20000"/>
+              </a:spcBef>
+              <a:buFont typeface="Arial" panose="020B0604020202020204" pitchFamily="34" charset="0"/>
+              <a:buChar char="•"/>
+              <a:defRPr sz="2400" kern="1200">
+                <a:solidFill>
+                  <a:schemeClr val="tx1"/>
+                </a:solidFill>
+                <a:latin typeface="+mn-lt"/>
+                <a:ea typeface="+mn-ea"/>
+                <a:cs typeface="+mn-cs"/>
+              </a:defRPr>
+            </a:lvl3pPr>
+            <a:lvl4pPr marL="1600200" indent="-228600" algn="l" defTabSz="914400" rtl="0" eaLnBrk="1" latinLnBrk="0" hangingPunct="1">
+              <a:spcBef>
+                <a:spcPct val="20000"/>
+              </a:spcBef>
+              <a:buFont typeface="Arial" panose="020B0604020202020204" pitchFamily="34" charset="0"/>
+              <a:buChar char="–"/>
+              <a:defRPr sz="2000" kern="1200">
+                <a:solidFill>
+                  <a:schemeClr val="tx1"/>
+                </a:solidFill>
+                <a:latin typeface="+mn-lt"/>
+                <a:ea typeface="+mn-ea"/>
+                <a:cs typeface="+mn-cs"/>
+              </a:defRPr>
+            </a:lvl4pPr>
+            <a:lvl5pPr marL="2057400" indent="-228600" algn="l" defTabSz="914400" rtl="0" eaLnBrk="1" latinLnBrk="0" hangingPunct="1">
+              <a:spcBef>
+                <a:spcPct val="20000"/>
+              </a:spcBef>
+              <a:buFont typeface="Arial" panose="020B0604020202020204" pitchFamily="34" charset="0"/>
+              <a:buChar char="»"/>
+              <a:defRPr sz="2000" kern="1200">
+                <a:solidFill>
+                  <a:schemeClr val="tx1"/>
+                </a:solidFill>
+                <a:latin typeface="+mn-lt"/>
+                <a:ea typeface="+mn-ea"/>
+                <a:cs typeface="+mn-cs"/>
+              </a:defRPr>
+            </a:lvl5pPr>
+            <a:lvl6pPr marL="2514600" indent="-228600" algn="l" defTabSz="914400" rtl="0" eaLnBrk="1" latinLnBrk="0" hangingPunct="1">
+              <a:spcBef>
+                <a:spcPct val="20000"/>
+              </a:spcBef>
+              <a:buFont typeface="Arial" panose="020B0604020202020204" pitchFamily="34" charset="0"/>
+              <a:buChar char="•"/>
+              <a:defRPr sz="2000" kern="1200">
+                <a:solidFill>
+                  <a:schemeClr val="tx1"/>
+                </a:solidFill>
+                <a:latin typeface="+mn-lt"/>
+                <a:ea typeface="+mn-ea"/>
+                <a:cs typeface="+mn-cs"/>
+              </a:defRPr>
+            </a:lvl6pPr>
+            <a:lvl7pPr marL="2971800" indent="-228600" algn="l" defTabSz="914400" rtl="0" eaLnBrk="1" latinLnBrk="0" hangingPunct="1">
+              <a:spcBef>
+                <a:spcPct val="20000"/>
+              </a:spcBef>
+              <a:buFont typeface="Arial" panose="020B0604020202020204" pitchFamily="34" charset="0"/>
+              <a:buChar char="•"/>
+              <a:defRPr sz="2000" kern="1200">
+                <a:solidFill>
+                  <a:schemeClr val="tx1"/>
+                </a:solidFill>
+                <a:latin typeface="+mn-lt"/>
+                <a:ea typeface="+mn-ea"/>
+                <a:cs typeface="+mn-cs"/>
+              </a:defRPr>
+            </a:lvl7pPr>
+            <a:lvl8pPr marL="3429000" indent="-228600" algn="l" defTabSz="914400" rtl="0" eaLnBrk="1" latinLnBrk="0" hangingPunct="1">
+              <a:spcBef>
+                <a:spcPct val="20000"/>
+              </a:spcBef>
+              <a:buFont typeface="Arial" panose="020B0604020202020204" pitchFamily="34" charset="0"/>
+              <a:buChar char="•"/>
+              <a:defRPr sz="2000" kern="1200">
+                <a:solidFill>
+                  <a:schemeClr val="tx1"/>
+                </a:solidFill>
+                <a:latin typeface="+mn-lt"/>
+                <a:ea typeface="+mn-ea"/>
+                <a:cs typeface="+mn-cs"/>
+              </a:defRPr>
+            </a:lvl8pPr>
+            <a:lvl9pPr marL="3886200" indent="-228600" algn="l" defTabSz="914400" rtl="0" eaLnBrk="1" latinLnBrk="0" hangingPunct="1">
+              <a:spcBef>
+                <a:spcPct val="20000"/>
+              </a:spcBef>
+              <a:buFont typeface="Arial" panose="020B0604020202020204" pitchFamily="34" charset="0"/>
+              <a:buChar char="•"/>
+              <a:defRPr sz="2000" kern="1200">
+                <a:solidFill>
+                  <a:schemeClr val="tx1"/>
+                </a:solidFill>
+                <a:latin typeface="+mn-lt"/>
+                <a:ea typeface="+mn-ea"/>
+                <a:cs typeface="+mn-cs"/>
+              </a:defRPr>
+            </a:lvl9pPr>
+          </a:lstStyle>
+          <a:p>
+            <a:endParaRPr lang="en-US" sz="2400" dirty="0" smtClean="0"/>
+          </a:p>
+        </p:txBody>
+      </p:sp>
+      <p:sp>
+        <p:nvSpPr>
+          <p:cNvPr id="7" name="Rectangle 6"/>
+          <p:cNvSpPr/>
+          <p:nvPr/>
+        </p:nvSpPr>
+        <p:spPr>
+          <a:xfrm>
+            <a:off x="457200" y="3886200"/>
+            <a:ext cx="8144774" cy="1631216"/>
+          </a:xfrm>
+          <a:prstGeom prst="rect">
+            <a:avLst/>
+          </a:prstGeom>
+        </p:spPr>
+        <p:txBody>
+          <a:bodyPr wrap="square">
+            <a:spAutoFit/>
+          </a:bodyPr>
+          <a:lstStyle/>
+          <a:p>
+            <a:pPr marL="342900" indent="-342900">
+              <a:buFont typeface="Arial" panose="020B0604020202020204" pitchFamily="34" charset="0"/>
+              <a:buChar char="•"/>
+            </a:pPr>
+            <a:r>
+              <a:rPr lang="en-US" sz="2000" dirty="0"/>
               <a:t>Define Receiver for messages and registration ID</a:t>
             </a:r>
           </a:p>
           <a:p>
-            <a:r>
-              <a:rPr lang="en-US" sz="2800" dirty="0" smtClean="0"/>
-              <a:t>Define IntentService for processing notifications</a:t>
-            </a:r>
-          </a:p>
-          <a:p>
-            <a:r>
-              <a:rPr lang="en-US" sz="2800" dirty="0" smtClean="0"/>
+            <a:pPr marL="342900" indent="-342900">
+              <a:buFont typeface="Arial" panose="020B0604020202020204" pitchFamily="34" charset="0"/>
+              <a:buChar char="•"/>
+            </a:pPr>
+            <a:r>
+              <a:rPr lang="en-US" sz="2000" dirty="0"/>
+              <a:t>Define </a:t>
+            </a:r>
+            <a:r>
+              <a:rPr lang="en-US" sz="2000" dirty="0" err="1"/>
+              <a:t>IntentService</a:t>
+            </a:r>
+            <a:r>
+              <a:rPr lang="en-US" sz="2000" dirty="0"/>
+              <a:t> for processing notifications</a:t>
+            </a:r>
+          </a:p>
+          <a:p>
+            <a:pPr marL="342900" indent="-342900">
+              <a:buFont typeface="Arial" panose="020B0604020202020204" pitchFamily="34" charset="0"/>
+              <a:buChar char="•"/>
+            </a:pPr>
+            <a:r>
+              <a:rPr lang="en-US" sz="2000" dirty="0"/>
               <a:t>See </a:t>
             </a:r>
             <a:r>
-              <a:rPr lang="en-US" sz="2800" dirty="0"/>
-              <a:t>http://developer.android.com/google/gcm/client.html#manifest for additional details</a:t>
-            </a:r>
-          </a:p>
-          <a:p>
-            <a:r>
-              <a:rPr lang="en-US" sz="2800" dirty="0" smtClean="0"/>
+              <a:rPr lang="en-US" sz="2000" dirty="0">
+                <a:hlinkClick r:id="rId2"/>
+              </a:rPr>
+              <a:t>http://</a:t>
+            </a:r>
+            <a:r>
+              <a:rPr lang="en-US" sz="2000" dirty="0" smtClean="0">
+                <a:hlinkClick r:id="rId2"/>
+              </a:rPr>
+              <a:t>developer.android.com/google/gcm/client.html#manifest</a:t>
+            </a:r>
+            <a:r>
+              <a:rPr lang="en-US" sz="2000" dirty="0" smtClean="0"/>
+              <a:t/>
+            </a:r>
+            <a:br>
+              <a:rPr lang="en-US" sz="2000" dirty="0" smtClean="0"/>
+            </a:br>
+            <a:r>
+              <a:rPr lang="en-US" sz="2000" dirty="0" smtClean="0"/>
+              <a:t>for </a:t>
+            </a:r>
+            <a:r>
+              <a:rPr lang="en-US" sz="2000" dirty="0"/>
+              <a:t>additional details</a:t>
+            </a:r>
+          </a:p>
+          <a:p>
+            <a:pPr marL="342900" indent="-342900">
+              <a:buFont typeface="Arial" panose="020B0604020202020204" pitchFamily="34" charset="0"/>
+              <a:buChar char="•"/>
+            </a:pPr>
+            <a:r>
+              <a:rPr lang="en-US" sz="2000" dirty="0"/>
               <a:t>Code walkthrough</a:t>
             </a:r>
           </a:p>
@@ -5431,14 +6873,13 @@
             <a:pPr lvl="2"/>
             <a:r>
               <a:rPr lang="en-US" dirty="0" smtClean="0"/>
-              <a:t>Dev HTTP Client  - Google Chrome App</a:t>
-            </a:r>
-          </a:p>
-          <a:p>
+              <a:t>Dev HTTP Client  - Google Chrome </a:t>
+            </a:r>
             <a:r>
               <a:rPr lang="en-US" dirty="0" smtClean="0"/>
-              <a:t>DEMO</a:t>
-            </a:r>
+              <a:t>App</a:t>
+            </a:r>
+            <a:endParaRPr lang="en-US" dirty="0" smtClean="0"/>
           </a:p>
           <a:p>
             <a:pPr lvl="2"/>
@@ -5496,7 +6937,7 @@
           <a:p>
             <a:r>
               <a:rPr lang="en-US" dirty="0" smtClean="0"/>
-              <a:t>Additional Info and Questions</a:t>
+              <a:t>Test API Key and Registration ID</a:t>
             </a:r>
             <a:endParaRPr lang="en-US" dirty="0"/>
           </a:p>
@@ -5512,123 +6953,922 @@
             <p:ph idx="1"/>
           </p:nvPr>
         </p:nvSpPr>
-        <p:spPr/>
-        <p:txBody>
-          <a:bodyPr/>
+        <p:spPr>
+          <a:xfrm>
+            <a:off x="457200" y="1600200"/>
+            <a:ext cx="8229600" cy="496669"/>
+          </a:xfrm>
+        </p:spPr>
+        <p:txBody>
+          <a:bodyPr>
+            <a:normAutofit/>
+          </a:bodyPr>
           <a:lstStyle/>
           <a:p>
-            <a:r>
-              <a:rPr lang="en-US" dirty="0" err="1" smtClean="0"/>
-              <a:t>GitHub</a:t>
-            </a:r>
-            <a:r>
-              <a:rPr lang="en-US" dirty="0" smtClean="0"/>
-              <a:t> repo:</a:t>
-            </a:r>
-          </a:p>
-          <a:p>
-            <a:pPr lvl="1"/>
+            <a:pPr marL="0" indent="0">
+              <a:buNone/>
+            </a:pPr>
             <a:r>
               <a:rPr lang="en-US" sz="2400" dirty="0"/>
-              <a:t>https://</a:t>
-            </a:r>
-            <a:r>
-              <a:rPr lang="en-US" sz="2400" dirty="0" err="1"/>
-              <a:t>github.com</a:t>
-            </a:r>
-            <a:r>
-              <a:rPr lang="en-US" sz="2400" dirty="0"/>
+              <a:t>Run this command, all on one line</a:t>
+            </a:r>
+            <a:endParaRPr lang="en-US" sz="2400" dirty="0"/>
+          </a:p>
+        </p:txBody>
+      </p:sp>
+      <p:sp>
+        <p:nvSpPr>
+          <p:cNvPr id="5" name="TextBox 4"/>
+          <p:cNvSpPr txBox="1"/>
+          <p:nvPr/>
+        </p:nvSpPr>
+        <p:spPr>
+          <a:xfrm>
+            <a:off x="451449" y="2068658"/>
+            <a:ext cx="8229600" cy="646331"/>
+          </a:xfrm>
+          <a:prstGeom prst="rect">
+            <a:avLst/>
+          </a:prstGeom>
+          <a:solidFill>
+            <a:schemeClr val="bg1">
+              <a:lumMod val="85000"/>
+            </a:schemeClr>
+          </a:solidFill>
+          <a:ln>
+            <a:solidFill>
+              <a:schemeClr val="tx1"/>
+            </a:solidFill>
+          </a:ln>
+        </p:spPr>
+        <p:txBody>
+          <a:bodyPr wrap="square" rtlCol="0">
+            <a:spAutoFit/>
+          </a:bodyPr>
+          <a:lstStyle/>
+          <a:p>
+            <a:r>
+              <a:rPr lang="en-US" sz="1200" dirty="0">
+                <a:latin typeface="Courier"/>
+                <a:cs typeface="Courier"/>
+              </a:rPr>
+              <a:t>curl --header "Authorization: key=&lt;API Key&gt;" --header </a:t>
+            </a:r>
+            <a:r>
+              <a:rPr lang="en-US" sz="1200" dirty="0" err="1">
+                <a:latin typeface="Courier"/>
+                <a:cs typeface="Courier"/>
+              </a:rPr>
+              <a:t>Content-Type:"application</a:t>
+            </a:r>
+            <a:r>
+              <a:rPr lang="en-US" sz="1200" dirty="0">
+                <a:latin typeface="Courier"/>
+                <a:cs typeface="Courier"/>
+              </a:rPr>
               <a:t>/</a:t>
             </a:r>
             <a:r>
-              <a:rPr lang="en-US" sz="2400" dirty="0" err="1"/>
-              <a:t>LeadingEDJE</a:t>
-            </a:r>
-            <a:r>
-              <a:rPr lang="en-US" sz="2400" dirty="0"/>
-              <a:t>/</a:t>
-            </a:r>
-            <a:r>
-              <a:rPr lang="en-US" sz="2400" dirty="0" err="1" smtClean="0"/>
-              <a:t>MobilePushNotification</a:t>
-            </a:r>
-            <a:endParaRPr lang="en-US" sz="2400" dirty="0" smtClean="0"/>
-          </a:p>
-          <a:p>
-            <a:r>
-              <a:rPr lang="en-US" dirty="0" smtClean="0"/>
-              <a:t>Google Cloud Messaging for Android</a:t>
-            </a:r>
-          </a:p>
-          <a:p>
-            <a:pPr lvl="1"/>
-            <a:r>
-              <a:rPr lang="en-US" sz="2400" dirty="0"/>
-              <a:t>http://</a:t>
-            </a:r>
-            <a:r>
-              <a:rPr lang="en-US" sz="2400" dirty="0" err="1"/>
-              <a:t>developer.android.com</a:t>
-            </a:r>
-            <a:r>
-              <a:rPr lang="en-US" sz="2400" dirty="0"/>
-              <a:t>/</a:t>
-            </a:r>
-            <a:r>
-              <a:rPr lang="en-US" sz="2400" dirty="0" err="1"/>
-              <a:t>google</a:t>
-            </a:r>
-            <a:r>
-              <a:rPr lang="en-US" sz="2400" dirty="0"/>
-              <a:t>/</a:t>
-            </a:r>
-            <a:r>
-              <a:rPr lang="en-US" sz="2400" dirty="0" err="1"/>
-              <a:t>gcm</a:t>
-            </a:r>
-            <a:r>
-              <a:rPr lang="en-US" sz="2400" dirty="0"/>
-              <a:t>/</a:t>
-            </a:r>
-            <a:r>
-              <a:rPr lang="en-US" sz="2400" dirty="0" err="1"/>
-              <a:t>index.html</a:t>
+              <a:rPr lang="en-US" sz="1200" dirty="0" err="1">
+                <a:latin typeface="Courier"/>
+                <a:cs typeface="Courier"/>
+              </a:rPr>
+              <a:t>json</a:t>
+            </a:r>
+            <a:r>
+              <a:rPr lang="en-US" sz="1200" dirty="0">
+                <a:latin typeface="Courier"/>
+                <a:cs typeface="Courier"/>
+              </a:rPr>
+              <a:t>" https://android.googleapis.com/gcm/send  -d "{\"</a:t>
+            </a:r>
+            <a:r>
+              <a:rPr lang="en-US" sz="1200" dirty="0" err="1">
+                <a:latin typeface="Courier"/>
+                <a:cs typeface="Courier"/>
+              </a:rPr>
+              <a:t>registration_ids</a:t>
+            </a:r>
+            <a:r>
+              <a:rPr lang="en-US" sz="1200" dirty="0">
+                <a:latin typeface="Courier"/>
+                <a:cs typeface="Courier"/>
+              </a:rPr>
+              <a:t>\":[\"&lt;Registration ID</a:t>
+            </a:r>
+            <a:r>
+              <a:rPr lang="en-US" sz="1200" dirty="0" smtClean="0">
+                <a:latin typeface="Courier"/>
+                <a:cs typeface="Courier"/>
+              </a:rPr>
+              <a:t>&gt;\"]}"</a:t>
+            </a:r>
+            <a:endParaRPr lang="en-US" sz="1200" dirty="0">
+              <a:latin typeface="Courier"/>
+              <a:cs typeface="Courier"/>
+            </a:endParaRPr>
+          </a:p>
+        </p:txBody>
+      </p:sp>
+      <p:sp>
+        <p:nvSpPr>
+          <p:cNvPr id="6" name="TextBox 5"/>
+          <p:cNvSpPr txBox="1"/>
+          <p:nvPr/>
+        </p:nvSpPr>
+        <p:spPr>
+          <a:xfrm>
+            <a:off x="451449" y="3326875"/>
+            <a:ext cx="8229600" cy="461665"/>
+          </a:xfrm>
+          <a:prstGeom prst="rect">
+            <a:avLst/>
+          </a:prstGeom>
+          <a:solidFill>
+            <a:schemeClr val="bg1">
+              <a:lumMod val="85000"/>
+            </a:schemeClr>
+          </a:solidFill>
+          <a:ln>
+            <a:solidFill>
+              <a:schemeClr val="tx1"/>
+            </a:solidFill>
+          </a:ln>
+        </p:spPr>
+        <p:txBody>
+          <a:bodyPr wrap="square" rtlCol="0">
+            <a:spAutoFit/>
+          </a:bodyPr>
+          <a:lstStyle/>
+          <a:p>
+            <a:r>
+              <a:rPr lang="en-US" sz="1200" dirty="0">
+                <a:latin typeface="Courier"/>
+                <a:cs typeface="Courier"/>
+              </a:rPr>
+              <a:t>{"multicast_id":7234249251933638557,"success":1,"failure":0,"canonical_ids":0,"results":[{"message_id":"0:1397573613153828%b1013b1cf9fd7ecd</a:t>
+            </a:r>
+            <a:r>
+              <a:rPr lang="en-US" sz="1200" dirty="0" smtClean="0">
+                <a:latin typeface="Courier"/>
+                <a:cs typeface="Courier"/>
+              </a:rPr>
+              <a:t>"}]}</a:t>
+            </a:r>
+            <a:endParaRPr lang="en-US" sz="1200" dirty="0">
+              <a:latin typeface="Courier"/>
+              <a:cs typeface="Courier"/>
+            </a:endParaRPr>
+          </a:p>
+        </p:txBody>
+      </p:sp>
+      <p:sp>
+        <p:nvSpPr>
+          <p:cNvPr id="7" name="TextBox 6"/>
+          <p:cNvSpPr txBox="1"/>
+          <p:nvPr/>
+        </p:nvSpPr>
+        <p:spPr>
+          <a:xfrm>
+            <a:off x="460075" y="4801409"/>
+            <a:ext cx="8229600" cy="276999"/>
+          </a:xfrm>
+          <a:prstGeom prst="rect">
+            <a:avLst/>
+          </a:prstGeom>
+          <a:solidFill>
+            <a:schemeClr val="bg1">
+              <a:lumMod val="85000"/>
+            </a:schemeClr>
+          </a:solidFill>
+          <a:ln>
+            <a:solidFill>
+              <a:schemeClr val="tx1"/>
+            </a:solidFill>
+          </a:ln>
+        </p:spPr>
+        <p:txBody>
+          <a:bodyPr wrap="square" rtlCol="0">
+            <a:spAutoFit/>
+          </a:bodyPr>
+          <a:lstStyle/>
+          <a:p>
+            <a:r>
+              <a:rPr lang="en-US" sz="1200" dirty="0">
+                <a:latin typeface="Courier"/>
+                <a:cs typeface="Courier"/>
+              </a:rPr>
+              <a:t>"failure":1, results":[{"error":"</a:t>
+            </a:r>
+            <a:r>
+              <a:rPr lang="en-US" sz="1200" dirty="0" err="1">
+                <a:latin typeface="Courier"/>
+                <a:cs typeface="Courier"/>
+              </a:rPr>
+              <a:t>InvalidRegistration</a:t>
+            </a:r>
+            <a:r>
+              <a:rPr lang="en-US" sz="1200" dirty="0" smtClean="0">
+                <a:latin typeface="Courier"/>
+                <a:cs typeface="Courier"/>
+              </a:rPr>
+              <a:t>"}]</a:t>
+            </a:r>
+            <a:endParaRPr lang="en-US" sz="1200" dirty="0">
+              <a:latin typeface="Courier"/>
+              <a:cs typeface="Courier"/>
+            </a:endParaRPr>
+          </a:p>
+        </p:txBody>
+      </p:sp>
+      <p:sp>
+        <p:nvSpPr>
+          <p:cNvPr id="8" name="Content Placeholder 2"/>
+          <p:cNvSpPr txBox="1">
+            <a:spLocks/>
+          </p:cNvSpPr>
+          <p:nvPr/>
+        </p:nvSpPr>
+        <p:spPr>
+          <a:xfrm>
+            <a:off x="451449" y="2817266"/>
+            <a:ext cx="8229600" cy="496669"/>
+          </a:xfrm>
+          <a:prstGeom prst="rect">
+            <a:avLst/>
+          </a:prstGeom>
+        </p:spPr>
+        <p:txBody>
+          <a:bodyPr vert="horz" lIns="91440" tIns="45720" rIns="91440" bIns="45720" rtlCol="0">
+            <a:normAutofit/>
+          </a:bodyPr>
+          <a:lstStyle>
+            <a:lvl1pPr marL="342900" indent="-342900" algn="l" defTabSz="914400" rtl="0" eaLnBrk="1" latinLnBrk="0" hangingPunct="1">
+              <a:spcBef>
+                <a:spcPct val="20000"/>
+              </a:spcBef>
+              <a:buFont typeface="Arial" panose="020B0604020202020204" pitchFamily="34" charset="0"/>
+              <a:buChar char="•"/>
+              <a:defRPr sz="3200" kern="1200">
+                <a:solidFill>
+                  <a:schemeClr val="tx1"/>
+                </a:solidFill>
+                <a:latin typeface="+mn-lt"/>
+                <a:ea typeface="+mn-ea"/>
+                <a:cs typeface="+mn-cs"/>
+              </a:defRPr>
+            </a:lvl1pPr>
+            <a:lvl2pPr marL="742950" indent="-285750" algn="l" defTabSz="914400" rtl="0" eaLnBrk="1" latinLnBrk="0" hangingPunct="1">
+              <a:spcBef>
+                <a:spcPct val="20000"/>
+              </a:spcBef>
+              <a:buFont typeface="Arial" panose="020B0604020202020204" pitchFamily="34" charset="0"/>
+              <a:buChar char="–"/>
+              <a:defRPr sz="2800" kern="1200">
+                <a:solidFill>
+                  <a:schemeClr val="tx1"/>
+                </a:solidFill>
+                <a:latin typeface="+mn-lt"/>
+                <a:ea typeface="+mn-ea"/>
+                <a:cs typeface="+mn-cs"/>
+              </a:defRPr>
+            </a:lvl2pPr>
+            <a:lvl3pPr marL="1143000" indent="-228600" algn="l" defTabSz="914400" rtl="0" eaLnBrk="1" latinLnBrk="0" hangingPunct="1">
+              <a:spcBef>
+                <a:spcPct val="20000"/>
+              </a:spcBef>
+              <a:buFont typeface="Arial" panose="020B0604020202020204" pitchFamily="34" charset="0"/>
+              <a:buChar char="•"/>
+              <a:defRPr sz="2400" kern="1200">
+                <a:solidFill>
+                  <a:schemeClr val="tx1"/>
+                </a:solidFill>
+                <a:latin typeface="+mn-lt"/>
+                <a:ea typeface="+mn-ea"/>
+                <a:cs typeface="+mn-cs"/>
+              </a:defRPr>
+            </a:lvl3pPr>
+            <a:lvl4pPr marL="1600200" indent="-228600" algn="l" defTabSz="914400" rtl="0" eaLnBrk="1" latinLnBrk="0" hangingPunct="1">
+              <a:spcBef>
+                <a:spcPct val="20000"/>
+              </a:spcBef>
+              <a:buFont typeface="Arial" panose="020B0604020202020204" pitchFamily="34" charset="0"/>
+              <a:buChar char="–"/>
+              <a:defRPr sz="2000" kern="1200">
+                <a:solidFill>
+                  <a:schemeClr val="tx1"/>
+                </a:solidFill>
+                <a:latin typeface="+mn-lt"/>
+                <a:ea typeface="+mn-ea"/>
+                <a:cs typeface="+mn-cs"/>
+              </a:defRPr>
+            </a:lvl4pPr>
+            <a:lvl5pPr marL="2057400" indent="-228600" algn="l" defTabSz="914400" rtl="0" eaLnBrk="1" latinLnBrk="0" hangingPunct="1">
+              <a:spcBef>
+                <a:spcPct val="20000"/>
+              </a:spcBef>
+              <a:buFont typeface="Arial" panose="020B0604020202020204" pitchFamily="34" charset="0"/>
+              <a:buChar char="»"/>
+              <a:defRPr sz="2000" kern="1200">
+                <a:solidFill>
+                  <a:schemeClr val="tx1"/>
+                </a:solidFill>
+                <a:latin typeface="+mn-lt"/>
+                <a:ea typeface="+mn-ea"/>
+                <a:cs typeface="+mn-cs"/>
+              </a:defRPr>
+            </a:lvl5pPr>
+            <a:lvl6pPr marL="2514600" indent="-228600" algn="l" defTabSz="914400" rtl="0" eaLnBrk="1" latinLnBrk="0" hangingPunct="1">
+              <a:spcBef>
+                <a:spcPct val="20000"/>
+              </a:spcBef>
+              <a:buFont typeface="Arial" panose="020B0604020202020204" pitchFamily="34" charset="0"/>
+              <a:buChar char="•"/>
+              <a:defRPr sz="2000" kern="1200">
+                <a:solidFill>
+                  <a:schemeClr val="tx1"/>
+                </a:solidFill>
+                <a:latin typeface="+mn-lt"/>
+                <a:ea typeface="+mn-ea"/>
+                <a:cs typeface="+mn-cs"/>
+              </a:defRPr>
+            </a:lvl6pPr>
+            <a:lvl7pPr marL="2971800" indent="-228600" algn="l" defTabSz="914400" rtl="0" eaLnBrk="1" latinLnBrk="0" hangingPunct="1">
+              <a:spcBef>
+                <a:spcPct val="20000"/>
+              </a:spcBef>
+              <a:buFont typeface="Arial" panose="020B0604020202020204" pitchFamily="34" charset="0"/>
+              <a:buChar char="•"/>
+              <a:defRPr sz="2000" kern="1200">
+                <a:solidFill>
+                  <a:schemeClr val="tx1"/>
+                </a:solidFill>
+                <a:latin typeface="+mn-lt"/>
+                <a:ea typeface="+mn-ea"/>
+                <a:cs typeface="+mn-cs"/>
+              </a:defRPr>
+            </a:lvl7pPr>
+            <a:lvl8pPr marL="3429000" indent="-228600" algn="l" defTabSz="914400" rtl="0" eaLnBrk="1" latinLnBrk="0" hangingPunct="1">
+              <a:spcBef>
+                <a:spcPct val="20000"/>
+              </a:spcBef>
+              <a:buFont typeface="Arial" panose="020B0604020202020204" pitchFamily="34" charset="0"/>
+              <a:buChar char="•"/>
+              <a:defRPr sz="2000" kern="1200">
+                <a:solidFill>
+                  <a:schemeClr val="tx1"/>
+                </a:solidFill>
+                <a:latin typeface="+mn-lt"/>
+                <a:ea typeface="+mn-ea"/>
+                <a:cs typeface="+mn-cs"/>
+              </a:defRPr>
+            </a:lvl8pPr>
+            <a:lvl9pPr marL="3886200" indent="-228600" algn="l" defTabSz="914400" rtl="0" eaLnBrk="1" latinLnBrk="0" hangingPunct="1">
+              <a:spcBef>
+                <a:spcPct val="20000"/>
+              </a:spcBef>
+              <a:buFont typeface="Arial" panose="020B0604020202020204" pitchFamily="34" charset="0"/>
+              <a:buChar char="•"/>
+              <a:defRPr sz="2000" kern="1200">
+                <a:solidFill>
+                  <a:schemeClr val="tx1"/>
+                </a:solidFill>
+                <a:latin typeface="+mn-lt"/>
+                <a:ea typeface="+mn-ea"/>
+                <a:cs typeface="+mn-cs"/>
+              </a:defRPr>
+            </a:lvl9pPr>
+          </a:lstStyle>
+          <a:p>
+            <a:pPr marL="0" indent="0">
+              <a:buFont typeface="Arial" panose="020B0604020202020204" pitchFamily="34" charset="0"/>
+              <a:buNone/>
+            </a:pPr>
+            <a:r>
+              <a:rPr lang="en-US" sz="2400" dirty="0" smtClean="0"/>
+              <a:t>Valid server API key and device registration ID returns:</a:t>
             </a:r>
             <a:endParaRPr lang="en-US" sz="2400" dirty="0"/>
           </a:p>
-          <a:p>
-            <a:r>
-              <a:rPr lang="en-US" dirty="0" smtClean="0"/>
-              <a:t>My </a:t>
-            </a:r>
-            <a:r>
-              <a:rPr lang="en-US" dirty="0"/>
-              <a:t>contact info:</a:t>
-            </a:r>
-          </a:p>
-          <a:p>
-            <a:pPr lvl="1"/>
-            <a:r>
-              <a:rPr lang="en-US" sz="2400" dirty="0"/>
-              <a:t>keith.wedinger@leadingedje.com</a:t>
-            </a:r>
-          </a:p>
-          <a:p>
-            <a:pPr lvl="1"/>
-            <a:r>
-              <a:rPr lang="en-US" sz="2400" dirty="0"/>
-              <a:t>Twitter: @jkwuc89</a:t>
-            </a:r>
-          </a:p>
-          <a:p>
-            <a:endParaRPr lang="en-US" dirty="0"/>
+        </p:txBody>
+      </p:sp>
+      <p:sp>
+        <p:nvSpPr>
+          <p:cNvPr id="9" name="Content Placeholder 2"/>
+          <p:cNvSpPr txBox="1">
+            <a:spLocks/>
+          </p:cNvSpPr>
+          <p:nvPr/>
+        </p:nvSpPr>
+        <p:spPr>
+          <a:xfrm>
+            <a:off x="451449" y="3804726"/>
+            <a:ext cx="8229600" cy="496669"/>
+          </a:xfrm>
+          <a:prstGeom prst="rect">
+            <a:avLst/>
+          </a:prstGeom>
+        </p:spPr>
+        <p:txBody>
+          <a:bodyPr vert="horz" lIns="91440" tIns="45720" rIns="91440" bIns="45720" rtlCol="0">
+            <a:normAutofit/>
+          </a:bodyPr>
+          <a:lstStyle>
+            <a:lvl1pPr marL="342900" indent="-342900" algn="l" defTabSz="914400" rtl="0" eaLnBrk="1" latinLnBrk="0" hangingPunct="1">
+              <a:spcBef>
+                <a:spcPct val="20000"/>
+              </a:spcBef>
+              <a:buFont typeface="Arial" panose="020B0604020202020204" pitchFamily="34" charset="0"/>
+              <a:buChar char="•"/>
+              <a:defRPr sz="3200" kern="1200">
+                <a:solidFill>
+                  <a:schemeClr val="tx1"/>
+                </a:solidFill>
+                <a:latin typeface="+mn-lt"/>
+                <a:ea typeface="+mn-ea"/>
+                <a:cs typeface="+mn-cs"/>
+              </a:defRPr>
+            </a:lvl1pPr>
+            <a:lvl2pPr marL="742950" indent="-285750" algn="l" defTabSz="914400" rtl="0" eaLnBrk="1" latinLnBrk="0" hangingPunct="1">
+              <a:spcBef>
+                <a:spcPct val="20000"/>
+              </a:spcBef>
+              <a:buFont typeface="Arial" panose="020B0604020202020204" pitchFamily="34" charset="0"/>
+              <a:buChar char="–"/>
+              <a:defRPr sz="2800" kern="1200">
+                <a:solidFill>
+                  <a:schemeClr val="tx1"/>
+                </a:solidFill>
+                <a:latin typeface="+mn-lt"/>
+                <a:ea typeface="+mn-ea"/>
+                <a:cs typeface="+mn-cs"/>
+              </a:defRPr>
+            </a:lvl2pPr>
+            <a:lvl3pPr marL="1143000" indent="-228600" algn="l" defTabSz="914400" rtl="0" eaLnBrk="1" latinLnBrk="0" hangingPunct="1">
+              <a:spcBef>
+                <a:spcPct val="20000"/>
+              </a:spcBef>
+              <a:buFont typeface="Arial" panose="020B0604020202020204" pitchFamily="34" charset="0"/>
+              <a:buChar char="•"/>
+              <a:defRPr sz="2400" kern="1200">
+                <a:solidFill>
+                  <a:schemeClr val="tx1"/>
+                </a:solidFill>
+                <a:latin typeface="+mn-lt"/>
+                <a:ea typeface="+mn-ea"/>
+                <a:cs typeface="+mn-cs"/>
+              </a:defRPr>
+            </a:lvl3pPr>
+            <a:lvl4pPr marL="1600200" indent="-228600" algn="l" defTabSz="914400" rtl="0" eaLnBrk="1" latinLnBrk="0" hangingPunct="1">
+              <a:spcBef>
+                <a:spcPct val="20000"/>
+              </a:spcBef>
+              <a:buFont typeface="Arial" panose="020B0604020202020204" pitchFamily="34" charset="0"/>
+              <a:buChar char="–"/>
+              <a:defRPr sz="2000" kern="1200">
+                <a:solidFill>
+                  <a:schemeClr val="tx1"/>
+                </a:solidFill>
+                <a:latin typeface="+mn-lt"/>
+                <a:ea typeface="+mn-ea"/>
+                <a:cs typeface="+mn-cs"/>
+              </a:defRPr>
+            </a:lvl4pPr>
+            <a:lvl5pPr marL="2057400" indent="-228600" algn="l" defTabSz="914400" rtl="0" eaLnBrk="1" latinLnBrk="0" hangingPunct="1">
+              <a:spcBef>
+                <a:spcPct val="20000"/>
+              </a:spcBef>
+              <a:buFont typeface="Arial" panose="020B0604020202020204" pitchFamily="34" charset="0"/>
+              <a:buChar char="»"/>
+              <a:defRPr sz="2000" kern="1200">
+                <a:solidFill>
+                  <a:schemeClr val="tx1"/>
+                </a:solidFill>
+                <a:latin typeface="+mn-lt"/>
+                <a:ea typeface="+mn-ea"/>
+                <a:cs typeface="+mn-cs"/>
+              </a:defRPr>
+            </a:lvl5pPr>
+            <a:lvl6pPr marL="2514600" indent="-228600" algn="l" defTabSz="914400" rtl="0" eaLnBrk="1" latinLnBrk="0" hangingPunct="1">
+              <a:spcBef>
+                <a:spcPct val="20000"/>
+              </a:spcBef>
+              <a:buFont typeface="Arial" panose="020B0604020202020204" pitchFamily="34" charset="0"/>
+              <a:buChar char="•"/>
+              <a:defRPr sz="2000" kern="1200">
+                <a:solidFill>
+                  <a:schemeClr val="tx1"/>
+                </a:solidFill>
+                <a:latin typeface="+mn-lt"/>
+                <a:ea typeface="+mn-ea"/>
+                <a:cs typeface="+mn-cs"/>
+              </a:defRPr>
+            </a:lvl6pPr>
+            <a:lvl7pPr marL="2971800" indent="-228600" algn="l" defTabSz="914400" rtl="0" eaLnBrk="1" latinLnBrk="0" hangingPunct="1">
+              <a:spcBef>
+                <a:spcPct val="20000"/>
+              </a:spcBef>
+              <a:buFont typeface="Arial" panose="020B0604020202020204" pitchFamily="34" charset="0"/>
+              <a:buChar char="•"/>
+              <a:defRPr sz="2000" kern="1200">
+                <a:solidFill>
+                  <a:schemeClr val="tx1"/>
+                </a:solidFill>
+                <a:latin typeface="+mn-lt"/>
+                <a:ea typeface="+mn-ea"/>
+                <a:cs typeface="+mn-cs"/>
+              </a:defRPr>
+            </a:lvl7pPr>
+            <a:lvl8pPr marL="3429000" indent="-228600" algn="l" defTabSz="914400" rtl="0" eaLnBrk="1" latinLnBrk="0" hangingPunct="1">
+              <a:spcBef>
+                <a:spcPct val="20000"/>
+              </a:spcBef>
+              <a:buFont typeface="Arial" panose="020B0604020202020204" pitchFamily="34" charset="0"/>
+              <a:buChar char="•"/>
+              <a:defRPr sz="2000" kern="1200">
+                <a:solidFill>
+                  <a:schemeClr val="tx1"/>
+                </a:solidFill>
+                <a:latin typeface="+mn-lt"/>
+                <a:ea typeface="+mn-ea"/>
+                <a:cs typeface="+mn-cs"/>
+              </a:defRPr>
+            </a:lvl8pPr>
+            <a:lvl9pPr marL="3886200" indent="-228600" algn="l" defTabSz="914400" rtl="0" eaLnBrk="1" latinLnBrk="0" hangingPunct="1">
+              <a:spcBef>
+                <a:spcPct val="20000"/>
+              </a:spcBef>
+              <a:buFont typeface="Arial" panose="020B0604020202020204" pitchFamily="34" charset="0"/>
+              <a:buChar char="•"/>
+              <a:defRPr sz="2000" kern="1200">
+                <a:solidFill>
+                  <a:schemeClr val="tx1"/>
+                </a:solidFill>
+                <a:latin typeface="+mn-lt"/>
+                <a:ea typeface="+mn-ea"/>
+                <a:cs typeface="+mn-cs"/>
+              </a:defRPr>
+            </a:lvl9pPr>
+          </a:lstStyle>
+          <a:p>
+            <a:pPr marL="0" indent="0">
+              <a:buFont typeface="Arial" panose="020B0604020202020204" pitchFamily="34" charset="0"/>
+              <a:buNone/>
+            </a:pPr>
+            <a:r>
+              <a:rPr lang="en-US" sz="2400" dirty="0" smtClean="0"/>
+              <a:t>Invalid server API key returns HTTP status code 401</a:t>
+            </a:r>
+            <a:endParaRPr lang="en-US" sz="2400" dirty="0"/>
+          </a:p>
+        </p:txBody>
+      </p:sp>
+      <p:sp>
+        <p:nvSpPr>
+          <p:cNvPr id="10" name="Content Placeholder 2"/>
+          <p:cNvSpPr txBox="1">
+            <a:spLocks/>
+          </p:cNvSpPr>
+          <p:nvPr/>
+        </p:nvSpPr>
+        <p:spPr>
+          <a:xfrm>
+            <a:off x="455762" y="4297180"/>
+            <a:ext cx="8229600" cy="496669"/>
+          </a:xfrm>
+          <a:prstGeom prst="rect">
+            <a:avLst/>
+          </a:prstGeom>
+        </p:spPr>
+        <p:txBody>
+          <a:bodyPr vert="horz" lIns="91440" tIns="45720" rIns="91440" bIns="45720" rtlCol="0">
+            <a:normAutofit/>
+          </a:bodyPr>
+          <a:lstStyle>
+            <a:lvl1pPr marL="342900" indent="-342900" algn="l" defTabSz="914400" rtl="0" eaLnBrk="1" latinLnBrk="0" hangingPunct="1">
+              <a:spcBef>
+                <a:spcPct val="20000"/>
+              </a:spcBef>
+              <a:buFont typeface="Arial" panose="020B0604020202020204" pitchFamily="34" charset="0"/>
+              <a:buChar char="•"/>
+              <a:defRPr sz="3200" kern="1200">
+                <a:solidFill>
+                  <a:schemeClr val="tx1"/>
+                </a:solidFill>
+                <a:latin typeface="+mn-lt"/>
+                <a:ea typeface="+mn-ea"/>
+                <a:cs typeface="+mn-cs"/>
+              </a:defRPr>
+            </a:lvl1pPr>
+            <a:lvl2pPr marL="742950" indent="-285750" algn="l" defTabSz="914400" rtl="0" eaLnBrk="1" latinLnBrk="0" hangingPunct="1">
+              <a:spcBef>
+                <a:spcPct val="20000"/>
+              </a:spcBef>
+              <a:buFont typeface="Arial" panose="020B0604020202020204" pitchFamily="34" charset="0"/>
+              <a:buChar char="–"/>
+              <a:defRPr sz="2800" kern="1200">
+                <a:solidFill>
+                  <a:schemeClr val="tx1"/>
+                </a:solidFill>
+                <a:latin typeface="+mn-lt"/>
+                <a:ea typeface="+mn-ea"/>
+                <a:cs typeface="+mn-cs"/>
+              </a:defRPr>
+            </a:lvl2pPr>
+            <a:lvl3pPr marL="1143000" indent="-228600" algn="l" defTabSz="914400" rtl="0" eaLnBrk="1" latinLnBrk="0" hangingPunct="1">
+              <a:spcBef>
+                <a:spcPct val="20000"/>
+              </a:spcBef>
+              <a:buFont typeface="Arial" panose="020B0604020202020204" pitchFamily="34" charset="0"/>
+              <a:buChar char="•"/>
+              <a:defRPr sz="2400" kern="1200">
+                <a:solidFill>
+                  <a:schemeClr val="tx1"/>
+                </a:solidFill>
+                <a:latin typeface="+mn-lt"/>
+                <a:ea typeface="+mn-ea"/>
+                <a:cs typeface="+mn-cs"/>
+              </a:defRPr>
+            </a:lvl3pPr>
+            <a:lvl4pPr marL="1600200" indent="-228600" algn="l" defTabSz="914400" rtl="0" eaLnBrk="1" latinLnBrk="0" hangingPunct="1">
+              <a:spcBef>
+                <a:spcPct val="20000"/>
+              </a:spcBef>
+              <a:buFont typeface="Arial" panose="020B0604020202020204" pitchFamily="34" charset="0"/>
+              <a:buChar char="–"/>
+              <a:defRPr sz="2000" kern="1200">
+                <a:solidFill>
+                  <a:schemeClr val="tx1"/>
+                </a:solidFill>
+                <a:latin typeface="+mn-lt"/>
+                <a:ea typeface="+mn-ea"/>
+                <a:cs typeface="+mn-cs"/>
+              </a:defRPr>
+            </a:lvl4pPr>
+            <a:lvl5pPr marL="2057400" indent="-228600" algn="l" defTabSz="914400" rtl="0" eaLnBrk="1" latinLnBrk="0" hangingPunct="1">
+              <a:spcBef>
+                <a:spcPct val="20000"/>
+              </a:spcBef>
+              <a:buFont typeface="Arial" panose="020B0604020202020204" pitchFamily="34" charset="0"/>
+              <a:buChar char="»"/>
+              <a:defRPr sz="2000" kern="1200">
+                <a:solidFill>
+                  <a:schemeClr val="tx1"/>
+                </a:solidFill>
+                <a:latin typeface="+mn-lt"/>
+                <a:ea typeface="+mn-ea"/>
+                <a:cs typeface="+mn-cs"/>
+              </a:defRPr>
+            </a:lvl5pPr>
+            <a:lvl6pPr marL="2514600" indent="-228600" algn="l" defTabSz="914400" rtl="0" eaLnBrk="1" latinLnBrk="0" hangingPunct="1">
+              <a:spcBef>
+                <a:spcPct val="20000"/>
+              </a:spcBef>
+              <a:buFont typeface="Arial" panose="020B0604020202020204" pitchFamily="34" charset="0"/>
+              <a:buChar char="•"/>
+              <a:defRPr sz="2000" kern="1200">
+                <a:solidFill>
+                  <a:schemeClr val="tx1"/>
+                </a:solidFill>
+                <a:latin typeface="+mn-lt"/>
+                <a:ea typeface="+mn-ea"/>
+                <a:cs typeface="+mn-cs"/>
+              </a:defRPr>
+            </a:lvl6pPr>
+            <a:lvl7pPr marL="2971800" indent="-228600" algn="l" defTabSz="914400" rtl="0" eaLnBrk="1" latinLnBrk="0" hangingPunct="1">
+              <a:spcBef>
+                <a:spcPct val="20000"/>
+              </a:spcBef>
+              <a:buFont typeface="Arial" panose="020B0604020202020204" pitchFamily="34" charset="0"/>
+              <a:buChar char="•"/>
+              <a:defRPr sz="2000" kern="1200">
+                <a:solidFill>
+                  <a:schemeClr val="tx1"/>
+                </a:solidFill>
+                <a:latin typeface="+mn-lt"/>
+                <a:ea typeface="+mn-ea"/>
+                <a:cs typeface="+mn-cs"/>
+              </a:defRPr>
+            </a:lvl7pPr>
+            <a:lvl8pPr marL="3429000" indent="-228600" algn="l" defTabSz="914400" rtl="0" eaLnBrk="1" latinLnBrk="0" hangingPunct="1">
+              <a:spcBef>
+                <a:spcPct val="20000"/>
+              </a:spcBef>
+              <a:buFont typeface="Arial" panose="020B0604020202020204" pitchFamily="34" charset="0"/>
+              <a:buChar char="•"/>
+              <a:defRPr sz="2000" kern="1200">
+                <a:solidFill>
+                  <a:schemeClr val="tx1"/>
+                </a:solidFill>
+                <a:latin typeface="+mn-lt"/>
+                <a:ea typeface="+mn-ea"/>
+                <a:cs typeface="+mn-cs"/>
+              </a:defRPr>
+            </a:lvl8pPr>
+            <a:lvl9pPr marL="3886200" indent="-228600" algn="l" defTabSz="914400" rtl="0" eaLnBrk="1" latinLnBrk="0" hangingPunct="1">
+              <a:spcBef>
+                <a:spcPct val="20000"/>
+              </a:spcBef>
+              <a:buFont typeface="Arial" panose="020B0604020202020204" pitchFamily="34" charset="0"/>
+              <a:buChar char="•"/>
+              <a:defRPr sz="2000" kern="1200">
+                <a:solidFill>
+                  <a:schemeClr val="tx1"/>
+                </a:solidFill>
+                <a:latin typeface="+mn-lt"/>
+                <a:ea typeface="+mn-ea"/>
+                <a:cs typeface="+mn-cs"/>
+              </a:defRPr>
+            </a:lvl9pPr>
+          </a:lstStyle>
+          <a:p>
+            <a:pPr marL="0" indent="0">
+              <a:buFont typeface="Arial" panose="020B0604020202020204" pitchFamily="34" charset="0"/>
+              <a:buNone/>
+            </a:pPr>
+            <a:r>
+              <a:rPr lang="en-US" sz="2400" dirty="0" smtClean="0"/>
+              <a:t>Invalid device registration ID returns:</a:t>
+            </a:r>
+            <a:endParaRPr lang="en-US" sz="2400" dirty="0"/>
+          </a:p>
+        </p:txBody>
+      </p:sp>
+      <p:sp>
+        <p:nvSpPr>
+          <p:cNvPr id="11" name="Content Placeholder 2"/>
+          <p:cNvSpPr txBox="1">
+            <a:spLocks/>
+          </p:cNvSpPr>
+          <p:nvPr/>
+        </p:nvSpPr>
+        <p:spPr>
+          <a:xfrm>
+            <a:off x="451449" y="5111945"/>
+            <a:ext cx="8229600" cy="496669"/>
+          </a:xfrm>
+          <a:prstGeom prst="rect">
+            <a:avLst/>
+          </a:prstGeom>
+        </p:spPr>
+        <p:txBody>
+          <a:bodyPr vert="horz" lIns="91440" tIns="45720" rIns="91440" bIns="45720" rtlCol="0">
+            <a:normAutofit/>
+          </a:bodyPr>
+          <a:lstStyle>
+            <a:lvl1pPr marL="342900" indent="-342900" algn="l" defTabSz="914400" rtl="0" eaLnBrk="1" latinLnBrk="0" hangingPunct="1">
+              <a:spcBef>
+                <a:spcPct val="20000"/>
+              </a:spcBef>
+              <a:buFont typeface="Arial" panose="020B0604020202020204" pitchFamily="34" charset="0"/>
+              <a:buChar char="•"/>
+              <a:defRPr sz="3200" kern="1200">
+                <a:solidFill>
+                  <a:schemeClr val="tx1"/>
+                </a:solidFill>
+                <a:latin typeface="+mn-lt"/>
+                <a:ea typeface="+mn-ea"/>
+                <a:cs typeface="+mn-cs"/>
+              </a:defRPr>
+            </a:lvl1pPr>
+            <a:lvl2pPr marL="742950" indent="-285750" algn="l" defTabSz="914400" rtl="0" eaLnBrk="1" latinLnBrk="0" hangingPunct="1">
+              <a:spcBef>
+                <a:spcPct val="20000"/>
+              </a:spcBef>
+              <a:buFont typeface="Arial" panose="020B0604020202020204" pitchFamily="34" charset="0"/>
+              <a:buChar char="–"/>
+              <a:defRPr sz="2800" kern="1200">
+                <a:solidFill>
+                  <a:schemeClr val="tx1"/>
+                </a:solidFill>
+                <a:latin typeface="+mn-lt"/>
+                <a:ea typeface="+mn-ea"/>
+                <a:cs typeface="+mn-cs"/>
+              </a:defRPr>
+            </a:lvl2pPr>
+            <a:lvl3pPr marL="1143000" indent="-228600" algn="l" defTabSz="914400" rtl="0" eaLnBrk="1" latinLnBrk="0" hangingPunct="1">
+              <a:spcBef>
+                <a:spcPct val="20000"/>
+              </a:spcBef>
+              <a:buFont typeface="Arial" panose="020B0604020202020204" pitchFamily="34" charset="0"/>
+              <a:buChar char="•"/>
+              <a:defRPr sz="2400" kern="1200">
+                <a:solidFill>
+                  <a:schemeClr val="tx1"/>
+                </a:solidFill>
+                <a:latin typeface="+mn-lt"/>
+                <a:ea typeface="+mn-ea"/>
+                <a:cs typeface="+mn-cs"/>
+              </a:defRPr>
+            </a:lvl3pPr>
+            <a:lvl4pPr marL="1600200" indent="-228600" algn="l" defTabSz="914400" rtl="0" eaLnBrk="1" latinLnBrk="0" hangingPunct="1">
+              <a:spcBef>
+                <a:spcPct val="20000"/>
+              </a:spcBef>
+              <a:buFont typeface="Arial" panose="020B0604020202020204" pitchFamily="34" charset="0"/>
+              <a:buChar char="–"/>
+              <a:defRPr sz="2000" kern="1200">
+                <a:solidFill>
+                  <a:schemeClr val="tx1"/>
+                </a:solidFill>
+                <a:latin typeface="+mn-lt"/>
+                <a:ea typeface="+mn-ea"/>
+                <a:cs typeface="+mn-cs"/>
+              </a:defRPr>
+            </a:lvl4pPr>
+            <a:lvl5pPr marL="2057400" indent="-228600" algn="l" defTabSz="914400" rtl="0" eaLnBrk="1" latinLnBrk="0" hangingPunct="1">
+              <a:spcBef>
+                <a:spcPct val="20000"/>
+              </a:spcBef>
+              <a:buFont typeface="Arial" panose="020B0604020202020204" pitchFamily="34" charset="0"/>
+              <a:buChar char="»"/>
+              <a:defRPr sz="2000" kern="1200">
+                <a:solidFill>
+                  <a:schemeClr val="tx1"/>
+                </a:solidFill>
+                <a:latin typeface="+mn-lt"/>
+                <a:ea typeface="+mn-ea"/>
+                <a:cs typeface="+mn-cs"/>
+              </a:defRPr>
+            </a:lvl5pPr>
+            <a:lvl6pPr marL="2514600" indent="-228600" algn="l" defTabSz="914400" rtl="0" eaLnBrk="1" latinLnBrk="0" hangingPunct="1">
+              <a:spcBef>
+                <a:spcPct val="20000"/>
+              </a:spcBef>
+              <a:buFont typeface="Arial" panose="020B0604020202020204" pitchFamily="34" charset="0"/>
+              <a:buChar char="•"/>
+              <a:defRPr sz="2000" kern="1200">
+                <a:solidFill>
+                  <a:schemeClr val="tx1"/>
+                </a:solidFill>
+                <a:latin typeface="+mn-lt"/>
+                <a:ea typeface="+mn-ea"/>
+                <a:cs typeface="+mn-cs"/>
+              </a:defRPr>
+            </a:lvl6pPr>
+            <a:lvl7pPr marL="2971800" indent="-228600" algn="l" defTabSz="914400" rtl="0" eaLnBrk="1" latinLnBrk="0" hangingPunct="1">
+              <a:spcBef>
+                <a:spcPct val="20000"/>
+              </a:spcBef>
+              <a:buFont typeface="Arial" panose="020B0604020202020204" pitchFamily="34" charset="0"/>
+              <a:buChar char="•"/>
+              <a:defRPr sz="2000" kern="1200">
+                <a:solidFill>
+                  <a:schemeClr val="tx1"/>
+                </a:solidFill>
+                <a:latin typeface="+mn-lt"/>
+                <a:ea typeface="+mn-ea"/>
+                <a:cs typeface="+mn-cs"/>
+              </a:defRPr>
+            </a:lvl7pPr>
+            <a:lvl8pPr marL="3429000" indent="-228600" algn="l" defTabSz="914400" rtl="0" eaLnBrk="1" latinLnBrk="0" hangingPunct="1">
+              <a:spcBef>
+                <a:spcPct val="20000"/>
+              </a:spcBef>
+              <a:buFont typeface="Arial" panose="020B0604020202020204" pitchFamily="34" charset="0"/>
+              <a:buChar char="•"/>
+              <a:defRPr sz="2000" kern="1200">
+                <a:solidFill>
+                  <a:schemeClr val="tx1"/>
+                </a:solidFill>
+                <a:latin typeface="+mn-lt"/>
+                <a:ea typeface="+mn-ea"/>
+                <a:cs typeface="+mn-cs"/>
+              </a:defRPr>
+            </a:lvl8pPr>
+            <a:lvl9pPr marL="3886200" indent="-228600" algn="l" defTabSz="914400" rtl="0" eaLnBrk="1" latinLnBrk="0" hangingPunct="1">
+              <a:spcBef>
+                <a:spcPct val="20000"/>
+              </a:spcBef>
+              <a:buFont typeface="Arial" panose="020B0604020202020204" pitchFamily="34" charset="0"/>
+              <a:buChar char="•"/>
+              <a:defRPr sz="2000" kern="1200">
+                <a:solidFill>
+                  <a:schemeClr val="tx1"/>
+                </a:solidFill>
+                <a:latin typeface="+mn-lt"/>
+                <a:ea typeface="+mn-ea"/>
+                <a:cs typeface="+mn-cs"/>
+              </a:defRPr>
+            </a:lvl9pPr>
+          </a:lstStyle>
+          <a:p>
+            <a:pPr marL="0" indent="0">
+              <a:buFont typeface="Arial" panose="020B0604020202020204" pitchFamily="34" charset="0"/>
+              <a:buNone/>
+            </a:pPr>
+            <a:r>
+              <a:rPr lang="en-US" sz="2400" dirty="0" smtClean="0"/>
+              <a:t>DEMO</a:t>
+            </a:r>
+            <a:endParaRPr lang="en-US" sz="2400" dirty="0"/>
           </a:p>
         </p:txBody>
       </p:sp>
     </p:spTree>
     <p:extLst>
       <p:ext uri="{BB962C8B-B14F-4D97-AF65-F5344CB8AC3E}">
-        <p14:creationId xmlns:p14="http://schemas.microsoft.com/office/powerpoint/2010/main" val="442285733"/>
+        <p14:creationId xmlns:p14="http://schemas.microsoft.com/office/powerpoint/2010/main" val="2683352921"/>
       </p:ext>
     </p:extLst>
   </p:cSld>
@@ -5717,7 +7957,7 @@
           <a:noFill/>
           <a:extLst>
             <a:ext uri="{909E8E84-426E-40dd-AFC4-6F175D3DCCD1}">
-              <a14:hiddenFill xmlns:a14="http://schemas.microsoft.com/office/drawing/2010/main">
+              <a14:hiddenFill xmlns:a14="http://schemas.microsoft.com/office/drawing/2010/main" xmlns="">
                 <a:solidFill>
                   <a:srgbClr val="FFFFFF"/>
                 </a:solidFill>
@@ -5762,7 +8002,7 @@
         <p:spPr/>
         <p:txBody>
           <a:bodyPr>
-            <a:normAutofit lnSpcReduction="10000"/>
+            <a:normAutofit fontScale="92500" lnSpcReduction="10000"/>
           </a:bodyPr>
           <a:lstStyle/>
           <a:p>
@@ -5813,25 +8053,7 @@
           </a:p>
           <a:p>
             <a:r>
-              <a:rPr lang="en-US" sz="2000" dirty="0"/>
-              <a:t>Test </a:t>
-            </a:r>
-            <a:r>
               <a:rPr lang="en-US" sz="2000" dirty="0" smtClean="0"/>
-              <a:t>API </a:t>
-            </a:r>
-            <a:r>
-              <a:rPr lang="en-US" sz="2000" dirty="0"/>
-              <a:t>Key and </a:t>
-            </a:r>
-            <a:r>
-              <a:rPr lang="en-US" sz="2000" dirty="0" smtClean="0"/>
-              <a:t>Registration ID</a:t>
-            </a:r>
-          </a:p>
-          <a:p>
-            <a:r>
-              <a:rPr lang="en-US" sz="2000" dirty="0"/>
               <a:t>Implement </a:t>
             </a:r>
             <a:r>
@@ -5862,13 +8084,27 @@
           <a:p>
             <a:r>
               <a:rPr lang="en-US" sz="2000" dirty="0" smtClean="0"/>
-              <a:t>Testing Without a Server</a:t>
-            </a:r>
-          </a:p>
-          <a:p>
+              <a:t>Testing Without a </a:t>
+            </a:r>
             <a:r>
               <a:rPr lang="en-US" sz="2000" dirty="0" smtClean="0"/>
-              <a:t>Additional Info and Questions</a:t>
+              <a:t>Server</a:t>
+            </a:r>
+          </a:p>
+          <a:p>
+            <a:r>
+              <a:rPr lang="en-US" sz="2000" dirty="0"/>
+              <a:t>Test API Key and Registration ID</a:t>
+            </a:r>
+          </a:p>
+          <a:p>
+            <a:r>
+              <a:rPr lang="en-US" sz="2000" dirty="0" smtClean="0"/>
+              <a:t>Additional </a:t>
+            </a:r>
+            <a:r>
+              <a:rPr lang="en-US" sz="2000" dirty="0" smtClean="0"/>
+              <a:t>Info and Questions</a:t>
             </a:r>
             <a:endParaRPr lang="en-US" sz="2000" dirty="0"/>
           </a:p>
@@ -5895,10 +8131,343 @@
   <p:timing>
     <p:tnLst>
       <p:par>
-        <p:cTn xmlns:p14="http://schemas.microsoft.com/office/powerpoint/2010/main" id="1" dur="indefinite" restart="never" nodeType="tmRoot"/>
+        <p:cTn id="1" dur="indefinite" restart="never" nodeType="tmRoot"/>
       </p:par>
     </p:tnLst>
   </p:timing>
+</p:sld>
+</file>
+
+<file path=ppt/slides/slide20.xml><?xml version="1.0" encoding="utf-8"?>
+<p:sld xmlns:a="http://schemas.openxmlformats.org/drawingml/2006/main" xmlns:r="http://schemas.openxmlformats.org/officeDocument/2006/relationships" xmlns:p="http://schemas.openxmlformats.org/presentationml/2006/main">
+  <p:cSld>
+    <p:spTree>
+      <p:nvGrpSpPr>
+        <p:cNvPr id="1" name=""/>
+        <p:cNvGrpSpPr/>
+        <p:nvPr/>
+      </p:nvGrpSpPr>
+      <p:grpSpPr>
+        <a:xfrm>
+          <a:off x="0" y="0"/>
+          <a:ext cx="0" cy="0"/>
+          <a:chOff x="0" y="0"/>
+          <a:chExt cx="0" cy="0"/>
+        </a:xfrm>
+      </p:grpSpPr>
+      <p:sp>
+        <p:nvSpPr>
+          <p:cNvPr id="2" name="Title 1"/>
+          <p:cNvSpPr>
+            <a:spLocks noGrp="1"/>
+          </p:cNvSpPr>
+          <p:nvPr>
+            <p:ph type="title"/>
+          </p:nvPr>
+        </p:nvSpPr>
+        <p:spPr/>
+        <p:txBody>
+          <a:bodyPr/>
+          <a:lstStyle/>
+          <a:p>
+            <a:r>
+              <a:rPr lang="en-US" dirty="0" smtClean="0"/>
+              <a:t>Additional Info</a:t>
+            </a:r>
+            <a:endParaRPr lang="en-US" dirty="0"/>
+          </a:p>
+        </p:txBody>
+      </p:sp>
+      <p:sp>
+        <p:nvSpPr>
+          <p:cNvPr id="3" name="Content Placeholder 2"/>
+          <p:cNvSpPr>
+            <a:spLocks noGrp="1"/>
+          </p:cNvSpPr>
+          <p:nvPr>
+            <p:ph idx="1"/>
+          </p:nvPr>
+        </p:nvSpPr>
+        <p:spPr/>
+        <p:txBody>
+          <a:bodyPr>
+            <a:normAutofit/>
+          </a:bodyPr>
+          <a:lstStyle/>
+          <a:p>
+            <a:r>
+              <a:rPr lang="en-US" sz="1800" dirty="0" smtClean="0"/>
+              <a:t>GitHub repo:</a:t>
+            </a:r>
+          </a:p>
+          <a:p>
+            <a:pPr lvl="1"/>
+            <a:r>
+              <a:rPr lang="en-US" sz="1400" dirty="0">
+                <a:hlinkClick r:id="rId2"/>
+              </a:rPr>
+              <a:t>https://</a:t>
+            </a:r>
+            <a:r>
+              <a:rPr lang="en-US" sz="1400" dirty="0" smtClean="0">
+                <a:hlinkClick r:id="rId2"/>
+              </a:rPr>
+              <a:t>github.com/LeadingEDJE/MobilePushNotification</a:t>
+            </a:r>
+            <a:endParaRPr lang="en-US" sz="1400" dirty="0" smtClean="0"/>
+          </a:p>
+          <a:p>
+            <a:pPr lvl="2"/>
+            <a:r>
+              <a:rPr lang="en-US" sz="1200" dirty="0" smtClean="0"/>
+              <a:t>Use gradle_migration_2014-10-08 branch for Android Studio / </a:t>
+            </a:r>
+            <a:r>
+              <a:rPr lang="en-US" sz="1200" dirty="0" err="1" smtClean="0"/>
+              <a:t>Gradle</a:t>
+            </a:r>
+            <a:r>
+              <a:rPr lang="en-US" sz="1200" dirty="0" smtClean="0"/>
+              <a:t> based project</a:t>
+            </a:r>
+          </a:p>
+          <a:p>
+            <a:pPr lvl="2"/>
+            <a:r>
+              <a:rPr lang="en-US" sz="1200" dirty="0" smtClean="0"/>
+              <a:t>Use master for Eclipse based project</a:t>
+            </a:r>
+          </a:p>
+          <a:p>
+            <a:r>
+              <a:rPr lang="en-US" sz="1800" dirty="0" smtClean="0"/>
+              <a:t>Google Cloud Messaging for Android</a:t>
+            </a:r>
+          </a:p>
+          <a:p>
+            <a:pPr lvl="1"/>
+            <a:r>
+              <a:rPr lang="en-US" sz="1400" dirty="0">
+                <a:hlinkClick r:id="rId3"/>
+              </a:rPr>
+              <a:t>http://</a:t>
+            </a:r>
+            <a:r>
+              <a:rPr lang="en-US" sz="1400" dirty="0" smtClean="0">
+                <a:hlinkClick r:id="rId3"/>
+              </a:rPr>
+              <a:t>developer.android.com/google/gcm/index.html</a:t>
+            </a:r>
+            <a:endParaRPr lang="en-US" sz="1400" dirty="0"/>
+          </a:p>
+          <a:p>
+            <a:r>
+              <a:rPr lang="en-US" sz="1800" dirty="0" smtClean="0"/>
+              <a:t>Setting up Google Play Services</a:t>
+            </a:r>
+          </a:p>
+          <a:p>
+            <a:pPr lvl="1"/>
+            <a:r>
+              <a:rPr lang="en-US" sz="1600" dirty="0">
+                <a:hlinkClick r:id="rId4"/>
+              </a:rPr>
+              <a:t>http://</a:t>
+            </a:r>
+            <a:r>
+              <a:rPr lang="en-US" sz="1600" dirty="0" smtClean="0">
+                <a:hlinkClick r:id="rId4"/>
+              </a:rPr>
+              <a:t>developer.android.com/google/play-services/setup.html</a:t>
+            </a:r>
+            <a:endParaRPr lang="en-US" sz="1600" dirty="0" smtClean="0"/>
+          </a:p>
+          <a:p>
+            <a:r>
+              <a:rPr lang="en-US" sz="2000" dirty="0" smtClean="0"/>
+              <a:t>Building your Project with </a:t>
+            </a:r>
+            <a:r>
+              <a:rPr lang="en-US" sz="2000" dirty="0" err="1" smtClean="0"/>
+              <a:t>Gradle</a:t>
+            </a:r>
+            <a:r>
+              <a:rPr lang="en-US" sz="2000" dirty="0" smtClean="0"/>
+              <a:t> and Android Studio</a:t>
+            </a:r>
+          </a:p>
+          <a:p>
+            <a:pPr lvl="1"/>
+            <a:r>
+              <a:rPr lang="en-US" sz="1600" dirty="0">
+                <a:hlinkClick r:id="rId5"/>
+              </a:rPr>
+              <a:t>http://</a:t>
+            </a:r>
+            <a:r>
+              <a:rPr lang="en-US" sz="1600" dirty="0" smtClean="0">
+                <a:hlinkClick r:id="rId5"/>
+              </a:rPr>
+              <a:t>developer.android.com/sdk/installing/studio-build.html</a:t>
+            </a:r>
+            <a:endParaRPr lang="en-US" sz="1600" dirty="0"/>
+          </a:p>
+          <a:p>
+            <a:r>
+              <a:rPr lang="en-US" sz="2000" dirty="0" smtClean="0"/>
+              <a:t>DHC </a:t>
+            </a:r>
+            <a:r>
+              <a:rPr lang="en-US" sz="2000" dirty="0" smtClean="0"/>
+              <a:t>REST HTTP API Client</a:t>
+            </a:r>
+          </a:p>
+          <a:p>
+            <a:pPr lvl="1"/>
+            <a:r>
+              <a:rPr lang="en-US" sz="1600" dirty="0">
+                <a:hlinkClick r:id="rId6"/>
+              </a:rPr>
+              <a:t>https://</a:t>
+            </a:r>
+            <a:r>
+              <a:rPr lang="en-US" sz="1600" dirty="0" smtClean="0">
+                <a:hlinkClick r:id="rId6"/>
+              </a:rPr>
+              <a:t>chrome.google.com/webstore/detail/dhc-rest-http-api-client/aejoelaoggembcahagimdiliamlcdmfm?hl=en</a:t>
+            </a:r>
+            <a:endParaRPr lang="en-US" sz="1600" dirty="0" smtClean="0"/>
+          </a:p>
+          <a:p>
+            <a:r>
+              <a:rPr lang="en-US" sz="2000" dirty="0" err="1" smtClean="0"/>
+              <a:t>Droid@Screen</a:t>
+            </a:r>
+            <a:endParaRPr lang="en-US" sz="2000" dirty="0"/>
+          </a:p>
+          <a:p>
+            <a:pPr lvl="1"/>
+            <a:r>
+              <a:rPr lang="en-US" sz="1600" dirty="0">
+                <a:hlinkClick r:id="rId7"/>
+              </a:rPr>
+              <a:t>http://droid-at-screen.ribomation.com</a:t>
+            </a:r>
+            <a:r>
+              <a:rPr lang="en-US" sz="1600" dirty="0" smtClean="0">
+                <a:hlinkClick r:id="rId7"/>
+              </a:rPr>
+              <a:t>/</a:t>
+            </a:r>
+            <a:endParaRPr lang="en-US" sz="1600" dirty="0"/>
+          </a:p>
+          <a:p>
+            <a:endParaRPr lang="en-US" sz="1800" dirty="0"/>
+          </a:p>
+        </p:txBody>
+      </p:sp>
+    </p:spTree>
+    <p:extLst>
+      <p:ext uri="{BB962C8B-B14F-4D97-AF65-F5344CB8AC3E}">
+        <p14:creationId xmlns:p14="http://schemas.microsoft.com/office/powerpoint/2010/main" val="442285733"/>
+      </p:ext>
+    </p:extLst>
+  </p:cSld>
+  <p:clrMapOvr>
+    <a:masterClrMapping/>
+  </p:clrMapOvr>
+</p:sld>
+</file>
+
+<file path=ppt/slides/slide21.xml><?xml version="1.0" encoding="utf-8"?>
+<p:sld xmlns:a="http://schemas.openxmlformats.org/drawingml/2006/main" xmlns:r="http://schemas.openxmlformats.org/officeDocument/2006/relationships" xmlns:p="http://schemas.openxmlformats.org/presentationml/2006/main">
+  <p:cSld>
+    <p:spTree>
+      <p:nvGrpSpPr>
+        <p:cNvPr id="1" name=""/>
+        <p:cNvGrpSpPr/>
+        <p:nvPr/>
+      </p:nvGrpSpPr>
+      <p:grpSpPr>
+        <a:xfrm>
+          <a:off x="0" y="0"/>
+          <a:ext cx="0" cy="0"/>
+          <a:chOff x="0" y="0"/>
+          <a:chExt cx="0" cy="0"/>
+        </a:xfrm>
+      </p:grpSpPr>
+      <p:sp>
+        <p:nvSpPr>
+          <p:cNvPr id="2" name="Title 1"/>
+          <p:cNvSpPr>
+            <a:spLocks noGrp="1"/>
+          </p:cNvSpPr>
+          <p:nvPr>
+            <p:ph type="title"/>
+          </p:nvPr>
+        </p:nvSpPr>
+        <p:spPr/>
+        <p:txBody>
+          <a:bodyPr/>
+          <a:lstStyle/>
+          <a:p>
+            <a:r>
+              <a:rPr lang="en-US" dirty="0" smtClean="0"/>
+              <a:t>Questions</a:t>
+            </a:r>
+            <a:endParaRPr lang="en-US" dirty="0"/>
+          </a:p>
+        </p:txBody>
+      </p:sp>
+      <p:sp>
+        <p:nvSpPr>
+          <p:cNvPr id="3" name="Content Placeholder 2"/>
+          <p:cNvSpPr>
+            <a:spLocks noGrp="1"/>
+          </p:cNvSpPr>
+          <p:nvPr>
+            <p:ph idx="1"/>
+          </p:nvPr>
+        </p:nvSpPr>
+        <p:spPr/>
+        <p:txBody>
+          <a:bodyPr/>
+          <a:lstStyle/>
+          <a:p>
+            <a:r>
+              <a:rPr lang="en-US" dirty="0"/>
+              <a:t>My contact info:</a:t>
+            </a:r>
+          </a:p>
+          <a:p>
+            <a:pPr lvl="1"/>
+            <a:r>
+              <a:rPr lang="en-US" dirty="0"/>
+              <a:t>keith.wedinger@leadingedje.com</a:t>
+            </a:r>
+          </a:p>
+          <a:p>
+            <a:pPr lvl="1"/>
+            <a:r>
+              <a:rPr lang="en-US" dirty="0"/>
+              <a:t>Twitter: @jkwuc89</a:t>
+            </a:r>
+          </a:p>
+          <a:p>
+            <a:endParaRPr lang="en-US" dirty="0"/>
+          </a:p>
+        </p:txBody>
+      </p:sp>
+    </p:spTree>
+    <p:extLst>
+      <p:ext uri="{BB962C8B-B14F-4D97-AF65-F5344CB8AC3E}">
+        <p14:creationId xmlns:p14="http://schemas.microsoft.com/office/powerpoint/2010/main" val="1023252770"/>
+      </p:ext>
+    </p:extLst>
+  </p:cSld>
+  <p:clrMapOvr>
+    <a:masterClrMapping/>
+  </p:clrMapOvr>
 </p:sld>
 </file>
 
@@ -5972,7 +8541,51 @@
             </a:r>
             <a:r>
               <a:rPr lang="en-US" sz="2000" dirty="0"/>
-              <a:t>25 years experience designing, developing and delivering high quality software solutions for several companies including Lexmark, Diebold, Limited Brands, Sterling Commerce and IBM. He completed a PhoneGap / web technology based Android mobile app solution to help automate the workflow for his client's 1,200 service technicians. He also completed push notification support for a client’s native Android app that allows the client’s employees to be notified of new equipment alarms. He has presented "Real World Mobile App Development with Phonegap" at Columbus Code Camp, </a:t>
+              <a:t>25 years experience designing, developing and delivering high quality software solutions for several companies including Lexmark, Diebold, Limited Brands, Sterling Commerce and IBM. </a:t>
+            </a:r>
+            <a:r>
+              <a:rPr lang="en-US" sz="2000" dirty="0"/>
+              <a:t>C</a:t>
+            </a:r>
+            <a:r>
+              <a:rPr lang="en-US" sz="2000" dirty="0" smtClean="0"/>
+              <a:t>ompleted </a:t>
+            </a:r>
+            <a:r>
+              <a:rPr lang="en-US" sz="2000" dirty="0"/>
+              <a:t>a PhoneGap / web technology based Android mobile app solution to help automate the workflow for </a:t>
+            </a:r>
+            <a:r>
+              <a:rPr lang="en-US" sz="2000" dirty="0" smtClean="0"/>
+              <a:t>client's </a:t>
+            </a:r>
+            <a:r>
+              <a:rPr lang="en-US" sz="2000" dirty="0"/>
+              <a:t>1,200 service technicians. </a:t>
+            </a:r>
+            <a:r>
+              <a:rPr lang="en-US" sz="2000" dirty="0" smtClean="0"/>
+              <a:t>Also </a:t>
+            </a:r>
+            <a:r>
+              <a:rPr lang="en-US" sz="2000" dirty="0"/>
+              <a:t>completed push notification support for a client’s native Android app that allows the client’s employees to be notified of new equipment alarms. </a:t>
+            </a:r>
+            <a:r>
+              <a:rPr lang="en-US" sz="2000" dirty="0" smtClean="0"/>
+              <a:t>Presented </a:t>
+            </a:r>
+            <a:r>
+              <a:rPr lang="en-US" sz="2000" dirty="0"/>
+              <a:t>"Real World Mobile App Development with </a:t>
+            </a:r>
+            <a:r>
+              <a:rPr lang="en-US" sz="2000" dirty="0" smtClean="0"/>
+              <a:t>PhoneGap</a:t>
+            </a:r>
+            <a:r>
+              <a:rPr lang="en-US" sz="2000" dirty="0"/>
+              <a:t>" at Columbus Code Camp, </a:t>
             </a:r>
             <a:r>
               <a:rPr lang="en-US" sz="2000" dirty="0" err="1"/>
@@ -5980,7 +8593,15 @@
             </a:r>
             <a:r>
               <a:rPr lang="en-US" sz="2000" dirty="0"/>
-              <a:t> and M3. He is currently working on the design and architecture of a mobile and server vehicle health management solution for a large trucking company</a:t>
+              <a:t> and M3. </a:t>
+            </a:r>
+            <a:r>
+              <a:rPr lang="en-US" sz="2000" dirty="0" smtClean="0"/>
+              <a:t>Currently </a:t>
+            </a:r>
+            <a:r>
+              <a:rPr lang="en-US" sz="2000" dirty="0"/>
+              <a:t>working on the design and architecture of a mobile and server vehicle health management solution for a large trucking company</a:t>
             </a:r>
             <a:r>
               <a:rPr lang="en-US" sz="2000" dirty="0" smtClean="0"/>
@@ -6078,30 +8699,92 @@
         </p:nvSpPr>
         <p:spPr/>
         <p:txBody>
-          <a:bodyPr/>
+          <a:bodyPr>
+            <a:normAutofit/>
+          </a:bodyPr>
           <a:lstStyle/>
           <a:p>
             <a:r>
-              <a:rPr lang="en-US" dirty="0"/>
+              <a:rPr lang="en-US" sz="2000" dirty="0"/>
               <a:t>Google Cloud Messaging (GCM) is a free service that allows you to send data from your server to your Android </a:t>
             </a:r>
             <a:r>
-              <a:rPr lang="en-US" dirty="0" smtClean="0"/>
+              <a:rPr lang="en-US" sz="2000" dirty="0" smtClean="0"/>
               <a:t>application</a:t>
             </a:r>
           </a:p>
           <a:p>
-            <a:r>
-              <a:rPr lang="en-US" dirty="0" smtClean="0"/>
-              <a:t>Can </a:t>
-            </a:r>
-            <a:r>
-              <a:rPr lang="en-US" dirty="0"/>
-              <a:t>be lightweight messages telling your app there is new data to be fetched from your server or it could be a message containing up to 4kb of payload data</a:t>
-            </a:r>
-          </a:p>
-        </p:txBody>
-      </p:sp>
+            <a:pPr lvl="1"/>
+            <a:r>
+              <a:rPr lang="en-US" sz="1800" dirty="0" smtClean="0"/>
+              <a:t>GCM service handles all aspects of message queueing and delivery to target app running on the target device</a:t>
+            </a:r>
+            <a:endParaRPr lang="en-US" sz="1800" dirty="0" smtClean="0"/>
+          </a:p>
+          <a:p>
+            <a:r>
+              <a:rPr lang="en-US" sz="2000" dirty="0"/>
+              <a:t>L</a:t>
+            </a:r>
+            <a:r>
+              <a:rPr lang="en-US" sz="2000" dirty="0" smtClean="0"/>
+              <a:t>ightweight </a:t>
+            </a:r>
+            <a:r>
+              <a:rPr lang="en-US" sz="2000" dirty="0"/>
+              <a:t>messages telling your app there is new data to be fetched from your </a:t>
+            </a:r>
+            <a:r>
+              <a:rPr lang="en-US" sz="2000" dirty="0" smtClean="0"/>
+              <a:t>server</a:t>
+            </a:r>
+          </a:p>
+          <a:p>
+            <a:r>
+              <a:rPr lang="en-US" sz="2000" dirty="0" smtClean="0"/>
+              <a:t>M</a:t>
+            </a:r>
+            <a:r>
+              <a:rPr lang="en-US" sz="2000" dirty="0" smtClean="0"/>
+              <a:t>essages </a:t>
+            </a:r>
+            <a:r>
+              <a:rPr lang="en-US" sz="2000" dirty="0"/>
+              <a:t>containing up to 4kb of payload data</a:t>
+            </a:r>
+          </a:p>
+        </p:txBody>
+      </p:sp>
+      <p:pic>
+        <p:nvPicPr>
+          <p:cNvPr id="4" name="Picture 3"/>
+          <p:cNvPicPr>
+            <a:picLocks noChangeAspect="1"/>
+          </p:cNvPicPr>
+          <p:nvPr/>
+        </p:nvPicPr>
+        <p:blipFill>
+          <a:blip r:embed="rId2">
+            <a:extLst>
+              <a:ext uri="{28A0092B-C50C-407E-A947-70E740481C1C}">
+                <a14:useLocalDpi xmlns:a14="http://schemas.microsoft.com/office/drawing/2010/main" val="0"/>
+              </a:ext>
+            </a:extLst>
+          </a:blip>
+          <a:stretch>
+            <a:fillRect/>
+          </a:stretch>
+        </p:blipFill>
+        <p:spPr>
+          <a:xfrm>
+            <a:off x="1292458" y="3688485"/>
+            <a:ext cx="6559083" cy="2472184"/>
+          </a:xfrm>
+          <a:prstGeom prst="rect">
+            <a:avLst/>
+          </a:prstGeom>
+        </p:spPr>
+      </p:pic>
     </p:spTree>
     <p:extLst>
       <p:ext uri="{BB962C8B-B14F-4D97-AF65-F5344CB8AC3E}">
@@ -6168,7 +8851,7 @@
         <p:spPr/>
         <p:txBody>
           <a:bodyPr>
-            <a:normAutofit lnSpcReduction="10000"/>
+            <a:normAutofit fontScale="85000" lnSpcReduction="20000"/>
           </a:bodyPr>
           <a:lstStyle/>
           <a:p>
@@ -6181,22 +8864,65 @@
             <a:pPr lvl="1"/>
             <a:r>
               <a:rPr lang="en-US" sz="2400" dirty="0" smtClean="0"/>
-              <a:t>Android development environment</a:t>
+              <a:t>Google account to create Google API project</a:t>
+            </a:r>
+          </a:p>
+          <a:p>
+            <a:pPr lvl="1"/>
+            <a:r>
+              <a:rPr lang="en-US" sz="2400" dirty="0" smtClean="0"/>
+              <a:t>Android </a:t>
+            </a:r>
+            <a:r>
+              <a:rPr lang="en-US" sz="2400" dirty="0" smtClean="0"/>
+              <a:t>development environment</a:t>
             </a:r>
           </a:p>
           <a:p>
             <a:pPr lvl="2"/>
             <a:r>
               <a:rPr lang="en-US" sz="2000" dirty="0" smtClean="0"/>
-              <a:t>Android SDK</a:t>
+              <a:t>Android SDK: </a:t>
+            </a:r>
+            <a:r>
+              <a:rPr lang="en-US" sz="2000" dirty="0"/>
+              <a:t>http://developer.android.com/sdk/index.html</a:t>
             </a:r>
           </a:p>
           <a:p>
             <a:pPr lvl="2"/>
             <a:r>
               <a:rPr lang="en-US" sz="2000" dirty="0" smtClean="0"/>
-              <a:t>IDE – Eclipse, IntelliJ IDEA, Android Studio</a:t>
-            </a:r>
+              <a:t>IDE</a:t>
+            </a:r>
+          </a:p>
+          <a:p>
+            <a:pPr lvl="3"/>
+            <a:r>
+              <a:rPr lang="en-US" sz="1600" dirty="0"/>
+              <a:t>Eclipse: http://eclipse.org/downloads/</a:t>
+            </a:r>
+            <a:endParaRPr lang="en-US" sz="1600" dirty="0" smtClean="0"/>
+          </a:p>
+          <a:p>
+            <a:pPr lvl="3"/>
+            <a:r>
+              <a:rPr lang="en-US" sz="1600" dirty="0" err="1" smtClean="0"/>
+              <a:t>IntelliJ</a:t>
+            </a:r>
+            <a:r>
+              <a:rPr lang="en-US" sz="1600" dirty="0"/>
+              <a:t> IDEA: http://www.jetbrains.com/idea/</a:t>
+            </a:r>
+            <a:endParaRPr lang="en-US" sz="1600" dirty="0" smtClean="0"/>
+          </a:p>
+          <a:p>
+            <a:pPr lvl="3"/>
+            <a:r>
+              <a:rPr lang="en-US" sz="1600" dirty="0"/>
+              <a:t>Android Studio: https://developer.android.com/sdk/installing/studio.html</a:t>
+            </a:r>
+            <a:endParaRPr lang="en-US" sz="1600" dirty="0" smtClean="0"/>
           </a:p>
           <a:p>
             <a:pPr lvl="1"/>
@@ -6349,14 +9075,14 @@
             <a:pPr lvl="1"/>
             <a:r>
               <a:rPr lang="en-US" dirty="0" smtClean="0"/>
-              <a:t>Expand platform for API 17 or higher</a:t>
+              <a:t>Expand platform for API 19 or higher</a:t>
             </a:r>
           </a:p>
           <a:p>
             <a:pPr lvl="1"/>
             <a:r>
               <a:rPr lang="en-US" dirty="0" smtClean="0"/>
-              <a:t>Install Google APIs</a:t>
+              <a:t>Install Google APIs (x86 System Image)</a:t>
             </a:r>
           </a:p>
           <a:p>
@@ -6508,7 +9234,7 @@
             <a:pPr lvl="1"/>
             <a:r>
               <a:rPr lang="en-US" sz="2400" dirty="0" smtClean="0"/>
-              <a:t>Click APIs &amp; auth in left sidebar</a:t>
+              <a:t>Expand APIs &amp; auth in left sidebar and click on APIs</a:t>
             </a:r>
           </a:p>
           <a:p>
@@ -6603,7 +9329,15 @@
           <a:p>
             <a:r>
               <a:rPr lang="en-US" dirty="0"/>
-              <a:t>Obtain the API key</a:t>
+              <a:t>Obtain the </a:t>
+            </a:r>
+            <a:r>
+              <a:rPr lang="en-US" dirty="0" smtClean="0"/>
+              <a:t>Server API </a:t>
+            </a:r>
+            <a:r>
+              <a:rPr lang="en-US" dirty="0"/>
+              <a:t>key</a:t>
             </a:r>
           </a:p>
           <a:p>
@@ -6617,7 +9351,15 @@
             <a:pPr lvl="1"/>
             <a:r>
               <a:rPr lang="en-US" dirty="0"/>
-              <a:t>Under Public API access, click Create New Key</a:t>
+              <a:t>Under Public API access, click Create </a:t>
+            </a:r>
+            <a:r>
+              <a:rPr lang="en-US" dirty="0" smtClean="0"/>
+              <a:t>new </a:t>
+            </a:r>
+            <a:r>
+              <a:rPr lang="en-US" dirty="0"/>
+              <a:t>Key</a:t>
             </a:r>
           </a:p>
           <a:p>
@@ -6650,7 +9392,7 @@
             </a:r>
             <a:r>
               <a:rPr lang="en-US" dirty="0" smtClean="0"/>
-              <a:t>Note the API key, used by server as authorization key in HTTP headers when posting notification messages</a:t>
+              <a:t>Note the API KEY, used by server as authorization key in HTTP Authorization header when posting notification messages</a:t>
             </a:r>
           </a:p>
           <a:p>
@@ -6707,35 +9449,37 @@
         </p:nvSpPr>
         <p:spPr/>
         <p:txBody>
-          <a:bodyPr/>
-          <a:lstStyle/>
-          <a:p>
-            <a:r>
-              <a:rPr lang="en-US" dirty="0" smtClean="0"/>
-              <a:t>Add Google Play Services Library</a:t>
-            </a:r>
-            <a:endParaRPr lang="en-US" dirty="0"/>
-          </a:p>
-        </p:txBody>
-      </p:sp>
-      <p:sp>
-        <p:nvSpPr>
-          <p:cNvPr id="3" name="Content Placeholder 2"/>
-          <p:cNvSpPr>
-            <a:spLocks noGrp="1"/>
-          </p:cNvSpPr>
-          <p:nvPr>
-            <p:ph idx="1"/>
-          </p:nvPr>
-        </p:nvSpPr>
-        <p:spPr/>
-        <p:txBody>
           <a:bodyPr>
             <a:normAutofit/>
           </a:bodyPr>
           <a:lstStyle/>
           <a:p>
             <a:r>
+              <a:rPr lang="en-US" sz="3600" dirty="0" smtClean="0"/>
+              <a:t>Add Google Play Services Library - Eclipse</a:t>
+            </a:r>
+            <a:endParaRPr lang="en-US" sz="3600" dirty="0"/>
+          </a:p>
+        </p:txBody>
+      </p:sp>
+      <p:sp>
+        <p:nvSpPr>
+          <p:cNvPr id="3" name="Content Placeholder 2"/>
+          <p:cNvSpPr>
+            <a:spLocks noGrp="1"/>
+          </p:cNvSpPr>
+          <p:nvPr>
+            <p:ph idx="1"/>
+          </p:nvPr>
+        </p:nvSpPr>
+        <p:spPr/>
+        <p:txBody>
+          <a:bodyPr>
+            <a:normAutofit/>
+          </a:bodyPr>
+          <a:lstStyle/>
+          <a:p>
+            <a:r>
               <a:rPr lang="en-US" sz="2800" dirty="0" smtClean="0"/>
               <a:t>Copy library project </a:t>
             </a:r>
@@ -6764,12 +9508,7 @@
               <a:rPr lang="en-US" sz="2400" dirty="0" smtClean="0"/>
               <a:t>it</a:t>
             </a:r>
-          </a:p>
-          <a:p>
-            <a:r>
-              <a:rPr lang="en-US" dirty="0" smtClean="0"/>
-              <a:t>DEMO</a:t>
-            </a:r>
+            <a:endParaRPr lang="en-US" dirty="0" smtClean="0"/>
           </a:p>
           <a:p>
             <a:endParaRPr lang="en-US" sz="2800" dirty="0"/>

</xml_diff>

<commit_message>
Changed LE logo inside the presentation. Change LE logo used inside app icon images. Moved additional AndroidManifest.xml config to build.gradle.
</commit_message>
<xml_diff>
--- a/Implementing Push Notification in Android.pptx
+++ b/Implementing Push Notification in Android.pptx
@@ -245,7 +245,7 @@
           <a:p>
             <a:fld id="{AB6131E3-072D-1447-B771-F05C9D397949}" type="datetimeFigureOut">
               <a:rPr lang="en-US" smtClean="0"/>
-              <a:t>10/10/2014</a:t>
+              <a:t>10/24/2014</a:t>
             </a:fld>
             <a:endParaRPr lang="en-US" dirty="0"/>
           </a:p>
@@ -410,7 +410,7 @@
           <a:p>
             <a:fld id="{DE4C9721-1813-4A55-A5DA-76417DB5EE62}" type="datetimeFigureOut">
               <a:rPr lang="en-US" smtClean="0"/>
-              <a:t>10/10/2014</a:t>
+              <a:t>10/24/2014</a:t>
             </a:fld>
             <a:endParaRPr lang="en-US" dirty="0"/>
           </a:p>
@@ -1051,7 +1051,7 @@
           <a:p>
             <a:fld id="{1A6A9824-C09F-4166-9A2C-6C9FA577887A}" type="datetimeFigureOut">
               <a:rPr lang="en-US" smtClean="0"/>
-              <a:t>10/10/2014</a:t>
+              <a:t>10/24/2014</a:t>
             </a:fld>
             <a:endParaRPr lang="en-US" dirty="0"/>
           </a:p>
@@ -1221,7 +1221,7 @@
           <a:p>
             <a:fld id="{1A6A9824-C09F-4166-9A2C-6C9FA577887A}" type="datetimeFigureOut">
               <a:rPr lang="en-US" smtClean="0"/>
-              <a:t>10/10/2014</a:t>
+              <a:t>10/24/2014</a:t>
             </a:fld>
             <a:endParaRPr lang="en-US" dirty="0"/>
           </a:p>
@@ -1401,7 +1401,7 @@
           <a:p>
             <a:fld id="{1A6A9824-C09F-4166-9A2C-6C9FA577887A}" type="datetimeFigureOut">
               <a:rPr lang="en-US" smtClean="0"/>
-              <a:t>10/10/2014</a:t>
+              <a:t>10/24/2014</a:t>
             </a:fld>
             <a:endParaRPr lang="en-US" dirty="0"/>
           </a:p>
@@ -1571,7 +1571,7 @@
           <a:p>
             <a:fld id="{1A6A9824-C09F-4166-9A2C-6C9FA577887A}" type="datetimeFigureOut">
               <a:rPr lang="en-US" smtClean="0"/>
-              <a:t>10/10/2014</a:t>
+              <a:t>10/24/2014</a:t>
             </a:fld>
             <a:endParaRPr lang="en-US" dirty="0"/>
           </a:p>
@@ -1817,7 +1817,7 @@
           <a:p>
             <a:fld id="{1A6A9824-C09F-4166-9A2C-6C9FA577887A}" type="datetimeFigureOut">
               <a:rPr lang="en-US" smtClean="0"/>
-              <a:t>10/10/2014</a:t>
+              <a:t>10/24/2014</a:t>
             </a:fld>
             <a:endParaRPr lang="en-US" dirty="0"/>
           </a:p>
@@ -2105,7 +2105,7 @@
           <a:p>
             <a:fld id="{1A6A9824-C09F-4166-9A2C-6C9FA577887A}" type="datetimeFigureOut">
               <a:rPr lang="en-US" smtClean="0"/>
-              <a:t>10/10/2014</a:t>
+              <a:t>10/24/2014</a:t>
             </a:fld>
             <a:endParaRPr lang="en-US" dirty="0"/>
           </a:p>
@@ -2527,7 +2527,7 @@
           <a:p>
             <a:fld id="{1A6A9824-C09F-4166-9A2C-6C9FA577887A}" type="datetimeFigureOut">
               <a:rPr lang="en-US" smtClean="0"/>
-              <a:t>10/10/2014</a:t>
+              <a:t>10/24/2014</a:t>
             </a:fld>
             <a:endParaRPr lang="en-US" dirty="0"/>
           </a:p>
@@ -2645,7 +2645,7 @@
           <a:p>
             <a:fld id="{1A6A9824-C09F-4166-9A2C-6C9FA577887A}" type="datetimeFigureOut">
               <a:rPr lang="en-US" smtClean="0"/>
-              <a:t>10/10/2014</a:t>
+              <a:t>10/24/2014</a:t>
             </a:fld>
             <a:endParaRPr lang="en-US" dirty="0"/>
           </a:p>
@@ -2740,7 +2740,7 @@
           <a:p>
             <a:fld id="{1A6A9824-C09F-4166-9A2C-6C9FA577887A}" type="datetimeFigureOut">
               <a:rPr lang="en-US" smtClean="0"/>
-              <a:t>10/10/2014</a:t>
+              <a:t>10/24/2014</a:t>
             </a:fld>
             <a:endParaRPr lang="en-US" dirty="0"/>
           </a:p>
@@ -3017,7 +3017,7 @@
           <a:p>
             <a:fld id="{1A6A9824-C09F-4166-9A2C-6C9FA577887A}" type="datetimeFigureOut">
               <a:rPr lang="en-US" smtClean="0"/>
-              <a:t>10/10/2014</a:t>
+              <a:t>10/24/2014</a:t>
             </a:fld>
             <a:endParaRPr lang="en-US" dirty="0"/>
           </a:p>
@@ -3274,7 +3274,7 @@
           <a:p>
             <a:fld id="{1A6A9824-C09F-4166-9A2C-6C9FA577887A}" type="datetimeFigureOut">
               <a:rPr lang="en-US" smtClean="0"/>
-              <a:t>10/10/2014</a:t>
+              <a:t>10/24/2014</a:t>
             </a:fld>
             <a:endParaRPr lang="en-US" dirty="0"/>
           </a:p>
@@ -3389,29 +3389,28 @@
       </p:pic>
       <p:pic>
         <p:nvPicPr>
-          <p:cNvPr id="10" name="Picture 2" descr="C:\Users\luke.davis\Documents\SCRUM training\leading-edje_logo.png"/>
+          <p:cNvPr id="10" name="Picture 2"/>
           <p:cNvPicPr>
             <a:picLocks noChangeAspect="1" noChangeArrowheads="1"/>
           </p:cNvPicPr>
           <p:nvPr/>
         </p:nvPicPr>
         <p:blipFill>
-          <a:blip r:embed="rId14">
+          <a:blip r:embed="rId14" cstate="print">
             <a:extLst>
               <a:ext uri="{28A0092B-C50C-407E-A947-70E740481C1C}">
                 <a14:useLocalDpi xmlns:a14="http://schemas.microsoft.com/office/drawing/2010/main" val="0"/>
               </a:ext>
             </a:extLst>
           </a:blip>
-          <a:srcRect/>
           <a:stretch>
             <a:fillRect/>
           </a:stretch>
         </p:blipFill>
         <p:spPr bwMode="auto">
           <a:xfrm>
-            <a:off x="6934200" y="6019800"/>
-            <a:ext cx="2066925" cy="708065"/>
+            <a:off x="5943600" y="6248400"/>
+            <a:ext cx="3077353" cy="533043"/>
           </a:xfrm>
           <a:prstGeom prst="rect">
             <a:avLst/>
@@ -3558,7 +3557,7 @@
           <a:p>
             <a:fld id="{1A6A9824-C09F-4166-9A2C-6C9FA577887A}" type="datetimeFigureOut">
               <a:rPr lang="en-US" smtClean="0"/>
-              <a:t>10/10/2014</a:t>
+              <a:t>10/24/2014</a:t>
             </a:fld>
             <a:endParaRPr lang="en-US" dirty="0"/>
           </a:p>
@@ -3963,31 +3962,96 @@
           </a:prstGeom>
         </p:spPr>
       </p:pic>
+      <p:sp>
+        <p:nvSpPr>
+          <p:cNvPr id="4" name="Title 3"/>
+          <p:cNvSpPr>
+            <a:spLocks noGrp="1"/>
+          </p:cNvSpPr>
+          <p:nvPr>
+            <p:ph type="ctrTitle"/>
+          </p:nvPr>
+        </p:nvSpPr>
+        <p:spPr/>
+        <p:txBody>
+          <a:bodyPr>
+            <a:normAutofit fontScale="90000"/>
+          </a:bodyPr>
+          <a:lstStyle/>
+          <a:p>
+            <a:r>
+              <a:rPr lang="en-US" dirty="0"/>
+              <a:t>Implementing Push Notification </a:t>
+            </a:r>
+            <a:r>
+              <a:rPr lang="en-US" dirty="0" smtClean="0"/>
+              <a:t>Support </a:t>
+            </a:r>
+            <a:r>
+              <a:rPr lang="en-US" dirty="0"/>
+              <a:t>in your Android </a:t>
+            </a:r>
+            <a:r>
+              <a:rPr lang="en-US" dirty="0" smtClean="0"/>
+              <a:t>Application</a:t>
+            </a:r>
+            <a:endParaRPr lang="en-US" dirty="0"/>
+          </a:p>
+        </p:txBody>
+      </p:sp>
+      <p:sp>
+        <p:nvSpPr>
+          <p:cNvPr id="5" name="Subtitle 4"/>
+          <p:cNvSpPr>
+            <a:spLocks noGrp="1"/>
+          </p:cNvSpPr>
+          <p:nvPr>
+            <p:ph type="subTitle" idx="1"/>
+          </p:nvPr>
+        </p:nvSpPr>
+        <p:spPr/>
+        <p:txBody>
+          <a:bodyPr/>
+          <a:lstStyle/>
+          <a:p>
+            <a:r>
+              <a:rPr lang="en-US" dirty="0" smtClean="0"/>
+              <a:t>Keith Wedinger</a:t>
+            </a:r>
+          </a:p>
+          <a:p>
+            <a:r>
+              <a:rPr lang="en-US" dirty="0" smtClean="0"/>
+              <a:t>Solutions Architect</a:t>
+            </a:r>
+            <a:endParaRPr lang="en-US" dirty="0"/>
+          </a:p>
+        </p:txBody>
+      </p:sp>
       <p:pic>
         <p:nvPicPr>
-          <p:cNvPr id="1026" name="Picture 2" descr="C:\Users\luke.davis\Documents\SCRUM training\leading-edje_logo.png"/>
+          <p:cNvPr id="7" name="Picture 2"/>
           <p:cNvPicPr>
             <a:picLocks noChangeAspect="1" noChangeArrowheads="1"/>
           </p:cNvPicPr>
           <p:nvPr/>
         </p:nvPicPr>
         <p:blipFill>
-          <a:blip r:embed="rId4">
+          <a:blip r:embed="rId4" cstate="print">
             <a:extLst>
               <a:ext uri="{28A0092B-C50C-407E-A947-70E740481C1C}">
                 <a14:useLocalDpi xmlns:a14="http://schemas.microsoft.com/office/drawing/2010/main" val="0"/>
               </a:ext>
             </a:extLst>
           </a:blip>
-          <a:srcRect/>
           <a:stretch>
             <a:fillRect/>
           </a:stretch>
         </p:blipFill>
         <p:spPr bwMode="auto">
           <a:xfrm>
-            <a:off x="6934200" y="6019800"/>
-            <a:ext cx="2066925" cy="708065"/>
+            <a:off x="5943600" y="6248400"/>
+            <a:ext cx="3072900" cy="532272"/>
           </a:xfrm>
           <a:prstGeom prst="rect">
             <a:avLst/>
@@ -4004,72 +4068,6 @@
           </a:extLst>
         </p:spPr>
       </p:pic>
-      <p:sp>
-        <p:nvSpPr>
-          <p:cNvPr id="4" name="Title 3"/>
-          <p:cNvSpPr>
-            <a:spLocks noGrp="1"/>
-          </p:cNvSpPr>
-          <p:nvPr>
-            <p:ph type="ctrTitle"/>
-          </p:nvPr>
-        </p:nvSpPr>
-        <p:spPr/>
-        <p:txBody>
-          <a:bodyPr>
-            <a:normAutofit fontScale="90000"/>
-          </a:bodyPr>
-          <a:lstStyle/>
-          <a:p>
-            <a:r>
-              <a:rPr lang="en-US" dirty="0"/>
-              <a:t>Implementing Push Notification </a:t>
-            </a:r>
-            <a:r>
-              <a:rPr lang="en-US" dirty="0" smtClean="0"/>
-              <a:t>Support </a:t>
-            </a:r>
-            <a:r>
-              <a:rPr lang="en-US" dirty="0"/>
-              <a:t>in your Android </a:t>
-            </a:r>
-            <a:r>
-              <a:rPr lang="en-US" dirty="0" smtClean="0"/>
-              <a:t>Application</a:t>
-            </a:r>
-            <a:endParaRPr lang="en-US" dirty="0"/>
-          </a:p>
-        </p:txBody>
-      </p:sp>
-      <p:sp>
-        <p:nvSpPr>
-          <p:cNvPr id="5" name="Subtitle 4"/>
-          <p:cNvSpPr>
-            <a:spLocks noGrp="1"/>
-          </p:cNvSpPr>
-          <p:nvPr>
-            <p:ph type="subTitle" idx="1"/>
-          </p:nvPr>
-        </p:nvSpPr>
-        <p:spPr/>
-        <p:txBody>
-          <a:bodyPr/>
-          <a:lstStyle/>
-          <a:p>
-            <a:r>
-              <a:rPr lang="en-US" dirty="0" smtClean="0"/>
-              <a:t>Keith Wedinger</a:t>
-            </a:r>
-          </a:p>
-          <a:p>
-            <a:r>
-              <a:rPr lang="en-US" dirty="0" smtClean="0"/>
-              <a:t>Solutions Architect</a:t>
-            </a:r>
-            <a:endParaRPr lang="en-US" dirty="0"/>
-          </a:p>
-        </p:txBody>
-      </p:sp>
     </p:spTree>
     <p:extLst>
       <p:ext uri="{BB962C8B-B14F-4D97-AF65-F5344CB8AC3E}">
@@ -4208,11 +4206,7 @@
             </a:r>
             <a:r>
               <a:rPr lang="en-US" sz="2400" dirty="0" smtClean="0"/>
-              <a:t> </a:t>
-            </a:r>
-            <a:r>
-              <a:rPr lang="en-US" sz="2400" dirty="0" smtClean="0"/>
-              <a:t>project</a:t>
+              <a:t> project</a:t>
             </a:r>
           </a:p>
           <a:p>
@@ -4220,7 +4214,6 @@
               <a:rPr lang="en-US" dirty="0" smtClean="0"/>
               <a:t>DEMO</a:t>
             </a:r>
-            <a:endParaRPr lang="en-US" dirty="0" smtClean="0"/>
           </a:p>
         </p:txBody>
       </p:sp>
@@ -4321,11 +4314,7 @@
           <a:p>
             <a:r>
               <a:rPr lang="en-US" sz="2400" dirty="0" smtClean="0"/>
-              <a:t>Much </a:t>
-            </a:r>
-            <a:r>
-              <a:rPr lang="en-US" sz="2400" dirty="0" smtClean="0"/>
-              <a:t>simpler...</a:t>
+              <a:t>Much simpler...</a:t>
             </a:r>
           </a:p>
           <a:p>
@@ -5735,7 +5724,6 @@
               <a:rPr lang="en-US" sz="2000" dirty="0" smtClean="0"/>
               <a:t>Permissions</a:t>
             </a:r>
-            <a:endParaRPr lang="en-US" sz="2000" dirty="0" smtClean="0"/>
           </a:p>
           <a:p>
             <a:endParaRPr lang="en-US" sz="2000" dirty="0"/>
@@ -5767,7 +5755,7 @@
         </p:nvGraphicFramePr>
         <p:xfrm>
           <a:off x="304800" y="1981200"/>
-          <a:ext cx="8610600" cy="1877262"/>
+          <a:ext cx="8610600" cy="2082544"/>
         </p:xfrm>
         <a:graphic>
           <a:graphicData uri="http://schemas.openxmlformats.org/drawingml/2006/table">
@@ -6873,13 +6861,8 @@
             <a:pPr lvl="2"/>
             <a:r>
               <a:rPr lang="en-US" dirty="0" smtClean="0"/>
-              <a:t>Dev HTTP Client  - Google Chrome </a:t>
-            </a:r>
-            <a:r>
-              <a:rPr lang="en-US" dirty="0" smtClean="0"/>
-              <a:t>App</a:t>
-            </a:r>
-            <a:endParaRPr lang="en-US" dirty="0" smtClean="0"/>
+              <a:t>Dev HTTP Client  - Google Chrome App</a:t>
+            </a:r>
           </a:p>
           <a:p>
             <a:pPr lvl="2"/>
@@ -6972,7 +6955,6 @@
               <a:rPr lang="en-US" sz="2400" dirty="0"/>
               <a:t>Run this command, all on one line</a:t>
             </a:r>
-            <a:endParaRPr lang="en-US" sz="2400" dirty="0"/>
           </a:p>
         </p:txBody>
       </p:sp>
@@ -7927,29 +7909,28 @@
       </p:pic>
       <p:pic>
         <p:nvPicPr>
-          <p:cNvPr id="1026" name="Picture 2" descr="C:\Users\luke.davis\Documents\SCRUM training\leading-edje_logo.png"/>
+          <p:cNvPr id="1026" name="Picture 2"/>
           <p:cNvPicPr>
             <a:picLocks noChangeAspect="1" noChangeArrowheads="1"/>
           </p:cNvPicPr>
           <p:nvPr/>
         </p:nvPicPr>
         <p:blipFill>
-          <a:blip r:embed="rId4">
+          <a:blip r:embed="rId4" cstate="print">
             <a:extLst>
               <a:ext uri="{28A0092B-C50C-407E-A947-70E740481C1C}">
                 <a14:useLocalDpi xmlns:a14="http://schemas.microsoft.com/office/drawing/2010/main" val="0"/>
               </a:ext>
             </a:extLst>
           </a:blip>
-          <a:srcRect/>
           <a:stretch>
             <a:fillRect/>
           </a:stretch>
         </p:blipFill>
         <p:spPr bwMode="auto">
           <a:xfrm>
-            <a:off x="6934200" y="6019800"/>
-            <a:ext cx="2066925" cy="708065"/>
+            <a:off x="5943600" y="6248400"/>
+            <a:ext cx="3072900" cy="532272"/>
           </a:xfrm>
           <a:prstGeom prst="rect">
             <a:avLst/>
@@ -8054,11 +8035,7 @@
           <a:p>
             <a:r>
               <a:rPr lang="en-US" sz="2000" dirty="0" smtClean="0"/>
-              <a:t>Implement </a:t>
-            </a:r>
-            <a:r>
-              <a:rPr lang="en-US" sz="2000" dirty="0" smtClean="0"/>
-              <a:t>Broadcast </a:t>
+              <a:t>Implement Broadcast </a:t>
             </a:r>
             <a:r>
               <a:rPr lang="en-US" sz="2000" dirty="0"/>
@@ -8084,11 +8061,7 @@
           <a:p>
             <a:r>
               <a:rPr lang="en-US" sz="2000" dirty="0" smtClean="0"/>
-              <a:t>Testing Without a </a:t>
-            </a:r>
-            <a:r>
-              <a:rPr lang="en-US" sz="2000" dirty="0" smtClean="0"/>
-              <a:t>Server</a:t>
+              <a:t>Testing Without a Server</a:t>
             </a:r>
           </a:p>
           <a:p>
@@ -8100,11 +8073,7 @@
           <a:p>
             <a:r>
               <a:rPr lang="en-US" sz="2000" dirty="0" smtClean="0"/>
-              <a:t>Additional </a:t>
-            </a:r>
-            <a:r>
-              <a:rPr lang="en-US" sz="2000" dirty="0" smtClean="0"/>
-              <a:t>Info and Questions</a:t>
+              <a:t>Additional Info and Questions</a:t>
             </a:r>
             <a:endParaRPr lang="en-US" sz="2000" dirty="0"/>
           </a:p>
@@ -8315,11 +8284,7 @@
           <a:p>
             <a:r>
               <a:rPr lang="en-US" sz="2000" dirty="0" smtClean="0"/>
-              <a:t>DHC </a:t>
-            </a:r>
-            <a:r>
-              <a:rPr lang="en-US" sz="2000" dirty="0" smtClean="0"/>
-              <a:t>REST HTTP API Client</a:t>
+              <a:t>DHC REST HTTP API Client</a:t>
             </a:r>
           </a:p>
           <a:p>
@@ -8541,11 +8506,7 @@
             </a:r>
             <a:r>
               <a:rPr lang="en-US" sz="2000" dirty="0"/>
-              <a:t>25 years experience designing, developing and delivering high quality software solutions for several companies including Lexmark, Diebold, Limited Brands, Sterling Commerce and IBM. </a:t>
-            </a:r>
-            <a:r>
-              <a:rPr lang="en-US" sz="2000" dirty="0"/>
-              <a:t>C</a:t>
+              <a:t>25 years experience designing, developing and delivering high quality software solutions for several companies including Lexmark, Diebold, Limited Brands, Sterling Commerce and IBM. C</a:t>
             </a:r>
             <a:r>
               <a:rPr lang="en-US" sz="2000" dirty="0" smtClean="0"/>
@@ -8719,7 +8680,6 @@
               <a:rPr lang="en-US" sz="1800" dirty="0" smtClean="0"/>
               <a:t>GCM service handles all aspects of message queueing and delivery to target app running on the target device</a:t>
             </a:r>
-            <a:endParaRPr lang="en-US" sz="1800" dirty="0" smtClean="0"/>
           </a:p>
           <a:p>
             <a:r>
@@ -8742,11 +8702,7 @@
           <a:p>
             <a:r>
               <a:rPr lang="en-US" sz="2000" dirty="0" smtClean="0"/>
-              <a:t>M</a:t>
-            </a:r>
-            <a:r>
-              <a:rPr lang="en-US" sz="2000" dirty="0" smtClean="0"/>
-              <a:t>essages </a:t>
+              <a:t>Messages </a:t>
             </a:r>
             <a:r>
               <a:rPr lang="en-US" sz="2000" dirty="0"/>
@@ -8871,11 +8827,7 @@
             <a:pPr lvl="1"/>
             <a:r>
               <a:rPr lang="en-US" sz="2400" dirty="0" smtClean="0"/>
-              <a:t>Android </a:t>
-            </a:r>
-            <a:r>
-              <a:rPr lang="en-US" sz="2400" dirty="0" smtClean="0"/>
-              <a:t>development environment</a:t>
+              <a:t>Android development environment</a:t>
             </a:r>
           </a:p>
           <a:p>

</xml_diff>

<commit_message>
Upgraded to latest Android build tools, Android gradle plugin 1.0.0, Gradle 2.2.1
</commit_message>
<xml_diff>
--- a/Implementing Push Notification in Android.pptx
+++ b/Implementing Push Notification in Android.pptx
@@ -5,33 +5,34 @@
     <p:sldMasterId id="2147483648" r:id="rId1"/>
   </p:sldMasterIdLst>
   <p:notesMasterIdLst>
-    <p:notesMasterId r:id="rId23"/>
+    <p:notesMasterId r:id="rId24"/>
   </p:notesMasterIdLst>
   <p:handoutMasterIdLst>
-    <p:handoutMasterId r:id="rId24"/>
+    <p:handoutMasterId r:id="rId25"/>
   </p:handoutMasterIdLst>
   <p:sldIdLst>
     <p:sldId id="257" r:id="rId2"/>
     <p:sldId id="258" r:id="rId3"/>
     <p:sldId id="260" r:id="rId4"/>
-    <p:sldId id="261" r:id="rId5"/>
-    <p:sldId id="263" r:id="rId6"/>
-    <p:sldId id="262" r:id="rId7"/>
-    <p:sldId id="264" r:id="rId8"/>
-    <p:sldId id="265" r:id="rId9"/>
-    <p:sldId id="266" r:id="rId10"/>
-    <p:sldId id="267" r:id="rId11"/>
-    <p:sldId id="277" r:id="rId12"/>
-    <p:sldId id="276" r:id="rId13"/>
-    <p:sldId id="270" r:id="rId14"/>
-    <p:sldId id="271" r:id="rId15"/>
-    <p:sldId id="273" r:id="rId16"/>
-    <p:sldId id="275" r:id="rId17"/>
-    <p:sldId id="269" r:id="rId18"/>
-    <p:sldId id="274" r:id="rId19"/>
-    <p:sldId id="272" r:id="rId20"/>
-    <p:sldId id="259" r:id="rId21"/>
-    <p:sldId id="278" r:id="rId22"/>
+    <p:sldId id="279" r:id="rId5"/>
+    <p:sldId id="261" r:id="rId6"/>
+    <p:sldId id="263" r:id="rId7"/>
+    <p:sldId id="262" r:id="rId8"/>
+    <p:sldId id="264" r:id="rId9"/>
+    <p:sldId id="265" r:id="rId10"/>
+    <p:sldId id="266" r:id="rId11"/>
+    <p:sldId id="267" r:id="rId12"/>
+    <p:sldId id="277" r:id="rId13"/>
+    <p:sldId id="276" r:id="rId14"/>
+    <p:sldId id="270" r:id="rId15"/>
+    <p:sldId id="271" r:id="rId16"/>
+    <p:sldId id="273" r:id="rId17"/>
+    <p:sldId id="275" r:id="rId18"/>
+    <p:sldId id="269" r:id="rId19"/>
+    <p:sldId id="274" r:id="rId20"/>
+    <p:sldId id="272" r:id="rId21"/>
+    <p:sldId id="259" r:id="rId22"/>
+    <p:sldId id="278" r:id="rId23"/>
   </p:sldIdLst>
   <p:sldSz cx="9144000" cy="6858000" type="screen4x3"/>
   <p:notesSz cx="6858000" cy="9144000"/>
@@ -245,7 +246,7 @@
           <a:p>
             <a:fld id="{AB6131E3-072D-1447-B771-F05C9D397949}" type="datetimeFigureOut">
               <a:rPr lang="en-US" smtClean="0"/>
-              <a:t>10/24/2014</a:t>
+              <a:t>12/29/2014</a:t>
             </a:fld>
             <a:endParaRPr lang="en-US" dirty="0"/>
           </a:p>
@@ -410,7 +411,7 @@
           <a:p>
             <a:fld id="{DE4C9721-1813-4A55-A5DA-76417DB5EE62}" type="datetimeFigureOut">
               <a:rPr lang="en-US" smtClean="0"/>
-              <a:t>10/24/2014</a:t>
+              <a:t>12/29/2014</a:t>
             </a:fld>
             <a:endParaRPr lang="en-US" dirty="0"/>
           </a:p>
@@ -1051,7 +1052,7 @@
           <a:p>
             <a:fld id="{1A6A9824-C09F-4166-9A2C-6C9FA577887A}" type="datetimeFigureOut">
               <a:rPr lang="en-US" smtClean="0"/>
-              <a:t>10/24/2014</a:t>
+              <a:t>12/29/2014</a:t>
             </a:fld>
             <a:endParaRPr lang="en-US" dirty="0"/>
           </a:p>
@@ -1221,7 +1222,7 @@
           <a:p>
             <a:fld id="{1A6A9824-C09F-4166-9A2C-6C9FA577887A}" type="datetimeFigureOut">
               <a:rPr lang="en-US" smtClean="0"/>
-              <a:t>10/24/2014</a:t>
+              <a:t>12/29/2014</a:t>
             </a:fld>
             <a:endParaRPr lang="en-US" dirty="0"/>
           </a:p>
@@ -1401,7 +1402,7 @@
           <a:p>
             <a:fld id="{1A6A9824-C09F-4166-9A2C-6C9FA577887A}" type="datetimeFigureOut">
               <a:rPr lang="en-US" smtClean="0"/>
-              <a:t>10/24/2014</a:t>
+              <a:t>12/29/2014</a:t>
             </a:fld>
             <a:endParaRPr lang="en-US" dirty="0"/>
           </a:p>
@@ -1571,7 +1572,7 @@
           <a:p>
             <a:fld id="{1A6A9824-C09F-4166-9A2C-6C9FA577887A}" type="datetimeFigureOut">
               <a:rPr lang="en-US" smtClean="0"/>
-              <a:t>10/24/2014</a:t>
+              <a:t>12/29/2014</a:t>
             </a:fld>
             <a:endParaRPr lang="en-US" dirty="0"/>
           </a:p>
@@ -1817,7 +1818,7 @@
           <a:p>
             <a:fld id="{1A6A9824-C09F-4166-9A2C-6C9FA577887A}" type="datetimeFigureOut">
               <a:rPr lang="en-US" smtClean="0"/>
-              <a:t>10/24/2014</a:t>
+              <a:t>12/29/2014</a:t>
             </a:fld>
             <a:endParaRPr lang="en-US" dirty="0"/>
           </a:p>
@@ -2105,7 +2106,7 @@
           <a:p>
             <a:fld id="{1A6A9824-C09F-4166-9A2C-6C9FA577887A}" type="datetimeFigureOut">
               <a:rPr lang="en-US" smtClean="0"/>
-              <a:t>10/24/2014</a:t>
+              <a:t>12/29/2014</a:t>
             </a:fld>
             <a:endParaRPr lang="en-US" dirty="0"/>
           </a:p>
@@ -2527,7 +2528,7 @@
           <a:p>
             <a:fld id="{1A6A9824-C09F-4166-9A2C-6C9FA577887A}" type="datetimeFigureOut">
               <a:rPr lang="en-US" smtClean="0"/>
-              <a:t>10/24/2014</a:t>
+              <a:t>12/29/2014</a:t>
             </a:fld>
             <a:endParaRPr lang="en-US" dirty="0"/>
           </a:p>
@@ -2645,7 +2646,7 @@
           <a:p>
             <a:fld id="{1A6A9824-C09F-4166-9A2C-6C9FA577887A}" type="datetimeFigureOut">
               <a:rPr lang="en-US" smtClean="0"/>
-              <a:t>10/24/2014</a:t>
+              <a:t>12/29/2014</a:t>
             </a:fld>
             <a:endParaRPr lang="en-US" dirty="0"/>
           </a:p>
@@ -2740,7 +2741,7 @@
           <a:p>
             <a:fld id="{1A6A9824-C09F-4166-9A2C-6C9FA577887A}" type="datetimeFigureOut">
               <a:rPr lang="en-US" smtClean="0"/>
-              <a:t>10/24/2014</a:t>
+              <a:t>12/29/2014</a:t>
             </a:fld>
             <a:endParaRPr lang="en-US" dirty="0"/>
           </a:p>
@@ -3017,7 +3018,7 @@
           <a:p>
             <a:fld id="{1A6A9824-C09F-4166-9A2C-6C9FA577887A}" type="datetimeFigureOut">
               <a:rPr lang="en-US" smtClean="0"/>
-              <a:t>10/24/2014</a:t>
+              <a:t>12/29/2014</a:t>
             </a:fld>
             <a:endParaRPr lang="en-US" dirty="0"/>
           </a:p>
@@ -3274,7 +3275,7 @@
           <a:p>
             <a:fld id="{1A6A9824-C09F-4166-9A2C-6C9FA577887A}" type="datetimeFigureOut">
               <a:rPr lang="en-US" smtClean="0"/>
-              <a:t>10/24/2014</a:t>
+              <a:t>12/29/2014</a:t>
             </a:fld>
             <a:endParaRPr lang="en-US" dirty="0"/>
           </a:p>
@@ -3418,7 +3419,7 @@
           <a:noFill/>
           <a:extLst>
             <a:ext uri="{909E8E84-426E-40dd-AFC4-6F175D3DCCD1}">
-              <a14:hiddenFill xmlns:a14="http://schemas.microsoft.com/office/drawing/2010/main" xmlns="">
+              <a14:hiddenFill xmlns="" xmlns:a14="http://schemas.microsoft.com/office/drawing/2010/main">
                 <a:solidFill>
                   <a:srgbClr val="FFFFFF"/>
                 </a:solidFill>
@@ -3557,7 +3558,7 @@
           <a:p>
             <a:fld id="{1A6A9824-C09F-4166-9A2C-6C9FA577887A}" type="datetimeFigureOut">
               <a:rPr lang="en-US" smtClean="0"/>
-              <a:t>10/24/2014</a:t>
+              <a:t>12/29/2014</a:t>
             </a:fld>
             <a:endParaRPr lang="en-US" dirty="0"/>
           </a:p>
@@ -4059,7 +4060,7 @@
           <a:noFill/>
           <a:extLst>
             <a:ext uri="{909E8E84-426E-40dd-AFC4-6F175D3DCCD1}">
-              <a14:hiddenFill xmlns:a14="http://schemas.microsoft.com/office/drawing/2010/main" xmlns="">
+              <a14:hiddenFill xmlns="" xmlns:a14="http://schemas.microsoft.com/office/drawing/2010/main">
                 <a:solidFill>
                   <a:srgbClr val="FFFFFF"/>
                 </a:solidFill>
@@ -4131,9 +4132,10 @@
           <a:lstStyle/>
           <a:p>
             <a:r>
-              <a:rPr lang="en-US" sz="3600" dirty="0"/>
+              <a:rPr lang="en-US" sz="3600" dirty="0" smtClean="0"/>
               <a:t>Add Google Play Services Library - Eclipse</a:t>
             </a:r>
+            <a:endParaRPr lang="en-US" sz="3600" dirty="0"/>
           </a:p>
         </p:txBody>
       </p:sp>
@@ -4147,80 +4149,53 @@
             <p:ph idx="1"/>
           </p:nvPr>
         </p:nvSpPr>
-        <p:spPr>
-          <a:xfrm>
-            <a:off x="457200" y="1600200"/>
-            <a:ext cx="8229600" cy="4267199"/>
-          </a:xfrm>
-        </p:spPr>
+        <p:spPr/>
         <p:txBody>
           <a:bodyPr>
-            <a:noAutofit/>
+            <a:normAutofit/>
           </a:bodyPr>
           <a:lstStyle/>
           <a:p>
             <a:r>
+              <a:rPr lang="en-US" sz="2800" dirty="0" smtClean="0"/>
+              <a:t>Copy library project </a:t>
+            </a:r>
+            <a:r>
               <a:rPr lang="en-US" sz="2800" dirty="0"/>
-              <a:t>Add Project Reference </a:t>
+              <a:t>from &lt;android-sdk&gt;/extras/google/google_play_services/libproject/google-play-services_lib</a:t>
             </a:r>
             <a:r>
               <a:rPr lang="en-US" sz="2800" dirty="0" smtClean="0"/>
-              <a:t>for library project to </a:t>
-            </a:r>
-            <a:r>
-              <a:rPr lang="en-US" sz="2800" dirty="0"/>
-              <a:t>your Android app project</a:t>
+              <a:t>/ to your Android app project directory</a:t>
+            </a:r>
+          </a:p>
+          <a:p>
+            <a:r>
+              <a:rPr lang="en-US" sz="2800" dirty="0" smtClean="0"/>
+              <a:t>Import library project into your Eclipse workspace</a:t>
             </a:r>
           </a:p>
           <a:p>
             <a:pPr lvl="1"/>
             <a:r>
+              <a:rPr lang="en-US" sz="2400" dirty="0"/>
+              <a:t>Click File &gt; Import, select Android &gt; Existing Android Code into Workspace, and browse to the copy of the library project to import </a:t>
+            </a:r>
+            <a:r>
               <a:rPr lang="en-US" sz="2400" dirty="0" smtClean="0"/>
-              <a:t>Right-click on Android app project and select Properties</a:t>
-            </a:r>
-          </a:p>
-          <a:p>
-            <a:pPr lvl="1"/>
-            <a:r>
-              <a:rPr lang="en-US" sz="2400" dirty="0" smtClean="0"/>
-              <a:t>Select </a:t>
-            </a:r>
-            <a:r>
-              <a:rPr lang="en-US" sz="2400" dirty="0"/>
-              <a:t>the "Android" properties </a:t>
-            </a:r>
-            <a:r>
-              <a:rPr lang="en-US" sz="2400" dirty="0" smtClean="0"/>
-              <a:t>group</a:t>
-            </a:r>
-          </a:p>
-          <a:p>
-            <a:pPr lvl="1"/>
-            <a:r>
-              <a:rPr lang="en-US" sz="2400" dirty="0" smtClean="0"/>
-              <a:t>Click Add… under Library and select the imported google-play-</a:t>
-            </a:r>
-            <a:r>
-              <a:rPr lang="en-US" sz="2400" dirty="0" err="1" smtClean="0"/>
-              <a:t>services_lib</a:t>
-            </a:r>
-            <a:r>
-              <a:rPr lang="en-US" sz="2400" dirty="0" smtClean="0"/>
-              <a:t> project</a:t>
-            </a:r>
-          </a:p>
-          <a:p>
-            <a:r>
-              <a:rPr lang="en-US" dirty="0" smtClean="0"/>
-              <a:t>DEMO</a:t>
-            </a:r>
+              <a:t>it</a:t>
+            </a:r>
+            <a:endParaRPr lang="en-US" dirty="0" smtClean="0"/>
+          </a:p>
+          <a:p>
+            <a:endParaRPr lang="en-US" sz="2800" dirty="0"/>
           </a:p>
         </p:txBody>
       </p:sp>
     </p:spTree>
     <p:extLst>
       <p:ext uri="{BB962C8B-B14F-4D97-AF65-F5344CB8AC3E}">
-        <p14:creationId xmlns:p14="http://schemas.microsoft.com/office/powerpoint/2010/main" val="581338712"/>
+        <p14:creationId xmlns:p14="http://schemas.microsoft.com/office/powerpoint/2010/main" val="2482566287"/>
       </p:ext>
     </p:extLst>
   </p:cSld>
@@ -4260,6 +4235,140 @@
         <p:spPr/>
         <p:txBody>
           <a:bodyPr>
+            <a:normAutofit/>
+          </a:bodyPr>
+          <a:lstStyle/>
+          <a:p>
+            <a:r>
+              <a:rPr lang="en-US" sz="3600" dirty="0"/>
+              <a:t>Add Google Play Services Library - Eclipse</a:t>
+            </a:r>
+          </a:p>
+        </p:txBody>
+      </p:sp>
+      <p:sp>
+        <p:nvSpPr>
+          <p:cNvPr id="3" name="Content Placeholder 2"/>
+          <p:cNvSpPr>
+            <a:spLocks noGrp="1"/>
+          </p:cNvSpPr>
+          <p:nvPr>
+            <p:ph idx="1"/>
+          </p:nvPr>
+        </p:nvSpPr>
+        <p:spPr>
+          <a:xfrm>
+            <a:off x="457200" y="1600200"/>
+            <a:ext cx="8229600" cy="4267199"/>
+          </a:xfrm>
+        </p:spPr>
+        <p:txBody>
+          <a:bodyPr>
+            <a:noAutofit/>
+          </a:bodyPr>
+          <a:lstStyle/>
+          <a:p>
+            <a:r>
+              <a:rPr lang="en-US" sz="2800" dirty="0"/>
+              <a:t>Add Project Reference </a:t>
+            </a:r>
+            <a:r>
+              <a:rPr lang="en-US" sz="2800" dirty="0" smtClean="0"/>
+              <a:t>for library project to </a:t>
+            </a:r>
+            <a:r>
+              <a:rPr lang="en-US" sz="2800" dirty="0"/>
+              <a:t>your Android app project</a:t>
+            </a:r>
+          </a:p>
+          <a:p>
+            <a:pPr lvl="1"/>
+            <a:r>
+              <a:rPr lang="en-US" sz="2400" dirty="0" smtClean="0"/>
+              <a:t>Right-click on Android app project and select Properties</a:t>
+            </a:r>
+          </a:p>
+          <a:p>
+            <a:pPr lvl="1"/>
+            <a:r>
+              <a:rPr lang="en-US" sz="2400" dirty="0" smtClean="0"/>
+              <a:t>Select </a:t>
+            </a:r>
+            <a:r>
+              <a:rPr lang="en-US" sz="2400" dirty="0"/>
+              <a:t>the "Android" properties </a:t>
+            </a:r>
+            <a:r>
+              <a:rPr lang="en-US" sz="2400" dirty="0" smtClean="0"/>
+              <a:t>group</a:t>
+            </a:r>
+          </a:p>
+          <a:p>
+            <a:pPr lvl="1"/>
+            <a:r>
+              <a:rPr lang="en-US" sz="2400" dirty="0" smtClean="0"/>
+              <a:t>Click Add… under Library and select the imported google-play-</a:t>
+            </a:r>
+            <a:r>
+              <a:rPr lang="en-US" sz="2400" dirty="0" err="1" smtClean="0"/>
+              <a:t>services_lib</a:t>
+            </a:r>
+            <a:r>
+              <a:rPr lang="en-US" sz="2400" dirty="0" smtClean="0"/>
+              <a:t> project</a:t>
+            </a:r>
+          </a:p>
+          <a:p>
+            <a:r>
+              <a:rPr lang="en-US" dirty="0" smtClean="0"/>
+              <a:t>DEMO</a:t>
+            </a:r>
+          </a:p>
+        </p:txBody>
+      </p:sp>
+    </p:spTree>
+    <p:extLst>
+      <p:ext uri="{BB962C8B-B14F-4D97-AF65-F5344CB8AC3E}">
+        <p14:creationId xmlns:p14="http://schemas.microsoft.com/office/powerpoint/2010/main" val="581338712"/>
+      </p:ext>
+    </p:extLst>
+  </p:cSld>
+  <p:clrMapOvr>
+    <a:masterClrMapping/>
+  </p:clrMapOvr>
+</p:sld>
+</file>
+
+<file path=ppt/slides/slide12.xml><?xml version="1.0" encoding="utf-8"?>
+<p:sld xmlns:a="http://schemas.openxmlformats.org/drawingml/2006/main" xmlns:r="http://schemas.openxmlformats.org/officeDocument/2006/relationships" xmlns:p="http://schemas.openxmlformats.org/presentationml/2006/main">
+  <p:cSld>
+    <p:spTree>
+      <p:nvGrpSpPr>
+        <p:cNvPr id="1" name=""/>
+        <p:cNvGrpSpPr/>
+        <p:nvPr/>
+      </p:nvGrpSpPr>
+      <p:grpSpPr>
+        <a:xfrm>
+          <a:off x="0" y="0"/>
+          <a:ext cx="0" cy="0"/>
+          <a:chOff x="0" y="0"/>
+          <a:chExt cx="0" cy="0"/>
+        </a:xfrm>
+      </p:grpSpPr>
+      <p:sp>
+        <p:nvSpPr>
+          <p:cNvPr id="2" name="Title 1"/>
+          <p:cNvSpPr>
+            <a:spLocks noGrp="1"/>
+          </p:cNvSpPr>
+          <p:nvPr>
+            <p:ph type="title"/>
+          </p:nvPr>
+        </p:nvSpPr>
+        <p:spPr/>
+        <p:txBody>
+          <a:bodyPr>
             <a:noAutofit/>
           </a:bodyPr>
           <a:lstStyle/>
@@ -4506,7 +4615,7 @@
 </p:sld>
 </file>
 
-<file path=ppt/slides/slide12.xml><?xml version="1.0" encoding="utf-8"?>
+<file path=ppt/slides/slide13.xml><?xml version="1.0" encoding="utf-8"?>
 <p:sld xmlns:a="http://schemas.openxmlformats.org/drawingml/2006/main" xmlns:r="http://schemas.openxmlformats.org/officeDocument/2006/relationships" xmlns:p="http://schemas.openxmlformats.org/presentationml/2006/main">
   <p:cSld>
     <p:spTree>
@@ -5124,143 +5233,6 @@
 </p:sld>
 </file>
 
-<file path=ppt/slides/slide13.xml><?xml version="1.0" encoding="utf-8"?>
-<p:sld xmlns:a="http://schemas.openxmlformats.org/drawingml/2006/main" xmlns:r="http://schemas.openxmlformats.org/officeDocument/2006/relationships" xmlns:p="http://schemas.openxmlformats.org/presentationml/2006/main">
-  <p:cSld>
-    <p:spTree>
-      <p:nvGrpSpPr>
-        <p:cNvPr id="1" name=""/>
-        <p:cNvGrpSpPr/>
-        <p:nvPr/>
-      </p:nvGrpSpPr>
-      <p:grpSpPr>
-        <a:xfrm>
-          <a:off x="0" y="0"/>
-          <a:ext cx="0" cy="0"/>
-          <a:chOff x="0" y="0"/>
-          <a:chExt cx="0" cy="0"/>
-        </a:xfrm>
-      </p:grpSpPr>
-      <p:sp>
-        <p:nvSpPr>
-          <p:cNvPr id="2" name="Title 1"/>
-          <p:cNvSpPr>
-            <a:spLocks noGrp="1"/>
-          </p:cNvSpPr>
-          <p:nvPr>
-            <p:ph type="title"/>
-          </p:nvPr>
-        </p:nvSpPr>
-        <p:spPr/>
-        <p:txBody>
-          <a:bodyPr>
-            <a:normAutofit/>
-          </a:bodyPr>
-          <a:lstStyle/>
-          <a:p>
-            <a:r>
-              <a:rPr lang="en-US" dirty="0"/>
-              <a:t>Check for Google Play </a:t>
-            </a:r>
-            <a:r>
-              <a:rPr lang="en-US" dirty="0" smtClean="0"/>
-              <a:t>Services</a:t>
-            </a:r>
-            <a:endParaRPr lang="en-US" dirty="0"/>
-          </a:p>
-        </p:txBody>
-      </p:sp>
-      <p:sp>
-        <p:nvSpPr>
-          <p:cNvPr id="3" name="Content Placeholder 2"/>
-          <p:cNvSpPr>
-            <a:spLocks noGrp="1"/>
-          </p:cNvSpPr>
-          <p:nvPr>
-            <p:ph idx="1"/>
-          </p:nvPr>
-        </p:nvSpPr>
-        <p:spPr/>
-        <p:txBody>
-          <a:bodyPr>
-            <a:normAutofit/>
-          </a:bodyPr>
-          <a:lstStyle/>
-          <a:p>
-            <a:r>
-              <a:rPr lang="en-US" sz="2400" dirty="0" smtClean="0"/>
-              <a:t>Apps relying on Google Play Services should check for compatible version</a:t>
-            </a:r>
-          </a:p>
-          <a:p>
-            <a:r>
-              <a:rPr lang="en-US" sz="2400" dirty="0" smtClean="0"/>
-              <a:t>Typically done in following main activity methods</a:t>
-            </a:r>
-          </a:p>
-          <a:p>
-            <a:pPr lvl="1"/>
-            <a:r>
-              <a:rPr lang="en-US" sz="2000" dirty="0" smtClean="0"/>
-              <a:t>onCreate() – ensures app cannot be used without successful check</a:t>
-            </a:r>
-          </a:p>
-          <a:p>
-            <a:pPr lvl="1"/>
-            <a:r>
-              <a:rPr lang="en-US" sz="2000" dirty="0" smtClean="0"/>
-              <a:t>onResume() – ensures check is done when user returns to the app</a:t>
-            </a:r>
-          </a:p>
-          <a:p>
-            <a:r>
-              <a:rPr lang="en-US" sz="2400" dirty="0" smtClean="0"/>
-              <a:t>App can </a:t>
-            </a:r>
-            <a:r>
-              <a:rPr lang="en-US" sz="2400" dirty="0"/>
-              <a:t>call GooglePlayServicesUtil.getErrorDialog(</a:t>
-            </a:r>
-            <a:r>
-              <a:rPr lang="en-US" sz="2400" dirty="0" smtClean="0"/>
-              <a:t>) to:</a:t>
-            </a:r>
-          </a:p>
-          <a:p>
-            <a:pPr lvl="1"/>
-            <a:r>
-              <a:rPr lang="en-US" sz="2000" dirty="0" smtClean="0"/>
-              <a:t>Download APK from Google Play Store or</a:t>
-            </a:r>
-          </a:p>
-          <a:p>
-            <a:pPr lvl="1"/>
-            <a:r>
-              <a:rPr lang="en-US" sz="2000" dirty="0" smtClean="0"/>
-              <a:t>Enable it in device settings</a:t>
-            </a:r>
-          </a:p>
-          <a:p>
-            <a:r>
-              <a:rPr lang="en-US" sz="2400" dirty="0" smtClean="0"/>
-              <a:t>Code walkthrough</a:t>
-            </a:r>
-          </a:p>
-        </p:txBody>
-      </p:sp>
-    </p:spTree>
-    <p:extLst>
-      <p:ext uri="{BB962C8B-B14F-4D97-AF65-F5344CB8AC3E}">
-        <p14:creationId xmlns:p14="http://schemas.microsoft.com/office/powerpoint/2010/main" val="606154861"/>
-      </p:ext>
-    </p:extLst>
-  </p:cSld>
-  <p:clrMapOvr>
-    <a:masterClrMapping/>
-  </p:clrMapOvr>
-</p:sld>
-</file>
-
 <file path=ppt/slides/slide14.xml><?xml version="1.0" encoding="utf-8"?>
 <p:sld xmlns:a="http://schemas.openxmlformats.org/drawingml/2006/main" xmlns:r="http://schemas.openxmlformats.org/officeDocument/2006/relationships" xmlns:p="http://schemas.openxmlformats.org/presentationml/2006/main">
   <p:cSld>
@@ -5290,108 +5262,105 @@
         </p:nvSpPr>
         <p:spPr/>
         <p:txBody>
-          <a:bodyPr/>
-          <a:lstStyle/>
-          <a:p>
-            <a:r>
-              <a:rPr lang="en-US" dirty="0" smtClean="0"/>
-              <a:t>Register with GCM</a:t>
-            </a:r>
-            <a:endParaRPr lang="en-US" dirty="0"/>
-          </a:p>
-        </p:txBody>
-      </p:sp>
-      <p:sp>
-        <p:nvSpPr>
-          <p:cNvPr id="3" name="Content Placeholder 2"/>
-          <p:cNvSpPr>
-            <a:spLocks noGrp="1"/>
-          </p:cNvSpPr>
-          <p:nvPr>
-            <p:ph idx="1"/>
-          </p:nvPr>
-        </p:nvSpPr>
-        <p:spPr/>
-        <p:txBody>
           <a:bodyPr>
-            <a:normAutofit lnSpcReduction="10000"/>
+            <a:normAutofit/>
           </a:bodyPr>
           <a:lstStyle/>
           <a:p>
             <a:r>
-              <a:rPr lang="en-US" sz="2800" dirty="0" smtClean="0"/>
-              <a:t>App must </a:t>
-            </a:r>
-            <a:r>
-              <a:rPr lang="en-US" sz="2800" dirty="0"/>
-              <a:t>register </a:t>
-            </a:r>
-            <a:r>
-              <a:rPr lang="en-US" sz="2800" dirty="0" smtClean="0"/>
-              <a:t>with GCM before </a:t>
-            </a:r>
-            <a:r>
-              <a:rPr lang="en-US" sz="2800" dirty="0"/>
-              <a:t>it can receive </a:t>
-            </a:r>
-            <a:r>
-              <a:rPr lang="en-US" sz="2800" dirty="0" smtClean="0"/>
-              <a:t>messages</a:t>
+              <a:rPr lang="en-US" dirty="0"/>
+              <a:t>Check for Google Play </a:t>
+            </a:r>
+            <a:r>
+              <a:rPr lang="en-US" dirty="0" smtClean="0"/>
+              <a:t>Services</a:t>
+            </a:r>
+            <a:endParaRPr lang="en-US" dirty="0"/>
+          </a:p>
+        </p:txBody>
+      </p:sp>
+      <p:sp>
+        <p:nvSpPr>
+          <p:cNvPr id="3" name="Content Placeholder 2"/>
+          <p:cNvSpPr>
+            <a:spLocks noGrp="1"/>
+          </p:cNvSpPr>
+          <p:nvPr>
+            <p:ph idx="1"/>
+          </p:nvPr>
+        </p:nvSpPr>
+        <p:spPr/>
+        <p:txBody>
+          <a:bodyPr>
+            <a:normAutofit/>
+          </a:bodyPr>
+          <a:lstStyle/>
+          <a:p>
+            <a:r>
+              <a:rPr lang="en-US" sz="2400" dirty="0" smtClean="0"/>
+              <a:t>Apps relying on Google Play Services should check for compatible version</a:t>
+            </a:r>
+          </a:p>
+          <a:p>
+            <a:r>
+              <a:rPr lang="en-US" sz="2400" dirty="0" smtClean="0"/>
+              <a:t>Typically done in following main activity methods</a:t>
             </a:r>
           </a:p>
           <a:p>
             <a:pPr lvl="1"/>
             <a:r>
+              <a:rPr lang="en-US" sz="2000" dirty="0" smtClean="0"/>
+              <a:t>onCreate() – ensures app cannot be used without successful check</a:t>
+            </a:r>
+          </a:p>
+          <a:p>
+            <a:pPr lvl="1"/>
+            <a:r>
+              <a:rPr lang="en-US" sz="2000" dirty="0" smtClean="0"/>
+              <a:t>onResume() – ensures check is done when user returns to the app</a:t>
+            </a:r>
+          </a:p>
+          <a:p>
+            <a:r>
               <a:rPr lang="en-US" sz="2400" dirty="0" smtClean="0"/>
-              <a:t>Must be done on background thread because GCM register() method blocks</a:t>
-            </a:r>
-          </a:p>
-          <a:p>
-            <a:r>
-              <a:rPr lang="en-US" sz="2800" dirty="0" smtClean="0"/>
-              <a:t>Receives registration ID from GCM</a:t>
+              <a:t>App can </a:t>
+            </a:r>
+            <a:r>
+              <a:rPr lang="en-US" sz="2400" dirty="0"/>
+              <a:t>call GooglePlayServicesUtil.getErrorDialog(</a:t>
+            </a:r>
+            <a:r>
+              <a:rPr lang="en-US" sz="2400" dirty="0" smtClean="0"/>
+              <a:t>) to:</a:t>
             </a:r>
           </a:p>
           <a:p>
             <a:pPr lvl="1"/>
             <a:r>
+              <a:rPr lang="en-US" sz="2000" dirty="0" smtClean="0"/>
+              <a:t>Download APK from Google Play Store or</a:t>
+            </a:r>
+          </a:p>
+          <a:p>
+            <a:pPr lvl="1"/>
+            <a:r>
+              <a:rPr lang="en-US" sz="2000" dirty="0" smtClean="0"/>
+              <a:t>Enable it in device settings</a:t>
+            </a:r>
+          </a:p>
+          <a:p>
+            <a:r>
               <a:rPr lang="en-US" sz="2400" dirty="0" smtClean="0"/>
-              <a:t>Used by server to send notifications to that device</a:t>
-            </a:r>
-          </a:p>
-          <a:p>
-            <a:r>
-              <a:rPr lang="en-US" sz="2800" dirty="0" smtClean="0"/>
-              <a:t>Registration ID stored by app</a:t>
-            </a:r>
-          </a:p>
-          <a:p>
-            <a:pPr lvl="1"/>
-            <a:r>
-              <a:rPr lang="en-US" sz="2400" dirty="0" smtClean="0"/>
-              <a:t>Allows registration to be skipped if ID is still valid</a:t>
-            </a:r>
-          </a:p>
-          <a:p>
-            <a:pPr lvl="1"/>
-            <a:r>
-              <a:rPr lang="en-US" sz="2400" dirty="0" smtClean="0"/>
-              <a:t>Typically inside shared preferences</a:t>
-            </a:r>
-          </a:p>
-          <a:p>
-            <a:r>
-              <a:rPr lang="en-US" sz="2800" dirty="0" smtClean="0"/>
               <a:t>Code walkthrough</a:t>
             </a:r>
-            <a:endParaRPr lang="en-US" sz="2800" dirty="0"/>
           </a:p>
         </p:txBody>
       </p:sp>
     </p:spTree>
     <p:extLst>
       <p:ext uri="{BB962C8B-B14F-4D97-AF65-F5344CB8AC3E}">
-        <p14:creationId xmlns:p14="http://schemas.microsoft.com/office/powerpoint/2010/main" val="361619516"/>
+        <p14:creationId xmlns:p14="http://schemas.microsoft.com/office/powerpoint/2010/main" val="606154861"/>
       </p:ext>
     </p:extLst>
   </p:cSld>
@@ -5430,14 +5399,12 @@
         </p:nvSpPr>
         <p:spPr/>
         <p:txBody>
-          <a:bodyPr>
-            <a:normAutofit fontScale="90000"/>
-          </a:bodyPr>
+          <a:bodyPr/>
           <a:lstStyle/>
           <a:p>
             <a:r>
               <a:rPr lang="en-US" dirty="0" smtClean="0"/>
-              <a:t>Implement Broadcast Receiver and Intent Service</a:t>
+              <a:t>Register with GCM</a:t>
             </a:r>
             <a:endParaRPr lang="en-US" dirty="0"/>
           </a:p>
@@ -5461,72 +5428,79 @@
           <a:lstStyle/>
           <a:p>
             <a:r>
-              <a:rPr lang="en-US" dirty="0" smtClean="0"/>
-              <a:t>Broadcast Receiver</a:t>
+              <a:rPr lang="en-US" sz="2800" dirty="0" smtClean="0"/>
+              <a:t>App must </a:t>
+            </a:r>
+            <a:r>
+              <a:rPr lang="en-US" sz="2800" dirty="0"/>
+              <a:t>register </a:t>
+            </a:r>
+            <a:r>
+              <a:rPr lang="en-US" sz="2800" dirty="0" smtClean="0"/>
+              <a:t>with GCM before </a:t>
+            </a:r>
+            <a:r>
+              <a:rPr lang="en-US" sz="2800" dirty="0"/>
+              <a:t>it can receive </a:t>
+            </a:r>
+            <a:r>
+              <a:rPr lang="en-US" sz="2800" dirty="0" smtClean="0"/>
+              <a:t>messages</a:t>
             </a:r>
           </a:p>
           <a:p>
             <a:pPr lvl="1"/>
             <a:r>
-              <a:rPr lang="en-US" dirty="0" smtClean="0"/>
-              <a:t>Extends WakefulBroadcastReceiver</a:t>
+              <a:rPr lang="en-US" sz="2400" dirty="0" smtClean="0"/>
+              <a:t>Must be done on background thread because GCM register() method blocks</a:t>
+            </a:r>
+          </a:p>
+          <a:p>
+            <a:r>
+              <a:rPr lang="en-US" sz="2800" dirty="0" smtClean="0"/>
+              <a:t>Receives registration ID from GCM</a:t>
             </a:r>
           </a:p>
           <a:p>
             <a:pPr lvl="1"/>
             <a:r>
-              <a:rPr lang="en-US" dirty="0" smtClean="0"/>
-              <a:t>Override onReceive() to receive notification and start intent service to handle notification</a:t>
-            </a:r>
-          </a:p>
-          <a:p>
-            <a:r>
-              <a:rPr lang="en-US" dirty="0" smtClean="0"/>
-              <a:t>Intent Service</a:t>
+              <a:rPr lang="en-US" sz="2400" dirty="0" smtClean="0"/>
+              <a:t>Used by server to send notifications to that device</a:t>
+            </a:r>
+          </a:p>
+          <a:p>
+            <a:r>
+              <a:rPr lang="en-US" sz="2800" dirty="0" smtClean="0"/>
+              <a:t>Registration ID stored by app</a:t>
             </a:r>
           </a:p>
           <a:p>
             <a:pPr lvl="1"/>
             <a:r>
-              <a:rPr lang="en-US" dirty="0" smtClean="0"/>
-              <a:t>Extends IntentService</a:t>
+              <a:rPr lang="en-US" sz="2400" dirty="0" smtClean="0"/>
+              <a:t>Allows registration to be skipped if ID is still valid</a:t>
             </a:r>
           </a:p>
           <a:p>
             <a:pPr lvl="1"/>
             <a:r>
-              <a:rPr lang="en-US" dirty="0" smtClean="0"/>
-              <a:t>Override onHandleIntent() to process notification</a:t>
-            </a:r>
-          </a:p>
-          <a:p>
-            <a:pPr lvl="1"/>
-            <a:r>
-              <a:rPr lang="en-US" b="1" dirty="0" smtClean="0">
-                <a:solidFill>
-                  <a:srgbClr val="800000"/>
-                </a:solidFill>
-              </a:rPr>
-              <a:t>IMPORTANT: </a:t>
-            </a:r>
-            <a:r>
-              <a:rPr lang="en-US" dirty="0" smtClean="0"/>
-              <a:t>Release wake lock when done</a:t>
-            </a:r>
-          </a:p>
-          <a:p>
-            <a:r>
-              <a:rPr lang="en-US" dirty="0" smtClean="0"/>
+              <a:rPr lang="en-US" sz="2400" dirty="0" smtClean="0"/>
+              <a:t>Typically inside shared preferences</a:t>
+            </a:r>
+          </a:p>
+          <a:p>
+            <a:r>
+              <a:rPr lang="en-US" sz="2800" dirty="0" smtClean="0"/>
               <a:t>Code walkthrough</a:t>
             </a:r>
-            <a:endParaRPr lang="en-US" dirty="0"/>
+            <a:endParaRPr lang="en-US" sz="2800" dirty="0"/>
           </a:p>
         </p:txBody>
       </p:sp>
     </p:spTree>
     <p:extLst>
       <p:ext uri="{BB962C8B-B14F-4D97-AF65-F5344CB8AC3E}">
-        <p14:creationId xmlns:p14="http://schemas.microsoft.com/office/powerpoint/2010/main" val="2368302692"/>
+        <p14:creationId xmlns:p14="http://schemas.microsoft.com/office/powerpoint/2010/main" val="361619516"/>
       </p:ext>
     </p:extLst>
   </p:cSld>
@@ -5572,6 +5546,141 @@
           <a:p>
             <a:r>
               <a:rPr lang="en-US" dirty="0" smtClean="0"/>
+              <a:t>Implement Broadcast Receiver and Intent Service</a:t>
+            </a:r>
+            <a:endParaRPr lang="en-US" dirty="0"/>
+          </a:p>
+        </p:txBody>
+      </p:sp>
+      <p:sp>
+        <p:nvSpPr>
+          <p:cNvPr id="3" name="Content Placeholder 2"/>
+          <p:cNvSpPr>
+            <a:spLocks noGrp="1"/>
+          </p:cNvSpPr>
+          <p:nvPr>
+            <p:ph idx="1"/>
+          </p:nvPr>
+        </p:nvSpPr>
+        <p:spPr/>
+        <p:txBody>
+          <a:bodyPr>
+            <a:normAutofit lnSpcReduction="10000"/>
+          </a:bodyPr>
+          <a:lstStyle/>
+          <a:p>
+            <a:r>
+              <a:rPr lang="en-US" dirty="0" smtClean="0"/>
+              <a:t>Broadcast Receiver</a:t>
+            </a:r>
+          </a:p>
+          <a:p>
+            <a:pPr lvl="1"/>
+            <a:r>
+              <a:rPr lang="en-US" dirty="0" smtClean="0"/>
+              <a:t>Extends WakefulBroadcastReceiver</a:t>
+            </a:r>
+          </a:p>
+          <a:p>
+            <a:pPr lvl="1"/>
+            <a:r>
+              <a:rPr lang="en-US" dirty="0" smtClean="0"/>
+              <a:t>Override onReceive() to receive notification and start intent service to handle notification</a:t>
+            </a:r>
+          </a:p>
+          <a:p>
+            <a:r>
+              <a:rPr lang="en-US" dirty="0" smtClean="0"/>
+              <a:t>Intent Service</a:t>
+            </a:r>
+          </a:p>
+          <a:p>
+            <a:pPr lvl="1"/>
+            <a:r>
+              <a:rPr lang="en-US" dirty="0" smtClean="0"/>
+              <a:t>Extends IntentService</a:t>
+            </a:r>
+          </a:p>
+          <a:p>
+            <a:pPr lvl="1"/>
+            <a:r>
+              <a:rPr lang="en-US" dirty="0" smtClean="0"/>
+              <a:t>Override onHandleIntent() to process notification</a:t>
+            </a:r>
+          </a:p>
+          <a:p>
+            <a:pPr lvl="1"/>
+            <a:r>
+              <a:rPr lang="en-US" b="1" dirty="0" smtClean="0">
+                <a:solidFill>
+                  <a:srgbClr val="800000"/>
+                </a:solidFill>
+              </a:rPr>
+              <a:t>IMPORTANT: </a:t>
+            </a:r>
+            <a:r>
+              <a:rPr lang="en-US" dirty="0" smtClean="0"/>
+              <a:t>Release wake lock when done</a:t>
+            </a:r>
+          </a:p>
+          <a:p>
+            <a:r>
+              <a:rPr lang="en-US" dirty="0" smtClean="0"/>
+              <a:t>Code walkthrough</a:t>
+            </a:r>
+            <a:endParaRPr lang="en-US" dirty="0"/>
+          </a:p>
+        </p:txBody>
+      </p:sp>
+    </p:spTree>
+    <p:extLst>
+      <p:ext uri="{BB962C8B-B14F-4D97-AF65-F5344CB8AC3E}">
+        <p14:creationId xmlns:p14="http://schemas.microsoft.com/office/powerpoint/2010/main" val="2368302692"/>
+      </p:ext>
+    </p:extLst>
+  </p:cSld>
+  <p:clrMapOvr>
+    <a:masterClrMapping/>
+  </p:clrMapOvr>
+</p:sld>
+</file>
+
+<file path=ppt/slides/slide17.xml><?xml version="1.0" encoding="utf-8"?>
+<p:sld xmlns:a="http://schemas.openxmlformats.org/drawingml/2006/main" xmlns:r="http://schemas.openxmlformats.org/officeDocument/2006/relationships" xmlns:p="http://schemas.openxmlformats.org/presentationml/2006/main">
+  <p:cSld>
+    <p:spTree>
+      <p:nvGrpSpPr>
+        <p:cNvPr id="1" name=""/>
+        <p:cNvGrpSpPr/>
+        <p:nvPr/>
+      </p:nvGrpSpPr>
+      <p:grpSpPr>
+        <a:xfrm>
+          <a:off x="0" y="0"/>
+          <a:ext cx="0" cy="0"/>
+          <a:chOff x="0" y="0"/>
+          <a:chExt cx="0" cy="0"/>
+        </a:xfrm>
+      </p:grpSpPr>
+      <p:sp>
+        <p:nvSpPr>
+          <p:cNvPr id="2" name="Title 1"/>
+          <p:cNvSpPr>
+            <a:spLocks noGrp="1"/>
+          </p:cNvSpPr>
+          <p:nvPr>
+            <p:ph type="title"/>
+          </p:nvPr>
+        </p:nvSpPr>
+        <p:spPr/>
+        <p:txBody>
+          <a:bodyPr>
+            <a:normAutofit fontScale="90000"/>
+          </a:bodyPr>
+          <a:lstStyle/>
+          <a:p>
+            <a:r>
+              <a:rPr lang="en-US" dirty="0" smtClean="0"/>
               <a:t>Process Notification Data in Activity</a:t>
             </a:r>
             <a:endParaRPr lang="en-US" dirty="0"/>
@@ -5655,7 +5764,7 @@
 </p:sld>
 </file>
 
-<file path=ppt/slides/slide17.xml><?xml version="1.0" encoding="utf-8"?>
+<file path=ppt/slides/slide18.xml><?xml version="1.0" encoding="utf-8"?>
 <p:sld xmlns:a="http://schemas.openxmlformats.org/drawingml/2006/main" xmlns:r="http://schemas.openxmlformats.org/officeDocument/2006/relationships" xmlns:p="http://schemas.openxmlformats.org/presentationml/2006/main">
   <p:cSld>
     <p:spTree>
@@ -6758,7 +6867,7 @@
 </p:sld>
 </file>
 
-<file path=ppt/slides/slide18.xml><?xml version="1.0" encoding="utf-8"?>
+<file path=ppt/slides/slide19.xml><?xml version="1.0" encoding="utf-8"?>
 <p:sld xmlns:a="http://schemas.openxmlformats.org/drawingml/2006/main" xmlns:r="http://schemas.openxmlformats.org/officeDocument/2006/relationships" xmlns:p="http://schemas.openxmlformats.org/presentationml/2006/main">
   <p:cSld>
     <p:spTree>
@@ -6886,7 +6995,254 @@
 </p:sld>
 </file>
 
-<file path=ppt/slides/slide19.xml><?xml version="1.0" encoding="utf-8"?>
+<file path=ppt/slides/slide2.xml><?xml version="1.0" encoding="utf-8"?>
+<p:sld xmlns:a="http://schemas.openxmlformats.org/drawingml/2006/main" xmlns:r="http://schemas.openxmlformats.org/officeDocument/2006/relationships" xmlns:p="http://schemas.openxmlformats.org/presentationml/2006/main">
+  <p:cSld>
+    <p:spTree>
+      <p:nvGrpSpPr>
+        <p:cNvPr id="1" name=""/>
+        <p:cNvGrpSpPr/>
+        <p:nvPr/>
+      </p:nvGrpSpPr>
+      <p:grpSpPr>
+        <a:xfrm>
+          <a:off x="0" y="0"/>
+          <a:ext cx="0" cy="0"/>
+          <a:chOff x="0" y="0"/>
+          <a:chExt cx="0" cy="0"/>
+        </a:xfrm>
+      </p:grpSpPr>
+      <p:pic>
+        <p:nvPicPr>
+          <p:cNvPr id="3" name="Picture 2"/>
+          <p:cNvPicPr>
+            <a:picLocks noChangeAspect="1"/>
+          </p:cNvPicPr>
+          <p:nvPr/>
+        </p:nvPicPr>
+        <p:blipFill>
+          <a:blip r:embed="rId3">
+            <a:extLst>
+              <a:ext uri="{28A0092B-C50C-407E-A947-70E740481C1C}">
+                <a14:useLocalDpi xmlns:a14="http://schemas.microsoft.com/office/drawing/2010/main" val="0"/>
+              </a:ext>
+            </a:extLst>
+          </a:blip>
+          <a:stretch>
+            <a:fillRect/>
+          </a:stretch>
+        </p:blipFill>
+        <p:spPr>
+          <a:xfrm>
+            <a:off x="76200" y="3630"/>
+            <a:ext cx="9144000" cy="6858000"/>
+          </a:xfrm>
+          <a:prstGeom prst="rect">
+            <a:avLst/>
+          </a:prstGeom>
+        </p:spPr>
+      </p:pic>
+      <p:pic>
+        <p:nvPicPr>
+          <p:cNvPr id="1026" name="Picture 2"/>
+          <p:cNvPicPr>
+            <a:picLocks noChangeAspect="1" noChangeArrowheads="1"/>
+          </p:cNvPicPr>
+          <p:nvPr/>
+        </p:nvPicPr>
+        <p:blipFill>
+          <a:blip r:embed="rId4" cstate="print">
+            <a:extLst>
+              <a:ext uri="{28A0092B-C50C-407E-A947-70E740481C1C}">
+                <a14:useLocalDpi xmlns:a14="http://schemas.microsoft.com/office/drawing/2010/main" val="0"/>
+              </a:ext>
+            </a:extLst>
+          </a:blip>
+          <a:stretch>
+            <a:fillRect/>
+          </a:stretch>
+        </p:blipFill>
+        <p:spPr bwMode="auto">
+          <a:xfrm>
+            <a:off x="5943600" y="6248400"/>
+            <a:ext cx="3072900" cy="532272"/>
+          </a:xfrm>
+          <a:prstGeom prst="rect">
+            <a:avLst/>
+          </a:prstGeom>
+          <a:noFill/>
+          <a:extLst>
+            <a:ext uri="{909E8E84-426E-40dd-AFC4-6F175D3DCCD1}">
+              <a14:hiddenFill xmlns="" xmlns:a14="http://schemas.microsoft.com/office/drawing/2010/main">
+                <a:solidFill>
+                  <a:srgbClr val="FFFFFF"/>
+                </a:solidFill>
+              </a14:hiddenFill>
+            </a:ext>
+          </a:extLst>
+        </p:spPr>
+      </p:pic>
+      <p:sp>
+        <p:nvSpPr>
+          <p:cNvPr id="2" name="Title 1"/>
+          <p:cNvSpPr>
+            <a:spLocks noGrp="1"/>
+          </p:cNvSpPr>
+          <p:nvPr>
+            <p:ph type="title"/>
+          </p:nvPr>
+        </p:nvSpPr>
+        <p:spPr/>
+        <p:txBody>
+          <a:bodyPr/>
+          <a:lstStyle/>
+          <a:p>
+            <a:r>
+              <a:rPr lang="en-US" dirty="0" smtClean="0"/>
+              <a:t>Agenda</a:t>
+            </a:r>
+            <a:endParaRPr lang="en-US" dirty="0"/>
+          </a:p>
+        </p:txBody>
+      </p:sp>
+      <p:sp>
+        <p:nvSpPr>
+          <p:cNvPr id="6" name="Content Placeholder 5"/>
+          <p:cNvSpPr>
+            <a:spLocks noGrp="1"/>
+          </p:cNvSpPr>
+          <p:nvPr>
+            <p:ph idx="1"/>
+          </p:nvPr>
+        </p:nvSpPr>
+        <p:spPr/>
+        <p:txBody>
+          <a:bodyPr>
+            <a:normAutofit fontScale="92500" lnSpcReduction="10000"/>
+          </a:bodyPr>
+          <a:lstStyle/>
+          <a:p>
+            <a:r>
+              <a:rPr lang="en-US" sz="2000" dirty="0" smtClean="0"/>
+              <a:t>Introduction</a:t>
+            </a:r>
+          </a:p>
+          <a:p>
+            <a:r>
+              <a:rPr lang="en-US" sz="2000" dirty="0" smtClean="0"/>
+              <a:t>Prerequisites</a:t>
+            </a:r>
+          </a:p>
+          <a:p>
+            <a:r>
+              <a:rPr lang="en-US" sz="2000" dirty="0" smtClean="0"/>
+              <a:t>Set Up Google Play Services SDK</a:t>
+            </a:r>
+          </a:p>
+          <a:p>
+            <a:r>
+              <a:rPr lang="en-US" sz="2000" dirty="0" smtClean="0"/>
+              <a:t>Create Google API Project</a:t>
+            </a:r>
+          </a:p>
+          <a:p>
+            <a:r>
+              <a:rPr lang="en-US" sz="2000" dirty="0" smtClean="0"/>
+              <a:t>Add Google Play Services Library</a:t>
+            </a:r>
+          </a:p>
+          <a:p>
+            <a:r>
+              <a:rPr lang="en-US" sz="2000" dirty="0"/>
+              <a:t>Check for Google Play </a:t>
+            </a:r>
+            <a:r>
+              <a:rPr lang="en-US" sz="2000" dirty="0" smtClean="0"/>
+              <a:t>Services Availability</a:t>
+            </a:r>
+          </a:p>
+          <a:p>
+            <a:r>
+              <a:rPr lang="en-US" sz="2000" dirty="0" smtClean="0"/>
+              <a:t>Register Your App with GCM</a:t>
+            </a:r>
+          </a:p>
+          <a:p>
+            <a:r>
+              <a:rPr lang="en-US" sz="2000" dirty="0" smtClean="0"/>
+              <a:t>Implement Broadcast </a:t>
+            </a:r>
+            <a:r>
+              <a:rPr lang="en-US" sz="2000" dirty="0"/>
+              <a:t>Receiver and </a:t>
+            </a:r>
+            <a:r>
+              <a:rPr lang="en-US" sz="2000" dirty="0" smtClean="0"/>
+              <a:t>Intent Service</a:t>
+            </a:r>
+          </a:p>
+          <a:p>
+            <a:r>
+              <a:rPr lang="en-US" sz="2000" dirty="0" smtClean="0"/>
+              <a:t>Process Notification Data in Activity</a:t>
+            </a:r>
+          </a:p>
+          <a:p>
+            <a:r>
+              <a:rPr lang="en-US" sz="2000" dirty="0" smtClean="0"/>
+              <a:t>Update the App's Manifest</a:t>
+            </a:r>
+          </a:p>
+          <a:p>
+            <a:r>
+              <a:rPr lang="en-US" sz="2000" dirty="0" smtClean="0"/>
+              <a:t>Testing Without a Server</a:t>
+            </a:r>
+          </a:p>
+          <a:p>
+            <a:r>
+              <a:rPr lang="en-US" sz="2000" dirty="0"/>
+              <a:t>Test API Key and Registration ID</a:t>
+            </a:r>
+          </a:p>
+          <a:p>
+            <a:r>
+              <a:rPr lang="en-US" sz="2000" dirty="0" smtClean="0"/>
+              <a:t>Additional Info and Questions</a:t>
+            </a:r>
+            <a:endParaRPr lang="en-US" sz="2000" dirty="0"/>
+          </a:p>
+        </p:txBody>
+      </p:sp>
+    </p:spTree>
+    <p:extLst>
+      <p:ext uri="{BB962C8B-B14F-4D97-AF65-F5344CB8AC3E}">
+        <p14:creationId xmlns:p14="http://schemas.microsoft.com/office/powerpoint/2010/main" val="3827468359"/>
+      </p:ext>
+    </p:extLst>
+  </p:cSld>
+  <p:clrMapOvr>
+    <a:masterClrMapping/>
+  </p:clrMapOvr>
+  <mc:AlternateContent xmlns:mc="http://schemas.openxmlformats.org/markup-compatibility/2006" xmlns:p14="http://schemas.microsoft.com/office/powerpoint/2010/main">
+    <mc:Choice Requires="p14">
+      <p:transition spd="slow" p14:dur="2000"/>
+    </mc:Choice>
+    <mc:Fallback xmlns="">
+      <p:transition spd="slow"/>
+    </mc:Fallback>
+  </mc:AlternateContent>
+  <p:timing>
+    <p:tnLst>
+      <p:par>
+        <p:cTn id="1" dur="indefinite" restart="never" nodeType="tmRoot"/>
+      </p:par>
+    </p:tnLst>
+  </p:timing>
+</p:sld>
+</file>
+
+<file path=ppt/slides/slide20.xml><?xml version="1.0" encoding="utf-8"?>
 <p:sld xmlns:a="http://schemas.openxmlformats.org/drawingml/2006/main" xmlns:r="http://schemas.openxmlformats.org/officeDocument/2006/relationships" xmlns:p="http://schemas.openxmlformats.org/presentationml/2006/main">
   <p:cSld>
     <p:spTree>
@@ -7860,7 +8216,7 @@
 </p:sld>
 </file>
 
-<file path=ppt/slides/slide2.xml><?xml version="1.0" encoding="utf-8"?>
+<file path=ppt/slides/slide21.xml><?xml version="1.0" encoding="utf-8"?>
 <p:sld xmlns:a="http://schemas.openxmlformats.org/drawingml/2006/main" xmlns:r="http://schemas.openxmlformats.org/officeDocument/2006/relationships" xmlns:p="http://schemas.openxmlformats.org/presentationml/2006/main">
   <p:cSld>
     <p:spTree>
@@ -7877,253 +8233,6 @@
           <a:chExt cx="0" cy="0"/>
         </a:xfrm>
       </p:grpSpPr>
-      <p:pic>
-        <p:nvPicPr>
-          <p:cNvPr id="3" name="Picture 2"/>
-          <p:cNvPicPr>
-            <a:picLocks noChangeAspect="1"/>
-          </p:cNvPicPr>
-          <p:nvPr/>
-        </p:nvPicPr>
-        <p:blipFill>
-          <a:blip r:embed="rId3">
-            <a:extLst>
-              <a:ext uri="{28A0092B-C50C-407E-A947-70E740481C1C}">
-                <a14:useLocalDpi xmlns:a14="http://schemas.microsoft.com/office/drawing/2010/main" val="0"/>
-              </a:ext>
-            </a:extLst>
-          </a:blip>
-          <a:stretch>
-            <a:fillRect/>
-          </a:stretch>
-        </p:blipFill>
-        <p:spPr>
-          <a:xfrm>
-            <a:off x="76200" y="3630"/>
-            <a:ext cx="9144000" cy="6858000"/>
-          </a:xfrm>
-          <a:prstGeom prst="rect">
-            <a:avLst/>
-          </a:prstGeom>
-        </p:spPr>
-      </p:pic>
-      <p:pic>
-        <p:nvPicPr>
-          <p:cNvPr id="1026" name="Picture 2"/>
-          <p:cNvPicPr>
-            <a:picLocks noChangeAspect="1" noChangeArrowheads="1"/>
-          </p:cNvPicPr>
-          <p:nvPr/>
-        </p:nvPicPr>
-        <p:blipFill>
-          <a:blip r:embed="rId4" cstate="print">
-            <a:extLst>
-              <a:ext uri="{28A0092B-C50C-407E-A947-70E740481C1C}">
-                <a14:useLocalDpi xmlns:a14="http://schemas.microsoft.com/office/drawing/2010/main" val="0"/>
-              </a:ext>
-            </a:extLst>
-          </a:blip>
-          <a:stretch>
-            <a:fillRect/>
-          </a:stretch>
-        </p:blipFill>
-        <p:spPr bwMode="auto">
-          <a:xfrm>
-            <a:off x="5943600" y="6248400"/>
-            <a:ext cx="3072900" cy="532272"/>
-          </a:xfrm>
-          <a:prstGeom prst="rect">
-            <a:avLst/>
-          </a:prstGeom>
-          <a:noFill/>
-          <a:extLst>
-            <a:ext uri="{909E8E84-426E-40dd-AFC4-6F175D3DCCD1}">
-              <a14:hiddenFill xmlns:a14="http://schemas.microsoft.com/office/drawing/2010/main" xmlns="">
-                <a:solidFill>
-                  <a:srgbClr val="FFFFFF"/>
-                </a:solidFill>
-              </a14:hiddenFill>
-            </a:ext>
-          </a:extLst>
-        </p:spPr>
-      </p:pic>
-      <p:sp>
-        <p:nvSpPr>
-          <p:cNvPr id="2" name="Title 1"/>
-          <p:cNvSpPr>
-            <a:spLocks noGrp="1"/>
-          </p:cNvSpPr>
-          <p:nvPr>
-            <p:ph type="title"/>
-          </p:nvPr>
-        </p:nvSpPr>
-        <p:spPr/>
-        <p:txBody>
-          <a:bodyPr/>
-          <a:lstStyle/>
-          <a:p>
-            <a:r>
-              <a:rPr lang="en-US" dirty="0" smtClean="0"/>
-              <a:t>Agenda</a:t>
-            </a:r>
-            <a:endParaRPr lang="en-US" dirty="0"/>
-          </a:p>
-        </p:txBody>
-      </p:sp>
-      <p:sp>
-        <p:nvSpPr>
-          <p:cNvPr id="6" name="Content Placeholder 5"/>
-          <p:cNvSpPr>
-            <a:spLocks noGrp="1"/>
-          </p:cNvSpPr>
-          <p:nvPr>
-            <p:ph idx="1"/>
-          </p:nvPr>
-        </p:nvSpPr>
-        <p:spPr/>
-        <p:txBody>
-          <a:bodyPr>
-            <a:normAutofit fontScale="92500" lnSpcReduction="10000"/>
-          </a:bodyPr>
-          <a:lstStyle/>
-          <a:p>
-            <a:r>
-              <a:rPr lang="en-US" sz="2000" dirty="0" smtClean="0"/>
-              <a:t>Introduction</a:t>
-            </a:r>
-          </a:p>
-          <a:p>
-            <a:r>
-              <a:rPr lang="en-US" sz="2000" dirty="0" smtClean="0"/>
-              <a:t>Prerequisites</a:t>
-            </a:r>
-          </a:p>
-          <a:p>
-            <a:r>
-              <a:rPr lang="en-US" sz="2000" dirty="0" smtClean="0"/>
-              <a:t>Set Up Google Play Services SDK</a:t>
-            </a:r>
-          </a:p>
-          <a:p>
-            <a:r>
-              <a:rPr lang="en-US" sz="2000" dirty="0" smtClean="0"/>
-              <a:t>Create Google API Project</a:t>
-            </a:r>
-          </a:p>
-          <a:p>
-            <a:r>
-              <a:rPr lang="en-US" sz="2000" dirty="0" smtClean="0"/>
-              <a:t>Add Google Play Services Library</a:t>
-            </a:r>
-          </a:p>
-          <a:p>
-            <a:r>
-              <a:rPr lang="en-US" sz="2000" dirty="0"/>
-              <a:t>Check for Google Play </a:t>
-            </a:r>
-            <a:r>
-              <a:rPr lang="en-US" sz="2000" dirty="0" smtClean="0"/>
-              <a:t>Services Availability</a:t>
-            </a:r>
-          </a:p>
-          <a:p>
-            <a:r>
-              <a:rPr lang="en-US" sz="2000" dirty="0" smtClean="0"/>
-              <a:t>Register Your App with GCM</a:t>
-            </a:r>
-          </a:p>
-          <a:p>
-            <a:r>
-              <a:rPr lang="en-US" sz="2000" dirty="0" smtClean="0"/>
-              <a:t>Implement Broadcast </a:t>
-            </a:r>
-            <a:r>
-              <a:rPr lang="en-US" sz="2000" dirty="0"/>
-              <a:t>Receiver and </a:t>
-            </a:r>
-            <a:r>
-              <a:rPr lang="en-US" sz="2000" dirty="0" smtClean="0"/>
-              <a:t>Intent Service</a:t>
-            </a:r>
-          </a:p>
-          <a:p>
-            <a:r>
-              <a:rPr lang="en-US" sz="2000" dirty="0" smtClean="0"/>
-              <a:t>Process Notification Data in Activity</a:t>
-            </a:r>
-          </a:p>
-          <a:p>
-            <a:r>
-              <a:rPr lang="en-US" sz="2000" dirty="0" smtClean="0"/>
-              <a:t>Update the App's Manifest</a:t>
-            </a:r>
-          </a:p>
-          <a:p>
-            <a:r>
-              <a:rPr lang="en-US" sz="2000" dirty="0" smtClean="0"/>
-              <a:t>Testing Without a Server</a:t>
-            </a:r>
-          </a:p>
-          <a:p>
-            <a:r>
-              <a:rPr lang="en-US" sz="2000" dirty="0"/>
-              <a:t>Test API Key and Registration ID</a:t>
-            </a:r>
-          </a:p>
-          <a:p>
-            <a:r>
-              <a:rPr lang="en-US" sz="2000" dirty="0" smtClean="0"/>
-              <a:t>Additional Info and Questions</a:t>
-            </a:r>
-            <a:endParaRPr lang="en-US" sz="2000" dirty="0"/>
-          </a:p>
-        </p:txBody>
-      </p:sp>
-    </p:spTree>
-    <p:extLst>
-      <p:ext uri="{BB962C8B-B14F-4D97-AF65-F5344CB8AC3E}">
-        <p14:creationId xmlns:p14="http://schemas.microsoft.com/office/powerpoint/2010/main" val="3827468359"/>
-      </p:ext>
-    </p:extLst>
-  </p:cSld>
-  <p:clrMapOvr>
-    <a:masterClrMapping/>
-  </p:clrMapOvr>
-  <mc:AlternateContent xmlns:mc="http://schemas.openxmlformats.org/markup-compatibility/2006" xmlns:p14="http://schemas.microsoft.com/office/powerpoint/2010/main">
-    <mc:Choice Requires="p14">
-      <p:transition spd="slow" p14:dur="2000"/>
-    </mc:Choice>
-    <mc:Fallback xmlns="">
-      <p:transition spd="slow"/>
-    </mc:Fallback>
-  </mc:AlternateContent>
-  <p:timing>
-    <p:tnLst>
-      <p:par>
-        <p:cTn id="1" dur="indefinite" restart="never" nodeType="tmRoot"/>
-      </p:par>
-    </p:tnLst>
-  </p:timing>
-</p:sld>
-</file>
-
-<file path=ppt/slides/slide20.xml><?xml version="1.0" encoding="utf-8"?>
-<p:sld xmlns:a="http://schemas.openxmlformats.org/drawingml/2006/main" xmlns:r="http://schemas.openxmlformats.org/officeDocument/2006/relationships" xmlns:p="http://schemas.openxmlformats.org/presentationml/2006/main">
-  <p:cSld>
-    <p:spTree>
-      <p:nvGrpSpPr>
-        <p:cNvPr id="1" name=""/>
-        <p:cNvGrpSpPr/>
-        <p:nvPr/>
-      </p:nvGrpSpPr>
-      <p:grpSpPr>
-        <a:xfrm>
-          <a:off x="0" y="0"/>
-          <a:ext cx="0" cy="0"/>
-          <a:chOff x="0" y="0"/>
-          <a:chExt cx="0" cy="0"/>
-        </a:xfrm>
-      </p:grpSpPr>
       <p:sp>
         <p:nvSpPr>
           <p:cNvPr id="2" name="Title 1"/>
@@ -8344,7 +8453,7 @@
 </p:sld>
 </file>
 
-<file path=ppt/slides/slide21.xml><?xml version="1.0" encoding="utf-8"?>
+<file path=ppt/slides/slide22.xml><?xml version="1.0" encoding="utf-8"?>
 <p:sld xmlns:a="http://schemas.openxmlformats.org/drawingml/2006/main" xmlns:r="http://schemas.openxmlformats.org/officeDocument/2006/relationships" xmlns:p="http://schemas.openxmlformats.org/presentationml/2006/main">
   <p:cSld>
     <p:spTree>
@@ -8489,7 +8598,7 @@
         <p:spPr/>
         <p:txBody>
           <a:bodyPr>
-            <a:normAutofit fontScale="92500" lnSpcReduction="10000"/>
+            <a:normAutofit/>
           </a:bodyPr>
           <a:lstStyle/>
           <a:p>
@@ -8557,8 +8666,12 @@
               <a:t> and M3. </a:t>
             </a:r>
             <a:r>
+              <a:rPr lang="en-US" sz="2000" dirty="0"/>
+              <a:t>Presented "Hybrid or Native - What Should Be Your Mobile Strategy and </a:t>
+            </a:r>
+            <a:r>
               <a:rPr lang="en-US" sz="2000" dirty="0" smtClean="0"/>
-              <a:t>Currently </a:t>
+              <a:t>Why" at M3. Currently </a:t>
             </a:r>
             <a:r>
               <a:rPr lang="en-US" sz="2000" dirty="0"/>
@@ -8568,30 +8681,7 @@
               <a:rPr lang="en-US" sz="2000" dirty="0" smtClean="0"/>
               <a:t>.</a:t>
             </a:r>
-          </a:p>
-          <a:p>
-            <a:r>
-              <a:rPr lang="en-US" sz="2400" dirty="0" smtClean="0"/>
-              <a:t>About </a:t>
-            </a:r>
-            <a:r>
-              <a:rPr lang="en-US" sz="2400" dirty="0"/>
-              <a:t>Leading EDJE</a:t>
-            </a:r>
-          </a:p>
-          <a:p>
-            <a:pPr lvl="1"/>
-            <a:r>
-              <a:rPr lang="en-US" sz="2000" dirty="0" smtClean="0"/>
-              <a:t>Creating </a:t>
-            </a:r>
-            <a:r>
-              <a:rPr lang="en-US" sz="2000" dirty="0"/>
-              <a:t>custom technology solutions while making the business world a “funner place to work”</a:t>
-            </a:r>
-          </a:p>
-          <a:p>
-            <a:endParaRPr lang="en-US" sz="2400" dirty="0"/>
+            <a:endParaRPr lang="en-US" sz="2000" dirty="0" smtClean="0"/>
           </a:p>
         </p:txBody>
       </p:sp>
@@ -8609,6 +8699,93 @@
 </file>
 
 <file path=ppt/slides/slide4.xml><?xml version="1.0" encoding="utf-8"?>
+<p:sld xmlns:a="http://schemas.openxmlformats.org/drawingml/2006/main" xmlns:r="http://schemas.openxmlformats.org/officeDocument/2006/relationships" xmlns:p="http://schemas.openxmlformats.org/presentationml/2006/main">
+  <p:cSld>
+    <p:spTree>
+      <p:nvGrpSpPr>
+        <p:cNvPr id="1" name=""/>
+        <p:cNvGrpSpPr/>
+        <p:nvPr/>
+      </p:nvGrpSpPr>
+      <p:grpSpPr>
+        <a:xfrm>
+          <a:off x="0" y="0"/>
+          <a:ext cx="0" cy="0"/>
+          <a:chOff x="0" y="0"/>
+          <a:chExt cx="0" cy="0"/>
+        </a:xfrm>
+      </p:grpSpPr>
+      <p:sp>
+        <p:nvSpPr>
+          <p:cNvPr id="2" name="Title 1"/>
+          <p:cNvSpPr>
+            <a:spLocks noGrp="1"/>
+          </p:cNvSpPr>
+          <p:nvPr>
+            <p:ph type="title"/>
+          </p:nvPr>
+        </p:nvSpPr>
+        <p:spPr/>
+        <p:txBody>
+          <a:bodyPr/>
+          <a:lstStyle/>
+          <a:p>
+            <a:r>
+              <a:rPr lang="en-US" dirty="0" smtClean="0"/>
+              <a:t>Introduction</a:t>
+            </a:r>
+            <a:endParaRPr lang="en-US" dirty="0"/>
+          </a:p>
+        </p:txBody>
+      </p:sp>
+      <p:sp>
+        <p:nvSpPr>
+          <p:cNvPr id="3" name="Content Placeholder 2"/>
+          <p:cNvSpPr>
+            <a:spLocks noGrp="1"/>
+          </p:cNvSpPr>
+          <p:nvPr>
+            <p:ph idx="1"/>
+          </p:nvPr>
+        </p:nvSpPr>
+        <p:spPr/>
+        <p:txBody>
+          <a:bodyPr>
+            <a:normAutofit lnSpcReduction="10000"/>
+          </a:bodyPr>
+          <a:lstStyle/>
+          <a:p>
+            <a:r>
+              <a:rPr lang="en-US" dirty="0"/>
+              <a:t>About Leading EDJE</a:t>
+            </a:r>
+          </a:p>
+          <a:p>
+            <a:pPr lvl="1"/>
+            <a:r>
+              <a:rPr lang="en-US" dirty="0"/>
+              <a:t>At Leading EDJE solving problems is our sweet spot!  We are an IT Consulting firm specializing in building custom application solutions utilizing leading edge technologies.  We have a unique culture which promotes high positive energy with an entrepreneurial spirit.  Our firm is made of exceptionally talented individuals who deliver exceptional results.  We choose to live our lives by making the right decisions as opposed to the "right now" ones.</a:t>
+            </a:r>
+          </a:p>
+          <a:p>
+            <a:endParaRPr lang="en-US" dirty="0"/>
+          </a:p>
+        </p:txBody>
+      </p:sp>
+    </p:spTree>
+    <p:extLst>
+      <p:ext uri="{BB962C8B-B14F-4D97-AF65-F5344CB8AC3E}">
+        <p14:creationId xmlns:p14="http://schemas.microsoft.com/office/powerpoint/2010/main" val="2658747591"/>
+      </p:ext>
+    </p:extLst>
+  </p:cSld>
+  <p:clrMapOvr>
+    <a:masterClrMapping/>
+  </p:clrMapOvr>
+</p:sld>
+</file>
+
+<file path=ppt/slides/slide5.xml><?xml version="1.0" encoding="utf-8"?>
 <p:sld xmlns:a="http://schemas.openxmlformats.org/drawingml/2006/main" xmlns:r="http://schemas.openxmlformats.org/officeDocument/2006/relationships" xmlns:p="http://schemas.openxmlformats.org/presentationml/2006/main">
   <p:cSld>
     <p:spTree>
@@ -8754,197 +8931,6 @@
 </p:sld>
 </file>
 
-<file path=ppt/slides/slide5.xml><?xml version="1.0" encoding="utf-8"?>
-<p:sld xmlns:a="http://schemas.openxmlformats.org/drawingml/2006/main" xmlns:r="http://schemas.openxmlformats.org/officeDocument/2006/relationships" xmlns:p="http://schemas.openxmlformats.org/presentationml/2006/main">
-  <p:cSld>
-    <p:spTree>
-      <p:nvGrpSpPr>
-        <p:cNvPr id="1" name=""/>
-        <p:cNvGrpSpPr/>
-        <p:nvPr/>
-      </p:nvGrpSpPr>
-      <p:grpSpPr>
-        <a:xfrm>
-          <a:off x="0" y="0"/>
-          <a:ext cx="0" cy="0"/>
-          <a:chOff x="0" y="0"/>
-          <a:chExt cx="0" cy="0"/>
-        </a:xfrm>
-      </p:grpSpPr>
-      <p:sp>
-        <p:nvSpPr>
-          <p:cNvPr id="2" name="Title 1"/>
-          <p:cNvSpPr>
-            <a:spLocks noGrp="1"/>
-          </p:cNvSpPr>
-          <p:nvPr>
-            <p:ph type="title"/>
-          </p:nvPr>
-        </p:nvSpPr>
-        <p:spPr/>
-        <p:txBody>
-          <a:bodyPr/>
-          <a:lstStyle/>
-          <a:p>
-            <a:r>
-              <a:rPr lang="en-US" dirty="0" smtClean="0"/>
-              <a:t>Prerequisites</a:t>
-            </a:r>
-            <a:endParaRPr lang="en-US" dirty="0"/>
-          </a:p>
-        </p:txBody>
-      </p:sp>
-      <p:sp>
-        <p:nvSpPr>
-          <p:cNvPr id="3" name="Content Placeholder 2"/>
-          <p:cNvSpPr>
-            <a:spLocks noGrp="1"/>
-          </p:cNvSpPr>
-          <p:nvPr>
-            <p:ph idx="1"/>
-          </p:nvPr>
-        </p:nvSpPr>
-        <p:spPr/>
-        <p:txBody>
-          <a:bodyPr>
-            <a:normAutofit fontScale="85000" lnSpcReduction="20000"/>
-          </a:bodyPr>
-          <a:lstStyle/>
-          <a:p>
-            <a:r>
-              <a:rPr lang="en-US" sz="2800" dirty="0" smtClean="0"/>
-              <a:t>Development</a:t>
-            </a:r>
-          </a:p>
-          <a:p>
-            <a:pPr lvl="1"/>
-            <a:r>
-              <a:rPr lang="en-US" sz="2400" dirty="0" smtClean="0"/>
-              <a:t>Google account to create Google API project</a:t>
-            </a:r>
-          </a:p>
-          <a:p>
-            <a:pPr lvl="1"/>
-            <a:r>
-              <a:rPr lang="en-US" sz="2400" dirty="0" smtClean="0"/>
-              <a:t>Android development environment</a:t>
-            </a:r>
-          </a:p>
-          <a:p>
-            <a:pPr lvl="2"/>
-            <a:r>
-              <a:rPr lang="en-US" sz="2000" dirty="0" smtClean="0"/>
-              <a:t>Android SDK: </a:t>
-            </a:r>
-            <a:r>
-              <a:rPr lang="en-US" sz="2000" dirty="0"/>
-              <a:t>http://developer.android.com/sdk/index.html</a:t>
-            </a:r>
-          </a:p>
-          <a:p>
-            <a:pPr lvl="2"/>
-            <a:r>
-              <a:rPr lang="en-US" sz="2000" dirty="0" smtClean="0"/>
-              <a:t>IDE</a:t>
-            </a:r>
-          </a:p>
-          <a:p>
-            <a:pPr lvl="3"/>
-            <a:r>
-              <a:rPr lang="en-US" sz="1600" dirty="0"/>
-              <a:t>Eclipse: http://eclipse.org/downloads/</a:t>
-            </a:r>
-            <a:endParaRPr lang="en-US" sz="1600" dirty="0" smtClean="0"/>
-          </a:p>
-          <a:p>
-            <a:pPr lvl="3"/>
-            <a:r>
-              <a:rPr lang="en-US" sz="1600" dirty="0" err="1" smtClean="0"/>
-              <a:t>IntelliJ</a:t>
-            </a:r>
-            <a:r>
-              <a:rPr lang="en-US" sz="1600" dirty="0"/>
-              <a:t> IDEA: http://www.jetbrains.com/idea/</a:t>
-            </a:r>
-            <a:endParaRPr lang="en-US" sz="1600" dirty="0" smtClean="0"/>
-          </a:p>
-          <a:p>
-            <a:pPr lvl="3"/>
-            <a:r>
-              <a:rPr lang="en-US" sz="1600" dirty="0"/>
-              <a:t>Android Studio: https://developer.android.com/sdk/installing/studio.html</a:t>
-            </a:r>
-            <a:endParaRPr lang="en-US" sz="1600" dirty="0" smtClean="0"/>
-          </a:p>
-          <a:p>
-            <a:pPr lvl="1"/>
-            <a:r>
-              <a:rPr lang="en-US" sz="2400" dirty="0" smtClean="0"/>
-              <a:t>Google Play services SDK</a:t>
-            </a:r>
-          </a:p>
-          <a:p>
-            <a:pPr lvl="2"/>
-            <a:r>
-              <a:rPr lang="en-US" sz="2000" dirty="0"/>
-              <a:t>Required to use the GoogleCloudMessaging </a:t>
-            </a:r>
-            <a:r>
-              <a:rPr lang="en-US" sz="2000" dirty="0" smtClean="0"/>
-              <a:t>methods</a:t>
-            </a:r>
-          </a:p>
-          <a:p>
-            <a:r>
-              <a:rPr lang="en-US" sz="2800" dirty="0" smtClean="0"/>
-              <a:t>Test</a:t>
-            </a:r>
-          </a:p>
-          <a:p>
-            <a:pPr lvl="1"/>
-            <a:r>
-              <a:rPr lang="en-US" sz="2400" dirty="0" smtClean="0"/>
-              <a:t>Compatible </a:t>
-            </a:r>
-            <a:r>
-              <a:rPr lang="en-US" sz="2400" dirty="0"/>
-              <a:t>Android device that runs Android 2.3 or higher and includes Google Play </a:t>
-            </a:r>
-            <a:r>
-              <a:rPr lang="en-US" sz="2400" dirty="0" smtClean="0"/>
-              <a:t>Store</a:t>
-            </a:r>
-          </a:p>
-          <a:p>
-            <a:pPr lvl="1"/>
-            <a:r>
-              <a:rPr lang="en-US" sz="2400" dirty="0" smtClean="0"/>
-              <a:t>Android </a:t>
-            </a:r>
-            <a:r>
-              <a:rPr lang="en-US" sz="2400" dirty="0"/>
-              <a:t>emulator with an AVD that runs the Google APIs platform based on Android 4.2.2 or higher</a:t>
-            </a:r>
-            <a:endParaRPr lang="en-US" sz="2400" dirty="0" smtClean="0"/>
-          </a:p>
-          <a:p>
-            <a:endParaRPr lang="en-US" sz="2800" dirty="0"/>
-          </a:p>
-        </p:txBody>
-      </p:sp>
-    </p:spTree>
-    <p:extLst>
-      <p:ext uri="{BB962C8B-B14F-4D97-AF65-F5344CB8AC3E}">
-        <p14:creationId xmlns:p14="http://schemas.microsoft.com/office/powerpoint/2010/main" val="1827219439"/>
-      </p:ext>
-    </p:extLst>
-  </p:cSld>
-  <p:clrMapOvr>
-    <a:masterClrMapping/>
-  </p:clrMapOvr>
-</p:sld>
-</file>
-
 <file path=ppt/slides/slide6.xml><?xml version="1.0" encoding="utf-8"?>
 <p:sld xmlns:a="http://schemas.openxmlformats.org/drawingml/2006/main" xmlns:r="http://schemas.openxmlformats.org/officeDocument/2006/relationships" xmlns:p="http://schemas.openxmlformats.org/presentationml/2006/main">
   <p:cSld>
@@ -8974,97 +8960,179 @@
         </p:nvSpPr>
         <p:spPr/>
         <p:txBody>
+          <a:bodyPr/>
+          <a:lstStyle/>
+          <a:p>
+            <a:r>
+              <a:rPr lang="en-US" dirty="0" smtClean="0"/>
+              <a:t>Prerequisites</a:t>
+            </a:r>
+            <a:endParaRPr lang="en-US" dirty="0"/>
+          </a:p>
+        </p:txBody>
+      </p:sp>
+      <p:sp>
+        <p:nvSpPr>
+          <p:cNvPr id="3" name="Content Placeholder 2"/>
+          <p:cNvSpPr>
+            <a:spLocks noGrp="1"/>
+          </p:cNvSpPr>
+          <p:nvPr>
+            <p:ph idx="1"/>
+          </p:nvPr>
+        </p:nvSpPr>
+        <p:spPr/>
+        <p:txBody>
           <a:bodyPr>
-            <a:normAutofit/>
+            <a:normAutofit fontScale="85000" lnSpcReduction="20000"/>
           </a:bodyPr>
           <a:lstStyle/>
           <a:p>
             <a:r>
-              <a:rPr lang="en-US" dirty="0"/>
-              <a:t>Set Up Google Play Services </a:t>
-            </a:r>
-            <a:r>
-              <a:rPr lang="en-US" dirty="0" smtClean="0"/>
-              <a:t>SDK</a:t>
-            </a:r>
-            <a:endParaRPr lang="en-US" dirty="0"/>
-          </a:p>
-        </p:txBody>
-      </p:sp>
-      <p:sp>
-        <p:nvSpPr>
-          <p:cNvPr id="3" name="Content Placeholder 2"/>
-          <p:cNvSpPr>
-            <a:spLocks noGrp="1"/>
-          </p:cNvSpPr>
-          <p:nvPr>
-            <p:ph idx="1"/>
-          </p:nvPr>
-        </p:nvSpPr>
-        <p:spPr/>
-        <p:txBody>
-          <a:bodyPr/>
-          <a:lstStyle/>
-          <a:p>
-            <a:r>
-              <a:rPr lang="en-US" dirty="0" smtClean="0"/>
-              <a:t>Start the Android SDK Manager</a:t>
-            </a:r>
-          </a:p>
-          <a:p>
-            <a:r>
-              <a:rPr lang="en-US" dirty="0" smtClean="0"/>
-              <a:t>Install the Google Play services SDK</a:t>
-            </a:r>
-          </a:p>
-          <a:p>
-            <a:r>
-              <a:rPr lang="en-US" dirty="0" smtClean="0"/>
-              <a:t>To test on emulator</a:t>
+              <a:rPr lang="en-US" sz="2800" dirty="0" smtClean="0"/>
+              <a:t>Development</a:t>
             </a:r>
           </a:p>
           <a:p>
             <a:pPr lvl="1"/>
             <a:r>
-              <a:rPr lang="en-US" dirty="0" smtClean="0"/>
-              <a:t>Expand platform for API 19 or higher</a:t>
+              <a:rPr lang="en-US" sz="2400" dirty="0" smtClean="0"/>
+              <a:t>Google account to create Google API project</a:t>
             </a:r>
           </a:p>
           <a:p>
             <a:pPr lvl="1"/>
             <a:r>
-              <a:rPr lang="en-US" dirty="0" smtClean="0"/>
-              <a:t>Install Google APIs (x86 System Image)</a:t>
-            </a:r>
+              <a:rPr lang="en-US" sz="2400" dirty="0" smtClean="0"/>
+              <a:t>Android development environment</a:t>
+            </a:r>
+          </a:p>
+          <a:p>
+            <a:pPr lvl="2"/>
+            <a:r>
+              <a:rPr lang="en-US" sz="2000" dirty="0" smtClean="0"/>
+              <a:t>Android SDK: </a:t>
+            </a:r>
+            <a:r>
+              <a:rPr lang="en-US" sz="2000" dirty="0"/>
+              <a:t>http://developer.android.com/sdk/index.html</a:t>
+            </a:r>
+          </a:p>
+          <a:p>
+            <a:pPr lvl="2"/>
+            <a:r>
+              <a:rPr lang="en-US" sz="2000" dirty="0" smtClean="0"/>
+              <a:t>IDE</a:t>
+            </a:r>
+          </a:p>
+          <a:p>
+            <a:pPr lvl="3"/>
+            <a:r>
+              <a:rPr lang="en-US" sz="1600" dirty="0"/>
+              <a:t>Eclipse: http://eclipse.org/downloads/</a:t>
+            </a:r>
+            <a:endParaRPr lang="en-US" sz="1600" dirty="0" smtClean="0"/>
+          </a:p>
+          <a:p>
+            <a:pPr lvl="3"/>
+            <a:r>
+              <a:rPr lang="en-US" sz="1600" dirty="0" err="1" smtClean="0"/>
+              <a:t>IntelliJ</a:t>
+            </a:r>
+            <a:r>
+              <a:rPr lang="en-US" sz="1600" dirty="0"/>
+              <a:t> </a:t>
+            </a:r>
+            <a:r>
+              <a:rPr lang="en-US" sz="1600" dirty="0" smtClean="0"/>
+              <a:t>IDEA 14: </a:t>
+            </a:r>
+            <a:r>
+              <a:rPr lang="en-US" sz="1600" dirty="0"/>
+              <a:t>http://www.jetbrains.com/idea/</a:t>
+            </a:r>
+            <a:endParaRPr lang="en-US" sz="1600" dirty="0" smtClean="0"/>
+          </a:p>
+          <a:p>
+            <a:pPr lvl="3"/>
+            <a:r>
+              <a:rPr lang="en-US" sz="1600" dirty="0"/>
+              <a:t>Android </a:t>
+            </a:r>
+            <a:r>
+              <a:rPr lang="en-US" sz="1600" dirty="0" smtClean="0"/>
+              <a:t>Studio 1.0</a:t>
+            </a:r>
+            <a:r>
+              <a:rPr lang="en-US" sz="1600" dirty="0"/>
+              <a:t>: http://developer.android.com/sdk/index.html</a:t>
+            </a:r>
+            <a:endParaRPr lang="en-US" sz="1600" dirty="0" smtClean="0"/>
           </a:p>
           <a:p>
             <a:pPr lvl="1"/>
             <a:r>
-              <a:rPr lang="en-US" dirty="0" smtClean="0"/>
-              <a:t>Create </a:t>
-            </a:r>
-            <a:r>
-              <a:rPr lang="en-US" dirty="0"/>
-              <a:t>a new AVD with Google APIs as the platform </a:t>
-            </a:r>
-            <a:r>
-              <a:rPr lang="en-US" dirty="0" smtClean="0"/>
-              <a:t>target</a:t>
-            </a:r>
-          </a:p>
-          <a:p>
-            <a:r>
-              <a:rPr lang="en-US" dirty="0" smtClean="0"/>
-              <a:t>DEMO</a:t>
-            </a:r>
-            <a:endParaRPr lang="en-US" dirty="0"/>
+              <a:rPr lang="en-US" sz="2400" dirty="0" smtClean="0"/>
+              <a:t>Google Play services SDK</a:t>
+            </a:r>
+          </a:p>
+          <a:p>
+            <a:pPr lvl="2"/>
+            <a:r>
+              <a:rPr lang="en-US" sz="2000" dirty="0" smtClean="0"/>
+              <a:t>Required </a:t>
+            </a:r>
+            <a:r>
+              <a:rPr lang="en-US" sz="2000" dirty="0"/>
+              <a:t>to use the GoogleCloudMessaging </a:t>
+            </a:r>
+            <a:r>
+              <a:rPr lang="en-US" sz="2000" dirty="0" smtClean="0"/>
+              <a:t>methods</a:t>
+            </a:r>
+          </a:p>
+          <a:p>
+            <a:r>
+              <a:rPr lang="en-US" sz="2800" dirty="0" smtClean="0"/>
+              <a:t>Test</a:t>
+            </a:r>
+          </a:p>
+          <a:p>
+            <a:pPr lvl="1"/>
+            <a:r>
+              <a:rPr lang="en-US" sz="2400" dirty="0" smtClean="0"/>
+              <a:t>Compatible </a:t>
+            </a:r>
+            <a:r>
+              <a:rPr lang="en-US" sz="2400" dirty="0"/>
+              <a:t>Android device that runs Android 2.3 or higher and includes Google Play </a:t>
+            </a:r>
+            <a:r>
+              <a:rPr lang="en-US" sz="2400" dirty="0" smtClean="0"/>
+              <a:t>Store</a:t>
+            </a:r>
+          </a:p>
+          <a:p>
+            <a:pPr lvl="1"/>
+            <a:r>
+              <a:rPr lang="en-US" sz="2400" dirty="0" smtClean="0"/>
+              <a:t>Android </a:t>
+            </a:r>
+            <a:r>
+              <a:rPr lang="en-US" sz="2400" dirty="0"/>
+              <a:t>emulator with an AVD that runs the Google APIs platform based on Android 4.2.2 or higher</a:t>
+            </a:r>
+            <a:endParaRPr lang="en-US" sz="2400" dirty="0" smtClean="0"/>
+          </a:p>
+          <a:p>
+            <a:endParaRPr lang="en-US" sz="2800" dirty="0"/>
           </a:p>
         </p:txBody>
       </p:sp>
     </p:spTree>
     <p:extLst>
       <p:ext uri="{BB962C8B-B14F-4D97-AF65-F5344CB8AC3E}">
-        <p14:creationId xmlns:p14="http://schemas.microsoft.com/office/powerpoint/2010/main" val="707280565"/>
+        <p14:creationId xmlns:p14="http://schemas.microsoft.com/office/powerpoint/2010/main" val="1827219439"/>
       </p:ext>
     </p:extLst>
   </p:cSld>
@@ -9103,116 +9171,97 @@
         </p:nvSpPr>
         <p:spPr/>
         <p:txBody>
-          <a:bodyPr/>
-          <a:lstStyle/>
-          <a:p>
-            <a:r>
-              <a:rPr lang="en-US" dirty="0" smtClean="0"/>
-              <a:t>Create Google API Project</a:t>
-            </a:r>
-            <a:endParaRPr lang="en-US" dirty="0"/>
-          </a:p>
-        </p:txBody>
-      </p:sp>
-      <p:sp>
-        <p:nvSpPr>
-          <p:cNvPr id="3" name="Content Placeholder 2"/>
-          <p:cNvSpPr>
-            <a:spLocks noGrp="1"/>
-          </p:cNvSpPr>
-          <p:nvPr>
-            <p:ph idx="1"/>
-          </p:nvPr>
-        </p:nvSpPr>
-        <p:spPr/>
-        <p:txBody>
           <a:bodyPr>
             <a:normAutofit/>
           </a:bodyPr>
           <a:lstStyle/>
           <a:p>
             <a:r>
-              <a:rPr lang="en-US" sz="2800" dirty="0" smtClean="0"/>
-              <a:t>Open the Google Developers Console</a:t>
+              <a:rPr lang="en-US" dirty="0"/>
+              <a:t>Set Up Google Play Services </a:t>
+            </a:r>
+            <a:r>
+              <a:rPr lang="en-US" dirty="0" smtClean="0"/>
+              <a:t>SDK</a:t>
+            </a:r>
+            <a:endParaRPr lang="en-US" dirty="0"/>
+          </a:p>
+        </p:txBody>
+      </p:sp>
+      <p:sp>
+        <p:nvSpPr>
+          <p:cNvPr id="3" name="Content Placeholder 2"/>
+          <p:cNvSpPr>
+            <a:spLocks noGrp="1"/>
+          </p:cNvSpPr>
+          <p:nvPr>
+            <p:ph idx="1"/>
+          </p:nvPr>
+        </p:nvSpPr>
+        <p:spPr/>
+        <p:txBody>
+          <a:bodyPr/>
+          <a:lstStyle/>
+          <a:p>
+            <a:r>
+              <a:rPr lang="en-US" dirty="0" smtClean="0"/>
+              <a:t>Start the Android SDK Manager</a:t>
+            </a:r>
+          </a:p>
+          <a:p>
+            <a:r>
+              <a:rPr lang="en-US" dirty="0" smtClean="0"/>
+              <a:t>Install the Google Play services SDK</a:t>
+            </a:r>
+          </a:p>
+          <a:p>
+            <a:r>
+              <a:rPr lang="en-US" dirty="0" smtClean="0"/>
+              <a:t>To test on emulator</a:t>
             </a:r>
           </a:p>
           <a:p>
             <a:pPr lvl="1"/>
             <a:r>
-              <a:rPr lang="en-US" sz="2400" dirty="0"/>
-              <a:t>https://cloud.google.com/</a:t>
-            </a:r>
-            <a:r>
-              <a:rPr lang="en-US" sz="2400" dirty="0" smtClean="0"/>
-              <a:t>console</a:t>
+              <a:rPr lang="en-US" dirty="0" smtClean="0"/>
+              <a:t>Expand platform for API 19 or higher</a:t>
             </a:r>
           </a:p>
           <a:p>
             <a:pPr lvl="1"/>
             <a:r>
-              <a:rPr lang="en-US" sz="2400" dirty="0" smtClean="0"/>
-              <a:t>Click Create Project</a:t>
+              <a:rPr lang="en-US" dirty="0" smtClean="0"/>
+              <a:t>Install Google APIs (x86 System Image)</a:t>
             </a:r>
           </a:p>
           <a:p>
             <a:pPr lvl="1"/>
             <a:r>
-              <a:rPr lang="en-US" sz="2400" dirty="0" smtClean="0"/>
-              <a:t>Enter the project’s name and ID</a:t>
-            </a:r>
-          </a:p>
-          <a:p>
-            <a:pPr lvl="1"/>
-            <a:r>
-              <a:rPr lang="en-US" sz="2400" b="1" dirty="0" smtClean="0">
-                <a:solidFill>
-                  <a:srgbClr val="800000"/>
-                </a:solidFill>
-              </a:rPr>
-              <a:t>IMPORTANT:</a:t>
-            </a:r>
-            <a:r>
-              <a:rPr lang="en-US" sz="2400" dirty="0" smtClean="0"/>
-              <a:t> Note the project number, used later as GCM sender ID inside app when registering with GCM</a:t>
-            </a:r>
-          </a:p>
-          <a:p>
-            <a:r>
-              <a:rPr lang="en-US" sz="2800" dirty="0" smtClean="0"/>
-              <a:t>Enable the GCM service</a:t>
-            </a:r>
-          </a:p>
-          <a:p>
-            <a:pPr lvl="1"/>
-            <a:r>
-              <a:rPr lang="en-US" sz="2400" dirty="0" smtClean="0"/>
-              <a:t>Expand APIs &amp; auth in left sidebar and click on APIs</a:t>
-            </a:r>
-          </a:p>
-          <a:p>
-            <a:pPr lvl="1"/>
-            <a:r>
-              <a:rPr lang="en-US" sz="2400" dirty="0"/>
-              <a:t>Scroll down to Google Cloud Messaging for </a:t>
-            </a:r>
-            <a:r>
-              <a:rPr lang="en-US" sz="2400" dirty="0" smtClean="0"/>
-              <a:t>Android and turn it on</a:t>
-            </a:r>
-          </a:p>
-          <a:p>
-            <a:pPr lvl="1"/>
-            <a:endParaRPr lang="en-US" sz="2400" dirty="0" smtClean="0"/>
-          </a:p>
-          <a:p>
-            <a:endParaRPr lang="en-US" sz="2800" dirty="0"/>
+              <a:rPr lang="en-US" dirty="0" smtClean="0"/>
+              <a:t>Create </a:t>
+            </a:r>
+            <a:r>
+              <a:rPr lang="en-US" dirty="0"/>
+              <a:t>a new AVD with Google APIs as the platform </a:t>
+            </a:r>
+            <a:r>
+              <a:rPr lang="en-US" dirty="0" smtClean="0"/>
+              <a:t>target</a:t>
+            </a:r>
+          </a:p>
+          <a:p>
+            <a:r>
+              <a:rPr lang="en-US" dirty="0" smtClean="0"/>
+              <a:t>DEMO</a:t>
+            </a:r>
+            <a:endParaRPr lang="en-US" dirty="0"/>
           </a:p>
         </p:txBody>
       </p:sp>
     </p:spTree>
     <p:extLst>
       <p:ext uri="{BB962C8B-B14F-4D97-AF65-F5344CB8AC3E}">
-        <p14:creationId xmlns:p14="http://schemas.microsoft.com/office/powerpoint/2010/main" val="4033455311"/>
+        <p14:creationId xmlns:p14="http://schemas.microsoft.com/office/powerpoint/2010/main" val="707280565"/>
       </p:ext>
     </p:extLst>
   </p:cSld>
@@ -9275,94 +9324,97 @@
         <p:spPr/>
         <p:txBody>
           <a:bodyPr>
-            <a:normAutofit fontScale="92500" lnSpcReduction="10000"/>
+            <a:normAutofit/>
           </a:bodyPr>
           <a:lstStyle/>
           <a:p>
             <a:r>
-              <a:rPr lang="en-US" dirty="0"/>
-              <a:t>Obtain the </a:t>
-            </a:r>
-            <a:r>
-              <a:rPr lang="en-US" dirty="0" smtClean="0"/>
-              <a:t>Server API </a:t>
-            </a:r>
-            <a:r>
-              <a:rPr lang="en-US" dirty="0"/>
-              <a:t>key</a:t>
+              <a:rPr lang="en-US" sz="2800" dirty="0" smtClean="0"/>
+              <a:t>Open the Google Developers Console</a:t>
             </a:r>
           </a:p>
           <a:p>
             <a:pPr lvl="1"/>
             <a:r>
-              <a:rPr lang="en-US" dirty="0"/>
-              <a:t>Click Credentials under APIs &amp; auth in left sidebar</a:t>
-            </a:r>
+              <a:rPr lang="en-US" sz="2400" dirty="0">
+                <a:hlinkClick r:id="rId2"/>
+              </a:rPr>
+              <a:t>https://cloud.google.com/</a:t>
+            </a:r>
+            <a:r>
+              <a:rPr lang="en-US" sz="2400" dirty="0" smtClean="0">
+                <a:hlinkClick r:id="rId2"/>
+              </a:rPr>
+              <a:t>console</a:t>
+            </a:r>
+            <a:endParaRPr lang="en-US" sz="2400" dirty="0" smtClean="0"/>
           </a:p>
           <a:p>
             <a:pPr lvl="1"/>
             <a:r>
-              <a:rPr lang="en-US" dirty="0"/>
-              <a:t>Under Public API access, click Create </a:t>
-            </a:r>
-            <a:r>
-              <a:rPr lang="en-US" dirty="0" smtClean="0"/>
-              <a:t>new </a:t>
-            </a:r>
-            <a:r>
-              <a:rPr lang="en-US" dirty="0"/>
-              <a:t>Key</a:t>
+              <a:rPr lang="en-US" sz="2400" dirty="0" smtClean="0"/>
+              <a:t>Click Create Project</a:t>
             </a:r>
           </a:p>
           <a:p>
             <a:pPr lvl="1"/>
             <a:r>
-              <a:rPr lang="en-US" dirty="0"/>
-              <a:t>In Create a new key dialog, click Server </a:t>
-            </a:r>
-            <a:r>
-              <a:rPr lang="en-US" dirty="0" smtClean="0"/>
-              <a:t>key</a:t>
+              <a:rPr lang="en-US" sz="2400" dirty="0" smtClean="0"/>
+              <a:t>Enter the project’s name and ID</a:t>
             </a:r>
           </a:p>
           <a:p>
             <a:pPr lvl="1"/>
             <a:r>
-              <a:rPr lang="en-US" dirty="0" smtClean="0"/>
-              <a:t>In Create a server key and configure allowed IPs dialog, leave entry box blank and click Create</a:t>
-            </a:r>
-          </a:p>
-          <a:p>
-            <a:pPr lvl="1"/>
-            <a:r>
-              <a:rPr lang="en-US" b="1" dirty="0" smtClean="0">
+              <a:rPr lang="en-US" sz="2400" b="1" dirty="0" smtClean="0">
                 <a:solidFill>
                   <a:srgbClr val="800000"/>
                 </a:solidFill>
               </a:rPr>
-              <a:t>IMPORTANT: </a:t>
-            </a:r>
-            <a:r>
-              <a:rPr lang="en-US" dirty="0" smtClean="0"/>
-              <a:t>Note the API KEY, used by server as authorization key in HTTP Authorization header when posting notification messages</a:t>
-            </a:r>
-          </a:p>
-          <a:p>
-            <a:r>
-              <a:rPr lang="en-US" dirty="0" smtClean="0"/>
-              <a:t>DEMO</a:t>
-            </a:r>
-            <a:endParaRPr lang="en-US" dirty="0"/>
-          </a:p>
-          <a:p>
-            <a:endParaRPr lang="en-US" dirty="0"/>
+              <a:t>IMPORTANT:</a:t>
+            </a:r>
+            <a:r>
+              <a:rPr lang="en-US" sz="2400" dirty="0" smtClean="0"/>
+              <a:t> Note the project number, used later as GCM sender ID inside app when registering with GCM</a:t>
+            </a:r>
+          </a:p>
+          <a:p>
+            <a:r>
+              <a:rPr lang="en-US" sz="2800" dirty="0" smtClean="0"/>
+              <a:t>Enable the GCM service</a:t>
+            </a:r>
+          </a:p>
+          <a:p>
+            <a:pPr lvl="1"/>
+            <a:r>
+              <a:rPr lang="en-US" sz="2400" dirty="0" smtClean="0"/>
+              <a:t>Expand APIs &amp; auth in left sidebar and click on APIs</a:t>
+            </a:r>
+          </a:p>
+          <a:p>
+            <a:pPr lvl="1"/>
+            <a:r>
+              <a:rPr lang="en-US" sz="2400" dirty="0"/>
+              <a:t>Scroll down to Google Cloud Messaging for </a:t>
+            </a:r>
+            <a:r>
+              <a:rPr lang="en-US" sz="2400" dirty="0" smtClean="0"/>
+              <a:t>Android and turn it on</a:t>
+            </a:r>
+          </a:p>
+          <a:p>
+            <a:pPr lvl="1"/>
+            <a:endParaRPr lang="en-US" sz="2400" dirty="0" smtClean="0"/>
+          </a:p>
+          <a:p>
+            <a:endParaRPr lang="en-US" sz="2800" dirty="0"/>
           </a:p>
         </p:txBody>
       </p:sp>
     </p:spTree>
     <p:extLst>
       <p:ext uri="{BB962C8B-B14F-4D97-AF65-F5344CB8AC3E}">
-        <p14:creationId xmlns:p14="http://schemas.microsoft.com/office/powerpoint/2010/main" val="2396239310"/>
+        <p14:creationId xmlns:p14="http://schemas.microsoft.com/office/powerpoint/2010/main" val="4033455311"/>
       </p:ext>
     </p:extLst>
   </p:cSld>
@@ -9401,76 +9453,118 @@
         </p:nvSpPr>
         <p:spPr/>
         <p:txBody>
+          <a:bodyPr/>
+          <a:lstStyle/>
+          <a:p>
+            <a:r>
+              <a:rPr lang="en-US" dirty="0" smtClean="0"/>
+              <a:t>Create Google API Project</a:t>
+            </a:r>
+            <a:endParaRPr lang="en-US" dirty="0"/>
+          </a:p>
+        </p:txBody>
+      </p:sp>
+      <p:sp>
+        <p:nvSpPr>
+          <p:cNvPr id="3" name="Content Placeholder 2"/>
+          <p:cNvSpPr>
+            <a:spLocks noGrp="1"/>
+          </p:cNvSpPr>
+          <p:nvPr>
+            <p:ph idx="1"/>
+          </p:nvPr>
+        </p:nvSpPr>
+        <p:spPr/>
+        <p:txBody>
           <a:bodyPr>
-            <a:normAutofit/>
+            <a:normAutofit fontScale="92500" lnSpcReduction="10000"/>
           </a:bodyPr>
           <a:lstStyle/>
           <a:p>
             <a:r>
-              <a:rPr lang="en-US" sz="3600" dirty="0" smtClean="0"/>
-              <a:t>Add Google Play Services Library - Eclipse</a:t>
-            </a:r>
-            <a:endParaRPr lang="en-US" sz="3600" dirty="0"/>
-          </a:p>
-        </p:txBody>
-      </p:sp>
-      <p:sp>
-        <p:nvSpPr>
-          <p:cNvPr id="3" name="Content Placeholder 2"/>
-          <p:cNvSpPr>
-            <a:spLocks noGrp="1"/>
-          </p:cNvSpPr>
-          <p:nvPr>
-            <p:ph idx="1"/>
-          </p:nvPr>
-        </p:nvSpPr>
-        <p:spPr/>
-        <p:txBody>
-          <a:bodyPr>
-            <a:normAutofit/>
-          </a:bodyPr>
-          <a:lstStyle/>
-          <a:p>
-            <a:r>
-              <a:rPr lang="en-US" sz="2800" dirty="0" smtClean="0"/>
-              <a:t>Copy library project </a:t>
-            </a:r>
-            <a:r>
-              <a:rPr lang="en-US" sz="2800" dirty="0"/>
-              <a:t>from &lt;android-sdk&gt;/extras/google/google_play_services/libproject/google-play-services_lib</a:t>
-            </a:r>
-            <a:r>
-              <a:rPr lang="en-US" sz="2800" dirty="0" smtClean="0"/>
-              <a:t>/ to your Android app project directory</a:t>
-            </a:r>
-          </a:p>
-          <a:p>
-            <a:r>
-              <a:rPr lang="en-US" sz="2800" dirty="0" smtClean="0"/>
-              <a:t>Import library project into your Eclipse workspace</a:t>
+              <a:rPr lang="en-US" dirty="0"/>
+              <a:t>Obtain the </a:t>
+            </a:r>
+            <a:r>
+              <a:rPr lang="en-US" dirty="0" smtClean="0"/>
+              <a:t>Server API </a:t>
+            </a:r>
+            <a:r>
+              <a:rPr lang="en-US" dirty="0"/>
+              <a:t>key</a:t>
             </a:r>
           </a:p>
           <a:p>
             <a:pPr lvl="1"/>
             <a:r>
-              <a:rPr lang="en-US" sz="2400" dirty="0"/>
-              <a:t>Click File &gt; Import, select Android &gt; Existing Android Code into Workspace, and browse to the copy of the library project to import </a:t>
-            </a:r>
-            <a:r>
-              <a:rPr lang="en-US" sz="2400" dirty="0" smtClean="0"/>
-              <a:t>it</a:t>
-            </a:r>
-            <a:endParaRPr lang="en-US" dirty="0" smtClean="0"/>
-          </a:p>
-          <a:p>
-            <a:endParaRPr lang="en-US" sz="2800" dirty="0"/>
+              <a:rPr lang="en-US" dirty="0"/>
+              <a:t>Click Credentials under APIs &amp; auth in left sidebar</a:t>
+            </a:r>
+          </a:p>
+          <a:p>
+            <a:pPr lvl="1"/>
+            <a:r>
+              <a:rPr lang="en-US" dirty="0"/>
+              <a:t>Under Public API access, click Create </a:t>
+            </a:r>
+            <a:r>
+              <a:rPr lang="en-US" dirty="0" smtClean="0"/>
+              <a:t>new </a:t>
+            </a:r>
+            <a:r>
+              <a:rPr lang="en-US" dirty="0"/>
+              <a:t>Key</a:t>
+            </a:r>
+          </a:p>
+          <a:p>
+            <a:pPr lvl="1"/>
+            <a:r>
+              <a:rPr lang="en-US" dirty="0"/>
+              <a:t>In Create a new key dialog, click Server </a:t>
+            </a:r>
+            <a:r>
+              <a:rPr lang="en-US" dirty="0" smtClean="0"/>
+              <a:t>key</a:t>
+            </a:r>
+          </a:p>
+          <a:p>
+            <a:pPr lvl="1"/>
+            <a:r>
+              <a:rPr lang="en-US" dirty="0" smtClean="0"/>
+              <a:t>In Create a server key and configure allowed IPs dialog, leave entry box blank and click Create</a:t>
+            </a:r>
+          </a:p>
+          <a:p>
+            <a:pPr lvl="1"/>
+            <a:r>
+              <a:rPr lang="en-US" b="1" dirty="0" smtClean="0">
+                <a:solidFill>
+                  <a:srgbClr val="800000"/>
+                </a:solidFill>
+              </a:rPr>
+              <a:t>IMPORTANT: </a:t>
+            </a:r>
+            <a:r>
+              <a:rPr lang="en-US" dirty="0" smtClean="0"/>
+              <a:t>Note the API KEY, used by server as authorization key in HTTP Authorization header when posting notification messages</a:t>
+            </a:r>
+          </a:p>
+          <a:p>
+            <a:r>
+              <a:rPr lang="en-US" dirty="0" smtClean="0"/>
+              <a:t>DEMO</a:t>
+            </a:r>
+            <a:endParaRPr lang="en-US" dirty="0"/>
+          </a:p>
+          <a:p>
+            <a:endParaRPr lang="en-US" dirty="0"/>
           </a:p>
         </p:txBody>
       </p:sp>
     </p:spTree>
     <p:extLst>
       <p:ext uri="{BB962C8B-B14F-4D97-AF65-F5344CB8AC3E}">
-        <p14:creationId xmlns:p14="http://schemas.microsoft.com/office/powerpoint/2010/main" val="2482566287"/>
+        <p14:creationId xmlns:p14="http://schemas.microsoft.com/office/powerpoint/2010/main" val="2396239310"/>
       </p:ext>
     </p:extLst>
   </p:cSld>

</xml_diff>

<commit_message>
Upgraded appcompat library and play services library
</commit_message>
<xml_diff>
--- a/Implementing Push Notification in Android.pptx
+++ b/Implementing Push Notification in Android.pptx
@@ -5,10 +5,10 @@
     <p:sldMasterId id="2147483648" r:id="rId1"/>
   </p:sldMasterIdLst>
   <p:notesMasterIdLst>
-    <p:notesMasterId r:id="rId24"/>
+    <p:notesMasterId r:id="rId25"/>
   </p:notesMasterIdLst>
   <p:handoutMasterIdLst>
-    <p:handoutMasterId r:id="rId25"/>
+    <p:handoutMasterId r:id="rId26"/>
   </p:handoutMasterIdLst>
   <p:sldIdLst>
     <p:sldId id="257" r:id="rId2"/>
@@ -25,14 +25,15 @@
     <p:sldId id="277" r:id="rId13"/>
     <p:sldId id="276" r:id="rId14"/>
     <p:sldId id="270" r:id="rId15"/>
-    <p:sldId id="271" r:id="rId16"/>
-    <p:sldId id="273" r:id="rId17"/>
-    <p:sldId id="275" r:id="rId18"/>
-    <p:sldId id="269" r:id="rId19"/>
-    <p:sldId id="274" r:id="rId20"/>
-    <p:sldId id="272" r:id="rId21"/>
-    <p:sldId id="259" r:id="rId22"/>
-    <p:sldId id="278" r:id="rId23"/>
+    <p:sldId id="280" r:id="rId16"/>
+    <p:sldId id="271" r:id="rId17"/>
+    <p:sldId id="273" r:id="rId18"/>
+    <p:sldId id="275" r:id="rId19"/>
+    <p:sldId id="269" r:id="rId20"/>
+    <p:sldId id="274" r:id="rId21"/>
+    <p:sldId id="272" r:id="rId22"/>
+    <p:sldId id="259" r:id="rId23"/>
+    <p:sldId id="278" r:id="rId24"/>
   </p:sldIdLst>
   <p:sldSz cx="9144000" cy="6858000" type="screen4x3"/>
   <p:notesSz cx="6858000" cy="9144000"/>
@@ -4498,10 +4499,16 @@
               <a:t>    compile </a:t>
             </a:r>
             <a:r>
+              <a:rPr lang="en-US" sz="1200" b="1" dirty="0" smtClean="0">
+                <a:latin typeface="Courier"/>
+              </a:rPr>
+              <a:t>'com.android.support:appcompat-v7:21.+'</a:t>
+            </a:r>
+            <a:r>
               <a:rPr lang="en-US" sz="1200" b="1" dirty="0">
                 <a:latin typeface="Courier"/>
               </a:rPr>
-              <a:t>'com.android.support:appcompat-v7:20.+'</a:t>
+              <a:t/>
             </a:r>
             <a:br>
               <a:rPr lang="en-US" sz="1200" b="1" dirty="0">
@@ -4515,16 +4522,22 @@
               <a:t>    </a:t>
             </a:r>
             <a:r>
-              <a:rPr lang="en-US" sz="1200" dirty="0">
+              <a:rPr lang="en-US" sz="1200">
                 <a:latin typeface="Courier"/>
               </a:rPr>
               <a:t>compile </a:t>
             </a:r>
             <a:r>
+              <a:rPr lang="en-US" sz="1200" b="1" smtClean="0">
+                <a:latin typeface="Courier"/>
+              </a:rPr>
+              <a:t>'com.google.android.gms:play-services:6.1+'</a:t>
+            </a:r>
+            <a:r>
               <a:rPr lang="en-US" sz="1200" b="1" dirty="0">
                 <a:latin typeface="Courier"/>
               </a:rPr>
-              <a:t>'com.google.android.gms:play-services:5.+'</a:t>
+              <a:t/>
             </a:r>
             <a:br>
               <a:rPr lang="en-US" sz="1200" b="1" dirty="0">
@@ -5404,103 +5417,75 @@
           <a:p>
             <a:r>
               <a:rPr lang="en-US" dirty="0" smtClean="0"/>
-              <a:t>Register with GCM</a:t>
+              <a:t>Check for Google Play Services</a:t>
             </a:r>
             <a:endParaRPr lang="en-US" dirty="0"/>
           </a:p>
         </p:txBody>
       </p:sp>
-      <p:sp>
-        <p:nvSpPr>
-          <p:cNvPr id="3" name="Content Placeholder 2"/>
-          <p:cNvSpPr>
-            <a:spLocks noGrp="1"/>
-          </p:cNvSpPr>
+      <p:pic>
+        <p:nvPicPr>
+          <p:cNvPr id="4" name="Content Placeholder 3"/>
+          <p:cNvPicPr>
+            <a:picLocks noGrp="1" noChangeAspect="1"/>
+          </p:cNvPicPr>
           <p:nvPr>
             <p:ph idx="1"/>
           </p:nvPr>
-        </p:nvSpPr>
-        <p:spPr/>
-        <p:txBody>
-          <a:bodyPr>
-            <a:normAutofit lnSpcReduction="10000"/>
-          </a:bodyPr>
-          <a:lstStyle/>
-          <a:p>
-            <a:r>
-              <a:rPr lang="en-US" sz="2800" dirty="0" smtClean="0"/>
-              <a:t>App must </a:t>
-            </a:r>
-            <a:r>
-              <a:rPr lang="en-US" sz="2800" dirty="0"/>
-              <a:t>register </a:t>
-            </a:r>
-            <a:r>
-              <a:rPr lang="en-US" sz="2800" dirty="0" smtClean="0"/>
-              <a:t>with GCM before </a:t>
-            </a:r>
-            <a:r>
-              <a:rPr lang="en-US" sz="2800" dirty="0"/>
-              <a:t>it can receive </a:t>
-            </a:r>
-            <a:r>
-              <a:rPr lang="en-US" sz="2800" dirty="0" smtClean="0"/>
-              <a:t>messages</a:t>
-            </a:r>
-          </a:p>
-          <a:p>
-            <a:pPr lvl="1"/>
-            <a:r>
-              <a:rPr lang="en-US" sz="2400" dirty="0" smtClean="0"/>
-              <a:t>Must be done on background thread because GCM register() method blocks</a:t>
-            </a:r>
-          </a:p>
-          <a:p>
-            <a:r>
-              <a:rPr lang="en-US" sz="2800" dirty="0" smtClean="0"/>
-              <a:t>Receives registration ID from GCM</a:t>
-            </a:r>
-          </a:p>
-          <a:p>
-            <a:pPr lvl="1"/>
-            <a:r>
-              <a:rPr lang="en-US" sz="2400" dirty="0" smtClean="0"/>
-              <a:t>Used by server to send notifications to that device</a:t>
-            </a:r>
-          </a:p>
-          <a:p>
-            <a:r>
-              <a:rPr lang="en-US" sz="2800" dirty="0" smtClean="0"/>
-              <a:t>Registration ID stored by app</a:t>
-            </a:r>
-          </a:p>
-          <a:p>
-            <a:pPr lvl="1"/>
-            <a:r>
-              <a:rPr lang="en-US" sz="2400" dirty="0" smtClean="0"/>
-              <a:t>Allows registration to be skipped if ID is still valid</a:t>
-            </a:r>
-          </a:p>
-          <a:p>
-            <a:pPr lvl="1"/>
-            <a:r>
-              <a:rPr lang="en-US" sz="2400" dirty="0" smtClean="0"/>
-              <a:t>Typically inside shared preferences</a:t>
-            </a:r>
-          </a:p>
-          <a:p>
-            <a:r>
-              <a:rPr lang="en-US" sz="2800" dirty="0" smtClean="0"/>
-              <a:t>Code walkthrough</a:t>
-            </a:r>
-            <a:endParaRPr lang="en-US" sz="2800" dirty="0"/>
-          </a:p>
-        </p:txBody>
-      </p:sp>
+        </p:nvPicPr>
+        <p:blipFill>
+          <a:blip r:embed="rId2" cstate="print">
+            <a:extLst>
+              <a:ext uri="{28A0092B-C50C-407E-A947-70E740481C1C}">
+                <a14:useLocalDpi xmlns:a14="http://schemas.microsoft.com/office/drawing/2010/main" val="0"/>
+              </a:ext>
+            </a:extLst>
+          </a:blip>
+          <a:stretch>
+            <a:fillRect/>
+          </a:stretch>
+        </p:blipFill>
+        <p:spPr>
+          <a:xfrm>
+            <a:off x="1600200" y="1600200"/>
+            <a:ext cx="2711040" cy="4525963"/>
+          </a:xfrm>
+        </p:spPr>
+      </p:pic>
+      <p:pic>
+        <p:nvPicPr>
+          <p:cNvPr id="5" name="Picture 4"/>
+          <p:cNvPicPr>
+            <a:picLocks noChangeAspect="1"/>
+          </p:cNvPicPr>
+          <p:nvPr/>
+        </p:nvPicPr>
+        <p:blipFill>
+          <a:blip r:embed="rId3" cstate="print">
+            <a:extLst>
+              <a:ext uri="{28A0092B-C50C-407E-A947-70E740481C1C}">
+                <a14:useLocalDpi xmlns:a14="http://schemas.microsoft.com/office/drawing/2010/main" val="0"/>
+              </a:ext>
+            </a:extLst>
+          </a:blip>
+          <a:stretch>
+            <a:fillRect/>
+          </a:stretch>
+        </p:blipFill>
+        <p:spPr>
+          <a:xfrm>
+            <a:off x="4800600" y="1600200"/>
+            <a:ext cx="2714442" cy="4525963"/>
+          </a:xfrm>
+          <a:prstGeom prst="rect">
+            <a:avLst/>
+          </a:prstGeom>
+        </p:spPr>
+      </p:pic>
     </p:spTree>
     <p:extLst>
       <p:ext uri="{BB962C8B-B14F-4D97-AF65-F5344CB8AC3E}">
-        <p14:creationId xmlns:p14="http://schemas.microsoft.com/office/powerpoint/2010/main" val="361619516"/>
+        <p14:creationId xmlns:p14="http://schemas.microsoft.com/office/powerpoint/2010/main" val="3882006213"/>
       </p:ext>
     </p:extLst>
   </p:cSld>
@@ -5539,14 +5524,12 @@
         </p:nvSpPr>
         <p:spPr/>
         <p:txBody>
-          <a:bodyPr>
-            <a:normAutofit fontScale="90000"/>
-          </a:bodyPr>
+          <a:bodyPr/>
           <a:lstStyle/>
           <a:p>
             <a:r>
               <a:rPr lang="en-US" dirty="0" smtClean="0"/>
-              <a:t>Implement Broadcast Receiver and Intent Service</a:t>
+              <a:t>Register with GCM</a:t>
             </a:r>
             <a:endParaRPr lang="en-US" dirty="0"/>
           </a:p>
@@ -5570,72 +5553,79 @@
           <a:lstStyle/>
           <a:p>
             <a:r>
-              <a:rPr lang="en-US" dirty="0" smtClean="0"/>
-              <a:t>Broadcast Receiver</a:t>
+              <a:rPr lang="en-US" sz="2800" dirty="0" smtClean="0"/>
+              <a:t>App must </a:t>
+            </a:r>
+            <a:r>
+              <a:rPr lang="en-US" sz="2800" dirty="0"/>
+              <a:t>register </a:t>
+            </a:r>
+            <a:r>
+              <a:rPr lang="en-US" sz="2800" dirty="0" smtClean="0"/>
+              <a:t>with GCM before </a:t>
+            </a:r>
+            <a:r>
+              <a:rPr lang="en-US" sz="2800" dirty="0"/>
+              <a:t>it can receive </a:t>
+            </a:r>
+            <a:r>
+              <a:rPr lang="en-US" sz="2800" dirty="0" smtClean="0"/>
+              <a:t>messages</a:t>
             </a:r>
           </a:p>
           <a:p>
             <a:pPr lvl="1"/>
             <a:r>
-              <a:rPr lang="en-US" dirty="0" smtClean="0"/>
-              <a:t>Extends WakefulBroadcastReceiver</a:t>
+              <a:rPr lang="en-US" sz="2400" dirty="0" smtClean="0"/>
+              <a:t>Must be done on background thread because GCM register() method blocks</a:t>
+            </a:r>
+          </a:p>
+          <a:p>
+            <a:r>
+              <a:rPr lang="en-US" sz="2800" dirty="0" smtClean="0"/>
+              <a:t>Receives registration ID from GCM</a:t>
             </a:r>
           </a:p>
           <a:p>
             <a:pPr lvl="1"/>
             <a:r>
-              <a:rPr lang="en-US" dirty="0" smtClean="0"/>
-              <a:t>Override onReceive() to receive notification and start intent service to handle notification</a:t>
-            </a:r>
-          </a:p>
-          <a:p>
-            <a:r>
-              <a:rPr lang="en-US" dirty="0" smtClean="0"/>
-              <a:t>Intent Service</a:t>
+              <a:rPr lang="en-US" sz="2400" dirty="0" smtClean="0"/>
+              <a:t>Used by server to send notifications to that device</a:t>
+            </a:r>
+          </a:p>
+          <a:p>
+            <a:r>
+              <a:rPr lang="en-US" sz="2800" dirty="0" smtClean="0"/>
+              <a:t>Registration ID stored by app</a:t>
             </a:r>
           </a:p>
           <a:p>
             <a:pPr lvl="1"/>
             <a:r>
-              <a:rPr lang="en-US" dirty="0" smtClean="0"/>
-              <a:t>Extends IntentService</a:t>
+              <a:rPr lang="en-US" sz="2400" dirty="0" smtClean="0"/>
+              <a:t>Allows registration to be skipped if ID is still valid</a:t>
             </a:r>
           </a:p>
           <a:p>
             <a:pPr lvl="1"/>
             <a:r>
-              <a:rPr lang="en-US" dirty="0" smtClean="0"/>
-              <a:t>Override onHandleIntent() to process notification</a:t>
-            </a:r>
-          </a:p>
-          <a:p>
-            <a:pPr lvl="1"/>
-            <a:r>
-              <a:rPr lang="en-US" b="1" dirty="0" smtClean="0">
-                <a:solidFill>
-                  <a:srgbClr val="800000"/>
-                </a:solidFill>
-              </a:rPr>
-              <a:t>IMPORTANT: </a:t>
-            </a:r>
-            <a:r>
-              <a:rPr lang="en-US" dirty="0" smtClean="0"/>
-              <a:t>Release wake lock when done</a:t>
-            </a:r>
-          </a:p>
-          <a:p>
-            <a:r>
-              <a:rPr lang="en-US" dirty="0" smtClean="0"/>
+              <a:rPr lang="en-US" sz="2400" dirty="0" smtClean="0"/>
+              <a:t>Typically inside shared preferences</a:t>
+            </a:r>
+          </a:p>
+          <a:p>
+            <a:r>
+              <a:rPr lang="en-US" sz="2800" dirty="0" smtClean="0"/>
               <a:t>Code walkthrough</a:t>
             </a:r>
-            <a:endParaRPr lang="en-US" dirty="0"/>
+            <a:endParaRPr lang="en-US" sz="2800" dirty="0"/>
           </a:p>
         </p:txBody>
       </p:sp>
     </p:spTree>
     <p:extLst>
       <p:ext uri="{BB962C8B-B14F-4D97-AF65-F5344CB8AC3E}">
-        <p14:creationId xmlns:p14="http://schemas.microsoft.com/office/powerpoint/2010/main" val="2368302692"/>
+        <p14:creationId xmlns:p14="http://schemas.microsoft.com/office/powerpoint/2010/main" val="361619516"/>
       </p:ext>
     </p:extLst>
   </p:cSld>
@@ -5681,7 +5671,7 @@
           <a:p>
             <a:r>
               <a:rPr lang="en-US" dirty="0" smtClean="0"/>
-              <a:t>Process Notification Data in Activity</a:t>
+              <a:t>Implement Broadcast Receiver and Intent Service</a:t>
             </a:r>
             <a:endParaRPr lang="en-US" dirty="0"/>
           </a:p>
@@ -5699,53 +5689,69 @@
         </p:nvSpPr>
         <p:spPr/>
         <p:txBody>
-          <a:bodyPr/>
+          <a:bodyPr>
+            <a:normAutofit lnSpcReduction="10000"/>
+          </a:bodyPr>
           <a:lstStyle/>
           <a:p>
             <a:r>
               <a:rPr lang="en-US" dirty="0" smtClean="0"/>
-              <a:t>Store data inside Intent extras</a:t>
-            </a:r>
-          </a:p>
-          <a:p>
+              <a:t>Broadcast Receiver</a:t>
+            </a:r>
+          </a:p>
+          <a:p>
+            <a:pPr lvl="1"/>
             <a:r>
               <a:rPr lang="en-US" dirty="0" smtClean="0"/>
-              <a:t>Process data in two places</a:t>
+              <a:t>Extends WakefulBroadcastReceiver</a:t>
             </a:r>
           </a:p>
           <a:p>
             <a:pPr lvl="1"/>
             <a:r>
               <a:rPr lang="en-US" dirty="0" smtClean="0"/>
-              <a:t>onCreate() if activity was destroyed / recreated</a:t>
+              <a:t>Override onReceive() to receive notification and start intent service to handle notification</a:t>
+            </a:r>
+          </a:p>
+          <a:p>
+            <a:r>
+              <a:rPr lang="en-US" dirty="0" smtClean="0"/>
+              <a:t>Intent Service</a:t>
             </a:r>
           </a:p>
           <a:p>
             <a:pPr lvl="1"/>
             <a:r>
               <a:rPr lang="en-US" dirty="0" smtClean="0"/>
-              <a:t>onNewIntent() if activity still exists</a:t>
-            </a:r>
-          </a:p>
-          <a:p>
-            <a:pPr lvl="2"/>
+              <a:t>Extends IntentService</a:t>
+            </a:r>
+          </a:p>
+          <a:p>
+            <a:pPr lvl="1"/>
             <a:r>
               <a:rPr lang="en-US" dirty="0" smtClean="0"/>
-              <a:t>Requires Intent to </a:t>
-            </a:r>
-            <a:r>
-              <a:rPr lang="en-US" dirty="0"/>
-              <a:t>have </a:t>
+              <a:t>Override onHandleIntent() to process notification</a:t>
+            </a:r>
+          </a:p>
+          <a:p>
+            <a:pPr lvl="1"/>
+            <a:r>
+              <a:rPr lang="en-US" b="1" dirty="0" smtClean="0">
+                <a:solidFill>
+                  <a:srgbClr val="800000"/>
+                </a:solidFill>
+              </a:rPr>
+              <a:t>IMPORTANT: </a:t>
             </a:r>
             <a:r>
               <a:rPr lang="en-US" dirty="0" smtClean="0"/>
-              <a:t>FLAG_ACTIVITY_SINGLE_TOP flag to be set</a:t>
+              <a:t>Release wake lock when done</a:t>
             </a:r>
           </a:p>
           <a:p>
             <a:r>
               <a:rPr lang="en-US" dirty="0" smtClean="0"/>
-              <a:t> Code walkthrough</a:t>
+              <a:t>Code walkthrough</a:t>
             </a:r>
             <a:endParaRPr lang="en-US" dirty="0"/>
           </a:p>
@@ -5754,7 +5760,7 @@
     </p:spTree>
     <p:extLst>
       <p:ext uri="{BB962C8B-B14F-4D97-AF65-F5344CB8AC3E}">
-        <p14:creationId xmlns:p14="http://schemas.microsoft.com/office/powerpoint/2010/main" val="504142742"/>
+        <p14:creationId xmlns:p14="http://schemas.microsoft.com/office/powerpoint/2010/main" val="2368302692"/>
       </p:ext>
     </p:extLst>
   </p:cSld>
@@ -5793,6 +5799,125 @@
         </p:nvSpPr>
         <p:spPr/>
         <p:txBody>
+          <a:bodyPr>
+            <a:normAutofit fontScale="90000"/>
+          </a:bodyPr>
+          <a:lstStyle/>
+          <a:p>
+            <a:r>
+              <a:rPr lang="en-US" dirty="0" smtClean="0"/>
+              <a:t>Process Notification Data in Activity</a:t>
+            </a:r>
+            <a:endParaRPr lang="en-US" dirty="0"/>
+          </a:p>
+        </p:txBody>
+      </p:sp>
+      <p:sp>
+        <p:nvSpPr>
+          <p:cNvPr id="3" name="Content Placeholder 2"/>
+          <p:cNvSpPr>
+            <a:spLocks noGrp="1"/>
+          </p:cNvSpPr>
+          <p:nvPr>
+            <p:ph idx="1"/>
+          </p:nvPr>
+        </p:nvSpPr>
+        <p:spPr/>
+        <p:txBody>
+          <a:bodyPr/>
+          <a:lstStyle/>
+          <a:p>
+            <a:r>
+              <a:rPr lang="en-US" dirty="0" smtClean="0"/>
+              <a:t>Store data inside Intent extras</a:t>
+            </a:r>
+          </a:p>
+          <a:p>
+            <a:r>
+              <a:rPr lang="en-US" dirty="0" smtClean="0"/>
+              <a:t>Process data in two places</a:t>
+            </a:r>
+          </a:p>
+          <a:p>
+            <a:pPr lvl="1"/>
+            <a:r>
+              <a:rPr lang="en-US" dirty="0" smtClean="0"/>
+              <a:t>onCreate() if activity was destroyed / recreated</a:t>
+            </a:r>
+          </a:p>
+          <a:p>
+            <a:pPr lvl="1"/>
+            <a:r>
+              <a:rPr lang="en-US" dirty="0" smtClean="0"/>
+              <a:t>onNewIntent() if activity still exists</a:t>
+            </a:r>
+          </a:p>
+          <a:p>
+            <a:pPr lvl="2"/>
+            <a:r>
+              <a:rPr lang="en-US" dirty="0" smtClean="0"/>
+              <a:t>Requires Intent to </a:t>
+            </a:r>
+            <a:r>
+              <a:rPr lang="en-US" dirty="0"/>
+              <a:t>have </a:t>
+            </a:r>
+            <a:r>
+              <a:rPr lang="en-US" dirty="0" smtClean="0"/>
+              <a:t>FLAG_ACTIVITY_SINGLE_TOP flag to be set</a:t>
+            </a:r>
+          </a:p>
+          <a:p>
+            <a:r>
+              <a:rPr lang="en-US" dirty="0" smtClean="0"/>
+              <a:t> Code walkthrough</a:t>
+            </a:r>
+            <a:endParaRPr lang="en-US" dirty="0"/>
+          </a:p>
+        </p:txBody>
+      </p:sp>
+    </p:spTree>
+    <p:extLst>
+      <p:ext uri="{BB962C8B-B14F-4D97-AF65-F5344CB8AC3E}">
+        <p14:creationId xmlns:p14="http://schemas.microsoft.com/office/powerpoint/2010/main" val="504142742"/>
+      </p:ext>
+    </p:extLst>
+  </p:cSld>
+  <p:clrMapOvr>
+    <a:masterClrMapping/>
+  </p:clrMapOvr>
+</p:sld>
+</file>
+
+<file path=ppt/slides/slide19.xml><?xml version="1.0" encoding="utf-8"?>
+<p:sld xmlns:a="http://schemas.openxmlformats.org/drawingml/2006/main" xmlns:r="http://schemas.openxmlformats.org/officeDocument/2006/relationships" xmlns:p="http://schemas.openxmlformats.org/presentationml/2006/main">
+  <p:cSld>
+    <p:spTree>
+      <p:nvGrpSpPr>
+        <p:cNvPr id="1" name=""/>
+        <p:cNvGrpSpPr/>
+        <p:nvPr/>
+      </p:nvGrpSpPr>
+      <p:grpSpPr>
+        <a:xfrm>
+          <a:off x="0" y="0"/>
+          <a:ext cx="0" cy="0"/>
+          <a:chOff x="0" y="0"/>
+          <a:chExt cx="0" cy="0"/>
+        </a:xfrm>
+      </p:grpSpPr>
+      <p:sp>
+        <p:nvSpPr>
+          <p:cNvPr id="2" name="Title 1"/>
+          <p:cNvSpPr>
+            <a:spLocks noGrp="1"/>
+          </p:cNvSpPr>
+          <p:nvPr>
+            <p:ph type="title"/>
+          </p:nvPr>
+        </p:nvSpPr>
+        <p:spPr/>
+        <p:txBody>
           <a:bodyPr/>
           <a:lstStyle/>
           <a:p>
@@ -5864,7 +5989,7 @@
         </p:nvGraphicFramePr>
         <p:xfrm>
           <a:off x="304800" y="1981200"/>
-          <a:ext cx="8610600" cy="2082544"/>
+          <a:ext cx="8610600" cy="1877262"/>
         </p:xfrm>
         <a:graphic>
           <a:graphicData uri="http://schemas.openxmlformats.org/drawingml/2006/table">
@@ -6867,134 +6992,6 @@
 </p:sld>
 </file>
 
-<file path=ppt/slides/slide19.xml><?xml version="1.0" encoding="utf-8"?>
-<p:sld xmlns:a="http://schemas.openxmlformats.org/drawingml/2006/main" xmlns:r="http://schemas.openxmlformats.org/officeDocument/2006/relationships" xmlns:p="http://schemas.openxmlformats.org/presentationml/2006/main">
-  <p:cSld>
-    <p:spTree>
-      <p:nvGrpSpPr>
-        <p:cNvPr id="1" name=""/>
-        <p:cNvGrpSpPr/>
-        <p:nvPr/>
-      </p:nvGrpSpPr>
-      <p:grpSpPr>
-        <a:xfrm>
-          <a:off x="0" y="0"/>
-          <a:ext cx="0" cy="0"/>
-          <a:chOff x="0" y="0"/>
-          <a:chExt cx="0" cy="0"/>
-        </a:xfrm>
-      </p:grpSpPr>
-      <p:sp>
-        <p:nvSpPr>
-          <p:cNvPr id="2" name="Title 1"/>
-          <p:cNvSpPr>
-            <a:spLocks noGrp="1"/>
-          </p:cNvSpPr>
-          <p:nvPr>
-            <p:ph type="title"/>
-          </p:nvPr>
-        </p:nvSpPr>
-        <p:spPr/>
-        <p:txBody>
-          <a:bodyPr/>
-          <a:lstStyle/>
-          <a:p>
-            <a:r>
-              <a:rPr lang="en-US" dirty="0" smtClean="0"/>
-              <a:t>Testing Without a Server</a:t>
-            </a:r>
-            <a:endParaRPr lang="en-US" dirty="0"/>
-          </a:p>
-        </p:txBody>
-      </p:sp>
-      <p:sp>
-        <p:nvSpPr>
-          <p:cNvPr id="3" name="Content Placeholder 2"/>
-          <p:cNvSpPr>
-            <a:spLocks noGrp="1"/>
-          </p:cNvSpPr>
-          <p:nvPr>
-            <p:ph idx="1"/>
-          </p:nvPr>
-        </p:nvSpPr>
-        <p:spPr/>
-        <p:txBody>
-          <a:bodyPr/>
-          <a:lstStyle/>
-          <a:p>
-            <a:r>
-              <a:rPr lang="en-US" dirty="0" smtClean="0"/>
-              <a:t>Server implementation not required</a:t>
-            </a:r>
-          </a:p>
-          <a:p>
-            <a:r>
-              <a:rPr lang="en-US" dirty="0" smtClean="0"/>
-              <a:t>Any tool capable of sending HTTPS POST requests will work</a:t>
-            </a:r>
-          </a:p>
-          <a:p>
-            <a:pPr lvl="1"/>
-            <a:r>
-              <a:rPr lang="en-US" dirty="0" smtClean="0"/>
-              <a:t>Examples:</a:t>
-            </a:r>
-          </a:p>
-          <a:p>
-            <a:pPr lvl="2"/>
-            <a:r>
-              <a:rPr lang="en-US" dirty="0" smtClean="0"/>
-              <a:t>curl</a:t>
-            </a:r>
-          </a:p>
-          <a:p>
-            <a:pPr lvl="2"/>
-            <a:r>
-              <a:rPr lang="en-US" dirty="0"/>
-              <a:t>Hurl.it -</a:t>
-            </a:r>
-            <a:r>
-              <a:rPr lang="en-US" dirty="0" smtClean="0"/>
-              <a:t> http</a:t>
-            </a:r>
-            <a:r>
-              <a:rPr lang="en-US" dirty="0"/>
-              <a:t>://www.hurl.it</a:t>
-            </a:r>
-            <a:r>
-              <a:rPr lang="en-US" dirty="0" smtClean="0"/>
-              <a:t>/</a:t>
-            </a:r>
-          </a:p>
-          <a:p>
-            <a:pPr lvl="2"/>
-            <a:r>
-              <a:rPr lang="en-US" dirty="0" smtClean="0"/>
-              <a:t>Dev HTTP Client  - Google Chrome App</a:t>
-            </a:r>
-          </a:p>
-          <a:p>
-            <a:pPr lvl="2"/>
-            <a:endParaRPr lang="en-US" dirty="0" smtClean="0"/>
-          </a:p>
-          <a:p>
-            <a:endParaRPr lang="en-US" dirty="0"/>
-          </a:p>
-        </p:txBody>
-      </p:sp>
-    </p:spTree>
-    <p:extLst>
-      <p:ext uri="{BB962C8B-B14F-4D97-AF65-F5344CB8AC3E}">
-        <p14:creationId xmlns:p14="http://schemas.microsoft.com/office/powerpoint/2010/main" val="327509647"/>
-      </p:ext>
-    </p:extLst>
-  </p:cSld>
-  <p:clrMapOvr>
-    <a:masterClrMapping/>
-  </p:clrMapOvr>
-</p:sld>
-</file>
-
 <file path=ppt/slides/slide2.xml><?xml version="1.0" encoding="utf-8"?>
 <p:sld xmlns:a="http://schemas.openxmlformats.org/drawingml/2006/main" xmlns:r="http://schemas.openxmlformats.org/officeDocument/2006/relationships" xmlns:p="http://schemas.openxmlformats.org/presentationml/2006/main">
   <p:cSld>
@@ -7243,6 +7240,134 @@
 </file>
 
 <file path=ppt/slides/slide20.xml><?xml version="1.0" encoding="utf-8"?>
+<p:sld xmlns:a="http://schemas.openxmlformats.org/drawingml/2006/main" xmlns:r="http://schemas.openxmlformats.org/officeDocument/2006/relationships" xmlns:p="http://schemas.openxmlformats.org/presentationml/2006/main">
+  <p:cSld>
+    <p:spTree>
+      <p:nvGrpSpPr>
+        <p:cNvPr id="1" name=""/>
+        <p:cNvGrpSpPr/>
+        <p:nvPr/>
+      </p:nvGrpSpPr>
+      <p:grpSpPr>
+        <a:xfrm>
+          <a:off x="0" y="0"/>
+          <a:ext cx="0" cy="0"/>
+          <a:chOff x="0" y="0"/>
+          <a:chExt cx="0" cy="0"/>
+        </a:xfrm>
+      </p:grpSpPr>
+      <p:sp>
+        <p:nvSpPr>
+          <p:cNvPr id="2" name="Title 1"/>
+          <p:cNvSpPr>
+            <a:spLocks noGrp="1"/>
+          </p:cNvSpPr>
+          <p:nvPr>
+            <p:ph type="title"/>
+          </p:nvPr>
+        </p:nvSpPr>
+        <p:spPr/>
+        <p:txBody>
+          <a:bodyPr/>
+          <a:lstStyle/>
+          <a:p>
+            <a:r>
+              <a:rPr lang="en-US" dirty="0" smtClean="0"/>
+              <a:t>Testing Without a Server</a:t>
+            </a:r>
+            <a:endParaRPr lang="en-US" dirty="0"/>
+          </a:p>
+        </p:txBody>
+      </p:sp>
+      <p:sp>
+        <p:nvSpPr>
+          <p:cNvPr id="3" name="Content Placeholder 2"/>
+          <p:cNvSpPr>
+            <a:spLocks noGrp="1"/>
+          </p:cNvSpPr>
+          <p:nvPr>
+            <p:ph idx="1"/>
+          </p:nvPr>
+        </p:nvSpPr>
+        <p:spPr/>
+        <p:txBody>
+          <a:bodyPr/>
+          <a:lstStyle/>
+          <a:p>
+            <a:r>
+              <a:rPr lang="en-US" dirty="0" smtClean="0"/>
+              <a:t>Server implementation not required</a:t>
+            </a:r>
+          </a:p>
+          <a:p>
+            <a:r>
+              <a:rPr lang="en-US" dirty="0" smtClean="0"/>
+              <a:t>Any tool capable of sending HTTPS POST requests will work</a:t>
+            </a:r>
+          </a:p>
+          <a:p>
+            <a:pPr lvl="1"/>
+            <a:r>
+              <a:rPr lang="en-US" dirty="0" smtClean="0"/>
+              <a:t>Examples:</a:t>
+            </a:r>
+          </a:p>
+          <a:p>
+            <a:pPr lvl="2"/>
+            <a:r>
+              <a:rPr lang="en-US" dirty="0" smtClean="0"/>
+              <a:t>curl</a:t>
+            </a:r>
+          </a:p>
+          <a:p>
+            <a:pPr lvl="2"/>
+            <a:r>
+              <a:rPr lang="en-US" dirty="0"/>
+              <a:t>Hurl.it -</a:t>
+            </a:r>
+            <a:r>
+              <a:rPr lang="en-US" dirty="0" smtClean="0"/>
+              <a:t> http</a:t>
+            </a:r>
+            <a:r>
+              <a:rPr lang="en-US" dirty="0"/>
+              <a:t>://www.hurl.it</a:t>
+            </a:r>
+            <a:r>
+              <a:rPr lang="en-US" dirty="0" smtClean="0"/>
+              <a:t>/</a:t>
+            </a:r>
+          </a:p>
+          <a:p>
+            <a:pPr lvl="2"/>
+            <a:r>
+              <a:rPr lang="en-US" dirty="0" smtClean="0"/>
+              <a:t>Dev HTTP Client  - Google Chrome App</a:t>
+            </a:r>
+          </a:p>
+          <a:p>
+            <a:pPr lvl="2"/>
+            <a:endParaRPr lang="en-US" dirty="0" smtClean="0"/>
+          </a:p>
+          <a:p>
+            <a:endParaRPr lang="en-US" dirty="0"/>
+          </a:p>
+        </p:txBody>
+      </p:sp>
+    </p:spTree>
+    <p:extLst>
+      <p:ext uri="{BB962C8B-B14F-4D97-AF65-F5344CB8AC3E}">
+        <p14:creationId xmlns:p14="http://schemas.microsoft.com/office/powerpoint/2010/main" val="327509647"/>
+      </p:ext>
+    </p:extLst>
+  </p:cSld>
+  <p:clrMapOvr>
+    <a:masterClrMapping/>
+  </p:clrMapOvr>
+</p:sld>
+</file>
+
+<file path=ppt/slides/slide21.xml><?xml version="1.0" encoding="utf-8"?>
 <p:sld xmlns:a="http://schemas.openxmlformats.org/drawingml/2006/main" xmlns:r="http://schemas.openxmlformats.org/officeDocument/2006/relationships" xmlns:p="http://schemas.openxmlformats.org/presentationml/2006/main">
   <p:cSld>
     <p:spTree>
@@ -8216,7 +8341,7 @@
 </p:sld>
 </file>
 
-<file path=ppt/slides/slide21.xml><?xml version="1.0" encoding="utf-8"?>
+<file path=ppt/slides/slide22.xml><?xml version="1.0" encoding="utf-8"?>
 <p:sld xmlns:a="http://schemas.openxmlformats.org/drawingml/2006/main" xmlns:r="http://schemas.openxmlformats.org/officeDocument/2006/relationships" xmlns:p="http://schemas.openxmlformats.org/presentationml/2006/main">
   <p:cSld>
     <p:spTree>
@@ -8453,7 +8578,7 @@
 </p:sld>
 </file>
 
-<file path=ppt/slides/slide22.xml><?xml version="1.0" encoding="utf-8"?>
+<file path=ppt/slides/slide23.xml><?xml version="1.0" encoding="utf-8"?>
 <p:sld xmlns:a="http://schemas.openxmlformats.org/drawingml/2006/main" xmlns:r="http://schemas.openxmlformats.org/officeDocument/2006/relationships" xmlns:p="http://schemas.openxmlformats.org/presentationml/2006/main">
   <p:cSld>
     <p:spTree>

</xml_diff>

<commit_message>
Updated my LE title
</commit_message>
<xml_diff>
--- a/Implementing Push Notification in Android.pptx
+++ b/Implementing Push Notification in Android.pptx
@@ -247,7 +247,7 @@
           <a:p>
             <a:fld id="{AB6131E3-072D-1447-B771-F05C9D397949}" type="datetimeFigureOut">
               <a:rPr lang="en-US" smtClean="0"/>
-              <a:t>12/29/2014</a:t>
+              <a:t>12/30/2014</a:t>
             </a:fld>
             <a:endParaRPr lang="en-US" dirty="0"/>
           </a:p>
@@ -412,7 +412,7 @@
           <a:p>
             <a:fld id="{DE4C9721-1813-4A55-A5DA-76417DB5EE62}" type="datetimeFigureOut">
               <a:rPr lang="en-US" smtClean="0"/>
-              <a:t>12/29/2014</a:t>
+              <a:t>12/30/2014</a:t>
             </a:fld>
             <a:endParaRPr lang="en-US" dirty="0"/>
           </a:p>
@@ -1053,7 +1053,7 @@
           <a:p>
             <a:fld id="{1A6A9824-C09F-4166-9A2C-6C9FA577887A}" type="datetimeFigureOut">
               <a:rPr lang="en-US" smtClean="0"/>
-              <a:t>12/29/2014</a:t>
+              <a:t>12/30/2014</a:t>
             </a:fld>
             <a:endParaRPr lang="en-US" dirty="0"/>
           </a:p>
@@ -1223,7 +1223,7 @@
           <a:p>
             <a:fld id="{1A6A9824-C09F-4166-9A2C-6C9FA577887A}" type="datetimeFigureOut">
               <a:rPr lang="en-US" smtClean="0"/>
-              <a:t>12/29/2014</a:t>
+              <a:t>12/30/2014</a:t>
             </a:fld>
             <a:endParaRPr lang="en-US" dirty="0"/>
           </a:p>
@@ -1403,7 +1403,7 @@
           <a:p>
             <a:fld id="{1A6A9824-C09F-4166-9A2C-6C9FA577887A}" type="datetimeFigureOut">
               <a:rPr lang="en-US" smtClean="0"/>
-              <a:t>12/29/2014</a:t>
+              <a:t>12/30/2014</a:t>
             </a:fld>
             <a:endParaRPr lang="en-US" dirty="0"/>
           </a:p>
@@ -1573,7 +1573,7 @@
           <a:p>
             <a:fld id="{1A6A9824-C09F-4166-9A2C-6C9FA577887A}" type="datetimeFigureOut">
               <a:rPr lang="en-US" smtClean="0"/>
-              <a:t>12/29/2014</a:t>
+              <a:t>12/30/2014</a:t>
             </a:fld>
             <a:endParaRPr lang="en-US" dirty="0"/>
           </a:p>
@@ -1819,7 +1819,7 @@
           <a:p>
             <a:fld id="{1A6A9824-C09F-4166-9A2C-6C9FA577887A}" type="datetimeFigureOut">
               <a:rPr lang="en-US" smtClean="0"/>
-              <a:t>12/29/2014</a:t>
+              <a:t>12/30/2014</a:t>
             </a:fld>
             <a:endParaRPr lang="en-US" dirty="0"/>
           </a:p>
@@ -2107,7 +2107,7 @@
           <a:p>
             <a:fld id="{1A6A9824-C09F-4166-9A2C-6C9FA577887A}" type="datetimeFigureOut">
               <a:rPr lang="en-US" smtClean="0"/>
-              <a:t>12/29/2014</a:t>
+              <a:t>12/30/2014</a:t>
             </a:fld>
             <a:endParaRPr lang="en-US" dirty="0"/>
           </a:p>
@@ -2529,7 +2529,7 @@
           <a:p>
             <a:fld id="{1A6A9824-C09F-4166-9A2C-6C9FA577887A}" type="datetimeFigureOut">
               <a:rPr lang="en-US" smtClean="0"/>
-              <a:t>12/29/2014</a:t>
+              <a:t>12/30/2014</a:t>
             </a:fld>
             <a:endParaRPr lang="en-US" dirty="0"/>
           </a:p>
@@ -2647,7 +2647,7 @@
           <a:p>
             <a:fld id="{1A6A9824-C09F-4166-9A2C-6C9FA577887A}" type="datetimeFigureOut">
               <a:rPr lang="en-US" smtClean="0"/>
-              <a:t>12/29/2014</a:t>
+              <a:t>12/30/2014</a:t>
             </a:fld>
             <a:endParaRPr lang="en-US" dirty="0"/>
           </a:p>
@@ -2742,7 +2742,7 @@
           <a:p>
             <a:fld id="{1A6A9824-C09F-4166-9A2C-6C9FA577887A}" type="datetimeFigureOut">
               <a:rPr lang="en-US" smtClean="0"/>
-              <a:t>12/29/2014</a:t>
+              <a:t>12/30/2014</a:t>
             </a:fld>
             <a:endParaRPr lang="en-US" dirty="0"/>
           </a:p>
@@ -3019,7 +3019,7 @@
           <a:p>
             <a:fld id="{1A6A9824-C09F-4166-9A2C-6C9FA577887A}" type="datetimeFigureOut">
               <a:rPr lang="en-US" smtClean="0"/>
-              <a:t>12/29/2014</a:t>
+              <a:t>12/30/2014</a:t>
             </a:fld>
             <a:endParaRPr lang="en-US" dirty="0"/>
           </a:p>
@@ -3276,7 +3276,7 @@
           <a:p>
             <a:fld id="{1A6A9824-C09F-4166-9A2C-6C9FA577887A}" type="datetimeFigureOut">
               <a:rPr lang="en-US" smtClean="0"/>
-              <a:t>12/29/2014</a:t>
+              <a:t>12/30/2014</a:t>
             </a:fld>
             <a:endParaRPr lang="en-US" dirty="0"/>
           </a:p>
@@ -3420,7 +3420,7 @@
           <a:noFill/>
           <a:extLst>
             <a:ext uri="{909E8E84-426E-40dd-AFC4-6F175D3DCCD1}">
-              <a14:hiddenFill xmlns="" xmlns:a14="http://schemas.microsoft.com/office/drawing/2010/main">
+              <a14:hiddenFill xmlns:a14="http://schemas.microsoft.com/office/drawing/2010/main" xmlns="">
                 <a:solidFill>
                   <a:srgbClr val="FFFFFF"/>
                 </a:solidFill>
@@ -3559,7 +3559,7 @@
           <a:p>
             <a:fld id="{1A6A9824-C09F-4166-9A2C-6C9FA577887A}" type="datetimeFigureOut">
               <a:rPr lang="en-US" smtClean="0"/>
-              <a:t>12/29/2014</a:t>
+              <a:t>12/30/2014</a:t>
             </a:fld>
             <a:endParaRPr lang="en-US" dirty="0"/>
           </a:p>
@@ -4017,16 +4017,36 @@
           <a:lstStyle/>
           <a:p>
             <a:r>
-              <a:rPr lang="en-US" dirty="0" smtClean="0"/>
+              <a:rPr lang="en-US" dirty="0" smtClean="0">
+                <a:solidFill>
+                  <a:srgbClr val="4D4E50"/>
+                </a:solidFill>
+              </a:rPr>
               <a:t>Keith Wedinger</a:t>
             </a:r>
           </a:p>
           <a:p>
             <a:r>
-              <a:rPr lang="en-US" dirty="0" smtClean="0"/>
-              <a:t>Solutions Architect</a:t>
-            </a:r>
-            <a:endParaRPr lang="en-US" dirty="0"/>
+              <a:rPr lang="en-US" dirty="0" smtClean="0">
+                <a:solidFill>
+                  <a:srgbClr val="4D4E50"/>
+                </a:solidFill>
+              </a:rPr>
+              <a:t>Director of </a:t>
+            </a:r>
+            <a:r>
+              <a:rPr lang="en-US" smtClean="0">
+                <a:solidFill>
+                  <a:srgbClr val="4D4E50"/>
+                </a:solidFill>
+              </a:rPr>
+              <a:t>Technology Solutions</a:t>
+            </a:r>
+            <a:endParaRPr lang="en-US" dirty="0">
+              <a:solidFill>
+                <a:srgbClr val="4D4E50"/>
+              </a:solidFill>
+            </a:endParaRPr>
           </a:p>
         </p:txBody>
       </p:sp>
@@ -4061,7 +4081,7 @@
           <a:noFill/>
           <a:extLst>
             <a:ext uri="{909E8E84-426E-40dd-AFC4-6F175D3DCCD1}">
-              <a14:hiddenFill xmlns="" xmlns:a14="http://schemas.microsoft.com/office/drawing/2010/main">
+              <a14:hiddenFill xmlns:a14="http://schemas.microsoft.com/office/drawing/2010/main" xmlns="">
                 <a:solidFill>
                   <a:srgbClr val="FFFFFF"/>
                 </a:solidFill>
@@ -4522,13 +4542,13 @@
               <a:t>    </a:t>
             </a:r>
             <a:r>
-              <a:rPr lang="en-US" sz="1200">
+              <a:rPr lang="en-US" sz="1200" dirty="0">
                 <a:latin typeface="Courier"/>
               </a:rPr>
               <a:t>compile </a:t>
             </a:r>
             <a:r>
-              <a:rPr lang="en-US" sz="1200" b="1" smtClean="0">
+              <a:rPr lang="en-US" sz="1200" b="1" dirty="0" smtClean="0">
                 <a:latin typeface="Courier"/>
               </a:rPr>
               <a:t>'com.google.android.gms:play-services:6.1+'</a:t>
@@ -7070,7 +7090,7 @@
           <a:noFill/>
           <a:extLst>
             <a:ext uri="{909E8E84-426E-40dd-AFC4-6F175D3DCCD1}">
-              <a14:hiddenFill xmlns="" xmlns:a14="http://schemas.microsoft.com/office/drawing/2010/main">
+              <a14:hiddenFill xmlns:a14="http://schemas.microsoft.com/office/drawing/2010/main" xmlns="">
                 <a:solidFill>
                   <a:srgbClr val="FFFFFF"/>
                 </a:solidFill>
@@ -8788,11 +8808,7 @@
             </a:r>
             <a:r>
               <a:rPr lang="en-US" sz="2000" dirty="0"/>
-              <a:t> and M3. </a:t>
-            </a:r>
-            <a:r>
-              <a:rPr lang="en-US" sz="2000" dirty="0"/>
-              <a:t>Presented "Hybrid or Native - What Should Be Your Mobile Strategy and </a:t>
+              <a:t> and M3. Presented "Hybrid or Native - What Should Be Your Mobile Strategy and </a:t>
             </a:r>
             <a:r>
               <a:rPr lang="en-US" sz="2000" dirty="0" smtClean="0"/>
@@ -8806,7 +8822,6 @@
               <a:rPr lang="en-US" sz="2000" dirty="0" smtClean="0"/>
               <a:t>.</a:t>
             </a:r>
-            <a:endParaRPr lang="en-US" sz="2000" dirty="0" smtClean="0"/>
           </a:p>
         </p:txBody>
       </p:sp>

</xml_diff>

<commit_message>
CodeMash 2015 version of presentation
</commit_message>
<xml_diff>
--- a/Implementing Push Notification in Android.pptx
+++ b/Implementing Push Notification in Android.pptx
@@ -134,7 +134,7 @@
   </p:defaultTextStyle>
   <p:extLst>
     <p:ext uri="{EFAFB233-063F-42B5-8137-9DF3F51BA10A}">
-      <p15:sldGuideLst xmlns:p15="http://schemas.microsoft.com/office/powerpoint/2012/main">
+      <p15:sldGuideLst xmlns:p15="http://schemas.microsoft.com/office/powerpoint/2012/main" xmlns="">
         <p15:guide id="1" orient="horz" pos="2160">
           <p15:clr>
             <a:srgbClr val="A4A3A4"/>
@@ -148,7 +148,7 @@
       </p15:sldGuideLst>
     </p:ext>
     <p:ext uri="{2D200454-40CA-4A62-9FC3-DE9A4176ACB9}">
-      <p15:notesGuideLst xmlns:p15="http://schemas.microsoft.com/office/powerpoint/2012/main">
+      <p15:notesGuideLst xmlns:p15="http://schemas.microsoft.com/office/powerpoint/2012/main" xmlns="">
         <p15:guide id="1" orient="horz" pos="2880">
           <p15:clr>
             <a:srgbClr val="A4A3A4"/>
@@ -247,7 +247,7 @@
           <a:p>
             <a:fld id="{AB6131E3-072D-1447-B771-F05C9D397949}" type="datetimeFigureOut">
               <a:rPr lang="en-US" smtClean="0"/>
-              <a:t>12/30/2014</a:t>
+              <a:t>1/9/15</a:t>
             </a:fld>
             <a:endParaRPr lang="en-US" dirty="0"/>
           </a:p>
@@ -412,7 +412,7 @@
           <a:p>
             <a:fld id="{DE4C9721-1813-4A55-A5DA-76417DB5EE62}" type="datetimeFigureOut">
               <a:rPr lang="en-US" smtClean="0"/>
-              <a:t>12/30/2014</a:t>
+              <a:t>1/9/15</a:t>
             </a:fld>
             <a:endParaRPr lang="en-US" dirty="0"/>
           </a:p>
@@ -1053,7 +1053,7 @@
           <a:p>
             <a:fld id="{1A6A9824-C09F-4166-9A2C-6C9FA577887A}" type="datetimeFigureOut">
               <a:rPr lang="en-US" smtClean="0"/>
-              <a:t>12/30/2014</a:t>
+              <a:t>1/9/15</a:t>
             </a:fld>
             <a:endParaRPr lang="en-US" dirty="0"/>
           </a:p>
@@ -1223,7 +1223,7 @@
           <a:p>
             <a:fld id="{1A6A9824-C09F-4166-9A2C-6C9FA577887A}" type="datetimeFigureOut">
               <a:rPr lang="en-US" smtClean="0"/>
-              <a:t>12/30/2014</a:t>
+              <a:t>1/9/15</a:t>
             </a:fld>
             <a:endParaRPr lang="en-US" dirty="0"/>
           </a:p>
@@ -1403,7 +1403,7 @@
           <a:p>
             <a:fld id="{1A6A9824-C09F-4166-9A2C-6C9FA577887A}" type="datetimeFigureOut">
               <a:rPr lang="en-US" smtClean="0"/>
-              <a:t>12/30/2014</a:t>
+              <a:t>1/9/15</a:t>
             </a:fld>
             <a:endParaRPr lang="en-US" dirty="0"/>
           </a:p>
@@ -1573,7 +1573,7 @@
           <a:p>
             <a:fld id="{1A6A9824-C09F-4166-9A2C-6C9FA577887A}" type="datetimeFigureOut">
               <a:rPr lang="en-US" smtClean="0"/>
-              <a:t>12/30/2014</a:t>
+              <a:t>1/9/15</a:t>
             </a:fld>
             <a:endParaRPr lang="en-US" dirty="0"/>
           </a:p>
@@ -1819,7 +1819,7 @@
           <a:p>
             <a:fld id="{1A6A9824-C09F-4166-9A2C-6C9FA577887A}" type="datetimeFigureOut">
               <a:rPr lang="en-US" smtClean="0"/>
-              <a:t>12/30/2014</a:t>
+              <a:t>1/9/15</a:t>
             </a:fld>
             <a:endParaRPr lang="en-US" dirty="0"/>
           </a:p>
@@ -2107,7 +2107,7 @@
           <a:p>
             <a:fld id="{1A6A9824-C09F-4166-9A2C-6C9FA577887A}" type="datetimeFigureOut">
               <a:rPr lang="en-US" smtClean="0"/>
-              <a:t>12/30/2014</a:t>
+              <a:t>1/9/15</a:t>
             </a:fld>
             <a:endParaRPr lang="en-US" dirty="0"/>
           </a:p>
@@ -2529,7 +2529,7 @@
           <a:p>
             <a:fld id="{1A6A9824-C09F-4166-9A2C-6C9FA577887A}" type="datetimeFigureOut">
               <a:rPr lang="en-US" smtClean="0"/>
-              <a:t>12/30/2014</a:t>
+              <a:t>1/9/15</a:t>
             </a:fld>
             <a:endParaRPr lang="en-US" dirty="0"/>
           </a:p>
@@ -2647,7 +2647,7 @@
           <a:p>
             <a:fld id="{1A6A9824-C09F-4166-9A2C-6C9FA577887A}" type="datetimeFigureOut">
               <a:rPr lang="en-US" smtClean="0"/>
-              <a:t>12/30/2014</a:t>
+              <a:t>1/9/15</a:t>
             </a:fld>
             <a:endParaRPr lang="en-US" dirty="0"/>
           </a:p>
@@ -2742,7 +2742,7 @@
           <a:p>
             <a:fld id="{1A6A9824-C09F-4166-9A2C-6C9FA577887A}" type="datetimeFigureOut">
               <a:rPr lang="en-US" smtClean="0"/>
-              <a:t>12/30/2014</a:t>
+              <a:t>1/9/15</a:t>
             </a:fld>
             <a:endParaRPr lang="en-US" dirty="0"/>
           </a:p>
@@ -3019,7 +3019,7 @@
           <a:p>
             <a:fld id="{1A6A9824-C09F-4166-9A2C-6C9FA577887A}" type="datetimeFigureOut">
               <a:rPr lang="en-US" smtClean="0"/>
-              <a:t>12/30/2014</a:t>
+              <a:t>1/9/15</a:t>
             </a:fld>
             <a:endParaRPr lang="en-US" dirty="0"/>
           </a:p>
@@ -3276,7 +3276,7 @@
           <a:p>
             <a:fld id="{1A6A9824-C09F-4166-9A2C-6C9FA577887A}" type="datetimeFigureOut">
               <a:rPr lang="en-US" smtClean="0"/>
-              <a:t>12/30/2014</a:t>
+              <a:t>1/9/15</a:t>
             </a:fld>
             <a:endParaRPr lang="en-US" dirty="0"/>
           </a:p>
@@ -3420,7 +3420,7 @@
           <a:noFill/>
           <a:extLst>
             <a:ext uri="{909E8E84-426E-40dd-AFC4-6F175D3DCCD1}">
-              <a14:hiddenFill xmlns:a14="http://schemas.microsoft.com/office/drawing/2010/main" xmlns="">
+              <a14:hiddenFill xmlns:a14="http://schemas.microsoft.com/office/drawing/2010/main">
                 <a:solidFill>
                   <a:srgbClr val="FFFFFF"/>
                 </a:solidFill>
@@ -3559,7 +3559,7 @@
           <a:p>
             <a:fld id="{1A6A9824-C09F-4166-9A2C-6C9FA577887A}" type="datetimeFigureOut">
               <a:rPr lang="en-US" smtClean="0"/>
-              <a:t>12/30/2014</a:t>
+              <a:t>1/9/15</a:t>
             </a:fld>
             <a:endParaRPr lang="en-US" dirty="0"/>
           </a:p>
@@ -4027,20 +4027,20 @@
           </a:p>
           <a:p>
             <a:r>
+              <a:rPr lang="en-US" smtClean="0">
+                <a:solidFill>
+                  <a:srgbClr val="4D4E50"/>
+                </a:solidFill>
+              </a:rPr>
+              <a:t>Director, Technology </a:t>
+            </a:r>
+            <a:r>
               <a:rPr lang="en-US" dirty="0" smtClean="0">
                 <a:solidFill>
                   <a:srgbClr val="4D4E50"/>
                 </a:solidFill>
               </a:rPr>
-              <a:t>Director of </a:t>
-            </a:r>
-            <a:r>
-              <a:rPr lang="en-US" smtClean="0">
-                <a:solidFill>
-                  <a:srgbClr val="4D4E50"/>
-                </a:solidFill>
-              </a:rPr>
-              <a:t>Technology Solutions</a:t>
+              <a:t>Solutions</a:t>
             </a:r>
             <a:endParaRPr lang="en-US" dirty="0">
               <a:solidFill>
@@ -4081,7 +4081,7 @@
           <a:noFill/>
           <a:extLst>
             <a:ext uri="{909E8E84-426E-40dd-AFC4-6F175D3DCCD1}">
-              <a14:hiddenFill xmlns:a14="http://schemas.microsoft.com/office/drawing/2010/main" xmlns="">
+              <a14:hiddenFill xmlns:a14="http://schemas.microsoft.com/office/drawing/2010/main">
                 <a:solidFill>
                   <a:srgbClr val="FFFFFF"/>
                 </a:solidFill>
@@ -4111,7 +4111,7 @@
   <p:timing>
     <p:tnLst>
       <p:par>
-        <p:cTn id="1" dur="indefinite" restart="never" nodeType="tmRoot"/>
+        <p:cTn xmlns:p14="http://schemas.microsoft.com/office/powerpoint/2010/main" id="1" dur="indefinite" restart="never" nodeType="tmRoot"/>
       </p:par>
     </p:tnLst>
   </p:timing>
@@ -4339,12 +4339,6 @@
               <a:t> project</a:t>
             </a:r>
           </a:p>
-          <a:p>
-            <a:r>
-              <a:rPr lang="en-US" dirty="0" smtClean="0"/>
-              <a:t>DEMO</a:t>
-            </a:r>
-          </a:p>
         </p:txBody>
       </p:sp>
     </p:spTree>
@@ -4433,13 +4427,8 @@
           <a:p>
             <a:r>
               <a:rPr lang="en-US" sz="2400" dirty="0" smtClean="0"/>
-              <a:t>New Android build system based on </a:t>
-            </a:r>
-            <a:r>
-              <a:rPr lang="en-US" sz="2400" dirty="0" err="1" smtClean="0"/>
-              <a:t>Gradle</a:t>
-            </a:r>
-            <a:endParaRPr lang="en-US" sz="2400" dirty="0" smtClean="0"/>
+              <a:t>New Android build system based on Gradle</a:t>
+            </a:r>
           </a:p>
           <a:p>
             <a:r>
@@ -4450,15 +4439,7 @@
           <a:p>
             <a:r>
               <a:rPr lang="en-US" sz="2400" dirty="0" smtClean="0"/>
-              <a:t>Inside </a:t>
-            </a:r>
-            <a:r>
-              <a:rPr lang="en-US" sz="2400" dirty="0" err="1" smtClean="0"/>
-              <a:t>build.gradle</a:t>
-            </a:r>
-            <a:r>
-              <a:rPr lang="en-US" sz="2400" dirty="0" smtClean="0"/>
-              <a:t>, add the following dependencies</a:t>
+              <a:t>Inside build.gradle, add the following dependencies</a:t>
             </a:r>
             <a:endParaRPr lang="en-US" sz="2400" dirty="0"/>
           </a:p>
@@ -4586,7 +4567,7 @@
         <p:spPr>
           <a:xfrm>
             <a:off x="457200" y="3886200"/>
-            <a:ext cx="8229600" cy="1938992"/>
+            <a:ext cx="8229600" cy="830997"/>
           </a:xfrm>
           <a:prstGeom prst="rect">
             <a:avLst/>
@@ -4603,33 +4584,8 @@
               <a:buChar char="•"/>
             </a:pPr>
             <a:r>
-              <a:rPr lang="en-US" sz="2400" dirty="0" err="1" smtClean="0"/>
-              <a:t>Gradle</a:t>
-            </a:r>
-            <a:r>
               <a:rPr lang="en-US" sz="2400" dirty="0" smtClean="0"/>
-              <a:t> build will run these tasks to get dependencies from Android SDK</a:t>
-            </a:r>
-            <a:br>
-              <a:rPr lang="en-US" sz="2400" dirty="0" smtClean="0"/>
-            </a:br>
-            <a:r>
-              <a:rPr lang="en-US" sz="2400" dirty="0" smtClean="0"/>
-              <a:t>:prepareComAndroidSupportAppcompatV72000Library</a:t>
-            </a:r>
-            <a:br>
-              <a:rPr lang="en-US" sz="2400" dirty="0" smtClean="0"/>
-            </a:br>
-            <a:r>
-              <a:rPr lang="en-US" sz="2400" dirty="0" smtClean="0"/>
-              <a:t>:prepareComAndroidSupportSupportV42000Library</a:t>
-            </a:r>
-            <a:br>
-              <a:rPr lang="en-US" sz="2400" dirty="0" smtClean="0"/>
-            </a:br>
-            <a:r>
-              <a:rPr lang="en-US" sz="2400" dirty="0" smtClean="0"/>
-              <a:t>:prepareComGoogleAndroidGmsPlayServices5089Library</a:t>
+              <a:t>Gradle build will run tasks to get dependencies from Android SDK</a:t>
             </a:r>
             <a:endParaRPr lang="en-US" sz="2400" dirty="0"/>
           </a:p>
@@ -6009,7 +5965,7 @@
         </p:nvGraphicFramePr>
         <p:xfrm>
           <a:off x="304800" y="1981200"/>
-          <a:ext cx="8610600" cy="1877262"/>
+          <a:ext cx="8610600" cy="2082544"/>
         </p:xfrm>
         <a:graphic>
           <a:graphicData uri="http://schemas.openxmlformats.org/drawingml/2006/table">
@@ -6910,7 +6866,7 @@
         </p:nvSpPr>
         <p:spPr>
           <a:xfrm>
-            <a:off x="457200" y="3886200"/>
+            <a:off x="457200" y="4038600"/>
             <a:ext cx="8144774" cy="1631216"/>
           </a:xfrm>
           <a:prstGeom prst="rect">
@@ -6939,15 +6895,7 @@
             </a:pPr>
             <a:r>
               <a:rPr lang="en-US" sz="2000" dirty="0"/>
-              <a:t>Define </a:t>
-            </a:r>
-            <a:r>
-              <a:rPr lang="en-US" sz="2000" dirty="0" err="1"/>
-              <a:t>IntentService</a:t>
-            </a:r>
-            <a:r>
-              <a:rPr lang="en-US" sz="2000" dirty="0"/>
-              <a:t> for processing notifications</a:t>
+              <a:t>Define IntentService for processing notifications</a:t>
             </a:r>
           </a:p>
           <a:p>
@@ -7090,7 +7038,7 @@
           <a:noFill/>
           <a:extLst>
             <a:ext uri="{909E8E84-426E-40dd-AFC4-6F175D3DCCD1}">
-              <a14:hiddenFill xmlns:a14="http://schemas.microsoft.com/office/drawing/2010/main" xmlns="">
+              <a14:hiddenFill xmlns:a14="http://schemas.microsoft.com/office/drawing/2010/main">
                 <a:solidFill>
                   <a:srgbClr val="FFFFFF"/>
                 </a:solidFill>
@@ -7252,7 +7200,7 @@
   <p:timing>
     <p:tnLst>
       <p:par>
-        <p:cTn id="1" dur="indefinite" restart="never" nodeType="tmRoot"/>
+        <p:cTn xmlns:p14="http://schemas.microsoft.com/office/powerpoint/2010/main" id="1" dur="indefinite" restart="never" nodeType="tmRoot"/>
       </p:par>
     </p:tnLst>
   </p:timing>
@@ -8437,29 +8385,7 @@
               </a:rPr>
               <a:t>github.com/LeadingEDJE/MobilePushNotification</a:t>
             </a:r>
-            <a:endParaRPr lang="en-US" sz="1400" dirty="0" smtClean="0"/>
-          </a:p>
-          <a:p>
-            <a:pPr lvl="2"/>
-            <a:r>
-              <a:rPr lang="en-US" sz="1200" dirty="0" smtClean="0"/>
-              <a:t>Use gradle_migration_2014-10-08 branch for Android Studio / </a:t>
-            </a:r>
-            <a:r>
-              <a:rPr lang="en-US" sz="1200" dirty="0" err="1" smtClean="0"/>
-              <a:t>Gradle</a:t>
-            </a:r>
-            <a:r>
-              <a:rPr lang="en-US" sz="1200" dirty="0" smtClean="0"/>
-              <a:t> based project</a:t>
-            </a:r>
-          </a:p>
-          <a:p>
-            <a:pPr lvl="2"/>
-            <a:r>
-              <a:rPr lang="en-US" sz="1200" dirty="0" smtClean="0"/>
-              <a:t>Use master for Eclipse based project</a:t>
-            </a:r>
+            <a:endParaRPr lang="en-US" sz="1200" dirty="0" smtClean="0"/>
           </a:p>
           <a:p>
             <a:r>
@@ -8508,15 +8434,7 @@
           <a:p>
             <a:r>
               <a:rPr lang="en-US" sz="2000" dirty="0" smtClean="0"/>
-              <a:t>Building your Project with </a:t>
-            </a:r>
-            <a:r>
-              <a:rPr lang="en-US" sz="2000" dirty="0" err="1" smtClean="0"/>
-              <a:t>Gradle</a:t>
-            </a:r>
-            <a:r>
-              <a:rPr lang="en-US" sz="2000" dirty="0" smtClean="0"/>
-              <a:t> and Android Studio</a:t>
+              <a:t>Building your Project with Gradle and Android Studio</a:t>
             </a:r>
           </a:p>
           <a:p>
@@ -9124,7 +9042,7 @@
         <p:spPr/>
         <p:txBody>
           <a:bodyPr>
-            <a:normAutofit fontScale="85000" lnSpcReduction="20000"/>
+            <a:normAutofit fontScale="92500" lnSpcReduction="20000"/>
           </a:bodyPr>
           <a:lstStyle/>
           <a:p>
@@ -9168,24 +9086,12 @@
           <a:p>
             <a:pPr lvl="3"/>
             <a:r>
-              <a:rPr lang="en-US" sz="1600" dirty="0"/>
-              <a:t>Eclipse: http://eclipse.org/downloads/</a:t>
-            </a:r>
-            <a:endParaRPr lang="en-US" sz="1600" dirty="0" smtClean="0"/>
-          </a:p>
-          <a:p>
-            <a:pPr lvl="3"/>
-            <a:r>
               <a:rPr lang="en-US" sz="1600" dirty="0" err="1" smtClean="0"/>
               <a:t>IntelliJ</a:t>
             </a:r>
             <a:r>
-              <a:rPr lang="en-US" sz="1600" dirty="0"/>
-              <a:t> </a:t>
-            </a:r>
-            <a:r>
               <a:rPr lang="en-US" sz="1600" dirty="0" smtClean="0"/>
-              <a:t>IDEA 14: </a:t>
+              <a:t> IDEA 14: </a:t>
             </a:r>
             <a:r>
               <a:rPr lang="en-US" sz="1600" dirty="0"/>
@@ -9201,11 +9107,11 @@
             </a:r>
             <a:r>
               <a:rPr lang="en-US" sz="1600" dirty="0" smtClean="0"/>
-              <a:t>Studio 1.0</a:t>
+              <a:t>Studio 1.0.2: </a:t>
             </a:r>
             <a:r>
               <a:rPr lang="en-US" sz="1600" dirty="0"/>
-              <a:t>: http://developer.android.com/sdk/index.html</a:t>
+              <a:t>http://developer.android.com/sdk/index.html</a:t>
             </a:r>
             <a:endParaRPr lang="en-US" sz="1600" dirty="0" smtClean="0"/>
           </a:p>

</xml_diff>

<commit_message>
Presentation updates for That Conference
</commit_message>
<xml_diff>
--- a/Implementing Push Notification in Android.pptx
+++ b/Implementing Push Notification in Android.pptx
@@ -12,24 +12,24 @@
   </p:handoutMasterIdLst>
   <p:sldIdLst>
     <p:sldId id="257" r:id="rId2"/>
-    <p:sldId id="258" r:id="rId3"/>
-    <p:sldId id="260" r:id="rId4"/>
-    <p:sldId id="279" r:id="rId5"/>
-    <p:sldId id="261" r:id="rId6"/>
-    <p:sldId id="263" r:id="rId7"/>
-    <p:sldId id="262" r:id="rId8"/>
-    <p:sldId id="264" r:id="rId9"/>
-    <p:sldId id="265" r:id="rId10"/>
-    <p:sldId id="266" r:id="rId11"/>
-    <p:sldId id="267" r:id="rId12"/>
-    <p:sldId id="277" r:id="rId13"/>
-    <p:sldId id="276" r:id="rId14"/>
-    <p:sldId id="270" r:id="rId15"/>
-    <p:sldId id="280" r:id="rId16"/>
-    <p:sldId id="271" r:id="rId17"/>
-    <p:sldId id="273" r:id="rId18"/>
-    <p:sldId id="275" r:id="rId19"/>
-    <p:sldId id="269" r:id="rId20"/>
+    <p:sldId id="281" r:id="rId3"/>
+    <p:sldId id="282" r:id="rId4"/>
+    <p:sldId id="258" r:id="rId5"/>
+    <p:sldId id="260" r:id="rId6"/>
+    <p:sldId id="279" r:id="rId7"/>
+    <p:sldId id="261" r:id="rId8"/>
+    <p:sldId id="263" r:id="rId9"/>
+    <p:sldId id="262" r:id="rId10"/>
+    <p:sldId id="264" r:id="rId11"/>
+    <p:sldId id="265" r:id="rId12"/>
+    <p:sldId id="283" r:id="rId13"/>
+    <p:sldId id="277" r:id="rId14"/>
+    <p:sldId id="269" r:id="rId15"/>
+    <p:sldId id="270" r:id="rId16"/>
+    <p:sldId id="280" r:id="rId17"/>
+    <p:sldId id="271" r:id="rId18"/>
+    <p:sldId id="273" r:id="rId19"/>
+    <p:sldId id="275" r:id="rId20"/>
     <p:sldId id="274" r:id="rId21"/>
     <p:sldId id="272" r:id="rId22"/>
     <p:sldId id="259" r:id="rId23"/>
@@ -134,7 +134,7 @@
   </p:defaultTextStyle>
   <p:extLst>
     <p:ext uri="{EFAFB233-063F-42B5-8137-9DF3F51BA10A}">
-      <p15:sldGuideLst xmlns:p15="http://schemas.microsoft.com/office/powerpoint/2012/main" xmlns="">
+      <p15:sldGuideLst xmlns:p15="http://schemas.microsoft.com/office/powerpoint/2012/main">
         <p15:guide id="1" orient="horz" pos="2160">
           <p15:clr>
             <a:srgbClr val="A4A3A4"/>
@@ -148,7 +148,7 @@
       </p15:sldGuideLst>
     </p:ext>
     <p:ext uri="{2D200454-40CA-4A62-9FC3-DE9A4176ACB9}">
-      <p15:notesGuideLst xmlns:p15="http://schemas.microsoft.com/office/powerpoint/2012/main" xmlns="">
+      <p15:notesGuideLst xmlns:p15="http://schemas.microsoft.com/office/powerpoint/2012/main">
         <p15:guide id="1" orient="horz" pos="2880">
           <p15:clr>
             <a:srgbClr val="A4A3A4"/>
@@ -247,7 +247,7 @@
           <a:p>
             <a:fld id="{AB6131E3-072D-1447-B771-F05C9D397949}" type="datetimeFigureOut">
               <a:rPr lang="en-US" smtClean="0"/>
-              <a:t>1/9/15</a:t>
+              <a:t>8/6/15</a:t>
             </a:fld>
             <a:endParaRPr lang="en-US" dirty="0"/>
           </a:p>
@@ -412,7 +412,7 @@
           <a:p>
             <a:fld id="{DE4C9721-1813-4A55-A5DA-76417DB5EE62}" type="datetimeFigureOut">
               <a:rPr lang="en-US" smtClean="0"/>
-              <a:t>1/9/15</a:t>
+              <a:t>8/6/15</a:t>
             </a:fld>
             <a:endParaRPr lang="en-US" dirty="0"/>
           </a:p>
@@ -820,6 +820,90 @@
           <a:bodyPr/>
           <a:lstStyle/>
           <a:p>
+            <a:endParaRPr lang="en-US" dirty="0"/>
+          </a:p>
+        </p:txBody>
+      </p:sp>
+      <p:sp>
+        <p:nvSpPr>
+          <p:cNvPr id="4" name="Slide Number Placeholder 3"/>
+          <p:cNvSpPr>
+            <a:spLocks noGrp="1"/>
+          </p:cNvSpPr>
+          <p:nvPr>
+            <p:ph type="sldNum" sz="quarter" idx="10"/>
+          </p:nvPr>
+        </p:nvSpPr>
+        <p:spPr/>
+        <p:txBody>
+          <a:bodyPr/>
+          <a:lstStyle/>
+          <a:p>
+            <a:fld id="{E5D4B8C3-E62F-4D90-96E6-3B107CCE0282}" type="slidenum">
+              <a:rPr lang="en-US" smtClean="0"/>
+              <a:t>3</a:t>
+            </a:fld>
+            <a:endParaRPr lang="en-US" dirty="0"/>
+          </a:p>
+        </p:txBody>
+      </p:sp>
+    </p:spTree>
+    <p:extLst>
+      <p:ext uri="{BB962C8B-B14F-4D97-AF65-F5344CB8AC3E}">
+        <p14:creationId xmlns:p14="http://schemas.microsoft.com/office/powerpoint/2010/main" val="1376710097"/>
+      </p:ext>
+    </p:extLst>
+  </p:cSld>
+  <p:clrMapOvr>
+    <a:masterClrMapping/>
+  </p:clrMapOvr>
+</p:notes>
+</file>
+
+<file path=ppt/notesSlides/notesSlide3.xml><?xml version="1.0" encoding="utf-8"?>
+<p:notes xmlns:a="http://schemas.openxmlformats.org/drawingml/2006/main" xmlns:r="http://schemas.openxmlformats.org/officeDocument/2006/relationships" xmlns:p="http://schemas.openxmlformats.org/presentationml/2006/main">
+  <p:cSld>
+    <p:spTree>
+      <p:nvGrpSpPr>
+        <p:cNvPr id="1" name=""/>
+        <p:cNvGrpSpPr/>
+        <p:nvPr/>
+      </p:nvGrpSpPr>
+      <p:grpSpPr>
+        <a:xfrm>
+          <a:off x="0" y="0"/>
+          <a:ext cx="0" cy="0"/>
+          <a:chOff x="0" y="0"/>
+          <a:chExt cx="0" cy="0"/>
+        </a:xfrm>
+      </p:grpSpPr>
+      <p:sp>
+        <p:nvSpPr>
+          <p:cNvPr id="2" name="Slide Image Placeholder 1"/>
+          <p:cNvSpPr>
+            <a:spLocks noGrp="1" noRot="1" noChangeAspect="1"/>
+          </p:cNvSpPr>
+          <p:nvPr>
+            <p:ph type="sldImg"/>
+          </p:nvPr>
+        </p:nvSpPr>
+        <p:spPr/>
+      </p:sp>
+      <p:sp>
+        <p:nvSpPr>
+          <p:cNvPr id="3" name="Notes Placeholder 2"/>
+          <p:cNvSpPr>
+            <a:spLocks noGrp="1"/>
+          </p:cNvSpPr>
+          <p:nvPr>
+            <p:ph type="body" idx="1"/>
+          </p:nvPr>
+        </p:nvSpPr>
+        <p:spPr/>
+        <p:txBody>
+          <a:bodyPr/>
+          <a:lstStyle/>
+          <a:p>
             <a:pPr marL="457200" lvl="1" indent="0">
               <a:buFont typeface="Arial" panose="020B0604020202020204" pitchFamily="34" charset="0"/>
               <a:buNone/>
@@ -853,7 +937,7 @@
           <a:p>
             <a:fld id="{3A09ECF4-2FF5-41AA-8B53-E32E4ADBE53E}" type="slidenum">
               <a:rPr lang="en-US" smtClean="0"/>
-              <a:t>2</a:t>
+              <a:t>4</a:t>
             </a:fld>
             <a:endParaRPr lang="en-US" dirty="0"/>
           </a:p>
@@ -1053,7 +1137,7 @@
           <a:p>
             <a:fld id="{1A6A9824-C09F-4166-9A2C-6C9FA577887A}" type="datetimeFigureOut">
               <a:rPr lang="en-US" smtClean="0"/>
-              <a:t>1/9/15</a:t>
+              <a:t>8/6/15</a:t>
             </a:fld>
             <a:endParaRPr lang="en-US" dirty="0"/>
           </a:p>
@@ -1223,7 +1307,7 @@
           <a:p>
             <a:fld id="{1A6A9824-C09F-4166-9A2C-6C9FA577887A}" type="datetimeFigureOut">
               <a:rPr lang="en-US" smtClean="0"/>
-              <a:t>1/9/15</a:t>
+              <a:t>8/6/15</a:t>
             </a:fld>
             <a:endParaRPr lang="en-US" dirty="0"/>
           </a:p>
@@ -1403,7 +1487,7 @@
           <a:p>
             <a:fld id="{1A6A9824-C09F-4166-9A2C-6C9FA577887A}" type="datetimeFigureOut">
               <a:rPr lang="en-US" smtClean="0"/>
-              <a:t>1/9/15</a:t>
+              <a:t>8/6/15</a:t>
             </a:fld>
             <a:endParaRPr lang="en-US" dirty="0"/>
           </a:p>
@@ -1573,7 +1657,7 @@
           <a:p>
             <a:fld id="{1A6A9824-C09F-4166-9A2C-6C9FA577887A}" type="datetimeFigureOut">
               <a:rPr lang="en-US" smtClean="0"/>
-              <a:t>1/9/15</a:t>
+              <a:t>8/6/15</a:t>
             </a:fld>
             <a:endParaRPr lang="en-US" dirty="0"/>
           </a:p>
@@ -1819,7 +1903,7 @@
           <a:p>
             <a:fld id="{1A6A9824-C09F-4166-9A2C-6C9FA577887A}" type="datetimeFigureOut">
               <a:rPr lang="en-US" smtClean="0"/>
-              <a:t>1/9/15</a:t>
+              <a:t>8/6/15</a:t>
             </a:fld>
             <a:endParaRPr lang="en-US" dirty="0"/>
           </a:p>
@@ -2107,7 +2191,7 @@
           <a:p>
             <a:fld id="{1A6A9824-C09F-4166-9A2C-6C9FA577887A}" type="datetimeFigureOut">
               <a:rPr lang="en-US" smtClean="0"/>
-              <a:t>1/9/15</a:t>
+              <a:t>8/6/15</a:t>
             </a:fld>
             <a:endParaRPr lang="en-US" dirty="0"/>
           </a:p>
@@ -2529,7 +2613,7 @@
           <a:p>
             <a:fld id="{1A6A9824-C09F-4166-9A2C-6C9FA577887A}" type="datetimeFigureOut">
               <a:rPr lang="en-US" smtClean="0"/>
-              <a:t>1/9/15</a:t>
+              <a:t>8/6/15</a:t>
             </a:fld>
             <a:endParaRPr lang="en-US" dirty="0"/>
           </a:p>
@@ -2647,7 +2731,7 @@
           <a:p>
             <a:fld id="{1A6A9824-C09F-4166-9A2C-6C9FA577887A}" type="datetimeFigureOut">
               <a:rPr lang="en-US" smtClean="0"/>
-              <a:t>1/9/15</a:t>
+              <a:t>8/6/15</a:t>
             </a:fld>
             <a:endParaRPr lang="en-US" dirty="0"/>
           </a:p>
@@ -2742,7 +2826,7 @@
           <a:p>
             <a:fld id="{1A6A9824-C09F-4166-9A2C-6C9FA577887A}" type="datetimeFigureOut">
               <a:rPr lang="en-US" smtClean="0"/>
-              <a:t>1/9/15</a:t>
+              <a:t>8/6/15</a:t>
             </a:fld>
             <a:endParaRPr lang="en-US" dirty="0"/>
           </a:p>
@@ -3019,7 +3103,7 @@
           <a:p>
             <a:fld id="{1A6A9824-C09F-4166-9A2C-6C9FA577887A}" type="datetimeFigureOut">
               <a:rPr lang="en-US" smtClean="0"/>
-              <a:t>1/9/15</a:t>
+              <a:t>8/6/15</a:t>
             </a:fld>
             <a:endParaRPr lang="en-US" dirty="0"/>
           </a:p>
@@ -3276,7 +3360,7 @@
           <a:p>
             <a:fld id="{1A6A9824-C09F-4166-9A2C-6C9FA577887A}" type="datetimeFigureOut">
               <a:rPr lang="en-US" smtClean="0"/>
-              <a:t>1/9/15</a:t>
+              <a:t>8/6/15</a:t>
             </a:fld>
             <a:endParaRPr lang="en-US" dirty="0"/>
           </a:p>
@@ -3420,7 +3504,7 @@
           <a:noFill/>
           <a:extLst>
             <a:ext uri="{909E8E84-426E-40dd-AFC4-6F175D3DCCD1}">
-              <a14:hiddenFill xmlns:a14="http://schemas.microsoft.com/office/drawing/2010/main">
+              <a14:hiddenFill xmlns:a14="http://schemas.microsoft.com/office/drawing/2010/main" xmlns="">
                 <a:solidFill>
                   <a:srgbClr val="FFFFFF"/>
                 </a:solidFill>
@@ -3559,7 +3643,7 @@
           <a:p>
             <a:fld id="{1A6A9824-C09F-4166-9A2C-6C9FA577887A}" type="datetimeFigureOut">
               <a:rPr lang="en-US" smtClean="0"/>
-              <a:t>1/9/15</a:t>
+              <a:t>8/6/15</a:t>
             </a:fld>
             <a:endParaRPr lang="en-US" dirty="0"/>
           </a:p>
@@ -4081,7 +4165,7 @@
           <a:noFill/>
           <a:extLst>
             <a:ext uri="{909E8E84-426E-40dd-AFC4-6F175D3DCCD1}">
-              <a14:hiddenFill xmlns:a14="http://schemas.microsoft.com/office/drawing/2010/main">
+              <a14:hiddenFill xmlns:a14="http://schemas.microsoft.com/office/drawing/2010/main" xmlns="">
                 <a:solidFill>
                   <a:srgbClr val="FFFFFF"/>
                 </a:solidFill>
@@ -4111,7 +4195,7 @@
   <p:timing>
     <p:tnLst>
       <p:par>
-        <p:cTn xmlns:p14="http://schemas.microsoft.com/office/powerpoint/2010/main" id="1" dur="indefinite" restart="never" nodeType="tmRoot"/>
+        <p:cTn id="1" dur="indefinite" restart="never" nodeType="tmRoot"/>
       </p:par>
     </p:tnLst>
   </p:timing>
@@ -4147,66 +4231,121 @@
         </p:nvSpPr>
         <p:spPr/>
         <p:txBody>
+          <a:bodyPr/>
+          <a:lstStyle/>
+          <a:p>
+            <a:r>
+              <a:rPr lang="en-US" dirty="0" smtClean="0"/>
+              <a:t>Create Google API Project</a:t>
+            </a:r>
+            <a:endParaRPr lang="en-US" dirty="0"/>
+          </a:p>
+        </p:txBody>
+      </p:sp>
+      <p:sp>
+        <p:nvSpPr>
+          <p:cNvPr id="3" name="Content Placeholder 2"/>
+          <p:cNvSpPr>
+            <a:spLocks noGrp="1"/>
+          </p:cNvSpPr>
+          <p:nvPr>
+            <p:ph idx="1"/>
+          </p:nvPr>
+        </p:nvSpPr>
+        <p:spPr/>
+        <p:txBody>
           <a:bodyPr>
             <a:normAutofit/>
           </a:bodyPr>
           <a:lstStyle/>
           <a:p>
             <a:r>
-              <a:rPr lang="en-US" sz="3600" dirty="0" smtClean="0"/>
-              <a:t>Add Google Play Services Library - Eclipse</a:t>
-            </a:r>
-            <a:endParaRPr lang="en-US" sz="3600" dirty="0"/>
-          </a:p>
-        </p:txBody>
-      </p:sp>
-      <p:sp>
-        <p:nvSpPr>
-          <p:cNvPr id="3" name="Content Placeholder 2"/>
-          <p:cNvSpPr>
-            <a:spLocks noGrp="1"/>
-          </p:cNvSpPr>
-          <p:nvPr>
-            <p:ph idx="1"/>
-          </p:nvPr>
-        </p:nvSpPr>
-        <p:spPr/>
-        <p:txBody>
-          <a:bodyPr>
-            <a:normAutofit/>
-          </a:bodyPr>
-          <a:lstStyle/>
-          <a:p>
-            <a:r>
-              <a:rPr lang="en-US" sz="2800" dirty="0" smtClean="0"/>
-              <a:t>Copy library project </a:t>
-            </a:r>
-            <a:r>
-              <a:rPr lang="en-US" sz="2800" dirty="0"/>
-              <a:t>from &lt;android-sdk&gt;/extras/google/google_play_services/libproject/google-play-services_lib</a:t>
-            </a:r>
-            <a:r>
-              <a:rPr lang="en-US" sz="2800" dirty="0" smtClean="0"/>
-              <a:t>/ to your Android app project directory</a:t>
-            </a:r>
-          </a:p>
-          <a:p>
-            <a:r>
-              <a:rPr lang="en-US" sz="2800" dirty="0" smtClean="0"/>
-              <a:t>Import library project into your Eclipse workspace</a:t>
+              <a:rPr lang="en-US" dirty="0" smtClean="0"/>
+              <a:t>Open the Google Developers </a:t>
+            </a:r>
+            <a:r>
+              <a:rPr lang="en-US" dirty="0" smtClean="0"/>
+              <a:t>Console</a:t>
             </a:r>
           </a:p>
           <a:p>
             <a:pPr lvl="1"/>
             <a:r>
-              <a:rPr lang="en-US" sz="2400" dirty="0"/>
-              <a:t>Click File &gt; Import, select Android &gt; Existing Android Code into Workspace, and browse to the copy of the library project to import </a:t>
-            </a:r>
-            <a:r>
-              <a:rPr lang="en-US" sz="2400" dirty="0" smtClean="0"/>
-              <a:t>it</a:t>
+              <a:rPr lang="en-US" sz="2400" dirty="0" smtClean="0">
+                <a:hlinkClick r:id="rId2"/>
+              </a:rPr>
+              <a:t>https</a:t>
+            </a:r>
+            <a:r>
+              <a:rPr lang="en-US" sz="2000" dirty="0">
+                <a:hlinkClick r:id="rId2"/>
+              </a:rPr>
+              <a:t>://</a:t>
+            </a:r>
+            <a:r>
+              <a:rPr lang="en-US" sz="2400" dirty="0" smtClean="0">
+                <a:hlinkClick r:id="rId2"/>
+              </a:rPr>
+              <a:t>console.developers.google.com/project</a:t>
+            </a:r>
+            <a:endParaRPr lang="en-US" sz="2000" dirty="0" smtClean="0"/>
+          </a:p>
+          <a:p>
+            <a:r>
+              <a:rPr lang="en-US" dirty="0" smtClean="0"/>
+              <a:t>Click Create Project</a:t>
+            </a:r>
+          </a:p>
+          <a:p>
+            <a:r>
+              <a:rPr lang="en-US" dirty="0" smtClean="0"/>
+              <a:t>Enter the project’s </a:t>
+            </a:r>
+            <a:r>
+              <a:rPr lang="en-US" dirty="0" smtClean="0"/>
+              <a:t>name</a:t>
             </a:r>
             <a:endParaRPr lang="en-US" dirty="0" smtClean="0"/>
+          </a:p>
+          <a:p>
+            <a:r>
+              <a:rPr lang="en-US" b="1" dirty="0" smtClean="0">
+                <a:solidFill>
+                  <a:srgbClr val="800000"/>
+                </a:solidFill>
+              </a:rPr>
+              <a:t>IMPORTANT:</a:t>
+            </a:r>
+            <a:r>
+              <a:rPr lang="en-US" dirty="0" smtClean="0"/>
+              <a:t> Note the project </a:t>
+            </a:r>
+            <a:r>
+              <a:rPr lang="en-US" dirty="0" smtClean="0"/>
+              <a:t>number</a:t>
+            </a:r>
+          </a:p>
+          <a:p>
+            <a:pPr lvl="1"/>
+            <a:r>
+              <a:rPr lang="en-US" dirty="0" smtClean="0"/>
+              <a:t>Used </a:t>
+            </a:r>
+            <a:r>
+              <a:rPr lang="en-US" dirty="0" smtClean="0"/>
+              <a:t>later as GCM sender ID inside app when registering with </a:t>
+            </a:r>
+            <a:r>
+              <a:rPr lang="en-US" dirty="0" smtClean="0"/>
+              <a:t>GCM</a:t>
+            </a:r>
+          </a:p>
+          <a:p>
+            <a:r>
+              <a:rPr lang="en-US" sz="3200" dirty="0" smtClean="0"/>
+              <a:t>DEMO</a:t>
+            </a:r>
+            <a:endParaRPr lang="en-US" sz="3200" dirty="0" smtClean="0"/>
           </a:p>
           <a:p>
             <a:endParaRPr lang="en-US" sz="2800" dirty="0"/>
@@ -4216,7 +4355,7 @@
     </p:spTree>
     <p:extLst>
       <p:ext uri="{BB962C8B-B14F-4D97-AF65-F5344CB8AC3E}">
-        <p14:creationId xmlns:p14="http://schemas.microsoft.com/office/powerpoint/2010/main" val="2482566287"/>
+        <p14:creationId xmlns:p14="http://schemas.microsoft.com/office/powerpoint/2010/main" val="4033455311"/>
       </p:ext>
     </p:extLst>
   </p:cSld>
@@ -4255,96 +4394,133 @@
         </p:nvSpPr>
         <p:spPr/>
         <p:txBody>
+          <a:bodyPr/>
+          <a:lstStyle/>
+          <a:p>
+            <a:r>
+              <a:rPr lang="en-US" dirty="0" smtClean="0"/>
+              <a:t>Create Google API Project</a:t>
+            </a:r>
+            <a:endParaRPr lang="en-US" dirty="0"/>
+          </a:p>
+        </p:txBody>
+      </p:sp>
+      <p:sp>
+        <p:nvSpPr>
+          <p:cNvPr id="3" name="Content Placeholder 2"/>
+          <p:cNvSpPr>
+            <a:spLocks noGrp="1"/>
+          </p:cNvSpPr>
+          <p:nvPr>
+            <p:ph idx="1"/>
+          </p:nvPr>
+        </p:nvSpPr>
+        <p:spPr/>
+        <p:txBody>
           <a:bodyPr>
-            <a:normAutofit/>
+            <a:normAutofit fontScale="92500" lnSpcReduction="10000"/>
           </a:bodyPr>
           <a:lstStyle/>
           <a:p>
             <a:r>
-              <a:rPr lang="en-US" sz="3600" dirty="0"/>
-              <a:t>Add Google Play Services Library - Eclipse</a:t>
-            </a:r>
-          </a:p>
-        </p:txBody>
-      </p:sp>
-      <p:sp>
-        <p:nvSpPr>
-          <p:cNvPr id="3" name="Content Placeholder 2"/>
-          <p:cNvSpPr>
-            <a:spLocks noGrp="1"/>
-          </p:cNvSpPr>
-          <p:nvPr>
-            <p:ph idx="1"/>
-          </p:nvPr>
-        </p:nvSpPr>
-        <p:spPr>
-          <a:xfrm>
-            <a:off x="457200" y="1600200"/>
-            <a:ext cx="8229600" cy="4267199"/>
-          </a:xfrm>
-        </p:spPr>
-        <p:txBody>
-          <a:bodyPr>
-            <a:noAutofit/>
-          </a:bodyPr>
-          <a:lstStyle/>
-          <a:p>
-            <a:r>
-              <a:rPr lang="en-US" sz="2800" dirty="0"/>
-              <a:t>Add Project Reference </a:t>
-            </a:r>
-            <a:r>
-              <a:rPr lang="en-US" sz="2800" dirty="0" smtClean="0"/>
-              <a:t>for library project to </a:t>
-            </a:r>
-            <a:r>
-              <a:rPr lang="en-US" sz="2800" dirty="0"/>
-              <a:t>your Android app project</a:t>
+              <a:rPr lang="en-US" dirty="0"/>
+              <a:t>Obtain the </a:t>
+            </a:r>
+            <a:r>
+              <a:rPr lang="en-US" dirty="0" smtClean="0"/>
+              <a:t>Server API </a:t>
+            </a:r>
+            <a:r>
+              <a:rPr lang="en-US" dirty="0"/>
+              <a:t>key</a:t>
             </a:r>
           </a:p>
           <a:p>
             <a:pPr lvl="1"/>
             <a:r>
-              <a:rPr lang="en-US" sz="2400" dirty="0" smtClean="0"/>
-              <a:t>Right-click on Android app project and select Properties</a:t>
+              <a:rPr lang="en-US" dirty="0"/>
+              <a:t>Click Credentials under APIs &amp; auth in left sidebar</a:t>
             </a:r>
           </a:p>
           <a:p>
             <a:pPr lvl="1"/>
             <a:r>
-              <a:rPr lang="en-US" sz="2400" dirty="0" smtClean="0"/>
-              <a:t>Select </a:t>
-            </a:r>
-            <a:r>
-              <a:rPr lang="en-US" sz="2400" dirty="0"/>
-              <a:t>the "Android" properties </a:t>
-            </a:r>
-            <a:r>
-              <a:rPr lang="en-US" sz="2400" dirty="0" smtClean="0"/>
-              <a:t>group</a:t>
+              <a:rPr lang="en-US" dirty="0"/>
+              <a:t>Under Public API access, click Create </a:t>
+            </a:r>
+            <a:r>
+              <a:rPr lang="en-US" dirty="0" smtClean="0"/>
+              <a:t>new </a:t>
+            </a:r>
+            <a:r>
+              <a:rPr lang="en-US" dirty="0"/>
+              <a:t>Key</a:t>
             </a:r>
           </a:p>
           <a:p>
             <a:pPr lvl="1"/>
             <a:r>
-              <a:rPr lang="en-US" sz="2400" dirty="0" smtClean="0"/>
-              <a:t>Click Add… under Library and select the imported google-play-</a:t>
-            </a:r>
-            <a:r>
-              <a:rPr lang="en-US" sz="2400" dirty="0" err="1" smtClean="0"/>
-              <a:t>services_lib</a:t>
-            </a:r>
-            <a:r>
-              <a:rPr lang="en-US" sz="2400" dirty="0" smtClean="0"/>
-              <a:t> project</a:t>
-            </a:r>
+              <a:rPr lang="en-US" dirty="0"/>
+              <a:t>In Create a new key dialog, click Server </a:t>
+            </a:r>
+            <a:r>
+              <a:rPr lang="en-US" dirty="0" smtClean="0"/>
+              <a:t>key</a:t>
+            </a:r>
+          </a:p>
+          <a:p>
+            <a:pPr lvl="1"/>
+            <a:r>
+              <a:rPr lang="en-US" dirty="0" smtClean="0"/>
+              <a:t>In Create a server key and configure allowed IPs dialog, leave entry box blank and click Create</a:t>
+            </a:r>
+          </a:p>
+          <a:p>
+            <a:pPr lvl="1"/>
+            <a:r>
+              <a:rPr lang="en-US" b="1" dirty="0" smtClean="0">
+                <a:solidFill>
+                  <a:srgbClr val="800000"/>
+                </a:solidFill>
+              </a:rPr>
+              <a:t>IMPORTANT: </a:t>
+            </a:r>
+            <a:r>
+              <a:rPr lang="en-US" dirty="0" smtClean="0"/>
+              <a:t>Note the API </a:t>
+            </a:r>
+            <a:r>
+              <a:rPr lang="en-US" dirty="0" smtClean="0"/>
+              <a:t>key</a:t>
+            </a:r>
+          </a:p>
+          <a:p>
+            <a:pPr lvl="2"/>
+            <a:r>
+              <a:rPr lang="en-US" dirty="0" smtClean="0"/>
+              <a:t>Used </a:t>
+            </a:r>
+            <a:r>
+              <a:rPr lang="en-US" dirty="0" smtClean="0"/>
+              <a:t>by server as authorization key in HTTP Authorization header when posting notification messages</a:t>
+            </a:r>
+          </a:p>
+          <a:p>
+            <a:r>
+              <a:rPr lang="en-US" dirty="0" smtClean="0"/>
+              <a:t>DEMO</a:t>
+            </a:r>
+            <a:endParaRPr lang="en-US" dirty="0"/>
+          </a:p>
+          <a:p>
+            <a:endParaRPr lang="en-US" dirty="0"/>
           </a:p>
         </p:txBody>
       </p:sp>
     </p:spTree>
     <p:extLst>
       <p:ext uri="{BB962C8B-B14F-4D97-AF65-F5344CB8AC3E}">
-        <p14:creationId xmlns:p14="http://schemas.microsoft.com/office/powerpoint/2010/main" val="581338712"/>
+        <p14:creationId xmlns:p14="http://schemas.microsoft.com/office/powerpoint/2010/main" val="2396239310"/>
       </p:ext>
     </p:extLst>
   </p:cSld>
@@ -4383,209 +4559,127 @@
         </p:nvSpPr>
         <p:spPr/>
         <p:txBody>
+          <a:bodyPr/>
+          <a:lstStyle/>
+          <a:p>
+            <a:r>
+              <a:rPr lang="en-US" dirty="0" smtClean="0"/>
+              <a:t>Get a Configuration File</a:t>
+            </a:r>
+            <a:endParaRPr lang="en-US" dirty="0"/>
+          </a:p>
+        </p:txBody>
+      </p:sp>
+      <p:sp>
+        <p:nvSpPr>
+          <p:cNvPr id="3" name="Content Placeholder 2"/>
+          <p:cNvSpPr>
+            <a:spLocks noGrp="1"/>
+          </p:cNvSpPr>
+          <p:nvPr>
+            <p:ph idx="1"/>
+          </p:nvPr>
+        </p:nvSpPr>
+        <p:spPr/>
+        <p:txBody>
           <a:bodyPr>
-            <a:noAutofit/>
+            <a:normAutofit fontScale="92500" lnSpcReduction="20000"/>
           </a:bodyPr>
           <a:lstStyle/>
           <a:p>
             <a:r>
-              <a:rPr lang="en-US" sz="3600" dirty="0" smtClean="0"/>
-              <a:t>Add Google Play Services Library –</a:t>
-            </a:r>
-            <a:br>
-              <a:rPr lang="en-US" sz="3600" dirty="0" smtClean="0"/>
-            </a:br>
-            <a:r>
-              <a:rPr lang="en-US" sz="3600" dirty="0" smtClean="0"/>
-              <a:t>Android Studio</a:t>
-            </a:r>
-            <a:endParaRPr lang="en-US" sz="3600" dirty="0"/>
-          </a:p>
-        </p:txBody>
-      </p:sp>
-      <p:sp>
-        <p:nvSpPr>
-          <p:cNvPr id="3" name="Content Placeholder 2"/>
-          <p:cNvSpPr>
-            <a:spLocks noGrp="1"/>
-          </p:cNvSpPr>
-          <p:nvPr>
-            <p:ph idx="1"/>
-          </p:nvPr>
-        </p:nvSpPr>
-        <p:spPr>
-          <a:xfrm>
-            <a:off x="457200" y="1608827"/>
-            <a:ext cx="8229600" cy="1362973"/>
-          </a:xfrm>
-        </p:spPr>
-        <p:txBody>
-          <a:bodyPr>
-            <a:normAutofit/>
-          </a:bodyPr>
-          <a:lstStyle/>
-          <a:p>
-            <a:r>
               <a:rPr lang="en-US" sz="2400" dirty="0" smtClean="0"/>
-              <a:t>New Android build system based on Gradle</a:t>
+              <a:t>Enables Google Cloud Messaging service for your app</a:t>
+            </a:r>
+          </a:p>
+          <a:p>
+            <a:pPr lvl="1"/>
+            <a:r>
+              <a:rPr lang="en-US" sz="2000" dirty="0" smtClean="0"/>
+              <a:t>Parsed by Google Services plugin during app build</a:t>
             </a:r>
           </a:p>
           <a:p>
             <a:r>
               <a:rPr lang="en-US" sz="2400" dirty="0" smtClean="0"/>
-              <a:t>Much simpler...</a:t>
-            </a:r>
+              <a:t>Open Get a configuration file</a:t>
+            </a:r>
+            <a:endParaRPr lang="en-US" sz="2400" dirty="0"/>
+          </a:p>
+          <a:p>
+            <a:pPr lvl="1"/>
+            <a:r>
+              <a:rPr lang="en-US" sz="1600" dirty="0">
+                <a:hlinkClick r:id="rId2"/>
+              </a:rPr>
+              <a:t>https://</a:t>
+            </a:r>
+            <a:r>
+              <a:rPr lang="en-US" sz="1600" dirty="0" smtClean="0">
+                <a:hlinkClick r:id="rId2"/>
+              </a:rPr>
+              <a:t>developers.google.com/cloud-messaging/android/client#get-config</a:t>
+            </a:r>
+            <a:endParaRPr lang="en-US" sz="1800" dirty="0" smtClean="0"/>
           </a:p>
           <a:p>
             <a:r>
               <a:rPr lang="en-US" sz="2400" dirty="0" smtClean="0"/>
-              <a:t>Inside build.gradle, add the following dependencies</a:t>
-            </a:r>
-            <a:endParaRPr lang="en-US" sz="2400" dirty="0"/>
-          </a:p>
-        </p:txBody>
-      </p:sp>
-      <p:sp>
-        <p:nvSpPr>
-          <p:cNvPr id="4" name="TextBox 3"/>
-          <p:cNvSpPr txBox="1"/>
-          <p:nvPr/>
-        </p:nvSpPr>
-        <p:spPr>
-          <a:xfrm>
-            <a:off x="457200" y="2971800"/>
-            <a:ext cx="8229600" cy="830997"/>
-          </a:xfrm>
-          <a:prstGeom prst="rect">
-            <a:avLst/>
-          </a:prstGeom>
-          <a:solidFill>
-            <a:schemeClr val="bg1">
-              <a:lumMod val="85000"/>
-            </a:schemeClr>
-          </a:solidFill>
-          <a:ln>
-            <a:solidFill>
-              <a:schemeClr val="tx1"/>
-            </a:solidFill>
-          </a:ln>
-        </p:spPr>
-        <p:txBody>
-          <a:bodyPr wrap="square" rtlCol="0">
-            <a:spAutoFit/>
-          </a:bodyPr>
-          <a:lstStyle/>
-          <a:p>
-            <a:r>
-              <a:rPr lang="en-US" sz="1200" dirty="0" smtClean="0">
-                <a:latin typeface="Courier"/>
-              </a:rPr>
-              <a:t>dependencies </a:t>
-            </a:r>
-            <a:r>
-              <a:rPr lang="en-US" sz="1200" dirty="0">
-                <a:latin typeface="Courier"/>
-              </a:rPr>
-              <a:t>{</a:t>
-            </a:r>
-            <a:br>
-              <a:rPr lang="en-US" sz="1200" dirty="0">
-                <a:latin typeface="Courier"/>
-              </a:rPr>
-            </a:br>
-            <a:r>
-              <a:rPr lang="en-US" sz="1200" dirty="0">
-                <a:latin typeface="Courier"/>
-              </a:rPr>
-              <a:t>    compile </a:t>
-            </a:r>
-            <a:r>
-              <a:rPr lang="en-US" sz="1200" b="1" dirty="0" smtClean="0">
-                <a:latin typeface="Courier"/>
-              </a:rPr>
-              <a:t>'com.android.support:appcompat-v7:21.+'</a:t>
-            </a:r>
-            <a:r>
-              <a:rPr lang="en-US" sz="1200" b="1" dirty="0">
-                <a:latin typeface="Courier"/>
-              </a:rPr>
-              <a:t/>
-            </a:r>
-            <a:br>
-              <a:rPr lang="en-US" sz="1200" b="1" dirty="0">
-                <a:latin typeface="Courier"/>
-              </a:rPr>
-            </a:br>
-            <a:r>
-              <a:rPr lang="en-US" sz="1200" b="1" dirty="0">
-                <a:latin typeface="Courier"/>
-              </a:rPr>
-              <a:t>    </a:t>
-            </a:r>
-            <a:r>
-              <a:rPr lang="en-US" sz="1200" dirty="0">
-                <a:latin typeface="Courier"/>
-              </a:rPr>
-              <a:t>compile </a:t>
-            </a:r>
-            <a:r>
-              <a:rPr lang="en-US" sz="1200" b="1" dirty="0" smtClean="0">
-                <a:latin typeface="Courier"/>
-              </a:rPr>
-              <a:t>'com.google.android.gms:play-services:6.1+'</a:t>
-            </a:r>
-            <a:r>
-              <a:rPr lang="en-US" sz="1200" b="1" dirty="0">
-                <a:latin typeface="Courier"/>
-              </a:rPr>
-              <a:t/>
-            </a:r>
-            <a:br>
-              <a:rPr lang="en-US" sz="1200" b="1" dirty="0">
-                <a:latin typeface="Courier"/>
-              </a:rPr>
-            </a:br>
-            <a:r>
-              <a:rPr lang="en-US" sz="1200" dirty="0" smtClean="0">
-                <a:latin typeface="Courier"/>
-              </a:rPr>
-              <a:t>}</a:t>
-            </a:r>
-            <a:endParaRPr lang="en-US" sz="1200" dirty="0">
-              <a:latin typeface="Courier"/>
-              <a:cs typeface="Courier"/>
-            </a:endParaRPr>
-          </a:p>
-        </p:txBody>
-      </p:sp>
-      <p:sp>
-        <p:nvSpPr>
-          <p:cNvPr id="5" name="Rectangle 4"/>
-          <p:cNvSpPr/>
-          <p:nvPr/>
-        </p:nvSpPr>
-        <p:spPr>
-          <a:xfrm>
-            <a:off x="457200" y="3886200"/>
-            <a:ext cx="8229600" cy="830997"/>
-          </a:xfrm>
-          <a:prstGeom prst="rect">
-            <a:avLst/>
-          </a:prstGeom>
-        </p:spPr>
-        <p:txBody>
-          <a:bodyPr wrap="square">
-            <a:spAutoFit/>
-          </a:bodyPr>
-          <a:lstStyle/>
-          <a:p>
-            <a:pPr marL="342900" indent="-342900">
-              <a:buFont typeface="Arial" panose="020B0604020202020204" pitchFamily="34" charset="0"/>
-              <a:buChar char="•"/>
-            </a:pPr>
+              <a:t>Click GET CONFIGURATION FILE</a:t>
+            </a:r>
+          </a:p>
+          <a:p>
             <a:r>
               <a:rPr lang="en-US" sz="2400" dirty="0" smtClean="0"/>
-              <a:t>Gradle build will run tasks to get dependencies from Android SDK</a:t>
+              <a:t>Choose existing Google API project name in App name drop down</a:t>
+            </a:r>
+          </a:p>
+          <a:p>
+            <a:r>
+              <a:rPr lang="en-US" sz="2400" dirty="0" smtClean="0"/>
+              <a:t>Enter Android package name for your app</a:t>
+            </a:r>
+          </a:p>
+          <a:p>
+            <a:r>
+              <a:rPr lang="en-US" sz="2400" dirty="0" smtClean="0"/>
+              <a:t>Click CONTINUE TO Choose and configure services</a:t>
+            </a:r>
+          </a:p>
+          <a:p>
+            <a:r>
+              <a:rPr lang="en-US" sz="2400" dirty="0" smtClean="0"/>
+              <a:t>Click ENABLE GOOGLE CLOUD MESSAGING</a:t>
+            </a:r>
+          </a:p>
+          <a:p>
+            <a:r>
+              <a:rPr lang="en-US" sz="2400" dirty="0" smtClean="0"/>
+              <a:t>Click CONTINUE TO Generate configuration files</a:t>
+            </a:r>
+          </a:p>
+          <a:p>
+            <a:r>
+              <a:rPr lang="en-US" sz="2400" dirty="0" smtClean="0"/>
+              <a:t>Click Download google-</a:t>
+            </a:r>
+            <a:r>
+              <a:rPr lang="en-US" sz="2400" dirty="0" err="1" smtClean="0"/>
+              <a:t>services.json</a:t>
+            </a:r>
+            <a:endParaRPr lang="en-US" sz="2400" dirty="0" smtClean="0"/>
+          </a:p>
+          <a:p>
+            <a:pPr lvl="1"/>
+            <a:r>
+              <a:rPr lang="en-US" sz="2000" dirty="0" smtClean="0"/>
+              <a:t>This will get placed in root directory of your project</a:t>
+            </a:r>
+          </a:p>
+          <a:p>
+            <a:r>
+              <a:rPr lang="en-US" sz="2400" dirty="0" smtClean="0"/>
+              <a:t>DEMO</a:t>
             </a:r>
             <a:endParaRPr lang="en-US" sz="2400" dirty="0"/>
           </a:p>
@@ -4594,7 +4688,7 @@
     </p:spTree>
     <p:extLst>
       <p:ext uri="{BB962C8B-B14F-4D97-AF65-F5344CB8AC3E}">
-        <p14:creationId xmlns:p14="http://schemas.microsoft.com/office/powerpoint/2010/main" val="3695063026"/>
+        <p14:creationId xmlns:p14="http://schemas.microsoft.com/office/powerpoint/2010/main" val="492067917"/>
       </p:ext>
     </p:extLst>
   </p:cSld>
@@ -4633,20 +4727,27 @@
         </p:nvSpPr>
         <p:spPr/>
         <p:txBody>
-          <a:bodyPr/>
+          <a:bodyPr>
+            <a:noAutofit/>
+          </a:bodyPr>
           <a:lstStyle/>
           <a:p>
             <a:r>
-              <a:rPr lang="en-US" dirty="0"/>
-              <a:t>Add Google Play Services Library</a:t>
-            </a:r>
-          </a:p>
-        </p:txBody>
-      </p:sp>
-      <p:sp>
-        <p:nvSpPr>
-          <p:cNvPr id="4" name="Content Placeholder 3"/>
-          <p:cNvSpPr txBox="1">
+              <a:rPr lang="en-US" sz="3600" dirty="0" smtClean="0"/>
+              <a:t>Add Google Play Services </a:t>
+            </a:r>
+            <a:r>
+              <a:rPr lang="en-US" sz="3600" dirty="0" smtClean="0"/>
+              <a:t>Library</a:t>
+            </a:r>
+            <a:endParaRPr lang="en-US" sz="3600" dirty="0"/>
+          </a:p>
+        </p:txBody>
+      </p:sp>
+      <p:sp>
+        <p:nvSpPr>
+          <p:cNvPr id="3" name="Content Placeholder 2"/>
+          <p:cNvSpPr>
             <a:spLocks noGrp="1"/>
           </p:cNvSpPr>
           <p:nvPr>
@@ -4655,8 +4756,46 @@
         </p:nvSpPr>
         <p:spPr>
           <a:xfrm>
-            <a:off x="457200" y="2286000"/>
-            <a:ext cx="8229600" cy="457200"/>
+            <a:off x="457200" y="1608827"/>
+            <a:ext cx="8229600" cy="1362973"/>
+          </a:xfrm>
+        </p:spPr>
+        <p:txBody>
+          <a:bodyPr>
+            <a:normAutofit/>
+          </a:bodyPr>
+          <a:lstStyle/>
+          <a:p>
+            <a:r>
+              <a:rPr lang="en-US" sz="2400" dirty="0" smtClean="0"/>
+              <a:t>New Android build system based on Gradle</a:t>
+            </a:r>
+          </a:p>
+          <a:p>
+            <a:r>
+              <a:rPr lang="en-US" sz="2400" dirty="0" smtClean="0"/>
+              <a:t>Much simpler...</a:t>
+            </a:r>
+          </a:p>
+          <a:p>
+            <a:r>
+              <a:rPr lang="en-US" sz="2400" dirty="0" smtClean="0"/>
+              <a:t>Inside build.gradle, add the following dependencies</a:t>
+            </a:r>
+            <a:endParaRPr lang="en-US" sz="2400" dirty="0"/>
+          </a:p>
+        </p:txBody>
+      </p:sp>
+      <p:sp>
+        <p:nvSpPr>
+          <p:cNvPr id="4" name="TextBox 3"/>
+          <p:cNvSpPr txBox="1"/>
+          <p:nvPr/>
+        </p:nvSpPr>
+        <p:spPr>
+          <a:xfrm>
+            <a:off x="457200" y="2971800"/>
+            <a:ext cx="8229600" cy="830997"/>
           </a:xfrm>
           <a:prstGeom prst="rect">
             <a:avLst/>
@@ -4674,545 +4813,129 @@
         </p:spPr>
         <p:txBody>
           <a:bodyPr wrap="square" rtlCol="0">
-            <a:noAutofit/>
+            <a:spAutoFit/>
           </a:bodyPr>
           <a:lstStyle/>
           <a:p>
-            <a:pPr marL="457200" lvl="1" indent="0">
-              <a:buNone/>
-            </a:pPr>
             <a:r>
               <a:rPr lang="en-US" sz="1200" dirty="0" smtClean="0">
                 <a:latin typeface="Courier"/>
-                <a:cs typeface="Courier"/>
               </a:rPr>
-              <a:t>&lt;</a:t>
+              <a:t>dependencies </a:t>
             </a:r>
             <a:r>
               <a:rPr lang="en-US" sz="1200" dirty="0">
                 <a:latin typeface="Courier"/>
-                <a:cs typeface="Courier"/>
               </a:rPr>
-              <a:t>meta-data android:name="com.google.android.gms.version" android:value="@integer/google_play_services_version" /&gt;</a:t>
-            </a:r>
-          </a:p>
-        </p:txBody>
-      </p:sp>
-      <p:sp>
-        <p:nvSpPr>
-          <p:cNvPr id="5" name="Content Placeholder 2"/>
-          <p:cNvSpPr txBox="1">
-            <a:spLocks/>
-          </p:cNvSpPr>
+              <a:t>{</a:t>
+            </a:r>
+            <a:br>
+              <a:rPr lang="en-US" sz="1200" dirty="0">
+                <a:latin typeface="Courier"/>
+              </a:rPr>
+            </a:br>
+            <a:r>
+              <a:rPr lang="en-US" sz="1200" dirty="0">
+                <a:latin typeface="Courier"/>
+              </a:rPr>
+              <a:t>    compile </a:t>
+            </a:r>
+            <a:r>
+              <a:rPr lang="en-US" sz="1200" b="1" dirty="0" smtClean="0">
+                <a:latin typeface="Courier"/>
+              </a:rPr>
+              <a:t>'com.android.support:appcompat-v7:22.+'</a:t>
+            </a:r>
+            <a:r>
+              <a:rPr lang="en-US" sz="1200" b="1" dirty="0">
+                <a:latin typeface="Courier"/>
+              </a:rPr>
+              <a:t/>
+            </a:r>
+            <a:br>
+              <a:rPr lang="en-US" sz="1200" b="1" dirty="0">
+                <a:latin typeface="Courier"/>
+              </a:rPr>
+            </a:br>
+            <a:r>
+              <a:rPr lang="en-US" sz="1200" b="1" dirty="0">
+                <a:latin typeface="Courier"/>
+              </a:rPr>
+              <a:t>    </a:t>
+            </a:r>
+            <a:r>
+              <a:rPr lang="en-US" sz="1200" dirty="0">
+                <a:latin typeface="Courier"/>
+              </a:rPr>
+              <a:t>compile </a:t>
+            </a:r>
+            <a:r>
+              <a:rPr lang="en-US" sz="1200" b="1" dirty="0" smtClean="0">
+                <a:latin typeface="Courier"/>
+              </a:rPr>
+              <a:t>'com.google.android.gms:play-services:7.5+'</a:t>
+            </a:r>
+            <a:r>
+              <a:rPr lang="en-US" sz="1200" b="1" dirty="0">
+                <a:latin typeface="Courier"/>
+              </a:rPr>
+              <a:t/>
+            </a:r>
+            <a:br>
+              <a:rPr lang="en-US" sz="1200" b="1" dirty="0">
+                <a:latin typeface="Courier"/>
+              </a:rPr>
+            </a:br>
+            <a:r>
+              <a:rPr lang="en-US" sz="1200" dirty="0" smtClean="0">
+                <a:latin typeface="Courier"/>
+              </a:rPr>
+              <a:t>}</a:t>
+            </a:r>
+            <a:endParaRPr lang="en-US" sz="1200" dirty="0">
+              <a:latin typeface="Courier"/>
+              <a:cs typeface="Courier"/>
+            </a:endParaRPr>
+          </a:p>
+        </p:txBody>
+      </p:sp>
+      <p:sp>
+        <p:nvSpPr>
+          <p:cNvPr id="5" name="Rectangle 4"/>
+          <p:cNvSpPr/>
           <p:nvPr/>
         </p:nvSpPr>
         <p:spPr>
           <a:xfrm>
-            <a:off x="457200" y="1600201"/>
-            <a:ext cx="8229600" cy="685799"/>
+            <a:off x="457200" y="3886200"/>
+            <a:ext cx="8229600" cy="830997"/>
           </a:xfrm>
           <a:prstGeom prst="rect">
             <a:avLst/>
           </a:prstGeom>
         </p:spPr>
         <p:txBody>
-          <a:bodyPr vert="horz" lIns="91440" tIns="45720" rIns="91440" bIns="45720" rtlCol="0">
-            <a:noAutofit/>
-          </a:bodyPr>
-          <a:lstStyle>
-            <a:lvl1pPr marL="342900" indent="-342900" algn="l" defTabSz="914400" rtl="0" eaLnBrk="1" latinLnBrk="0" hangingPunct="1">
-              <a:spcBef>
-                <a:spcPct val="20000"/>
-              </a:spcBef>
-              <a:buFont typeface="Arial" panose="020B0604020202020204" pitchFamily="34" charset="0"/>
-              <a:buChar char="•"/>
-              <a:defRPr sz="3200" kern="1200">
-                <a:solidFill>
-                  <a:schemeClr val="tx1"/>
-                </a:solidFill>
-                <a:latin typeface="+mn-lt"/>
-                <a:ea typeface="+mn-ea"/>
-                <a:cs typeface="+mn-cs"/>
-              </a:defRPr>
-            </a:lvl1pPr>
-            <a:lvl2pPr marL="742950" indent="-285750" algn="l" defTabSz="914400" rtl="0" eaLnBrk="1" latinLnBrk="0" hangingPunct="1">
-              <a:spcBef>
-                <a:spcPct val="20000"/>
-              </a:spcBef>
-              <a:buFont typeface="Arial" panose="020B0604020202020204" pitchFamily="34" charset="0"/>
-              <a:buChar char="–"/>
-              <a:defRPr sz="2800" kern="1200">
-                <a:solidFill>
-                  <a:schemeClr val="tx1"/>
-                </a:solidFill>
-                <a:latin typeface="+mn-lt"/>
-                <a:ea typeface="+mn-ea"/>
-                <a:cs typeface="+mn-cs"/>
-              </a:defRPr>
-            </a:lvl2pPr>
-            <a:lvl3pPr marL="1143000" indent="-228600" algn="l" defTabSz="914400" rtl="0" eaLnBrk="1" latinLnBrk="0" hangingPunct="1">
-              <a:spcBef>
-                <a:spcPct val="20000"/>
-              </a:spcBef>
-              <a:buFont typeface="Arial" panose="020B0604020202020204" pitchFamily="34" charset="0"/>
-              <a:buChar char="•"/>
-              <a:defRPr sz="2400" kern="1200">
-                <a:solidFill>
-                  <a:schemeClr val="tx1"/>
-                </a:solidFill>
-                <a:latin typeface="+mn-lt"/>
-                <a:ea typeface="+mn-ea"/>
-                <a:cs typeface="+mn-cs"/>
-              </a:defRPr>
-            </a:lvl3pPr>
-            <a:lvl4pPr marL="1600200" indent="-228600" algn="l" defTabSz="914400" rtl="0" eaLnBrk="1" latinLnBrk="0" hangingPunct="1">
-              <a:spcBef>
-                <a:spcPct val="20000"/>
-              </a:spcBef>
-              <a:buFont typeface="Arial" panose="020B0604020202020204" pitchFamily="34" charset="0"/>
-              <a:buChar char="–"/>
-              <a:defRPr sz="2000" kern="1200">
-                <a:solidFill>
-                  <a:schemeClr val="tx1"/>
-                </a:solidFill>
-                <a:latin typeface="+mn-lt"/>
-                <a:ea typeface="+mn-ea"/>
-                <a:cs typeface="+mn-cs"/>
-              </a:defRPr>
-            </a:lvl4pPr>
-            <a:lvl5pPr marL="2057400" indent="-228600" algn="l" defTabSz="914400" rtl="0" eaLnBrk="1" latinLnBrk="0" hangingPunct="1">
-              <a:spcBef>
-                <a:spcPct val="20000"/>
-              </a:spcBef>
-              <a:buFont typeface="Arial" panose="020B0604020202020204" pitchFamily="34" charset="0"/>
-              <a:buChar char="»"/>
-              <a:defRPr sz="2000" kern="1200">
-                <a:solidFill>
-                  <a:schemeClr val="tx1"/>
-                </a:solidFill>
-                <a:latin typeface="+mn-lt"/>
-                <a:ea typeface="+mn-ea"/>
-                <a:cs typeface="+mn-cs"/>
-              </a:defRPr>
-            </a:lvl5pPr>
-            <a:lvl6pPr marL="2514600" indent="-228600" algn="l" defTabSz="914400" rtl="0" eaLnBrk="1" latinLnBrk="0" hangingPunct="1">
-              <a:spcBef>
-                <a:spcPct val="20000"/>
-              </a:spcBef>
-              <a:buFont typeface="Arial" panose="020B0604020202020204" pitchFamily="34" charset="0"/>
-              <a:buChar char="•"/>
-              <a:defRPr sz="2000" kern="1200">
-                <a:solidFill>
-                  <a:schemeClr val="tx1"/>
-                </a:solidFill>
-                <a:latin typeface="+mn-lt"/>
-                <a:ea typeface="+mn-ea"/>
-                <a:cs typeface="+mn-cs"/>
-              </a:defRPr>
-            </a:lvl6pPr>
-            <a:lvl7pPr marL="2971800" indent="-228600" algn="l" defTabSz="914400" rtl="0" eaLnBrk="1" latinLnBrk="0" hangingPunct="1">
-              <a:spcBef>
-                <a:spcPct val="20000"/>
-              </a:spcBef>
-              <a:buFont typeface="Arial" panose="020B0604020202020204" pitchFamily="34" charset="0"/>
-              <a:buChar char="•"/>
-              <a:defRPr sz="2000" kern="1200">
-                <a:solidFill>
-                  <a:schemeClr val="tx1"/>
-                </a:solidFill>
-                <a:latin typeface="+mn-lt"/>
-                <a:ea typeface="+mn-ea"/>
-                <a:cs typeface="+mn-cs"/>
-              </a:defRPr>
-            </a:lvl7pPr>
-            <a:lvl8pPr marL="3429000" indent="-228600" algn="l" defTabSz="914400" rtl="0" eaLnBrk="1" latinLnBrk="0" hangingPunct="1">
-              <a:spcBef>
-                <a:spcPct val="20000"/>
-              </a:spcBef>
-              <a:buFont typeface="Arial" panose="020B0604020202020204" pitchFamily="34" charset="0"/>
-              <a:buChar char="•"/>
-              <a:defRPr sz="2000" kern="1200">
-                <a:solidFill>
-                  <a:schemeClr val="tx1"/>
-                </a:solidFill>
-                <a:latin typeface="+mn-lt"/>
-                <a:ea typeface="+mn-ea"/>
-                <a:cs typeface="+mn-cs"/>
-              </a:defRPr>
-            </a:lvl8pPr>
-            <a:lvl9pPr marL="3886200" indent="-228600" algn="l" defTabSz="914400" rtl="0" eaLnBrk="1" latinLnBrk="0" hangingPunct="1">
-              <a:spcBef>
-                <a:spcPct val="20000"/>
-              </a:spcBef>
-              <a:buFont typeface="Arial" panose="020B0604020202020204" pitchFamily="34" charset="0"/>
-              <a:buChar char="•"/>
-              <a:defRPr sz="2000" kern="1200">
-                <a:solidFill>
-                  <a:schemeClr val="tx1"/>
-                </a:solidFill>
-                <a:latin typeface="+mn-lt"/>
-                <a:ea typeface="+mn-ea"/>
-                <a:cs typeface="+mn-cs"/>
-              </a:defRPr>
-            </a:lvl9pPr>
-          </a:lstStyle>
-          <a:p>
-            <a:r>
-              <a:rPr lang="en-US" sz="2000" dirty="0" smtClean="0"/>
-              <a:t>Add the following as a child of </a:t>
-            </a:r>
-            <a:r>
-              <a:rPr lang="en-US" sz="2000" dirty="0" smtClean="0">
-                <a:latin typeface="Courier"/>
-                <a:cs typeface="Courier"/>
-              </a:rPr>
-              <a:t>&lt;application&gt;</a:t>
-            </a:r>
-            <a:r>
-              <a:rPr lang="en-US" sz="2000" dirty="0" smtClean="0"/>
-              <a:t> inside AndroidManifest.xml</a:t>
-            </a:r>
-          </a:p>
-        </p:txBody>
-      </p:sp>
-      <p:sp>
-        <p:nvSpPr>
-          <p:cNvPr id="6" name="TextBox 5"/>
-          <p:cNvSpPr txBox="1"/>
-          <p:nvPr/>
-        </p:nvSpPr>
-        <p:spPr>
-          <a:xfrm>
-            <a:off x="457200" y="3437625"/>
-            <a:ext cx="8229600" cy="2492990"/>
-          </a:xfrm>
-          <a:prstGeom prst="rect">
-            <a:avLst/>
-          </a:prstGeom>
-          <a:solidFill>
-            <a:schemeClr val="bg1">
-              <a:lumMod val="85000"/>
-            </a:schemeClr>
-          </a:solidFill>
-          <a:ln>
-            <a:solidFill>
-              <a:schemeClr val="tx1"/>
-            </a:solidFill>
-          </a:ln>
-        </p:spPr>
-        <p:txBody>
-          <a:bodyPr wrap="square" rtlCol="0">
+          <a:bodyPr wrap="square">
             <a:spAutoFit/>
           </a:bodyPr>
           <a:lstStyle/>
           <a:p>
-            <a:r>
-              <a:rPr lang="en-US" sz="1200" dirty="0">
-                <a:latin typeface="Courier"/>
-                <a:cs typeface="Courier"/>
-              </a:rPr>
-              <a:t>-keep class * extends java.util.ListResourceBundle {</a:t>
-            </a:r>
-          </a:p>
-          <a:p>
-            <a:r>
-              <a:rPr lang="en-US" sz="1200" dirty="0">
-                <a:latin typeface="Courier"/>
-                <a:cs typeface="Courier"/>
-              </a:rPr>
-              <a:t>    protected Object[][] getContents();</a:t>
-            </a:r>
-          </a:p>
-          <a:p>
-            <a:r>
-              <a:rPr lang="en-US" sz="1200" dirty="0">
-                <a:latin typeface="Courier"/>
-                <a:cs typeface="Courier"/>
-              </a:rPr>
-              <a:t>}</a:t>
-            </a:r>
-          </a:p>
-          <a:p>
-            <a:r>
-              <a:rPr lang="en-US" sz="1200" dirty="0">
-                <a:latin typeface="Courier"/>
-                <a:cs typeface="Courier"/>
-              </a:rPr>
-              <a:t>-keep public class com.google.android.gms.common.internal.safeparcel.SafeParcelable {</a:t>
-            </a:r>
-          </a:p>
-          <a:p>
-            <a:r>
-              <a:rPr lang="en-US" sz="1200" dirty="0">
-                <a:latin typeface="Courier"/>
-                <a:cs typeface="Courier"/>
-              </a:rPr>
-              <a:t>    public static final *** NULL;</a:t>
-            </a:r>
-          </a:p>
-          <a:p>
-            <a:r>
-              <a:rPr lang="en-US" sz="1200" dirty="0">
-                <a:latin typeface="Courier"/>
-                <a:cs typeface="Courier"/>
-              </a:rPr>
-              <a:t>}</a:t>
-            </a:r>
-          </a:p>
-          <a:p>
-            <a:r>
-              <a:rPr lang="en-US" sz="1200" dirty="0">
-                <a:latin typeface="Courier"/>
-                <a:cs typeface="Courier"/>
-              </a:rPr>
-              <a:t>-keepnames @com.google.android.gms.common.annotation.KeepName class *</a:t>
-            </a:r>
-          </a:p>
-          <a:p>
-            <a:r>
-              <a:rPr lang="en-US" sz="1200" dirty="0">
-                <a:latin typeface="Courier"/>
-                <a:cs typeface="Courier"/>
-              </a:rPr>
-              <a:t>-keepclassmembernames class * {</a:t>
-            </a:r>
-          </a:p>
-          <a:p>
-            <a:r>
-              <a:rPr lang="en-US" sz="1200" dirty="0">
-                <a:latin typeface="Courier"/>
-                <a:cs typeface="Courier"/>
-              </a:rPr>
-              <a:t>    @com.google.android.gms.common.annotation.KeepName *;</a:t>
-            </a:r>
-          </a:p>
-          <a:p>
-            <a:r>
-              <a:rPr lang="en-US" sz="1200" dirty="0">
-                <a:latin typeface="Courier"/>
-                <a:cs typeface="Courier"/>
-              </a:rPr>
-              <a:t>}</a:t>
-            </a:r>
-          </a:p>
-          <a:p>
-            <a:r>
-              <a:rPr lang="en-US" sz="1200" dirty="0">
-                <a:latin typeface="Courier"/>
-                <a:cs typeface="Courier"/>
-              </a:rPr>
-              <a:t>-keepnames class * implements android.os.Parcelable {</a:t>
-            </a:r>
-          </a:p>
-          <a:p>
-            <a:r>
-              <a:rPr lang="en-US" sz="1200" dirty="0">
-                <a:latin typeface="Courier"/>
-                <a:cs typeface="Courier"/>
-              </a:rPr>
-              <a:t>    public static final ** CREATOR;</a:t>
-            </a:r>
-          </a:p>
-          <a:p>
-            <a:r>
-              <a:rPr lang="en-US" sz="1200" dirty="0">
-                <a:latin typeface="Courier"/>
-                <a:cs typeface="Courier"/>
-              </a:rPr>
-              <a:t>}</a:t>
-            </a:r>
-          </a:p>
-        </p:txBody>
-      </p:sp>
-      <p:sp>
-        <p:nvSpPr>
-          <p:cNvPr id="7" name="Content Placeholder 2"/>
-          <p:cNvSpPr txBox="1">
-            <a:spLocks/>
-          </p:cNvSpPr>
-          <p:nvPr/>
-        </p:nvSpPr>
-        <p:spPr>
-          <a:xfrm>
-            <a:off x="457200" y="2743200"/>
-            <a:ext cx="8229600" cy="766311"/>
-          </a:xfrm>
-          <a:prstGeom prst="rect">
-            <a:avLst/>
-          </a:prstGeom>
-        </p:spPr>
-        <p:txBody>
-          <a:bodyPr vert="horz" lIns="91440" tIns="45720" rIns="91440" bIns="45720" rtlCol="0">
-            <a:normAutofit/>
-          </a:bodyPr>
-          <a:lstStyle>
-            <a:lvl1pPr marL="342900" indent="-342900" algn="l" defTabSz="914400" rtl="0" eaLnBrk="1" latinLnBrk="0" hangingPunct="1">
-              <a:spcBef>
-                <a:spcPct val="20000"/>
-              </a:spcBef>
+            <a:pPr marL="342900" indent="-342900">
               <a:buFont typeface="Arial" panose="020B0604020202020204" pitchFamily="34" charset="0"/>
               <a:buChar char="•"/>
-              <a:defRPr sz="3200" kern="1200">
-                <a:solidFill>
-                  <a:schemeClr val="tx1"/>
-                </a:solidFill>
-                <a:latin typeface="+mn-lt"/>
-                <a:ea typeface="+mn-ea"/>
-                <a:cs typeface="+mn-cs"/>
-              </a:defRPr>
-            </a:lvl1pPr>
-            <a:lvl2pPr marL="742950" indent="-285750" algn="l" defTabSz="914400" rtl="0" eaLnBrk="1" latinLnBrk="0" hangingPunct="1">
-              <a:spcBef>
-                <a:spcPct val="20000"/>
-              </a:spcBef>
-              <a:buFont typeface="Arial" panose="020B0604020202020204" pitchFamily="34" charset="0"/>
-              <a:buChar char="–"/>
-              <a:defRPr sz="2800" kern="1200">
-                <a:solidFill>
-                  <a:schemeClr val="tx1"/>
-                </a:solidFill>
-                <a:latin typeface="+mn-lt"/>
-                <a:ea typeface="+mn-ea"/>
-                <a:cs typeface="+mn-cs"/>
-              </a:defRPr>
-            </a:lvl2pPr>
-            <a:lvl3pPr marL="1143000" indent="-228600" algn="l" defTabSz="914400" rtl="0" eaLnBrk="1" latinLnBrk="0" hangingPunct="1">
-              <a:spcBef>
-                <a:spcPct val="20000"/>
-              </a:spcBef>
-              <a:buFont typeface="Arial" panose="020B0604020202020204" pitchFamily="34" charset="0"/>
-              <a:buChar char="•"/>
-              <a:defRPr sz="2400" kern="1200">
-                <a:solidFill>
-                  <a:schemeClr val="tx1"/>
-                </a:solidFill>
-                <a:latin typeface="+mn-lt"/>
-                <a:ea typeface="+mn-ea"/>
-                <a:cs typeface="+mn-cs"/>
-              </a:defRPr>
-            </a:lvl3pPr>
-            <a:lvl4pPr marL="1600200" indent="-228600" algn="l" defTabSz="914400" rtl="0" eaLnBrk="1" latinLnBrk="0" hangingPunct="1">
-              <a:spcBef>
-                <a:spcPct val="20000"/>
-              </a:spcBef>
-              <a:buFont typeface="Arial" panose="020B0604020202020204" pitchFamily="34" charset="0"/>
-              <a:buChar char="–"/>
-              <a:defRPr sz="2000" kern="1200">
-                <a:solidFill>
-                  <a:schemeClr val="tx1"/>
-                </a:solidFill>
-                <a:latin typeface="+mn-lt"/>
-                <a:ea typeface="+mn-ea"/>
-                <a:cs typeface="+mn-cs"/>
-              </a:defRPr>
-            </a:lvl4pPr>
-            <a:lvl5pPr marL="2057400" indent="-228600" algn="l" defTabSz="914400" rtl="0" eaLnBrk="1" latinLnBrk="0" hangingPunct="1">
-              <a:spcBef>
-                <a:spcPct val="20000"/>
-              </a:spcBef>
-              <a:buFont typeface="Arial" panose="020B0604020202020204" pitchFamily="34" charset="0"/>
-              <a:buChar char="»"/>
-              <a:defRPr sz="2000" kern="1200">
-                <a:solidFill>
-                  <a:schemeClr val="tx1"/>
-                </a:solidFill>
-                <a:latin typeface="+mn-lt"/>
-                <a:ea typeface="+mn-ea"/>
-                <a:cs typeface="+mn-cs"/>
-              </a:defRPr>
-            </a:lvl5pPr>
-            <a:lvl6pPr marL="2514600" indent="-228600" algn="l" defTabSz="914400" rtl="0" eaLnBrk="1" latinLnBrk="0" hangingPunct="1">
-              <a:spcBef>
-                <a:spcPct val="20000"/>
-              </a:spcBef>
-              <a:buFont typeface="Arial" panose="020B0604020202020204" pitchFamily="34" charset="0"/>
-              <a:buChar char="•"/>
-              <a:defRPr sz="2000" kern="1200">
-                <a:solidFill>
-                  <a:schemeClr val="tx1"/>
-                </a:solidFill>
-                <a:latin typeface="+mn-lt"/>
-                <a:ea typeface="+mn-ea"/>
-                <a:cs typeface="+mn-cs"/>
-              </a:defRPr>
-            </a:lvl6pPr>
-            <a:lvl7pPr marL="2971800" indent="-228600" algn="l" defTabSz="914400" rtl="0" eaLnBrk="1" latinLnBrk="0" hangingPunct="1">
-              <a:spcBef>
-                <a:spcPct val="20000"/>
-              </a:spcBef>
-              <a:buFont typeface="Arial" panose="020B0604020202020204" pitchFamily="34" charset="0"/>
-              <a:buChar char="•"/>
-              <a:defRPr sz="2000" kern="1200">
-                <a:solidFill>
-                  <a:schemeClr val="tx1"/>
-                </a:solidFill>
-                <a:latin typeface="+mn-lt"/>
-                <a:ea typeface="+mn-ea"/>
-                <a:cs typeface="+mn-cs"/>
-              </a:defRPr>
-            </a:lvl7pPr>
-            <a:lvl8pPr marL="3429000" indent="-228600" algn="l" defTabSz="914400" rtl="0" eaLnBrk="1" latinLnBrk="0" hangingPunct="1">
-              <a:spcBef>
-                <a:spcPct val="20000"/>
-              </a:spcBef>
-              <a:buFont typeface="Arial" panose="020B0604020202020204" pitchFamily="34" charset="0"/>
-              <a:buChar char="•"/>
-              <a:defRPr sz="2000" kern="1200">
-                <a:solidFill>
-                  <a:schemeClr val="tx1"/>
-                </a:solidFill>
-                <a:latin typeface="+mn-lt"/>
-                <a:ea typeface="+mn-ea"/>
-                <a:cs typeface="+mn-cs"/>
-              </a:defRPr>
-            </a:lvl8pPr>
-            <a:lvl9pPr marL="3886200" indent="-228600" algn="l" defTabSz="914400" rtl="0" eaLnBrk="1" latinLnBrk="0" hangingPunct="1">
-              <a:spcBef>
-                <a:spcPct val="20000"/>
-              </a:spcBef>
-              <a:buFont typeface="Arial" panose="020B0604020202020204" pitchFamily="34" charset="0"/>
-              <a:buChar char="•"/>
-              <a:defRPr sz="2000" kern="1200">
-                <a:solidFill>
-                  <a:schemeClr val="tx1"/>
-                </a:solidFill>
-                <a:latin typeface="+mn-lt"/>
-                <a:ea typeface="+mn-ea"/>
-                <a:cs typeface="+mn-cs"/>
-              </a:defRPr>
-            </a:lvl9pPr>
-          </a:lstStyle>
-          <a:p>
-            <a:r>
-              <a:rPr lang="en-US" sz="2000" dirty="0" smtClean="0"/>
-              <a:t>To prevent </a:t>
-            </a:r>
-            <a:r>
-              <a:rPr lang="en-US" sz="2000" dirty="0" err="1" smtClean="0"/>
-              <a:t>ProGuard</a:t>
-            </a:r>
-            <a:r>
-              <a:rPr lang="en-US" sz="2000" dirty="0" smtClean="0"/>
-              <a:t> from stripping away required classes, add the following lines in the file &lt;</a:t>
-            </a:r>
-            <a:r>
-              <a:rPr lang="en-US" sz="2000" dirty="0" err="1" smtClean="0"/>
-              <a:t>project_directory</a:t>
-            </a:r>
-            <a:r>
-              <a:rPr lang="en-US" sz="2000" dirty="0" smtClean="0"/>
-              <a:t>&gt;/proguard-project.txt:</a:t>
-            </a:r>
-          </a:p>
-          <a:p>
-            <a:endParaRPr lang="en-US" sz="1800" dirty="0" smtClean="0"/>
+            </a:pPr>
+            <a:r>
+              <a:rPr lang="en-US" sz="2400" dirty="0" smtClean="0"/>
+              <a:t>Gradle build will run tasks to get dependencies from Android SDK</a:t>
+            </a:r>
+            <a:endParaRPr lang="en-US" sz="2400" dirty="0"/>
           </a:p>
         </p:txBody>
       </p:sp>
     </p:spTree>
     <p:extLst>
       <p:ext uri="{BB962C8B-B14F-4D97-AF65-F5344CB8AC3E}">
-        <p14:creationId xmlns:p14="http://schemas.microsoft.com/office/powerpoint/2010/main" val="1180308513"/>
+        <p14:creationId xmlns:p14="http://schemas.microsoft.com/office/powerpoint/2010/main" val="3695063026"/>
       </p:ext>
     </p:extLst>
   </p:cSld>
@@ -5251,649 +4974,6 @@
         </p:nvSpPr>
         <p:spPr/>
         <p:txBody>
-          <a:bodyPr>
-            <a:normAutofit/>
-          </a:bodyPr>
-          <a:lstStyle/>
-          <a:p>
-            <a:r>
-              <a:rPr lang="en-US" dirty="0"/>
-              <a:t>Check for Google Play </a:t>
-            </a:r>
-            <a:r>
-              <a:rPr lang="en-US" dirty="0" smtClean="0"/>
-              <a:t>Services</a:t>
-            </a:r>
-            <a:endParaRPr lang="en-US" dirty="0"/>
-          </a:p>
-        </p:txBody>
-      </p:sp>
-      <p:sp>
-        <p:nvSpPr>
-          <p:cNvPr id="3" name="Content Placeholder 2"/>
-          <p:cNvSpPr>
-            <a:spLocks noGrp="1"/>
-          </p:cNvSpPr>
-          <p:nvPr>
-            <p:ph idx="1"/>
-          </p:nvPr>
-        </p:nvSpPr>
-        <p:spPr/>
-        <p:txBody>
-          <a:bodyPr>
-            <a:normAutofit/>
-          </a:bodyPr>
-          <a:lstStyle/>
-          <a:p>
-            <a:r>
-              <a:rPr lang="en-US" sz="2400" dirty="0" smtClean="0"/>
-              <a:t>Apps relying on Google Play Services should check for compatible version</a:t>
-            </a:r>
-          </a:p>
-          <a:p>
-            <a:r>
-              <a:rPr lang="en-US" sz="2400" dirty="0" smtClean="0"/>
-              <a:t>Typically done in following main activity methods</a:t>
-            </a:r>
-          </a:p>
-          <a:p>
-            <a:pPr lvl="1"/>
-            <a:r>
-              <a:rPr lang="en-US" sz="2000" dirty="0" smtClean="0"/>
-              <a:t>onCreate() – ensures app cannot be used without successful check</a:t>
-            </a:r>
-          </a:p>
-          <a:p>
-            <a:pPr lvl="1"/>
-            <a:r>
-              <a:rPr lang="en-US" sz="2000" dirty="0" smtClean="0"/>
-              <a:t>onResume() – ensures check is done when user returns to the app</a:t>
-            </a:r>
-          </a:p>
-          <a:p>
-            <a:r>
-              <a:rPr lang="en-US" sz="2400" dirty="0" smtClean="0"/>
-              <a:t>App can </a:t>
-            </a:r>
-            <a:r>
-              <a:rPr lang="en-US" sz="2400" dirty="0"/>
-              <a:t>call GooglePlayServicesUtil.getErrorDialog(</a:t>
-            </a:r>
-            <a:r>
-              <a:rPr lang="en-US" sz="2400" dirty="0" smtClean="0"/>
-              <a:t>) to:</a:t>
-            </a:r>
-          </a:p>
-          <a:p>
-            <a:pPr lvl="1"/>
-            <a:r>
-              <a:rPr lang="en-US" sz="2000" dirty="0" smtClean="0"/>
-              <a:t>Download APK from Google Play Store or</a:t>
-            </a:r>
-          </a:p>
-          <a:p>
-            <a:pPr lvl="1"/>
-            <a:r>
-              <a:rPr lang="en-US" sz="2000" dirty="0" smtClean="0"/>
-              <a:t>Enable it in device settings</a:t>
-            </a:r>
-          </a:p>
-          <a:p>
-            <a:r>
-              <a:rPr lang="en-US" sz="2400" dirty="0" smtClean="0"/>
-              <a:t>Code walkthrough</a:t>
-            </a:r>
-          </a:p>
-        </p:txBody>
-      </p:sp>
-    </p:spTree>
-    <p:extLst>
-      <p:ext uri="{BB962C8B-B14F-4D97-AF65-F5344CB8AC3E}">
-        <p14:creationId xmlns:p14="http://schemas.microsoft.com/office/powerpoint/2010/main" val="606154861"/>
-      </p:ext>
-    </p:extLst>
-  </p:cSld>
-  <p:clrMapOvr>
-    <a:masterClrMapping/>
-  </p:clrMapOvr>
-</p:sld>
-</file>
-
-<file path=ppt/slides/slide15.xml><?xml version="1.0" encoding="utf-8"?>
-<p:sld xmlns:a="http://schemas.openxmlformats.org/drawingml/2006/main" xmlns:r="http://schemas.openxmlformats.org/officeDocument/2006/relationships" xmlns:p="http://schemas.openxmlformats.org/presentationml/2006/main">
-  <p:cSld>
-    <p:spTree>
-      <p:nvGrpSpPr>
-        <p:cNvPr id="1" name=""/>
-        <p:cNvGrpSpPr/>
-        <p:nvPr/>
-      </p:nvGrpSpPr>
-      <p:grpSpPr>
-        <a:xfrm>
-          <a:off x="0" y="0"/>
-          <a:ext cx="0" cy="0"/>
-          <a:chOff x="0" y="0"/>
-          <a:chExt cx="0" cy="0"/>
-        </a:xfrm>
-      </p:grpSpPr>
-      <p:sp>
-        <p:nvSpPr>
-          <p:cNvPr id="2" name="Title 1"/>
-          <p:cNvSpPr>
-            <a:spLocks noGrp="1"/>
-          </p:cNvSpPr>
-          <p:nvPr>
-            <p:ph type="title"/>
-          </p:nvPr>
-        </p:nvSpPr>
-        <p:spPr/>
-        <p:txBody>
-          <a:bodyPr/>
-          <a:lstStyle/>
-          <a:p>
-            <a:r>
-              <a:rPr lang="en-US" dirty="0" smtClean="0"/>
-              <a:t>Check for Google Play Services</a:t>
-            </a:r>
-            <a:endParaRPr lang="en-US" dirty="0"/>
-          </a:p>
-        </p:txBody>
-      </p:sp>
-      <p:pic>
-        <p:nvPicPr>
-          <p:cNvPr id="4" name="Content Placeholder 3"/>
-          <p:cNvPicPr>
-            <a:picLocks noGrp="1" noChangeAspect="1"/>
-          </p:cNvPicPr>
-          <p:nvPr>
-            <p:ph idx="1"/>
-          </p:nvPr>
-        </p:nvPicPr>
-        <p:blipFill>
-          <a:blip r:embed="rId2" cstate="print">
-            <a:extLst>
-              <a:ext uri="{28A0092B-C50C-407E-A947-70E740481C1C}">
-                <a14:useLocalDpi xmlns:a14="http://schemas.microsoft.com/office/drawing/2010/main" val="0"/>
-              </a:ext>
-            </a:extLst>
-          </a:blip>
-          <a:stretch>
-            <a:fillRect/>
-          </a:stretch>
-        </p:blipFill>
-        <p:spPr>
-          <a:xfrm>
-            <a:off x="1600200" y="1600200"/>
-            <a:ext cx="2711040" cy="4525963"/>
-          </a:xfrm>
-        </p:spPr>
-      </p:pic>
-      <p:pic>
-        <p:nvPicPr>
-          <p:cNvPr id="5" name="Picture 4"/>
-          <p:cNvPicPr>
-            <a:picLocks noChangeAspect="1"/>
-          </p:cNvPicPr>
-          <p:nvPr/>
-        </p:nvPicPr>
-        <p:blipFill>
-          <a:blip r:embed="rId3" cstate="print">
-            <a:extLst>
-              <a:ext uri="{28A0092B-C50C-407E-A947-70E740481C1C}">
-                <a14:useLocalDpi xmlns:a14="http://schemas.microsoft.com/office/drawing/2010/main" val="0"/>
-              </a:ext>
-            </a:extLst>
-          </a:blip>
-          <a:stretch>
-            <a:fillRect/>
-          </a:stretch>
-        </p:blipFill>
-        <p:spPr>
-          <a:xfrm>
-            <a:off x="4800600" y="1600200"/>
-            <a:ext cx="2714442" cy="4525963"/>
-          </a:xfrm>
-          <a:prstGeom prst="rect">
-            <a:avLst/>
-          </a:prstGeom>
-        </p:spPr>
-      </p:pic>
-    </p:spTree>
-    <p:extLst>
-      <p:ext uri="{BB962C8B-B14F-4D97-AF65-F5344CB8AC3E}">
-        <p14:creationId xmlns:p14="http://schemas.microsoft.com/office/powerpoint/2010/main" val="3882006213"/>
-      </p:ext>
-    </p:extLst>
-  </p:cSld>
-  <p:clrMapOvr>
-    <a:masterClrMapping/>
-  </p:clrMapOvr>
-</p:sld>
-</file>
-
-<file path=ppt/slides/slide16.xml><?xml version="1.0" encoding="utf-8"?>
-<p:sld xmlns:a="http://schemas.openxmlformats.org/drawingml/2006/main" xmlns:r="http://schemas.openxmlformats.org/officeDocument/2006/relationships" xmlns:p="http://schemas.openxmlformats.org/presentationml/2006/main">
-  <p:cSld>
-    <p:spTree>
-      <p:nvGrpSpPr>
-        <p:cNvPr id="1" name=""/>
-        <p:cNvGrpSpPr/>
-        <p:nvPr/>
-      </p:nvGrpSpPr>
-      <p:grpSpPr>
-        <a:xfrm>
-          <a:off x="0" y="0"/>
-          <a:ext cx="0" cy="0"/>
-          <a:chOff x="0" y="0"/>
-          <a:chExt cx="0" cy="0"/>
-        </a:xfrm>
-      </p:grpSpPr>
-      <p:sp>
-        <p:nvSpPr>
-          <p:cNvPr id="2" name="Title 1"/>
-          <p:cNvSpPr>
-            <a:spLocks noGrp="1"/>
-          </p:cNvSpPr>
-          <p:nvPr>
-            <p:ph type="title"/>
-          </p:nvPr>
-        </p:nvSpPr>
-        <p:spPr/>
-        <p:txBody>
-          <a:bodyPr/>
-          <a:lstStyle/>
-          <a:p>
-            <a:r>
-              <a:rPr lang="en-US" dirty="0" smtClean="0"/>
-              <a:t>Register with GCM</a:t>
-            </a:r>
-            <a:endParaRPr lang="en-US" dirty="0"/>
-          </a:p>
-        </p:txBody>
-      </p:sp>
-      <p:sp>
-        <p:nvSpPr>
-          <p:cNvPr id="3" name="Content Placeholder 2"/>
-          <p:cNvSpPr>
-            <a:spLocks noGrp="1"/>
-          </p:cNvSpPr>
-          <p:nvPr>
-            <p:ph idx="1"/>
-          </p:nvPr>
-        </p:nvSpPr>
-        <p:spPr/>
-        <p:txBody>
-          <a:bodyPr>
-            <a:normAutofit lnSpcReduction="10000"/>
-          </a:bodyPr>
-          <a:lstStyle/>
-          <a:p>
-            <a:r>
-              <a:rPr lang="en-US" sz="2800" dirty="0" smtClean="0"/>
-              <a:t>App must </a:t>
-            </a:r>
-            <a:r>
-              <a:rPr lang="en-US" sz="2800" dirty="0"/>
-              <a:t>register </a:t>
-            </a:r>
-            <a:r>
-              <a:rPr lang="en-US" sz="2800" dirty="0" smtClean="0"/>
-              <a:t>with GCM before </a:t>
-            </a:r>
-            <a:r>
-              <a:rPr lang="en-US" sz="2800" dirty="0"/>
-              <a:t>it can receive </a:t>
-            </a:r>
-            <a:r>
-              <a:rPr lang="en-US" sz="2800" dirty="0" smtClean="0"/>
-              <a:t>messages</a:t>
-            </a:r>
-          </a:p>
-          <a:p>
-            <a:pPr lvl="1"/>
-            <a:r>
-              <a:rPr lang="en-US" sz="2400" dirty="0" smtClean="0"/>
-              <a:t>Must be done on background thread because GCM register() method blocks</a:t>
-            </a:r>
-          </a:p>
-          <a:p>
-            <a:r>
-              <a:rPr lang="en-US" sz="2800" dirty="0" smtClean="0"/>
-              <a:t>Receives registration ID from GCM</a:t>
-            </a:r>
-          </a:p>
-          <a:p>
-            <a:pPr lvl="1"/>
-            <a:r>
-              <a:rPr lang="en-US" sz="2400" dirty="0" smtClean="0"/>
-              <a:t>Used by server to send notifications to that device</a:t>
-            </a:r>
-          </a:p>
-          <a:p>
-            <a:r>
-              <a:rPr lang="en-US" sz="2800" dirty="0" smtClean="0"/>
-              <a:t>Registration ID stored by app</a:t>
-            </a:r>
-          </a:p>
-          <a:p>
-            <a:pPr lvl="1"/>
-            <a:r>
-              <a:rPr lang="en-US" sz="2400" dirty="0" smtClean="0"/>
-              <a:t>Allows registration to be skipped if ID is still valid</a:t>
-            </a:r>
-          </a:p>
-          <a:p>
-            <a:pPr lvl="1"/>
-            <a:r>
-              <a:rPr lang="en-US" sz="2400" dirty="0" smtClean="0"/>
-              <a:t>Typically inside shared preferences</a:t>
-            </a:r>
-          </a:p>
-          <a:p>
-            <a:r>
-              <a:rPr lang="en-US" sz="2800" dirty="0" smtClean="0"/>
-              <a:t>Code walkthrough</a:t>
-            </a:r>
-            <a:endParaRPr lang="en-US" sz="2800" dirty="0"/>
-          </a:p>
-        </p:txBody>
-      </p:sp>
-    </p:spTree>
-    <p:extLst>
-      <p:ext uri="{BB962C8B-B14F-4D97-AF65-F5344CB8AC3E}">
-        <p14:creationId xmlns:p14="http://schemas.microsoft.com/office/powerpoint/2010/main" val="361619516"/>
-      </p:ext>
-    </p:extLst>
-  </p:cSld>
-  <p:clrMapOvr>
-    <a:masterClrMapping/>
-  </p:clrMapOvr>
-</p:sld>
-</file>
-
-<file path=ppt/slides/slide17.xml><?xml version="1.0" encoding="utf-8"?>
-<p:sld xmlns:a="http://schemas.openxmlformats.org/drawingml/2006/main" xmlns:r="http://schemas.openxmlformats.org/officeDocument/2006/relationships" xmlns:p="http://schemas.openxmlformats.org/presentationml/2006/main">
-  <p:cSld>
-    <p:spTree>
-      <p:nvGrpSpPr>
-        <p:cNvPr id="1" name=""/>
-        <p:cNvGrpSpPr/>
-        <p:nvPr/>
-      </p:nvGrpSpPr>
-      <p:grpSpPr>
-        <a:xfrm>
-          <a:off x="0" y="0"/>
-          <a:ext cx="0" cy="0"/>
-          <a:chOff x="0" y="0"/>
-          <a:chExt cx="0" cy="0"/>
-        </a:xfrm>
-      </p:grpSpPr>
-      <p:sp>
-        <p:nvSpPr>
-          <p:cNvPr id="2" name="Title 1"/>
-          <p:cNvSpPr>
-            <a:spLocks noGrp="1"/>
-          </p:cNvSpPr>
-          <p:nvPr>
-            <p:ph type="title"/>
-          </p:nvPr>
-        </p:nvSpPr>
-        <p:spPr/>
-        <p:txBody>
-          <a:bodyPr>
-            <a:normAutofit fontScale="90000"/>
-          </a:bodyPr>
-          <a:lstStyle/>
-          <a:p>
-            <a:r>
-              <a:rPr lang="en-US" dirty="0" smtClean="0"/>
-              <a:t>Implement Broadcast Receiver and Intent Service</a:t>
-            </a:r>
-            <a:endParaRPr lang="en-US" dirty="0"/>
-          </a:p>
-        </p:txBody>
-      </p:sp>
-      <p:sp>
-        <p:nvSpPr>
-          <p:cNvPr id="3" name="Content Placeholder 2"/>
-          <p:cNvSpPr>
-            <a:spLocks noGrp="1"/>
-          </p:cNvSpPr>
-          <p:nvPr>
-            <p:ph idx="1"/>
-          </p:nvPr>
-        </p:nvSpPr>
-        <p:spPr/>
-        <p:txBody>
-          <a:bodyPr>
-            <a:normAutofit lnSpcReduction="10000"/>
-          </a:bodyPr>
-          <a:lstStyle/>
-          <a:p>
-            <a:r>
-              <a:rPr lang="en-US" dirty="0" smtClean="0"/>
-              <a:t>Broadcast Receiver</a:t>
-            </a:r>
-          </a:p>
-          <a:p>
-            <a:pPr lvl="1"/>
-            <a:r>
-              <a:rPr lang="en-US" dirty="0" smtClean="0"/>
-              <a:t>Extends WakefulBroadcastReceiver</a:t>
-            </a:r>
-          </a:p>
-          <a:p>
-            <a:pPr lvl="1"/>
-            <a:r>
-              <a:rPr lang="en-US" dirty="0" smtClean="0"/>
-              <a:t>Override onReceive() to receive notification and start intent service to handle notification</a:t>
-            </a:r>
-          </a:p>
-          <a:p>
-            <a:r>
-              <a:rPr lang="en-US" dirty="0" smtClean="0"/>
-              <a:t>Intent Service</a:t>
-            </a:r>
-          </a:p>
-          <a:p>
-            <a:pPr lvl="1"/>
-            <a:r>
-              <a:rPr lang="en-US" dirty="0" smtClean="0"/>
-              <a:t>Extends IntentService</a:t>
-            </a:r>
-          </a:p>
-          <a:p>
-            <a:pPr lvl="1"/>
-            <a:r>
-              <a:rPr lang="en-US" dirty="0" smtClean="0"/>
-              <a:t>Override onHandleIntent() to process notification</a:t>
-            </a:r>
-          </a:p>
-          <a:p>
-            <a:pPr lvl="1"/>
-            <a:r>
-              <a:rPr lang="en-US" b="1" dirty="0" smtClean="0">
-                <a:solidFill>
-                  <a:srgbClr val="800000"/>
-                </a:solidFill>
-              </a:rPr>
-              <a:t>IMPORTANT: </a:t>
-            </a:r>
-            <a:r>
-              <a:rPr lang="en-US" dirty="0" smtClean="0"/>
-              <a:t>Release wake lock when done</a:t>
-            </a:r>
-          </a:p>
-          <a:p>
-            <a:r>
-              <a:rPr lang="en-US" dirty="0" smtClean="0"/>
-              <a:t>Code walkthrough</a:t>
-            </a:r>
-            <a:endParaRPr lang="en-US" dirty="0"/>
-          </a:p>
-        </p:txBody>
-      </p:sp>
-    </p:spTree>
-    <p:extLst>
-      <p:ext uri="{BB962C8B-B14F-4D97-AF65-F5344CB8AC3E}">
-        <p14:creationId xmlns:p14="http://schemas.microsoft.com/office/powerpoint/2010/main" val="2368302692"/>
-      </p:ext>
-    </p:extLst>
-  </p:cSld>
-  <p:clrMapOvr>
-    <a:masterClrMapping/>
-  </p:clrMapOvr>
-</p:sld>
-</file>
-
-<file path=ppt/slides/slide18.xml><?xml version="1.0" encoding="utf-8"?>
-<p:sld xmlns:a="http://schemas.openxmlformats.org/drawingml/2006/main" xmlns:r="http://schemas.openxmlformats.org/officeDocument/2006/relationships" xmlns:p="http://schemas.openxmlformats.org/presentationml/2006/main">
-  <p:cSld>
-    <p:spTree>
-      <p:nvGrpSpPr>
-        <p:cNvPr id="1" name=""/>
-        <p:cNvGrpSpPr/>
-        <p:nvPr/>
-      </p:nvGrpSpPr>
-      <p:grpSpPr>
-        <a:xfrm>
-          <a:off x="0" y="0"/>
-          <a:ext cx="0" cy="0"/>
-          <a:chOff x="0" y="0"/>
-          <a:chExt cx="0" cy="0"/>
-        </a:xfrm>
-      </p:grpSpPr>
-      <p:sp>
-        <p:nvSpPr>
-          <p:cNvPr id="2" name="Title 1"/>
-          <p:cNvSpPr>
-            <a:spLocks noGrp="1"/>
-          </p:cNvSpPr>
-          <p:nvPr>
-            <p:ph type="title"/>
-          </p:nvPr>
-        </p:nvSpPr>
-        <p:spPr/>
-        <p:txBody>
-          <a:bodyPr>
-            <a:normAutofit fontScale="90000"/>
-          </a:bodyPr>
-          <a:lstStyle/>
-          <a:p>
-            <a:r>
-              <a:rPr lang="en-US" dirty="0" smtClean="0"/>
-              <a:t>Process Notification Data in Activity</a:t>
-            </a:r>
-            <a:endParaRPr lang="en-US" dirty="0"/>
-          </a:p>
-        </p:txBody>
-      </p:sp>
-      <p:sp>
-        <p:nvSpPr>
-          <p:cNvPr id="3" name="Content Placeholder 2"/>
-          <p:cNvSpPr>
-            <a:spLocks noGrp="1"/>
-          </p:cNvSpPr>
-          <p:nvPr>
-            <p:ph idx="1"/>
-          </p:nvPr>
-        </p:nvSpPr>
-        <p:spPr/>
-        <p:txBody>
-          <a:bodyPr/>
-          <a:lstStyle/>
-          <a:p>
-            <a:r>
-              <a:rPr lang="en-US" dirty="0" smtClean="0"/>
-              <a:t>Store data inside Intent extras</a:t>
-            </a:r>
-          </a:p>
-          <a:p>
-            <a:r>
-              <a:rPr lang="en-US" dirty="0" smtClean="0"/>
-              <a:t>Process data in two places</a:t>
-            </a:r>
-          </a:p>
-          <a:p>
-            <a:pPr lvl="1"/>
-            <a:r>
-              <a:rPr lang="en-US" dirty="0" smtClean="0"/>
-              <a:t>onCreate() if activity was destroyed / recreated</a:t>
-            </a:r>
-          </a:p>
-          <a:p>
-            <a:pPr lvl="1"/>
-            <a:r>
-              <a:rPr lang="en-US" dirty="0" smtClean="0"/>
-              <a:t>onNewIntent() if activity still exists</a:t>
-            </a:r>
-          </a:p>
-          <a:p>
-            <a:pPr lvl="2"/>
-            <a:r>
-              <a:rPr lang="en-US" dirty="0" smtClean="0"/>
-              <a:t>Requires Intent to </a:t>
-            </a:r>
-            <a:r>
-              <a:rPr lang="en-US" dirty="0"/>
-              <a:t>have </a:t>
-            </a:r>
-            <a:r>
-              <a:rPr lang="en-US" dirty="0" smtClean="0"/>
-              <a:t>FLAG_ACTIVITY_SINGLE_TOP flag to be set</a:t>
-            </a:r>
-          </a:p>
-          <a:p>
-            <a:r>
-              <a:rPr lang="en-US" dirty="0" smtClean="0"/>
-              <a:t> Code walkthrough</a:t>
-            </a:r>
-            <a:endParaRPr lang="en-US" dirty="0"/>
-          </a:p>
-        </p:txBody>
-      </p:sp>
-    </p:spTree>
-    <p:extLst>
-      <p:ext uri="{BB962C8B-B14F-4D97-AF65-F5344CB8AC3E}">
-        <p14:creationId xmlns:p14="http://schemas.microsoft.com/office/powerpoint/2010/main" val="504142742"/>
-      </p:ext>
-    </p:extLst>
-  </p:cSld>
-  <p:clrMapOvr>
-    <a:masterClrMapping/>
-  </p:clrMapOvr>
-</p:sld>
-</file>
-
-<file path=ppt/slides/slide19.xml><?xml version="1.0" encoding="utf-8"?>
-<p:sld xmlns:a="http://schemas.openxmlformats.org/drawingml/2006/main" xmlns:r="http://schemas.openxmlformats.org/officeDocument/2006/relationships" xmlns:p="http://schemas.openxmlformats.org/presentationml/2006/main">
-  <p:cSld>
-    <p:spTree>
-      <p:nvGrpSpPr>
-        <p:cNvPr id="1" name=""/>
-        <p:cNvGrpSpPr/>
-        <p:nvPr/>
-      </p:nvGrpSpPr>
-      <p:grpSpPr>
-        <a:xfrm>
-          <a:off x="0" y="0"/>
-          <a:ext cx="0" cy="0"/>
-          <a:chOff x="0" y="0"/>
-          <a:chExt cx="0" cy="0"/>
-        </a:xfrm>
-      </p:grpSpPr>
-      <p:sp>
-        <p:nvSpPr>
-          <p:cNvPr id="2" name="Title 1"/>
-          <p:cNvSpPr>
-            <a:spLocks noGrp="1"/>
-          </p:cNvSpPr>
-          <p:nvPr>
-            <p:ph type="title"/>
-          </p:nvPr>
-        </p:nvSpPr>
-        <p:spPr/>
-        <p:txBody>
           <a:bodyPr/>
           <a:lstStyle/>
           <a:p>
@@ -5932,8 +5012,9 @@
           <a:p>
             <a:r>
               <a:rPr lang="en-US" sz="2000" dirty="0" smtClean="0"/>
-              <a:t>Permissions</a:t>
-            </a:r>
+              <a:t>Add Permissions</a:t>
+            </a:r>
+            <a:endParaRPr lang="en-US" sz="2000" dirty="0" smtClean="0"/>
           </a:p>
           <a:p>
             <a:endParaRPr lang="en-US" sz="2000" dirty="0"/>
@@ -5965,7 +5046,7 @@
         </p:nvGraphicFramePr>
         <p:xfrm>
           <a:off x="304800" y="1981200"/>
-          <a:ext cx="8610600" cy="2082544"/>
+          <a:ext cx="8610600" cy="1877262"/>
         </p:xfrm>
         <a:graphic>
           <a:graphicData uri="http://schemas.openxmlformats.org/drawingml/2006/table">
@@ -6867,7 +5948,7 @@
         <p:spPr>
           <a:xfrm>
             <a:off x="457200" y="4038600"/>
-            <a:ext cx="8144774" cy="1631216"/>
+            <a:ext cx="8144774" cy="1938992"/>
           </a:xfrm>
           <a:prstGeom prst="rect">
             <a:avLst/>
@@ -6885,7 +5966,15 @@
             </a:pPr>
             <a:r>
               <a:rPr lang="en-US" sz="2000" dirty="0"/>
-              <a:t>Define Receiver for messages and registration ID</a:t>
+              <a:t>Define </a:t>
+            </a:r>
+            <a:r>
+              <a:rPr lang="en-US" sz="2000" dirty="0" err="1" smtClean="0"/>
+              <a:t>GcmReceiver</a:t>
+            </a:r>
+            <a:r>
+              <a:rPr lang="en-US" sz="2000" dirty="0" smtClean="0"/>
+              <a:t> to receive GCM messages</a:t>
             </a:r>
           </a:p>
           <a:p>
@@ -6894,8 +5983,20 @@
               <a:buChar char="•"/>
             </a:pPr>
             <a:r>
-              <a:rPr lang="en-US" sz="2000" dirty="0"/>
-              <a:t>Define IntentService for processing notifications</a:t>
+              <a:rPr lang="en-US" sz="2000" dirty="0" smtClean="0"/>
+              <a:t>Define </a:t>
+            </a:r>
+            <a:r>
+              <a:rPr lang="en-US" sz="2000" dirty="0" err="1" smtClean="0"/>
+              <a:t>GcmListenerService</a:t>
+            </a:r>
+            <a:r>
+              <a:rPr lang="en-US" sz="2000" dirty="0" smtClean="0"/>
+              <a:t> implementation for </a:t>
+            </a:r>
+            <a:r>
+              <a:rPr lang="en-US" sz="2000" dirty="0" smtClean="0"/>
+              <a:t>handling GCM messages</a:t>
             </a:r>
           </a:p>
           <a:p>
@@ -6904,35 +6005,16 @@
               <a:buChar char="•"/>
             </a:pPr>
             <a:r>
-              <a:rPr lang="en-US" sz="2000" dirty="0"/>
-              <a:t>See </a:t>
-            </a:r>
-            <a:r>
-              <a:rPr lang="en-US" sz="2000" dirty="0">
-                <a:hlinkClick r:id="rId2"/>
-              </a:rPr>
-              <a:t>http://</a:t>
-            </a:r>
-            <a:r>
-              <a:rPr lang="en-US" sz="2000" dirty="0" smtClean="0">
-                <a:hlinkClick r:id="rId2"/>
-              </a:rPr>
-              <a:t>developer.android.com/google/gcm/client.html#manifest</a:t>
-            </a:r>
-            <a:r>
               <a:rPr lang="en-US" sz="2000" dirty="0" smtClean="0"/>
-              <a:t/>
-            </a:r>
-            <a:br>
+              <a:t>Define </a:t>
+            </a:r>
+            <a:r>
+              <a:rPr lang="en-US" sz="2000" dirty="0" err="1" smtClean="0"/>
+              <a:t>IntentService</a:t>
+            </a:r>
+            <a:r>
               <a:rPr lang="en-US" sz="2000" dirty="0" smtClean="0"/>
-            </a:br>
-            <a:r>
-              <a:rPr lang="en-US" sz="2000" dirty="0" smtClean="0"/>
-              <a:t>for </a:t>
-            </a:r>
-            <a:r>
-              <a:rPr lang="en-US" sz="2000" dirty="0"/>
-              <a:t>additional details</a:t>
+              <a:t> implementation for GCM registration</a:t>
             </a:r>
           </a:p>
           <a:p>
@@ -6941,8 +6023,31 @@
               <a:buChar char="•"/>
             </a:pPr>
             <a:r>
+              <a:rPr lang="en-US" sz="2000" dirty="0" smtClean="0"/>
+              <a:t>Define </a:t>
+            </a:r>
+            <a:r>
+              <a:rPr lang="en-US" sz="2000" dirty="0" err="1" smtClean="0"/>
+              <a:t>InstanceIDListenerService</a:t>
+            </a:r>
+            <a:r>
+              <a:rPr lang="en-US" sz="2000" dirty="0" smtClean="0"/>
+              <a:t> implementation for handling registration token updates</a:t>
+            </a:r>
+            <a:endParaRPr lang="en-US" sz="2000" dirty="0" smtClean="0"/>
+          </a:p>
+          <a:p>
+            <a:pPr marL="342900" indent="-342900">
+              <a:buFont typeface="Arial" panose="020B0604020202020204" pitchFamily="34" charset="0"/>
+              <a:buChar char="•"/>
+            </a:pPr>
+            <a:r>
+              <a:rPr lang="en-US" sz="2000" dirty="0" smtClean="0"/>
+              <a:t>Code </a:t>
+            </a:r>
+            <a:r>
               <a:rPr lang="en-US" sz="2000" dirty="0"/>
-              <a:t>Code walkthrough</a:t>
+              <a:t>walkthrough</a:t>
             </a:r>
           </a:p>
         </p:txBody>
@@ -6951,6 +6056,694 @@
     <p:extLst>
       <p:ext uri="{BB962C8B-B14F-4D97-AF65-F5344CB8AC3E}">
         <p14:creationId xmlns:p14="http://schemas.microsoft.com/office/powerpoint/2010/main" val="1627020553"/>
+      </p:ext>
+    </p:extLst>
+  </p:cSld>
+  <p:clrMapOvr>
+    <a:masterClrMapping/>
+  </p:clrMapOvr>
+</p:sld>
+</file>
+
+<file path=ppt/slides/slide15.xml><?xml version="1.0" encoding="utf-8"?>
+<p:sld xmlns:a="http://schemas.openxmlformats.org/drawingml/2006/main" xmlns:r="http://schemas.openxmlformats.org/officeDocument/2006/relationships" xmlns:p="http://schemas.openxmlformats.org/presentationml/2006/main">
+  <p:cSld>
+    <p:spTree>
+      <p:nvGrpSpPr>
+        <p:cNvPr id="1" name=""/>
+        <p:cNvGrpSpPr/>
+        <p:nvPr/>
+      </p:nvGrpSpPr>
+      <p:grpSpPr>
+        <a:xfrm>
+          <a:off x="0" y="0"/>
+          <a:ext cx="0" cy="0"/>
+          <a:chOff x="0" y="0"/>
+          <a:chExt cx="0" cy="0"/>
+        </a:xfrm>
+      </p:grpSpPr>
+      <p:sp>
+        <p:nvSpPr>
+          <p:cNvPr id="2" name="Title 1"/>
+          <p:cNvSpPr>
+            <a:spLocks noGrp="1"/>
+          </p:cNvSpPr>
+          <p:nvPr>
+            <p:ph type="title"/>
+          </p:nvPr>
+        </p:nvSpPr>
+        <p:spPr/>
+        <p:txBody>
+          <a:bodyPr>
+            <a:normAutofit/>
+          </a:bodyPr>
+          <a:lstStyle/>
+          <a:p>
+            <a:r>
+              <a:rPr lang="en-US" dirty="0"/>
+              <a:t>Check for Google Play </a:t>
+            </a:r>
+            <a:r>
+              <a:rPr lang="en-US" dirty="0" smtClean="0"/>
+              <a:t>Services</a:t>
+            </a:r>
+            <a:endParaRPr lang="en-US" dirty="0"/>
+          </a:p>
+        </p:txBody>
+      </p:sp>
+      <p:sp>
+        <p:nvSpPr>
+          <p:cNvPr id="3" name="Content Placeholder 2"/>
+          <p:cNvSpPr>
+            <a:spLocks noGrp="1"/>
+          </p:cNvSpPr>
+          <p:nvPr>
+            <p:ph idx="1"/>
+          </p:nvPr>
+        </p:nvSpPr>
+        <p:spPr/>
+        <p:txBody>
+          <a:bodyPr>
+            <a:normAutofit/>
+          </a:bodyPr>
+          <a:lstStyle/>
+          <a:p>
+            <a:r>
+              <a:rPr lang="en-US" sz="2400" dirty="0" smtClean="0"/>
+              <a:t>Apps relying on Google Play Services should check for compatible version</a:t>
+            </a:r>
+          </a:p>
+          <a:p>
+            <a:r>
+              <a:rPr lang="en-US" sz="2400" dirty="0" smtClean="0"/>
+              <a:t>Typically done in following main activity methods</a:t>
+            </a:r>
+          </a:p>
+          <a:p>
+            <a:pPr lvl="1"/>
+            <a:r>
+              <a:rPr lang="en-US" sz="2000" dirty="0" smtClean="0"/>
+              <a:t>onCreate() – ensures app cannot be used without successful check</a:t>
+            </a:r>
+          </a:p>
+          <a:p>
+            <a:pPr lvl="1"/>
+            <a:r>
+              <a:rPr lang="en-US" sz="2000" dirty="0" smtClean="0"/>
+              <a:t>onResume() – ensures check is done when user returns to the app</a:t>
+            </a:r>
+          </a:p>
+          <a:p>
+            <a:r>
+              <a:rPr lang="en-US" sz="2400" dirty="0" smtClean="0"/>
+              <a:t>App can </a:t>
+            </a:r>
+            <a:r>
+              <a:rPr lang="en-US" sz="2400" dirty="0"/>
+              <a:t>call GooglePlayServicesUtil.getErrorDialog(</a:t>
+            </a:r>
+            <a:r>
+              <a:rPr lang="en-US" sz="2400" dirty="0" smtClean="0"/>
+              <a:t>) to:</a:t>
+            </a:r>
+          </a:p>
+          <a:p>
+            <a:pPr lvl="1"/>
+            <a:r>
+              <a:rPr lang="en-US" sz="2000" dirty="0" smtClean="0"/>
+              <a:t>Download APK from Google Play Store or</a:t>
+            </a:r>
+          </a:p>
+          <a:p>
+            <a:pPr lvl="1"/>
+            <a:r>
+              <a:rPr lang="en-US" sz="2000" dirty="0" smtClean="0"/>
+              <a:t>Enable it in device settings</a:t>
+            </a:r>
+          </a:p>
+          <a:p>
+            <a:r>
+              <a:rPr lang="en-US" sz="2400" dirty="0" smtClean="0"/>
+              <a:t>Code walkthrough</a:t>
+            </a:r>
+          </a:p>
+        </p:txBody>
+      </p:sp>
+    </p:spTree>
+    <p:extLst>
+      <p:ext uri="{BB962C8B-B14F-4D97-AF65-F5344CB8AC3E}">
+        <p14:creationId xmlns:p14="http://schemas.microsoft.com/office/powerpoint/2010/main" val="606154861"/>
+      </p:ext>
+    </p:extLst>
+  </p:cSld>
+  <p:clrMapOvr>
+    <a:masterClrMapping/>
+  </p:clrMapOvr>
+</p:sld>
+</file>
+
+<file path=ppt/slides/slide16.xml><?xml version="1.0" encoding="utf-8"?>
+<p:sld xmlns:a="http://schemas.openxmlformats.org/drawingml/2006/main" xmlns:r="http://schemas.openxmlformats.org/officeDocument/2006/relationships" xmlns:p="http://schemas.openxmlformats.org/presentationml/2006/main">
+  <p:cSld>
+    <p:spTree>
+      <p:nvGrpSpPr>
+        <p:cNvPr id="1" name=""/>
+        <p:cNvGrpSpPr/>
+        <p:nvPr/>
+      </p:nvGrpSpPr>
+      <p:grpSpPr>
+        <a:xfrm>
+          <a:off x="0" y="0"/>
+          <a:ext cx="0" cy="0"/>
+          <a:chOff x="0" y="0"/>
+          <a:chExt cx="0" cy="0"/>
+        </a:xfrm>
+      </p:grpSpPr>
+      <p:sp>
+        <p:nvSpPr>
+          <p:cNvPr id="2" name="Title 1"/>
+          <p:cNvSpPr>
+            <a:spLocks noGrp="1"/>
+          </p:cNvSpPr>
+          <p:nvPr>
+            <p:ph type="title"/>
+          </p:nvPr>
+        </p:nvSpPr>
+        <p:spPr/>
+        <p:txBody>
+          <a:bodyPr/>
+          <a:lstStyle/>
+          <a:p>
+            <a:r>
+              <a:rPr lang="en-US" dirty="0" smtClean="0"/>
+              <a:t>Check for Google Play Services</a:t>
+            </a:r>
+            <a:endParaRPr lang="en-US" dirty="0"/>
+          </a:p>
+        </p:txBody>
+      </p:sp>
+      <p:pic>
+        <p:nvPicPr>
+          <p:cNvPr id="4" name="Content Placeholder 3"/>
+          <p:cNvPicPr>
+            <a:picLocks noGrp="1" noChangeAspect="1"/>
+          </p:cNvPicPr>
+          <p:nvPr>
+            <p:ph idx="1"/>
+          </p:nvPr>
+        </p:nvPicPr>
+        <p:blipFill>
+          <a:blip r:embed="rId2" cstate="print">
+            <a:extLst>
+              <a:ext uri="{28A0092B-C50C-407E-A947-70E740481C1C}">
+                <a14:useLocalDpi xmlns:a14="http://schemas.microsoft.com/office/drawing/2010/main" val="0"/>
+              </a:ext>
+            </a:extLst>
+          </a:blip>
+          <a:stretch>
+            <a:fillRect/>
+          </a:stretch>
+        </p:blipFill>
+        <p:spPr>
+          <a:xfrm>
+            <a:off x="1600200" y="1600200"/>
+            <a:ext cx="2711040" cy="4525963"/>
+          </a:xfrm>
+        </p:spPr>
+      </p:pic>
+      <p:pic>
+        <p:nvPicPr>
+          <p:cNvPr id="5" name="Picture 4"/>
+          <p:cNvPicPr>
+            <a:picLocks noChangeAspect="1"/>
+          </p:cNvPicPr>
+          <p:nvPr/>
+        </p:nvPicPr>
+        <p:blipFill>
+          <a:blip r:embed="rId3" cstate="print">
+            <a:extLst>
+              <a:ext uri="{28A0092B-C50C-407E-A947-70E740481C1C}">
+                <a14:useLocalDpi xmlns:a14="http://schemas.microsoft.com/office/drawing/2010/main" val="0"/>
+              </a:ext>
+            </a:extLst>
+          </a:blip>
+          <a:stretch>
+            <a:fillRect/>
+          </a:stretch>
+        </p:blipFill>
+        <p:spPr>
+          <a:xfrm>
+            <a:off x="4800600" y="1600200"/>
+            <a:ext cx="2714442" cy="4525963"/>
+          </a:xfrm>
+          <a:prstGeom prst="rect">
+            <a:avLst/>
+          </a:prstGeom>
+        </p:spPr>
+      </p:pic>
+    </p:spTree>
+    <p:extLst>
+      <p:ext uri="{BB962C8B-B14F-4D97-AF65-F5344CB8AC3E}">
+        <p14:creationId xmlns:p14="http://schemas.microsoft.com/office/powerpoint/2010/main" val="3882006213"/>
+      </p:ext>
+    </p:extLst>
+  </p:cSld>
+  <p:clrMapOvr>
+    <a:masterClrMapping/>
+  </p:clrMapOvr>
+</p:sld>
+</file>
+
+<file path=ppt/slides/slide17.xml><?xml version="1.0" encoding="utf-8"?>
+<p:sld xmlns:a="http://schemas.openxmlformats.org/drawingml/2006/main" xmlns:r="http://schemas.openxmlformats.org/officeDocument/2006/relationships" xmlns:p="http://schemas.openxmlformats.org/presentationml/2006/main">
+  <p:cSld>
+    <p:spTree>
+      <p:nvGrpSpPr>
+        <p:cNvPr id="1" name=""/>
+        <p:cNvGrpSpPr/>
+        <p:nvPr/>
+      </p:nvGrpSpPr>
+      <p:grpSpPr>
+        <a:xfrm>
+          <a:off x="0" y="0"/>
+          <a:ext cx="0" cy="0"/>
+          <a:chOff x="0" y="0"/>
+          <a:chExt cx="0" cy="0"/>
+        </a:xfrm>
+      </p:grpSpPr>
+      <p:sp>
+        <p:nvSpPr>
+          <p:cNvPr id="2" name="Title 1"/>
+          <p:cNvSpPr>
+            <a:spLocks noGrp="1"/>
+          </p:cNvSpPr>
+          <p:nvPr>
+            <p:ph type="title"/>
+          </p:nvPr>
+        </p:nvSpPr>
+        <p:spPr/>
+        <p:txBody>
+          <a:bodyPr/>
+          <a:lstStyle/>
+          <a:p>
+            <a:r>
+              <a:rPr lang="en-US" dirty="0" smtClean="0"/>
+              <a:t>Register with GCM</a:t>
+            </a:r>
+            <a:endParaRPr lang="en-US" dirty="0"/>
+          </a:p>
+        </p:txBody>
+      </p:sp>
+      <p:sp>
+        <p:nvSpPr>
+          <p:cNvPr id="3" name="Content Placeholder 2"/>
+          <p:cNvSpPr>
+            <a:spLocks noGrp="1"/>
+          </p:cNvSpPr>
+          <p:nvPr>
+            <p:ph idx="1"/>
+          </p:nvPr>
+        </p:nvSpPr>
+        <p:spPr/>
+        <p:txBody>
+          <a:bodyPr>
+            <a:normAutofit lnSpcReduction="10000"/>
+          </a:bodyPr>
+          <a:lstStyle/>
+          <a:p>
+            <a:r>
+              <a:rPr lang="en-US" sz="2800" dirty="0" smtClean="0"/>
+              <a:t>App must </a:t>
+            </a:r>
+            <a:r>
+              <a:rPr lang="en-US" sz="2800" dirty="0"/>
+              <a:t>register </a:t>
+            </a:r>
+            <a:r>
+              <a:rPr lang="en-US" sz="2800" dirty="0" smtClean="0"/>
+              <a:t>with GCM before </a:t>
+            </a:r>
+            <a:r>
+              <a:rPr lang="en-US" sz="2800" dirty="0"/>
+              <a:t>it can receive </a:t>
+            </a:r>
+            <a:r>
+              <a:rPr lang="en-US" sz="2800" dirty="0" smtClean="0"/>
+              <a:t>messages</a:t>
+            </a:r>
+          </a:p>
+          <a:p>
+            <a:pPr lvl="1"/>
+            <a:r>
+              <a:rPr lang="en-US" sz="2400" dirty="0" smtClean="0"/>
+              <a:t>Must be done on background thread because GCM register() method blocks</a:t>
+            </a:r>
+          </a:p>
+          <a:p>
+            <a:r>
+              <a:rPr lang="en-US" sz="2800" dirty="0" smtClean="0"/>
+              <a:t>Receives registration ID from GCM</a:t>
+            </a:r>
+          </a:p>
+          <a:p>
+            <a:pPr lvl="1"/>
+            <a:r>
+              <a:rPr lang="en-US" sz="2400" dirty="0" smtClean="0"/>
+              <a:t>Used by server to send notifications to that device</a:t>
+            </a:r>
+          </a:p>
+          <a:p>
+            <a:r>
+              <a:rPr lang="en-US" sz="2800" dirty="0" smtClean="0"/>
+              <a:t>Registration ID stored by app</a:t>
+            </a:r>
+          </a:p>
+          <a:p>
+            <a:pPr lvl="1"/>
+            <a:r>
+              <a:rPr lang="en-US" sz="2400" dirty="0" smtClean="0"/>
+              <a:t>Allows registration to be skipped if ID is still valid</a:t>
+            </a:r>
+          </a:p>
+          <a:p>
+            <a:pPr lvl="1"/>
+            <a:r>
+              <a:rPr lang="en-US" sz="2400" dirty="0" smtClean="0"/>
+              <a:t>Typically inside shared preferences</a:t>
+            </a:r>
+          </a:p>
+          <a:p>
+            <a:r>
+              <a:rPr lang="en-US" sz="2800" dirty="0" smtClean="0"/>
+              <a:t>Code walkthrough</a:t>
+            </a:r>
+            <a:endParaRPr lang="en-US" sz="2800" dirty="0"/>
+          </a:p>
+        </p:txBody>
+      </p:sp>
+    </p:spTree>
+    <p:extLst>
+      <p:ext uri="{BB962C8B-B14F-4D97-AF65-F5344CB8AC3E}">
+        <p14:creationId xmlns:p14="http://schemas.microsoft.com/office/powerpoint/2010/main" val="361619516"/>
+      </p:ext>
+    </p:extLst>
+  </p:cSld>
+  <p:clrMapOvr>
+    <a:masterClrMapping/>
+  </p:clrMapOvr>
+</p:sld>
+</file>
+
+<file path=ppt/slides/slide18.xml><?xml version="1.0" encoding="utf-8"?>
+<p:sld xmlns:a="http://schemas.openxmlformats.org/drawingml/2006/main" xmlns:r="http://schemas.openxmlformats.org/officeDocument/2006/relationships" xmlns:p="http://schemas.openxmlformats.org/presentationml/2006/main">
+  <p:cSld>
+    <p:spTree>
+      <p:nvGrpSpPr>
+        <p:cNvPr id="1" name=""/>
+        <p:cNvGrpSpPr/>
+        <p:nvPr/>
+      </p:nvGrpSpPr>
+      <p:grpSpPr>
+        <a:xfrm>
+          <a:off x="0" y="0"/>
+          <a:ext cx="0" cy="0"/>
+          <a:chOff x="0" y="0"/>
+          <a:chExt cx="0" cy="0"/>
+        </a:xfrm>
+      </p:grpSpPr>
+      <p:sp>
+        <p:nvSpPr>
+          <p:cNvPr id="2" name="Title 1"/>
+          <p:cNvSpPr>
+            <a:spLocks noGrp="1"/>
+          </p:cNvSpPr>
+          <p:nvPr>
+            <p:ph type="title"/>
+          </p:nvPr>
+        </p:nvSpPr>
+        <p:spPr/>
+        <p:txBody>
+          <a:bodyPr>
+            <a:normAutofit/>
+          </a:bodyPr>
+          <a:lstStyle/>
+          <a:p>
+            <a:r>
+              <a:rPr lang="en-US" dirty="0" smtClean="0"/>
+              <a:t>Implement </a:t>
+            </a:r>
+            <a:r>
+              <a:rPr lang="en-US" dirty="0" smtClean="0"/>
+              <a:t>Services</a:t>
+            </a:r>
+            <a:endParaRPr lang="en-US" dirty="0"/>
+          </a:p>
+        </p:txBody>
+      </p:sp>
+      <p:sp>
+        <p:nvSpPr>
+          <p:cNvPr id="3" name="Content Placeholder 2"/>
+          <p:cNvSpPr>
+            <a:spLocks noGrp="1"/>
+          </p:cNvSpPr>
+          <p:nvPr>
+            <p:ph idx="1"/>
+          </p:nvPr>
+        </p:nvSpPr>
+        <p:spPr/>
+        <p:txBody>
+          <a:bodyPr>
+            <a:normAutofit lnSpcReduction="10000"/>
+          </a:bodyPr>
+          <a:lstStyle/>
+          <a:p>
+            <a:r>
+              <a:rPr lang="en-US" dirty="0" smtClean="0"/>
+              <a:t>Extend </a:t>
+            </a:r>
+            <a:r>
+              <a:rPr lang="en-US" dirty="0" err="1" smtClean="0"/>
+              <a:t>InstanceIDListenerService</a:t>
+            </a:r>
+            <a:endParaRPr lang="en-US" dirty="0" smtClean="0"/>
+          </a:p>
+          <a:p>
+            <a:pPr lvl="1"/>
+            <a:r>
+              <a:rPr lang="en-US" dirty="0" smtClean="0"/>
+              <a:t>Override </a:t>
+            </a:r>
+            <a:r>
+              <a:rPr lang="en-US" dirty="0" err="1" smtClean="0"/>
+              <a:t>onTokenRefresh</a:t>
+            </a:r>
+            <a:r>
+              <a:rPr lang="en-US" dirty="0" smtClean="0"/>
+              <a:t>() to process GCM registration token updates</a:t>
+            </a:r>
+            <a:endParaRPr lang="en-US" dirty="0" smtClean="0"/>
+          </a:p>
+          <a:p>
+            <a:r>
+              <a:rPr lang="en-US" dirty="0" smtClean="0"/>
+              <a:t>Extend </a:t>
+            </a:r>
+            <a:r>
+              <a:rPr lang="en-US" dirty="0" err="1" smtClean="0"/>
+              <a:t>GcmListenerService</a:t>
+            </a:r>
+            <a:endParaRPr lang="en-US" dirty="0" smtClean="0"/>
+          </a:p>
+          <a:p>
+            <a:pPr lvl="1"/>
+            <a:r>
+              <a:rPr lang="en-US" dirty="0" smtClean="0"/>
+              <a:t>Override </a:t>
+            </a:r>
+            <a:r>
+              <a:rPr lang="en-US" dirty="0" err="1" smtClean="0"/>
+              <a:t>onMessageReceived</a:t>
+            </a:r>
+            <a:r>
+              <a:rPr lang="en-US" dirty="0" smtClean="0"/>
+              <a:t>() </a:t>
+            </a:r>
+            <a:r>
+              <a:rPr lang="en-US" dirty="0" smtClean="0"/>
+              <a:t>to </a:t>
+            </a:r>
+            <a:r>
+              <a:rPr lang="en-US" dirty="0" smtClean="0"/>
+              <a:t>receive and process GCM messages</a:t>
+            </a:r>
+          </a:p>
+          <a:p>
+            <a:pPr lvl="1"/>
+            <a:r>
+              <a:rPr lang="en-US" dirty="0" smtClean="0"/>
+              <a:t>Use </a:t>
+            </a:r>
+            <a:r>
+              <a:rPr lang="en-US" dirty="0" err="1" smtClean="0"/>
+              <a:t>Notification.Builder</a:t>
+            </a:r>
+            <a:r>
+              <a:rPr lang="en-US" dirty="0" smtClean="0"/>
+              <a:t> to build notification</a:t>
+            </a:r>
+          </a:p>
+          <a:p>
+            <a:pPr lvl="1"/>
+            <a:r>
+              <a:rPr lang="en-US" dirty="0" smtClean="0"/>
+              <a:t>Use </a:t>
+            </a:r>
+            <a:r>
+              <a:rPr lang="en-US" dirty="0" err="1" smtClean="0"/>
+              <a:t>NotificationManager</a:t>
+            </a:r>
+            <a:r>
+              <a:rPr lang="en-US" dirty="0" smtClean="0"/>
+              <a:t> to send notification</a:t>
+            </a:r>
+            <a:endParaRPr lang="en-US" dirty="0" smtClean="0"/>
+          </a:p>
+          <a:p>
+            <a:r>
+              <a:rPr lang="en-US" dirty="0" smtClean="0"/>
+              <a:t>Code </a:t>
+            </a:r>
+            <a:r>
+              <a:rPr lang="en-US" dirty="0" smtClean="0"/>
+              <a:t>walkthrough</a:t>
+            </a:r>
+            <a:endParaRPr lang="en-US" dirty="0"/>
+          </a:p>
+        </p:txBody>
+      </p:sp>
+    </p:spTree>
+    <p:extLst>
+      <p:ext uri="{BB962C8B-B14F-4D97-AF65-F5344CB8AC3E}">
+        <p14:creationId xmlns:p14="http://schemas.microsoft.com/office/powerpoint/2010/main" val="2368302692"/>
+      </p:ext>
+    </p:extLst>
+  </p:cSld>
+  <p:clrMapOvr>
+    <a:masterClrMapping/>
+  </p:clrMapOvr>
+</p:sld>
+</file>
+
+<file path=ppt/slides/slide19.xml><?xml version="1.0" encoding="utf-8"?>
+<p:sld xmlns:a="http://schemas.openxmlformats.org/drawingml/2006/main" xmlns:r="http://schemas.openxmlformats.org/officeDocument/2006/relationships" xmlns:p="http://schemas.openxmlformats.org/presentationml/2006/main">
+  <p:cSld>
+    <p:spTree>
+      <p:nvGrpSpPr>
+        <p:cNvPr id="1" name=""/>
+        <p:cNvGrpSpPr/>
+        <p:nvPr/>
+      </p:nvGrpSpPr>
+      <p:grpSpPr>
+        <a:xfrm>
+          <a:off x="0" y="0"/>
+          <a:ext cx="0" cy="0"/>
+          <a:chOff x="0" y="0"/>
+          <a:chExt cx="0" cy="0"/>
+        </a:xfrm>
+      </p:grpSpPr>
+      <p:sp>
+        <p:nvSpPr>
+          <p:cNvPr id="2" name="Title 1"/>
+          <p:cNvSpPr>
+            <a:spLocks noGrp="1"/>
+          </p:cNvSpPr>
+          <p:nvPr>
+            <p:ph type="title"/>
+          </p:nvPr>
+        </p:nvSpPr>
+        <p:spPr/>
+        <p:txBody>
+          <a:bodyPr>
+            <a:normAutofit fontScale="90000"/>
+          </a:bodyPr>
+          <a:lstStyle/>
+          <a:p>
+            <a:r>
+              <a:rPr lang="en-US" dirty="0" smtClean="0"/>
+              <a:t>Process Notification Data in Activity</a:t>
+            </a:r>
+            <a:endParaRPr lang="en-US" dirty="0"/>
+          </a:p>
+        </p:txBody>
+      </p:sp>
+      <p:sp>
+        <p:nvSpPr>
+          <p:cNvPr id="3" name="Content Placeholder 2"/>
+          <p:cNvSpPr>
+            <a:spLocks noGrp="1"/>
+          </p:cNvSpPr>
+          <p:nvPr>
+            <p:ph idx="1"/>
+          </p:nvPr>
+        </p:nvSpPr>
+        <p:spPr/>
+        <p:txBody>
+          <a:bodyPr/>
+          <a:lstStyle/>
+          <a:p>
+            <a:r>
+              <a:rPr lang="en-US" dirty="0" smtClean="0"/>
+              <a:t>Store data inside Intent extras</a:t>
+            </a:r>
+          </a:p>
+          <a:p>
+            <a:r>
+              <a:rPr lang="en-US" dirty="0" smtClean="0"/>
+              <a:t>Process data in two places</a:t>
+            </a:r>
+          </a:p>
+          <a:p>
+            <a:pPr lvl="1"/>
+            <a:r>
+              <a:rPr lang="en-US" dirty="0" smtClean="0"/>
+              <a:t>onCreate() if activity was destroyed / recreated</a:t>
+            </a:r>
+          </a:p>
+          <a:p>
+            <a:pPr lvl="1"/>
+            <a:r>
+              <a:rPr lang="en-US" dirty="0" smtClean="0"/>
+              <a:t>onNewIntent() if activity still exists</a:t>
+            </a:r>
+          </a:p>
+          <a:p>
+            <a:pPr lvl="2"/>
+            <a:r>
+              <a:rPr lang="en-US" dirty="0" smtClean="0"/>
+              <a:t>Requires Intent to </a:t>
+            </a:r>
+            <a:r>
+              <a:rPr lang="en-US" dirty="0"/>
+              <a:t>have </a:t>
+            </a:r>
+            <a:r>
+              <a:rPr lang="en-US" dirty="0" smtClean="0"/>
+              <a:t>FLAG_ACTIVITY_SINGLE_TOP flag to be set</a:t>
+            </a:r>
+          </a:p>
+          <a:p>
+            <a:r>
+              <a:rPr lang="en-US" dirty="0" smtClean="0"/>
+              <a:t> Code walkthrough</a:t>
+            </a:r>
+            <a:endParaRPr lang="en-US" dirty="0"/>
+          </a:p>
+        </p:txBody>
+      </p:sp>
+    </p:spTree>
+    <p:extLst>
+      <p:ext uri="{BB962C8B-B14F-4D97-AF65-F5344CB8AC3E}">
+        <p14:creationId xmlns:p14="http://schemas.microsoft.com/office/powerpoint/2010/main" val="504142742"/>
       </p:ext>
     </p:extLst>
   </p:cSld>
@@ -6979,7 +6772,37 @@
       </p:grpSpPr>
       <p:pic>
         <p:nvPicPr>
-          <p:cNvPr id="3" name="Picture 2"/>
+          <p:cNvPr id="4" name="Picture 3"/>
+          <p:cNvPicPr>
+            <a:picLocks noChangeAspect="1"/>
+          </p:cNvPicPr>
+          <p:nvPr/>
+        </p:nvPicPr>
+        <p:blipFill>
+          <a:blip r:embed="rId2">
+            <a:extLst>
+              <a:ext uri="{28A0092B-C50C-407E-A947-70E740481C1C}">
+                <a14:useLocalDpi xmlns:a14="http://schemas.microsoft.com/office/drawing/2010/main" val="0"/>
+              </a:ext>
+            </a:extLst>
+          </a:blip>
+          <a:stretch>
+            <a:fillRect/>
+          </a:stretch>
+        </p:blipFill>
+        <p:spPr>
+          <a:xfrm>
+            <a:off x="0" y="0"/>
+            <a:ext cx="9144000" cy="6858000"/>
+          </a:xfrm>
+          <a:prstGeom prst="rect">
+            <a:avLst/>
+          </a:prstGeom>
+        </p:spPr>
+      </p:pic>
+      <p:pic>
+        <p:nvPicPr>
+          <p:cNvPr id="5" name="Picture 4"/>
           <p:cNvPicPr>
             <a:picLocks noChangeAspect="1"/>
           </p:cNvPicPr>
@@ -6999,211 +6822,24 @@
         </p:blipFill>
         <p:spPr>
           <a:xfrm>
-            <a:off x="76200" y="3630"/>
-            <a:ext cx="9144000" cy="6858000"/>
+            <a:off x="1028700" y="857250"/>
+            <a:ext cx="7081524" cy="5143500"/>
           </a:xfrm>
           <a:prstGeom prst="rect">
             <a:avLst/>
           </a:prstGeom>
         </p:spPr>
       </p:pic>
-      <p:pic>
-        <p:nvPicPr>
-          <p:cNvPr id="1026" name="Picture 2"/>
-          <p:cNvPicPr>
-            <a:picLocks noChangeAspect="1" noChangeArrowheads="1"/>
-          </p:cNvPicPr>
-          <p:nvPr/>
-        </p:nvPicPr>
-        <p:blipFill>
-          <a:blip r:embed="rId4" cstate="print">
-            <a:extLst>
-              <a:ext uri="{28A0092B-C50C-407E-A947-70E740481C1C}">
-                <a14:useLocalDpi xmlns:a14="http://schemas.microsoft.com/office/drawing/2010/main" val="0"/>
-              </a:ext>
-            </a:extLst>
-          </a:blip>
-          <a:stretch>
-            <a:fillRect/>
-          </a:stretch>
-        </p:blipFill>
-        <p:spPr bwMode="auto">
-          <a:xfrm>
-            <a:off x="5943600" y="6248400"/>
-            <a:ext cx="3072900" cy="532272"/>
-          </a:xfrm>
-          <a:prstGeom prst="rect">
-            <a:avLst/>
-          </a:prstGeom>
-          <a:noFill/>
-          <a:extLst>
-            <a:ext uri="{909E8E84-426E-40dd-AFC4-6F175D3DCCD1}">
-              <a14:hiddenFill xmlns:a14="http://schemas.microsoft.com/office/drawing/2010/main">
-                <a:solidFill>
-                  <a:srgbClr val="FFFFFF"/>
-                </a:solidFill>
-              </a14:hiddenFill>
-            </a:ext>
-          </a:extLst>
-        </p:spPr>
-      </p:pic>
-      <p:sp>
-        <p:nvSpPr>
-          <p:cNvPr id="2" name="Title 1"/>
-          <p:cNvSpPr>
-            <a:spLocks noGrp="1"/>
-          </p:cNvSpPr>
-          <p:nvPr>
-            <p:ph type="title"/>
-          </p:nvPr>
-        </p:nvSpPr>
-        <p:spPr/>
-        <p:txBody>
-          <a:bodyPr/>
-          <a:lstStyle/>
-          <a:p>
-            <a:r>
-              <a:rPr lang="en-US" dirty="0" smtClean="0"/>
-              <a:t>Agenda</a:t>
-            </a:r>
-            <a:endParaRPr lang="en-US" dirty="0"/>
-          </a:p>
-        </p:txBody>
-      </p:sp>
-      <p:sp>
-        <p:nvSpPr>
-          <p:cNvPr id="6" name="Content Placeholder 5"/>
-          <p:cNvSpPr>
-            <a:spLocks noGrp="1"/>
-          </p:cNvSpPr>
-          <p:nvPr>
-            <p:ph idx="1"/>
-          </p:nvPr>
-        </p:nvSpPr>
-        <p:spPr/>
-        <p:txBody>
-          <a:bodyPr>
-            <a:normAutofit fontScale="92500" lnSpcReduction="10000"/>
-          </a:bodyPr>
-          <a:lstStyle/>
-          <a:p>
-            <a:r>
-              <a:rPr lang="en-US" sz="2000" dirty="0" smtClean="0"/>
-              <a:t>Introduction</a:t>
-            </a:r>
-          </a:p>
-          <a:p>
-            <a:r>
-              <a:rPr lang="en-US" sz="2000" dirty="0" smtClean="0"/>
-              <a:t>Prerequisites</a:t>
-            </a:r>
-          </a:p>
-          <a:p>
-            <a:r>
-              <a:rPr lang="en-US" sz="2000" dirty="0" smtClean="0"/>
-              <a:t>Set Up Google Play Services SDK</a:t>
-            </a:r>
-          </a:p>
-          <a:p>
-            <a:r>
-              <a:rPr lang="en-US" sz="2000" dirty="0" smtClean="0"/>
-              <a:t>Create Google API Project</a:t>
-            </a:r>
-          </a:p>
-          <a:p>
-            <a:r>
-              <a:rPr lang="en-US" sz="2000" dirty="0" smtClean="0"/>
-              <a:t>Add Google Play Services Library</a:t>
-            </a:r>
-          </a:p>
-          <a:p>
-            <a:r>
-              <a:rPr lang="en-US" sz="2000" dirty="0"/>
-              <a:t>Check for Google Play </a:t>
-            </a:r>
-            <a:r>
-              <a:rPr lang="en-US" sz="2000" dirty="0" smtClean="0"/>
-              <a:t>Services Availability</a:t>
-            </a:r>
-          </a:p>
-          <a:p>
-            <a:r>
-              <a:rPr lang="en-US" sz="2000" dirty="0" smtClean="0"/>
-              <a:t>Register Your App with GCM</a:t>
-            </a:r>
-          </a:p>
-          <a:p>
-            <a:r>
-              <a:rPr lang="en-US" sz="2000" dirty="0" smtClean="0"/>
-              <a:t>Implement Broadcast </a:t>
-            </a:r>
-            <a:r>
-              <a:rPr lang="en-US" sz="2000" dirty="0"/>
-              <a:t>Receiver and </a:t>
-            </a:r>
-            <a:r>
-              <a:rPr lang="en-US" sz="2000" dirty="0" smtClean="0"/>
-              <a:t>Intent Service</a:t>
-            </a:r>
-          </a:p>
-          <a:p>
-            <a:r>
-              <a:rPr lang="en-US" sz="2000" dirty="0" smtClean="0"/>
-              <a:t>Process Notification Data in Activity</a:t>
-            </a:r>
-          </a:p>
-          <a:p>
-            <a:r>
-              <a:rPr lang="en-US" sz="2000" dirty="0" smtClean="0"/>
-              <a:t>Update the App's Manifest</a:t>
-            </a:r>
-          </a:p>
-          <a:p>
-            <a:r>
-              <a:rPr lang="en-US" sz="2000" dirty="0" smtClean="0"/>
-              <a:t>Testing Without a Server</a:t>
-            </a:r>
-          </a:p>
-          <a:p>
-            <a:r>
-              <a:rPr lang="en-US" sz="2000" dirty="0"/>
-              <a:t>Test API Key and Registration ID</a:t>
-            </a:r>
-          </a:p>
-          <a:p>
-            <a:r>
-              <a:rPr lang="en-US" sz="2000" dirty="0" smtClean="0"/>
-              <a:t>Additional Info and Questions</a:t>
-            </a:r>
-            <a:endParaRPr lang="en-US" sz="2000" dirty="0"/>
-          </a:p>
-        </p:txBody>
-      </p:sp>
     </p:spTree>
     <p:extLst>
       <p:ext uri="{BB962C8B-B14F-4D97-AF65-F5344CB8AC3E}">
-        <p14:creationId xmlns:p14="http://schemas.microsoft.com/office/powerpoint/2010/main" val="3827468359"/>
+        <p14:creationId xmlns:p14="http://schemas.microsoft.com/office/powerpoint/2010/main" val="1681692777"/>
       </p:ext>
     </p:extLst>
   </p:cSld>
   <p:clrMapOvr>
     <a:masterClrMapping/>
   </p:clrMapOvr>
-  <mc:AlternateContent xmlns:mc="http://schemas.openxmlformats.org/markup-compatibility/2006" xmlns:p14="http://schemas.microsoft.com/office/powerpoint/2010/main">
-    <mc:Choice Requires="p14">
-      <p:transition spd="slow" p14:dur="2000"/>
-    </mc:Choice>
-    <mc:Fallback xmlns="">
-      <p:transition spd="slow"/>
-    </mc:Fallback>
-  </mc:AlternateContent>
-  <p:timing>
-    <p:tnLst>
-      <p:par>
-        <p:cTn xmlns:p14="http://schemas.microsoft.com/office/powerpoint/2010/main" id="1" dur="indefinite" restart="never" nodeType="tmRoot"/>
-      </p:par>
-    </p:tnLst>
-  </p:timing>
 </p:sld>
 </file>
 
@@ -7310,8 +6946,28 @@
             <a:pPr lvl="2"/>
             <a:r>
               <a:rPr lang="en-US" dirty="0" smtClean="0"/>
-              <a:t>Dev HTTP Client  - Google Chrome App</a:t>
-            </a:r>
+              <a:t>Dev HTTP Client </a:t>
+            </a:r>
+            <a:r>
+              <a:rPr lang="en-US" dirty="0" smtClean="0"/>
+              <a:t>(DHC) </a:t>
+            </a:r>
+            <a:r>
+              <a:rPr lang="en-US" dirty="0" smtClean="0"/>
+              <a:t>- Google Chrome </a:t>
+            </a:r>
+            <a:r>
+              <a:rPr lang="en-US" dirty="0" smtClean="0"/>
+              <a:t>App</a:t>
+            </a:r>
+          </a:p>
+          <a:p>
+            <a:pPr lvl="2"/>
+            <a:r>
+              <a:rPr lang="en-US" dirty="0" smtClean="0"/>
+              <a:t>Postman - Google Chrome App</a:t>
+            </a:r>
+            <a:endParaRPr lang="en-US" dirty="0" smtClean="0"/>
           </a:p>
           <a:p>
             <a:pPr lvl="2"/>
@@ -8434,8 +8090,9 @@
           <a:p>
             <a:r>
               <a:rPr lang="en-US" sz="2000" dirty="0" smtClean="0"/>
-              <a:t>Building your Project with Gradle and Android Studio</a:t>
-            </a:r>
+              <a:t>Android Build System Overview</a:t>
+            </a:r>
+            <a:endParaRPr lang="en-US" sz="2000" dirty="0" smtClean="0"/>
           </a:p>
           <a:p>
             <a:pPr lvl="1"/>
@@ -8625,128 +8282,100 @@
           <a:chExt cx="0" cy="0"/>
         </a:xfrm>
       </p:grpSpPr>
-      <p:sp>
-        <p:nvSpPr>
-          <p:cNvPr id="2" name="Title 1"/>
-          <p:cNvSpPr>
-            <a:spLocks noGrp="1"/>
-          </p:cNvSpPr>
-          <p:nvPr>
-            <p:ph type="title"/>
-          </p:nvPr>
-        </p:nvSpPr>
-        <p:spPr/>
-        <p:txBody>
-          <a:bodyPr/>
-          <a:lstStyle/>
-          <a:p>
-            <a:r>
-              <a:rPr lang="en-US" dirty="0" smtClean="0"/>
-              <a:t>Introduction</a:t>
-            </a:r>
-            <a:endParaRPr lang="en-US" dirty="0"/>
-          </a:p>
-        </p:txBody>
-      </p:sp>
-      <p:sp>
-        <p:nvSpPr>
-          <p:cNvPr id="3" name="Content Placeholder 2"/>
-          <p:cNvSpPr>
-            <a:spLocks noGrp="1"/>
-          </p:cNvSpPr>
-          <p:nvPr>
-            <p:ph idx="1"/>
-          </p:nvPr>
-        </p:nvSpPr>
-        <p:spPr/>
-        <p:txBody>
-          <a:bodyPr>
-            <a:normAutofit/>
-          </a:bodyPr>
-          <a:lstStyle/>
-          <a:p>
-            <a:r>
-              <a:rPr lang="en-US" sz="2400" dirty="0" smtClean="0"/>
-              <a:t>About me</a:t>
-            </a:r>
-          </a:p>
-          <a:p>
-            <a:pPr lvl="1"/>
-            <a:r>
-              <a:rPr lang="en-US" sz="2000" dirty="0" smtClean="0"/>
-              <a:t>Over </a:t>
-            </a:r>
-            <a:r>
-              <a:rPr lang="en-US" sz="2000" dirty="0"/>
-              <a:t>25 years experience designing, developing and delivering high quality software solutions for several companies including Lexmark, Diebold, Limited Brands, Sterling Commerce and IBM. C</a:t>
-            </a:r>
-            <a:r>
-              <a:rPr lang="en-US" sz="2000" dirty="0" smtClean="0"/>
-              <a:t>ompleted </a:t>
-            </a:r>
-            <a:r>
-              <a:rPr lang="en-US" sz="2000" dirty="0"/>
-              <a:t>a PhoneGap / web technology based Android mobile app solution to help automate the workflow for </a:t>
-            </a:r>
-            <a:r>
-              <a:rPr lang="en-US" sz="2000" dirty="0" smtClean="0"/>
-              <a:t>client's </a:t>
-            </a:r>
-            <a:r>
-              <a:rPr lang="en-US" sz="2000" dirty="0"/>
-              <a:t>1,200 service technicians. </a:t>
-            </a:r>
-            <a:r>
-              <a:rPr lang="en-US" sz="2000" dirty="0" smtClean="0"/>
-              <a:t>Also </a:t>
-            </a:r>
-            <a:r>
-              <a:rPr lang="en-US" sz="2000" dirty="0"/>
-              <a:t>completed push notification support for a client’s native Android app that allows the client’s employees to be notified of new equipment alarms. </a:t>
-            </a:r>
-            <a:r>
-              <a:rPr lang="en-US" sz="2000" dirty="0" smtClean="0"/>
-              <a:t>Presented </a:t>
-            </a:r>
-            <a:r>
-              <a:rPr lang="en-US" sz="2000" dirty="0"/>
-              <a:t>"Real World Mobile App Development with </a:t>
-            </a:r>
-            <a:r>
-              <a:rPr lang="en-US" sz="2000" dirty="0" smtClean="0"/>
-              <a:t>PhoneGap</a:t>
-            </a:r>
-            <a:r>
-              <a:rPr lang="en-US" sz="2000" dirty="0"/>
-              <a:t>" at Columbus Code Camp, </a:t>
-            </a:r>
-            <a:r>
-              <a:rPr lang="en-US" sz="2000" dirty="0" err="1"/>
-              <a:t>StirTrek</a:t>
-            </a:r>
-            <a:r>
-              <a:rPr lang="en-US" sz="2000" dirty="0"/>
-              <a:t> and M3. Presented "Hybrid or Native - What Should Be Your Mobile Strategy and </a:t>
-            </a:r>
-            <a:r>
-              <a:rPr lang="en-US" sz="2000" dirty="0" smtClean="0"/>
-              <a:t>Why" at M3. Currently </a:t>
-            </a:r>
-            <a:r>
-              <a:rPr lang="en-US" sz="2000" dirty="0"/>
-              <a:t>working on the design and architecture of a mobile and server vehicle health management solution for a large trucking company</a:t>
-            </a:r>
-            <a:r>
-              <a:rPr lang="en-US" sz="2000" dirty="0" smtClean="0"/>
-              <a:t>.</a:t>
-            </a:r>
-          </a:p>
-        </p:txBody>
-      </p:sp>
+      <p:pic>
+        <p:nvPicPr>
+          <p:cNvPr id="4" name="Picture 3"/>
+          <p:cNvPicPr>
+            <a:picLocks noChangeAspect="1"/>
+          </p:cNvPicPr>
+          <p:nvPr/>
+        </p:nvPicPr>
+        <p:blipFill>
+          <a:blip r:embed="rId3">
+            <a:extLst>
+              <a:ext uri="{28A0092B-C50C-407E-A947-70E740481C1C}">
+                <a14:useLocalDpi xmlns:a14="http://schemas.microsoft.com/office/drawing/2010/main" val="0"/>
+              </a:ext>
+            </a:extLst>
+          </a:blip>
+          <a:stretch>
+            <a:fillRect/>
+          </a:stretch>
+        </p:blipFill>
+        <p:spPr>
+          <a:xfrm>
+            <a:off x="0" y="857250"/>
+            <a:ext cx="9144000" cy="5143500"/>
+          </a:xfrm>
+          <a:prstGeom prst="rect">
+            <a:avLst/>
+          </a:prstGeom>
+        </p:spPr>
+      </p:pic>
+      <p:pic>
+        <p:nvPicPr>
+          <p:cNvPr id="5" name="Picture 4"/>
+          <p:cNvPicPr>
+            <a:picLocks noChangeAspect="1"/>
+          </p:cNvPicPr>
+          <p:nvPr/>
+        </p:nvPicPr>
+        <p:blipFill>
+          <a:blip r:embed="rId3">
+            <a:extLst>
+              <a:ext uri="{28A0092B-C50C-407E-A947-70E740481C1C}">
+                <a14:useLocalDpi xmlns:a14="http://schemas.microsoft.com/office/drawing/2010/main" val="0"/>
+              </a:ext>
+            </a:extLst>
+          </a:blip>
+          <a:stretch>
+            <a:fillRect/>
+          </a:stretch>
+        </p:blipFill>
+        <p:spPr>
+          <a:xfrm>
+            <a:off x="0" y="0"/>
+            <a:ext cx="9144000" cy="6858000"/>
+          </a:xfrm>
+          <a:prstGeom prst="rect">
+            <a:avLst/>
+          </a:prstGeom>
+        </p:spPr>
+      </p:pic>
+      <p:pic>
+        <p:nvPicPr>
+          <p:cNvPr id="2" name="Picture 1"/>
+          <p:cNvPicPr>
+            <a:picLocks noChangeAspect="1"/>
+          </p:cNvPicPr>
+          <p:nvPr/>
+        </p:nvPicPr>
+        <p:blipFill>
+          <a:blip r:embed="rId4">
+            <a:extLst>
+              <a:ext uri="{28A0092B-C50C-407E-A947-70E740481C1C}">
+                <a14:useLocalDpi xmlns:a14="http://schemas.microsoft.com/office/drawing/2010/main" val="0"/>
+              </a:ext>
+            </a:extLst>
+          </a:blip>
+          <a:stretch>
+            <a:fillRect/>
+          </a:stretch>
+        </p:blipFill>
+        <p:spPr>
+          <a:xfrm>
+            <a:off x="0" y="857250"/>
+            <a:ext cx="9144000" cy="5143500"/>
+          </a:xfrm>
+          <a:prstGeom prst="rect">
+            <a:avLst/>
+          </a:prstGeom>
+        </p:spPr>
+      </p:pic>
     </p:spTree>
     <p:extLst>
       <p:ext uri="{BB962C8B-B14F-4D97-AF65-F5344CB8AC3E}">
-        <p14:creationId xmlns:p14="http://schemas.microsoft.com/office/powerpoint/2010/main" val="2746077949"/>
+        <p14:creationId xmlns:p14="http://schemas.microsoft.com/office/powerpoint/2010/main" val="1059961393"/>
       </p:ext>
     </p:extLst>
   </p:cSld>
@@ -8773,6 +8402,417 @@
           <a:chExt cx="0" cy="0"/>
         </a:xfrm>
       </p:grpSpPr>
+      <p:pic>
+        <p:nvPicPr>
+          <p:cNvPr id="3" name="Picture 2"/>
+          <p:cNvPicPr>
+            <a:picLocks noChangeAspect="1"/>
+          </p:cNvPicPr>
+          <p:nvPr/>
+        </p:nvPicPr>
+        <p:blipFill>
+          <a:blip r:embed="rId3">
+            <a:extLst>
+              <a:ext uri="{28A0092B-C50C-407E-A947-70E740481C1C}">
+                <a14:useLocalDpi xmlns:a14="http://schemas.microsoft.com/office/drawing/2010/main" val="0"/>
+              </a:ext>
+            </a:extLst>
+          </a:blip>
+          <a:stretch>
+            <a:fillRect/>
+          </a:stretch>
+        </p:blipFill>
+        <p:spPr>
+          <a:xfrm>
+            <a:off x="76200" y="3630"/>
+            <a:ext cx="9144000" cy="6858000"/>
+          </a:xfrm>
+          <a:prstGeom prst="rect">
+            <a:avLst/>
+          </a:prstGeom>
+        </p:spPr>
+      </p:pic>
+      <p:pic>
+        <p:nvPicPr>
+          <p:cNvPr id="1026" name="Picture 2"/>
+          <p:cNvPicPr>
+            <a:picLocks noChangeAspect="1" noChangeArrowheads="1"/>
+          </p:cNvPicPr>
+          <p:nvPr/>
+        </p:nvPicPr>
+        <p:blipFill>
+          <a:blip r:embed="rId4" cstate="print">
+            <a:extLst>
+              <a:ext uri="{28A0092B-C50C-407E-A947-70E740481C1C}">
+                <a14:useLocalDpi xmlns:a14="http://schemas.microsoft.com/office/drawing/2010/main" val="0"/>
+              </a:ext>
+            </a:extLst>
+          </a:blip>
+          <a:stretch>
+            <a:fillRect/>
+          </a:stretch>
+        </p:blipFill>
+        <p:spPr bwMode="auto">
+          <a:xfrm>
+            <a:off x="5943600" y="6248400"/>
+            <a:ext cx="3072900" cy="532272"/>
+          </a:xfrm>
+          <a:prstGeom prst="rect">
+            <a:avLst/>
+          </a:prstGeom>
+          <a:noFill/>
+          <a:extLst>
+            <a:ext uri="{909E8E84-426E-40dd-AFC4-6F175D3DCCD1}">
+              <a14:hiddenFill xmlns:a14="http://schemas.microsoft.com/office/drawing/2010/main" xmlns="">
+                <a:solidFill>
+                  <a:srgbClr val="FFFFFF"/>
+                </a:solidFill>
+              </a14:hiddenFill>
+            </a:ext>
+          </a:extLst>
+        </p:spPr>
+      </p:pic>
+      <p:sp>
+        <p:nvSpPr>
+          <p:cNvPr id="2" name="Title 1"/>
+          <p:cNvSpPr>
+            <a:spLocks noGrp="1"/>
+          </p:cNvSpPr>
+          <p:nvPr>
+            <p:ph type="title"/>
+          </p:nvPr>
+        </p:nvSpPr>
+        <p:spPr/>
+        <p:txBody>
+          <a:bodyPr/>
+          <a:lstStyle/>
+          <a:p>
+            <a:r>
+              <a:rPr lang="en-US" dirty="0" smtClean="0"/>
+              <a:t>Agenda</a:t>
+            </a:r>
+            <a:endParaRPr lang="en-US" dirty="0"/>
+          </a:p>
+        </p:txBody>
+      </p:sp>
+      <p:sp>
+        <p:nvSpPr>
+          <p:cNvPr id="6" name="Content Placeholder 5"/>
+          <p:cNvSpPr>
+            <a:spLocks noGrp="1"/>
+          </p:cNvSpPr>
+          <p:nvPr>
+            <p:ph idx="1"/>
+          </p:nvPr>
+        </p:nvSpPr>
+        <p:spPr/>
+        <p:txBody>
+          <a:bodyPr>
+            <a:normAutofit fontScale="92500" lnSpcReduction="10000"/>
+          </a:bodyPr>
+          <a:lstStyle/>
+          <a:p>
+            <a:r>
+              <a:rPr lang="en-US" sz="2000" dirty="0" smtClean="0"/>
+              <a:t>Introduction</a:t>
+            </a:r>
+          </a:p>
+          <a:p>
+            <a:r>
+              <a:rPr lang="en-US" sz="2000" dirty="0" smtClean="0"/>
+              <a:t>Prerequisites</a:t>
+            </a:r>
+          </a:p>
+          <a:p>
+            <a:r>
+              <a:rPr lang="en-US" sz="2000" dirty="0" smtClean="0"/>
+              <a:t>Set Up Google Play Services SDK</a:t>
+            </a:r>
+          </a:p>
+          <a:p>
+            <a:r>
+              <a:rPr lang="en-US" sz="2000" dirty="0" smtClean="0"/>
+              <a:t>Create Google API </a:t>
+            </a:r>
+            <a:r>
+              <a:rPr lang="en-US" sz="2000" dirty="0" smtClean="0"/>
+              <a:t>Project</a:t>
+            </a:r>
+          </a:p>
+          <a:p>
+            <a:r>
+              <a:rPr lang="en-US" sz="2000" dirty="0" smtClean="0"/>
+              <a:t>Get a Configuration File</a:t>
+            </a:r>
+            <a:endParaRPr lang="en-US" sz="2000" dirty="0" smtClean="0"/>
+          </a:p>
+          <a:p>
+            <a:r>
+              <a:rPr lang="en-US" sz="2000" dirty="0" smtClean="0"/>
+              <a:t>Add Google Play Services Library</a:t>
+            </a:r>
+          </a:p>
+          <a:p>
+            <a:r>
+              <a:rPr lang="en-US" sz="2000" dirty="0"/>
+              <a:t>Update the App's Manifest</a:t>
+            </a:r>
+          </a:p>
+          <a:p>
+            <a:r>
+              <a:rPr lang="en-US" sz="2000" dirty="0" smtClean="0"/>
+              <a:t>Check </a:t>
+            </a:r>
+            <a:r>
+              <a:rPr lang="en-US" sz="2000" dirty="0"/>
+              <a:t>for Google Play </a:t>
+            </a:r>
+            <a:r>
+              <a:rPr lang="en-US" sz="2000" dirty="0" smtClean="0"/>
+              <a:t>Services Availability</a:t>
+            </a:r>
+          </a:p>
+          <a:p>
+            <a:r>
+              <a:rPr lang="en-US" sz="2000" dirty="0" smtClean="0"/>
+              <a:t>Register Your App with GCM</a:t>
+            </a:r>
+          </a:p>
+          <a:p>
+            <a:r>
+              <a:rPr lang="en-US" sz="2000" dirty="0" smtClean="0"/>
+              <a:t>Implement </a:t>
+            </a:r>
+            <a:r>
+              <a:rPr lang="en-US" sz="2000" dirty="0" smtClean="0"/>
+              <a:t>Services</a:t>
+            </a:r>
+            <a:endParaRPr lang="en-US" sz="2000" dirty="0" smtClean="0"/>
+          </a:p>
+          <a:p>
+            <a:r>
+              <a:rPr lang="en-US" sz="2000" dirty="0" smtClean="0"/>
+              <a:t>Process Notification Data in Activity</a:t>
+            </a:r>
+          </a:p>
+          <a:p>
+            <a:r>
+              <a:rPr lang="en-US" sz="2000" dirty="0" smtClean="0"/>
+              <a:t>Testing </a:t>
+            </a:r>
+            <a:r>
+              <a:rPr lang="en-US" sz="2000" dirty="0" smtClean="0"/>
+              <a:t>Without a Server</a:t>
+            </a:r>
+          </a:p>
+          <a:p>
+            <a:r>
+              <a:rPr lang="en-US" sz="2000" dirty="0"/>
+              <a:t>Test API Key and Registration ID</a:t>
+            </a:r>
+          </a:p>
+          <a:p>
+            <a:r>
+              <a:rPr lang="en-US" sz="2000" dirty="0" smtClean="0"/>
+              <a:t>Additional Info and Questions</a:t>
+            </a:r>
+            <a:endParaRPr lang="en-US" sz="2000" dirty="0"/>
+          </a:p>
+        </p:txBody>
+      </p:sp>
+    </p:spTree>
+    <p:extLst>
+      <p:ext uri="{BB962C8B-B14F-4D97-AF65-F5344CB8AC3E}">
+        <p14:creationId xmlns:p14="http://schemas.microsoft.com/office/powerpoint/2010/main" val="3827468359"/>
+      </p:ext>
+    </p:extLst>
+  </p:cSld>
+  <p:clrMapOvr>
+    <a:masterClrMapping/>
+  </p:clrMapOvr>
+  <mc:AlternateContent xmlns:mc="http://schemas.openxmlformats.org/markup-compatibility/2006" xmlns:p14="http://schemas.microsoft.com/office/powerpoint/2010/main">
+    <mc:Choice Requires="p14">
+      <p:transition spd="slow" p14:dur="2000"/>
+    </mc:Choice>
+    <mc:Fallback xmlns="">
+      <p:transition spd="slow"/>
+    </mc:Fallback>
+  </mc:AlternateContent>
+  <p:timing>
+    <p:tnLst>
+      <p:par>
+        <p:cTn id="1" dur="indefinite" restart="never" nodeType="tmRoot"/>
+      </p:par>
+    </p:tnLst>
+  </p:timing>
+</p:sld>
+</file>
+
+<file path=ppt/slides/slide5.xml><?xml version="1.0" encoding="utf-8"?>
+<p:sld xmlns:a="http://schemas.openxmlformats.org/drawingml/2006/main" xmlns:r="http://schemas.openxmlformats.org/officeDocument/2006/relationships" xmlns:p="http://schemas.openxmlformats.org/presentationml/2006/main">
+  <p:cSld>
+    <p:spTree>
+      <p:nvGrpSpPr>
+        <p:cNvPr id="1" name=""/>
+        <p:cNvGrpSpPr/>
+        <p:nvPr/>
+      </p:nvGrpSpPr>
+      <p:grpSpPr>
+        <a:xfrm>
+          <a:off x="0" y="0"/>
+          <a:ext cx="0" cy="0"/>
+          <a:chOff x="0" y="0"/>
+          <a:chExt cx="0" cy="0"/>
+        </a:xfrm>
+      </p:grpSpPr>
+      <p:sp>
+        <p:nvSpPr>
+          <p:cNvPr id="2" name="Title 1"/>
+          <p:cNvSpPr>
+            <a:spLocks noGrp="1"/>
+          </p:cNvSpPr>
+          <p:nvPr>
+            <p:ph type="title"/>
+          </p:nvPr>
+        </p:nvSpPr>
+        <p:spPr/>
+        <p:txBody>
+          <a:bodyPr/>
+          <a:lstStyle/>
+          <a:p>
+            <a:r>
+              <a:rPr lang="en-US" dirty="0" smtClean="0"/>
+              <a:t>Introduction</a:t>
+            </a:r>
+            <a:endParaRPr lang="en-US" dirty="0"/>
+          </a:p>
+        </p:txBody>
+      </p:sp>
+      <p:sp>
+        <p:nvSpPr>
+          <p:cNvPr id="3" name="Content Placeholder 2"/>
+          <p:cNvSpPr>
+            <a:spLocks noGrp="1"/>
+          </p:cNvSpPr>
+          <p:nvPr>
+            <p:ph idx="1"/>
+          </p:nvPr>
+        </p:nvSpPr>
+        <p:spPr/>
+        <p:txBody>
+          <a:bodyPr>
+            <a:normAutofit/>
+          </a:bodyPr>
+          <a:lstStyle/>
+          <a:p>
+            <a:r>
+              <a:rPr lang="en-US" sz="2400" dirty="0" smtClean="0"/>
+              <a:t>About me</a:t>
+            </a:r>
+          </a:p>
+          <a:p>
+            <a:pPr lvl="1"/>
+            <a:r>
+              <a:rPr lang="en-US" sz="2000" dirty="0" smtClean="0"/>
+              <a:t>Over </a:t>
+            </a:r>
+            <a:r>
+              <a:rPr lang="en-US" sz="2000" dirty="0"/>
+              <a:t>25 years experience designing, developing and delivering high quality software solutions for several companies including Lexmark, Diebold, Limited Brands, Sterling Commerce and IBM. C</a:t>
+            </a:r>
+            <a:r>
+              <a:rPr lang="en-US" sz="2000" dirty="0" smtClean="0"/>
+              <a:t>ompleted </a:t>
+            </a:r>
+            <a:r>
+              <a:rPr lang="en-US" sz="2000" dirty="0"/>
+              <a:t>a PhoneGap / web technology based Android mobile app solution to help automate the workflow for </a:t>
+            </a:r>
+            <a:r>
+              <a:rPr lang="en-US" sz="2000" dirty="0" smtClean="0"/>
+              <a:t>client's </a:t>
+            </a:r>
+            <a:r>
+              <a:rPr lang="en-US" sz="2000" dirty="0"/>
+              <a:t>1,200 service technicians. </a:t>
+            </a:r>
+            <a:r>
+              <a:rPr lang="en-US" sz="2000" dirty="0" smtClean="0"/>
+              <a:t>Also </a:t>
+            </a:r>
+            <a:r>
+              <a:rPr lang="en-US" sz="2000" dirty="0"/>
+              <a:t>completed push notification support for a client’s native Android app that allows the client’s employees to be notified of new equipment alarms. </a:t>
+            </a:r>
+            <a:r>
+              <a:rPr lang="en-US" sz="2000" dirty="0" smtClean="0"/>
+              <a:t>Presented </a:t>
+            </a:r>
+            <a:r>
+              <a:rPr lang="en-US" sz="2000" dirty="0"/>
+              <a:t>"Real World Mobile App Development with </a:t>
+            </a:r>
+            <a:r>
+              <a:rPr lang="en-US" sz="2000" dirty="0" smtClean="0"/>
+              <a:t>PhoneGap</a:t>
+            </a:r>
+            <a:r>
+              <a:rPr lang="en-US" sz="2000" dirty="0"/>
+              <a:t>" at Columbus Code Camp, </a:t>
+            </a:r>
+            <a:r>
+              <a:rPr lang="en-US" sz="2000" dirty="0" err="1"/>
+              <a:t>StirTrek</a:t>
+            </a:r>
+            <a:r>
+              <a:rPr lang="en-US" sz="2000" dirty="0"/>
+              <a:t> and M3. Presented "Hybrid or Native - What Should Be Your Mobile Strategy and </a:t>
+            </a:r>
+            <a:r>
+              <a:rPr lang="en-US" sz="2000" dirty="0" smtClean="0"/>
+              <a:t>Why" at M3. Currently </a:t>
+            </a:r>
+            <a:r>
+              <a:rPr lang="en-US" sz="2000" dirty="0"/>
+              <a:t>working on the design and architecture of a mobile and server vehicle health management solution for a large trucking company</a:t>
+            </a:r>
+            <a:r>
+              <a:rPr lang="en-US" sz="2000" dirty="0" smtClean="0"/>
+              <a:t>.</a:t>
+            </a:r>
+          </a:p>
+        </p:txBody>
+      </p:sp>
+    </p:spTree>
+    <p:extLst>
+      <p:ext uri="{BB962C8B-B14F-4D97-AF65-F5344CB8AC3E}">
+        <p14:creationId xmlns:p14="http://schemas.microsoft.com/office/powerpoint/2010/main" val="2746077949"/>
+      </p:ext>
+    </p:extLst>
+  </p:cSld>
+  <p:clrMapOvr>
+    <a:masterClrMapping/>
+  </p:clrMapOvr>
+</p:sld>
+</file>
+
+<file path=ppt/slides/slide6.xml><?xml version="1.0" encoding="utf-8"?>
+<p:sld xmlns:a="http://schemas.openxmlformats.org/drawingml/2006/main" xmlns:r="http://schemas.openxmlformats.org/officeDocument/2006/relationships" xmlns:p="http://schemas.openxmlformats.org/presentationml/2006/main">
+  <p:cSld>
+    <p:spTree>
+      <p:nvGrpSpPr>
+        <p:cNvPr id="1" name=""/>
+        <p:cNvGrpSpPr/>
+        <p:nvPr/>
+      </p:nvGrpSpPr>
+      <p:grpSpPr>
+        <a:xfrm>
+          <a:off x="0" y="0"/>
+          <a:ext cx="0" cy="0"/>
+          <a:chOff x="0" y="0"/>
+          <a:chExt cx="0" cy="0"/>
+        </a:xfrm>
+      </p:grpSpPr>
       <p:sp>
         <p:nvSpPr>
           <p:cNvPr id="2" name="Title 1"/>
@@ -8843,7 +8883,7 @@
 </p:sld>
 </file>
 
-<file path=ppt/slides/slide5.xml><?xml version="1.0" encoding="utf-8"?>
+<file path=ppt/slides/slide7.xml><?xml version="1.0" encoding="utf-8"?>
 <p:sld xmlns:a="http://schemas.openxmlformats.org/drawingml/2006/main" xmlns:r="http://schemas.openxmlformats.org/officeDocument/2006/relationships" xmlns:p="http://schemas.openxmlformats.org/presentationml/2006/main">
   <p:cSld>
     <p:spTree>
@@ -8989,334 +9029,6 @@
 </p:sld>
 </file>
 
-<file path=ppt/slides/slide6.xml><?xml version="1.0" encoding="utf-8"?>
-<p:sld xmlns:a="http://schemas.openxmlformats.org/drawingml/2006/main" xmlns:r="http://schemas.openxmlformats.org/officeDocument/2006/relationships" xmlns:p="http://schemas.openxmlformats.org/presentationml/2006/main">
-  <p:cSld>
-    <p:spTree>
-      <p:nvGrpSpPr>
-        <p:cNvPr id="1" name=""/>
-        <p:cNvGrpSpPr/>
-        <p:nvPr/>
-      </p:nvGrpSpPr>
-      <p:grpSpPr>
-        <a:xfrm>
-          <a:off x="0" y="0"/>
-          <a:ext cx="0" cy="0"/>
-          <a:chOff x="0" y="0"/>
-          <a:chExt cx="0" cy="0"/>
-        </a:xfrm>
-      </p:grpSpPr>
-      <p:sp>
-        <p:nvSpPr>
-          <p:cNvPr id="2" name="Title 1"/>
-          <p:cNvSpPr>
-            <a:spLocks noGrp="1"/>
-          </p:cNvSpPr>
-          <p:nvPr>
-            <p:ph type="title"/>
-          </p:nvPr>
-        </p:nvSpPr>
-        <p:spPr/>
-        <p:txBody>
-          <a:bodyPr/>
-          <a:lstStyle/>
-          <a:p>
-            <a:r>
-              <a:rPr lang="en-US" dirty="0" smtClean="0"/>
-              <a:t>Prerequisites</a:t>
-            </a:r>
-            <a:endParaRPr lang="en-US" dirty="0"/>
-          </a:p>
-        </p:txBody>
-      </p:sp>
-      <p:sp>
-        <p:nvSpPr>
-          <p:cNvPr id="3" name="Content Placeholder 2"/>
-          <p:cNvSpPr>
-            <a:spLocks noGrp="1"/>
-          </p:cNvSpPr>
-          <p:nvPr>
-            <p:ph idx="1"/>
-          </p:nvPr>
-        </p:nvSpPr>
-        <p:spPr/>
-        <p:txBody>
-          <a:bodyPr>
-            <a:normAutofit fontScale="92500" lnSpcReduction="20000"/>
-          </a:bodyPr>
-          <a:lstStyle/>
-          <a:p>
-            <a:r>
-              <a:rPr lang="en-US" sz="2800" dirty="0" smtClean="0"/>
-              <a:t>Development</a:t>
-            </a:r>
-          </a:p>
-          <a:p>
-            <a:pPr lvl="1"/>
-            <a:r>
-              <a:rPr lang="en-US" sz="2400" dirty="0" smtClean="0"/>
-              <a:t>Google account to create Google API project</a:t>
-            </a:r>
-          </a:p>
-          <a:p>
-            <a:pPr lvl="1"/>
-            <a:r>
-              <a:rPr lang="en-US" sz="2400" dirty="0" smtClean="0"/>
-              <a:t>Android development environment</a:t>
-            </a:r>
-          </a:p>
-          <a:p>
-            <a:pPr lvl="2"/>
-            <a:r>
-              <a:rPr lang="en-US" sz="2000" dirty="0" smtClean="0"/>
-              <a:t>Android SDK: </a:t>
-            </a:r>
-            <a:r>
-              <a:rPr lang="en-US" sz="2000" dirty="0"/>
-              <a:t>http://developer.android.com/sdk/index.html</a:t>
-            </a:r>
-          </a:p>
-          <a:p>
-            <a:pPr lvl="2"/>
-            <a:r>
-              <a:rPr lang="en-US" sz="2000" dirty="0" smtClean="0"/>
-              <a:t>IDE</a:t>
-            </a:r>
-          </a:p>
-          <a:p>
-            <a:pPr lvl="3"/>
-            <a:r>
-              <a:rPr lang="en-US" sz="1600" dirty="0" err="1" smtClean="0"/>
-              <a:t>IntelliJ</a:t>
-            </a:r>
-            <a:r>
-              <a:rPr lang="en-US" sz="1600" dirty="0" smtClean="0"/>
-              <a:t> IDEA 14: </a:t>
-            </a:r>
-            <a:r>
-              <a:rPr lang="en-US" sz="1600" dirty="0"/>
-              <a:t>http://www.jetbrains.com/idea/</a:t>
-            </a:r>
-            <a:endParaRPr lang="en-US" sz="1600" dirty="0" smtClean="0"/>
-          </a:p>
-          <a:p>
-            <a:pPr lvl="3"/>
-            <a:r>
-              <a:rPr lang="en-US" sz="1600" dirty="0"/>
-              <a:t>Android </a:t>
-            </a:r>
-            <a:r>
-              <a:rPr lang="en-US" sz="1600" dirty="0" smtClean="0"/>
-              <a:t>Studio 1.0.2: </a:t>
-            </a:r>
-            <a:r>
-              <a:rPr lang="en-US" sz="1600" dirty="0"/>
-              <a:t>http://developer.android.com/sdk/index.html</a:t>
-            </a:r>
-            <a:endParaRPr lang="en-US" sz="1600" dirty="0" smtClean="0"/>
-          </a:p>
-          <a:p>
-            <a:pPr lvl="1"/>
-            <a:r>
-              <a:rPr lang="en-US" sz="2400" dirty="0" smtClean="0"/>
-              <a:t>Google Play services SDK</a:t>
-            </a:r>
-          </a:p>
-          <a:p>
-            <a:pPr lvl="2"/>
-            <a:r>
-              <a:rPr lang="en-US" sz="2000" dirty="0" smtClean="0"/>
-              <a:t>Required </a:t>
-            </a:r>
-            <a:r>
-              <a:rPr lang="en-US" sz="2000" dirty="0"/>
-              <a:t>to use the GoogleCloudMessaging </a:t>
-            </a:r>
-            <a:r>
-              <a:rPr lang="en-US" sz="2000" dirty="0" smtClean="0"/>
-              <a:t>methods</a:t>
-            </a:r>
-          </a:p>
-          <a:p>
-            <a:r>
-              <a:rPr lang="en-US" sz="2800" dirty="0" smtClean="0"/>
-              <a:t>Test</a:t>
-            </a:r>
-          </a:p>
-          <a:p>
-            <a:pPr lvl="1"/>
-            <a:r>
-              <a:rPr lang="en-US" sz="2400" dirty="0" smtClean="0"/>
-              <a:t>Compatible </a:t>
-            </a:r>
-            <a:r>
-              <a:rPr lang="en-US" sz="2400" dirty="0"/>
-              <a:t>Android device that runs Android 2.3 or higher and includes Google Play </a:t>
-            </a:r>
-            <a:r>
-              <a:rPr lang="en-US" sz="2400" dirty="0" smtClean="0"/>
-              <a:t>Store</a:t>
-            </a:r>
-          </a:p>
-          <a:p>
-            <a:pPr lvl="1"/>
-            <a:r>
-              <a:rPr lang="en-US" sz="2400" dirty="0" smtClean="0"/>
-              <a:t>Android </a:t>
-            </a:r>
-            <a:r>
-              <a:rPr lang="en-US" sz="2400" dirty="0"/>
-              <a:t>emulator with an AVD that runs the Google APIs platform based on Android 4.2.2 or higher</a:t>
-            </a:r>
-            <a:endParaRPr lang="en-US" sz="2400" dirty="0" smtClean="0"/>
-          </a:p>
-          <a:p>
-            <a:endParaRPr lang="en-US" sz="2800" dirty="0"/>
-          </a:p>
-        </p:txBody>
-      </p:sp>
-    </p:spTree>
-    <p:extLst>
-      <p:ext uri="{BB962C8B-B14F-4D97-AF65-F5344CB8AC3E}">
-        <p14:creationId xmlns:p14="http://schemas.microsoft.com/office/powerpoint/2010/main" val="1827219439"/>
-      </p:ext>
-    </p:extLst>
-  </p:cSld>
-  <p:clrMapOvr>
-    <a:masterClrMapping/>
-  </p:clrMapOvr>
-</p:sld>
-</file>
-
-<file path=ppt/slides/slide7.xml><?xml version="1.0" encoding="utf-8"?>
-<p:sld xmlns:a="http://schemas.openxmlformats.org/drawingml/2006/main" xmlns:r="http://schemas.openxmlformats.org/officeDocument/2006/relationships" xmlns:p="http://schemas.openxmlformats.org/presentationml/2006/main">
-  <p:cSld>
-    <p:spTree>
-      <p:nvGrpSpPr>
-        <p:cNvPr id="1" name=""/>
-        <p:cNvGrpSpPr/>
-        <p:nvPr/>
-      </p:nvGrpSpPr>
-      <p:grpSpPr>
-        <a:xfrm>
-          <a:off x="0" y="0"/>
-          <a:ext cx="0" cy="0"/>
-          <a:chOff x="0" y="0"/>
-          <a:chExt cx="0" cy="0"/>
-        </a:xfrm>
-      </p:grpSpPr>
-      <p:sp>
-        <p:nvSpPr>
-          <p:cNvPr id="2" name="Title 1"/>
-          <p:cNvSpPr>
-            <a:spLocks noGrp="1"/>
-          </p:cNvSpPr>
-          <p:nvPr>
-            <p:ph type="title"/>
-          </p:nvPr>
-        </p:nvSpPr>
-        <p:spPr/>
-        <p:txBody>
-          <a:bodyPr>
-            <a:normAutofit/>
-          </a:bodyPr>
-          <a:lstStyle/>
-          <a:p>
-            <a:r>
-              <a:rPr lang="en-US" dirty="0"/>
-              <a:t>Set Up Google Play Services </a:t>
-            </a:r>
-            <a:r>
-              <a:rPr lang="en-US" dirty="0" smtClean="0"/>
-              <a:t>SDK</a:t>
-            </a:r>
-            <a:endParaRPr lang="en-US" dirty="0"/>
-          </a:p>
-        </p:txBody>
-      </p:sp>
-      <p:sp>
-        <p:nvSpPr>
-          <p:cNvPr id="3" name="Content Placeholder 2"/>
-          <p:cNvSpPr>
-            <a:spLocks noGrp="1"/>
-          </p:cNvSpPr>
-          <p:nvPr>
-            <p:ph idx="1"/>
-          </p:nvPr>
-        </p:nvSpPr>
-        <p:spPr/>
-        <p:txBody>
-          <a:bodyPr/>
-          <a:lstStyle/>
-          <a:p>
-            <a:r>
-              <a:rPr lang="en-US" dirty="0" smtClean="0"/>
-              <a:t>Start the Android SDK Manager</a:t>
-            </a:r>
-          </a:p>
-          <a:p>
-            <a:r>
-              <a:rPr lang="en-US" dirty="0" smtClean="0"/>
-              <a:t>Install the Google Play services SDK</a:t>
-            </a:r>
-          </a:p>
-          <a:p>
-            <a:r>
-              <a:rPr lang="en-US" dirty="0" smtClean="0"/>
-              <a:t>To test on emulator</a:t>
-            </a:r>
-          </a:p>
-          <a:p>
-            <a:pPr lvl="1"/>
-            <a:r>
-              <a:rPr lang="en-US" dirty="0" smtClean="0"/>
-              <a:t>Expand platform for API 19 or higher</a:t>
-            </a:r>
-          </a:p>
-          <a:p>
-            <a:pPr lvl="1"/>
-            <a:r>
-              <a:rPr lang="en-US" dirty="0" smtClean="0"/>
-              <a:t>Install Google APIs (x86 System Image)</a:t>
-            </a:r>
-          </a:p>
-          <a:p>
-            <a:pPr lvl="1"/>
-            <a:r>
-              <a:rPr lang="en-US" dirty="0" smtClean="0"/>
-              <a:t>Create </a:t>
-            </a:r>
-            <a:r>
-              <a:rPr lang="en-US" dirty="0"/>
-              <a:t>a new AVD with Google APIs as the platform </a:t>
-            </a:r>
-            <a:r>
-              <a:rPr lang="en-US" dirty="0" smtClean="0"/>
-              <a:t>target</a:t>
-            </a:r>
-          </a:p>
-          <a:p>
-            <a:r>
-              <a:rPr lang="en-US" dirty="0" smtClean="0"/>
-              <a:t>DEMO</a:t>
-            </a:r>
-            <a:endParaRPr lang="en-US" dirty="0"/>
-          </a:p>
-        </p:txBody>
-      </p:sp>
-    </p:spTree>
-    <p:extLst>
-      <p:ext uri="{BB962C8B-B14F-4D97-AF65-F5344CB8AC3E}">
-        <p14:creationId xmlns:p14="http://schemas.microsoft.com/office/powerpoint/2010/main" val="707280565"/>
-      </p:ext>
-    </p:extLst>
-  </p:cSld>
-  <p:clrMapOvr>
-    <a:masterClrMapping/>
-  </p:clrMapOvr>
-</p:sld>
-</file>
-
 <file path=ppt/slides/slide8.xml><?xml version="1.0" encoding="utf-8"?>
 <p:sld xmlns:a="http://schemas.openxmlformats.org/drawingml/2006/main" xmlns:r="http://schemas.openxmlformats.org/officeDocument/2006/relationships" xmlns:p="http://schemas.openxmlformats.org/presentationml/2006/main">
   <p:cSld>
@@ -9351,7 +9063,7 @@
           <a:p>
             <a:r>
               <a:rPr lang="en-US" dirty="0" smtClean="0"/>
-              <a:t>Create Google API Project</a:t>
+              <a:t>Prerequisites</a:t>
             </a:r>
             <a:endParaRPr lang="en-US" dirty="0"/>
           </a:p>
@@ -9370,86 +9082,136 @@
         <p:spPr/>
         <p:txBody>
           <a:bodyPr>
-            <a:normAutofit/>
+            <a:normAutofit fontScale="92500" lnSpcReduction="20000"/>
           </a:bodyPr>
           <a:lstStyle/>
           <a:p>
             <a:r>
               <a:rPr lang="en-US" sz="2800" dirty="0" smtClean="0"/>
-              <a:t>Open the Google Developers Console</a:t>
+              <a:t>Development</a:t>
             </a:r>
           </a:p>
           <a:p>
             <a:pPr lvl="1"/>
             <a:r>
-              <a:rPr lang="en-US" sz="2400" dirty="0">
-                <a:hlinkClick r:id="rId2"/>
-              </a:rPr>
-              <a:t>https://cloud.google.com/</a:t>
-            </a:r>
-            <a:r>
-              <a:rPr lang="en-US" sz="2400" dirty="0" smtClean="0">
-                <a:hlinkClick r:id="rId2"/>
-              </a:rPr>
-              <a:t>console</a:t>
-            </a:r>
-            <a:endParaRPr lang="en-US" sz="2400" dirty="0" smtClean="0"/>
+              <a:rPr lang="en-US" sz="2400" dirty="0" smtClean="0"/>
+              <a:t>Google account to create Google API project</a:t>
+            </a:r>
           </a:p>
           <a:p>
             <a:pPr lvl="1"/>
             <a:r>
               <a:rPr lang="en-US" sz="2400" dirty="0" smtClean="0"/>
-              <a:t>Click Create Project</a:t>
-            </a:r>
+              <a:t>Android development environment</a:t>
+            </a:r>
+          </a:p>
+          <a:p>
+            <a:pPr lvl="2"/>
+            <a:r>
+              <a:rPr lang="en-US" sz="2000" dirty="0" smtClean="0"/>
+              <a:t>Android SDK: </a:t>
+            </a:r>
+            <a:r>
+              <a:rPr lang="en-US" sz="2000" dirty="0"/>
+              <a:t>http://developer.android.com/sdk/index.html</a:t>
+            </a:r>
+          </a:p>
+          <a:p>
+            <a:pPr lvl="2"/>
+            <a:r>
+              <a:rPr lang="en-US" sz="2000" dirty="0" smtClean="0"/>
+              <a:t>IDE</a:t>
+            </a:r>
+          </a:p>
+          <a:p>
+            <a:pPr lvl="3"/>
+            <a:r>
+              <a:rPr lang="en-US" sz="1600" dirty="0" err="1" smtClean="0"/>
+              <a:t>IntelliJ</a:t>
+            </a:r>
+            <a:r>
+              <a:rPr lang="en-US" sz="1600" dirty="0" smtClean="0"/>
+              <a:t> </a:t>
+            </a:r>
+            <a:r>
+              <a:rPr lang="en-US" sz="1600" dirty="0" smtClean="0"/>
+              <a:t>IDEA: </a:t>
+            </a:r>
+            <a:r>
+              <a:rPr lang="en-US" sz="1600" dirty="0"/>
+              <a:t>http://www.jetbrains.com/idea/</a:t>
+            </a:r>
+            <a:endParaRPr lang="en-US" sz="1600" dirty="0" smtClean="0"/>
+          </a:p>
+          <a:p>
+            <a:pPr lvl="3"/>
+            <a:r>
+              <a:rPr lang="en-US" sz="1600" dirty="0"/>
+              <a:t>Android </a:t>
+            </a:r>
+            <a:r>
+              <a:rPr lang="en-US" sz="1600" dirty="0" smtClean="0"/>
+              <a:t>Studio: </a:t>
+            </a:r>
+            <a:r>
+              <a:rPr lang="en-US" sz="1600" dirty="0"/>
+              <a:t>http://developer.android.com/sdk/index.html</a:t>
+            </a:r>
+            <a:endParaRPr lang="en-US" sz="1600" dirty="0" smtClean="0"/>
           </a:p>
           <a:p>
             <a:pPr lvl="1"/>
             <a:r>
               <a:rPr lang="en-US" sz="2400" dirty="0" smtClean="0"/>
-              <a:t>Enter the project’s name and ID</a:t>
+              <a:t>Google Play services SDK</a:t>
+            </a:r>
+          </a:p>
+          <a:p>
+            <a:pPr lvl="2"/>
+            <a:r>
+              <a:rPr lang="en-US" sz="2000" dirty="0" smtClean="0"/>
+              <a:t>Required </a:t>
+            </a:r>
+            <a:r>
+              <a:rPr lang="en-US" sz="2000" dirty="0"/>
+              <a:t>to use the GoogleCloudMessaging </a:t>
+            </a:r>
+            <a:r>
+              <a:rPr lang="en-US" sz="2000" dirty="0" smtClean="0"/>
+              <a:t>methods</a:t>
+            </a:r>
+          </a:p>
+          <a:p>
+            <a:r>
+              <a:rPr lang="en-US" sz="2800" dirty="0" smtClean="0"/>
+              <a:t>Test</a:t>
             </a:r>
           </a:p>
           <a:p>
             <a:pPr lvl="1"/>
             <a:r>
-              <a:rPr lang="en-US" sz="2400" b="1" dirty="0" smtClean="0">
-                <a:solidFill>
-                  <a:srgbClr val="800000"/>
-                </a:solidFill>
-              </a:rPr>
-              <a:t>IMPORTANT:</a:t>
-            </a:r>
-            <a:r>
               <a:rPr lang="en-US" sz="2400" dirty="0" smtClean="0"/>
-              <a:t> Note the project number, used later as GCM sender ID inside app when registering with GCM</a:t>
-            </a:r>
-          </a:p>
-          <a:p>
-            <a:r>
-              <a:rPr lang="en-US" sz="2800" dirty="0" smtClean="0"/>
-              <a:t>Enable the GCM service</a:t>
+              <a:t>Compatible </a:t>
+            </a:r>
+            <a:r>
+              <a:rPr lang="en-US" sz="2400" dirty="0"/>
+              <a:t>Android device that runs Android 2.3 or higher and includes Google Play </a:t>
+            </a:r>
+            <a:r>
+              <a:rPr lang="en-US" sz="2400" dirty="0" smtClean="0"/>
+              <a:t>Store</a:t>
             </a:r>
           </a:p>
           <a:p>
             <a:pPr lvl="1"/>
             <a:r>
               <a:rPr lang="en-US" sz="2400" dirty="0" smtClean="0"/>
-              <a:t>Expand APIs &amp; auth in left sidebar and click on APIs</a:t>
-            </a:r>
-          </a:p>
-          <a:p>
-            <a:pPr lvl="1"/>
+              <a:t>Android </a:t>
+            </a:r>
             <a:r>
               <a:rPr lang="en-US" sz="2400" dirty="0"/>
-              <a:t>Scroll down to Google Cloud Messaging for </a:t>
-            </a:r>
-            <a:r>
-              <a:rPr lang="en-US" sz="2400" dirty="0" smtClean="0"/>
-              <a:t>Android and turn it on</a:t>
-            </a:r>
-          </a:p>
-          <a:p>
-            <a:pPr lvl="1"/>
+              <a:t>emulator with an AVD that runs the Google APIs platform based on Android 4.2.2 or higher</a:t>
+            </a:r>
             <a:endParaRPr lang="en-US" sz="2400" dirty="0" smtClean="0"/>
           </a:p>
           <a:p>
@@ -9460,7 +9222,7 @@
     </p:spTree>
     <p:extLst>
       <p:ext uri="{BB962C8B-B14F-4D97-AF65-F5344CB8AC3E}">
-        <p14:creationId xmlns:p14="http://schemas.microsoft.com/office/powerpoint/2010/main" val="4033455311"/>
+        <p14:creationId xmlns:p14="http://schemas.microsoft.com/office/powerpoint/2010/main" val="1827219439"/>
       </p:ext>
     </p:extLst>
   </p:cSld>
@@ -9499,100 +9261,82 @@
         </p:nvSpPr>
         <p:spPr/>
         <p:txBody>
+          <a:bodyPr>
+            <a:normAutofit/>
+          </a:bodyPr>
+          <a:lstStyle/>
+          <a:p>
+            <a:r>
+              <a:rPr lang="en-US" dirty="0"/>
+              <a:t>Set Up Google Play Services </a:t>
+            </a:r>
+            <a:r>
+              <a:rPr lang="en-US" dirty="0" smtClean="0"/>
+              <a:t>SDK</a:t>
+            </a:r>
+            <a:endParaRPr lang="en-US" dirty="0"/>
+          </a:p>
+        </p:txBody>
+      </p:sp>
+      <p:sp>
+        <p:nvSpPr>
+          <p:cNvPr id="3" name="Content Placeholder 2"/>
+          <p:cNvSpPr>
+            <a:spLocks noGrp="1"/>
+          </p:cNvSpPr>
+          <p:nvPr>
+            <p:ph idx="1"/>
+          </p:nvPr>
+        </p:nvSpPr>
+        <p:spPr/>
+        <p:txBody>
           <a:bodyPr/>
           <a:lstStyle/>
           <a:p>
             <a:r>
               <a:rPr lang="en-US" dirty="0" smtClean="0"/>
-              <a:t>Create Google API Project</a:t>
-            </a:r>
-            <a:endParaRPr lang="en-US" dirty="0"/>
-          </a:p>
-        </p:txBody>
-      </p:sp>
-      <p:sp>
-        <p:nvSpPr>
-          <p:cNvPr id="3" name="Content Placeholder 2"/>
-          <p:cNvSpPr>
-            <a:spLocks noGrp="1"/>
-          </p:cNvSpPr>
-          <p:nvPr>
-            <p:ph idx="1"/>
-          </p:nvPr>
-        </p:nvSpPr>
-        <p:spPr/>
-        <p:txBody>
-          <a:bodyPr>
-            <a:normAutofit fontScale="92500" lnSpcReduction="10000"/>
-          </a:bodyPr>
-          <a:lstStyle/>
-          <a:p>
+              <a:t>Start the Android SDK Manager</a:t>
+            </a:r>
+          </a:p>
+          <a:p>
+            <a:r>
+              <a:rPr lang="en-US" dirty="0" smtClean="0"/>
+              <a:t>Install the Google Play services SDK</a:t>
+            </a:r>
+          </a:p>
+          <a:p>
+            <a:r>
+              <a:rPr lang="en-US" dirty="0" smtClean="0"/>
+              <a:t>To test on emulator</a:t>
+            </a:r>
+          </a:p>
+          <a:p>
+            <a:pPr lvl="1"/>
+            <a:r>
+              <a:rPr lang="en-US" dirty="0" smtClean="0"/>
+              <a:t>Expand platform for API 19 or higher</a:t>
+            </a:r>
+          </a:p>
+          <a:p>
+            <a:pPr lvl="1"/>
+            <a:r>
+              <a:rPr lang="en-US" dirty="0" smtClean="0"/>
+              <a:t>Install Google APIs (x86 System Image)</a:t>
+            </a:r>
+          </a:p>
+          <a:p>
+            <a:pPr lvl="1"/>
+            <a:r>
+              <a:rPr lang="en-US" dirty="0" smtClean="0"/>
+              <a:t>Create </a:t>
+            </a:r>
             <a:r>
               <a:rPr lang="en-US" dirty="0"/>
-              <a:t>Obtain the </a:t>
+              <a:t>a new AVD with Google APIs as the platform </a:t>
             </a:r>
             <a:r>
               <a:rPr lang="en-US" dirty="0" smtClean="0"/>
-              <a:t>Server API </a:t>
-            </a:r>
-            <a:r>
-              <a:rPr lang="en-US" dirty="0"/>
-              <a:t>key</a:t>
-            </a:r>
-          </a:p>
-          <a:p>
-            <a:pPr lvl="1"/>
-            <a:r>
-              <a:rPr lang="en-US" dirty="0"/>
-              <a:t>Click Credentials under APIs &amp; auth in left sidebar</a:t>
-            </a:r>
-          </a:p>
-          <a:p>
-            <a:pPr lvl="1"/>
-            <a:r>
-              <a:rPr lang="en-US" dirty="0"/>
-              <a:t>Under Public API access, click Create </a:t>
-            </a:r>
-            <a:r>
-              <a:rPr lang="en-US" dirty="0" smtClean="0"/>
-              <a:t>new </a:t>
-            </a:r>
-            <a:r>
-              <a:rPr lang="en-US" dirty="0"/>
-              <a:t>Key</a:t>
-            </a:r>
-          </a:p>
-          <a:p>
-            <a:pPr lvl="1"/>
-            <a:r>
-              <a:rPr lang="en-US" dirty="0"/>
-              <a:t>In Create a new key dialog, click Server </a:t>
-            </a:r>
-            <a:r>
-              <a:rPr lang="en-US" dirty="0" smtClean="0"/>
-              <a:t>key</a:t>
-            </a:r>
-          </a:p>
-          <a:p>
-            <a:pPr lvl="1"/>
-            <a:r>
-              <a:rPr lang="en-US" dirty="0" smtClean="0"/>
-              <a:t>In Create a server key and configure allowed IPs dialog, leave entry box blank and click Create</a:t>
-            </a:r>
-          </a:p>
-          <a:p>
-            <a:pPr lvl="1"/>
-            <a:r>
-              <a:rPr lang="en-US" b="1" dirty="0" smtClean="0">
-                <a:solidFill>
-                  <a:srgbClr val="800000"/>
-                </a:solidFill>
-              </a:rPr>
-              <a:t>IMPORTANT: </a:t>
-            </a:r>
-            <a:r>
-              <a:rPr lang="en-US" dirty="0" smtClean="0"/>
-              <a:t>Note the API KEY, used by server as authorization key in HTTP Authorization header when posting notification messages</a:t>
+              <a:t>target</a:t>
             </a:r>
           </a:p>
           <a:p>
@@ -9600,9 +9344,6 @@
               <a:rPr lang="en-US" dirty="0" smtClean="0"/>
               <a:t>DEMO</a:t>
             </a:r>
-            <a:endParaRPr lang="en-US" dirty="0"/>
-          </a:p>
-          <a:p>
             <a:endParaRPr lang="en-US" dirty="0"/>
           </a:p>
         </p:txBody>
@@ -9610,7 +9351,7 @@
     </p:spTree>
     <p:extLst>
       <p:ext uri="{BB962C8B-B14F-4D97-AF65-F5344CB8AC3E}">
-        <p14:creationId xmlns:p14="http://schemas.microsoft.com/office/powerpoint/2010/main" val="2396239310"/>
+        <p14:creationId xmlns:p14="http://schemas.microsoft.com/office/powerpoint/2010/main" val="707280565"/>
       </p:ext>
     </p:extLst>
   </p:cSld>

</xml_diff>